<commit_message>
Added Adobe Acrobat Icon
</commit_message>
<xml_diff>
--- a/tepk2924_Custon_Icon.pptx
+++ b/tepk2924_Custon_Icon.pptx
@@ -273,7 +273,7 @@
           <a:p>
             <a:fld id="{5514A77A-5394-47DD-9A3D-6F42195EF4ED}" type="datetimeFigureOut">
               <a:rPr lang="ko-KR" altLang="en-US" smtClean="0"/>
-              <a:t>2024-07-07</a:t>
+              <a:t>2024-07-08</a:t>
             </a:fld>
             <a:endParaRPr lang="ko-KR" altLang="en-US"/>
           </a:p>
@@ -471,7 +471,7 @@
           <a:p>
             <a:fld id="{5514A77A-5394-47DD-9A3D-6F42195EF4ED}" type="datetimeFigureOut">
               <a:rPr lang="ko-KR" altLang="en-US" smtClean="0"/>
-              <a:t>2024-07-07</a:t>
+              <a:t>2024-07-08</a:t>
             </a:fld>
             <a:endParaRPr lang="ko-KR" altLang="en-US"/>
           </a:p>
@@ -679,7 +679,7 @@
           <a:p>
             <a:fld id="{5514A77A-5394-47DD-9A3D-6F42195EF4ED}" type="datetimeFigureOut">
               <a:rPr lang="ko-KR" altLang="en-US" smtClean="0"/>
-              <a:t>2024-07-07</a:t>
+              <a:t>2024-07-08</a:t>
             </a:fld>
             <a:endParaRPr lang="ko-KR" altLang="en-US"/>
           </a:p>
@@ -877,7 +877,7 @@
           <a:p>
             <a:fld id="{5514A77A-5394-47DD-9A3D-6F42195EF4ED}" type="datetimeFigureOut">
               <a:rPr lang="ko-KR" altLang="en-US" smtClean="0"/>
-              <a:t>2024-07-07</a:t>
+              <a:t>2024-07-08</a:t>
             </a:fld>
             <a:endParaRPr lang="ko-KR" altLang="en-US"/>
           </a:p>
@@ -1152,7 +1152,7 @@
           <a:p>
             <a:fld id="{5514A77A-5394-47DD-9A3D-6F42195EF4ED}" type="datetimeFigureOut">
               <a:rPr lang="ko-KR" altLang="en-US" smtClean="0"/>
-              <a:t>2024-07-07</a:t>
+              <a:t>2024-07-08</a:t>
             </a:fld>
             <a:endParaRPr lang="ko-KR" altLang="en-US"/>
           </a:p>
@@ -1417,7 +1417,7 @@
           <a:p>
             <a:fld id="{5514A77A-5394-47DD-9A3D-6F42195EF4ED}" type="datetimeFigureOut">
               <a:rPr lang="ko-KR" altLang="en-US" smtClean="0"/>
-              <a:t>2024-07-07</a:t>
+              <a:t>2024-07-08</a:t>
             </a:fld>
             <a:endParaRPr lang="ko-KR" altLang="en-US"/>
           </a:p>
@@ -1829,7 +1829,7 @@
           <a:p>
             <a:fld id="{5514A77A-5394-47DD-9A3D-6F42195EF4ED}" type="datetimeFigureOut">
               <a:rPr lang="ko-KR" altLang="en-US" smtClean="0"/>
-              <a:t>2024-07-07</a:t>
+              <a:t>2024-07-08</a:t>
             </a:fld>
             <a:endParaRPr lang="ko-KR" altLang="en-US"/>
           </a:p>
@@ -1970,7 +1970,7 @@
           <a:p>
             <a:fld id="{5514A77A-5394-47DD-9A3D-6F42195EF4ED}" type="datetimeFigureOut">
               <a:rPr lang="ko-KR" altLang="en-US" smtClean="0"/>
-              <a:t>2024-07-07</a:t>
+              <a:t>2024-07-08</a:t>
             </a:fld>
             <a:endParaRPr lang="ko-KR" altLang="en-US"/>
           </a:p>
@@ -2083,7 +2083,7 @@
           <a:p>
             <a:fld id="{5514A77A-5394-47DD-9A3D-6F42195EF4ED}" type="datetimeFigureOut">
               <a:rPr lang="ko-KR" altLang="en-US" smtClean="0"/>
-              <a:t>2024-07-07</a:t>
+              <a:t>2024-07-08</a:t>
             </a:fld>
             <a:endParaRPr lang="ko-KR" altLang="en-US"/>
           </a:p>
@@ -2394,7 +2394,7 @@
           <a:p>
             <a:fld id="{5514A77A-5394-47DD-9A3D-6F42195EF4ED}" type="datetimeFigureOut">
               <a:rPr lang="ko-KR" altLang="en-US" smtClean="0"/>
-              <a:t>2024-07-07</a:t>
+              <a:t>2024-07-08</a:t>
             </a:fld>
             <a:endParaRPr lang="ko-KR" altLang="en-US"/>
           </a:p>
@@ -2682,7 +2682,7 @@
           <a:p>
             <a:fld id="{5514A77A-5394-47DD-9A3D-6F42195EF4ED}" type="datetimeFigureOut">
               <a:rPr lang="ko-KR" altLang="en-US" smtClean="0"/>
-              <a:t>2024-07-07</a:t>
+              <a:t>2024-07-08</a:t>
             </a:fld>
             <a:endParaRPr lang="ko-KR" altLang="en-US"/>
           </a:p>
@@ -2923,7 +2923,7 @@
           <a:p>
             <a:fld id="{5514A77A-5394-47DD-9A3D-6F42195EF4ED}" type="datetimeFigureOut">
               <a:rPr lang="ko-KR" altLang="en-US" smtClean="0"/>
-              <a:t>2024-07-07</a:t>
+              <a:t>2024-07-08</a:t>
             </a:fld>
             <a:endParaRPr lang="ko-KR" altLang="en-US"/>
           </a:p>
@@ -3342,7 +3342,7 @@
       </p:grpSpPr>
       <p:sp>
         <p:nvSpPr>
-          <p:cNvPr id="5" name="팔각형 4">
+          <p:cNvPr id="6" name="팔각형 5">
             <a:extLst>
               <a:ext uri="{FF2B5EF4-FFF2-40B4-BE49-F238E27FC236}">
                 <a16:creationId xmlns:a16="http://schemas.microsoft.com/office/drawing/2014/main" id="{FE15EBFD-72B6-CA37-48F3-5EA228E3A587}"/>
@@ -3394,7 +3394,7 @@
       </p:sp>
       <p:sp>
         <p:nvSpPr>
-          <p:cNvPr id="3" name="직사각형 2">
+          <p:cNvPr id="7" name="직사각형 6">
             <a:extLst>
               <a:ext uri="{FF2B5EF4-FFF2-40B4-BE49-F238E27FC236}">
                 <a16:creationId xmlns:a16="http://schemas.microsoft.com/office/drawing/2014/main" id="{06B4E298-DAFB-4FBD-2AC4-D44E05385CFD}"/>
@@ -3476,42 +3476,6 @@
           <a:chExt cx="0" cy="0"/>
         </a:xfrm>
       </p:grpSpPr>
-      <p:pic>
-        <p:nvPicPr>
-          <p:cNvPr id="3" name="그림 2">
-            <a:extLst>
-              <a:ext uri="{FF2B5EF4-FFF2-40B4-BE49-F238E27FC236}">
-                <a16:creationId xmlns:a16="http://schemas.microsoft.com/office/drawing/2014/main" id="{058CCEBD-F2A2-7254-87E4-9BAA08126314}"/>
-              </a:ext>
-            </a:extLst>
-          </p:cNvPr>
-          <p:cNvPicPr>
-            <a:picLocks noChangeAspect="1"/>
-          </p:cNvPicPr>
-          <p:nvPr/>
-        </p:nvPicPr>
-        <p:blipFill>
-          <a:blip r:embed="rId2">
-            <a:extLst>
-              <a:ext uri="{28A0092B-C50C-407E-A947-70E740481C1C}">
-                <a14:useLocalDpi xmlns:a14="http://schemas.microsoft.com/office/drawing/2010/main" val="0"/>
-              </a:ext>
-            </a:extLst>
-          </a:blip>
-          <a:stretch>
-            <a:fillRect/>
-          </a:stretch>
-        </p:blipFill>
-        <p:spPr>
-          <a:xfrm>
-            <a:off x="5673191" y="2012709"/>
-            <a:ext cx="3010320" cy="2534004"/>
-          </a:xfrm>
-          <a:prstGeom prst="rect">
-            <a:avLst/>
-          </a:prstGeom>
-        </p:spPr>
-      </p:pic>
     </p:spTree>
     <p:extLst>
       <p:ext uri="{BB962C8B-B14F-4D97-AF65-F5344CB8AC3E}">
@@ -8271,6 +8235,825 @@
           </p:sp>
         </p:grpSp>
       </p:grpSp>
+      <p:grpSp>
+        <p:nvGrpSpPr>
+          <p:cNvPr id="36" name="그룹 35">
+            <a:extLst>
+              <a:ext uri="{FF2B5EF4-FFF2-40B4-BE49-F238E27FC236}">
+                <a16:creationId xmlns:a16="http://schemas.microsoft.com/office/drawing/2014/main" id="{57E4ACCD-5353-E317-33E1-EF16A78F397F}"/>
+              </a:ext>
+            </a:extLst>
+          </p:cNvPr>
+          <p:cNvGrpSpPr/>
+          <p:nvPr/>
+        </p:nvGrpSpPr>
+        <p:grpSpPr>
+          <a:xfrm>
+            <a:off x="214735" y="2274447"/>
+            <a:ext cx="1440000" cy="1440000"/>
+            <a:chOff x="2550870" y="826647"/>
+            <a:chExt cx="1440000" cy="1440000"/>
+          </a:xfrm>
+        </p:grpSpPr>
+        <p:sp>
+          <p:nvSpPr>
+            <p:cNvPr id="37" name="팔각형 36">
+              <a:extLst>
+                <a:ext uri="{FF2B5EF4-FFF2-40B4-BE49-F238E27FC236}">
+                  <a16:creationId xmlns:a16="http://schemas.microsoft.com/office/drawing/2014/main" id="{6E8F9DFC-22AE-315A-8B67-8DA48B584598}"/>
+                </a:ext>
+              </a:extLst>
+            </p:cNvPr>
+            <p:cNvSpPr/>
+            <p:nvPr/>
+          </p:nvSpPr>
+          <p:spPr>
+            <a:xfrm>
+              <a:off x="2550870" y="826647"/>
+              <a:ext cx="1440000" cy="1440000"/>
+            </a:xfrm>
+            <a:prstGeom prst="octagon">
+              <a:avLst>
+                <a:gd name="adj" fmla="val 10714"/>
+              </a:avLst>
+            </a:prstGeom>
+            <a:solidFill>
+              <a:srgbClr val="B30B00"/>
+            </a:solidFill>
+            <a:ln>
+              <a:noFill/>
+            </a:ln>
+          </p:spPr>
+          <p:style>
+            <a:lnRef idx="2">
+              <a:schemeClr val="accent1">
+                <a:shade val="15000"/>
+              </a:schemeClr>
+            </a:lnRef>
+            <a:fillRef idx="1">
+              <a:schemeClr val="accent1"/>
+            </a:fillRef>
+            <a:effectRef idx="0">
+              <a:schemeClr val="accent1"/>
+            </a:effectRef>
+            <a:fontRef idx="minor">
+              <a:schemeClr val="lt1"/>
+            </a:fontRef>
+          </p:style>
+          <p:txBody>
+            <a:bodyPr rtlCol="0" anchor="ctr"/>
+            <a:lstStyle/>
+            <a:p>
+              <a:pPr algn="ctr"/>
+              <a:endParaRPr lang="ko-KR" altLang="en-US"/>
+            </a:p>
+          </p:txBody>
+        </p:sp>
+        <p:sp>
+          <p:nvSpPr>
+            <p:cNvPr id="38" name="자유형: 도형 37">
+              <a:extLst>
+                <a:ext uri="{FF2B5EF4-FFF2-40B4-BE49-F238E27FC236}">
+                  <a16:creationId xmlns:a16="http://schemas.microsoft.com/office/drawing/2014/main" id="{B00C7DF8-8EEC-7F01-B0DE-F3E2D575DE0E}"/>
+                </a:ext>
+              </a:extLst>
+            </p:cNvPr>
+            <p:cNvSpPr/>
+            <p:nvPr/>
+          </p:nvSpPr>
+          <p:spPr>
+            <a:xfrm>
+              <a:off x="2639060" y="1672590"/>
+              <a:ext cx="468000" cy="468000"/>
+            </a:xfrm>
+            <a:custGeom>
+              <a:avLst/>
+              <a:gdLst>
+                <a:gd name="connsiteX0" fmla="*/ 159440 w 468000"/>
+                <a:gd name="connsiteY0" fmla="*/ 54000 h 468000"/>
+                <a:gd name="connsiteX1" fmla="*/ 54000 w 468000"/>
+                <a:gd name="connsiteY1" fmla="*/ 159440 h 468000"/>
+                <a:gd name="connsiteX2" fmla="*/ 54000 w 468000"/>
+                <a:gd name="connsiteY2" fmla="*/ 308560 h 468000"/>
+                <a:gd name="connsiteX3" fmla="*/ 159440 w 468000"/>
+                <a:gd name="connsiteY3" fmla="*/ 414000 h 468000"/>
+                <a:gd name="connsiteX4" fmla="*/ 308560 w 468000"/>
+                <a:gd name="connsiteY4" fmla="*/ 414000 h 468000"/>
+                <a:gd name="connsiteX5" fmla="*/ 414000 w 468000"/>
+                <a:gd name="connsiteY5" fmla="*/ 308560 h 468000"/>
+                <a:gd name="connsiteX6" fmla="*/ 414000 w 468000"/>
+                <a:gd name="connsiteY6" fmla="*/ 159440 h 468000"/>
+                <a:gd name="connsiteX7" fmla="*/ 308560 w 468000"/>
+                <a:gd name="connsiteY7" fmla="*/ 54000 h 468000"/>
+                <a:gd name="connsiteX8" fmla="*/ 137073 w 468000"/>
+                <a:gd name="connsiteY8" fmla="*/ 0 h 468000"/>
+                <a:gd name="connsiteX9" fmla="*/ 330927 w 468000"/>
+                <a:gd name="connsiteY9" fmla="*/ 0 h 468000"/>
+                <a:gd name="connsiteX10" fmla="*/ 468000 w 468000"/>
+                <a:gd name="connsiteY10" fmla="*/ 137073 h 468000"/>
+                <a:gd name="connsiteX11" fmla="*/ 468000 w 468000"/>
+                <a:gd name="connsiteY11" fmla="*/ 330927 h 468000"/>
+                <a:gd name="connsiteX12" fmla="*/ 330927 w 468000"/>
+                <a:gd name="connsiteY12" fmla="*/ 468000 h 468000"/>
+                <a:gd name="connsiteX13" fmla="*/ 137073 w 468000"/>
+                <a:gd name="connsiteY13" fmla="*/ 468000 h 468000"/>
+                <a:gd name="connsiteX14" fmla="*/ 0 w 468000"/>
+                <a:gd name="connsiteY14" fmla="*/ 330927 h 468000"/>
+                <a:gd name="connsiteX15" fmla="*/ 0 w 468000"/>
+                <a:gd name="connsiteY15" fmla="*/ 137073 h 468000"/>
+              </a:gdLst>
+              <a:ahLst/>
+              <a:cxnLst>
+                <a:cxn ang="0">
+                  <a:pos x="connsiteX0" y="connsiteY0"/>
+                </a:cxn>
+                <a:cxn ang="0">
+                  <a:pos x="connsiteX1" y="connsiteY1"/>
+                </a:cxn>
+                <a:cxn ang="0">
+                  <a:pos x="connsiteX2" y="connsiteY2"/>
+                </a:cxn>
+                <a:cxn ang="0">
+                  <a:pos x="connsiteX3" y="connsiteY3"/>
+                </a:cxn>
+                <a:cxn ang="0">
+                  <a:pos x="connsiteX4" y="connsiteY4"/>
+                </a:cxn>
+                <a:cxn ang="0">
+                  <a:pos x="connsiteX5" y="connsiteY5"/>
+                </a:cxn>
+                <a:cxn ang="0">
+                  <a:pos x="connsiteX6" y="connsiteY6"/>
+                </a:cxn>
+                <a:cxn ang="0">
+                  <a:pos x="connsiteX7" y="connsiteY7"/>
+                </a:cxn>
+                <a:cxn ang="0">
+                  <a:pos x="connsiteX8" y="connsiteY8"/>
+                </a:cxn>
+                <a:cxn ang="0">
+                  <a:pos x="connsiteX9" y="connsiteY9"/>
+                </a:cxn>
+                <a:cxn ang="0">
+                  <a:pos x="connsiteX10" y="connsiteY10"/>
+                </a:cxn>
+                <a:cxn ang="0">
+                  <a:pos x="connsiteX11" y="connsiteY11"/>
+                </a:cxn>
+                <a:cxn ang="0">
+                  <a:pos x="connsiteX12" y="connsiteY12"/>
+                </a:cxn>
+                <a:cxn ang="0">
+                  <a:pos x="connsiteX13" y="connsiteY13"/>
+                </a:cxn>
+                <a:cxn ang="0">
+                  <a:pos x="connsiteX14" y="connsiteY14"/>
+                </a:cxn>
+                <a:cxn ang="0">
+                  <a:pos x="connsiteX15" y="connsiteY15"/>
+                </a:cxn>
+              </a:cxnLst>
+              <a:rect l="l" t="t" r="r" b="b"/>
+              <a:pathLst>
+                <a:path w="468000" h="468000">
+                  <a:moveTo>
+                    <a:pt x="159440" y="54000"/>
+                  </a:moveTo>
+                  <a:lnTo>
+                    <a:pt x="54000" y="159440"/>
+                  </a:lnTo>
+                  <a:lnTo>
+                    <a:pt x="54000" y="308560"/>
+                  </a:lnTo>
+                  <a:lnTo>
+                    <a:pt x="159440" y="414000"/>
+                  </a:lnTo>
+                  <a:lnTo>
+                    <a:pt x="308560" y="414000"/>
+                  </a:lnTo>
+                  <a:lnTo>
+                    <a:pt x="414000" y="308560"/>
+                  </a:lnTo>
+                  <a:lnTo>
+                    <a:pt x="414000" y="159440"/>
+                  </a:lnTo>
+                  <a:lnTo>
+                    <a:pt x="308560" y="54000"/>
+                  </a:lnTo>
+                  <a:close/>
+                  <a:moveTo>
+                    <a:pt x="137073" y="0"/>
+                  </a:moveTo>
+                  <a:lnTo>
+                    <a:pt x="330927" y="0"/>
+                  </a:lnTo>
+                  <a:lnTo>
+                    <a:pt x="468000" y="137073"/>
+                  </a:lnTo>
+                  <a:lnTo>
+                    <a:pt x="468000" y="330927"/>
+                  </a:lnTo>
+                  <a:lnTo>
+                    <a:pt x="330927" y="468000"/>
+                  </a:lnTo>
+                  <a:lnTo>
+                    <a:pt x="137073" y="468000"/>
+                  </a:lnTo>
+                  <a:lnTo>
+                    <a:pt x="0" y="330927"/>
+                  </a:lnTo>
+                  <a:lnTo>
+                    <a:pt x="0" y="137073"/>
+                  </a:lnTo>
+                  <a:close/>
+                </a:path>
+              </a:pathLst>
+            </a:custGeom>
+            <a:solidFill>
+              <a:schemeClr val="bg1"/>
+            </a:solidFill>
+            <a:ln>
+              <a:noFill/>
+            </a:ln>
+          </p:spPr>
+          <p:style>
+            <a:lnRef idx="2">
+              <a:schemeClr val="accent1">
+                <a:shade val="15000"/>
+              </a:schemeClr>
+            </a:lnRef>
+            <a:fillRef idx="1">
+              <a:schemeClr val="accent1"/>
+            </a:fillRef>
+            <a:effectRef idx="0">
+              <a:schemeClr val="accent1"/>
+            </a:effectRef>
+            <a:fontRef idx="minor">
+              <a:schemeClr val="lt1"/>
+            </a:fontRef>
+          </p:style>
+          <p:txBody>
+            <a:bodyPr wrap="square" rtlCol="0" anchor="ctr">
+              <a:noAutofit/>
+            </a:bodyPr>
+            <a:lstStyle/>
+            <a:p>
+              <a:pPr algn="ctr"/>
+              <a:endParaRPr lang="ko-KR" altLang="en-US"/>
+            </a:p>
+          </p:txBody>
+        </p:sp>
+        <p:sp>
+          <p:nvSpPr>
+            <p:cNvPr id="39" name="자유형: 도형 38">
+              <a:extLst>
+                <a:ext uri="{FF2B5EF4-FFF2-40B4-BE49-F238E27FC236}">
+                  <a16:creationId xmlns:a16="http://schemas.microsoft.com/office/drawing/2014/main" id="{22E587E5-CCBA-4AA2-B316-4A01B02F9E09}"/>
+                </a:ext>
+              </a:extLst>
+            </p:cNvPr>
+            <p:cNvSpPr/>
+            <p:nvPr/>
+          </p:nvSpPr>
+          <p:spPr>
+            <a:xfrm>
+              <a:off x="3432810" y="1672590"/>
+              <a:ext cx="468000" cy="468000"/>
+            </a:xfrm>
+            <a:custGeom>
+              <a:avLst/>
+              <a:gdLst>
+                <a:gd name="connsiteX0" fmla="*/ 159440 w 468000"/>
+                <a:gd name="connsiteY0" fmla="*/ 54000 h 468000"/>
+                <a:gd name="connsiteX1" fmla="*/ 54000 w 468000"/>
+                <a:gd name="connsiteY1" fmla="*/ 159440 h 468000"/>
+                <a:gd name="connsiteX2" fmla="*/ 54000 w 468000"/>
+                <a:gd name="connsiteY2" fmla="*/ 308560 h 468000"/>
+                <a:gd name="connsiteX3" fmla="*/ 159440 w 468000"/>
+                <a:gd name="connsiteY3" fmla="*/ 414000 h 468000"/>
+                <a:gd name="connsiteX4" fmla="*/ 308560 w 468000"/>
+                <a:gd name="connsiteY4" fmla="*/ 414000 h 468000"/>
+                <a:gd name="connsiteX5" fmla="*/ 414000 w 468000"/>
+                <a:gd name="connsiteY5" fmla="*/ 308560 h 468000"/>
+                <a:gd name="connsiteX6" fmla="*/ 414000 w 468000"/>
+                <a:gd name="connsiteY6" fmla="*/ 159440 h 468000"/>
+                <a:gd name="connsiteX7" fmla="*/ 308560 w 468000"/>
+                <a:gd name="connsiteY7" fmla="*/ 54000 h 468000"/>
+                <a:gd name="connsiteX8" fmla="*/ 137073 w 468000"/>
+                <a:gd name="connsiteY8" fmla="*/ 0 h 468000"/>
+                <a:gd name="connsiteX9" fmla="*/ 330927 w 468000"/>
+                <a:gd name="connsiteY9" fmla="*/ 0 h 468000"/>
+                <a:gd name="connsiteX10" fmla="*/ 468000 w 468000"/>
+                <a:gd name="connsiteY10" fmla="*/ 137073 h 468000"/>
+                <a:gd name="connsiteX11" fmla="*/ 468000 w 468000"/>
+                <a:gd name="connsiteY11" fmla="*/ 330927 h 468000"/>
+                <a:gd name="connsiteX12" fmla="*/ 330927 w 468000"/>
+                <a:gd name="connsiteY12" fmla="*/ 468000 h 468000"/>
+                <a:gd name="connsiteX13" fmla="*/ 137073 w 468000"/>
+                <a:gd name="connsiteY13" fmla="*/ 468000 h 468000"/>
+                <a:gd name="connsiteX14" fmla="*/ 0 w 468000"/>
+                <a:gd name="connsiteY14" fmla="*/ 330927 h 468000"/>
+                <a:gd name="connsiteX15" fmla="*/ 0 w 468000"/>
+                <a:gd name="connsiteY15" fmla="*/ 137073 h 468000"/>
+              </a:gdLst>
+              <a:ahLst/>
+              <a:cxnLst>
+                <a:cxn ang="0">
+                  <a:pos x="connsiteX0" y="connsiteY0"/>
+                </a:cxn>
+                <a:cxn ang="0">
+                  <a:pos x="connsiteX1" y="connsiteY1"/>
+                </a:cxn>
+                <a:cxn ang="0">
+                  <a:pos x="connsiteX2" y="connsiteY2"/>
+                </a:cxn>
+                <a:cxn ang="0">
+                  <a:pos x="connsiteX3" y="connsiteY3"/>
+                </a:cxn>
+                <a:cxn ang="0">
+                  <a:pos x="connsiteX4" y="connsiteY4"/>
+                </a:cxn>
+                <a:cxn ang="0">
+                  <a:pos x="connsiteX5" y="connsiteY5"/>
+                </a:cxn>
+                <a:cxn ang="0">
+                  <a:pos x="connsiteX6" y="connsiteY6"/>
+                </a:cxn>
+                <a:cxn ang="0">
+                  <a:pos x="connsiteX7" y="connsiteY7"/>
+                </a:cxn>
+                <a:cxn ang="0">
+                  <a:pos x="connsiteX8" y="connsiteY8"/>
+                </a:cxn>
+                <a:cxn ang="0">
+                  <a:pos x="connsiteX9" y="connsiteY9"/>
+                </a:cxn>
+                <a:cxn ang="0">
+                  <a:pos x="connsiteX10" y="connsiteY10"/>
+                </a:cxn>
+                <a:cxn ang="0">
+                  <a:pos x="connsiteX11" y="connsiteY11"/>
+                </a:cxn>
+                <a:cxn ang="0">
+                  <a:pos x="connsiteX12" y="connsiteY12"/>
+                </a:cxn>
+                <a:cxn ang="0">
+                  <a:pos x="connsiteX13" y="connsiteY13"/>
+                </a:cxn>
+                <a:cxn ang="0">
+                  <a:pos x="connsiteX14" y="connsiteY14"/>
+                </a:cxn>
+                <a:cxn ang="0">
+                  <a:pos x="connsiteX15" y="connsiteY15"/>
+                </a:cxn>
+              </a:cxnLst>
+              <a:rect l="l" t="t" r="r" b="b"/>
+              <a:pathLst>
+                <a:path w="468000" h="468000">
+                  <a:moveTo>
+                    <a:pt x="159440" y="54000"/>
+                  </a:moveTo>
+                  <a:lnTo>
+                    <a:pt x="54000" y="159440"/>
+                  </a:lnTo>
+                  <a:lnTo>
+                    <a:pt x="54000" y="308560"/>
+                  </a:lnTo>
+                  <a:lnTo>
+                    <a:pt x="159440" y="414000"/>
+                  </a:lnTo>
+                  <a:lnTo>
+                    <a:pt x="308560" y="414000"/>
+                  </a:lnTo>
+                  <a:lnTo>
+                    <a:pt x="414000" y="308560"/>
+                  </a:lnTo>
+                  <a:lnTo>
+                    <a:pt x="414000" y="159440"/>
+                  </a:lnTo>
+                  <a:lnTo>
+                    <a:pt x="308560" y="54000"/>
+                  </a:lnTo>
+                  <a:close/>
+                  <a:moveTo>
+                    <a:pt x="137073" y="0"/>
+                  </a:moveTo>
+                  <a:lnTo>
+                    <a:pt x="330927" y="0"/>
+                  </a:lnTo>
+                  <a:lnTo>
+                    <a:pt x="468000" y="137073"/>
+                  </a:lnTo>
+                  <a:lnTo>
+                    <a:pt x="468000" y="330927"/>
+                  </a:lnTo>
+                  <a:lnTo>
+                    <a:pt x="330927" y="468000"/>
+                  </a:lnTo>
+                  <a:lnTo>
+                    <a:pt x="137073" y="468000"/>
+                  </a:lnTo>
+                  <a:lnTo>
+                    <a:pt x="0" y="330927"/>
+                  </a:lnTo>
+                  <a:lnTo>
+                    <a:pt x="0" y="137073"/>
+                  </a:lnTo>
+                  <a:close/>
+                </a:path>
+              </a:pathLst>
+            </a:custGeom>
+            <a:solidFill>
+              <a:schemeClr val="bg1"/>
+            </a:solidFill>
+            <a:ln>
+              <a:noFill/>
+            </a:ln>
+          </p:spPr>
+          <p:style>
+            <a:lnRef idx="2">
+              <a:schemeClr val="accent1">
+                <a:shade val="15000"/>
+              </a:schemeClr>
+            </a:lnRef>
+            <a:fillRef idx="1">
+              <a:schemeClr val="accent1"/>
+            </a:fillRef>
+            <a:effectRef idx="0">
+              <a:schemeClr val="accent1"/>
+            </a:effectRef>
+            <a:fontRef idx="minor">
+              <a:schemeClr val="lt1"/>
+            </a:fontRef>
+          </p:style>
+          <p:txBody>
+            <a:bodyPr wrap="square" rtlCol="0" anchor="ctr">
+              <a:noAutofit/>
+            </a:bodyPr>
+            <a:lstStyle/>
+            <a:p>
+              <a:pPr algn="ctr"/>
+              <a:endParaRPr lang="ko-KR" altLang="en-US"/>
+            </a:p>
+          </p:txBody>
+        </p:sp>
+        <p:sp>
+          <p:nvSpPr>
+            <p:cNvPr id="40" name="자유형: 도형 39">
+              <a:extLst>
+                <a:ext uri="{FF2B5EF4-FFF2-40B4-BE49-F238E27FC236}">
+                  <a16:creationId xmlns:a16="http://schemas.microsoft.com/office/drawing/2014/main" id="{90D56651-5230-92DC-26E2-36FB94F9BF5B}"/>
+                </a:ext>
+              </a:extLst>
+            </p:cNvPr>
+            <p:cNvSpPr/>
+            <p:nvPr/>
+          </p:nvSpPr>
+          <p:spPr>
+            <a:xfrm>
+              <a:off x="3036870" y="941799"/>
+              <a:ext cx="468000" cy="468000"/>
+            </a:xfrm>
+            <a:custGeom>
+              <a:avLst/>
+              <a:gdLst>
+                <a:gd name="connsiteX0" fmla="*/ 159440 w 468000"/>
+                <a:gd name="connsiteY0" fmla="*/ 54000 h 468000"/>
+                <a:gd name="connsiteX1" fmla="*/ 54000 w 468000"/>
+                <a:gd name="connsiteY1" fmla="*/ 159440 h 468000"/>
+                <a:gd name="connsiteX2" fmla="*/ 54000 w 468000"/>
+                <a:gd name="connsiteY2" fmla="*/ 308560 h 468000"/>
+                <a:gd name="connsiteX3" fmla="*/ 159440 w 468000"/>
+                <a:gd name="connsiteY3" fmla="*/ 414000 h 468000"/>
+                <a:gd name="connsiteX4" fmla="*/ 308560 w 468000"/>
+                <a:gd name="connsiteY4" fmla="*/ 414000 h 468000"/>
+                <a:gd name="connsiteX5" fmla="*/ 414000 w 468000"/>
+                <a:gd name="connsiteY5" fmla="*/ 308560 h 468000"/>
+                <a:gd name="connsiteX6" fmla="*/ 414000 w 468000"/>
+                <a:gd name="connsiteY6" fmla="*/ 159440 h 468000"/>
+                <a:gd name="connsiteX7" fmla="*/ 308560 w 468000"/>
+                <a:gd name="connsiteY7" fmla="*/ 54000 h 468000"/>
+                <a:gd name="connsiteX8" fmla="*/ 137073 w 468000"/>
+                <a:gd name="connsiteY8" fmla="*/ 0 h 468000"/>
+                <a:gd name="connsiteX9" fmla="*/ 330927 w 468000"/>
+                <a:gd name="connsiteY9" fmla="*/ 0 h 468000"/>
+                <a:gd name="connsiteX10" fmla="*/ 468000 w 468000"/>
+                <a:gd name="connsiteY10" fmla="*/ 137073 h 468000"/>
+                <a:gd name="connsiteX11" fmla="*/ 468000 w 468000"/>
+                <a:gd name="connsiteY11" fmla="*/ 330927 h 468000"/>
+                <a:gd name="connsiteX12" fmla="*/ 330927 w 468000"/>
+                <a:gd name="connsiteY12" fmla="*/ 468000 h 468000"/>
+                <a:gd name="connsiteX13" fmla="*/ 137073 w 468000"/>
+                <a:gd name="connsiteY13" fmla="*/ 468000 h 468000"/>
+                <a:gd name="connsiteX14" fmla="*/ 0 w 468000"/>
+                <a:gd name="connsiteY14" fmla="*/ 330927 h 468000"/>
+                <a:gd name="connsiteX15" fmla="*/ 0 w 468000"/>
+                <a:gd name="connsiteY15" fmla="*/ 137073 h 468000"/>
+              </a:gdLst>
+              <a:ahLst/>
+              <a:cxnLst>
+                <a:cxn ang="0">
+                  <a:pos x="connsiteX0" y="connsiteY0"/>
+                </a:cxn>
+                <a:cxn ang="0">
+                  <a:pos x="connsiteX1" y="connsiteY1"/>
+                </a:cxn>
+                <a:cxn ang="0">
+                  <a:pos x="connsiteX2" y="connsiteY2"/>
+                </a:cxn>
+                <a:cxn ang="0">
+                  <a:pos x="connsiteX3" y="connsiteY3"/>
+                </a:cxn>
+                <a:cxn ang="0">
+                  <a:pos x="connsiteX4" y="connsiteY4"/>
+                </a:cxn>
+                <a:cxn ang="0">
+                  <a:pos x="connsiteX5" y="connsiteY5"/>
+                </a:cxn>
+                <a:cxn ang="0">
+                  <a:pos x="connsiteX6" y="connsiteY6"/>
+                </a:cxn>
+                <a:cxn ang="0">
+                  <a:pos x="connsiteX7" y="connsiteY7"/>
+                </a:cxn>
+                <a:cxn ang="0">
+                  <a:pos x="connsiteX8" y="connsiteY8"/>
+                </a:cxn>
+                <a:cxn ang="0">
+                  <a:pos x="connsiteX9" y="connsiteY9"/>
+                </a:cxn>
+                <a:cxn ang="0">
+                  <a:pos x="connsiteX10" y="connsiteY10"/>
+                </a:cxn>
+                <a:cxn ang="0">
+                  <a:pos x="connsiteX11" y="connsiteY11"/>
+                </a:cxn>
+                <a:cxn ang="0">
+                  <a:pos x="connsiteX12" y="connsiteY12"/>
+                </a:cxn>
+                <a:cxn ang="0">
+                  <a:pos x="connsiteX13" y="connsiteY13"/>
+                </a:cxn>
+                <a:cxn ang="0">
+                  <a:pos x="connsiteX14" y="connsiteY14"/>
+                </a:cxn>
+                <a:cxn ang="0">
+                  <a:pos x="connsiteX15" y="connsiteY15"/>
+                </a:cxn>
+              </a:cxnLst>
+              <a:rect l="l" t="t" r="r" b="b"/>
+              <a:pathLst>
+                <a:path w="468000" h="468000">
+                  <a:moveTo>
+                    <a:pt x="159440" y="54000"/>
+                  </a:moveTo>
+                  <a:lnTo>
+                    <a:pt x="54000" y="159440"/>
+                  </a:lnTo>
+                  <a:lnTo>
+                    <a:pt x="54000" y="308560"/>
+                  </a:lnTo>
+                  <a:lnTo>
+                    <a:pt x="159440" y="414000"/>
+                  </a:lnTo>
+                  <a:lnTo>
+                    <a:pt x="308560" y="414000"/>
+                  </a:lnTo>
+                  <a:lnTo>
+                    <a:pt x="414000" y="308560"/>
+                  </a:lnTo>
+                  <a:lnTo>
+                    <a:pt x="414000" y="159440"/>
+                  </a:lnTo>
+                  <a:lnTo>
+                    <a:pt x="308560" y="54000"/>
+                  </a:lnTo>
+                  <a:close/>
+                  <a:moveTo>
+                    <a:pt x="137073" y="0"/>
+                  </a:moveTo>
+                  <a:lnTo>
+                    <a:pt x="330927" y="0"/>
+                  </a:lnTo>
+                  <a:lnTo>
+                    <a:pt x="468000" y="137073"/>
+                  </a:lnTo>
+                  <a:lnTo>
+                    <a:pt x="468000" y="330927"/>
+                  </a:lnTo>
+                  <a:lnTo>
+                    <a:pt x="330927" y="468000"/>
+                  </a:lnTo>
+                  <a:lnTo>
+                    <a:pt x="137073" y="468000"/>
+                  </a:lnTo>
+                  <a:lnTo>
+                    <a:pt x="0" y="330927"/>
+                  </a:lnTo>
+                  <a:lnTo>
+                    <a:pt x="0" y="137073"/>
+                  </a:lnTo>
+                  <a:close/>
+                </a:path>
+              </a:pathLst>
+            </a:custGeom>
+            <a:solidFill>
+              <a:schemeClr val="bg1"/>
+            </a:solidFill>
+            <a:ln>
+              <a:noFill/>
+            </a:ln>
+          </p:spPr>
+          <p:style>
+            <a:lnRef idx="2">
+              <a:schemeClr val="accent1">
+                <a:shade val="15000"/>
+              </a:schemeClr>
+            </a:lnRef>
+            <a:fillRef idx="1">
+              <a:schemeClr val="accent1"/>
+            </a:fillRef>
+            <a:effectRef idx="0">
+              <a:schemeClr val="accent1"/>
+            </a:effectRef>
+            <a:fontRef idx="minor">
+              <a:schemeClr val="lt1"/>
+            </a:fontRef>
+          </p:style>
+          <p:txBody>
+            <a:bodyPr wrap="square" rtlCol="0" anchor="ctr">
+              <a:noAutofit/>
+            </a:bodyPr>
+            <a:lstStyle/>
+            <a:p>
+              <a:pPr algn="ctr"/>
+              <a:endParaRPr lang="ko-KR" altLang="en-US"/>
+            </a:p>
+          </p:txBody>
+        </p:sp>
+        <p:sp>
+          <p:nvSpPr>
+            <p:cNvPr id="41" name="직사각형 40">
+              <a:extLst>
+                <a:ext uri="{FF2B5EF4-FFF2-40B4-BE49-F238E27FC236}">
+                  <a16:creationId xmlns:a16="http://schemas.microsoft.com/office/drawing/2014/main" id="{1677EFF3-F505-6D9D-F004-153D9BDFB45D}"/>
+                </a:ext>
+              </a:extLst>
+            </p:cNvPr>
+            <p:cNvSpPr/>
+            <p:nvPr/>
+          </p:nvSpPr>
+          <p:spPr>
+            <a:xfrm>
+              <a:off x="2909935" y="1672590"/>
+              <a:ext cx="720000" cy="54000"/>
+            </a:xfrm>
+            <a:prstGeom prst="rect">
+              <a:avLst/>
+            </a:prstGeom>
+            <a:solidFill>
+              <a:schemeClr val="bg1"/>
+            </a:solidFill>
+            <a:ln>
+              <a:noFill/>
+            </a:ln>
+          </p:spPr>
+          <p:style>
+            <a:lnRef idx="2">
+              <a:schemeClr val="accent1">
+                <a:shade val="15000"/>
+              </a:schemeClr>
+            </a:lnRef>
+            <a:fillRef idx="1">
+              <a:schemeClr val="accent1"/>
+            </a:fillRef>
+            <a:effectRef idx="0">
+              <a:schemeClr val="accent1"/>
+            </a:effectRef>
+            <a:fontRef idx="minor">
+              <a:schemeClr val="lt1"/>
+            </a:fontRef>
+          </p:style>
+          <p:txBody>
+            <a:bodyPr wrap="square" rtlCol="0" anchor="ctr">
+              <a:noAutofit/>
+            </a:bodyPr>
+            <a:lstStyle/>
+            <a:p>
+              <a:pPr algn="ctr"/>
+              <a:endParaRPr lang="ko-KR" altLang="en-US"/>
+            </a:p>
+          </p:txBody>
+        </p:sp>
+        <p:sp>
+          <p:nvSpPr>
+            <p:cNvPr id="42" name="직사각형 41">
+              <a:extLst>
+                <a:ext uri="{FF2B5EF4-FFF2-40B4-BE49-F238E27FC236}">
+                  <a16:creationId xmlns:a16="http://schemas.microsoft.com/office/drawing/2014/main" id="{957349AC-AF43-E5B0-1A9A-D5E428EA88DA}"/>
+                </a:ext>
+              </a:extLst>
+            </p:cNvPr>
+            <p:cNvSpPr/>
+            <p:nvPr/>
+          </p:nvSpPr>
+          <p:spPr>
+            <a:xfrm rot="2700000">
+              <a:off x="3061132" y="1503076"/>
+              <a:ext cx="540000" cy="54000"/>
+            </a:xfrm>
+            <a:prstGeom prst="rect">
+              <a:avLst/>
+            </a:prstGeom>
+            <a:solidFill>
+              <a:schemeClr val="bg1"/>
+            </a:solidFill>
+            <a:ln>
+              <a:noFill/>
+            </a:ln>
+          </p:spPr>
+          <p:style>
+            <a:lnRef idx="2">
+              <a:schemeClr val="accent1">
+                <a:shade val="15000"/>
+              </a:schemeClr>
+            </a:lnRef>
+            <a:fillRef idx="1">
+              <a:schemeClr val="accent1"/>
+            </a:fillRef>
+            <a:effectRef idx="0">
+              <a:schemeClr val="accent1"/>
+            </a:effectRef>
+            <a:fontRef idx="minor">
+              <a:schemeClr val="lt1"/>
+            </a:fontRef>
+          </p:style>
+          <p:txBody>
+            <a:bodyPr wrap="square" rtlCol="0" anchor="ctr">
+              <a:noAutofit/>
+            </a:bodyPr>
+            <a:lstStyle/>
+            <a:p>
+              <a:pPr algn="ctr"/>
+              <a:endParaRPr lang="ko-KR" altLang="en-US"/>
+            </a:p>
+          </p:txBody>
+        </p:sp>
+        <p:sp>
+          <p:nvSpPr>
+            <p:cNvPr id="43" name="직사각형 42">
+              <a:extLst>
+                <a:ext uri="{FF2B5EF4-FFF2-40B4-BE49-F238E27FC236}">
+                  <a16:creationId xmlns:a16="http://schemas.microsoft.com/office/drawing/2014/main" id="{F1FC16EC-4D25-5EFC-6C5D-CB71AAED5ACC}"/>
+                </a:ext>
+              </a:extLst>
+            </p:cNvPr>
+            <p:cNvSpPr/>
+            <p:nvPr/>
+          </p:nvSpPr>
+          <p:spPr>
+            <a:xfrm rot="18900000" flipH="1">
+              <a:off x="2940991" y="1503089"/>
+              <a:ext cx="540000" cy="53974"/>
+            </a:xfrm>
+            <a:prstGeom prst="rect">
+              <a:avLst/>
+            </a:prstGeom>
+            <a:solidFill>
+              <a:schemeClr val="bg1"/>
+            </a:solidFill>
+            <a:ln>
+              <a:noFill/>
+            </a:ln>
+          </p:spPr>
+          <p:style>
+            <a:lnRef idx="2">
+              <a:schemeClr val="accent1">
+                <a:shade val="15000"/>
+              </a:schemeClr>
+            </a:lnRef>
+            <a:fillRef idx="1">
+              <a:schemeClr val="accent1"/>
+            </a:fillRef>
+            <a:effectRef idx="0">
+              <a:schemeClr val="accent1"/>
+            </a:effectRef>
+            <a:fontRef idx="minor">
+              <a:schemeClr val="lt1"/>
+            </a:fontRef>
+          </p:style>
+          <p:txBody>
+            <a:bodyPr wrap="square" rtlCol="0" anchor="ctr">
+              <a:noAutofit/>
+            </a:bodyPr>
+            <a:lstStyle/>
+            <a:p>
+              <a:pPr algn="ctr"/>
+              <a:endParaRPr lang="ko-KR" altLang="en-US"/>
+            </a:p>
+          </p:txBody>
+        </p:sp>
+      </p:grpSp>
     </p:spTree>
     <p:extLst>
       <p:ext uri="{BB962C8B-B14F-4D97-AF65-F5344CB8AC3E}">

</xml_diff>

<commit_message>
Bandizip, Blender Logo Added
</commit_message>
<xml_diff>
--- a/tepk2924_Custon_Icon.pptx
+++ b/tepk2924_Custon_Icon.pptx
@@ -3342,58 +3342,6 @@
       </p:grpSpPr>
       <p:sp>
         <p:nvSpPr>
-          <p:cNvPr id="6" name="팔각형 5">
-            <a:extLst>
-              <a:ext uri="{FF2B5EF4-FFF2-40B4-BE49-F238E27FC236}">
-                <a16:creationId xmlns:a16="http://schemas.microsoft.com/office/drawing/2014/main" id="{FE15EBFD-72B6-CA37-48F3-5EA228E3A587}"/>
-              </a:ext>
-            </a:extLst>
-          </p:cNvPr>
-          <p:cNvSpPr/>
-          <p:nvPr/>
-        </p:nvSpPr>
-        <p:spPr>
-          <a:xfrm>
-            <a:off x="3084818" y="839462"/>
-            <a:ext cx="1440000" cy="1440000"/>
-          </a:xfrm>
-          <a:prstGeom prst="octagon">
-            <a:avLst/>
-          </a:prstGeom>
-          <a:solidFill>
-            <a:schemeClr val="tx1"/>
-          </a:solidFill>
-          <a:ln>
-            <a:noFill/>
-          </a:ln>
-        </p:spPr>
-        <p:style>
-          <a:lnRef idx="2">
-            <a:schemeClr val="accent1">
-              <a:shade val="15000"/>
-            </a:schemeClr>
-          </a:lnRef>
-          <a:fillRef idx="1">
-            <a:schemeClr val="accent1"/>
-          </a:fillRef>
-          <a:effectRef idx="0">
-            <a:schemeClr val="accent1"/>
-          </a:effectRef>
-          <a:fontRef idx="minor">
-            <a:schemeClr val="lt1"/>
-          </a:fontRef>
-        </p:style>
-        <p:txBody>
-          <a:bodyPr rtlCol="0" anchor="ctr"/>
-          <a:lstStyle/>
-          <a:p>
-            <a:pPr algn="ctr"/>
-            <a:endParaRPr lang="ko-KR" altLang="en-US"/>
-          </a:p>
-        </p:txBody>
-      </p:sp>
-      <p:sp>
-        <p:nvSpPr>
           <p:cNvPr id="7" name="직사각형 6">
             <a:extLst>
               <a:ext uri="{FF2B5EF4-FFF2-40B4-BE49-F238E27FC236}">
@@ -3439,6 +3387,58 @@
           <a:bodyPr wrap="square" rtlCol="0" anchor="ctr">
             <a:noAutofit/>
           </a:bodyPr>
+          <a:lstStyle/>
+          <a:p>
+            <a:pPr algn="ctr"/>
+            <a:endParaRPr lang="ko-KR" altLang="en-US"/>
+          </a:p>
+        </p:txBody>
+      </p:sp>
+      <p:sp>
+        <p:nvSpPr>
+          <p:cNvPr id="2" name="팔각형 1">
+            <a:extLst>
+              <a:ext uri="{FF2B5EF4-FFF2-40B4-BE49-F238E27FC236}">
+                <a16:creationId xmlns:a16="http://schemas.microsoft.com/office/drawing/2014/main" id="{FE15EBFD-72B6-CA37-48F3-5EA228E3A587}"/>
+              </a:ext>
+            </a:extLst>
+          </p:cNvPr>
+          <p:cNvSpPr/>
+          <p:nvPr/>
+        </p:nvSpPr>
+        <p:spPr>
+          <a:xfrm>
+            <a:off x="3084818" y="839462"/>
+            <a:ext cx="1440000" cy="1440000"/>
+          </a:xfrm>
+          <a:prstGeom prst="octagon">
+            <a:avLst/>
+          </a:prstGeom>
+          <a:solidFill>
+            <a:schemeClr val="tx1"/>
+          </a:solidFill>
+          <a:ln>
+            <a:noFill/>
+          </a:ln>
+        </p:spPr>
+        <p:style>
+          <a:lnRef idx="2">
+            <a:schemeClr val="accent1">
+              <a:shade val="15000"/>
+            </a:schemeClr>
+          </a:lnRef>
+          <a:fillRef idx="1">
+            <a:schemeClr val="accent1"/>
+          </a:fillRef>
+          <a:effectRef idx="0">
+            <a:schemeClr val="accent1"/>
+          </a:effectRef>
+          <a:fontRef idx="minor">
+            <a:schemeClr val="lt1"/>
+          </a:fontRef>
+        </p:style>
+        <p:txBody>
+          <a:bodyPr rtlCol="0" anchor="ctr"/>
           <a:lstStyle/>
           <a:p>
             <a:pPr algn="ctr"/>
@@ -9054,6 +9054,739 @@
           </p:txBody>
         </p:sp>
       </p:grpSp>
+      <p:grpSp>
+        <p:nvGrpSpPr>
+          <p:cNvPr id="44" name="그룹 43">
+            <a:extLst>
+              <a:ext uri="{FF2B5EF4-FFF2-40B4-BE49-F238E27FC236}">
+                <a16:creationId xmlns:a16="http://schemas.microsoft.com/office/drawing/2014/main" id="{890D68F7-C5CC-4BBF-261C-A3F5E38C341A}"/>
+              </a:ext>
+            </a:extLst>
+          </p:cNvPr>
+          <p:cNvGrpSpPr/>
+          <p:nvPr/>
+        </p:nvGrpSpPr>
+        <p:grpSpPr>
+          <a:xfrm>
+            <a:off x="2195726" y="2274447"/>
+            <a:ext cx="1440000" cy="1440000"/>
+            <a:chOff x="2109475" y="2412045"/>
+            <a:chExt cx="1440000" cy="1440000"/>
+          </a:xfrm>
+        </p:grpSpPr>
+        <p:sp>
+          <p:nvSpPr>
+            <p:cNvPr id="45" name="직사각형 44">
+              <a:extLst>
+                <a:ext uri="{FF2B5EF4-FFF2-40B4-BE49-F238E27FC236}">
+                  <a16:creationId xmlns:a16="http://schemas.microsoft.com/office/drawing/2014/main" id="{BC57E985-D419-EC13-B9E3-021632711D4B}"/>
+                </a:ext>
+              </a:extLst>
+            </p:cNvPr>
+            <p:cNvSpPr/>
+            <p:nvPr/>
+          </p:nvSpPr>
+          <p:spPr>
+            <a:xfrm>
+              <a:off x="2109475" y="2412045"/>
+              <a:ext cx="1440000" cy="1440000"/>
+            </a:xfrm>
+            <a:prstGeom prst="rect">
+              <a:avLst/>
+            </a:prstGeom>
+            <a:noFill/>
+            <a:ln>
+              <a:noFill/>
+            </a:ln>
+          </p:spPr>
+          <p:style>
+            <a:lnRef idx="2">
+              <a:schemeClr val="accent1">
+                <a:shade val="15000"/>
+              </a:schemeClr>
+            </a:lnRef>
+            <a:fillRef idx="1">
+              <a:schemeClr val="accent1"/>
+            </a:fillRef>
+            <a:effectRef idx="0">
+              <a:schemeClr val="accent1"/>
+            </a:effectRef>
+            <a:fontRef idx="minor">
+              <a:schemeClr val="lt1"/>
+            </a:fontRef>
+          </p:style>
+          <p:txBody>
+            <a:bodyPr wrap="square" rtlCol="0" anchor="ctr">
+              <a:noAutofit/>
+            </a:bodyPr>
+            <a:lstStyle/>
+            <a:p>
+              <a:pPr algn="ctr"/>
+              <a:endParaRPr lang="ko-KR" altLang="en-US"/>
+            </a:p>
+          </p:txBody>
+        </p:sp>
+        <p:sp>
+          <p:nvSpPr>
+            <p:cNvPr id="46" name="자유형: 도형 45">
+              <a:extLst>
+                <a:ext uri="{FF2B5EF4-FFF2-40B4-BE49-F238E27FC236}">
+                  <a16:creationId xmlns:a16="http://schemas.microsoft.com/office/drawing/2014/main" id="{66733BD6-313E-DC78-9244-350B1B7919C0}"/>
+                </a:ext>
+              </a:extLst>
+            </p:cNvPr>
+            <p:cNvSpPr/>
+            <p:nvPr/>
+          </p:nvSpPr>
+          <p:spPr>
+            <a:xfrm>
+              <a:off x="2109475" y="2419455"/>
+              <a:ext cx="1440000" cy="1432590"/>
+            </a:xfrm>
+            <a:custGeom>
+              <a:avLst/>
+              <a:gdLst>
+                <a:gd name="connsiteX0" fmla="*/ 621972 w 1440000"/>
+                <a:gd name="connsiteY0" fmla="*/ 0 h 1432590"/>
+                <a:gd name="connsiteX1" fmla="*/ 771087 w 1440000"/>
+                <a:gd name="connsiteY1" fmla="*/ 0 h 1432590"/>
+                <a:gd name="connsiteX2" fmla="*/ 1123677 w 1440000"/>
+                <a:gd name="connsiteY2" fmla="*/ 352590 h 1432590"/>
+                <a:gd name="connsiteX3" fmla="*/ 1123679 w 1440000"/>
+                <a:gd name="connsiteY3" fmla="*/ 352590 h 1432590"/>
+                <a:gd name="connsiteX4" fmla="*/ 1440000 w 1440000"/>
+                <a:gd name="connsiteY4" fmla="*/ 668911 h 1432590"/>
+                <a:gd name="connsiteX5" fmla="*/ 1440000 w 1440000"/>
+                <a:gd name="connsiteY5" fmla="*/ 1116269 h 1432590"/>
+                <a:gd name="connsiteX6" fmla="*/ 1123679 w 1440000"/>
+                <a:gd name="connsiteY6" fmla="*/ 1432590 h 1432590"/>
+                <a:gd name="connsiteX7" fmla="*/ 676321 w 1440000"/>
+                <a:gd name="connsiteY7" fmla="*/ 1432590 h 1432590"/>
+                <a:gd name="connsiteX8" fmla="*/ 390881 w 1440000"/>
+                <a:gd name="connsiteY8" fmla="*/ 1147150 h 1432590"/>
+                <a:gd name="connsiteX9" fmla="*/ 258490 w 1440000"/>
+                <a:gd name="connsiteY9" fmla="*/ 1279540 h 1432590"/>
+                <a:gd name="connsiteX10" fmla="*/ 109376 w 1440000"/>
+                <a:gd name="connsiteY10" fmla="*/ 1279540 h 1432590"/>
+                <a:gd name="connsiteX11" fmla="*/ 3932 w 1440000"/>
+                <a:gd name="connsiteY11" fmla="*/ 1174096 h 1432590"/>
+                <a:gd name="connsiteX12" fmla="*/ 3932 w 1440000"/>
+                <a:gd name="connsiteY12" fmla="*/ 1024981 h 1432590"/>
+                <a:gd name="connsiteX13" fmla="*/ 316323 w 1440000"/>
+                <a:gd name="connsiteY13" fmla="*/ 712590 h 1432590"/>
+                <a:gd name="connsiteX14" fmla="*/ 105440 w 1440000"/>
+                <a:gd name="connsiteY14" fmla="*/ 712590 h 1432590"/>
+                <a:gd name="connsiteX15" fmla="*/ 0 w 1440000"/>
+                <a:gd name="connsiteY15" fmla="*/ 607150 h 1432590"/>
+                <a:gd name="connsiteX16" fmla="*/ 0 w 1440000"/>
+                <a:gd name="connsiteY16" fmla="*/ 458030 h 1432590"/>
+                <a:gd name="connsiteX17" fmla="*/ 105440 w 1440000"/>
+                <a:gd name="connsiteY17" fmla="*/ 352590 h 1432590"/>
+                <a:gd name="connsiteX18" fmla="*/ 614560 w 1440000"/>
+                <a:gd name="connsiteY18" fmla="*/ 352590 h 1432590"/>
+                <a:gd name="connsiteX19" fmla="*/ 516528 w 1440000"/>
+                <a:gd name="connsiteY19" fmla="*/ 254558 h 1432590"/>
+                <a:gd name="connsiteX20" fmla="*/ 516528 w 1440000"/>
+                <a:gd name="connsiteY20" fmla="*/ 105444 h 1432590"/>
+              </a:gdLst>
+              <a:ahLst/>
+              <a:cxnLst>
+                <a:cxn ang="0">
+                  <a:pos x="connsiteX0" y="connsiteY0"/>
+                </a:cxn>
+                <a:cxn ang="0">
+                  <a:pos x="connsiteX1" y="connsiteY1"/>
+                </a:cxn>
+                <a:cxn ang="0">
+                  <a:pos x="connsiteX2" y="connsiteY2"/>
+                </a:cxn>
+                <a:cxn ang="0">
+                  <a:pos x="connsiteX3" y="connsiteY3"/>
+                </a:cxn>
+                <a:cxn ang="0">
+                  <a:pos x="connsiteX4" y="connsiteY4"/>
+                </a:cxn>
+                <a:cxn ang="0">
+                  <a:pos x="connsiteX5" y="connsiteY5"/>
+                </a:cxn>
+                <a:cxn ang="0">
+                  <a:pos x="connsiteX6" y="connsiteY6"/>
+                </a:cxn>
+                <a:cxn ang="0">
+                  <a:pos x="connsiteX7" y="connsiteY7"/>
+                </a:cxn>
+                <a:cxn ang="0">
+                  <a:pos x="connsiteX8" y="connsiteY8"/>
+                </a:cxn>
+                <a:cxn ang="0">
+                  <a:pos x="connsiteX9" y="connsiteY9"/>
+                </a:cxn>
+                <a:cxn ang="0">
+                  <a:pos x="connsiteX10" y="connsiteY10"/>
+                </a:cxn>
+                <a:cxn ang="0">
+                  <a:pos x="connsiteX11" y="connsiteY11"/>
+                </a:cxn>
+                <a:cxn ang="0">
+                  <a:pos x="connsiteX12" y="connsiteY12"/>
+                </a:cxn>
+                <a:cxn ang="0">
+                  <a:pos x="connsiteX13" y="connsiteY13"/>
+                </a:cxn>
+                <a:cxn ang="0">
+                  <a:pos x="connsiteX14" y="connsiteY14"/>
+                </a:cxn>
+                <a:cxn ang="0">
+                  <a:pos x="connsiteX15" y="connsiteY15"/>
+                </a:cxn>
+                <a:cxn ang="0">
+                  <a:pos x="connsiteX16" y="connsiteY16"/>
+                </a:cxn>
+                <a:cxn ang="0">
+                  <a:pos x="connsiteX17" y="connsiteY17"/>
+                </a:cxn>
+                <a:cxn ang="0">
+                  <a:pos x="connsiteX18" y="connsiteY18"/>
+                </a:cxn>
+                <a:cxn ang="0">
+                  <a:pos x="connsiteX19" y="connsiteY19"/>
+                </a:cxn>
+                <a:cxn ang="0">
+                  <a:pos x="connsiteX20" y="connsiteY20"/>
+                </a:cxn>
+              </a:cxnLst>
+              <a:rect l="l" t="t" r="r" b="b"/>
+              <a:pathLst>
+                <a:path w="1440000" h="1432590">
+                  <a:moveTo>
+                    <a:pt x="621972" y="0"/>
+                  </a:moveTo>
+                  <a:lnTo>
+                    <a:pt x="771087" y="0"/>
+                  </a:lnTo>
+                  <a:lnTo>
+                    <a:pt x="1123677" y="352590"/>
+                  </a:lnTo>
+                  <a:lnTo>
+                    <a:pt x="1123679" y="352590"/>
+                  </a:lnTo>
+                  <a:lnTo>
+                    <a:pt x="1440000" y="668911"/>
+                  </a:lnTo>
+                  <a:lnTo>
+                    <a:pt x="1440000" y="1116269"/>
+                  </a:lnTo>
+                  <a:lnTo>
+                    <a:pt x="1123679" y="1432590"/>
+                  </a:lnTo>
+                  <a:lnTo>
+                    <a:pt x="676321" y="1432590"/>
+                  </a:lnTo>
+                  <a:lnTo>
+                    <a:pt x="390881" y="1147150"/>
+                  </a:lnTo>
+                  <a:lnTo>
+                    <a:pt x="258490" y="1279540"/>
+                  </a:lnTo>
+                  <a:lnTo>
+                    <a:pt x="109376" y="1279540"/>
+                  </a:lnTo>
+                  <a:lnTo>
+                    <a:pt x="3932" y="1174096"/>
+                  </a:lnTo>
+                  <a:lnTo>
+                    <a:pt x="3932" y="1024981"/>
+                  </a:lnTo>
+                  <a:lnTo>
+                    <a:pt x="316323" y="712590"/>
+                  </a:lnTo>
+                  <a:lnTo>
+                    <a:pt x="105440" y="712590"/>
+                  </a:lnTo>
+                  <a:lnTo>
+                    <a:pt x="0" y="607150"/>
+                  </a:lnTo>
+                  <a:lnTo>
+                    <a:pt x="0" y="458030"/>
+                  </a:lnTo>
+                  <a:lnTo>
+                    <a:pt x="105440" y="352590"/>
+                  </a:lnTo>
+                  <a:lnTo>
+                    <a:pt x="614560" y="352590"/>
+                  </a:lnTo>
+                  <a:lnTo>
+                    <a:pt x="516528" y="254558"/>
+                  </a:lnTo>
+                  <a:lnTo>
+                    <a:pt x="516528" y="105444"/>
+                  </a:lnTo>
+                  <a:close/>
+                </a:path>
+              </a:pathLst>
+            </a:custGeom>
+            <a:solidFill>
+              <a:srgbClr val="FF881C"/>
+            </a:solidFill>
+            <a:ln>
+              <a:noFill/>
+            </a:ln>
+          </p:spPr>
+          <p:style>
+            <a:lnRef idx="2">
+              <a:schemeClr val="accent1">
+                <a:shade val="15000"/>
+              </a:schemeClr>
+            </a:lnRef>
+            <a:fillRef idx="1">
+              <a:schemeClr val="accent1"/>
+            </a:fillRef>
+            <a:effectRef idx="0">
+              <a:schemeClr val="accent1"/>
+            </a:effectRef>
+            <a:fontRef idx="minor">
+              <a:schemeClr val="lt1"/>
+            </a:fontRef>
+          </p:style>
+          <p:txBody>
+            <a:bodyPr wrap="square" rtlCol="0" anchor="ctr">
+              <a:noAutofit/>
+            </a:bodyPr>
+            <a:lstStyle/>
+            <a:p>
+              <a:pPr algn="ctr"/>
+              <a:endParaRPr lang="ko-KR" altLang="en-US"/>
+            </a:p>
+          </p:txBody>
+        </p:sp>
+        <p:sp>
+          <p:nvSpPr>
+            <p:cNvPr id="47" name="팔각형 46">
+              <a:extLst>
+                <a:ext uri="{FF2B5EF4-FFF2-40B4-BE49-F238E27FC236}">
+                  <a16:creationId xmlns:a16="http://schemas.microsoft.com/office/drawing/2014/main" id="{1884DB79-319A-09BC-9A01-75EE3454CB94}"/>
+                </a:ext>
+              </a:extLst>
+            </p:cNvPr>
+            <p:cNvSpPr/>
+            <p:nvPr/>
+          </p:nvSpPr>
+          <p:spPr>
+            <a:xfrm>
+              <a:off x="2675019" y="2952045"/>
+              <a:ext cx="720000" cy="720000"/>
+            </a:xfrm>
+            <a:prstGeom prst="octagon">
+              <a:avLst/>
+            </a:prstGeom>
+            <a:solidFill>
+              <a:srgbClr val="FFFFFF"/>
+            </a:solidFill>
+            <a:ln>
+              <a:noFill/>
+            </a:ln>
+          </p:spPr>
+          <p:style>
+            <a:lnRef idx="2">
+              <a:schemeClr val="accent1">
+                <a:shade val="15000"/>
+              </a:schemeClr>
+            </a:lnRef>
+            <a:fillRef idx="1">
+              <a:schemeClr val="accent1"/>
+            </a:fillRef>
+            <a:effectRef idx="0">
+              <a:schemeClr val="accent1"/>
+            </a:effectRef>
+            <a:fontRef idx="minor">
+              <a:schemeClr val="lt1"/>
+            </a:fontRef>
+          </p:style>
+          <p:txBody>
+            <a:bodyPr rtlCol="0" anchor="ctr"/>
+            <a:lstStyle/>
+            <a:p>
+              <a:pPr algn="ctr"/>
+              <a:endParaRPr lang="ko-KR" altLang="en-US"/>
+            </a:p>
+          </p:txBody>
+        </p:sp>
+        <p:sp>
+          <p:nvSpPr>
+            <p:cNvPr id="50" name="팔각형 49">
+              <a:extLst>
+                <a:ext uri="{FF2B5EF4-FFF2-40B4-BE49-F238E27FC236}">
+                  <a16:creationId xmlns:a16="http://schemas.microsoft.com/office/drawing/2014/main" id="{5CA41071-0730-20DE-9E69-CEC5F83193B1}"/>
+                </a:ext>
+              </a:extLst>
+            </p:cNvPr>
+            <p:cNvSpPr/>
+            <p:nvPr/>
+          </p:nvSpPr>
+          <p:spPr>
+            <a:xfrm>
+              <a:off x="2770380" y="3042045"/>
+              <a:ext cx="540000" cy="540000"/>
+            </a:xfrm>
+            <a:prstGeom prst="octagon">
+              <a:avLst/>
+            </a:prstGeom>
+            <a:solidFill>
+              <a:srgbClr val="004591"/>
+            </a:solidFill>
+            <a:ln>
+              <a:noFill/>
+            </a:ln>
+          </p:spPr>
+          <p:style>
+            <a:lnRef idx="2">
+              <a:schemeClr val="accent1">
+                <a:shade val="15000"/>
+              </a:schemeClr>
+            </a:lnRef>
+            <a:fillRef idx="1">
+              <a:schemeClr val="accent1"/>
+            </a:fillRef>
+            <a:effectRef idx="0">
+              <a:schemeClr val="accent1"/>
+            </a:effectRef>
+            <a:fontRef idx="minor">
+              <a:schemeClr val="lt1"/>
+            </a:fontRef>
+          </p:style>
+          <p:txBody>
+            <a:bodyPr rtlCol="0" anchor="ctr"/>
+            <a:lstStyle/>
+            <a:p>
+              <a:pPr algn="ctr"/>
+              <a:endParaRPr lang="ko-KR" altLang="en-US"/>
+            </a:p>
+          </p:txBody>
+        </p:sp>
+      </p:grpSp>
+      <p:grpSp>
+        <p:nvGrpSpPr>
+          <p:cNvPr id="51" name="그룹 50">
+            <a:extLst>
+              <a:ext uri="{FF2B5EF4-FFF2-40B4-BE49-F238E27FC236}">
+                <a16:creationId xmlns:a16="http://schemas.microsoft.com/office/drawing/2014/main" id="{69D7D41F-0790-3EBC-3118-39A0E5232185}"/>
+              </a:ext>
+            </a:extLst>
+          </p:cNvPr>
+          <p:cNvGrpSpPr/>
+          <p:nvPr/>
+        </p:nvGrpSpPr>
+        <p:grpSpPr>
+          <a:xfrm>
+            <a:off x="4176717" y="2281857"/>
+            <a:ext cx="1440000" cy="1440000"/>
+            <a:chOff x="3084818" y="839462"/>
+            <a:chExt cx="1440000" cy="1440000"/>
+          </a:xfrm>
+        </p:grpSpPr>
+        <p:sp>
+          <p:nvSpPr>
+            <p:cNvPr id="52" name="팔각형 51">
+              <a:extLst>
+                <a:ext uri="{FF2B5EF4-FFF2-40B4-BE49-F238E27FC236}">
+                  <a16:creationId xmlns:a16="http://schemas.microsoft.com/office/drawing/2014/main" id="{0938A33C-0093-C26F-1446-88F09AE09CB5}"/>
+                </a:ext>
+              </a:extLst>
+            </p:cNvPr>
+            <p:cNvSpPr/>
+            <p:nvPr/>
+          </p:nvSpPr>
+          <p:spPr>
+            <a:xfrm>
+              <a:off x="3084818" y="839462"/>
+              <a:ext cx="1440000" cy="1440000"/>
+            </a:xfrm>
+            <a:prstGeom prst="octagon">
+              <a:avLst/>
+            </a:prstGeom>
+            <a:gradFill>
+              <a:gsLst>
+                <a:gs pos="0">
+                  <a:srgbClr val="008CDE"/>
+                </a:gs>
+                <a:gs pos="100000">
+                  <a:srgbClr val="005FC2"/>
+                </a:gs>
+              </a:gsLst>
+              <a:lin ang="5400000" scaled="1"/>
+            </a:gradFill>
+            <a:ln>
+              <a:noFill/>
+            </a:ln>
+          </p:spPr>
+          <p:style>
+            <a:lnRef idx="2">
+              <a:schemeClr val="accent1">
+                <a:shade val="15000"/>
+              </a:schemeClr>
+            </a:lnRef>
+            <a:fillRef idx="1">
+              <a:schemeClr val="accent1"/>
+            </a:fillRef>
+            <a:effectRef idx="0">
+              <a:schemeClr val="accent1"/>
+            </a:effectRef>
+            <a:fontRef idx="minor">
+              <a:schemeClr val="lt1"/>
+            </a:fontRef>
+          </p:style>
+          <p:txBody>
+            <a:bodyPr rtlCol="0" anchor="ctr"/>
+            <a:lstStyle/>
+            <a:p>
+              <a:pPr algn="ctr"/>
+              <a:endParaRPr lang="ko-KR" altLang="en-US"/>
+            </a:p>
+          </p:txBody>
+        </p:sp>
+        <p:grpSp>
+          <p:nvGrpSpPr>
+            <p:cNvPr id="56" name="그룹 55">
+              <a:extLst>
+                <a:ext uri="{FF2B5EF4-FFF2-40B4-BE49-F238E27FC236}">
+                  <a16:creationId xmlns:a16="http://schemas.microsoft.com/office/drawing/2014/main" id="{9E8617EC-6AC4-4CF0-C2AD-79ABF30EEC90}"/>
+                </a:ext>
+              </a:extLst>
+            </p:cNvPr>
+            <p:cNvGrpSpPr/>
+            <p:nvPr/>
+          </p:nvGrpSpPr>
+          <p:grpSpPr>
+            <a:xfrm>
+              <a:off x="3444818" y="1019462"/>
+              <a:ext cx="720000" cy="1080000"/>
+              <a:chOff x="3343649" y="2844131"/>
+              <a:chExt cx="720000" cy="1080000"/>
+            </a:xfrm>
+          </p:grpSpPr>
+          <p:sp>
+            <p:nvSpPr>
+              <p:cNvPr id="57" name="직각 삼각형 56">
+                <a:extLst>
+                  <a:ext uri="{FF2B5EF4-FFF2-40B4-BE49-F238E27FC236}">
+                    <a16:creationId xmlns:a16="http://schemas.microsoft.com/office/drawing/2014/main" id="{0CE61785-BA6D-EFB5-8FCE-DABE80C2E0FD}"/>
+                  </a:ext>
+                </a:extLst>
+              </p:cNvPr>
+              <p:cNvSpPr/>
+              <p:nvPr/>
+            </p:nvSpPr>
+            <p:spPr>
+              <a:xfrm>
+                <a:off x="3703649" y="2844131"/>
+                <a:ext cx="360000" cy="360000"/>
+              </a:xfrm>
+              <a:prstGeom prst="rtTriangle">
+                <a:avLst/>
+              </a:prstGeom>
+              <a:solidFill>
+                <a:schemeClr val="bg1"/>
+              </a:solidFill>
+              <a:ln>
+                <a:noFill/>
+              </a:ln>
+            </p:spPr>
+            <p:style>
+              <a:lnRef idx="2">
+                <a:schemeClr val="accent1">
+                  <a:shade val="15000"/>
+                </a:schemeClr>
+              </a:lnRef>
+              <a:fillRef idx="1">
+                <a:schemeClr val="accent1"/>
+              </a:fillRef>
+              <a:effectRef idx="0">
+                <a:schemeClr val="accent1"/>
+              </a:effectRef>
+              <a:fontRef idx="minor">
+                <a:schemeClr val="lt1"/>
+              </a:fontRef>
+            </p:style>
+            <p:txBody>
+              <a:bodyPr wrap="square" rtlCol="0" anchor="ctr">
+                <a:noAutofit/>
+              </a:bodyPr>
+              <a:lstStyle/>
+              <a:p>
+                <a:pPr algn="ctr"/>
+                <a:endParaRPr lang="ko-KR" altLang="en-US"/>
+              </a:p>
+            </p:txBody>
+          </p:sp>
+          <p:sp>
+            <p:nvSpPr>
+              <p:cNvPr id="66" name="자유형: 도형 65">
+                <a:extLst>
+                  <a:ext uri="{FF2B5EF4-FFF2-40B4-BE49-F238E27FC236}">
+                    <a16:creationId xmlns:a16="http://schemas.microsoft.com/office/drawing/2014/main" id="{8F232FCB-3558-1165-288C-C9D9C1322A43}"/>
+                  </a:ext>
+                </a:extLst>
+              </p:cNvPr>
+              <p:cNvSpPr/>
+              <p:nvPr/>
+            </p:nvSpPr>
+            <p:spPr>
+              <a:xfrm>
+                <a:off x="3343649" y="3204131"/>
+                <a:ext cx="720000" cy="360000"/>
+              </a:xfrm>
+              <a:custGeom>
+                <a:avLst/>
+                <a:gdLst>
+                  <a:gd name="connsiteX0" fmla="*/ 179999 w 720000"/>
+                  <a:gd name="connsiteY0" fmla="*/ 0 h 360000"/>
+                  <a:gd name="connsiteX1" fmla="*/ 720000 w 720000"/>
+                  <a:gd name="connsiteY1" fmla="*/ 0 h 360000"/>
+                  <a:gd name="connsiteX2" fmla="*/ 720000 w 720000"/>
+                  <a:gd name="connsiteY2" fmla="*/ 180000 h 360000"/>
+                  <a:gd name="connsiteX3" fmla="*/ 540000 w 720000"/>
+                  <a:gd name="connsiteY3" fmla="*/ 360000 h 360000"/>
+                  <a:gd name="connsiteX4" fmla="*/ 0 w 720000"/>
+                  <a:gd name="connsiteY4" fmla="*/ 360000 h 360000"/>
+                  <a:gd name="connsiteX5" fmla="*/ 0 w 720000"/>
+                  <a:gd name="connsiteY5" fmla="*/ 179999 h 360000"/>
+                </a:gdLst>
+                <a:ahLst/>
+                <a:cxnLst>
+                  <a:cxn ang="0">
+                    <a:pos x="connsiteX0" y="connsiteY0"/>
+                  </a:cxn>
+                  <a:cxn ang="0">
+                    <a:pos x="connsiteX1" y="connsiteY1"/>
+                  </a:cxn>
+                  <a:cxn ang="0">
+                    <a:pos x="connsiteX2" y="connsiteY2"/>
+                  </a:cxn>
+                  <a:cxn ang="0">
+                    <a:pos x="connsiteX3" y="connsiteY3"/>
+                  </a:cxn>
+                  <a:cxn ang="0">
+                    <a:pos x="connsiteX4" y="connsiteY4"/>
+                  </a:cxn>
+                  <a:cxn ang="0">
+                    <a:pos x="connsiteX5" y="connsiteY5"/>
+                  </a:cxn>
+                </a:cxnLst>
+                <a:rect l="l" t="t" r="r" b="b"/>
+                <a:pathLst>
+                  <a:path w="720000" h="360000">
+                    <a:moveTo>
+                      <a:pt x="179999" y="0"/>
+                    </a:moveTo>
+                    <a:lnTo>
+                      <a:pt x="720000" y="0"/>
+                    </a:lnTo>
+                    <a:lnTo>
+                      <a:pt x="720000" y="180000"/>
+                    </a:lnTo>
+                    <a:lnTo>
+                      <a:pt x="540000" y="360000"/>
+                    </a:lnTo>
+                    <a:lnTo>
+                      <a:pt x="0" y="360000"/>
+                    </a:lnTo>
+                    <a:lnTo>
+                      <a:pt x="0" y="179999"/>
+                    </a:lnTo>
+                    <a:close/>
+                  </a:path>
+                </a:pathLst>
+              </a:custGeom>
+              <a:solidFill>
+                <a:schemeClr val="bg1"/>
+              </a:solidFill>
+              <a:ln>
+                <a:noFill/>
+              </a:ln>
+            </p:spPr>
+            <p:style>
+              <a:lnRef idx="2">
+                <a:schemeClr val="accent1">
+                  <a:shade val="15000"/>
+                </a:schemeClr>
+              </a:lnRef>
+              <a:fillRef idx="1">
+                <a:schemeClr val="accent1"/>
+              </a:fillRef>
+              <a:effectRef idx="0">
+                <a:schemeClr val="accent1"/>
+              </a:effectRef>
+              <a:fontRef idx="minor">
+                <a:schemeClr val="lt1"/>
+              </a:fontRef>
+            </p:style>
+            <p:txBody>
+              <a:bodyPr wrap="square" rtlCol="0" anchor="ctr">
+                <a:noAutofit/>
+              </a:bodyPr>
+              <a:lstStyle/>
+              <a:p>
+                <a:pPr algn="ctr"/>
+                <a:endParaRPr lang="ko-KR" altLang="en-US"/>
+              </a:p>
+            </p:txBody>
+          </p:sp>
+          <p:sp>
+            <p:nvSpPr>
+              <p:cNvPr id="67" name="직각 삼각형 66">
+                <a:extLst>
+                  <a:ext uri="{FF2B5EF4-FFF2-40B4-BE49-F238E27FC236}">
+                    <a16:creationId xmlns:a16="http://schemas.microsoft.com/office/drawing/2014/main" id="{EEF1A921-6632-E5D5-0B1D-9D93B8FA55F0}"/>
+                  </a:ext>
+                </a:extLst>
+              </p:cNvPr>
+              <p:cNvSpPr/>
+              <p:nvPr/>
+            </p:nvSpPr>
+            <p:spPr>
+              <a:xfrm rot="10800000">
+                <a:off x="3343649" y="3564131"/>
+                <a:ext cx="360000" cy="360000"/>
+              </a:xfrm>
+              <a:prstGeom prst="rtTriangle">
+                <a:avLst/>
+              </a:prstGeom>
+              <a:solidFill>
+                <a:schemeClr val="bg1"/>
+              </a:solidFill>
+              <a:ln>
+                <a:noFill/>
+              </a:ln>
+            </p:spPr>
+            <p:style>
+              <a:lnRef idx="2">
+                <a:schemeClr val="accent1">
+                  <a:shade val="15000"/>
+                </a:schemeClr>
+              </a:lnRef>
+              <a:fillRef idx="1">
+                <a:schemeClr val="accent1"/>
+              </a:fillRef>
+              <a:effectRef idx="0">
+                <a:schemeClr val="accent1"/>
+              </a:effectRef>
+              <a:fontRef idx="minor">
+                <a:schemeClr val="lt1"/>
+              </a:fontRef>
+            </p:style>
+            <p:txBody>
+              <a:bodyPr wrap="square" rtlCol="0" anchor="ctr">
+                <a:noAutofit/>
+              </a:bodyPr>
+              <a:lstStyle/>
+              <a:p>
+                <a:pPr algn="ctr"/>
+                <a:endParaRPr lang="ko-KR" altLang="en-US"/>
+              </a:p>
+            </p:txBody>
+          </p:sp>
+        </p:grpSp>
+      </p:grpSp>
     </p:spTree>
     <p:extLst>
       <p:ext uri="{BB962C8B-B14F-4D97-AF65-F5344CB8AC3E}">

</xml_diff>

<commit_message>
Powerpoint, Word, Excel Icons Added
</commit_message>
<xml_diff>
--- a/tepk2924_Custon_Icon.pptx
+++ b/tepk2924_Custon_Icon.pptx
@@ -273,7 +273,7 @@
           <a:p>
             <a:fld id="{5514A77A-5394-47DD-9A3D-6F42195EF4ED}" type="datetimeFigureOut">
               <a:rPr lang="ko-KR" altLang="en-US" smtClean="0"/>
-              <a:t>2024-07-08</a:t>
+              <a:t>2024-07-09</a:t>
             </a:fld>
             <a:endParaRPr lang="ko-KR" altLang="en-US"/>
           </a:p>
@@ -471,7 +471,7 @@
           <a:p>
             <a:fld id="{5514A77A-5394-47DD-9A3D-6F42195EF4ED}" type="datetimeFigureOut">
               <a:rPr lang="ko-KR" altLang="en-US" smtClean="0"/>
-              <a:t>2024-07-08</a:t>
+              <a:t>2024-07-09</a:t>
             </a:fld>
             <a:endParaRPr lang="ko-KR" altLang="en-US"/>
           </a:p>
@@ -679,7 +679,7 @@
           <a:p>
             <a:fld id="{5514A77A-5394-47DD-9A3D-6F42195EF4ED}" type="datetimeFigureOut">
               <a:rPr lang="ko-KR" altLang="en-US" smtClean="0"/>
-              <a:t>2024-07-08</a:t>
+              <a:t>2024-07-09</a:t>
             </a:fld>
             <a:endParaRPr lang="ko-KR" altLang="en-US"/>
           </a:p>
@@ -877,7 +877,7 @@
           <a:p>
             <a:fld id="{5514A77A-5394-47DD-9A3D-6F42195EF4ED}" type="datetimeFigureOut">
               <a:rPr lang="ko-KR" altLang="en-US" smtClean="0"/>
-              <a:t>2024-07-08</a:t>
+              <a:t>2024-07-09</a:t>
             </a:fld>
             <a:endParaRPr lang="ko-KR" altLang="en-US"/>
           </a:p>
@@ -1152,7 +1152,7 @@
           <a:p>
             <a:fld id="{5514A77A-5394-47DD-9A3D-6F42195EF4ED}" type="datetimeFigureOut">
               <a:rPr lang="ko-KR" altLang="en-US" smtClean="0"/>
-              <a:t>2024-07-08</a:t>
+              <a:t>2024-07-09</a:t>
             </a:fld>
             <a:endParaRPr lang="ko-KR" altLang="en-US"/>
           </a:p>
@@ -1417,7 +1417,7 @@
           <a:p>
             <a:fld id="{5514A77A-5394-47DD-9A3D-6F42195EF4ED}" type="datetimeFigureOut">
               <a:rPr lang="ko-KR" altLang="en-US" smtClean="0"/>
-              <a:t>2024-07-08</a:t>
+              <a:t>2024-07-09</a:t>
             </a:fld>
             <a:endParaRPr lang="ko-KR" altLang="en-US"/>
           </a:p>
@@ -1829,7 +1829,7 @@
           <a:p>
             <a:fld id="{5514A77A-5394-47DD-9A3D-6F42195EF4ED}" type="datetimeFigureOut">
               <a:rPr lang="ko-KR" altLang="en-US" smtClean="0"/>
-              <a:t>2024-07-08</a:t>
+              <a:t>2024-07-09</a:t>
             </a:fld>
             <a:endParaRPr lang="ko-KR" altLang="en-US"/>
           </a:p>
@@ -1970,7 +1970,7 @@
           <a:p>
             <a:fld id="{5514A77A-5394-47DD-9A3D-6F42195EF4ED}" type="datetimeFigureOut">
               <a:rPr lang="ko-KR" altLang="en-US" smtClean="0"/>
-              <a:t>2024-07-08</a:t>
+              <a:t>2024-07-09</a:t>
             </a:fld>
             <a:endParaRPr lang="ko-KR" altLang="en-US"/>
           </a:p>
@@ -2083,7 +2083,7 @@
           <a:p>
             <a:fld id="{5514A77A-5394-47DD-9A3D-6F42195EF4ED}" type="datetimeFigureOut">
               <a:rPr lang="ko-KR" altLang="en-US" smtClean="0"/>
-              <a:t>2024-07-08</a:t>
+              <a:t>2024-07-09</a:t>
             </a:fld>
             <a:endParaRPr lang="ko-KR" altLang="en-US"/>
           </a:p>
@@ -2394,7 +2394,7 @@
           <a:p>
             <a:fld id="{5514A77A-5394-47DD-9A3D-6F42195EF4ED}" type="datetimeFigureOut">
               <a:rPr lang="ko-KR" altLang="en-US" smtClean="0"/>
-              <a:t>2024-07-08</a:t>
+              <a:t>2024-07-09</a:t>
             </a:fld>
             <a:endParaRPr lang="ko-KR" altLang="en-US"/>
           </a:p>
@@ -2682,7 +2682,7 @@
           <a:p>
             <a:fld id="{5514A77A-5394-47DD-9A3D-6F42195EF4ED}" type="datetimeFigureOut">
               <a:rPr lang="ko-KR" altLang="en-US" smtClean="0"/>
-              <a:t>2024-07-08</a:t>
+              <a:t>2024-07-09</a:t>
             </a:fld>
             <a:endParaRPr lang="ko-KR" altLang="en-US"/>
           </a:p>
@@ -2923,7 +2923,7 @@
           <a:p>
             <a:fld id="{5514A77A-5394-47DD-9A3D-6F42195EF4ED}" type="datetimeFigureOut">
               <a:rPr lang="ko-KR" altLang="en-US" smtClean="0"/>
-              <a:t>2024-07-08</a:t>
+              <a:t>2024-07-09</a:t>
             </a:fld>
             <a:endParaRPr lang="ko-KR" altLang="en-US"/>
           </a:p>
@@ -3396,7 +3396,7 @@
       </p:sp>
       <p:sp>
         <p:nvSpPr>
-          <p:cNvPr id="2" name="팔각형 1">
+          <p:cNvPr id="3" name="팔각형 2">
             <a:extLst>
               <a:ext uri="{FF2B5EF4-FFF2-40B4-BE49-F238E27FC236}">
                 <a16:creationId xmlns:a16="http://schemas.microsoft.com/office/drawing/2014/main" id="{FE15EBFD-72B6-CA37-48F3-5EA228E3A587}"/>
@@ -3476,6 +3476,42 @@
           <a:chExt cx="0" cy="0"/>
         </a:xfrm>
       </p:grpSpPr>
+      <p:pic>
+        <p:nvPicPr>
+          <p:cNvPr id="3" name="그림 2">
+            <a:extLst>
+              <a:ext uri="{FF2B5EF4-FFF2-40B4-BE49-F238E27FC236}">
+                <a16:creationId xmlns:a16="http://schemas.microsoft.com/office/drawing/2014/main" id="{9DF67090-37C1-FE41-E4B9-E998DDF10B09}"/>
+              </a:ext>
+            </a:extLst>
+          </p:cNvPr>
+          <p:cNvPicPr>
+            <a:picLocks noChangeAspect="1"/>
+          </p:cNvPicPr>
+          <p:nvPr/>
+        </p:nvPicPr>
+        <p:blipFill>
+          <a:blip r:embed="rId2">
+            <a:extLst>
+              <a:ext uri="{28A0092B-C50C-407E-A947-70E740481C1C}">
+                <a14:useLocalDpi xmlns:a14="http://schemas.microsoft.com/office/drawing/2010/main" val="0"/>
+              </a:ext>
+            </a:extLst>
+          </a:blip>
+          <a:stretch>
+            <a:fillRect/>
+          </a:stretch>
+        </p:blipFill>
+        <p:spPr>
+          <a:xfrm>
+            <a:off x="5368169" y="3384596"/>
+            <a:ext cx="6425338" cy="2356894"/>
+          </a:xfrm>
+          <a:prstGeom prst="rect">
+            <a:avLst/>
+          </a:prstGeom>
+        </p:spPr>
+      </p:pic>
     </p:spTree>
     <p:extLst>
       <p:ext uri="{BB962C8B-B14F-4D97-AF65-F5344CB8AC3E}">
@@ -9787,6 +9823,2916 @@
           </p:sp>
         </p:grpSp>
       </p:grpSp>
+      <p:grpSp>
+        <p:nvGrpSpPr>
+          <p:cNvPr id="227" name="그룹 226">
+            <a:extLst>
+              <a:ext uri="{FF2B5EF4-FFF2-40B4-BE49-F238E27FC236}">
+                <a16:creationId xmlns:a16="http://schemas.microsoft.com/office/drawing/2014/main" id="{7B0F4BDC-92AA-51BA-CA17-345F7A2F06C2}"/>
+              </a:ext>
+            </a:extLst>
+          </p:cNvPr>
+          <p:cNvGrpSpPr/>
+          <p:nvPr/>
+        </p:nvGrpSpPr>
+        <p:grpSpPr>
+          <a:xfrm>
+            <a:off x="7960434" y="2281857"/>
+            <a:ext cx="1440000" cy="1440000"/>
+            <a:chOff x="2201893" y="271956"/>
+            <a:chExt cx="1440000" cy="1440000"/>
+          </a:xfrm>
+        </p:grpSpPr>
+        <p:sp>
+          <p:nvSpPr>
+            <p:cNvPr id="70" name="직사각형 69">
+              <a:extLst>
+                <a:ext uri="{FF2B5EF4-FFF2-40B4-BE49-F238E27FC236}">
+                  <a16:creationId xmlns:a16="http://schemas.microsoft.com/office/drawing/2014/main" id="{9460C139-5930-085A-0813-11F8184A8C50}"/>
+                </a:ext>
+              </a:extLst>
+            </p:cNvPr>
+            <p:cNvSpPr/>
+            <p:nvPr/>
+          </p:nvSpPr>
+          <p:spPr>
+            <a:xfrm>
+              <a:off x="2201893" y="271956"/>
+              <a:ext cx="1440000" cy="1440000"/>
+            </a:xfrm>
+            <a:prstGeom prst="rect">
+              <a:avLst/>
+            </a:prstGeom>
+            <a:noFill/>
+            <a:ln>
+              <a:noFill/>
+            </a:ln>
+          </p:spPr>
+          <p:style>
+            <a:lnRef idx="2">
+              <a:schemeClr val="accent1">
+                <a:shade val="15000"/>
+              </a:schemeClr>
+            </a:lnRef>
+            <a:fillRef idx="1">
+              <a:schemeClr val="accent1"/>
+            </a:fillRef>
+            <a:effectRef idx="0">
+              <a:schemeClr val="accent1"/>
+            </a:effectRef>
+            <a:fontRef idx="minor">
+              <a:schemeClr val="lt1"/>
+            </a:fontRef>
+          </p:style>
+          <p:txBody>
+            <a:bodyPr wrap="square" rtlCol="0" anchor="ctr">
+              <a:noAutofit/>
+            </a:bodyPr>
+            <a:lstStyle/>
+            <a:p>
+              <a:pPr algn="ctr"/>
+              <a:endParaRPr lang="ko-KR" altLang="en-US" dirty="0"/>
+            </a:p>
+          </p:txBody>
+        </p:sp>
+        <p:sp>
+          <p:nvSpPr>
+            <p:cNvPr id="156" name="자유형: 도형 155">
+              <a:extLst>
+                <a:ext uri="{FF2B5EF4-FFF2-40B4-BE49-F238E27FC236}">
+                  <a16:creationId xmlns:a16="http://schemas.microsoft.com/office/drawing/2014/main" id="{82B5B9E8-C803-116B-E427-6F7E5302D8A1}"/>
+                </a:ext>
+              </a:extLst>
+            </p:cNvPr>
+            <p:cNvSpPr/>
+            <p:nvPr/>
+          </p:nvSpPr>
+          <p:spPr>
+            <a:xfrm>
+              <a:off x="2561893" y="361956"/>
+              <a:ext cx="504000" cy="261000"/>
+            </a:xfrm>
+            <a:custGeom>
+              <a:avLst/>
+              <a:gdLst>
+                <a:gd name="connsiteX0" fmla="*/ 87718 w 504000"/>
+                <a:gd name="connsiteY0" fmla="*/ 0 h 261000"/>
+                <a:gd name="connsiteX1" fmla="*/ 504000 w 504000"/>
+                <a:gd name="connsiteY1" fmla="*/ 0 h 261000"/>
+                <a:gd name="connsiteX2" fmla="*/ 504000 w 504000"/>
+                <a:gd name="connsiteY2" fmla="*/ 261000 h 261000"/>
+                <a:gd name="connsiteX3" fmla="*/ 326749 w 504000"/>
+                <a:gd name="connsiteY3" fmla="*/ 261000 h 261000"/>
+                <a:gd name="connsiteX4" fmla="*/ 301522 w 504000"/>
+                <a:gd name="connsiteY4" fmla="*/ 235773 h 261000"/>
+                <a:gd name="connsiteX5" fmla="*/ 0 w 504000"/>
+                <a:gd name="connsiteY5" fmla="*/ 235773 h 261000"/>
+                <a:gd name="connsiteX6" fmla="*/ 0 w 504000"/>
+                <a:gd name="connsiteY6" fmla="*/ 87718 h 261000"/>
+                <a:gd name="connsiteX7" fmla="*/ 87718 w 504000"/>
+                <a:gd name="connsiteY7" fmla="*/ 0 h 261000"/>
+              </a:gdLst>
+              <a:ahLst/>
+              <a:cxnLst>
+                <a:cxn ang="0">
+                  <a:pos x="connsiteX0" y="connsiteY0"/>
+                </a:cxn>
+                <a:cxn ang="0">
+                  <a:pos x="connsiteX1" y="connsiteY1"/>
+                </a:cxn>
+                <a:cxn ang="0">
+                  <a:pos x="connsiteX2" y="connsiteY2"/>
+                </a:cxn>
+                <a:cxn ang="0">
+                  <a:pos x="connsiteX3" y="connsiteY3"/>
+                </a:cxn>
+                <a:cxn ang="0">
+                  <a:pos x="connsiteX4" y="connsiteY4"/>
+                </a:cxn>
+                <a:cxn ang="0">
+                  <a:pos x="connsiteX5" y="connsiteY5"/>
+                </a:cxn>
+                <a:cxn ang="0">
+                  <a:pos x="connsiteX6" y="connsiteY6"/>
+                </a:cxn>
+                <a:cxn ang="0">
+                  <a:pos x="connsiteX7" y="connsiteY7"/>
+                </a:cxn>
+              </a:cxnLst>
+              <a:rect l="l" t="t" r="r" b="b"/>
+              <a:pathLst>
+                <a:path w="504000" h="261000">
+                  <a:moveTo>
+                    <a:pt x="87718" y="0"/>
+                  </a:moveTo>
+                  <a:lnTo>
+                    <a:pt x="504000" y="0"/>
+                  </a:lnTo>
+                  <a:lnTo>
+                    <a:pt x="504000" y="261000"/>
+                  </a:lnTo>
+                  <a:lnTo>
+                    <a:pt x="326749" y="261000"/>
+                  </a:lnTo>
+                  <a:lnTo>
+                    <a:pt x="301522" y="235773"/>
+                  </a:lnTo>
+                  <a:lnTo>
+                    <a:pt x="0" y="235773"/>
+                  </a:lnTo>
+                  <a:lnTo>
+                    <a:pt x="0" y="87718"/>
+                  </a:lnTo>
+                  <a:lnTo>
+                    <a:pt x="87718" y="0"/>
+                  </a:lnTo>
+                  <a:close/>
+                </a:path>
+              </a:pathLst>
+            </a:custGeom>
+            <a:solidFill>
+              <a:srgbClr val="21A366"/>
+            </a:solidFill>
+            <a:ln>
+              <a:noFill/>
+            </a:ln>
+          </p:spPr>
+          <p:style>
+            <a:lnRef idx="2">
+              <a:schemeClr val="accent1">
+                <a:shade val="15000"/>
+              </a:schemeClr>
+            </a:lnRef>
+            <a:fillRef idx="1">
+              <a:schemeClr val="accent1"/>
+            </a:fillRef>
+            <a:effectRef idx="0">
+              <a:schemeClr val="accent1"/>
+            </a:effectRef>
+            <a:fontRef idx="minor">
+              <a:schemeClr val="lt1"/>
+            </a:fontRef>
+          </p:style>
+          <p:txBody>
+            <a:bodyPr wrap="square" rtlCol="0" anchor="ctr">
+              <a:noAutofit/>
+            </a:bodyPr>
+            <a:lstStyle/>
+            <a:p>
+              <a:pPr algn="ctr"/>
+              <a:endParaRPr lang="ko-KR" altLang="en-US"/>
+            </a:p>
+          </p:txBody>
+        </p:sp>
+        <p:sp>
+          <p:nvSpPr>
+            <p:cNvPr id="154" name="자유형: 도형 153">
+              <a:extLst>
+                <a:ext uri="{FF2B5EF4-FFF2-40B4-BE49-F238E27FC236}">
+                  <a16:creationId xmlns:a16="http://schemas.microsoft.com/office/drawing/2014/main" id="{C55EFE6A-1D04-6084-25D0-3F8997E3F9D1}"/>
+                </a:ext>
+              </a:extLst>
+            </p:cNvPr>
+            <p:cNvSpPr/>
+            <p:nvPr/>
+          </p:nvSpPr>
+          <p:spPr>
+            <a:xfrm>
+              <a:off x="2921893" y="694956"/>
+              <a:ext cx="144000" cy="261000"/>
+            </a:xfrm>
+            <a:custGeom>
+              <a:avLst/>
+              <a:gdLst>
+                <a:gd name="connsiteX0" fmla="*/ 0 w 144000"/>
+                <a:gd name="connsiteY0" fmla="*/ 0 h 261000"/>
+                <a:gd name="connsiteX1" fmla="*/ 144000 w 144000"/>
+                <a:gd name="connsiteY1" fmla="*/ 0 h 261000"/>
+                <a:gd name="connsiteX2" fmla="*/ 144000 w 144000"/>
+                <a:gd name="connsiteY2" fmla="*/ 261000 h 261000"/>
+                <a:gd name="connsiteX3" fmla="*/ 0 w 144000"/>
+                <a:gd name="connsiteY3" fmla="*/ 261000 h 261000"/>
+                <a:gd name="connsiteX4" fmla="*/ 0 w 144000"/>
+                <a:gd name="connsiteY4" fmla="*/ 0 h 261000"/>
+              </a:gdLst>
+              <a:ahLst/>
+              <a:cxnLst>
+                <a:cxn ang="0">
+                  <a:pos x="connsiteX0" y="connsiteY0"/>
+                </a:cxn>
+                <a:cxn ang="0">
+                  <a:pos x="connsiteX1" y="connsiteY1"/>
+                </a:cxn>
+                <a:cxn ang="0">
+                  <a:pos x="connsiteX2" y="connsiteY2"/>
+                </a:cxn>
+                <a:cxn ang="0">
+                  <a:pos x="connsiteX3" y="connsiteY3"/>
+                </a:cxn>
+                <a:cxn ang="0">
+                  <a:pos x="connsiteX4" y="connsiteY4"/>
+                </a:cxn>
+              </a:cxnLst>
+              <a:rect l="l" t="t" r="r" b="b"/>
+              <a:pathLst>
+                <a:path w="144000" h="261000">
+                  <a:moveTo>
+                    <a:pt x="0" y="0"/>
+                  </a:moveTo>
+                  <a:lnTo>
+                    <a:pt x="144000" y="0"/>
+                  </a:lnTo>
+                  <a:lnTo>
+                    <a:pt x="144000" y="261000"/>
+                  </a:lnTo>
+                  <a:lnTo>
+                    <a:pt x="0" y="261000"/>
+                  </a:lnTo>
+                  <a:lnTo>
+                    <a:pt x="0" y="0"/>
+                  </a:lnTo>
+                  <a:close/>
+                </a:path>
+              </a:pathLst>
+            </a:custGeom>
+            <a:solidFill>
+              <a:srgbClr val="107A40"/>
+            </a:solidFill>
+            <a:ln>
+              <a:noFill/>
+            </a:ln>
+          </p:spPr>
+          <p:style>
+            <a:lnRef idx="2">
+              <a:schemeClr val="accent1">
+                <a:shade val="15000"/>
+              </a:schemeClr>
+            </a:lnRef>
+            <a:fillRef idx="1">
+              <a:schemeClr val="accent1"/>
+            </a:fillRef>
+            <a:effectRef idx="0">
+              <a:schemeClr val="accent1"/>
+            </a:effectRef>
+            <a:fontRef idx="minor">
+              <a:schemeClr val="lt1"/>
+            </a:fontRef>
+          </p:style>
+          <p:txBody>
+            <a:bodyPr wrap="square" rtlCol="0" anchor="ctr">
+              <a:noAutofit/>
+            </a:bodyPr>
+            <a:lstStyle/>
+            <a:p>
+              <a:pPr algn="ctr"/>
+              <a:endParaRPr lang="ko-KR" altLang="en-US"/>
+            </a:p>
+          </p:txBody>
+        </p:sp>
+        <p:sp>
+          <p:nvSpPr>
+            <p:cNvPr id="153" name="자유형: 도형 152">
+              <a:extLst>
+                <a:ext uri="{FF2B5EF4-FFF2-40B4-BE49-F238E27FC236}">
+                  <a16:creationId xmlns:a16="http://schemas.microsoft.com/office/drawing/2014/main" id="{81A1EAC2-874D-A7E9-3A99-9D915B5B4272}"/>
+                </a:ext>
+              </a:extLst>
+            </p:cNvPr>
+            <p:cNvSpPr/>
+            <p:nvPr/>
+          </p:nvSpPr>
+          <p:spPr>
+            <a:xfrm>
+              <a:off x="2921893" y="1027956"/>
+              <a:ext cx="144000" cy="261000"/>
+            </a:xfrm>
+            <a:custGeom>
+              <a:avLst/>
+              <a:gdLst>
+                <a:gd name="connsiteX0" fmla="*/ 0 w 144000"/>
+                <a:gd name="connsiteY0" fmla="*/ 0 h 261000"/>
+                <a:gd name="connsiteX1" fmla="*/ 144000 w 144000"/>
+                <a:gd name="connsiteY1" fmla="*/ 0 h 261000"/>
+                <a:gd name="connsiteX2" fmla="*/ 144000 w 144000"/>
+                <a:gd name="connsiteY2" fmla="*/ 261000 h 261000"/>
+                <a:gd name="connsiteX3" fmla="*/ 0 w 144000"/>
+                <a:gd name="connsiteY3" fmla="*/ 261000 h 261000"/>
+                <a:gd name="connsiteX4" fmla="*/ 0 w 144000"/>
+                <a:gd name="connsiteY4" fmla="*/ 0 h 261000"/>
+              </a:gdLst>
+              <a:ahLst/>
+              <a:cxnLst>
+                <a:cxn ang="0">
+                  <a:pos x="connsiteX0" y="connsiteY0"/>
+                </a:cxn>
+                <a:cxn ang="0">
+                  <a:pos x="connsiteX1" y="connsiteY1"/>
+                </a:cxn>
+                <a:cxn ang="0">
+                  <a:pos x="connsiteX2" y="connsiteY2"/>
+                </a:cxn>
+                <a:cxn ang="0">
+                  <a:pos x="connsiteX3" y="connsiteY3"/>
+                </a:cxn>
+                <a:cxn ang="0">
+                  <a:pos x="connsiteX4" y="connsiteY4"/>
+                </a:cxn>
+              </a:cxnLst>
+              <a:rect l="l" t="t" r="r" b="b"/>
+              <a:pathLst>
+                <a:path w="144000" h="261000">
+                  <a:moveTo>
+                    <a:pt x="0" y="0"/>
+                  </a:moveTo>
+                  <a:lnTo>
+                    <a:pt x="144000" y="0"/>
+                  </a:lnTo>
+                  <a:lnTo>
+                    <a:pt x="144000" y="261000"/>
+                  </a:lnTo>
+                  <a:lnTo>
+                    <a:pt x="0" y="261000"/>
+                  </a:lnTo>
+                  <a:lnTo>
+                    <a:pt x="0" y="0"/>
+                  </a:lnTo>
+                  <a:close/>
+                </a:path>
+              </a:pathLst>
+            </a:custGeom>
+            <a:solidFill>
+              <a:srgbClr val="175835"/>
+            </a:solidFill>
+            <a:ln>
+              <a:noFill/>
+            </a:ln>
+          </p:spPr>
+          <p:style>
+            <a:lnRef idx="2">
+              <a:schemeClr val="accent1">
+                <a:shade val="15000"/>
+              </a:schemeClr>
+            </a:lnRef>
+            <a:fillRef idx="1">
+              <a:schemeClr val="accent1"/>
+            </a:fillRef>
+            <a:effectRef idx="0">
+              <a:schemeClr val="accent1"/>
+            </a:effectRef>
+            <a:fontRef idx="minor">
+              <a:schemeClr val="lt1"/>
+            </a:fontRef>
+          </p:style>
+          <p:txBody>
+            <a:bodyPr wrap="square" rtlCol="0" anchor="ctr">
+              <a:noAutofit/>
+            </a:bodyPr>
+            <a:lstStyle/>
+            <a:p>
+              <a:pPr algn="ctr"/>
+              <a:endParaRPr lang="ko-KR" altLang="en-US"/>
+            </a:p>
+          </p:txBody>
+        </p:sp>
+        <p:sp>
+          <p:nvSpPr>
+            <p:cNvPr id="152" name="자유형: 도형 151">
+              <a:extLst>
+                <a:ext uri="{FF2B5EF4-FFF2-40B4-BE49-F238E27FC236}">
+                  <a16:creationId xmlns:a16="http://schemas.microsoft.com/office/drawing/2014/main" id="{64A620F5-7372-8280-FFFD-E4BE9A63EFC1}"/>
+                </a:ext>
+              </a:extLst>
+            </p:cNvPr>
+            <p:cNvSpPr/>
+            <p:nvPr/>
+          </p:nvSpPr>
+          <p:spPr>
+            <a:xfrm>
+              <a:off x="2561893" y="1360956"/>
+              <a:ext cx="504000" cy="261000"/>
+            </a:xfrm>
+            <a:custGeom>
+              <a:avLst/>
+              <a:gdLst>
+                <a:gd name="connsiteX0" fmla="*/ 330295 w 504000"/>
+                <a:gd name="connsiteY0" fmla="*/ 0 h 261000"/>
+                <a:gd name="connsiteX1" fmla="*/ 504000 w 504000"/>
+                <a:gd name="connsiteY1" fmla="*/ 0 h 261000"/>
+                <a:gd name="connsiteX2" fmla="*/ 504000 w 504000"/>
+                <a:gd name="connsiteY2" fmla="*/ 261000 h 261000"/>
+                <a:gd name="connsiteX3" fmla="*/ 87718 w 504000"/>
+                <a:gd name="connsiteY3" fmla="*/ 261000 h 261000"/>
+                <a:gd name="connsiteX4" fmla="*/ 0 w 504000"/>
+                <a:gd name="connsiteY4" fmla="*/ 173282 h 261000"/>
+                <a:gd name="connsiteX5" fmla="*/ 0 w 504000"/>
+                <a:gd name="connsiteY5" fmla="*/ 28773 h 261000"/>
+                <a:gd name="connsiteX6" fmla="*/ 301522 w 504000"/>
+                <a:gd name="connsiteY6" fmla="*/ 28773 h 261000"/>
+                <a:gd name="connsiteX7" fmla="*/ 330295 w 504000"/>
+                <a:gd name="connsiteY7" fmla="*/ 0 h 261000"/>
+              </a:gdLst>
+              <a:ahLst/>
+              <a:cxnLst>
+                <a:cxn ang="0">
+                  <a:pos x="connsiteX0" y="connsiteY0"/>
+                </a:cxn>
+                <a:cxn ang="0">
+                  <a:pos x="connsiteX1" y="connsiteY1"/>
+                </a:cxn>
+                <a:cxn ang="0">
+                  <a:pos x="connsiteX2" y="connsiteY2"/>
+                </a:cxn>
+                <a:cxn ang="0">
+                  <a:pos x="connsiteX3" y="connsiteY3"/>
+                </a:cxn>
+                <a:cxn ang="0">
+                  <a:pos x="connsiteX4" y="connsiteY4"/>
+                </a:cxn>
+                <a:cxn ang="0">
+                  <a:pos x="connsiteX5" y="connsiteY5"/>
+                </a:cxn>
+                <a:cxn ang="0">
+                  <a:pos x="connsiteX6" y="connsiteY6"/>
+                </a:cxn>
+                <a:cxn ang="0">
+                  <a:pos x="connsiteX7" y="connsiteY7"/>
+                </a:cxn>
+              </a:cxnLst>
+              <a:rect l="l" t="t" r="r" b="b"/>
+              <a:pathLst>
+                <a:path w="504000" h="261000">
+                  <a:moveTo>
+                    <a:pt x="330295" y="0"/>
+                  </a:moveTo>
+                  <a:lnTo>
+                    <a:pt x="504000" y="0"/>
+                  </a:lnTo>
+                  <a:lnTo>
+                    <a:pt x="504000" y="261000"/>
+                  </a:lnTo>
+                  <a:lnTo>
+                    <a:pt x="87718" y="261000"/>
+                  </a:lnTo>
+                  <a:lnTo>
+                    <a:pt x="0" y="173282"/>
+                  </a:lnTo>
+                  <a:lnTo>
+                    <a:pt x="0" y="28773"/>
+                  </a:lnTo>
+                  <a:lnTo>
+                    <a:pt x="301522" y="28773"/>
+                  </a:lnTo>
+                  <a:lnTo>
+                    <a:pt x="330295" y="0"/>
+                  </a:lnTo>
+                  <a:close/>
+                </a:path>
+              </a:pathLst>
+            </a:custGeom>
+            <a:solidFill>
+              <a:srgbClr val="175935"/>
+            </a:solidFill>
+            <a:ln>
+              <a:noFill/>
+            </a:ln>
+          </p:spPr>
+          <p:style>
+            <a:lnRef idx="2">
+              <a:schemeClr val="accent1">
+                <a:shade val="15000"/>
+              </a:schemeClr>
+            </a:lnRef>
+            <a:fillRef idx="1">
+              <a:schemeClr val="accent1"/>
+            </a:fillRef>
+            <a:effectRef idx="0">
+              <a:schemeClr val="accent1"/>
+            </a:effectRef>
+            <a:fontRef idx="minor">
+              <a:schemeClr val="lt1"/>
+            </a:fontRef>
+          </p:style>
+          <p:txBody>
+            <a:bodyPr wrap="square" rtlCol="0" anchor="ctr">
+              <a:noAutofit/>
+            </a:bodyPr>
+            <a:lstStyle/>
+            <a:p>
+              <a:pPr algn="ctr"/>
+              <a:endParaRPr lang="ko-KR" altLang="en-US"/>
+            </a:p>
+          </p:txBody>
+        </p:sp>
+        <p:sp>
+          <p:nvSpPr>
+            <p:cNvPr id="94" name="자유형: 도형 93">
+              <a:extLst>
+                <a:ext uri="{FF2B5EF4-FFF2-40B4-BE49-F238E27FC236}">
+                  <a16:creationId xmlns:a16="http://schemas.microsoft.com/office/drawing/2014/main" id="{C72556CE-3628-7FBC-42E8-19D65CE59612}"/>
+                </a:ext>
+              </a:extLst>
+            </p:cNvPr>
+            <p:cNvSpPr/>
+            <p:nvPr/>
+          </p:nvSpPr>
+          <p:spPr>
+            <a:xfrm>
+              <a:off x="3137893" y="361956"/>
+              <a:ext cx="504000" cy="261000"/>
+            </a:xfrm>
+            <a:custGeom>
+              <a:avLst/>
+              <a:gdLst>
+                <a:gd name="connsiteX0" fmla="*/ 0 w 504000"/>
+                <a:gd name="connsiteY0" fmla="*/ 0 h 261000"/>
+                <a:gd name="connsiteX1" fmla="*/ 416282 w 504000"/>
+                <a:gd name="connsiteY1" fmla="*/ 0 h 261000"/>
+                <a:gd name="connsiteX2" fmla="*/ 504000 w 504000"/>
+                <a:gd name="connsiteY2" fmla="*/ 87718 h 261000"/>
+                <a:gd name="connsiteX3" fmla="*/ 504000 w 504000"/>
+                <a:gd name="connsiteY3" fmla="*/ 261000 h 261000"/>
+                <a:gd name="connsiteX4" fmla="*/ 0 w 504000"/>
+                <a:gd name="connsiteY4" fmla="*/ 261000 h 261000"/>
+                <a:gd name="connsiteX5" fmla="*/ 0 w 504000"/>
+                <a:gd name="connsiteY5" fmla="*/ 0 h 261000"/>
+              </a:gdLst>
+              <a:ahLst/>
+              <a:cxnLst>
+                <a:cxn ang="0">
+                  <a:pos x="connsiteX0" y="connsiteY0"/>
+                </a:cxn>
+                <a:cxn ang="0">
+                  <a:pos x="connsiteX1" y="connsiteY1"/>
+                </a:cxn>
+                <a:cxn ang="0">
+                  <a:pos x="connsiteX2" y="connsiteY2"/>
+                </a:cxn>
+                <a:cxn ang="0">
+                  <a:pos x="connsiteX3" y="connsiteY3"/>
+                </a:cxn>
+                <a:cxn ang="0">
+                  <a:pos x="connsiteX4" y="connsiteY4"/>
+                </a:cxn>
+                <a:cxn ang="0">
+                  <a:pos x="connsiteX5" y="connsiteY5"/>
+                </a:cxn>
+              </a:cxnLst>
+              <a:rect l="l" t="t" r="r" b="b"/>
+              <a:pathLst>
+                <a:path w="504000" h="261000">
+                  <a:moveTo>
+                    <a:pt x="0" y="0"/>
+                  </a:moveTo>
+                  <a:lnTo>
+                    <a:pt x="416282" y="0"/>
+                  </a:lnTo>
+                  <a:lnTo>
+                    <a:pt x="504000" y="87718"/>
+                  </a:lnTo>
+                  <a:lnTo>
+                    <a:pt x="504000" y="261000"/>
+                  </a:lnTo>
+                  <a:lnTo>
+                    <a:pt x="0" y="261000"/>
+                  </a:lnTo>
+                  <a:lnTo>
+                    <a:pt x="0" y="0"/>
+                  </a:lnTo>
+                  <a:close/>
+                </a:path>
+              </a:pathLst>
+            </a:custGeom>
+            <a:solidFill>
+              <a:srgbClr val="33C481"/>
+            </a:solidFill>
+            <a:ln>
+              <a:noFill/>
+            </a:ln>
+          </p:spPr>
+          <p:style>
+            <a:lnRef idx="2">
+              <a:schemeClr val="accent1">
+                <a:shade val="15000"/>
+              </a:schemeClr>
+            </a:lnRef>
+            <a:fillRef idx="1">
+              <a:schemeClr val="accent1"/>
+            </a:fillRef>
+            <a:effectRef idx="0">
+              <a:schemeClr val="accent1"/>
+            </a:effectRef>
+            <a:fontRef idx="minor">
+              <a:schemeClr val="lt1"/>
+            </a:fontRef>
+          </p:style>
+          <p:txBody>
+            <a:bodyPr wrap="square" rtlCol="0" anchor="ctr">
+              <a:noAutofit/>
+            </a:bodyPr>
+            <a:lstStyle/>
+            <a:p>
+              <a:pPr algn="ctr"/>
+              <a:endParaRPr lang="ko-KR" altLang="en-US"/>
+            </a:p>
+          </p:txBody>
+        </p:sp>
+        <p:sp>
+          <p:nvSpPr>
+            <p:cNvPr id="91" name="자유형: 도형 90">
+              <a:extLst>
+                <a:ext uri="{FF2B5EF4-FFF2-40B4-BE49-F238E27FC236}">
+                  <a16:creationId xmlns:a16="http://schemas.microsoft.com/office/drawing/2014/main" id="{8F0459A1-4918-67A3-C6EA-341E47CEFEEB}"/>
+                </a:ext>
+              </a:extLst>
+            </p:cNvPr>
+            <p:cNvSpPr/>
+            <p:nvPr/>
+          </p:nvSpPr>
+          <p:spPr>
+            <a:xfrm>
+              <a:off x="3137893" y="694956"/>
+              <a:ext cx="504000" cy="261000"/>
+            </a:xfrm>
+            <a:custGeom>
+              <a:avLst/>
+              <a:gdLst>
+                <a:gd name="connsiteX0" fmla="*/ 0 w 504000"/>
+                <a:gd name="connsiteY0" fmla="*/ 0 h 261000"/>
+                <a:gd name="connsiteX1" fmla="*/ 504000 w 504000"/>
+                <a:gd name="connsiteY1" fmla="*/ 0 h 261000"/>
+                <a:gd name="connsiteX2" fmla="*/ 504000 w 504000"/>
+                <a:gd name="connsiteY2" fmla="*/ 261000 h 261000"/>
+                <a:gd name="connsiteX3" fmla="*/ 0 w 504000"/>
+                <a:gd name="connsiteY3" fmla="*/ 261000 h 261000"/>
+                <a:gd name="connsiteX4" fmla="*/ 0 w 504000"/>
+                <a:gd name="connsiteY4" fmla="*/ 0 h 261000"/>
+              </a:gdLst>
+              <a:ahLst/>
+              <a:cxnLst>
+                <a:cxn ang="0">
+                  <a:pos x="connsiteX0" y="connsiteY0"/>
+                </a:cxn>
+                <a:cxn ang="0">
+                  <a:pos x="connsiteX1" y="connsiteY1"/>
+                </a:cxn>
+                <a:cxn ang="0">
+                  <a:pos x="connsiteX2" y="connsiteY2"/>
+                </a:cxn>
+                <a:cxn ang="0">
+                  <a:pos x="connsiteX3" y="connsiteY3"/>
+                </a:cxn>
+                <a:cxn ang="0">
+                  <a:pos x="connsiteX4" y="connsiteY4"/>
+                </a:cxn>
+              </a:cxnLst>
+              <a:rect l="l" t="t" r="r" b="b"/>
+              <a:pathLst>
+                <a:path w="504000" h="261000">
+                  <a:moveTo>
+                    <a:pt x="0" y="0"/>
+                  </a:moveTo>
+                  <a:lnTo>
+                    <a:pt x="504000" y="0"/>
+                  </a:lnTo>
+                  <a:lnTo>
+                    <a:pt x="504000" y="261000"/>
+                  </a:lnTo>
+                  <a:lnTo>
+                    <a:pt x="0" y="261000"/>
+                  </a:lnTo>
+                  <a:lnTo>
+                    <a:pt x="0" y="0"/>
+                  </a:lnTo>
+                  <a:close/>
+                </a:path>
+              </a:pathLst>
+            </a:custGeom>
+            <a:solidFill>
+              <a:srgbClr val="21A366"/>
+            </a:solidFill>
+            <a:ln>
+              <a:noFill/>
+            </a:ln>
+          </p:spPr>
+          <p:style>
+            <a:lnRef idx="2">
+              <a:schemeClr val="accent1">
+                <a:shade val="15000"/>
+              </a:schemeClr>
+            </a:lnRef>
+            <a:fillRef idx="1">
+              <a:schemeClr val="accent1"/>
+            </a:fillRef>
+            <a:effectRef idx="0">
+              <a:schemeClr val="accent1"/>
+            </a:effectRef>
+            <a:fontRef idx="minor">
+              <a:schemeClr val="lt1"/>
+            </a:fontRef>
+          </p:style>
+          <p:txBody>
+            <a:bodyPr wrap="square" rtlCol="0" anchor="ctr">
+              <a:noAutofit/>
+            </a:bodyPr>
+            <a:lstStyle/>
+            <a:p>
+              <a:pPr algn="ctr"/>
+              <a:endParaRPr lang="ko-KR" altLang="en-US"/>
+            </a:p>
+          </p:txBody>
+        </p:sp>
+        <p:sp>
+          <p:nvSpPr>
+            <p:cNvPr id="88" name="자유형: 도형 87">
+              <a:extLst>
+                <a:ext uri="{FF2B5EF4-FFF2-40B4-BE49-F238E27FC236}">
+                  <a16:creationId xmlns:a16="http://schemas.microsoft.com/office/drawing/2014/main" id="{9AA245D9-E83B-EBD1-4221-069E0B358149}"/>
+                </a:ext>
+              </a:extLst>
+            </p:cNvPr>
+            <p:cNvSpPr/>
+            <p:nvPr/>
+          </p:nvSpPr>
+          <p:spPr>
+            <a:xfrm>
+              <a:off x="3137893" y="1027956"/>
+              <a:ext cx="504000" cy="261000"/>
+            </a:xfrm>
+            <a:custGeom>
+              <a:avLst/>
+              <a:gdLst>
+                <a:gd name="connsiteX0" fmla="*/ 0 w 504000"/>
+                <a:gd name="connsiteY0" fmla="*/ 0 h 261000"/>
+                <a:gd name="connsiteX1" fmla="*/ 504000 w 504000"/>
+                <a:gd name="connsiteY1" fmla="*/ 0 h 261000"/>
+                <a:gd name="connsiteX2" fmla="*/ 504000 w 504000"/>
+                <a:gd name="connsiteY2" fmla="*/ 261000 h 261000"/>
+                <a:gd name="connsiteX3" fmla="*/ 0 w 504000"/>
+                <a:gd name="connsiteY3" fmla="*/ 261000 h 261000"/>
+                <a:gd name="connsiteX4" fmla="*/ 0 w 504000"/>
+                <a:gd name="connsiteY4" fmla="*/ 0 h 261000"/>
+              </a:gdLst>
+              <a:ahLst/>
+              <a:cxnLst>
+                <a:cxn ang="0">
+                  <a:pos x="connsiteX0" y="connsiteY0"/>
+                </a:cxn>
+                <a:cxn ang="0">
+                  <a:pos x="connsiteX1" y="connsiteY1"/>
+                </a:cxn>
+                <a:cxn ang="0">
+                  <a:pos x="connsiteX2" y="connsiteY2"/>
+                </a:cxn>
+                <a:cxn ang="0">
+                  <a:pos x="connsiteX3" y="connsiteY3"/>
+                </a:cxn>
+                <a:cxn ang="0">
+                  <a:pos x="connsiteX4" y="connsiteY4"/>
+                </a:cxn>
+              </a:cxnLst>
+              <a:rect l="l" t="t" r="r" b="b"/>
+              <a:pathLst>
+                <a:path w="504000" h="261000">
+                  <a:moveTo>
+                    <a:pt x="0" y="0"/>
+                  </a:moveTo>
+                  <a:lnTo>
+                    <a:pt x="504000" y="0"/>
+                  </a:lnTo>
+                  <a:lnTo>
+                    <a:pt x="504000" y="261000"/>
+                  </a:lnTo>
+                  <a:lnTo>
+                    <a:pt x="0" y="261000"/>
+                  </a:lnTo>
+                  <a:lnTo>
+                    <a:pt x="0" y="0"/>
+                  </a:lnTo>
+                  <a:close/>
+                </a:path>
+              </a:pathLst>
+            </a:custGeom>
+            <a:solidFill>
+              <a:srgbClr val="107C41"/>
+            </a:solidFill>
+            <a:ln>
+              <a:noFill/>
+            </a:ln>
+          </p:spPr>
+          <p:style>
+            <a:lnRef idx="2">
+              <a:schemeClr val="accent1">
+                <a:shade val="15000"/>
+              </a:schemeClr>
+            </a:lnRef>
+            <a:fillRef idx="1">
+              <a:schemeClr val="accent1"/>
+            </a:fillRef>
+            <a:effectRef idx="0">
+              <a:schemeClr val="accent1"/>
+            </a:effectRef>
+            <a:fontRef idx="minor">
+              <a:schemeClr val="lt1"/>
+            </a:fontRef>
+          </p:style>
+          <p:txBody>
+            <a:bodyPr wrap="square" rtlCol="0" anchor="ctr">
+              <a:noAutofit/>
+            </a:bodyPr>
+            <a:lstStyle/>
+            <a:p>
+              <a:pPr algn="ctr"/>
+              <a:endParaRPr lang="ko-KR" altLang="en-US"/>
+            </a:p>
+          </p:txBody>
+        </p:sp>
+        <p:sp>
+          <p:nvSpPr>
+            <p:cNvPr id="85" name="자유형: 도형 84">
+              <a:extLst>
+                <a:ext uri="{FF2B5EF4-FFF2-40B4-BE49-F238E27FC236}">
+                  <a16:creationId xmlns:a16="http://schemas.microsoft.com/office/drawing/2014/main" id="{99DF3869-BFD7-B18A-56DB-A382077AC7CA}"/>
+                </a:ext>
+              </a:extLst>
+            </p:cNvPr>
+            <p:cNvSpPr/>
+            <p:nvPr/>
+          </p:nvSpPr>
+          <p:spPr>
+            <a:xfrm>
+              <a:off x="3137893" y="1360956"/>
+              <a:ext cx="504000" cy="261000"/>
+            </a:xfrm>
+            <a:custGeom>
+              <a:avLst/>
+              <a:gdLst>
+                <a:gd name="connsiteX0" fmla="*/ 0 w 504000"/>
+                <a:gd name="connsiteY0" fmla="*/ 0 h 261000"/>
+                <a:gd name="connsiteX1" fmla="*/ 504000 w 504000"/>
+                <a:gd name="connsiteY1" fmla="*/ 0 h 261000"/>
+                <a:gd name="connsiteX2" fmla="*/ 504000 w 504000"/>
+                <a:gd name="connsiteY2" fmla="*/ 173282 h 261000"/>
+                <a:gd name="connsiteX3" fmla="*/ 416282 w 504000"/>
+                <a:gd name="connsiteY3" fmla="*/ 261000 h 261000"/>
+                <a:gd name="connsiteX4" fmla="*/ 0 w 504000"/>
+                <a:gd name="connsiteY4" fmla="*/ 261000 h 261000"/>
+                <a:gd name="connsiteX5" fmla="*/ 0 w 504000"/>
+                <a:gd name="connsiteY5" fmla="*/ 0 h 261000"/>
+              </a:gdLst>
+              <a:ahLst/>
+              <a:cxnLst>
+                <a:cxn ang="0">
+                  <a:pos x="connsiteX0" y="connsiteY0"/>
+                </a:cxn>
+                <a:cxn ang="0">
+                  <a:pos x="connsiteX1" y="connsiteY1"/>
+                </a:cxn>
+                <a:cxn ang="0">
+                  <a:pos x="connsiteX2" y="connsiteY2"/>
+                </a:cxn>
+                <a:cxn ang="0">
+                  <a:pos x="connsiteX3" y="connsiteY3"/>
+                </a:cxn>
+                <a:cxn ang="0">
+                  <a:pos x="connsiteX4" y="connsiteY4"/>
+                </a:cxn>
+                <a:cxn ang="0">
+                  <a:pos x="connsiteX5" y="connsiteY5"/>
+                </a:cxn>
+              </a:cxnLst>
+              <a:rect l="l" t="t" r="r" b="b"/>
+              <a:pathLst>
+                <a:path w="504000" h="261000">
+                  <a:moveTo>
+                    <a:pt x="0" y="0"/>
+                  </a:moveTo>
+                  <a:lnTo>
+                    <a:pt x="504000" y="0"/>
+                  </a:lnTo>
+                  <a:lnTo>
+                    <a:pt x="504000" y="173282"/>
+                  </a:lnTo>
+                  <a:lnTo>
+                    <a:pt x="416282" y="261000"/>
+                  </a:lnTo>
+                  <a:lnTo>
+                    <a:pt x="0" y="261000"/>
+                  </a:lnTo>
+                  <a:lnTo>
+                    <a:pt x="0" y="0"/>
+                  </a:lnTo>
+                  <a:close/>
+                </a:path>
+              </a:pathLst>
+            </a:custGeom>
+            <a:solidFill>
+              <a:srgbClr val="185C37"/>
+            </a:solidFill>
+            <a:ln>
+              <a:noFill/>
+            </a:ln>
+          </p:spPr>
+          <p:style>
+            <a:lnRef idx="2">
+              <a:schemeClr val="accent1">
+                <a:shade val="15000"/>
+              </a:schemeClr>
+            </a:lnRef>
+            <a:fillRef idx="1">
+              <a:schemeClr val="accent1"/>
+            </a:fillRef>
+            <a:effectRef idx="0">
+              <a:schemeClr val="accent1"/>
+            </a:effectRef>
+            <a:fontRef idx="minor">
+              <a:schemeClr val="lt1"/>
+            </a:fontRef>
+          </p:style>
+          <p:txBody>
+            <a:bodyPr wrap="square" rtlCol="0" anchor="ctr">
+              <a:noAutofit/>
+            </a:bodyPr>
+            <a:lstStyle/>
+            <a:p>
+              <a:pPr algn="ctr"/>
+              <a:endParaRPr lang="ko-KR" altLang="en-US"/>
+            </a:p>
+          </p:txBody>
+        </p:sp>
+        <p:sp>
+          <p:nvSpPr>
+            <p:cNvPr id="124" name="팔각형 123">
+              <a:extLst>
+                <a:ext uri="{FF2B5EF4-FFF2-40B4-BE49-F238E27FC236}">
+                  <a16:creationId xmlns:a16="http://schemas.microsoft.com/office/drawing/2014/main" id="{2657B2E5-6405-E915-5EFD-ED68CA75EA3F}"/>
+                </a:ext>
+              </a:extLst>
+            </p:cNvPr>
+            <p:cNvSpPr/>
+            <p:nvPr/>
+          </p:nvSpPr>
+          <p:spPr>
+            <a:xfrm>
+              <a:off x="2201893" y="667956"/>
+              <a:ext cx="648000" cy="648000"/>
+            </a:xfrm>
+            <a:prstGeom prst="octagon">
+              <a:avLst>
+                <a:gd name="adj" fmla="val 8122"/>
+              </a:avLst>
+            </a:prstGeom>
+            <a:solidFill>
+              <a:srgbClr val="107B41"/>
+            </a:solidFill>
+            <a:ln>
+              <a:noFill/>
+            </a:ln>
+          </p:spPr>
+          <p:style>
+            <a:lnRef idx="2">
+              <a:schemeClr val="accent1">
+                <a:shade val="15000"/>
+              </a:schemeClr>
+            </a:lnRef>
+            <a:fillRef idx="1">
+              <a:schemeClr val="accent1"/>
+            </a:fillRef>
+            <a:effectRef idx="0">
+              <a:schemeClr val="accent1"/>
+            </a:effectRef>
+            <a:fontRef idx="minor">
+              <a:schemeClr val="lt1"/>
+            </a:fontRef>
+          </p:style>
+          <p:txBody>
+            <a:bodyPr rtlCol="0" anchor="ctr"/>
+            <a:lstStyle/>
+            <a:p>
+              <a:pPr algn="ctr"/>
+              <a:endParaRPr lang="ko-KR" altLang="en-US" sz="4000" b="1" dirty="0"/>
+            </a:p>
+          </p:txBody>
+        </p:sp>
+        <p:sp>
+          <p:nvSpPr>
+            <p:cNvPr id="216" name="자유형: 도형 215">
+              <a:extLst>
+                <a:ext uri="{FF2B5EF4-FFF2-40B4-BE49-F238E27FC236}">
+                  <a16:creationId xmlns:a16="http://schemas.microsoft.com/office/drawing/2014/main" id="{9F77A6A4-06DE-DC58-2CA3-1B7BDBF42111}"/>
+                </a:ext>
+              </a:extLst>
+            </p:cNvPr>
+            <p:cNvSpPr/>
+            <p:nvPr/>
+          </p:nvSpPr>
+          <p:spPr>
+            <a:xfrm>
+              <a:off x="2363893" y="775956"/>
+              <a:ext cx="324000" cy="432000"/>
+            </a:xfrm>
+            <a:custGeom>
+              <a:avLst/>
+              <a:gdLst>
+                <a:gd name="connsiteX0" fmla="*/ 0 w 324000"/>
+                <a:gd name="connsiteY0" fmla="*/ 0 h 432000"/>
+                <a:gd name="connsiteX1" fmla="*/ 57600 w 324000"/>
+                <a:gd name="connsiteY1" fmla="*/ 0 h 432000"/>
+                <a:gd name="connsiteX2" fmla="*/ 57600 w 324000"/>
+                <a:gd name="connsiteY2" fmla="*/ 75004 h 432000"/>
+                <a:gd name="connsiteX3" fmla="*/ 162000 w 324000"/>
+                <a:gd name="connsiteY3" fmla="*/ 179404 h 432000"/>
+                <a:gd name="connsiteX4" fmla="*/ 266400 w 324000"/>
+                <a:gd name="connsiteY4" fmla="*/ 75004 h 432000"/>
+                <a:gd name="connsiteX5" fmla="*/ 266400 w 324000"/>
+                <a:gd name="connsiteY5" fmla="*/ 0 h 432000"/>
+                <a:gd name="connsiteX6" fmla="*/ 324000 w 324000"/>
+                <a:gd name="connsiteY6" fmla="*/ 0 h 432000"/>
+                <a:gd name="connsiteX7" fmla="*/ 324000 w 324000"/>
+                <a:gd name="connsiteY7" fmla="*/ 91453 h 432000"/>
+                <a:gd name="connsiteX8" fmla="*/ 199307 w 324000"/>
+                <a:gd name="connsiteY8" fmla="*/ 216146 h 432000"/>
+                <a:gd name="connsiteX9" fmla="*/ 324000 w 324000"/>
+                <a:gd name="connsiteY9" fmla="*/ 340839 h 432000"/>
+                <a:gd name="connsiteX10" fmla="*/ 324000 w 324000"/>
+                <a:gd name="connsiteY10" fmla="*/ 432000 h 432000"/>
+                <a:gd name="connsiteX11" fmla="*/ 266400 w 324000"/>
+                <a:gd name="connsiteY11" fmla="*/ 432000 h 432000"/>
+                <a:gd name="connsiteX12" fmla="*/ 266400 w 324000"/>
+                <a:gd name="connsiteY12" fmla="*/ 355804 h 432000"/>
+                <a:gd name="connsiteX13" fmla="*/ 162000 w 324000"/>
+                <a:gd name="connsiteY13" fmla="*/ 251404 h 432000"/>
+                <a:gd name="connsiteX14" fmla="*/ 57600 w 324000"/>
+                <a:gd name="connsiteY14" fmla="*/ 355804 h 432000"/>
+                <a:gd name="connsiteX15" fmla="*/ 57600 w 324000"/>
+                <a:gd name="connsiteY15" fmla="*/ 432000 h 432000"/>
+                <a:gd name="connsiteX16" fmla="*/ 0 w 324000"/>
+                <a:gd name="connsiteY16" fmla="*/ 432000 h 432000"/>
+                <a:gd name="connsiteX17" fmla="*/ 0 w 324000"/>
+                <a:gd name="connsiteY17" fmla="*/ 343307 h 432000"/>
+                <a:gd name="connsiteX18" fmla="*/ 127307 w 324000"/>
+                <a:gd name="connsiteY18" fmla="*/ 216000 h 432000"/>
+                <a:gd name="connsiteX19" fmla="*/ 0 w 324000"/>
+                <a:gd name="connsiteY19" fmla="*/ 88693 h 432000"/>
+              </a:gdLst>
+              <a:ahLst/>
+              <a:cxnLst>
+                <a:cxn ang="0">
+                  <a:pos x="connsiteX0" y="connsiteY0"/>
+                </a:cxn>
+                <a:cxn ang="0">
+                  <a:pos x="connsiteX1" y="connsiteY1"/>
+                </a:cxn>
+                <a:cxn ang="0">
+                  <a:pos x="connsiteX2" y="connsiteY2"/>
+                </a:cxn>
+                <a:cxn ang="0">
+                  <a:pos x="connsiteX3" y="connsiteY3"/>
+                </a:cxn>
+                <a:cxn ang="0">
+                  <a:pos x="connsiteX4" y="connsiteY4"/>
+                </a:cxn>
+                <a:cxn ang="0">
+                  <a:pos x="connsiteX5" y="connsiteY5"/>
+                </a:cxn>
+                <a:cxn ang="0">
+                  <a:pos x="connsiteX6" y="connsiteY6"/>
+                </a:cxn>
+                <a:cxn ang="0">
+                  <a:pos x="connsiteX7" y="connsiteY7"/>
+                </a:cxn>
+                <a:cxn ang="0">
+                  <a:pos x="connsiteX8" y="connsiteY8"/>
+                </a:cxn>
+                <a:cxn ang="0">
+                  <a:pos x="connsiteX9" y="connsiteY9"/>
+                </a:cxn>
+                <a:cxn ang="0">
+                  <a:pos x="connsiteX10" y="connsiteY10"/>
+                </a:cxn>
+                <a:cxn ang="0">
+                  <a:pos x="connsiteX11" y="connsiteY11"/>
+                </a:cxn>
+                <a:cxn ang="0">
+                  <a:pos x="connsiteX12" y="connsiteY12"/>
+                </a:cxn>
+                <a:cxn ang="0">
+                  <a:pos x="connsiteX13" y="connsiteY13"/>
+                </a:cxn>
+                <a:cxn ang="0">
+                  <a:pos x="connsiteX14" y="connsiteY14"/>
+                </a:cxn>
+                <a:cxn ang="0">
+                  <a:pos x="connsiteX15" y="connsiteY15"/>
+                </a:cxn>
+                <a:cxn ang="0">
+                  <a:pos x="connsiteX16" y="connsiteY16"/>
+                </a:cxn>
+                <a:cxn ang="0">
+                  <a:pos x="connsiteX17" y="connsiteY17"/>
+                </a:cxn>
+                <a:cxn ang="0">
+                  <a:pos x="connsiteX18" y="connsiteY18"/>
+                </a:cxn>
+                <a:cxn ang="0">
+                  <a:pos x="connsiteX19" y="connsiteY19"/>
+                </a:cxn>
+              </a:cxnLst>
+              <a:rect l="l" t="t" r="r" b="b"/>
+              <a:pathLst>
+                <a:path w="324000" h="432000">
+                  <a:moveTo>
+                    <a:pt x="0" y="0"/>
+                  </a:moveTo>
+                  <a:lnTo>
+                    <a:pt x="57600" y="0"/>
+                  </a:lnTo>
+                  <a:lnTo>
+                    <a:pt x="57600" y="75004"/>
+                  </a:lnTo>
+                  <a:lnTo>
+                    <a:pt x="162000" y="179404"/>
+                  </a:lnTo>
+                  <a:lnTo>
+                    <a:pt x="266400" y="75004"/>
+                  </a:lnTo>
+                  <a:lnTo>
+                    <a:pt x="266400" y="0"/>
+                  </a:lnTo>
+                  <a:lnTo>
+                    <a:pt x="324000" y="0"/>
+                  </a:lnTo>
+                  <a:lnTo>
+                    <a:pt x="324000" y="91453"/>
+                  </a:lnTo>
+                  <a:lnTo>
+                    <a:pt x="199307" y="216146"/>
+                  </a:lnTo>
+                  <a:lnTo>
+                    <a:pt x="324000" y="340839"/>
+                  </a:lnTo>
+                  <a:lnTo>
+                    <a:pt x="324000" y="432000"/>
+                  </a:lnTo>
+                  <a:lnTo>
+                    <a:pt x="266400" y="432000"/>
+                  </a:lnTo>
+                  <a:lnTo>
+                    <a:pt x="266400" y="355804"/>
+                  </a:lnTo>
+                  <a:lnTo>
+                    <a:pt x="162000" y="251404"/>
+                  </a:lnTo>
+                  <a:lnTo>
+                    <a:pt x="57600" y="355804"/>
+                  </a:lnTo>
+                  <a:lnTo>
+                    <a:pt x="57600" y="432000"/>
+                  </a:lnTo>
+                  <a:lnTo>
+                    <a:pt x="0" y="432000"/>
+                  </a:lnTo>
+                  <a:lnTo>
+                    <a:pt x="0" y="343307"/>
+                  </a:lnTo>
+                  <a:lnTo>
+                    <a:pt x="127307" y="216000"/>
+                  </a:lnTo>
+                  <a:lnTo>
+                    <a:pt x="0" y="88693"/>
+                  </a:lnTo>
+                  <a:close/>
+                </a:path>
+              </a:pathLst>
+            </a:custGeom>
+            <a:solidFill>
+              <a:schemeClr val="bg1"/>
+            </a:solidFill>
+            <a:ln>
+              <a:noFill/>
+            </a:ln>
+          </p:spPr>
+          <p:style>
+            <a:lnRef idx="2">
+              <a:schemeClr val="accent1">
+                <a:shade val="15000"/>
+              </a:schemeClr>
+            </a:lnRef>
+            <a:fillRef idx="1">
+              <a:schemeClr val="accent1"/>
+            </a:fillRef>
+            <a:effectRef idx="0">
+              <a:schemeClr val="accent1"/>
+            </a:effectRef>
+            <a:fontRef idx="minor">
+              <a:schemeClr val="lt1"/>
+            </a:fontRef>
+          </p:style>
+          <p:txBody>
+            <a:bodyPr wrap="square" rtlCol="0" anchor="ctr">
+              <a:noAutofit/>
+            </a:bodyPr>
+            <a:lstStyle/>
+            <a:p>
+              <a:pPr algn="ctr"/>
+              <a:endParaRPr lang="ko-KR" altLang="en-US"/>
+            </a:p>
+          </p:txBody>
+        </p:sp>
+      </p:grpSp>
+      <p:grpSp>
+        <p:nvGrpSpPr>
+          <p:cNvPr id="228" name="그룹 227">
+            <a:extLst>
+              <a:ext uri="{FF2B5EF4-FFF2-40B4-BE49-F238E27FC236}">
+                <a16:creationId xmlns:a16="http://schemas.microsoft.com/office/drawing/2014/main" id="{173640B5-0540-B67E-F1AE-15D68DA53D49}"/>
+              </a:ext>
+            </a:extLst>
+          </p:cNvPr>
+          <p:cNvGrpSpPr/>
+          <p:nvPr/>
+        </p:nvGrpSpPr>
+        <p:grpSpPr>
+          <a:xfrm>
+            <a:off x="9699482" y="2281857"/>
+            <a:ext cx="1440000" cy="1440000"/>
+            <a:chOff x="4195793" y="271956"/>
+            <a:chExt cx="1440000" cy="1440000"/>
+          </a:xfrm>
+        </p:grpSpPr>
+        <p:sp>
+          <p:nvSpPr>
+            <p:cNvPr id="71" name="직사각형 70">
+              <a:extLst>
+                <a:ext uri="{FF2B5EF4-FFF2-40B4-BE49-F238E27FC236}">
+                  <a16:creationId xmlns:a16="http://schemas.microsoft.com/office/drawing/2014/main" id="{506D9679-813A-0255-F2DD-9F75F2C13EFE}"/>
+                </a:ext>
+              </a:extLst>
+            </p:cNvPr>
+            <p:cNvSpPr/>
+            <p:nvPr/>
+          </p:nvSpPr>
+          <p:spPr>
+            <a:xfrm>
+              <a:off x="4195793" y="271956"/>
+              <a:ext cx="1440000" cy="1440000"/>
+            </a:xfrm>
+            <a:prstGeom prst="rect">
+              <a:avLst/>
+            </a:prstGeom>
+            <a:noFill/>
+            <a:ln>
+              <a:noFill/>
+            </a:ln>
+          </p:spPr>
+          <p:style>
+            <a:lnRef idx="2">
+              <a:schemeClr val="accent1">
+                <a:shade val="15000"/>
+              </a:schemeClr>
+            </a:lnRef>
+            <a:fillRef idx="1">
+              <a:schemeClr val="accent1"/>
+            </a:fillRef>
+            <a:effectRef idx="0">
+              <a:schemeClr val="accent1"/>
+            </a:effectRef>
+            <a:fontRef idx="minor">
+              <a:schemeClr val="lt1"/>
+            </a:fontRef>
+          </p:style>
+          <p:txBody>
+            <a:bodyPr wrap="square" rtlCol="0" anchor="ctr">
+              <a:noAutofit/>
+            </a:bodyPr>
+            <a:lstStyle/>
+            <a:p>
+              <a:pPr algn="ctr"/>
+              <a:endParaRPr lang="ko-KR" altLang="en-US" dirty="0"/>
+            </a:p>
+          </p:txBody>
+        </p:sp>
+        <p:sp>
+          <p:nvSpPr>
+            <p:cNvPr id="147" name="자유형: 도형 146">
+              <a:extLst>
+                <a:ext uri="{FF2B5EF4-FFF2-40B4-BE49-F238E27FC236}">
+                  <a16:creationId xmlns:a16="http://schemas.microsoft.com/office/drawing/2014/main" id="{D0D02E13-ED55-1532-5738-84EE7060B081}"/>
+                </a:ext>
+              </a:extLst>
+            </p:cNvPr>
+            <p:cNvSpPr/>
+            <p:nvPr/>
+          </p:nvSpPr>
+          <p:spPr>
+            <a:xfrm>
+              <a:off x="4555793" y="361956"/>
+              <a:ext cx="1080000" cy="261000"/>
+            </a:xfrm>
+            <a:custGeom>
+              <a:avLst/>
+              <a:gdLst>
+                <a:gd name="connsiteX0" fmla="*/ 87718 w 1080000"/>
+                <a:gd name="connsiteY0" fmla="*/ 0 h 261000"/>
+                <a:gd name="connsiteX1" fmla="*/ 992282 w 1080000"/>
+                <a:gd name="connsiteY1" fmla="*/ 0 h 261000"/>
+                <a:gd name="connsiteX2" fmla="*/ 1080000 w 1080000"/>
+                <a:gd name="connsiteY2" fmla="*/ 87718 h 261000"/>
+                <a:gd name="connsiteX3" fmla="*/ 1080000 w 1080000"/>
+                <a:gd name="connsiteY3" fmla="*/ 261000 h 261000"/>
+                <a:gd name="connsiteX4" fmla="*/ 326749 w 1080000"/>
+                <a:gd name="connsiteY4" fmla="*/ 261000 h 261000"/>
+                <a:gd name="connsiteX5" fmla="*/ 301522 w 1080000"/>
+                <a:gd name="connsiteY5" fmla="*/ 235773 h 261000"/>
+                <a:gd name="connsiteX6" fmla="*/ 0 w 1080000"/>
+                <a:gd name="connsiteY6" fmla="*/ 235773 h 261000"/>
+                <a:gd name="connsiteX7" fmla="*/ 0 w 1080000"/>
+                <a:gd name="connsiteY7" fmla="*/ 87718 h 261000"/>
+                <a:gd name="connsiteX8" fmla="*/ 87718 w 1080000"/>
+                <a:gd name="connsiteY8" fmla="*/ 0 h 261000"/>
+              </a:gdLst>
+              <a:ahLst/>
+              <a:cxnLst>
+                <a:cxn ang="0">
+                  <a:pos x="connsiteX0" y="connsiteY0"/>
+                </a:cxn>
+                <a:cxn ang="0">
+                  <a:pos x="connsiteX1" y="connsiteY1"/>
+                </a:cxn>
+                <a:cxn ang="0">
+                  <a:pos x="connsiteX2" y="connsiteY2"/>
+                </a:cxn>
+                <a:cxn ang="0">
+                  <a:pos x="connsiteX3" y="connsiteY3"/>
+                </a:cxn>
+                <a:cxn ang="0">
+                  <a:pos x="connsiteX4" y="connsiteY4"/>
+                </a:cxn>
+                <a:cxn ang="0">
+                  <a:pos x="connsiteX5" y="connsiteY5"/>
+                </a:cxn>
+                <a:cxn ang="0">
+                  <a:pos x="connsiteX6" y="connsiteY6"/>
+                </a:cxn>
+                <a:cxn ang="0">
+                  <a:pos x="connsiteX7" y="connsiteY7"/>
+                </a:cxn>
+                <a:cxn ang="0">
+                  <a:pos x="connsiteX8" y="connsiteY8"/>
+                </a:cxn>
+              </a:cxnLst>
+              <a:rect l="l" t="t" r="r" b="b"/>
+              <a:pathLst>
+                <a:path w="1080000" h="261000">
+                  <a:moveTo>
+                    <a:pt x="87718" y="0"/>
+                  </a:moveTo>
+                  <a:lnTo>
+                    <a:pt x="992282" y="0"/>
+                  </a:lnTo>
+                  <a:lnTo>
+                    <a:pt x="1080000" y="87718"/>
+                  </a:lnTo>
+                  <a:lnTo>
+                    <a:pt x="1080000" y="261000"/>
+                  </a:lnTo>
+                  <a:lnTo>
+                    <a:pt x="326749" y="261000"/>
+                  </a:lnTo>
+                  <a:lnTo>
+                    <a:pt x="301522" y="235773"/>
+                  </a:lnTo>
+                  <a:lnTo>
+                    <a:pt x="0" y="235773"/>
+                  </a:lnTo>
+                  <a:lnTo>
+                    <a:pt x="0" y="87718"/>
+                  </a:lnTo>
+                  <a:lnTo>
+                    <a:pt x="87718" y="0"/>
+                  </a:lnTo>
+                  <a:close/>
+                </a:path>
+              </a:pathLst>
+            </a:custGeom>
+            <a:solidFill>
+              <a:srgbClr val="41A5EE"/>
+            </a:solidFill>
+            <a:ln>
+              <a:noFill/>
+            </a:ln>
+          </p:spPr>
+          <p:style>
+            <a:lnRef idx="2">
+              <a:schemeClr val="accent1">
+                <a:shade val="15000"/>
+              </a:schemeClr>
+            </a:lnRef>
+            <a:fillRef idx="1">
+              <a:schemeClr val="accent1"/>
+            </a:fillRef>
+            <a:effectRef idx="0">
+              <a:schemeClr val="accent1"/>
+            </a:effectRef>
+            <a:fontRef idx="minor">
+              <a:schemeClr val="lt1"/>
+            </a:fontRef>
+          </p:style>
+          <p:txBody>
+            <a:bodyPr wrap="square" rtlCol="0" anchor="ctr">
+              <a:noAutofit/>
+            </a:bodyPr>
+            <a:lstStyle/>
+            <a:p>
+              <a:pPr algn="ctr"/>
+              <a:endParaRPr lang="ko-KR" altLang="en-US"/>
+            </a:p>
+          </p:txBody>
+        </p:sp>
+        <p:sp>
+          <p:nvSpPr>
+            <p:cNvPr id="145" name="자유형: 도형 144">
+              <a:extLst>
+                <a:ext uri="{FF2B5EF4-FFF2-40B4-BE49-F238E27FC236}">
+                  <a16:creationId xmlns:a16="http://schemas.microsoft.com/office/drawing/2014/main" id="{DBAD4001-0E64-B777-B6DD-D3F394E739FE}"/>
+                </a:ext>
+              </a:extLst>
+            </p:cNvPr>
+            <p:cNvSpPr/>
+            <p:nvPr/>
+          </p:nvSpPr>
+          <p:spPr>
+            <a:xfrm>
+              <a:off x="4915793" y="691882"/>
+              <a:ext cx="720000" cy="261000"/>
+            </a:xfrm>
+            <a:custGeom>
+              <a:avLst/>
+              <a:gdLst>
+                <a:gd name="connsiteX0" fmla="*/ 0 w 720000"/>
+                <a:gd name="connsiteY0" fmla="*/ 0 h 261000"/>
+                <a:gd name="connsiteX1" fmla="*/ 720000 w 720000"/>
+                <a:gd name="connsiteY1" fmla="*/ 0 h 261000"/>
+                <a:gd name="connsiteX2" fmla="*/ 720000 w 720000"/>
+                <a:gd name="connsiteY2" fmla="*/ 261000 h 261000"/>
+                <a:gd name="connsiteX3" fmla="*/ 0 w 720000"/>
+                <a:gd name="connsiteY3" fmla="*/ 261000 h 261000"/>
+                <a:gd name="connsiteX4" fmla="*/ 0 w 720000"/>
+                <a:gd name="connsiteY4" fmla="*/ 0 h 261000"/>
+              </a:gdLst>
+              <a:ahLst/>
+              <a:cxnLst>
+                <a:cxn ang="0">
+                  <a:pos x="connsiteX0" y="connsiteY0"/>
+                </a:cxn>
+                <a:cxn ang="0">
+                  <a:pos x="connsiteX1" y="connsiteY1"/>
+                </a:cxn>
+                <a:cxn ang="0">
+                  <a:pos x="connsiteX2" y="connsiteY2"/>
+                </a:cxn>
+                <a:cxn ang="0">
+                  <a:pos x="connsiteX3" y="connsiteY3"/>
+                </a:cxn>
+                <a:cxn ang="0">
+                  <a:pos x="connsiteX4" y="connsiteY4"/>
+                </a:cxn>
+              </a:cxnLst>
+              <a:rect l="l" t="t" r="r" b="b"/>
+              <a:pathLst>
+                <a:path w="720000" h="261000">
+                  <a:moveTo>
+                    <a:pt x="0" y="0"/>
+                  </a:moveTo>
+                  <a:lnTo>
+                    <a:pt x="720000" y="0"/>
+                  </a:lnTo>
+                  <a:lnTo>
+                    <a:pt x="720000" y="261000"/>
+                  </a:lnTo>
+                  <a:lnTo>
+                    <a:pt x="0" y="261000"/>
+                  </a:lnTo>
+                  <a:lnTo>
+                    <a:pt x="0" y="0"/>
+                  </a:lnTo>
+                  <a:close/>
+                </a:path>
+              </a:pathLst>
+            </a:custGeom>
+            <a:solidFill>
+              <a:srgbClr val="2B7CD3"/>
+            </a:solidFill>
+            <a:ln>
+              <a:noFill/>
+            </a:ln>
+          </p:spPr>
+          <p:style>
+            <a:lnRef idx="2">
+              <a:schemeClr val="accent1">
+                <a:shade val="15000"/>
+              </a:schemeClr>
+            </a:lnRef>
+            <a:fillRef idx="1">
+              <a:schemeClr val="accent1"/>
+            </a:fillRef>
+            <a:effectRef idx="0">
+              <a:schemeClr val="accent1"/>
+            </a:effectRef>
+            <a:fontRef idx="minor">
+              <a:schemeClr val="lt1"/>
+            </a:fontRef>
+          </p:style>
+          <p:txBody>
+            <a:bodyPr wrap="square" rtlCol="0" anchor="ctr">
+              <a:noAutofit/>
+            </a:bodyPr>
+            <a:lstStyle/>
+            <a:p>
+              <a:pPr algn="ctr"/>
+              <a:endParaRPr lang="ko-KR" altLang="en-US"/>
+            </a:p>
+          </p:txBody>
+        </p:sp>
+        <p:sp>
+          <p:nvSpPr>
+            <p:cNvPr id="144" name="자유형: 도형 143">
+              <a:extLst>
+                <a:ext uri="{FF2B5EF4-FFF2-40B4-BE49-F238E27FC236}">
+                  <a16:creationId xmlns:a16="http://schemas.microsoft.com/office/drawing/2014/main" id="{1BF8DA75-BCA4-360A-86D8-B00DBD03CB3C}"/>
+                </a:ext>
+              </a:extLst>
+            </p:cNvPr>
+            <p:cNvSpPr/>
+            <p:nvPr/>
+          </p:nvSpPr>
+          <p:spPr>
+            <a:xfrm>
+              <a:off x="4915793" y="1027956"/>
+              <a:ext cx="720000" cy="261000"/>
+            </a:xfrm>
+            <a:custGeom>
+              <a:avLst/>
+              <a:gdLst>
+                <a:gd name="connsiteX0" fmla="*/ 0 w 720000"/>
+                <a:gd name="connsiteY0" fmla="*/ 0 h 261000"/>
+                <a:gd name="connsiteX1" fmla="*/ 720000 w 720000"/>
+                <a:gd name="connsiteY1" fmla="*/ 0 h 261000"/>
+                <a:gd name="connsiteX2" fmla="*/ 720000 w 720000"/>
+                <a:gd name="connsiteY2" fmla="*/ 261000 h 261000"/>
+                <a:gd name="connsiteX3" fmla="*/ 0 w 720000"/>
+                <a:gd name="connsiteY3" fmla="*/ 261000 h 261000"/>
+                <a:gd name="connsiteX4" fmla="*/ 0 w 720000"/>
+                <a:gd name="connsiteY4" fmla="*/ 0 h 261000"/>
+              </a:gdLst>
+              <a:ahLst/>
+              <a:cxnLst>
+                <a:cxn ang="0">
+                  <a:pos x="connsiteX0" y="connsiteY0"/>
+                </a:cxn>
+                <a:cxn ang="0">
+                  <a:pos x="connsiteX1" y="connsiteY1"/>
+                </a:cxn>
+                <a:cxn ang="0">
+                  <a:pos x="connsiteX2" y="connsiteY2"/>
+                </a:cxn>
+                <a:cxn ang="0">
+                  <a:pos x="connsiteX3" y="connsiteY3"/>
+                </a:cxn>
+                <a:cxn ang="0">
+                  <a:pos x="connsiteX4" y="connsiteY4"/>
+                </a:cxn>
+              </a:cxnLst>
+              <a:rect l="l" t="t" r="r" b="b"/>
+              <a:pathLst>
+                <a:path w="720000" h="261000">
+                  <a:moveTo>
+                    <a:pt x="0" y="0"/>
+                  </a:moveTo>
+                  <a:lnTo>
+                    <a:pt x="720000" y="0"/>
+                  </a:lnTo>
+                  <a:lnTo>
+                    <a:pt x="720000" y="261000"/>
+                  </a:lnTo>
+                  <a:lnTo>
+                    <a:pt x="0" y="261000"/>
+                  </a:lnTo>
+                  <a:lnTo>
+                    <a:pt x="0" y="0"/>
+                  </a:lnTo>
+                  <a:close/>
+                </a:path>
+              </a:pathLst>
+            </a:custGeom>
+            <a:solidFill>
+              <a:srgbClr val="185ABD"/>
+            </a:solidFill>
+            <a:ln>
+              <a:noFill/>
+            </a:ln>
+          </p:spPr>
+          <p:style>
+            <a:lnRef idx="2">
+              <a:schemeClr val="accent1">
+                <a:shade val="15000"/>
+              </a:schemeClr>
+            </a:lnRef>
+            <a:fillRef idx="1">
+              <a:schemeClr val="accent1"/>
+            </a:fillRef>
+            <a:effectRef idx="0">
+              <a:schemeClr val="accent1"/>
+            </a:effectRef>
+            <a:fontRef idx="minor">
+              <a:schemeClr val="lt1"/>
+            </a:fontRef>
+          </p:style>
+          <p:txBody>
+            <a:bodyPr wrap="square" rtlCol="0" anchor="ctr">
+              <a:noAutofit/>
+            </a:bodyPr>
+            <a:lstStyle/>
+            <a:p>
+              <a:pPr algn="ctr"/>
+              <a:endParaRPr lang="ko-KR" altLang="en-US"/>
+            </a:p>
+          </p:txBody>
+        </p:sp>
+        <p:sp>
+          <p:nvSpPr>
+            <p:cNvPr id="143" name="자유형: 도형 142">
+              <a:extLst>
+                <a:ext uri="{FF2B5EF4-FFF2-40B4-BE49-F238E27FC236}">
+                  <a16:creationId xmlns:a16="http://schemas.microsoft.com/office/drawing/2014/main" id="{D2D2315B-F01B-29D0-86AE-FD537F89FCFD}"/>
+                </a:ext>
+              </a:extLst>
+            </p:cNvPr>
+            <p:cNvSpPr/>
+            <p:nvPr/>
+          </p:nvSpPr>
+          <p:spPr>
+            <a:xfrm>
+              <a:off x="4555793" y="1360956"/>
+              <a:ext cx="1080000" cy="261000"/>
+            </a:xfrm>
+            <a:custGeom>
+              <a:avLst/>
+              <a:gdLst>
+                <a:gd name="connsiteX0" fmla="*/ 330295 w 1080000"/>
+                <a:gd name="connsiteY0" fmla="*/ 0 h 261000"/>
+                <a:gd name="connsiteX1" fmla="*/ 1080000 w 1080000"/>
+                <a:gd name="connsiteY1" fmla="*/ 0 h 261000"/>
+                <a:gd name="connsiteX2" fmla="*/ 1080000 w 1080000"/>
+                <a:gd name="connsiteY2" fmla="*/ 173282 h 261000"/>
+                <a:gd name="connsiteX3" fmla="*/ 992282 w 1080000"/>
+                <a:gd name="connsiteY3" fmla="*/ 261000 h 261000"/>
+                <a:gd name="connsiteX4" fmla="*/ 87718 w 1080000"/>
+                <a:gd name="connsiteY4" fmla="*/ 261000 h 261000"/>
+                <a:gd name="connsiteX5" fmla="*/ 0 w 1080000"/>
+                <a:gd name="connsiteY5" fmla="*/ 173282 h 261000"/>
+                <a:gd name="connsiteX6" fmla="*/ 0 w 1080000"/>
+                <a:gd name="connsiteY6" fmla="*/ 28773 h 261000"/>
+                <a:gd name="connsiteX7" fmla="*/ 301522 w 1080000"/>
+                <a:gd name="connsiteY7" fmla="*/ 28773 h 261000"/>
+                <a:gd name="connsiteX8" fmla="*/ 330295 w 1080000"/>
+                <a:gd name="connsiteY8" fmla="*/ 0 h 261000"/>
+              </a:gdLst>
+              <a:ahLst/>
+              <a:cxnLst>
+                <a:cxn ang="0">
+                  <a:pos x="connsiteX0" y="connsiteY0"/>
+                </a:cxn>
+                <a:cxn ang="0">
+                  <a:pos x="connsiteX1" y="connsiteY1"/>
+                </a:cxn>
+                <a:cxn ang="0">
+                  <a:pos x="connsiteX2" y="connsiteY2"/>
+                </a:cxn>
+                <a:cxn ang="0">
+                  <a:pos x="connsiteX3" y="connsiteY3"/>
+                </a:cxn>
+                <a:cxn ang="0">
+                  <a:pos x="connsiteX4" y="connsiteY4"/>
+                </a:cxn>
+                <a:cxn ang="0">
+                  <a:pos x="connsiteX5" y="connsiteY5"/>
+                </a:cxn>
+                <a:cxn ang="0">
+                  <a:pos x="connsiteX6" y="connsiteY6"/>
+                </a:cxn>
+                <a:cxn ang="0">
+                  <a:pos x="connsiteX7" y="connsiteY7"/>
+                </a:cxn>
+                <a:cxn ang="0">
+                  <a:pos x="connsiteX8" y="connsiteY8"/>
+                </a:cxn>
+              </a:cxnLst>
+              <a:rect l="l" t="t" r="r" b="b"/>
+              <a:pathLst>
+                <a:path w="1080000" h="261000">
+                  <a:moveTo>
+                    <a:pt x="330295" y="0"/>
+                  </a:moveTo>
+                  <a:lnTo>
+                    <a:pt x="1080000" y="0"/>
+                  </a:lnTo>
+                  <a:lnTo>
+                    <a:pt x="1080000" y="173282"/>
+                  </a:lnTo>
+                  <a:lnTo>
+                    <a:pt x="992282" y="261000"/>
+                  </a:lnTo>
+                  <a:lnTo>
+                    <a:pt x="87718" y="261000"/>
+                  </a:lnTo>
+                  <a:lnTo>
+                    <a:pt x="0" y="173282"/>
+                  </a:lnTo>
+                  <a:lnTo>
+                    <a:pt x="0" y="28773"/>
+                  </a:lnTo>
+                  <a:lnTo>
+                    <a:pt x="301522" y="28773"/>
+                  </a:lnTo>
+                  <a:lnTo>
+                    <a:pt x="330295" y="0"/>
+                  </a:lnTo>
+                  <a:close/>
+                </a:path>
+              </a:pathLst>
+            </a:custGeom>
+            <a:solidFill>
+              <a:srgbClr val="103F91"/>
+            </a:solidFill>
+            <a:ln>
+              <a:noFill/>
+            </a:ln>
+          </p:spPr>
+          <p:style>
+            <a:lnRef idx="2">
+              <a:schemeClr val="accent1">
+                <a:shade val="15000"/>
+              </a:schemeClr>
+            </a:lnRef>
+            <a:fillRef idx="1">
+              <a:schemeClr val="accent1"/>
+            </a:fillRef>
+            <a:effectRef idx="0">
+              <a:schemeClr val="accent1"/>
+            </a:effectRef>
+            <a:fontRef idx="minor">
+              <a:schemeClr val="lt1"/>
+            </a:fontRef>
+          </p:style>
+          <p:txBody>
+            <a:bodyPr wrap="square" rtlCol="0" anchor="ctr">
+              <a:noAutofit/>
+            </a:bodyPr>
+            <a:lstStyle/>
+            <a:p>
+              <a:pPr algn="ctr"/>
+              <a:endParaRPr lang="ko-KR" altLang="en-US"/>
+            </a:p>
+          </p:txBody>
+        </p:sp>
+        <p:sp>
+          <p:nvSpPr>
+            <p:cNvPr id="72" name="팔각형 71">
+              <a:extLst>
+                <a:ext uri="{FF2B5EF4-FFF2-40B4-BE49-F238E27FC236}">
+                  <a16:creationId xmlns:a16="http://schemas.microsoft.com/office/drawing/2014/main" id="{4F76AEA7-8F9F-03B2-FF1E-2424059A3398}"/>
+                </a:ext>
+              </a:extLst>
+            </p:cNvPr>
+            <p:cNvSpPr/>
+            <p:nvPr/>
+          </p:nvSpPr>
+          <p:spPr>
+            <a:xfrm>
+              <a:off x="4195793" y="667956"/>
+              <a:ext cx="648000" cy="648000"/>
+            </a:xfrm>
+            <a:prstGeom prst="octagon">
+              <a:avLst>
+                <a:gd name="adj" fmla="val 8122"/>
+              </a:avLst>
+            </a:prstGeom>
+            <a:solidFill>
+              <a:srgbClr val="2064C2"/>
+            </a:solidFill>
+            <a:ln>
+              <a:noFill/>
+            </a:ln>
+          </p:spPr>
+          <p:style>
+            <a:lnRef idx="2">
+              <a:schemeClr val="accent1">
+                <a:shade val="15000"/>
+              </a:schemeClr>
+            </a:lnRef>
+            <a:fillRef idx="1">
+              <a:schemeClr val="accent1"/>
+            </a:fillRef>
+            <a:effectRef idx="0">
+              <a:schemeClr val="accent1"/>
+            </a:effectRef>
+            <a:fontRef idx="minor">
+              <a:schemeClr val="lt1"/>
+            </a:fontRef>
+          </p:style>
+          <p:txBody>
+            <a:bodyPr rtlCol="0" anchor="ctr"/>
+            <a:lstStyle/>
+            <a:p>
+              <a:pPr algn="ctr"/>
+              <a:endParaRPr lang="ko-KR" altLang="en-US" sz="4000" b="1" dirty="0"/>
+            </a:p>
+          </p:txBody>
+        </p:sp>
+        <p:sp>
+          <p:nvSpPr>
+            <p:cNvPr id="225" name="자유형: 도형 224">
+              <a:extLst>
+                <a:ext uri="{FF2B5EF4-FFF2-40B4-BE49-F238E27FC236}">
+                  <a16:creationId xmlns:a16="http://schemas.microsoft.com/office/drawing/2014/main" id="{00B16E7D-8CC7-7520-47B2-76BA5A639638}"/>
+                </a:ext>
+              </a:extLst>
+            </p:cNvPr>
+            <p:cNvSpPr/>
+            <p:nvPr/>
+          </p:nvSpPr>
+          <p:spPr>
+            <a:xfrm>
+              <a:off x="4303793" y="775956"/>
+              <a:ext cx="432000" cy="425750"/>
+            </a:xfrm>
+            <a:custGeom>
+              <a:avLst/>
+              <a:gdLst>
+                <a:gd name="connsiteX0" fmla="*/ 0 w 432000"/>
+                <a:gd name="connsiteY0" fmla="*/ 0 h 425750"/>
+                <a:gd name="connsiteX1" fmla="*/ 57344 w 432000"/>
+                <a:gd name="connsiteY1" fmla="*/ 0 h 425750"/>
+                <a:gd name="connsiteX2" fmla="*/ 57344 w 432000"/>
+                <a:gd name="connsiteY2" fmla="*/ 287125 h 425750"/>
+                <a:gd name="connsiteX3" fmla="*/ 58212 w 432000"/>
+                <a:gd name="connsiteY3" fmla="*/ 287125 h 425750"/>
+                <a:gd name="connsiteX4" fmla="*/ 123012 w 432000"/>
+                <a:gd name="connsiteY4" fmla="*/ 351925 h 425750"/>
+                <a:gd name="connsiteX5" fmla="*/ 187812 w 432000"/>
+                <a:gd name="connsiteY5" fmla="*/ 287125 h 425750"/>
+                <a:gd name="connsiteX6" fmla="*/ 186944 w 432000"/>
+                <a:gd name="connsiteY6" fmla="*/ 286257 h 425750"/>
+                <a:gd name="connsiteX7" fmla="*/ 186944 w 432000"/>
+                <a:gd name="connsiteY7" fmla="*/ 0 h 425750"/>
+                <a:gd name="connsiteX8" fmla="*/ 244544 w 432000"/>
+                <a:gd name="connsiteY8" fmla="*/ 0 h 425750"/>
+                <a:gd name="connsiteX9" fmla="*/ 244544 w 432000"/>
+                <a:gd name="connsiteY9" fmla="*/ 287125 h 425750"/>
+                <a:gd name="connsiteX10" fmla="*/ 245412 w 432000"/>
+                <a:gd name="connsiteY10" fmla="*/ 287125 h 425750"/>
+                <a:gd name="connsiteX11" fmla="*/ 310212 w 432000"/>
+                <a:gd name="connsiteY11" fmla="*/ 351925 h 425750"/>
+                <a:gd name="connsiteX12" fmla="*/ 375012 w 432000"/>
+                <a:gd name="connsiteY12" fmla="*/ 287125 h 425750"/>
+                <a:gd name="connsiteX13" fmla="*/ 374144 w 432000"/>
+                <a:gd name="connsiteY13" fmla="*/ 286257 h 425750"/>
+                <a:gd name="connsiteX14" fmla="*/ 374144 w 432000"/>
+                <a:gd name="connsiteY14" fmla="*/ 0 h 425750"/>
+                <a:gd name="connsiteX15" fmla="*/ 432000 w 432000"/>
+                <a:gd name="connsiteY15" fmla="*/ 0 h 425750"/>
+                <a:gd name="connsiteX16" fmla="*/ 432000 w 432000"/>
+                <a:gd name="connsiteY16" fmla="*/ 305050 h 425750"/>
+                <a:gd name="connsiteX17" fmla="*/ 311300 w 432000"/>
+                <a:gd name="connsiteY17" fmla="*/ 425750 h 425750"/>
+                <a:gd name="connsiteX18" fmla="*/ 216000 w 432000"/>
+                <a:gd name="connsiteY18" fmla="*/ 330450 h 425750"/>
+                <a:gd name="connsiteX19" fmla="*/ 120700 w 432000"/>
+                <a:gd name="connsiteY19" fmla="*/ 425750 h 425750"/>
+                <a:gd name="connsiteX20" fmla="*/ 0 w 432000"/>
+                <a:gd name="connsiteY20" fmla="*/ 305050 h 425750"/>
+              </a:gdLst>
+              <a:ahLst/>
+              <a:cxnLst>
+                <a:cxn ang="0">
+                  <a:pos x="connsiteX0" y="connsiteY0"/>
+                </a:cxn>
+                <a:cxn ang="0">
+                  <a:pos x="connsiteX1" y="connsiteY1"/>
+                </a:cxn>
+                <a:cxn ang="0">
+                  <a:pos x="connsiteX2" y="connsiteY2"/>
+                </a:cxn>
+                <a:cxn ang="0">
+                  <a:pos x="connsiteX3" y="connsiteY3"/>
+                </a:cxn>
+                <a:cxn ang="0">
+                  <a:pos x="connsiteX4" y="connsiteY4"/>
+                </a:cxn>
+                <a:cxn ang="0">
+                  <a:pos x="connsiteX5" y="connsiteY5"/>
+                </a:cxn>
+                <a:cxn ang="0">
+                  <a:pos x="connsiteX6" y="connsiteY6"/>
+                </a:cxn>
+                <a:cxn ang="0">
+                  <a:pos x="connsiteX7" y="connsiteY7"/>
+                </a:cxn>
+                <a:cxn ang="0">
+                  <a:pos x="connsiteX8" y="connsiteY8"/>
+                </a:cxn>
+                <a:cxn ang="0">
+                  <a:pos x="connsiteX9" y="connsiteY9"/>
+                </a:cxn>
+                <a:cxn ang="0">
+                  <a:pos x="connsiteX10" y="connsiteY10"/>
+                </a:cxn>
+                <a:cxn ang="0">
+                  <a:pos x="connsiteX11" y="connsiteY11"/>
+                </a:cxn>
+                <a:cxn ang="0">
+                  <a:pos x="connsiteX12" y="connsiteY12"/>
+                </a:cxn>
+                <a:cxn ang="0">
+                  <a:pos x="connsiteX13" y="connsiteY13"/>
+                </a:cxn>
+                <a:cxn ang="0">
+                  <a:pos x="connsiteX14" y="connsiteY14"/>
+                </a:cxn>
+                <a:cxn ang="0">
+                  <a:pos x="connsiteX15" y="connsiteY15"/>
+                </a:cxn>
+                <a:cxn ang="0">
+                  <a:pos x="connsiteX16" y="connsiteY16"/>
+                </a:cxn>
+                <a:cxn ang="0">
+                  <a:pos x="connsiteX17" y="connsiteY17"/>
+                </a:cxn>
+                <a:cxn ang="0">
+                  <a:pos x="connsiteX18" y="connsiteY18"/>
+                </a:cxn>
+                <a:cxn ang="0">
+                  <a:pos x="connsiteX19" y="connsiteY19"/>
+                </a:cxn>
+                <a:cxn ang="0">
+                  <a:pos x="connsiteX20" y="connsiteY20"/>
+                </a:cxn>
+              </a:cxnLst>
+              <a:rect l="l" t="t" r="r" b="b"/>
+              <a:pathLst>
+                <a:path w="432000" h="425750">
+                  <a:moveTo>
+                    <a:pt x="0" y="0"/>
+                  </a:moveTo>
+                  <a:lnTo>
+                    <a:pt x="57344" y="0"/>
+                  </a:lnTo>
+                  <a:lnTo>
+                    <a:pt x="57344" y="287125"/>
+                  </a:lnTo>
+                  <a:lnTo>
+                    <a:pt x="58212" y="287125"/>
+                  </a:lnTo>
+                  <a:lnTo>
+                    <a:pt x="123012" y="351925"/>
+                  </a:lnTo>
+                  <a:lnTo>
+                    <a:pt x="187812" y="287125"/>
+                  </a:lnTo>
+                  <a:lnTo>
+                    <a:pt x="186944" y="286257"/>
+                  </a:lnTo>
+                  <a:lnTo>
+                    <a:pt x="186944" y="0"/>
+                  </a:lnTo>
+                  <a:lnTo>
+                    <a:pt x="244544" y="0"/>
+                  </a:lnTo>
+                  <a:lnTo>
+                    <a:pt x="244544" y="287125"/>
+                  </a:lnTo>
+                  <a:lnTo>
+                    <a:pt x="245412" y="287125"/>
+                  </a:lnTo>
+                  <a:lnTo>
+                    <a:pt x="310212" y="351925"/>
+                  </a:lnTo>
+                  <a:lnTo>
+                    <a:pt x="375012" y="287125"/>
+                  </a:lnTo>
+                  <a:lnTo>
+                    <a:pt x="374144" y="286257"/>
+                  </a:lnTo>
+                  <a:lnTo>
+                    <a:pt x="374144" y="0"/>
+                  </a:lnTo>
+                  <a:lnTo>
+                    <a:pt x="432000" y="0"/>
+                  </a:lnTo>
+                  <a:lnTo>
+                    <a:pt x="432000" y="305050"/>
+                  </a:lnTo>
+                  <a:lnTo>
+                    <a:pt x="311300" y="425750"/>
+                  </a:lnTo>
+                  <a:lnTo>
+                    <a:pt x="216000" y="330450"/>
+                  </a:lnTo>
+                  <a:lnTo>
+                    <a:pt x="120700" y="425750"/>
+                  </a:lnTo>
+                  <a:lnTo>
+                    <a:pt x="0" y="305050"/>
+                  </a:lnTo>
+                  <a:close/>
+                </a:path>
+              </a:pathLst>
+            </a:custGeom>
+            <a:solidFill>
+              <a:schemeClr val="bg1"/>
+            </a:solidFill>
+            <a:ln>
+              <a:noFill/>
+            </a:ln>
+          </p:spPr>
+          <p:style>
+            <a:lnRef idx="2">
+              <a:schemeClr val="accent1">
+                <a:shade val="15000"/>
+              </a:schemeClr>
+            </a:lnRef>
+            <a:fillRef idx="1">
+              <a:schemeClr val="accent1"/>
+            </a:fillRef>
+            <a:effectRef idx="0">
+              <a:schemeClr val="accent1"/>
+            </a:effectRef>
+            <a:fontRef idx="minor">
+              <a:schemeClr val="lt1"/>
+            </a:fontRef>
+          </p:style>
+          <p:txBody>
+            <a:bodyPr wrap="square" rtlCol="0" anchor="ctr">
+              <a:noAutofit/>
+            </a:bodyPr>
+            <a:lstStyle/>
+            <a:p>
+              <a:pPr algn="ctr"/>
+              <a:endParaRPr lang="ko-KR" altLang="en-US"/>
+            </a:p>
+          </p:txBody>
+        </p:sp>
+      </p:grpSp>
+      <p:grpSp>
+        <p:nvGrpSpPr>
+          <p:cNvPr id="226" name="그룹 225">
+            <a:extLst>
+              <a:ext uri="{FF2B5EF4-FFF2-40B4-BE49-F238E27FC236}">
+                <a16:creationId xmlns:a16="http://schemas.microsoft.com/office/drawing/2014/main" id="{B657F46F-7783-F20C-08B2-C75779B2042D}"/>
+              </a:ext>
+            </a:extLst>
+          </p:cNvPr>
+          <p:cNvGrpSpPr/>
+          <p:nvPr/>
+        </p:nvGrpSpPr>
+        <p:grpSpPr>
+          <a:xfrm>
+            <a:off x="6157708" y="2281857"/>
+            <a:ext cx="1440000" cy="1440000"/>
+            <a:chOff x="207993" y="276330"/>
+            <a:chExt cx="1440000" cy="1440000"/>
+          </a:xfrm>
+        </p:grpSpPr>
+        <p:sp>
+          <p:nvSpPr>
+            <p:cNvPr id="73" name="직사각형 72">
+              <a:extLst>
+                <a:ext uri="{FF2B5EF4-FFF2-40B4-BE49-F238E27FC236}">
+                  <a16:creationId xmlns:a16="http://schemas.microsoft.com/office/drawing/2014/main" id="{81856FF4-C5B3-A069-A993-FFBC23CB1B3E}"/>
+                </a:ext>
+              </a:extLst>
+            </p:cNvPr>
+            <p:cNvSpPr/>
+            <p:nvPr/>
+          </p:nvSpPr>
+          <p:spPr>
+            <a:xfrm>
+              <a:off x="207993" y="276330"/>
+              <a:ext cx="1440000" cy="1440000"/>
+            </a:xfrm>
+            <a:prstGeom prst="rect">
+              <a:avLst/>
+            </a:prstGeom>
+            <a:noFill/>
+            <a:ln>
+              <a:noFill/>
+            </a:ln>
+          </p:spPr>
+          <p:style>
+            <a:lnRef idx="2">
+              <a:schemeClr val="accent1">
+                <a:shade val="15000"/>
+              </a:schemeClr>
+            </a:lnRef>
+            <a:fillRef idx="1">
+              <a:schemeClr val="accent1"/>
+            </a:fillRef>
+            <a:effectRef idx="0">
+              <a:schemeClr val="accent1"/>
+            </a:effectRef>
+            <a:fontRef idx="minor">
+              <a:schemeClr val="lt1"/>
+            </a:fontRef>
+          </p:style>
+          <p:txBody>
+            <a:bodyPr wrap="square" rtlCol="0" anchor="ctr">
+              <a:noAutofit/>
+            </a:bodyPr>
+            <a:lstStyle/>
+            <a:p>
+              <a:pPr algn="ctr"/>
+              <a:endParaRPr lang="ko-KR" altLang="en-US" dirty="0"/>
+            </a:p>
+          </p:txBody>
+        </p:sp>
+        <p:sp>
+          <p:nvSpPr>
+            <p:cNvPr id="137" name="자유형: 도형 136">
+              <a:extLst>
+                <a:ext uri="{FF2B5EF4-FFF2-40B4-BE49-F238E27FC236}">
+                  <a16:creationId xmlns:a16="http://schemas.microsoft.com/office/drawing/2014/main" id="{D184232D-4925-1093-B2D5-98AE3CB3319B}"/>
+                </a:ext>
+              </a:extLst>
+            </p:cNvPr>
+            <p:cNvSpPr/>
+            <p:nvPr/>
+          </p:nvSpPr>
+          <p:spPr>
+            <a:xfrm>
+              <a:off x="523035" y="363729"/>
+              <a:ext cx="458959" cy="594000"/>
+            </a:xfrm>
+            <a:custGeom>
+              <a:avLst/>
+              <a:gdLst>
+                <a:gd name="connsiteX0" fmla="*/ 234000 w 458959"/>
+                <a:gd name="connsiteY0" fmla="*/ 0 h 594000"/>
+                <a:gd name="connsiteX1" fmla="*/ 458959 w 458959"/>
+                <a:gd name="connsiteY1" fmla="*/ 0 h 594000"/>
+                <a:gd name="connsiteX2" fmla="*/ 458959 w 458959"/>
+                <a:gd name="connsiteY2" fmla="*/ 594000 h 594000"/>
+                <a:gd name="connsiteX3" fmla="*/ 404959 w 458959"/>
+                <a:gd name="connsiteY3" fmla="*/ 594000 h 594000"/>
+                <a:gd name="connsiteX4" fmla="*/ 404959 w 458959"/>
+                <a:gd name="connsiteY4" fmla="*/ 292478 h 594000"/>
+                <a:gd name="connsiteX5" fmla="*/ 346481 w 458959"/>
+                <a:gd name="connsiteY5" fmla="*/ 234000 h 594000"/>
+                <a:gd name="connsiteX6" fmla="*/ 0 w 458959"/>
+                <a:gd name="connsiteY6" fmla="*/ 234000 h 594000"/>
+              </a:gdLst>
+              <a:ahLst/>
+              <a:cxnLst>
+                <a:cxn ang="0">
+                  <a:pos x="connsiteX0" y="connsiteY0"/>
+                </a:cxn>
+                <a:cxn ang="0">
+                  <a:pos x="connsiteX1" y="connsiteY1"/>
+                </a:cxn>
+                <a:cxn ang="0">
+                  <a:pos x="connsiteX2" y="connsiteY2"/>
+                </a:cxn>
+                <a:cxn ang="0">
+                  <a:pos x="connsiteX3" y="connsiteY3"/>
+                </a:cxn>
+                <a:cxn ang="0">
+                  <a:pos x="connsiteX4" y="connsiteY4"/>
+                </a:cxn>
+                <a:cxn ang="0">
+                  <a:pos x="connsiteX5" y="connsiteY5"/>
+                </a:cxn>
+                <a:cxn ang="0">
+                  <a:pos x="connsiteX6" y="connsiteY6"/>
+                </a:cxn>
+              </a:cxnLst>
+              <a:rect l="l" t="t" r="r" b="b"/>
+              <a:pathLst>
+                <a:path w="458959" h="594000">
+                  <a:moveTo>
+                    <a:pt x="234000" y="0"/>
+                  </a:moveTo>
+                  <a:lnTo>
+                    <a:pt x="458959" y="0"/>
+                  </a:lnTo>
+                  <a:lnTo>
+                    <a:pt x="458959" y="594000"/>
+                  </a:lnTo>
+                  <a:lnTo>
+                    <a:pt x="404959" y="594000"/>
+                  </a:lnTo>
+                  <a:lnTo>
+                    <a:pt x="404959" y="292478"/>
+                  </a:lnTo>
+                  <a:lnTo>
+                    <a:pt x="346481" y="234000"/>
+                  </a:lnTo>
+                  <a:lnTo>
+                    <a:pt x="0" y="234000"/>
+                  </a:lnTo>
+                  <a:close/>
+                </a:path>
+              </a:pathLst>
+            </a:custGeom>
+            <a:solidFill>
+              <a:srgbClr val="ED6C47"/>
+            </a:solidFill>
+            <a:ln>
+              <a:noFill/>
+            </a:ln>
+          </p:spPr>
+          <p:style>
+            <a:lnRef idx="2">
+              <a:schemeClr val="accent1">
+                <a:shade val="15000"/>
+              </a:schemeClr>
+            </a:lnRef>
+            <a:fillRef idx="1">
+              <a:schemeClr val="accent1"/>
+            </a:fillRef>
+            <a:effectRef idx="0">
+              <a:schemeClr val="accent1"/>
+            </a:effectRef>
+            <a:fontRef idx="minor">
+              <a:schemeClr val="lt1"/>
+            </a:fontRef>
+          </p:style>
+          <p:txBody>
+            <a:bodyPr wrap="square" rtlCol="0" anchor="ctr">
+              <a:noAutofit/>
+            </a:bodyPr>
+            <a:lstStyle/>
+            <a:p>
+              <a:pPr algn="ctr"/>
+              <a:endParaRPr lang="ko-KR" altLang="en-US"/>
+            </a:p>
+          </p:txBody>
+        </p:sp>
+        <p:sp>
+          <p:nvSpPr>
+            <p:cNvPr id="130" name="자유형: 도형 129">
+              <a:extLst>
+                <a:ext uri="{FF2B5EF4-FFF2-40B4-BE49-F238E27FC236}">
+                  <a16:creationId xmlns:a16="http://schemas.microsoft.com/office/drawing/2014/main" id="{865A25A2-0173-C022-2C9F-85369205080C}"/>
+                </a:ext>
+              </a:extLst>
+            </p:cNvPr>
+            <p:cNvSpPr/>
+            <p:nvPr/>
+          </p:nvSpPr>
+          <p:spPr>
+            <a:xfrm>
+              <a:off x="1053993" y="363729"/>
+              <a:ext cx="594000" cy="594000"/>
+            </a:xfrm>
+            <a:custGeom>
+              <a:avLst/>
+              <a:gdLst>
+                <a:gd name="connsiteX0" fmla="*/ 0 w 594000"/>
+                <a:gd name="connsiteY0" fmla="*/ 0 h 594000"/>
+                <a:gd name="connsiteX1" fmla="*/ 224959 w 594000"/>
+                <a:gd name="connsiteY1" fmla="*/ 0 h 594000"/>
+                <a:gd name="connsiteX2" fmla="*/ 594000 w 594000"/>
+                <a:gd name="connsiteY2" fmla="*/ 369041 h 594000"/>
+                <a:gd name="connsiteX3" fmla="*/ 594000 w 594000"/>
+                <a:gd name="connsiteY3" fmla="*/ 594000 h 594000"/>
+                <a:gd name="connsiteX4" fmla="*/ 0 w 594000"/>
+                <a:gd name="connsiteY4" fmla="*/ 594000 h 594000"/>
+                <a:gd name="connsiteX5" fmla="*/ 0 w 594000"/>
+                <a:gd name="connsiteY5" fmla="*/ 0 h 594000"/>
+              </a:gdLst>
+              <a:ahLst/>
+              <a:cxnLst>
+                <a:cxn ang="0">
+                  <a:pos x="connsiteX0" y="connsiteY0"/>
+                </a:cxn>
+                <a:cxn ang="0">
+                  <a:pos x="connsiteX1" y="connsiteY1"/>
+                </a:cxn>
+                <a:cxn ang="0">
+                  <a:pos x="connsiteX2" y="connsiteY2"/>
+                </a:cxn>
+                <a:cxn ang="0">
+                  <a:pos x="connsiteX3" y="connsiteY3"/>
+                </a:cxn>
+                <a:cxn ang="0">
+                  <a:pos x="connsiteX4" y="connsiteY4"/>
+                </a:cxn>
+                <a:cxn ang="0">
+                  <a:pos x="connsiteX5" y="connsiteY5"/>
+                </a:cxn>
+              </a:cxnLst>
+              <a:rect l="l" t="t" r="r" b="b"/>
+              <a:pathLst>
+                <a:path w="594000" h="594000">
+                  <a:moveTo>
+                    <a:pt x="0" y="0"/>
+                  </a:moveTo>
+                  <a:lnTo>
+                    <a:pt x="224959" y="0"/>
+                  </a:lnTo>
+                  <a:lnTo>
+                    <a:pt x="594000" y="369041"/>
+                  </a:lnTo>
+                  <a:lnTo>
+                    <a:pt x="594000" y="594000"/>
+                  </a:lnTo>
+                  <a:lnTo>
+                    <a:pt x="0" y="594000"/>
+                  </a:lnTo>
+                  <a:lnTo>
+                    <a:pt x="0" y="0"/>
+                  </a:lnTo>
+                  <a:close/>
+                </a:path>
+              </a:pathLst>
+            </a:custGeom>
+            <a:solidFill>
+              <a:srgbClr val="FF8F6B"/>
+            </a:solidFill>
+            <a:ln>
+              <a:noFill/>
+            </a:ln>
+          </p:spPr>
+          <p:style>
+            <a:lnRef idx="2">
+              <a:schemeClr val="accent1">
+                <a:shade val="15000"/>
+              </a:schemeClr>
+            </a:lnRef>
+            <a:fillRef idx="1">
+              <a:schemeClr val="accent1"/>
+            </a:fillRef>
+            <a:effectRef idx="0">
+              <a:schemeClr val="accent1"/>
+            </a:effectRef>
+            <a:fontRef idx="minor">
+              <a:schemeClr val="lt1"/>
+            </a:fontRef>
+          </p:style>
+          <p:txBody>
+            <a:bodyPr wrap="square" rtlCol="0" anchor="ctr">
+              <a:noAutofit/>
+            </a:bodyPr>
+            <a:lstStyle/>
+            <a:p>
+              <a:pPr algn="ctr"/>
+              <a:endParaRPr lang="ko-KR" altLang="en-US"/>
+            </a:p>
+          </p:txBody>
+        </p:sp>
+        <p:sp>
+          <p:nvSpPr>
+            <p:cNvPr id="138" name="자유형: 도형 137">
+              <a:extLst>
+                <a:ext uri="{FF2B5EF4-FFF2-40B4-BE49-F238E27FC236}">
+                  <a16:creationId xmlns:a16="http://schemas.microsoft.com/office/drawing/2014/main" id="{945C04E0-4329-C3B6-C7FF-6993FAD8DFBA}"/>
+                </a:ext>
+              </a:extLst>
+            </p:cNvPr>
+            <p:cNvSpPr/>
+            <p:nvPr/>
+          </p:nvSpPr>
+          <p:spPr>
+            <a:xfrm>
+              <a:off x="523035" y="1029729"/>
+              <a:ext cx="458959" cy="594000"/>
+            </a:xfrm>
+            <a:custGeom>
+              <a:avLst/>
+              <a:gdLst>
+                <a:gd name="connsiteX0" fmla="*/ 404959 w 458959"/>
+                <a:gd name="connsiteY0" fmla="*/ 0 h 594000"/>
+                <a:gd name="connsiteX1" fmla="*/ 458959 w 458959"/>
+                <a:gd name="connsiteY1" fmla="*/ 0 h 594000"/>
+                <a:gd name="connsiteX2" fmla="*/ 458959 w 458959"/>
+                <a:gd name="connsiteY2" fmla="*/ 594000 h 594000"/>
+                <a:gd name="connsiteX3" fmla="*/ 234000 w 458959"/>
+                <a:gd name="connsiteY3" fmla="*/ 594000 h 594000"/>
+                <a:gd name="connsiteX4" fmla="*/ 0 w 458959"/>
+                <a:gd name="connsiteY4" fmla="*/ 360000 h 594000"/>
+                <a:gd name="connsiteX5" fmla="*/ 346481 w 458959"/>
+                <a:gd name="connsiteY5" fmla="*/ 360000 h 594000"/>
+                <a:gd name="connsiteX6" fmla="*/ 404959 w 458959"/>
+                <a:gd name="connsiteY6" fmla="*/ 301522 h 594000"/>
+              </a:gdLst>
+              <a:ahLst/>
+              <a:cxnLst>
+                <a:cxn ang="0">
+                  <a:pos x="connsiteX0" y="connsiteY0"/>
+                </a:cxn>
+                <a:cxn ang="0">
+                  <a:pos x="connsiteX1" y="connsiteY1"/>
+                </a:cxn>
+                <a:cxn ang="0">
+                  <a:pos x="connsiteX2" y="connsiteY2"/>
+                </a:cxn>
+                <a:cxn ang="0">
+                  <a:pos x="connsiteX3" y="connsiteY3"/>
+                </a:cxn>
+                <a:cxn ang="0">
+                  <a:pos x="connsiteX4" y="connsiteY4"/>
+                </a:cxn>
+                <a:cxn ang="0">
+                  <a:pos x="connsiteX5" y="connsiteY5"/>
+                </a:cxn>
+                <a:cxn ang="0">
+                  <a:pos x="connsiteX6" y="connsiteY6"/>
+                </a:cxn>
+              </a:cxnLst>
+              <a:rect l="l" t="t" r="r" b="b"/>
+              <a:pathLst>
+                <a:path w="458959" h="594000">
+                  <a:moveTo>
+                    <a:pt x="404959" y="0"/>
+                  </a:moveTo>
+                  <a:lnTo>
+                    <a:pt x="458959" y="0"/>
+                  </a:lnTo>
+                  <a:lnTo>
+                    <a:pt x="458959" y="594000"/>
+                  </a:lnTo>
+                  <a:lnTo>
+                    <a:pt x="234000" y="594000"/>
+                  </a:lnTo>
+                  <a:lnTo>
+                    <a:pt x="0" y="360000"/>
+                  </a:lnTo>
+                  <a:lnTo>
+                    <a:pt x="346481" y="360000"/>
+                  </a:lnTo>
+                  <a:lnTo>
+                    <a:pt x="404959" y="301522"/>
+                  </a:lnTo>
+                  <a:close/>
+                </a:path>
+              </a:pathLst>
+            </a:custGeom>
+            <a:solidFill>
+              <a:srgbClr val="D25230"/>
+            </a:solidFill>
+            <a:ln>
+              <a:noFill/>
+            </a:ln>
+          </p:spPr>
+          <p:style>
+            <a:lnRef idx="2">
+              <a:schemeClr val="accent1">
+                <a:shade val="15000"/>
+              </a:schemeClr>
+            </a:lnRef>
+            <a:fillRef idx="1">
+              <a:schemeClr val="accent1"/>
+            </a:fillRef>
+            <a:effectRef idx="0">
+              <a:schemeClr val="accent1"/>
+            </a:effectRef>
+            <a:fontRef idx="minor">
+              <a:schemeClr val="lt1"/>
+            </a:fontRef>
+          </p:style>
+          <p:txBody>
+            <a:bodyPr wrap="square" rtlCol="0" anchor="ctr">
+              <a:noAutofit/>
+            </a:bodyPr>
+            <a:lstStyle/>
+            <a:p>
+              <a:pPr algn="ctr"/>
+              <a:endParaRPr lang="ko-KR" altLang="en-US"/>
+            </a:p>
+          </p:txBody>
+        </p:sp>
+        <p:sp>
+          <p:nvSpPr>
+            <p:cNvPr id="127" name="자유형: 도형 126">
+              <a:extLst>
+                <a:ext uri="{FF2B5EF4-FFF2-40B4-BE49-F238E27FC236}">
+                  <a16:creationId xmlns:a16="http://schemas.microsoft.com/office/drawing/2014/main" id="{9793C8ED-0B01-ED6A-A09D-91CCD65B7144}"/>
+                </a:ext>
+              </a:extLst>
+            </p:cNvPr>
+            <p:cNvSpPr/>
+            <p:nvPr/>
+          </p:nvSpPr>
+          <p:spPr>
+            <a:xfrm>
+              <a:off x="1053993" y="1029729"/>
+              <a:ext cx="594000" cy="594000"/>
+            </a:xfrm>
+            <a:custGeom>
+              <a:avLst/>
+              <a:gdLst>
+                <a:gd name="connsiteX0" fmla="*/ 0 w 594000"/>
+                <a:gd name="connsiteY0" fmla="*/ 0 h 594000"/>
+                <a:gd name="connsiteX1" fmla="*/ 594000 w 594000"/>
+                <a:gd name="connsiteY1" fmla="*/ 0 h 594000"/>
+                <a:gd name="connsiteX2" fmla="*/ 594000 w 594000"/>
+                <a:gd name="connsiteY2" fmla="*/ 224959 h 594000"/>
+                <a:gd name="connsiteX3" fmla="*/ 224959 w 594000"/>
+                <a:gd name="connsiteY3" fmla="*/ 594000 h 594000"/>
+                <a:gd name="connsiteX4" fmla="*/ 0 w 594000"/>
+                <a:gd name="connsiteY4" fmla="*/ 594000 h 594000"/>
+                <a:gd name="connsiteX5" fmla="*/ 0 w 594000"/>
+                <a:gd name="connsiteY5" fmla="*/ 0 h 594000"/>
+              </a:gdLst>
+              <a:ahLst/>
+              <a:cxnLst>
+                <a:cxn ang="0">
+                  <a:pos x="connsiteX0" y="connsiteY0"/>
+                </a:cxn>
+                <a:cxn ang="0">
+                  <a:pos x="connsiteX1" y="connsiteY1"/>
+                </a:cxn>
+                <a:cxn ang="0">
+                  <a:pos x="connsiteX2" y="connsiteY2"/>
+                </a:cxn>
+                <a:cxn ang="0">
+                  <a:pos x="connsiteX3" y="connsiteY3"/>
+                </a:cxn>
+                <a:cxn ang="0">
+                  <a:pos x="connsiteX4" y="connsiteY4"/>
+                </a:cxn>
+                <a:cxn ang="0">
+                  <a:pos x="connsiteX5" y="connsiteY5"/>
+                </a:cxn>
+              </a:cxnLst>
+              <a:rect l="l" t="t" r="r" b="b"/>
+              <a:pathLst>
+                <a:path w="594000" h="594000">
+                  <a:moveTo>
+                    <a:pt x="0" y="0"/>
+                  </a:moveTo>
+                  <a:lnTo>
+                    <a:pt x="594000" y="0"/>
+                  </a:lnTo>
+                  <a:lnTo>
+                    <a:pt x="594000" y="224959"/>
+                  </a:lnTo>
+                  <a:lnTo>
+                    <a:pt x="224959" y="594000"/>
+                  </a:lnTo>
+                  <a:lnTo>
+                    <a:pt x="0" y="594000"/>
+                  </a:lnTo>
+                  <a:lnTo>
+                    <a:pt x="0" y="0"/>
+                  </a:lnTo>
+                  <a:close/>
+                </a:path>
+              </a:pathLst>
+            </a:custGeom>
+            <a:solidFill>
+              <a:srgbClr val="D35230"/>
+            </a:solidFill>
+            <a:ln>
+              <a:noFill/>
+            </a:ln>
+          </p:spPr>
+          <p:style>
+            <a:lnRef idx="2">
+              <a:schemeClr val="accent1">
+                <a:shade val="15000"/>
+              </a:schemeClr>
+            </a:lnRef>
+            <a:fillRef idx="1">
+              <a:schemeClr val="accent1"/>
+            </a:fillRef>
+            <a:effectRef idx="0">
+              <a:schemeClr val="accent1"/>
+            </a:effectRef>
+            <a:fontRef idx="minor">
+              <a:schemeClr val="lt1"/>
+            </a:fontRef>
+          </p:style>
+          <p:txBody>
+            <a:bodyPr wrap="square" rtlCol="0" anchor="ctr">
+              <a:noAutofit/>
+            </a:bodyPr>
+            <a:lstStyle/>
+            <a:p>
+              <a:pPr algn="ctr"/>
+              <a:endParaRPr lang="ko-KR" altLang="en-US"/>
+            </a:p>
+          </p:txBody>
+        </p:sp>
+        <p:sp>
+          <p:nvSpPr>
+            <p:cNvPr id="122" name="팔각형 121">
+              <a:extLst>
+                <a:ext uri="{FF2B5EF4-FFF2-40B4-BE49-F238E27FC236}">
+                  <a16:creationId xmlns:a16="http://schemas.microsoft.com/office/drawing/2014/main" id="{C5D37BEC-2AF4-2C92-760E-F998F0A85E60}"/>
+                </a:ext>
+              </a:extLst>
+            </p:cNvPr>
+            <p:cNvSpPr/>
+            <p:nvPr/>
+          </p:nvSpPr>
+          <p:spPr>
+            <a:xfrm>
+              <a:off x="207993" y="667956"/>
+              <a:ext cx="648000" cy="648000"/>
+            </a:xfrm>
+            <a:prstGeom prst="octagon">
+              <a:avLst>
+                <a:gd name="adj" fmla="val 8122"/>
+              </a:avLst>
+            </a:prstGeom>
+            <a:solidFill>
+              <a:srgbClr val="C74622"/>
+            </a:solidFill>
+            <a:ln>
+              <a:noFill/>
+            </a:ln>
+          </p:spPr>
+          <p:style>
+            <a:lnRef idx="2">
+              <a:schemeClr val="accent1">
+                <a:shade val="15000"/>
+              </a:schemeClr>
+            </a:lnRef>
+            <a:fillRef idx="1">
+              <a:schemeClr val="accent1"/>
+            </a:fillRef>
+            <a:effectRef idx="0">
+              <a:schemeClr val="accent1"/>
+            </a:effectRef>
+            <a:fontRef idx="minor">
+              <a:schemeClr val="lt1"/>
+            </a:fontRef>
+          </p:style>
+          <p:txBody>
+            <a:bodyPr rtlCol="0" anchor="ctr"/>
+            <a:lstStyle/>
+            <a:p>
+              <a:pPr algn="ctr"/>
+              <a:endParaRPr lang="ko-KR" altLang="en-US" sz="4000" b="1" dirty="0"/>
+            </a:p>
+          </p:txBody>
+        </p:sp>
+        <p:sp>
+          <p:nvSpPr>
+            <p:cNvPr id="165" name="직사각형 164">
+              <a:extLst>
+                <a:ext uri="{FF2B5EF4-FFF2-40B4-BE49-F238E27FC236}">
+                  <a16:creationId xmlns:a16="http://schemas.microsoft.com/office/drawing/2014/main" id="{3E6E90E9-C74B-0F3B-D436-6DAC02754D91}"/>
+                </a:ext>
+              </a:extLst>
+            </p:cNvPr>
+            <p:cNvSpPr/>
+            <p:nvPr/>
+          </p:nvSpPr>
+          <p:spPr>
+            <a:xfrm>
+              <a:off x="369993" y="775956"/>
+              <a:ext cx="56745" cy="432000"/>
+            </a:xfrm>
+            <a:prstGeom prst="rect">
+              <a:avLst/>
+            </a:prstGeom>
+            <a:solidFill>
+              <a:schemeClr val="bg1"/>
+            </a:solidFill>
+            <a:ln>
+              <a:noFill/>
+            </a:ln>
+          </p:spPr>
+          <p:style>
+            <a:lnRef idx="2">
+              <a:schemeClr val="accent1">
+                <a:shade val="15000"/>
+              </a:schemeClr>
+            </a:lnRef>
+            <a:fillRef idx="1">
+              <a:schemeClr val="accent1"/>
+            </a:fillRef>
+            <a:effectRef idx="0">
+              <a:schemeClr val="accent1"/>
+            </a:effectRef>
+            <a:fontRef idx="minor">
+              <a:schemeClr val="lt1"/>
+            </a:fontRef>
+          </p:style>
+          <p:txBody>
+            <a:bodyPr wrap="square" rtlCol="0" anchor="ctr">
+              <a:noAutofit/>
+            </a:bodyPr>
+            <a:lstStyle/>
+            <a:p>
+              <a:pPr algn="ctr"/>
+              <a:endParaRPr lang="ko-KR" altLang="en-US"/>
+            </a:p>
+          </p:txBody>
+        </p:sp>
+        <p:sp>
+          <p:nvSpPr>
+            <p:cNvPr id="180" name="자유형: 도형 179">
+              <a:extLst>
+                <a:ext uri="{FF2B5EF4-FFF2-40B4-BE49-F238E27FC236}">
+                  <a16:creationId xmlns:a16="http://schemas.microsoft.com/office/drawing/2014/main" id="{F7D6284D-A8BD-62F9-EBC6-3D5E69A06B86}"/>
+                </a:ext>
+              </a:extLst>
+            </p:cNvPr>
+            <p:cNvSpPr/>
+            <p:nvPr/>
+          </p:nvSpPr>
+          <p:spPr>
+            <a:xfrm>
+              <a:off x="369993" y="775956"/>
+              <a:ext cx="324000" cy="260404"/>
+            </a:xfrm>
+            <a:custGeom>
+              <a:avLst/>
+              <a:gdLst>
+                <a:gd name="connsiteX0" fmla="*/ 0 w 324000"/>
+                <a:gd name="connsiteY0" fmla="*/ 0 h 260404"/>
+                <a:gd name="connsiteX1" fmla="*/ 247730 w 324000"/>
+                <a:gd name="connsiteY1" fmla="*/ 0 h 260404"/>
+                <a:gd name="connsiteX2" fmla="*/ 324000 w 324000"/>
+                <a:gd name="connsiteY2" fmla="*/ 76270 h 260404"/>
+                <a:gd name="connsiteX3" fmla="*/ 324000 w 324000"/>
+                <a:gd name="connsiteY3" fmla="*/ 184134 h 260404"/>
+                <a:gd name="connsiteX4" fmla="*/ 247730 w 324000"/>
+                <a:gd name="connsiteY4" fmla="*/ 260404 h 260404"/>
+                <a:gd name="connsiteX5" fmla="*/ 0 w 324000"/>
+                <a:gd name="connsiteY5" fmla="*/ 260404 h 260404"/>
+                <a:gd name="connsiteX6" fmla="*/ 0 w 324000"/>
+                <a:gd name="connsiteY6" fmla="*/ 209546 h 260404"/>
+                <a:gd name="connsiteX7" fmla="*/ 225373 w 324000"/>
+                <a:gd name="connsiteY7" fmla="*/ 209546 h 260404"/>
+                <a:gd name="connsiteX8" fmla="*/ 271851 w 324000"/>
+                <a:gd name="connsiteY8" fmla="*/ 163068 h 260404"/>
+                <a:gd name="connsiteX9" fmla="*/ 271851 w 324000"/>
+                <a:gd name="connsiteY9" fmla="*/ 97336 h 260404"/>
+                <a:gd name="connsiteX10" fmla="*/ 225373 w 324000"/>
+                <a:gd name="connsiteY10" fmla="*/ 50858 h 260404"/>
+                <a:gd name="connsiteX11" fmla="*/ 0 w 324000"/>
+                <a:gd name="connsiteY11" fmla="*/ 50858 h 260404"/>
+              </a:gdLst>
+              <a:ahLst/>
+              <a:cxnLst>
+                <a:cxn ang="0">
+                  <a:pos x="connsiteX0" y="connsiteY0"/>
+                </a:cxn>
+                <a:cxn ang="0">
+                  <a:pos x="connsiteX1" y="connsiteY1"/>
+                </a:cxn>
+                <a:cxn ang="0">
+                  <a:pos x="connsiteX2" y="connsiteY2"/>
+                </a:cxn>
+                <a:cxn ang="0">
+                  <a:pos x="connsiteX3" y="connsiteY3"/>
+                </a:cxn>
+                <a:cxn ang="0">
+                  <a:pos x="connsiteX4" y="connsiteY4"/>
+                </a:cxn>
+                <a:cxn ang="0">
+                  <a:pos x="connsiteX5" y="connsiteY5"/>
+                </a:cxn>
+                <a:cxn ang="0">
+                  <a:pos x="connsiteX6" y="connsiteY6"/>
+                </a:cxn>
+                <a:cxn ang="0">
+                  <a:pos x="connsiteX7" y="connsiteY7"/>
+                </a:cxn>
+                <a:cxn ang="0">
+                  <a:pos x="connsiteX8" y="connsiteY8"/>
+                </a:cxn>
+                <a:cxn ang="0">
+                  <a:pos x="connsiteX9" y="connsiteY9"/>
+                </a:cxn>
+                <a:cxn ang="0">
+                  <a:pos x="connsiteX10" y="connsiteY10"/>
+                </a:cxn>
+                <a:cxn ang="0">
+                  <a:pos x="connsiteX11" y="connsiteY11"/>
+                </a:cxn>
+              </a:cxnLst>
+              <a:rect l="l" t="t" r="r" b="b"/>
+              <a:pathLst>
+                <a:path w="324000" h="260404">
+                  <a:moveTo>
+                    <a:pt x="0" y="0"/>
+                  </a:moveTo>
+                  <a:lnTo>
+                    <a:pt x="247730" y="0"/>
+                  </a:lnTo>
+                  <a:lnTo>
+                    <a:pt x="324000" y="76270"/>
+                  </a:lnTo>
+                  <a:lnTo>
+                    <a:pt x="324000" y="184134"/>
+                  </a:lnTo>
+                  <a:lnTo>
+                    <a:pt x="247730" y="260404"/>
+                  </a:lnTo>
+                  <a:lnTo>
+                    <a:pt x="0" y="260404"/>
+                  </a:lnTo>
+                  <a:lnTo>
+                    <a:pt x="0" y="209546"/>
+                  </a:lnTo>
+                  <a:lnTo>
+                    <a:pt x="225373" y="209546"/>
+                  </a:lnTo>
+                  <a:lnTo>
+                    <a:pt x="271851" y="163068"/>
+                  </a:lnTo>
+                  <a:lnTo>
+                    <a:pt x="271851" y="97336"/>
+                  </a:lnTo>
+                  <a:lnTo>
+                    <a:pt x="225373" y="50858"/>
+                  </a:lnTo>
+                  <a:lnTo>
+                    <a:pt x="0" y="50858"/>
+                  </a:lnTo>
+                  <a:close/>
+                </a:path>
+              </a:pathLst>
+            </a:custGeom>
+            <a:solidFill>
+              <a:schemeClr val="bg1"/>
+            </a:solidFill>
+            <a:ln>
+              <a:noFill/>
+            </a:ln>
+          </p:spPr>
+          <p:style>
+            <a:lnRef idx="2">
+              <a:schemeClr val="accent1">
+                <a:shade val="15000"/>
+              </a:schemeClr>
+            </a:lnRef>
+            <a:fillRef idx="1">
+              <a:schemeClr val="accent1"/>
+            </a:fillRef>
+            <a:effectRef idx="0">
+              <a:schemeClr val="accent1"/>
+            </a:effectRef>
+            <a:fontRef idx="minor">
+              <a:schemeClr val="lt1"/>
+            </a:fontRef>
+          </p:style>
+          <p:txBody>
+            <a:bodyPr wrap="square" rtlCol="0" anchor="ctr">
+              <a:noAutofit/>
+            </a:bodyPr>
+            <a:lstStyle/>
+            <a:p>
+              <a:pPr algn="ctr"/>
+              <a:endParaRPr lang="ko-KR" altLang="en-US"/>
+            </a:p>
+          </p:txBody>
+        </p:sp>
+      </p:grpSp>
     </p:spTree>
     <p:extLst>
       <p:ext uri="{BB962C8B-B14F-4D97-AF65-F5344CB8AC3E}">

</xml_diff>

<commit_message>
OBS Studio, Wallpaper Engine Icon Added
</commit_message>
<xml_diff>
--- a/tepk2924_Custon_Icon.pptx
+++ b/tepk2924_Custon_Icon.pptx
@@ -3476,42 +3476,6 @@
           <a:chExt cx="0" cy="0"/>
         </a:xfrm>
       </p:grpSpPr>
-      <p:pic>
-        <p:nvPicPr>
-          <p:cNvPr id="3" name="그림 2">
-            <a:extLst>
-              <a:ext uri="{FF2B5EF4-FFF2-40B4-BE49-F238E27FC236}">
-                <a16:creationId xmlns:a16="http://schemas.microsoft.com/office/drawing/2014/main" id="{9DF67090-37C1-FE41-E4B9-E998DDF10B09}"/>
-              </a:ext>
-            </a:extLst>
-          </p:cNvPr>
-          <p:cNvPicPr>
-            <a:picLocks noChangeAspect="1"/>
-          </p:cNvPicPr>
-          <p:nvPr/>
-        </p:nvPicPr>
-        <p:blipFill>
-          <a:blip r:embed="rId2">
-            <a:extLst>
-              <a:ext uri="{28A0092B-C50C-407E-A947-70E740481C1C}">
-                <a14:useLocalDpi xmlns:a14="http://schemas.microsoft.com/office/drawing/2010/main" val="0"/>
-              </a:ext>
-            </a:extLst>
-          </a:blip>
-          <a:stretch>
-            <a:fillRect/>
-          </a:stretch>
-        </p:blipFill>
-        <p:spPr>
-          <a:xfrm>
-            <a:off x="5368169" y="3384596"/>
-            <a:ext cx="6425338" cy="2356894"/>
-          </a:xfrm>
-          <a:prstGeom prst="rect">
-            <a:avLst/>
-          </a:prstGeom>
-        </p:spPr>
-      </p:pic>
     </p:spTree>
     <p:extLst>
       <p:ext uri="{BB962C8B-B14F-4D97-AF65-F5344CB8AC3E}">
@@ -12733,6 +12697,1469 @@
           </p:txBody>
         </p:sp>
       </p:grpSp>
+      <p:grpSp>
+        <p:nvGrpSpPr>
+          <p:cNvPr id="87" name="그룹 86">
+            <a:extLst>
+              <a:ext uri="{FF2B5EF4-FFF2-40B4-BE49-F238E27FC236}">
+                <a16:creationId xmlns:a16="http://schemas.microsoft.com/office/drawing/2014/main" id="{B501A714-2922-5D5F-38CA-0BC7EE8C197D}"/>
+              </a:ext>
+            </a:extLst>
+          </p:cNvPr>
+          <p:cNvGrpSpPr/>
+          <p:nvPr/>
+        </p:nvGrpSpPr>
+        <p:grpSpPr>
+          <a:xfrm>
+            <a:off x="213800" y="4434333"/>
+            <a:ext cx="1440000" cy="1440000"/>
+            <a:chOff x="747743" y="826647"/>
+            <a:chExt cx="1440000" cy="1440000"/>
+          </a:xfrm>
+        </p:grpSpPr>
+        <p:sp>
+          <p:nvSpPr>
+            <p:cNvPr id="89" name="직사각형 88">
+              <a:extLst>
+                <a:ext uri="{FF2B5EF4-FFF2-40B4-BE49-F238E27FC236}">
+                  <a16:creationId xmlns:a16="http://schemas.microsoft.com/office/drawing/2014/main" id="{5D1CD86A-D70A-965B-894B-790B8EAAC0A3}"/>
+                </a:ext>
+              </a:extLst>
+            </p:cNvPr>
+            <p:cNvSpPr/>
+            <p:nvPr/>
+          </p:nvSpPr>
+          <p:spPr>
+            <a:xfrm>
+              <a:off x="747743" y="826647"/>
+              <a:ext cx="1440000" cy="1440000"/>
+            </a:xfrm>
+            <a:prstGeom prst="rect">
+              <a:avLst/>
+            </a:prstGeom>
+            <a:noFill/>
+            <a:ln>
+              <a:noFill/>
+            </a:ln>
+          </p:spPr>
+          <p:style>
+            <a:lnRef idx="2">
+              <a:schemeClr val="accent1">
+                <a:shade val="15000"/>
+              </a:schemeClr>
+            </a:lnRef>
+            <a:fillRef idx="1">
+              <a:schemeClr val="accent1"/>
+            </a:fillRef>
+            <a:effectRef idx="0">
+              <a:schemeClr val="accent1"/>
+            </a:effectRef>
+            <a:fontRef idx="minor">
+              <a:schemeClr val="lt1"/>
+            </a:fontRef>
+          </p:style>
+          <p:txBody>
+            <a:bodyPr wrap="square" rtlCol="0" anchor="ctr">
+              <a:noAutofit/>
+            </a:bodyPr>
+            <a:lstStyle/>
+            <a:p>
+              <a:pPr algn="ctr"/>
+              <a:endParaRPr lang="ko-KR" altLang="en-US"/>
+            </a:p>
+          </p:txBody>
+        </p:sp>
+        <p:sp>
+          <p:nvSpPr>
+            <p:cNvPr id="90" name="팔각형 89">
+              <a:extLst>
+                <a:ext uri="{FF2B5EF4-FFF2-40B4-BE49-F238E27FC236}">
+                  <a16:creationId xmlns:a16="http://schemas.microsoft.com/office/drawing/2014/main" id="{91DF151B-0278-B93D-AB2D-D3CDFA4BC43C}"/>
+                </a:ext>
+              </a:extLst>
+            </p:cNvPr>
+            <p:cNvSpPr/>
+            <p:nvPr/>
+          </p:nvSpPr>
+          <p:spPr>
+            <a:xfrm>
+              <a:off x="747743" y="826647"/>
+              <a:ext cx="1440000" cy="1440000"/>
+            </a:xfrm>
+            <a:prstGeom prst="octagon">
+              <a:avLst/>
+            </a:prstGeom>
+            <a:solidFill>
+              <a:schemeClr val="bg1"/>
+            </a:solidFill>
+            <a:ln>
+              <a:noFill/>
+            </a:ln>
+          </p:spPr>
+          <p:style>
+            <a:lnRef idx="2">
+              <a:schemeClr val="accent1">
+                <a:shade val="15000"/>
+              </a:schemeClr>
+            </a:lnRef>
+            <a:fillRef idx="1">
+              <a:schemeClr val="accent1"/>
+            </a:fillRef>
+            <a:effectRef idx="0">
+              <a:schemeClr val="accent1"/>
+            </a:effectRef>
+            <a:fontRef idx="minor">
+              <a:schemeClr val="lt1"/>
+            </a:fontRef>
+          </p:style>
+          <p:txBody>
+            <a:bodyPr rtlCol="0" anchor="ctr"/>
+            <a:lstStyle/>
+            <a:p>
+              <a:pPr algn="ctr"/>
+              <a:endParaRPr lang="ko-KR" altLang="en-US"/>
+            </a:p>
+          </p:txBody>
+        </p:sp>
+        <p:sp>
+          <p:nvSpPr>
+            <p:cNvPr id="92" name="팔각형 91">
+              <a:extLst>
+                <a:ext uri="{FF2B5EF4-FFF2-40B4-BE49-F238E27FC236}">
+                  <a16:creationId xmlns:a16="http://schemas.microsoft.com/office/drawing/2014/main" id="{A51BABF0-55C8-12AE-E424-6F73DD824035}"/>
+                </a:ext>
+              </a:extLst>
+            </p:cNvPr>
+            <p:cNvSpPr/>
+            <p:nvPr/>
+          </p:nvSpPr>
+          <p:spPr>
+            <a:xfrm>
+              <a:off x="819743" y="898647"/>
+              <a:ext cx="1296000" cy="1296000"/>
+            </a:xfrm>
+            <a:prstGeom prst="octagon">
+              <a:avLst/>
+            </a:prstGeom>
+            <a:solidFill>
+              <a:schemeClr val="tx1"/>
+            </a:solidFill>
+            <a:ln>
+              <a:noFill/>
+            </a:ln>
+          </p:spPr>
+          <p:style>
+            <a:lnRef idx="2">
+              <a:schemeClr val="accent1">
+                <a:shade val="15000"/>
+              </a:schemeClr>
+            </a:lnRef>
+            <a:fillRef idx="1">
+              <a:schemeClr val="accent1"/>
+            </a:fillRef>
+            <a:effectRef idx="0">
+              <a:schemeClr val="accent1"/>
+            </a:effectRef>
+            <a:fontRef idx="minor">
+              <a:schemeClr val="lt1"/>
+            </a:fontRef>
+          </p:style>
+          <p:txBody>
+            <a:bodyPr rtlCol="0" anchor="ctr"/>
+            <a:lstStyle/>
+            <a:p>
+              <a:pPr algn="ctr"/>
+              <a:endParaRPr lang="ko-KR" altLang="en-US"/>
+            </a:p>
+          </p:txBody>
+        </p:sp>
+        <p:sp>
+          <p:nvSpPr>
+            <p:cNvPr id="93" name="자유형: 도형 92">
+              <a:extLst>
+                <a:ext uri="{FF2B5EF4-FFF2-40B4-BE49-F238E27FC236}">
+                  <a16:creationId xmlns:a16="http://schemas.microsoft.com/office/drawing/2014/main" id="{C1D00267-A753-6F71-C406-B77ED34C0055}"/>
+                </a:ext>
+              </a:extLst>
+            </p:cNvPr>
+            <p:cNvSpPr/>
+            <p:nvPr/>
+          </p:nvSpPr>
+          <p:spPr>
+            <a:xfrm>
+              <a:off x="1467743" y="1376663"/>
+              <a:ext cx="608382" cy="169984"/>
+            </a:xfrm>
+            <a:custGeom>
+              <a:avLst/>
+              <a:gdLst>
+                <a:gd name="connsiteX0" fmla="*/ 169984 w 608382"/>
+                <a:gd name="connsiteY0" fmla="*/ 0 h 169984"/>
+                <a:gd name="connsiteX1" fmla="*/ 438398 w 608382"/>
+                <a:gd name="connsiteY1" fmla="*/ 0 h 169984"/>
+                <a:gd name="connsiteX2" fmla="*/ 608382 w 608382"/>
+                <a:gd name="connsiteY2" fmla="*/ 169984 h 169984"/>
+                <a:gd name="connsiteX3" fmla="*/ 516741 w 608382"/>
+                <a:gd name="connsiteY3" fmla="*/ 169984 h 169984"/>
+                <a:gd name="connsiteX4" fmla="*/ 411557 w 608382"/>
+                <a:gd name="connsiteY4" fmla="*/ 64800 h 169984"/>
+                <a:gd name="connsiteX5" fmla="*/ 196826 w 608382"/>
+                <a:gd name="connsiteY5" fmla="*/ 64800 h 169984"/>
+                <a:gd name="connsiteX6" fmla="*/ 91642 w 608382"/>
+                <a:gd name="connsiteY6" fmla="*/ 169984 h 169984"/>
+                <a:gd name="connsiteX7" fmla="*/ 0 w 608382"/>
+                <a:gd name="connsiteY7" fmla="*/ 169984 h 169984"/>
+              </a:gdLst>
+              <a:ahLst/>
+              <a:cxnLst>
+                <a:cxn ang="0">
+                  <a:pos x="connsiteX0" y="connsiteY0"/>
+                </a:cxn>
+                <a:cxn ang="0">
+                  <a:pos x="connsiteX1" y="connsiteY1"/>
+                </a:cxn>
+                <a:cxn ang="0">
+                  <a:pos x="connsiteX2" y="connsiteY2"/>
+                </a:cxn>
+                <a:cxn ang="0">
+                  <a:pos x="connsiteX3" y="connsiteY3"/>
+                </a:cxn>
+                <a:cxn ang="0">
+                  <a:pos x="connsiteX4" y="connsiteY4"/>
+                </a:cxn>
+                <a:cxn ang="0">
+                  <a:pos x="connsiteX5" y="connsiteY5"/>
+                </a:cxn>
+                <a:cxn ang="0">
+                  <a:pos x="connsiteX6" y="connsiteY6"/>
+                </a:cxn>
+                <a:cxn ang="0">
+                  <a:pos x="connsiteX7" y="connsiteY7"/>
+                </a:cxn>
+              </a:cxnLst>
+              <a:rect l="l" t="t" r="r" b="b"/>
+              <a:pathLst>
+                <a:path w="608382" h="169984">
+                  <a:moveTo>
+                    <a:pt x="169984" y="0"/>
+                  </a:moveTo>
+                  <a:lnTo>
+                    <a:pt x="438398" y="0"/>
+                  </a:lnTo>
+                  <a:lnTo>
+                    <a:pt x="608382" y="169984"/>
+                  </a:lnTo>
+                  <a:lnTo>
+                    <a:pt x="516741" y="169984"/>
+                  </a:lnTo>
+                  <a:lnTo>
+                    <a:pt x="411557" y="64800"/>
+                  </a:lnTo>
+                  <a:lnTo>
+                    <a:pt x="196826" y="64800"/>
+                  </a:lnTo>
+                  <a:lnTo>
+                    <a:pt x="91642" y="169984"/>
+                  </a:lnTo>
+                  <a:lnTo>
+                    <a:pt x="0" y="169984"/>
+                  </a:lnTo>
+                  <a:close/>
+                </a:path>
+              </a:pathLst>
+            </a:custGeom>
+            <a:solidFill>
+              <a:srgbClr val="C3C1C3"/>
+            </a:solidFill>
+            <a:ln>
+              <a:noFill/>
+            </a:ln>
+          </p:spPr>
+          <p:style>
+            <a:lnRef idx="2">
+              <a:schemeClr val="accent1">
+                <a:shade val="15000"/>
+              </a:schemeClr>
+            </a:lnRef>
+            <a:fillRef idx="1">
+              <a:schemeClr val="accent1"/>
+            </a:fillRef>
+            <a:effectRef idx="0">
+              <a:schemeClr val="accent1"/>
+            </a:effectRef>
+            <a:fontRef idx="minor">
+              <a:schemeClr val="lt1"/>
+            </a:fontRef>
+          </p:style>
+          <p:txBody>
+            <a:bodyPr wrap="square" rtlCol="0" anchor="ctr">
+              <a:noAutofit/>
+            </a:bodyPr>
+            <a:lstStyle/>
+            <a:p>
+              <a:pPr algn="ctr"/>
+              <a:endParaRPr lang="ko-KR" altLang="en-US"/>
+            </a:p>
+          </p:txBody>
+        </p:sp>
+        <p:sp>
+          <p:nvSpPr>
+            <p:cNvPr id="95" name="자유형: 도형 94">
+              <a:extLst>
+                <a:ext uri="{FF2B5EF4-FFF2-40B4-BE49-F238E27FC236}">
+                  <a16:creationId xmlns:a16="http://schemas.microsoft.com/office/drawing/2014/main" id="{780CA882-48E4-AB4C-D62D-E789B0F8A1E0}"/>
+                </a:ext>
+              </a:extLst>
+            </p:cNvPr>
+            <p:cNvSpPr/>
+            <p:nvPr/>
+          </p:nvSpPr>
+          <p:spPr>
+            <a:xfrm rot="13500000">
+              <a:off x="888357" y="1306658"/>
+              <a:ext cx="608382" cy="169984"/>
+            </a:xfrm>
+            <a:custGeom>
+              <a:avLst/>
+              <a:gdLst>
+                <a:gd name="connsiteX0" fmla="*/ 169984 w 608382"/>
+                <a:gd name="connsiteY0" fmla="*/ 0 h 169984"/>
+                <a:gd name="connsiteX1" fmla="*/ 438398 w 608382"/>
+                <a:gd name="connsiteY1" fmla="*/ 0 h 169984"/>
+                <a:gd name="connsiteX2" fmla="*/ 608382 w 608382"/>
+                <a:gd name="connsiteY2" fmla="*/ 169984 h 169984"/>
+                <a:gd name="connsiteX3" fmla="*/ 516741 w 608382"/>
+                <a:gd name="connsiteY3" fmla="*/ 169984 h 169984"/>
+                <a:gd name="connsiteX4" fmla="*/ 411557 w 608382"/>
+                <a:gd name="connsiteY4" fmla="*/ 64800 h 169984"/>
+                <a:gd name="connsiteX5" fmla="*/ 196826 w 608382"/>
+                <a:gd name="connsiteY5" fmla="*/ 64800 h 169984"/>
+                <a:gd name="connsiteX6" fmla="*/ 91642 w 608382"/>
+                <a:gd name="connsiteY6" fmla="*/ 169984 h 169984"/>
+                <a:gd name="connsiteX7" fmla="*/ 0 w 608382"/>
+                <a:gd name="connsiteY7" fmla="*/ 169984 h 169984"/>
+              </a:gdLst>
+              <a:ahLst/>
+              <a:cxnLst>
+                <a:cxn ang="0">
+                  <a:pos x="connsiteX0" y="connsiteY0"/>
+                </a:cxn>
+                <a:cxn ang="0">
+                  <a:pos x="connsiteX1" y="connsiteY1"/>
+                </a:cxn>
+                <a:cxn ang="0">
+                  <a:pos x="connsiteX2" y="connsiteY2"/>
+                </a:cxn>
+                <a:cxn ang="0">
+                  <a:pos x="connsiteX3" y="connsiteY3"/>
+                </a:cxn>
+                <a:cxn ang="0">
+                  <a:pos x="connsiteX4" y="connsiteY4"/>
+                </a:cxn>
+                <a:cxn ang="0">
+                  <a:pos x="connsiteX5" y="connsiteY5"/>
+                </a:cxn>
+                <a:cxn ang="0">
+                  <a:pos x="connsiteX6" y="connsiteY6"/>
+                </a:cxn>
+                <a:cxn ang="0">
+                  <a:pos x="connsiteX7" y="connsiteY7"/>
+                </a:cxn>
+              </a:cxnLst>
+              <a:rect l="l" t="t" r="r" b="b"/>
+              <a:pathLst>
+                <a:path w="608382" h="169984">
+                  <a:moveTo>
+                    <a:pt x="169984" y="0"/>
+                  </a:moveTo>
+                  <a:lnTo>
+                    <a:pt x="438398" y="0"/>
+                  </a:lnTo>
+                  <a:lnTo>
+                    <a:pt x="608382" y="169984"/>
+                  </a:lnTo>
+                  <a:lnTo>
+                    <a:pt x="516741" y="169984"/>
+                  </a:lnTo>
+                  <a:lnTo>
+                    <a:pt x="411557" y="64800"/>
+                  </a:lnTo>
+                  <a:lnTo>
+                    <a:pt x="196826" y="64800"/>
+                  </a:lnTo>
+                  <a:lnTo>
+                    <a:pt x="91642" y="169984"/>
+                  </a:lnTo>
+                  <a:lnTo>
+                    <a:pt x="0" y="169984"/>
+                  </a:lnTo>
+                  <a:close/>
+                </a:path>
+              </a:pathLst>
+            </a:custGeom>
+            <a:solidFill>
+              <a:srgbClr val="C3C1C3"/>
+            </a:solidFill>
+            <a:ln>
+              <a:noFill/>
+            </a:ln>
+          </p:spPr>
+          <p:style>
+            <a:lnRef idx="2">
+              <a:schemeClr val="accent1">
+                <a:shade val="15000"/>
+              </a:schemeClr>
+            </a:lnRef>
+            <a:fillRef idx="1">
+              <a:schemeClr val="accent1"/>
+            </a:fillRef>
+            <a:effectRef idx="0">
+              <a:schemeClr val="accent1"/>
+            </a:effectRef>
+            <a:fontRef idx="minor">
+              <a:schemeClr val="lt1"/>
+            </a:fontRef>
+          </p:style>
+          <p:txBody>
+            <a:bodyPr wrap="square" rtlCol="0" anchor="ctr">
+              <a:noAutofit/>
+            </a:bodyPr>
+            <a:lstStyle/>
+            <a:p>
+              <a:pPr algn="ctr"/>
+              <a:endParaRPr lang="ko-KR" altLang="en-US"/>
+            </a:p>
+          </p:txBody>
+        </p:sp>
+        <p:sp>
+          <p:nvSpPr>
+            <p:cNvPr id="96" name="자유형: 도형 95">
+              <a:extLst>
+                <a:ext uri="{FF2B5EF4-FFF2-40B4-BE49-F238E27FC236}">
+                  <a16:creationId xmlns:a16="http://schemas.microsoft.com/office/drawing/2014/main" id="{E0AAF9B7-66AF-C25A-743C-CBD58EF3A72D}"/>
+                </a:ext>
+              </a:extLst>
+            </p:cNvPr>
+            <p:cNvSpPr/>
+            <p:nvPr/>
+          </p:nvSpPr>
+          <p:spPr>
+            <a:xfrm rot="8100000">
+              <a:off x="1008554" y="1737819"/>
+              <a:ext cx="608382" cy="169984"/>
+            </a:xfrm>
+            <a:custGeom>
+              <a:avLst/>
+              <a:gdLst>
+                <a:gd name="connsiteX0" fmla="*/ 169984 w 608382"/>
+                <a:gd name="connsiteY0" fmla="*/ 0 h 169984"/>
+                <a:gd name="connsiteX1" fmla="*/ 438398 w 608382"/>
+                <a:gd name="connsiteY1" fmla="*/ 0 h 169984"/>
+                <a:gd name="connsiteX2" fmla="*/ 608382 w 608382"/>
+                <a:gd name="connsiteY2" fmla="*/ 169984 h 169984"/>
+                <a:gd name="connsiteX3" fmla="*/ 516741 w 608382"/>
+                <a:gd name="connsiteY3" fmla="*/ 169984 h 169984"/>
+                <a:gd name="connsiteX4" fmla="*/ 411557 w 608382"/>
+                <a:gd name="connsiteY4" fmla="*/ 64800 h 169984"/>
+                <a:gd name="connsiteX5" fmla="*/ 196826 w 608382"/>
+                <a:gd name="connsiteY5" fmla="*/ 64800 h 169984"/>
+                <a:gd name="connsiteX6" fmla="*/ 91642 w 608382"/>
+                <a:gd name="connsiteY6" fmla="*/ 169984 h 169984"/>
+                <a:gd name="connsiteX7" fmla="*/ 0 w 608382"/>
+                <a:gd name="connsiteY7" fmla="*/ 169984 h 169984"/>
+              </a:gdLst>
+              <a:ahLst/>
+              <a:cxnLst>
+                <a:cxn ang="0">
+                  <a:pos x="connsiteX0" y="connsiteY0"/>
+                </a:cxn>
+                <a:cxn ang="0">
+                  <a:pos x="connsiteX1" y="connsiteY1"/>
+                </a:cxn>
+                <a:cxn ang="0">
+                  <a:pos x="connsiteX2" y="connsiteY2"/>
+                </a:cxn>
+                <a:cxn ang="0">
+                  <a:pos x="connsiteX3" y="connsiteY3"/>
+                </a:cxn>
+                <a:cxn ang="0">
+                  <a:pos x="connsiteX4" y="connsiteY4"/>
+                </a:cxn>
+                <a:cxn ang="0">
+                  <a:pos x="connsiteX5" y="connsiteY5"/>
+                </a:cxn>
+                <a:cxn ang="0">
+                  <a:pos x="connsiteX6" y="connsiteY6"/>
+                </a:cxn>
+                <a:cxn ang="0">
+                  <a:pos x="connsiteX7" y="connsiteY7"/>
+                </a:cxn>
+              </a:cxnLst>
+              <a:rect l="l" t="t" r="r" b="b"/>
+              <a:pathLst>
+                <a:path w="608382" h="169984">
+                  <a:moveTo>
+                    <a:pt x="169984" y="0"/>
+                  </a:moveTo>
+                  <a:lnTo>
+                    <a:pt x="438398" y="0"/>
+                  </a:lnTo>
+                  <a:lnTo>
+                    <a:pt x="608382" y="169984"/>
+                  </a:lnTo>
+                  <a:lnTo>
+                    <a:pt x="516741" y="169984"/>
+                  </a:lnTo>
+                  <a:lnTo>
+                    <a:pt x="411557" y="64800"/>
+                  </a:lnTo>
+                  <a:lnTo>
+                    <a:pt x="196826" y="64800"/>
+                  </a:lnTo>
+                  <a:lnTo>
+                    <a:pt x="91642" y="169984"/>
+                  </a:lnTo>
+                  <a:lnTo>
+                    <a:pt x="0" y="169984"/>
+                  </a:lnTo>
+                  <a:close/>
+                </a:path>
+              </a:pathLst>
+            </a:custGeom>
+            <a:solidFill>
+              <a:srgbClr val="C3C1C3"/>
+            </a:solidFill>
+            <a:ln>
+              <a:noFill/>
+            </a:ln>
+          </p:spPr>
+          <p:style>
+            <a:lnRef idx="2">
+              <a:schemeClr val="accent1">
+                <a:shade val="15000"/>
+              </a:schemeClr>
+            </a:lnRef>
+            <a:fillRef idx="1">
+              <a:schemeClr val="accent1"/>
+            </a:fillRef>
+            <a:effectRef idx="0">
+              <a:schemeClr val="accent1"/>
+            </a:effectRef>
+            <a:fontRef idx="minor">
+              <a:schemeClr val="lt1"/>
+            </a:fontRef>
+          </p:style>
+          <p:txBody>
+            <a:bodyPr wrap="square" rtlCol="0" anchor="ctr">
+              <a:noAutofit/>
+            </a:bodyPr>
+            <a:lstStyle/>
+            <a:p>
+              <a:pPr algn="ctr"/>
+              <a:endParaRPr lang="ko-KR" altLang="en-US"/>
+            </a:p>
+          </p:txBody>
+        </p:sp>
+      </p:grpSp>
+      <p:grpSp>
+        <p:nvGrpSpPr>
+          <p:cNvPr id="97" name="그룹 96">
+            <a:extLst>
+              <a:ext uri="{FF2B5EF4-FFF2-40B4-BE49-F238E27FC236}">
+                <a16:creationId xmlns:a16="http://schemas.microsoft.com/office/drawing/2014/main" id="{02CE18A4-7360-AAE6-8D35-89537E37521B}"/>
+              </a:ext>
+            </a:extLst>
+          </p:cNvPr>
+          <p:cNvGrpSpPr/>
+          <p:nvPr/>
+        </p:nvGrpSpPr>
+        <p:grpSpPr>
+          <a:xfrm>
+            <a:off x="2195726" y="4434333"/>
+            <a:ext cx="1440000" cy="1440000"/>
+            <a:chOff x="1900703" y="2709000"/>
+            <a:chExt cx="1440000" cy="1440000"/>
+          </a:xfrm>
+        </p:grpSpPr>
+        <p:sp>
+          <p:nvSpPr>
+            <p:cNvPr id="98" name="팔각형 97">
+              <a:extLst>
+                <a:ext uri="{FF2B5EF4-FFF2-40B4-BE49-F238E27FC236}">
+                  <a16:creationId xmlns:a16="http://schemas.microsoft.com/office/drawing/2014/main" id="{DF8B1CE2-E305-7A0C-1336-D7A872353807}"/>
+                </a:ext>
+              </a:extLst>
+            </p:cNvPr>
+            <p:cNvSpPr/>
+            <p:nvPr/>
+          </p:nvSpPr>
+          <p:spPr>
+            <a:xfrm>
+              <a:off x="1900703" y="2709000"/>
+              <a:ext cx="1440000" cy="1440000"/>
+            </a:xfrm>
+            <a:prstGeom prst="octagon">
+              <a:avLst/>
+            </a:prstGeom>
+            <a:solidFill>
+              <a:srgbClr val="003CC1"/>
+            </a:solidFill>
+            <a:ln>
+              <a:noFill/>
+            </a:ln>
+          </p:spPr>
+          <p:style>
+            <a:lnRef idx="2">
+              <a:schemeClr val="accent1">
+                <a:shade val="15000"/>
+              </a:schemeClr>
+            </a:lnRef>
+            <a:fillRef idx="1">
+              <a:schemeClr val="accent1"/>
+            </a:fillRef>
+            <a:effectRef idx="0">
+              <a:schemeClr val="accent1"/>
+            </a:effectRef>
+            <a:fontRef idx="minor">
+              <a:schemeClr val="lt1"/>
+            </a:fontRef>
+          </p:style>
+          <p:txBody>
+            <a:bodyPr rtlCol="0" anchor="ctr"/>
+            <a:lstStyle/>
+            <a:p>
+              <a:pPr algn="ctr"/>
+              <a:endParaRPr lang="ko-KR" altLang="en-US"/>
+            </a:p>
+          </p:txBody>
+        </p:sp>
+        <p:sp>
+          <p:nvSpPr>
+            <p:cNvPr id="99" name="자유형: 도형 98">
+              <a:extLst>
+                <a:ext uri="{FF2B5EF4-FFF2-40B4-BE49-F238E27FC236}">
+                  <a16:creationId xmlns:a16="http://schemas.microsoft.com/office/drawing/2014/main" id="{66B4792F-1CC7-2885-145C-B77CE5121FBF}"/>
+                </a:ext>
+              </a:extLst>
+            </p:cNvPr>
+            <p:cNvSpPr/>
+            <p:nvPr/>
+          </p:nvSpPr>
+          <p:spPr>
+            <a:xfrm>
+              <a:off x="2350800" y="2908800"/>
+              <a:ext cx="792000" cy="792000"/>
+            </a:xfrm>
+            <a:custGeom>
+              <a:avLst/>
+              <a:gdLst>
+                <a:gd name="connsiteX0" fmla="*/ 132000 w 792000"/>
+                <a:gd name="connsiteY0" fmla="*/ 0 h 792000"/>
+                <a:gd name="connsiteX1" fmla="*/ 660000 w 792000"/>
+                <a:gd name="connsiteY1" fmla="*/ 0 h 792000"/>
+                <a:gd name="connsiteX2" fmla="*/ 792000 w 792000"/>
+                <a:gd name="connsiteY2" fmla="*/ 132000 h 792000"/>
+                <a:gd name="connsiteX3" fmla="*/ 792000 w 792000"/>
+                <a:gd name="connsiteY3" fmla="*/ 666187 h 792000"/>
+                <a:gd name="connsiteX4" fmla="*/ 666187 w 792000"/>
+                <a:gd name="connsiteY4" fmla="*/ 792000 h 792000"/>
+                <a:gd name="connsiteX5" fmla="*/ 220000 w 792000"/>
+                <a:gd name="connsiteY5" fmla="*/ 792000 h 792000"/>
+                <a:gd name="connsiteX6" fmla="*/ 0 w 792000"/>
+                <a:gd name="connsiteY6" fmla="*/ 572000 h 792000"/>
+                <a:gd name="connsiteX7" fmla="*/ 0 w 792000"/>
+                <a:gd name="connsiteY7" fmla="*/ 376948 h 792000"/>
+                <a:gd name="connsiteX8" fmla="*/ 75959 w 792000"/>
+                <a:gd name="connsiteY8" fmla="*/ 376948 h 792000"/>
+                <a:gd name="connsiteX9" fmla="*/ 75959 w 792000"/>
+                <a:gd name="connsiteY9" fmla="*/ 538241 h 792000"/>
+                <a:gd name="connsiteX10" fmla="*/ 253759 w 792000"/>
+                <a:gd name="connsiteY10" fmla="*/ 716041 h 792000"/>
+                <a:gd name="connsiteX11" fmla="*/ 614361 w 792000"/>
+                <a:gd name="connsiteY11" fmla="*/ 716041 h 792000"/>
+                <a:gd name="connsiteX12" fmla="*/ 716041 w 792000"/>
+                <a:gd name="connsiteY12" fmla="*/ 614361 h 792000"/>
+                <a:gd name="connsiteX13" fmla="*/ 716041 w 792000"/>
+                <a:gd name="connsiteY13" fmla="*/ 182639 h 792000"/>
+                <a:gd name="connsiteX14" fmla="*/ 609361 w 792000"/>
+                <a:gd name="connsiteY14" fmla="*/ 75959 h 792000"/>
+                <a:gd name="connsiteX15" fmla="*/ 182639 w 792000"/>
+                <a:gd name="connsiteY15" fmla="*/ 75959 h 792000"/>
+                <a:gd name="connsiteX16" fmla="*/ 75959 w 792000"/>
+                <a:gd name="connsiteY16" fmla="*/ 182639 h 792000"/>
+                <a:gd name="connsiteX17" fmla="*/ 75959 w 792000"/>
+                <a:gd name="connsiteY17" fmla="*/ 205802 h 792000"/>
+                <a:gd name="connsiteX18" fmla="*/ 0 w 792000"/>
+                <a:gd name="connsiteY18" fmla="*/ 205802 h 792000"/>
+                <a:gd name="connsiteX19" fmla="*/ 0 w 792000"/>
+                <a:gd name="connsiteY19" fmla="*/ 132000 h 792000"/>
+              </a:gdLst>
+              <a:ahLst/>
+              <a:cxnLst>
+                <a:cxn ang="0">
+                  <a:pos x="connsiteX0" y="connsiteY0"/>
+                </a:cxn>
+                <a:cxn ang="0">
+                  <a:pos x="connsiteX1" y="connsiteY1"/>
+                </a:cxn>
+                <a:cxn ang="0">
+                  <a:pos x="connsiteX2" y="connsiteY2"/>
+                </a:cxn>
+                <a:cxn ang="0">
+                  <a:pos x="connsiteX3" y="connsiteY3"/>
+                </a:cxn>
+                <a:cxn ang="0">
+                  <a:pos x="connsiteX4" y="connsiteY4"/>
+                </a:cxn>
+                <a:cxn ang="0">
+                  <a:pos x="connsiteX5" y="connsiteY5"/>
+                </a:cxn>
+                <a:cxn ang="0">
+                  <a:pos x="connsiteX6" y="connsiteY6"/>
+                </a:cxn>
+                <a:cxn ang="0">
+                  <a:pos x="connsiteX7" y="connsiteY7"/>
+                </a:cxn>
+                <a:cxn ang="0">
+                  <a:pos x="connsiteX8" y="connsiteY8"/>
+                </a:cxn>
+                <a:cxn ang="0">
+                  <a:pos x="connsiteX9" y="connsiteY9"/>
+                </a:cxn>
+                <a:cxn ang="0">
+                  <a:pos x="connsiteX10" y="connsiteY10"/>
+                </a:cxn>
+                <a:cxn ang="0">
+                  <a:pos x="connsiteX11" y="connsiteY11"/>
+                </a:cxn>
+                <a:cxn ang="0">
+                  <a:pos x="connsiteX12" y="connsiteY12"/>
+                </a:cxn>
+                <a:cxn ang="0">
+                  <a:pos x="connsiteX13" y="connsiteY13"/>
+                </a:cxn>
+                <a:cxn ang="0">
+                  <a:pos x="connsiteX14" y="connsiteY14"/>
+                </a:cxn>
+                <a:cxn ang="0">
+                  <a:pos x="connsiteX15" y="connsiteY15"/>
+                </a:cxn>
+                <a:cxn ang="0">
+                  <a:pos x="connsiteX16" y="connsiteY16"/>
+                </a:cxn>
+                <a:cxn ang="0">
+                  <a:pos x="connsiteX17" y="connsiteY17"/>
+                </a:cxn>
+                <a:cxn ang="0">
+                  <a:pos x="connsiteX18" y="connsiteY18"/>
+                </a:cxn>
+                <a:cxn ang="0">
+                  <a:pos x="connsiteX19" y="connsiteY19"/>
+                </a:cxn>
+              </a:cxnLst>
+              <a:rect l="l" t="t" r="r" b="b"/>
+              <a:pathLst>
+                <a:path w="792000" h="792000">
+                  <a:moveTo>
+                    <a:pt x="132000" y="0"/>
+                  </a:moveTo>
+                  <a:lnTo>
+                    <a:pt x="660000" y="0"/>
+                  </a:lnTo>
+                  <a:lnTo>
+                    <a:pt x="792000" y="132000"/>
+                  </a:lnTo>
+                  <a:lnTo>
+                    <a:pt x="792000" y="666187"/>
+                  </a:lnTo>
+                  <a:lnTo>
+                    <a:pt x="666187" y="792000"/>
+                  </a:lnTo>
+                  <a:lnTo>
+                    <a:pt x="220000" y="792000"/>
+                  </a:lnTo>
+                  <a:lnTo>
+                    <a:pt x="0" y="572000"/>
+                  </a:lnTo>
+                  <a:lnTo>
+                    <a:pt x="0" y="376948"/>
+                  </a:lnTo>
+                  <a:lnTo>
+                    <a:pt x="75959" y="376948"/>
+                  </a:lnTo>
+                  <a:lnTo>
+                    <a:pt x="75959" y="538241"/>
+                  </a:lnTo>
+                  <a:lnTo>
+                    <a:pt x="253759" y="716041"/>
+                  </a:lnTo>
+                  <a:lnTo>
+                    <a:pt x="614361" y="716041"/>
+                  </a:lnTo>
+                  <a:lnTo>
+                    <a:pt x="716041" y="614361"/>
+                  </a:lnTo>
+                  <a:lnTo>
+                    <a:pt x="716041" y="182639"/>
+                  </a:lnTo>
+                  <a:lnTo>
+                    <a:pt x="609361" y="75959"/>
+                  </a:lnTo>
+                  <a:lnTo>
+                    <a:pt x="182639" y="75959"/>
+                  </a:lnTo>
+                  <a:lnTo>
+                    <a:pt x="75959" y="182639"/>
+                  </a:lnTo>
+                  <a:lnTo>
+                    <a:pt x="75959" y="205802"/>
+                  </a:lnTo>
+                  <a:lnTo>
+                    <a:pt x="0" y="205802"/>
+                  </a:lnTo>
+                  <a:lnTo>
+                    <a:pt x="0" y="132000"/>
+                  </a:lnTo>
+                  <a:close/>
+                </a:path>
+              </a:pathLst>
+            </a:custGeom>
+            <a:solidFill>
+              <a:srgbClr val="49BEFD"/>
+            </a:solidFill>
+            <a:ln>
+              <a:noFill/>
+            </a:ln>
+          </p:spPr>
+          <p:style>
+            <a:lnRef idx="2">
+              <a:schemeClr val="accent1">
+                <a:shade val="15000"/>
+              </a:schemeClr>
+            </a:lnRef>
+            <a:fillRef idx="1">
+              <a:schemeClr val="accent1"/>
+            </a:fillRef>
+            <a:effectRef idx="0">
+              <a:schemeClr val="accent1"/>
+            </a:effectRef>
+            <a:fontRef idx="minor">
+              <a:schemeClr val="lt1"/>
+            </a:fontRef>
+          </p:style>
+          <p:txBody>
+            <a:bodyPr wrap="square" rtlCol="0" anchor="ctr">
+              <a:noAutofit/>
+            </a:bodyPr>
+            <a:lstStyle/>
+            <a:p>
+              <a:pPr algn="ctr"/>
+              <a:endParaRPr lang="ko-KR" altLang="en-US"/>
+            </a:p>
+          </p:txBody>
+        </p:sp>
+        <p:sp>
+          <p:nvSpPr>
+            <p:cNvPr id="100" name="자유형: 도형 99">
+              <a:extLst>
+                <a:ext uri="{FF2B5EF4-FFF2-40B4-BE49-F238E27FC236}">
+                  <a16:creationId xmlns:a16="http://schemas.microsoft.com/office/drawing/2014/main" id="{BEEA448F-50BD-ACB8-42D7-2C1339DCFF3F}"/>
+                </a:ext>
+              </a:extLst>
+            </p:cNvPr>
+            <p:cNvSpPr/>
+            <p:nvPr/>
+          </p:nvSpPr>
+          <p:spPr>
+            <a:xfrm rot="10800000">
+              <a:off x="2098800" y="3160800"/>
+              <a:ext cx="792000" cy="792000"/>
+            </a:xfrm>
+            <a:custGeom>
+              <a:avLst/>
+              <a:gdLst>
+                <a:gd name="connsiteX0" fmla="*/ 666187 w 792000"/>
+                <a:gd name="connsiteY0" fmla="*/ 792000 h 792000"/>
+                <a:gd name="connsiteX1" fmla="*/ 220000 w 792000"/>
+                <a:gd name="connsiteY1" fmla="*/ 792000 h 792000"/>
+                <a:gd name="connsiteX2" fmla="*/ 0 w 792000"/>
+                <a:gd name="connsiteY2" fmla="*/ 572000 h 792000"/>
+                <a:gd name="connsiteX3" fmla="*/ 0 w 792000"/>
+                <a:gd name="connsiteY3" fmla="*/ 380548 h 792000"/>
+                <a:gd name="connsiteX4" fmla="*/ 75959 w 792000"/>
+                <a:gd name="connsiteY4" fmla="*/ 380548 h 792000"/>
+                <a:gd name="connsiteX5" fmla="*/ 75959 w 792000"/>
+                <a:gd name="connsiteY5" fmla="*/ 538241 h 792000"/>
+                <a:gd name="connsiteX6" fmla="*/ 253759 w 792000"/>
+                <a:gd name="connsiteY6" fmla="*/ 716041 h 792000"/>
+                <a:gd name="connsiteX7" fmla="*/ 614361 w 792000"/>
+                <a:gd name="connsiteY7" fmla="*/ 716041 h 792000"/>
+                <a:gd name="connsiteX8" fmla="*/ 716041 w 792000"/>
+                <a:gd name="connsiteY8" fmla="*/ 614361 h 792000"/>
+                <a:gd name="connsiteX9" fmla="*/ 716041 w 792000"/>
+                <a:gd name="connsiteY9" fmla="*/ 182639 h 792000"/>
+                <a:gd name="connsiteX10" fmla="*/ 609361 w 792000"/>
+                <a:gd name="connsiteY10" fmla="*/ 75959 h 792000"/>
+                <a:gd name="connsiteX11" fmla="*/ 182639 w 792000"/>
+                <a:gd name="connsiteY11" fmla="*/ 75959 h 792000"/>
+                <a:gd name="connsiteX12" fmla="*/ 75959 w 792000"/>
+                <a:gd name="connsiteY12" fmla="*/ 182639 h 792000"/>
+                <a:gd name="connsiteX13" fmla="*/ 75959 w 792000"/>
+                <a:gd name="connsiteY13" fmla="*/ 209402 h 792000"/>
+                <a:gd name="connsiteX14" fmla="*/ 0 w 792000"/>
+                <a:gd name="connsiteY14" fmla="*/ 209402 h 792000"/>
+                <a:gd name="connsiteX15" fmla="*/ 0 w 792000"/>
+                <a:gd name="connsiteY15" fmla="*/ 132000 h 792000"/>
+                <a:gd name="connsiteX16" fmla="*/ 132000 w 792000"/>
+                <a:gd name="connsiteY16" fmla="*/ 0 h 792000"/>
+                <a:gd name="connsiteX17" fmla="*/ 660000 w 792000"/>
+                <a:gd name="connsiteY17" fmla="*/ 0 h 792000"/>
+                <a:gd name="connsiteX18" fmla="*/ 792000 w 792000"/>
+                <a:gd name="connsiteY18" fmla="*/ 132000 h 792000"/>
+                <a:gd name="connsiteX19" fmla="*/ 792000 w 792000"/>
+                <a:gd name="connsiteY19" fmla="*/ 666187 h 792000"/>
+              </a:gdLst>
+              <a:ahLst/>
+              <a:cxnLst>
+                <a:cxn ang="0">
+                  <a:pos x="connsiteX0" y="connsiteY0"/>
+                </a:cxn>
+                <a:cxn ang="0">
+                  <a:pos x="connsiteX1" y="connsiteY1"/>
+                </a:cxn>
+                <a:cxn ang="0">
+                  <a:pos x="connsiteX2" y="connsiteY2"/>
+                </a:cxn>
+                <a:cxn ang="0">
+                  <a:pos x="connsiteX3" y="connsiteY3"/>
+                </a:cxn>
+                <a:cxn ang="0">
+                  <a:pos x="connsiteX4" y="connsiteY4"/>
+                </a:cxn>
+                <a:cxn ang="0">
+                  <a:pos x="connsiteX5" y="connsiteY5"/>
+                </a:cxn>
+                <a:cxn ang="0">
+                  <a:pos x="connsiteX6" y="connsiteY6"/>
+                </a:cxn>
+                <a:cxn ang="0">
+                  <a:pos x="connsiteX7" y="connsiteY7"/>
+                </a:cxn>
+                <a:cxn ang="0">
+                  <a:pos x="connsiteX8" y="connsiteY8"/>
+                </a:cxn>
+                <a:cxn ang="0">
+                  <a:pos x="connsiteX9" y="connsiteY9"/>
+                </a:cxn>
+                <a:cxn ang="0">
+                  <a:pos x="connsiteX10" y="connsiteY10"/>
+                </a:cxn>
+                <a:cxn ang="0">
+                  <a:pos x="connsiteX11" y="connsiteY11"/>
+                </a:cxn>
+                <a:cxn ang="0">
+                  <a:pos x="connsiteX12" y="connsiteY12"/>
+                </a:cxn>
+                <a:cxn ang="0">
+                  <a:pos x="connsiteX13" y="connsiteY13"/>
+                </a:cxn>
+                <a:cxn ang="0">
+                  <a:pos x="connsiteX14" y="connsiteY14"/>
+                </a:cxn>
+                <a:cxn ang="0">
+                  <a:pos x="connsiteX15" y="connsiteY15"/>
+                </a:cxn>
+                <a:cxn ang="0">
+                  <a:pos x="connsiteX16" y="connsiteY16"/>
+                </a:cxn>
+                <a:cxn ang="0">
+                  <a:pos x="connsiteX17" y="connsiteY17"/>
+                </a:cxn>
+                <a:cxn ang="0">
+                  <a:pos x="connsiteX18" y="connsiteY18"/>
+                </a:cxn>
+                <a:cxn ang="0">
+                  <a:pos x="connsiteX19" y="connsiteY19"/>
+                </a:cxn>
+              </a:cxnLst>
+              <a:rect l="l" t="t" r="r" b="b"/>
+              <a:pathLst>
+                <a:path w="792000" h="792000">
+                  <a:moveTo>
+                    <a:pt x="666187" y="792000"/>
+                  </a:moveTo>
+                  <a:lnTo>
+                    <a:pt x="220000" y="792000"/>
+                  </a:lnTo>
+                  <a:lnTo>
+                    <a:pt x="0" y="572000"/>
+                  </a:lnTo>
+                  <a:lnTo>
+                    <a:pt x="0" y="380548"/>
+                  </a:lnTo>
+                  <a:lnTo>
+                    <a:pt x="75959" y="380548"/>
+                  </a:lnTo>
+                  <a:lnTo>
+                    <a:pt x="75959" y="538241"/>
+                  </a:lnTo>
+                  <a:lnTo>
+                    <a:pt x="253759" y="716041"/>
+                  </a:lnTo>
+                  <a:lnTo>
+                    <a:pt x="614361" y="716041"/>
+                  </a:lnTo>
+                  <a:lnTo>
+                    <a:pt x="716041" y="614361"/>
+                  </a:lnTo>
+                  <a:lnTo>
+                    <a:pt x="716041" y="182639"/>
+                  </a:lnTo>
+                  <a:lnTo>
+                    <a:pt x="609361" y="75959"/>
+                  </a:lnTo>
+                  <a:lnTo>
+                    <a:pt x="182639" y="75959"/>
+                  </a:lnTo>
+                  <a:lnTo>
+                    <a:pt x="75959" y="182639"/>
+                  </a:lnTo>
+                  <a:lnTo>
+                    <a:pt x="75959" y="209402"/>
+                  </a:lnTo>
+                  <a:lnTo>
+                    <a:pt x="0" y="209402"/>
+                  </a:lnTo>
+                  <a:lnTo>
+                    <a:pt x="0" y="132000"/>
+                  </a:lnTo>
+                  <a:lnTo>
+                    <a:pt x="132000" y="0"/>
+                  </a:lnTo>
+                  <a:lnTo>
+                    <a:pt x="660000" y="0"/>
+                  </a:lnTo>
+                  <a:lnTo>
+                    <a:pt x="792000" y="132000"/>
+                  </a:lnTo>
+                  <a:lnTo>
+                    <a:pt x="792000" y="666187"/>
+                  </a:lnTo>
+                  <a:close/>
+                </a:path>
+              </a:pathLst>
+            </a:custGeom>
+            <a:solidFill>
+              <a:schemeClr val="bg1"/>
+            </a:solidFill>
+            <a:ln>
+              <a:noFill/>
+            </a:ln>
+          </p:spPr>
+          <p:style>
+            <a:lnRef idx="2">
+              <a:schemeClr val="accent1">
+                <a:shade val="15000"/>
+              </a:schemeClr>
+            </a:lnRef>
+            <a:fillRef idx="1">
+              <a:schemeClr val="accent1"/>
+            </a:fillRef>
+            <a:effectRef idx="0">
+              <a:schemeClr val="accent1"/>
+            </a:effectRef>
+            <a:fontRef idx="minor">
+              <a:schemeClr val="lt1"/>
+            </a:fontRef>
+          </p:style>
+          <p:txBody>
+            <a:bodyPr wrap="square" rtlCol="0" anchor="ctr">
+              <a:noAutofit/>
+            </a:bodyPr>
+            <a:lstStyle/>
+            <a:p>
+              <a:pPr algn="ctr"/>
+              <a:endParaRPr lang="ko-KR" altLang="en-US"/>
+            </a:p>
+          </p:txBody>
+        </p:sp>
+        <p:sp>
+          <p:nvSpPr>
+            <p:cNvPr id="101" name="팔각형 100">
+              <a:extLst>
+                <a:ext uri="{FF2B5EF4-FFF2-40B4-BE49-F238E27FC236}">
+                  <a16:creationId xmlns:a16="http://schemas.microsoft.com/office/drawing/2014/main" id="{B88892CC-A422-97B6-105F-71CC5E960E36}"/>
+                </a:ext>
+              </a:extLst>
+            </p:cNvPr>
+            <p:cNvSpPr/>
+            <p:nvPr/>
+          </p:nvSpPr>
+          <p:spPr>
+            <a:xfrm>
+              <a:off x="2522018" y="3330315"/>
+              <a:ext cx="197370" cy="197370"/>
+            </a:xfrm>
+            <a:prstGeom prst="octagon">
+              <a:avLst/>
+            </a:prstGeom>
+            <a:solidFill>
+              <a:schemeClr val="bg1"/>
+            </a:solidFill>
+            <a:ln>
+              <a:noFill/>
+            </a:ln>
+          </p:spPr>
+          <p:style>
+            <a:lnRef idx="2">
+              <a:schemeClr val="accent1">
+                <a:shade val="15000"/>
+              </a:schemeClr>
+            </a:lnRef>
+            <a:fillRef idx="1">
+              <a:schemeClr val="accent1"/>
+            </a:fillRef>
+            <a:effectRef idx="0">
+              <a:schemeClr val="accent1"/>
+            </a:effectRef>
+            <a:fontRef idx="minor">
+              <a:schemeClr val="lt1"/>
+            </a:fontRef>
+          </p:style>
+          <p:txBody>
+            <a:bodyPr rtlCol="0" anchor="ctr"/>
+            <a:lstStyle/>
+            <a:p>
+              <a:pPr algn="ctr"/>
+              <a:endParaRPr lang="ko-KR" altLang="en-US"/>
+            </a:p>
+          </p:txBody>
+        </p:sp>
+        <p:sp>
+          <p:nvSpPr>
+            <p:cNvPr id="102" name="직사각형 101">
+              <a:extLst>
+                <a:ext uri="{FF2B5EF4-FFF2-40B4-BE49-F238E27FC236}">
+                  <a16:creationId xmlns:a16="http://schemas.microsoft.com/office/drawing/2014/main" id="{CC133D0D-968B-F616-43C1-906162133DA3}"/>
+                </a:ext>
+              </a:extLst>
+            </p:cNvPr>
+            <p:cNvSpPr/>
+            <p:nvPr/>
+          </p:nvSpPr>
+          <p:spPr>
+            <a:xfrm>
+              <a:off x="2548699" y="3015717"/>
+              <a:ext cx="144007" cy="101600"/>
+            </a:xfrm>
+            <a:prstGeom prst="rect">
+              <a:avLst/>
+            </a:prstGeom>
+            <a:solidFill>
+              <a:schemeClr val="bg1"/>
+            </a:solidFill>
+            <a:ln>
+              <a:noFill/>
+            </a:ln>
+          </p:spPr>
+          <p:style>
+            <a:lnRef idx="2">
+              <a:schemeClr val="accent1">
+                <a:shade val="15000"/>
+              </a:schemeClr>
+            </a:lnRef>
+            <a:fillRef idx="1">
+              <a:schemeClr val="accent1"/>
+            </a:fillRef>
+            <a:effectRef idx="0">
+              <a:schemeClr val="accent1"/>
+            </a:effectRef>
+            <a:fontRef idx="minor">
+              <a:schemeClr val="lt1"/>
+            </a:fontRef>
+          </p:style>
+          <p:txBody>
+            <a:bodyPr wrap="square" rtlCol="0" anchor="ctr">
+              <a:noAutofit/>
+            </a:bodyPr>
+            <a:lstStyle/>
+            <a:p>
+              <a:pPr algn="ctr"/>
+              <a:endParaRPr lang="ko-KR" altLang="en-US"/>
+            </a:p>
+          </p:txBody>
+        </p:sp>
+        <p:sp>
+          <p:nvSpPr>
+            <p:cNvPr id="103" name="직사각형 102">
+              <a:extLst>
+                <a:ext uri="{FF2B5EF4-FFF2-40B4-BE49-F238E27FC236}">
+                  <a16:creationId xmlns:a16="http://schemas.microsoft.com/office/drawing/2014/main" id="{D7167595-E61D-F6E5-748A-1442CFA8FE7D}"/>
+                </a:ext>
+              </a:extLst>
+            </p:cNvPr>
+            <p:cNvSpPr/>
+            <p:nvPr/>
+          </p:nvSpPr>
+          <p:spPr>
+            <a:xfrm rot="5400000">
+              <a:off x="2911183" y="3374613"/>
+              <a:ext cx="144007" cy="101600"/>
+            </a:xfrm>
+            <a:prstGeom prst="rect">
+              <a:avLst/>
+            </a:prstGeom>
+            <a:solidFill>
+              <a:schemeClr val="bg1"/>
+            </a:solidFill>
+            <a:ln>
+              <a:noFill/>
+            </a:ln>
+          </p:spPr>
+          <p:style>
+            <a:lnRef idx="2">
+              <a:schemeClr val="accent1">
+                <a:shade val="15000"/>
+              </a:schemeClr>
+            </a:lnRef>
+            <a:fillRef idx="1">
+              <a:schemeClr val="accent1"/>
+            </a:fillRef>
+            <a:effectRef idx="0">
+              <a:schemeClr val="accent1"/>
+            </a:effectRef>
+            <a:fontRef idx="minor">
+              <a:schemeClr val="lt1"/>
+            </a:fontRef>
+          </p:style>
+          <p:txBody>
+            <a:bodyPr wrap="square" rtlCol="0" anchor="ctr">
+              <a:noAutofit/>
+            </a:bodyPr>
+            <a:lstStyle/>
+            <a:p>
+              <a:pPr algn="ctr"/>
+              <a:endParaRPr lang="ko-KR" altLang="en-US"/>
+            </a:p>
+          </p:txBody>
+        </p:sp>
+        <p:sp>
+          <p:nvSpPr>
+            <p:cNvPr id="104" name="직사각형 103">
+              <a:extLst>
+                <a:ext uri="{FF2B5EF4-FFF2-40B4-BE49-F238E27FC236}">
+                  <a16:creationId xmlns:a16="http://schemas.microsoft.com/office/drawing/2014/main" id="{F77B33F7-B983-9EB0-ACF0-7B614181B6EE}"/>
+                </a:ext>
+              </a:extLst>
+            </p:cNvPr>
+            <p:cNvSpPr/>
+            <p:nvPr/>
+          </p:nvSpPr>
+          <p:spPr>
+            <a:xfrm rot="2700000">
+              <a:off x="2805012" y="3125472"/>
+              <a:ext cx="144007" cy="101600"/>
+            </a:xfrm>
+            <a:prstGeom prst="rect">
+              <a:avLst/>
+            </a:prstGeom>
+            <a:solidFill>
+              <a:schemeClr val="bg1"/>
+            </a:solidFill>
+            <a:ln>
+              <a:noFill/>
+            </a:ln>
+          </p:spPr>
+          <p:style>
+            <a:lnRef idx="2">
+              <a:schemeClr val="accent1">
+                <a:shade val="15000"/>
+              </a:schemeClr>
+            </a:lnRef>
+            <a:fillRef idx="1">
+              <a:schemeClr val="accent1"/>
+            </a:fillRef>
+            <a:effectRef idx="0">
+              <a:schemeClr val="accent1"/>
+            </a:effectRef>
+            <a:fontRef idx="minor">
+              <a:schemeClr val="lt1"/>
+            </a:fontRef>
+          </p:style>
+          <p:txBody>
+            <a:bodyPr wrap="square" rtlCol="0" anchor="ctr">
+              <a:noAutofit/>
+            </a:bodyPr>
+            <a:lstStyle/>
+            <a:p>
+              <a:pPr algn="ctr"/>
+              <a:endParaRPr lang="ko-KR" altLang="en-US"/>
+            </a:p>
+          </p:txBody>
+        </p:sp>
+        <p:sp>
+          <p:nvSpPr>
+            <p:cNvPr id="105" name="직사각형 104">
+              <a:extLst>
+                <a:ext uri="{FF2B5EF4-FFF2-40B4-BE49-F238E27FC236}">
+                  <a16:creationId xmlns:a16="http://schemas.microsoft.com/office/drawing/2014/main" id="{25243F2A-C7B0-16CC-71B8-C83256388612}"/>
+                </a:ext>
+              </a:extLst>
+            </p:cNvPr>
+            <p:cNvSpPr/>
+            <p:nvPr/>
+          </p:nvSpPr>
+          <p:spPr>
+            <a:xfrm rot="10800000">
+              <a:off x="2548699" y="3737096"/>
+              <a:ext cx="144007" cy="101600"/>
+            </a:xfrm>
+            <a:prstGeom prst="rect">
+              <a:avLst/>
+            </a:prstGeom>
+            <a:solidFill>
+              <a:srgbClr val="49BEFD"/>
+            </a:solidFill>
+            <a:ln>
+              <a:noFill/>
+            </a:ln>
+          </p:spPr>
+          <p:style>
+            <a:lnRef idx="2">
+              <a:schemeClr val="accent1">
+                <a:shade val="15000"/>
+              </a:schemeClr>
+            </a:lnRef>
+            <a:fillRef idx="1">
+              <a:schemeClr val="accent1"/>
+            </a:fillRef>
+            <a:effectRef idx="0">
+              <a:schemeClr val="accent1"/>
+            </a:effectRef>
+            <a:fontRef idx="minor">
+              <a:schemeClr val="lt1"/>
+            </a:fontRef>
+          </p:style>
+          <p:txBody>
+            <a:bodyPr wrap="square" rtlCol="0" anchor="ctr">
+              <a:noAutofit/>
+            </a:bodyPr>
+            <a:lstStyle/>
+            <a:p>
+              <a:pPr algn="ctr"/>
+              <a:endParaRPr lang="ko-KR" altLang="en-US"/>
+            </a:p>
+          </p:txBody>
+        </p:sp>
+        <p:sp>
+          <p:nvSpPr>
+            <p:cNvPr id="106" name="직사각형 105">
+              <a:extLst>
+                <a:ext uri="{FF2B5EF4-FFF2-40B4-BE49-F238E27FC236}">
+                  <a16:creationId xmlns:a16="http://schemas.microsoft.com/office/drawing/2014/main" id="{BB5D1D0E-3A57-7E38-ECF9-0B56B359489B}"/>
+                </a:ext>
+              </a:extLst>
+            </p:cNvPr>
+            <p:cNvSpPr/>
+            <p:nvPr/>
+          </p:nvSpPr>
+          <p:spPr>
+            <a:xfrm rot="16200000">
+              <a:off x="2186215" y="3378200"/>
+              <a:ext cx="144007" cy="101600"/>
+            </a:xfrm>
+            <a:prstGeom prst="rect">
+              <a:avLst/>
+            </a:prstGeom>
+            <a:solidFill>
+              <a:srgbClr val="49BEFD"/>
+            </a:solidFill>
+            <a:ln>
+              <a:noFill/>
+            </a:ln>
+          </p:spPr>
+          <p:style>
+            <a:lnRef idx="2">
+              <a:schemeClr val="accent1">
+                <a:shade val="15000"/>
+              </a:schemeClr>
+            </a:lnRef>
+            <a:fillRef idx="1">
+              <a:schemeClr val="accent1"/>
+            </a:fillRef>
+            <a:effectRef idx="0">
+              <a:schemeClr val="accent1"/>
+            </a:effectRef>
+            <a:fontRef idx="minor">
+              <a:schemeClr val="lt1"/>
+            </a:fontRef>
+          </p:style>
+          <p:txBody>
+            <a:bodyPr wrap="square" rtlCol="0" anchor="ctr">
+              <a:noAutofit/>
+            </a:bodyPr>
+            <a:lstStyle/>
+            <a:p>
+              <a:pPr algn="ctr"/>
+              <a:endParaRPr lang="ko-KR" altLang="en-US"/>
+            </a:p>
+          </p:txBody>
+        </p:sp>
+        <p:sp>
+          <p:nvSpPr>
+            <p:cNvPr id="107" name="직사각형 106">
+              <a:extLst>
+                <a:ext uri="{FF2B5EF4-FFF2-40B4-BE49-F238E27FC236}">
+                  <a16:creationId xmlns:a16="http://schemas.microsoft.com/office/drawing/2014/main" id="{AD7C5124-562D-C0E6-DC53-A618B954C798}"/>
+                </a:ext>
+              </a:extLst>
+            </p:cNvPr>
+            <p:cNvSpPr/>
+            <p:nvPr/>
+          </p:nvSpPr>
+          <p:spPr>
+            <a:xfrm rot="13500000">
+              <a:off x="2292386" y="3627341"/>
+              <a:ext cx="144007" cy="101600"/>
+            </a:xfrm>
+            <a:prstGeom prst="rect">
+              <a:avLst/>
+            </a:prstGeom>
+            <a:solidFill>
+              <a:srgbClr val="49BEFD"/>
+            </a:solidFill>
+            <a:ln>
+              <a:noFill/>
+            </a:ln>
+          </p:spPr>
+          <p:style>
+            <a:lnRef idx="2">
+              <a:schemeClr val="accent1">
+                <a:shade val="15000"/>
+              </a:schemeClr>
+            </a:lnRef>
+            <a:fillRef idx="1">
+              <a:schemeClr val="accent1"/>
+            </a:fillRef>
+            <a:effectRef idx="0">
+              <a:schemeClr val="accent1"/>
+            </a:effectRef>
+            <a:fontRef idx="minor">
+              <a:schemeClr val="lt1"/>
+            </a:fontRef>
+          </p:style>
+          <p:txBody>
+            <a:bodyPr wrap="square" rtlCol="0" anchor="ctr">
+              <a:noAutofit/>
+            </a:bodyPr>
+            <a:lstStyle/>
+            <a:p>
+              <a:pPr algn="ctr"/>
+              <a:endParaRPr lang="ko-KR" altLang="en-US"/>
+            </a:p>
+          </p:txBody>
+        </p:sp>
+      </p:grpSp>
     </p:spTree>
     <p:extLst>
       <p:ext uri="{BB962C8B-B14F-4D97-AF65-F5344CB8AC3E}">

</xml_diff>

<commit_message>
Added Icon for Kakaotalk
</commit_message>
<xml_diff>
--- a/tepk2924_Custon_Icon.pptx
+++ b/tepk2924_Custon_Icon.pptx
@@ -273,7 +273,7 @@
           <a:p>
             <a:fld id="{5514A77A-5394-47DD-9A3D-6F42195EF4ED}" type="datetimeFigureOut">
               <a:rPr lang="ko-KR" altLang="en-US" smtClean="0"/>
-              <a:t>2024-07-09</a:t>
+              <a:t>2024-07-27</a:t>
             </a:fld>
             <a:endParaRPr lang="ko-KR" altLang="en-US"/>
           </a:p>
@@ -471,7 +471,7 @@
           <a:p>
             <a:fld id="{5514A77A-5394-47DD-9A3D-6F42195EF4ED}" type="datetimeFigureOut">
               <a:rPr lang="ko-KR" altLang="en-US" smtClean="0"/>
-              <a:t>2024-07-09</a:t>
+              <a:t>2024-07-27</a:t>
             </a:fld>
             <a:endParaRPr lang="ko-KR" altLang="en-US"/>
           </a:p>
@@ -679,7 +679,7 @@
           <a:p>
             <a:fld id="{5514A77A-5394-47DD-9A3D-6F42195EF4ED}" type="datetimeFigureOut">
               <a:rPr lang="ko-KR" altLang="en-US" smtClean="0"/>
-              <a:t>2024-07-09</a:t>
+              <a:t>2024-07-27</a:t>
             </a:fld>
             <a:endParaRPr lang="ko-KR" altLang="en-US"/>
           </a:p>
@@ -877,7 +877,7 @@
           <a:p>
             <a:fld id="{5514A77A-5394-47DD-9A3D-6F42195EF4ED}" type="datetimeFigureOut">
               <a:rPr lang="ko-KR" altLang="en-US" smtClean="0"/>
-              <a:t>2024-07-09</a:t>
+              <a:t>2024-07-27</a:t>
             </a:fld>
             <a:endParaRPr lang="ko-KR" altLang="en-US"/>
           </a:p>
@@ -1152,7 +1152,7 @@
           <a:p>
             <a:fld id="{5514A77A-5394-47DD-9A3D-6F42195EF4ED}" type="datetimeFigureOut">
               <a:rPr lang="ko-KR" altLang="en-US" smtClean="0"/>
-              <a:t>2024-07-09</a:t>
+              <a:t>2024-07-27</a:t>
             </a:fld>
             <a:endParaRPr lang="ko-KR" altLang="en-US"/>
           </a:p>
@@ -1417,7 +1417,7 @@
           <a:p>
             <a:fld id="{5514A77A-5394-47DD-9A3D-6F42195EF4ED}" type="datetimeFigureOut">
               <a:rPr lang="ko-KR" altLang="en-US" smtClean="0"/>
-              <a:t>2024-07-09</a:t>
+              <a:t>2024-07-27</a:t>
             </a:fld>
             <a:endParaRPr lang="ko-KR" altLang="en-US"/>
           </a:p>
@@ -1829,7 +1829,7 @@
           <a:p>
             <a:fld id="{5514A77A-5394-47DD-9A3D-6F42195EF4ED}" type="datetimeFigureOut">
               <a:rPr lang="ko-KR" altLang="en-US" smtClean="0"/>
-              <a:t>2024-07-09</a:t>
+              <a:t>2024-07-27</a:t>
             </a:fld>
             <a:endParaRPr lang="ko-KR" altLang="en-US"/>
           </a:p>
@@ -1970,7 +1970,7 @@
           <a:p>
             <a:fld id="{5514A77A-5394-47DD-9A3D-6F42195EF4ED}" type="datetimeFigureOut">
               <a:rPr lang="ko-KR" altLang="en-US" smtClean="0"/>
-              <a:t>2024-07-09</a:t>
+              <a:t>2024-07-27</a:t>
             </a:fld>
             <a:endParaRPr lang="ko-KR" altLang="en-US"/>
           </a:p>
@@ -2083,7 +2083,7 @@
           <a:p>
             <a:fld id="{5514A77A-5394-47DD-9A3D-6F42195EF4ED}" type="datetimeFigureOut">
               <a:rPr lang="ko-KR" altLang="en-US" smtClean="0"/>
-              <a:t>2024-07-09</a:t>
+              <a:t>2024-07-27</a:t>
             </a:fld>
             <a:endParaRPr lang="ko-KR" altLang="en-US"/>
           </a:p>
@@ -2394,7 +2394,7 @@
           <a:p>
             <a:fld id="{5514A77A-5394-47DD-9A3D-6F42195EF4ED}" type="datetimeFigureOut">
               <a:rPr lang="ko-KR" altLang="en-US" smtClean="0"/>
-              <a:t>2024-07-09</a:t>
+              <a:t>2024-07-27</a:t>
             </a:fld>
             <a:endParaRPr lang="ko-KR" altLang="en-US"/>
           </a:p>
@@ -2682,7 +2682,7 @@
           <a:p>
             <a:fld id="{5514A77A-5394-47DD-9A3D-6F42195EF4ED}" type="datetimeFigureOut">
               <a:rPr lang="ko-KR" altLang="en-US" smtClean="0"/>
-              <a:t>2024-07-09</a:t>
+              <a:t>2024-07-27</a:t>
             </a:fld>
             <a:endParaRPr lang="ko-KR" altLang="en-US"/>
           </a:p>
@@ -2923,7 +2923,7 @@
           <a:p>
             <a:fld id="{5514A77A-5394-47DD-9A3D-6F42195EF4ED}" type="datetimeFigureOut">
               <a:rPr lang="ko-KR" altLang="en-US" smtClean="0"/>
-              <a:t>2024-07-09</a:t>
+              <a:t>2024-07-27</a:t>
             </a:fld>
             <a:endParaRPr lang="ko-KR" altLang="en-US"/>
           </a:p>
@@ -14160,6 +14160,315 @@
           </p:txBody>
         </p:sp>
       </p:grpSp>
+      <p:grpSp>
+        <p:nvGrpSpPr>
+          <p:cNvPr id="82" name="그룹 81">
+            <a:extLst>
+              <a:ext uri="{FF2B5EF4-FFF2-40B4-BE49-F238E27FC236}">
+                <a16:creationId xmlns:a16="http://schemas.microsoft.com/office/drawing/2014/main" id="{64B75A8E-B899-351E-AFBB-CDFCB02AA0C8}"/>
+              </a:ext>
+            </a:extLst>
+          </p:cNvPr>
+          <p:cNvGrpSpPr/>
+          <p:nvPr/>
+        </p:nvGrpSpPr>
+        <p:grpSpPr>
+          <a:xfrm>
+            <a:off x="4176716" y="4430746"/>
+            <a:ext cx="1440000" cy="1440000"/>
+            <a:chOff x="2372799" y="3240015"/>
+            <a:chExt cx="1440000" cy="1440000"/>
+          </a:xfrm>
+        </p:grpSpPr>
+        <p:sp>
+          <p:nvSpPr>
+            <p:cNvPr id="83" name="팔각형 82">
+              <a:extLst>
+                <a:ext uri="{FF2B5EF4-FFF2-40B4-BE49-F238E27FC236}">
+                  <a16:creationId xmlns:a16="http://schemas.microsoft.com/office/drawing/2014/main" id="{F9D76871-95A8-A42B-E6AC-2AD5013DDE4F}"/>
+                </a:ext>
+              </a:extLst>
+            </p:cNvPr>
+            <p:cNvSpPr/>
+            <p:nvPr/>
+          </p:nvSpPr>
+          <p:spPr>
+            <a:xfrm>
+              <a:off x="2372799" y="3240015"/>
+              <a:ext cx="1440000" cy="1440000"/>
+            </a:xfrm>
+            <a:prstGeom prst="octagon">
+              <a:avLst>
+                <a:gd name="adj" fmla="val 10714"/>
+              </a:avLst>
+            </a:prstGeom>
+            <a:solidFill>
+              <a:srgbClr val="FAE100"/>
+            </a:solidFill>
+            <a:ln>
+              <a:noFill/>
+            </a:ln>
+          </p:spPr>
+          <p:style>
+            <a:lnRef idx="2">
+              <a:schemeClr val="accent1">
+                <a:shade val="15000"/>
+              </a:schemeClr>
+            </a:lnRef>
+            <a:fillRef idx="1">
+              <a:schemeClr val="accent1"/>
+            </a:fillRef>
+            <a:effectRef idx="0">
+              <a:schemeClr val="accent1"/>
+            </a:effectRef>
+            <a:fontRef idx="minor">
+              <a:schemeClr val="lt1"/>
+            </a:fontRef>
+          </p:style>
+          <p:txBody>
+            <a:bodyPr rtlCol="0" anchor="ctr"/>
+            <a:lstStyle/>
+            <a:p>
+              <a:pPr algn="ctr"/>
+              <a:endParaRPr lang="ko-KR" altLang="en-US"/>
+            </a:p>
+          </p:txBody>
+        </p:sp>
+        <p:sp>
+          <p:nvSpPr>
+            <p:cNvPr id="84" name="자유형: 도형 83">
+              <a:extLst>
+                <a:ext uri="{FF2B5EF4-FFF2-40B4-BE49-F238E27FC236}">
+                  <a16:creationId xmlns:a16="http://schemas.microsoft.com/office/drawing/2014/main" id="{85834566-0596-809E-ACE7-B2C29A1729D9}"/>
+                </a:ext>
+              </a:extLst>
+            </p:cNvPr>
+            <p:cNvSpPr/>
+            <p:nvPr/>
+          </p:nvSpPr>
+          <p:spPr>
+            <a:xfrm>
+              <a:off x="2557592" y="3428999"/>
+              <a:ext cx="1070414" cy="1035743"/>
+            </a:xfrm>
+            <a:custGeom>
+              <a:avLst/>
+              <a:gdLst>
+                <a:gd name="connsiteX0" fmla="*/ 298384 w 1070414"/>
+                <a:gd name="connsiteY0" fmla="*/ 184467 h 1035743"/>
+                <a:gd name="connsiteX1" fmla="*/ 298384 w 1070414"/>
+                <a:gd name="connsiteY1" fmla="*/ 256467 h 1035743"/>
+                <a:gd name="connsiteX2" fmla="*/ 499207 w 1070414"/>
+                <a:gd name="connsiteY2" fmla="*/ 256467 h 1035743"/>
+                <a:gd name="connsiteX3" fmla="*/ 499207 w 1070414"/>
+                <a:gd name="connsiteY3" fmla="*/ 665559 h 1035743"/>
+                <a:gd name="connsiteX4" fmla="*/ 571207 w 1070414"/>
+                <a:gd name="connsiteY4" fmla="*/ 665559 h 1035743"/>
+                <a:gd name="connsiteX5" fmla="*/ 571207 w 1070414"/>
+                <a:gd name="connsiteY5" fmla="*/ 256467 h 1035743"/>
+                <a:gd name="connsiteX6" fmla="*/ 772030 w 1070414"/>
+                <a:gd name="connsiteY6" fmla="*/ 256467 h 1035743"/>
+                <a:gd name="connsiteX7" fmla="*/ 772030 w 1070414"/>
+                <a:gd name="connsiteY7" fmla="*/ 184467 h 1035743"/>
+                <a:gd name="connsiteX8" fmla="*/ 244952 w 1070414"/>
+                <a:gd name="connsiteY8" fmla="*/ 0 h 1035743"/>
+                <a:gd name="connsiteX9" fmla="*/ 825462 w 1070414"/>
+                <a:gd name="connsiteY9" fmla="*/ 0 h 1035743"/>
+                <a:gd name="connsiteX10" fmla="*/ 1070414 w 1070414"/>
+                <a:gd name="connsiteY10" fmla="*/ 244952 h 1035743"/>
+                <a:gd name="connsiteX11" fmla="*/ 1070414 w 1070414"/>
+                <a:gd name="connsiteY11" fmla="*/ 591376 h 1035743"/>
+                <a:gd name="connsiteX12" fmla="*/ 825462 w 1070414"/>
+                <a:gd name="connsiteY12" fmla="*/ 836328 h 1035743"/>
+                <a:gd name="connsiteX13" fmla="*/ 446865 w 1070414"/>
+                <a:gd name="connsiteY13" fmla="*/ 836328 h 1035743"/>
+                <a:gd name="connsiteX14" fmla="*/ 446865 w 1070414"/>
+                <a:gd name="connsiteY14" fmla="*/ 945853 h 1035743"/>
+                <a:gd name="connsiteX15" fmla="*/ 356975 w 1070414"/>
+                <a:gd name="connsiteY15" fmla="*/ 1035743 h 1035743"/>
+                <a:gd name="connsiteX16" fmla="*/ 229849 w 1070414"/>
+                <a:gd name="connsiteY16" fmla="*/ 1035743 h 1035743"/>
+                <a:gd name="connsiteX17" fmla="*/ 139959 w 1070414"/>
+                <a:gd name="connsiteY17" fmla="*/ 945853 h 1035743"/>
+                <a:gd name="connsiteX18" fmla="*/ 139959 w 1070414"/>
+                <a:gd name="connsiteY18" fmla="*/ 731335 h 1035743"/>
+                <a:gd name="connsiteX19" fmla="*/ 0 w 1070414"/>
+                <a:gd name="connsiteY19" fmla="*/ 591376 h 1035743"/>
+                <a:gd name="connsiteX20" fmla="*/ 0 w 1070414"/>
+                <a:gd name="connsiteY20" fmla="*/ 244952 h 1035743"/>
+              </a:gdLst>
+              <a:ahLst/>
+              <a:cxnLst>
+                <a:cxn ang="0">
+                  <a:pos x="connsiteX0" y="connsiteY0"/>
+                </a:cxn>
+                <a:cxn ang="0">
+                  <a:pos x="connsiteX1" y="connsiteY1"/>
+                </a:cxn>
+                <a:cxn ang="0">
+                  <a:pos x="connsiteX2" y="connsiteY2"/>
+                </a:cxn>
+                <a:cxn ang="0">
+                  <a:pos x="connsiteX3" y="connsiteY3"/>
+                </a:cxn>
+                <a:cxn ang="0">
+                  <a:pos x="connsiteX4" y="connsiteY4"/>
+                </a:cxn>
+                <a:cxn ang="0">
+                  <a:pos x="connsiteX5" y="connsiteY5"/>
+                </a:cxn>
+                <a:cxn ang="0">
+                  <a:pos x="connsiteX6" y="connsiteY6"/>
+                </a:cxn>
+                <a:cxn ang="0">
+                  <a:pos x="connsiteX7" y="connsiteY7"/>
+                </a:cxn>
+                <a:cxn ang="0">
+                  <a:pos x="connsiteX8" y="connsiteY8"/>
+                </a:cxn>
+                <a:cxn ang="0">
+                  <a:pos x="connsiteX9" y="connsiteY9"/>
+                </a:cxn>
+                <a:cxn ang="0">
+                  <a:pos x="connsiteX10" y="connsiteY10"/>
+                </a:cxn>
+                <a:cxn ang="0">
+                  <a:pos x="connsiteX11" y="connsiteY11"/>
+                </a:cxn>
+                <a:cxn ang="0">
+                  <a:pos x="connsiteX12" y="connsiteY12"/>
+                </a:cxn>
+                <a:cxn ang="0">
+                  <a:pos x="connsiteX13" y="connsiteY13"/>
+                </a:cxn>
+                <a:cxn ang="0">
+                  <a:pos x="connsiteX14" y="connsiteY14"/>
+                </a:cxn>
+                <a:cxn ang="0">
+                  <a:pos x="connsiteX15" y="connsiteY15"/>
+                </a:cxn>
+                <a:cxn ang="0">
+                  <a:pos x="connsiteX16" y="connsiteY16"/>
+                </a:cxn>
+                <a:cxn ang="0">
+                  <a:pos x="connsiteX17" y="connsiteY17"/>
+                </a:cxn>
+                <a:cxn ang="0">
+                  <a:pos x="connsiteX18" y="connsiteY18"/>
+                </a:cxn>
+                <a:cxn ang="0">
+                  <a:pos x="connsiteX19" y="connsiteY19"/>
+                </a:cxn>
+                <a:cxn ang="0">
+                  <a:pos x="connsiteX20" y="connsiteY20"/>
+                </a:cxn>
+              </a:cxnLst>
+              <a:rect l="l" t="t" r="r" b="b"/>
+              <a:pathLst>
+                <a:path w="1070414" h="1035743">
+                  <a:moveTo>
+                    <a:pt x="298384" y="184467"/>
+                  </a:moveTo>
+                  <a:lnTo>
+                    <a:pt x="298384" y="256467"/>
+                  </a:lnTo>
+                  <a:lnTo>
+                    <a:pt x="499207" y="256467"/>
+                  </a:lnTo>
+                  <a:lnTo>
+                    <a:pt x="499207" y="665559"/>
+                  </a:lnTo>
+                  <a:lnTo>
+                    <a:pt x="571207" y="665559"/>
+                  </a:lnTo>
+                  <a:lnTo>
+                    <a:pt x="571207" y="256467"/>
+                  </a:lnTo>
+                  <a:lnTo>
+                    <a:pt x="772030" y="256467"/>
+                  </a:lnTo>
+                  <a:lnTo>
+                    <a:pt x="772030" y="184467"/>
+                  </a:lnTo>
+                  <a:close/>
+                  <a:moveTo>
+                    <a:pt x="244952" y="0"/>
+                  </a:moveTo>
+                  <a:lnTo>
+                    <a:pt x="825462" y="0"/>
+                  </a:lnTo>
+                  <a:lnTo>
+                    <a:pt x="1070414" y="244952"/>
+                  </a:lnTo>
+                  <a:lnTo>
+                    <a:pt x="1070414" y="591376"/>
+                  </a:lnTo>
+                  <a:lnTo>
+                    <a:pt x="825462" y="836328"/>
+                  </a:lnTo>
+                  <a:lnTo>
+                    <a:pt x="446865" y="836328"/>
+                  </a:lnTo>
+                  <a:lnTo>
+                    <a:pt x="446865" y="945853"/>
+                  </a:lnTo>
+                  <a:lnTo>
+                    <a:pt x="356975" y="1035743"/>
+                  </a:lnTo>
+                  <a:lnTo>
+                    <a:pt x="229849" y="1035743"/>
+                  </a:lnTo>
+                  <a:lnTo>
+                    <a:pt x="139959" y="945853"/>
+                  </a:lnTo>
+                  <a:lnTo>
+                    <a:pt x="139959" y="731335"/>
+                  </a:lnTo>
+                  <a:lnTo>
+                    <a:pt x="0" y="591376"/>
+                  </a:lnTo>
+                  <a:lnTo>
+                    <a:pt x="0" y="244952"/>
+                  </a:lnTo>
+                  <a:close/>
+                </a:path>
+              </a:pathLst>
+            </a:custGeom>
+            <a:solidFill>
+              <a:srgbClr val="3C1E1E"/>
+            </a:solidFill>
+            <a:ln>
+              <a:noFill/>
+            </a:ln>
+          </p:spPr>
+          <p:style>
+            <a:lnRef idx="2">
+              <a:schemeClr val="accent1">
+                <a:shade val="15000"/>
+              </a:schemeClr>
+            </a:lnRef>
+            <a:fillRef idx="1">
+              <a:schemeClr val="accent1"/>
+            </a:fillRef>
+            <a:effectRef idx="0">
+              <a:schemeClr val="accent1"/>
+            </a:effectRef>
+            <a:fontRef idx="minor">
+              <a:schemeClr val="lt1"/>
+            </a:fontRef>
+          </p:style>
+          <p:txBody>
+            <a:bodyPr wrap="square" rtlCol="0" anchor="ctr">
+              <a:noAutofit/>
+            </a:bodyPr>
+            <a:lstStyle/>
+            <a:p>
+              <a:pPr algn="ctr"/>
+              <a:endParaRPr lang="ko-KR" altLang="en-US"/>
+            </a:p>
+          </p:txBody>
+        </p:sp>
+      </p:grpSp>
     </p:spTree>
     <p:extLst>
       <p:ext uri="{BB962C8B-B14F-4D97-AF65-F5344CB8AC3E}">

</xml_diff>

<commit_message>
Added icon of A Dance of Fiare and Ice
</commit_message>
<xml_diff>
--- a/tepk2924_Custon_Icon.pptx
+++ b/tepk2924_Custon_Icon.pptx
@@ -273,7 +273,7 @@
           <a:p>
             <a:fld id="{5514A77A-5394-47DD-9A3D-6F42195EF4ED}" type="datetimeFigureOut">
               <a:rPr lang="ko-KR" altLang="en-US" smtClean="0"/>
-              <a:t>2024-07-27</a:t>
+              <a:t>2024-08-05</a:t>
             </a:fld>
             <a:endParaRPr lang="ko-KR" altLang="en-US"/>
           </a:p>
@@ -471,7 +471,7 @@
           <a:p>
             <a:fld id="{5514A77A-5394-47DD-9A3D-6F42195EF4ED}" type="datetimeFigureOut">
               <a:rPr lang="ko-KR" altLang="en-US" smtClean="0"/>
-              <a:t>2024-07-27</a:t>
+              <a:t>2024-08-05</a:t>
             </a:fld>
             <a:endParaRPr lang="ko-KR" altLang="en-US"/>
           </a:p>
@@ -679,7 +679,7 @@
           <a:p>
             <a:fld id="{5514A77A-5394-47DD-9A3D-6F42195EF4ED}" type="datetimeFigureOut">
               <a:rPr lang="ko-KR" altLang="en-US" smtClean="0"/>
-              <a:t>2024-07-27</a:t>
+              <a:t>2024-08-05</a:t>
             </a:fld>
             <a:endParaRPr lang="ko-KR" altLang="en-US"/>
           </a:p>
@@ -877,7 +877,7 @@
           <a:p>
             <a:fld id="{5514A77A-5394-47DD-9A3D-6F42195EF4ED}" type="datetimeFigureOut">
               <a:rPr lang="ko-KR" altLang="en-US" smtClean="0"/>
-              <a:t>2024-07-27</a:t>
+              <a:t>2024-08-05</a:t>
             </a:fld>
             <a:endParaRPr lang="ko-KR" altLang="en-US"/>
           </a:p>
@@ -1152,7 +1152,7 @@
           <a:p>
             <a:fld id="{5514A77A-5394-47DD-9A3D-6F42195EF4ED}" type="datetimeFigureOut">
               <a:rPr lang="ko-KR" altLang="en-US" smtClean="0"/>
-              <a:t>2024-07-27</a:t>
+              <a:t>2024-08-05</a:t>
             </a:fld>
             <a:endParaRPr lang="ko-KR" altLang="en-US"/>
           </a:p>
@@ -1417,7 +1417,7 @@
           <a:p>
             <a:fld id="{5514A77A-5394-47DD-9A3D-6F42195EF4ED}" type="datetimeFigureOut">
               <a:rPr lang="ko-KR" altLang="en-US" smtClean="0"/>
-              <a:t>2024-07-27</a:t>
+              <a:t>2024-08-05</a:t>
             </a:fld>
             <a:endParaRPr lang="ko-KR" altLang="en-US"/>
           </a:p>
@@ -1829,7 +1829,7 @@
           <a:p>
             <a:fld id="{5514A77A-5394-47DD-9A3D-6F42195EF4ED}" type="datetimeFigureOut">
               <a:rPr lang="ko-KR" altLang="en-US" smtClean="0"/>
-              <a:t>2024-07-27</a:t>
+              <a:t>2024-08-05</a:t>
             </a:fld>
             <a:endParaRPr lang="ko-KR" altLang="en-US"/>
           </a:p>
@@ -1970,7 +1970,7 @@
           <a:p>
             <a:fld id="{5514A77A-5394-47DD-9A3D-6F42195EF4ED}" type="datetimeFigureOut">
               <a:rPr lang="ko-KR" altLang="en-US" smtClean="0"/>
-              <a:t>2024-07-27</a:t>
+              <a:t>2024-08-05</a:t>
             </a:fld>
             <a:endParaRPr lang="ko-KR" altLang="en-US"/>
           </a:p>
@@ -2083,7 +2083,7 @@
           <a:p>
             <a:fld id="{5514A77A-5394-47DD-9A3D-6F42195EF4ED}" type="datetimeFigureOut">
               <a:rPr lang="ko-KR" altLang="en-US" smtClean="0"/>
-              <a:t>2024-07-27</a:t>
+              <a:t>2024-08-05</a:t>
             </a:fld>
             <a:endParaRPr lang="ko-KR" altLang="en-US"/>
           </a:p>
@@ -2394,7 +2394,7 @@
           <a:p>
             <a:fld id="{5514A77A-5394-47DD-9A3D-6F42195EF4ED}" type="datetimeFigureOut">
               <a:rPr lang="ko-KR" altLang="en-US" smtClean="0"/>
-              <a:t>2024-07-27</a:t>
+              <a:t>2024-08-05</a:t>
             </a:fld>
             <a:endParaRPr lang="ko-KR" altLang="en-US"/>
           </a:p>
@@ -2682,7 +2682,7 @@
           <a:p>
             <a:fld id="{5514A77A-5394-47DD-9A3D-6F42195EF4ED}" type="datetimeFigureOut">
               <a:rPr lang="ko-KR" altLang="en-US" smtClean="0"/>
-              <a:t>2024-07-27</a:t>
+              <a:t>2024-08-05</a:t>
             </a:fld>
             <a:endParaRPr lang="ko-KR" altLang="en-US"/>
           </a:p>
@@ -2923,7 +2923,7 @@
           <a:p>
             <a:fld id="{5514A77A-5394-47DD-9A3D-6F42195EF4ED}" type="datetimeFigureOut">
               <a:rPr lang="ko-KR" altLang="en-US" smtClean="0"/>
-              <a:t>2024-07-27</a:t>
+              <a:t>2024-08-05</a:t>
             </a:fld>
             <a:endParaRPr lang="ko-KR" altLang="en-US"/>
           </a:p>
@@ -14469,6 +14469,3400 @@
           </p:txBody>
         </p:sp>
       </p:grpSp>
+      <p:grpSp>
+        <p:nvGrpSpPr>
+          <p:cNvPr id="76" name="그룹 75">
+            <a:extLst>
+              <a:ext uri="{FF2B5EF4-FFF2-40B4-BE49-F238E27FC236}">
+                <a16:creationId xmlns:a16="http://schemas.microsoft.com/office/drawing/2014/main" id="{EA972955-0D07-A308-3F7C-FDB61CEFE8A7}"/>
+              </a:ext>
+            </a:extLst>
+          </p:cNvPr>
+          <p:cNvGrpSpPr/>
+          <p:nvPr/>
+        </p:nvGrpSpPr>
+        <p:grpSpPr>
+          <a:xfrm>
+            <a:off x="6157706" y="4430746"/>
+            <a:ext cx="1440000" cy="1440000"/>
+            <a:chOff x="6374364" y="1121488"/>
+            <a:chExt cx="1440000" cy="1440000"/>
+          </a:xfrm>
+        </p:grpSpPr>
+        <p:sp>
+          <p:nvSpPr>
+            <p:cNvPr id="80" name="팔각형 79">
+              <a:extLst>
+                <a:ext uri="{FF2B5EF4-FFF2-40B4-BE49-F238E27FC236}">
+                  <a16:creationId xmlns:a16="http://schemas.microsoft.com/office/drawing/2014/main" id="{107C7871-3FCC-1A36-E6F3-6109F18A6619}"/>
+                </a:ext>
+              </a:extLst>
+            </p:cNvPr>
+            <p:cNvSpPr/>
+            <p:nvPr/>
+          </p:nvSpPr>
+          <p:spPr>
+            <a:xfrm>
+              <a:off x="6374364" y="1121488"/>
+              <a:ext cx="1440000" cy="1440000"/>
+            </a:xfrm>
+            <a:prstGeom prst="octagon">
+              <a:avLst>
+                <a:gd name="adj" fmla="val 7690"/>
+              </a:avLst>
+            </a:prstGeom>
+            <a:gradFill flip="none" rotWithShape="1">
+              <a:gsLst>
+                <a:gs pos="0">
+                  <a:srgbClr val="0D2636"/>
+                </a:gs>
+                <a:gs pos="100000">
+                  <a:srgbClr val="19154A"/>
+                </a:gs>
+              </a:gsLst>
+              <a:lin ang="2700000" scaled="1"/>
+              <a:tileRect/>
+            </a:gradFill>
+            <a:ln>
+              <a:noFill/>
+            </a:ln>
+          </p:spPr>
+          <p:style>
+            <a:lnRef idx="2">
+              <a:schemeClr val="accent1">
+                <a:shade val="15000"/>
+              </a:schemeClr>
+            </a:lnRef>
+            <a:fillRef idx="1">
+              <a:schemeClr val="accent1"/>
+            </a:fillRef>
+            <a:effectRef idx="0">
+              <a:schemeClr val="accent1"/>
+            </a:effectRef>
+            <a:fontRef idx="minor">
+              <a:schemeClr val="lt1"/>
+            </a:fontRef>
+          </p:style>
+          <p:txBody>
+            <a:bodyPr rtlCol="0" anchor="ctr"/>
+            <a:lstStyle/>
+            <a:p>
+              <a:pPr algn="ctr"/>
+              <a:endParaRPr lang="ko-KR" altLang="en-US" dirty="0"/>
+            </a:p>
+          </p:txBody>
+        </p:sp>
+        <p:sp>
+          <p:nvSpPr>
+            <p:cNvPr id="81" name="팔각형 80">
+              <a:extLst>
+                <a:ext uri="{FF2B5EF4-FFF2-40B4-BE49-F238E27FC236}">
+                  <a16:creationId xmlns:a16="http://schemas.microsoft.com/office/drawing/2014/main" id="{2AFDDBB6-7E11-2B88-3CFA-89466142F092}"/>
+                </a:ext>
+              </a:extLst>
+            </p:cNvPr>
+            <p:cNvSpPr/>
+            <p:nvPr/>
+          </p:nvSpPr>
+          <p:spPr>
+            <a:xfrm>
+              <a:off x="6635774" y="1495183"/>
+              <a:ext cx="319858" cy="319858"/>
+            </a:xfrm>
+            <a:prstGeom prst="octagon">
+              <a:avLst/>
+            </a:prstGeom>
+            <a:solidFill>
+              <a:srgbClr val="ED3231"/>
+            </a:solidFill>
+            <a:ln>
+              <a:noFill/>
+            </a:ln>
+          </p:spPr>
+          <p:style>
+            <a:lnRef idx="2">
+              <a:schemeClr val="accent1">
+                <a:shade val="15000"/>
+              </a:schemeClr>
+            </a:lnRef>
+            <a:fillRef idx="1">
+              <a:schemeClr val="accent1"/>
+            </a:fillRef>
+            <a:effectRef idx="0">
+              <a:schemeClr val="accent1"/>
+            </a:effectRef>
+            <a:fontRef idx="minor">
+              <a:schemeClr val="lt1"/>
+            </a:fontRef>
+          </p:style>
+          <p:txBody>
+            <a:bodyPr rtlCol="0" anchor="ctr"/>
+            <a:lstStyle/>
+            <a:p>
+              <a:pPr algn="ctr"/>
+              <a:endParaRPr lang="ko-KR" altLang="en-US"/>
+            </a:p>
+          </p:txBody>
+        </p:sp>
+        <p:sp>
+          <p:nvSpPr>
+            <p:cNvPr id="86" name="팔각형 85">
+              <a:extLst>
+                <a:ext uri="{FF2B5EF4-FFF2-40B4-BE49-F238E27FC236}">
+                  <a16:creationId xmlns:a16="http://schemas.microsoft.com/office/drawing/2014/main" id="{9EE56380-A1FD-5637-06C3-0D43F2B70108}"/>
+                </a:ext>
+              </a:extLst>
+            </p:cNvPr>
+            <p:cNvSpPr/>
+            <p:nvPr/>
+          </p:nvSpPr>
+          <p:spPr>
+            <a:xfrm>
+              <a:off x="6683885" y="1543294"/>
+              <a:ext cx="223636" cy="223636"/>
+            </a:xfrm>
+            <a:prstGeom prst="octagon">
+              <a:avLst/>
+            </a:prstGeom>
+            <a:solidFill>
+              <a:srgbClr val="FFA95B"/>
+            </a:solidFill>
+            <a:ln>
+              <a:noFill/>
+            </a:ln>
+          </p:spPr>
+          <p:style>
+            <a:lnRef idx="2">
+              <a:schemeClr val="accent1">
+                <a:shade val="15000"/>
+              </a:schemeClr>
+            </a:lnRef>
+            <a:fillRef idx="1">
+              <a:schemeClr val="accent1"/>
+            </a:fillRef>
+            <a:effectRef idx="0">
+              <a:schemeClr val="accent1"/>
+            </a:effectRef>
+            <a:fontRef idx="minor">
+              <a:schemeClr val="lt1"/>
+            </a:fontRef>
+          </p:style>
+          <p:txBody>
+            <a:bodyPr rtlCol="0" anchor="ctr"/>
+            <a:lstStyle/>
+            <a:p>
+              <a:pPr algn="ctr"/>
+              <a:endParaRPr lang="ko-KR" altLang="en-US"/>
+            </a:p>
+          </p:txBody>
+        </p:sp>
+        <p:sp>
+          <p:nvSpPr>
+            <p:cNvPr id="108" name="팔각형 107">
+              <a:extLst>
+                <a:ext uri="{FF2B5EF4-FFF2-40B4-BE49-F238E27FC236}">
+                  <a16:creationId xmlns:a16="http://schemas.microsoft.com/office/drawing/2014/main" id="{3585C8D1-8AEB-B9B1-8B58-13FDC23DDC44}"/>
+                </a:ext>
+              </a:extLst>
+            </p:cNvPr>
+            <p:cNvSpPr/>
+            <p:nvPr/>
+          </p:nvSpPr>
+          <p:spPr>
+            <a:xfrm>
+              <a:off x="6862377" y="1332729"/>
+              <a:ext cx="186510" cy="186510"/>
+            </a:xfrm>
+            <a:prstGeom prst="octagon">
+              <a:avLst/>
+            </a:prstGeom>
+            <a:solidFill>
+              <a:srgbClr val="ED3231"/>
+            </a:solidFill>
+            <a:ln>
+              <a:noFill/>
+            </a:ln>
+          </p:spPr>
+          <p:style>
+            <a:lnRef idx="2">
+              <a:schemeClr val="accent1">
+                <a:shade val="15000"/>
+              </a:schemeClr>
+            </a:lnRef>
+            <a:fillRef idx="1">
+              <a:schemeClr val="accent1"/>
+            </a:fillRef>
+            <a:effectRef idx="0">
+              <a:schemeClr val="accent1"/>
+            </a:effectRef>
+            <a:fontRef idx="minor">
+              <a:schemeClr val="lt1"/>
+            </a:fontRef>
+          </p:style>
+          <p:txBody>
+            <a:bodyPr rtlCol="0" anchor="ctr"/>
+            <a:lstStyle/>
+            <a:p>
+              <a:pPr algn="ctr"/>
+              <a:endParaRPr lang="ko-KR" altLang="en-US"/>
+            </a:p>
+          </p:txBody>
+        </p:sp>
+        <p:sp>
+          <p:nvSpPr>
+            <p:cNvPr id="109" name="팔각형 108">
+              <a:extLst>
+                <a:ext uri="{FF2B5EF4-FFF2-40B4-BE49-F238E27FC236}">
+                  <a16:creationId xmlns:a16="http://schemas.microsoft.com/office/drawing/2014/main" id="{FCB4A485-4415-3790-05A9-9584B6F61AE9}"/>
+                </a:ext>
+              </a:extLst>
+            </p:cNvPr>
+            <p:cNvSpPr/>
+            <p:nvPr/>
+          </p:nvSpPr>
+          <p:spPr>
+            <a:xfrm>
+              <a:off x="7077462" y="1361834"/>
+              <a:ext cx="118290" cy="118290"/>
+            </a:xfrm>
+            <a:prstGeom prst="octagon">
+              <a:avLst/>
+            </a:prstGeom>
+            <a:solidFill>
+              <a:srgbClr val="ED3231"/>
+            </a:solidFill>
+            <a:ln>
+              <a:noFill/>
+            </a:ln>
+          </p:spPr>
+          <p:style>
+            <a:lnRef idx="2">
+              <a:schemeClr val="accent1">
+                <a:shade val="15000"/>
+              </a:schemeClr>
+            </a:lnRef>
+            <a:fillRef idx="1">
+              <a:schemeClr val="accent1"/>
+            </a:fillRef>
+            <a:effectRef idx="0">
+              <a:schemeClr val="accent1"/>
+            </a:effectRef>
+            <a:fontRef idx="minor">
+              <a:schemeClr val="lt1"/>
+            </a:fontRef>
+          </p:style>
+          <p:txBody>
+            <a:bodyPr rtlCol="0" anchor="ctr"/>
+            <a:lstStyle/>
+            <a:p>
+              <a:pPr algn="ctr"/>
+              <a:endParaRPr lang="ko-KR" altLang="en-US"/>
+            </a:p>
+          </p:txBody>
+        </p:sp>
+        <p:sp>
+          <p:nvSpPr>
+            <p:cNvPr id="110" name="팔각형 109">
+              <a:extLst>
+                <a:ext uri="{FF2B5EF4-FFF2-40B4-BE49-F238E27FC236}">
+                  <a16:creationId xmlns:a16="http://schemas.microsoft.com/office/drawing/2014/main" id="{29AFFD0E-D291-ECC3-4922-42620F86A3A5}"/>
+                </a:ext>
+              </a:extLst>
+            </p:cNvPr>
+            <p:cNvSpPr/>
+            <p:nvPr/>
+          </p:nvSpPr>
+          <p:spPr>
+            <a:xfrm>
+              <a:off x="7224327" y="1416713"/>
+              <a:ext cx="102526" cy="102526"/>
+            </a:xfrm>
+            <a:prstGeom prst="octagon">
+              <a:avLst/>
+            </a:prstGeom>
+            <a:solidFill>
+              <a:srgbClr val="ED3231"/>
+            </a:solidFill>
+            <a:ln>
+              <a:noFill/>
+            </a:ln>
+          </p:spPr>
+          <p:style>
+            <a:lnRef idx="2">
+              <a:schemeClr val="accent1">
+                <a:shade val="15000"/>
+              </a:schemeClr>
+            </a:lnRef>
+            <a:fillRef idx="1">
+              <a:schemeClr val="accent1"/>
+            </a:fillRef>
+            <a:effectRef idx="0">
+              <a:schemeClr val="accent1"/>
+            </a:effectRef>
+            <a:fontRef idx="minor">
+              <a:schemeClr val="lt1"/>
+            </a:fontRef>
+          </p:style>
+          <p:txBody>
+            <a:bodyPr rtlCol="0" anchor="ctr"/>
+            <a:lstStyle/>
+            <a:p>
+              <a:pPr algn="ctr"/>
+              <a:endParaRPr lang="ko-KR" altLang="en-US"/>
+            </a:p>
+          </p:txBody>
+        </p:sp>
+        <p:sp>
+          <p:nvSpPr>
+            <p:cNvPr id="111" name="팔각형 110">
+              <a:extLst>
+                <a:ext uri="{FF2B5EF4-FFF2-40B4-BE49-F238E27FC236}">
+                  <a16:creationId xmlns:a16="http://schemas.microsoft.com/office/drawing/2014/main" id="{EBBF78E7-7466-2D57-0A19-12605DEBD3BC}"/>
+                </a:ext>
+              </a:extLst>
+            </p:cNvPr>
+            <p:cNvSpPr/>
+            <p:nvPr/>
+          </p:nvSpPr>
+          <p:spPr>
+            <a:xfrm rot="10800000">
+              <a:off x="7233096" y="1867935"/>
+              <a:ext cx="319858" cy="319858"/>
+            </a:xfrm>
+            <a:prstGeom prst="octagon">
+              <a:avLst/>
+            </a:prstGeom>
+            <a:solidFill>
+              <a:srgbClr val="3F6FFD"/>
+            </a:solidFill>
+            <a:ln>
+              <a:noFill/>
+            </a:ln>
+          </p:spPr>
+          <p:style>
+            <a:lnRef idx="2">
+              <a:schemeClr val="accent1">
+                <a:shade val="15000"/>
+              </a:schemeClr>
+            </a:lnRef>
+            <a:fillRef idx="1">
+              <a:schemeClr val="accent1"/>
+            </a:fillRef>
+            <a:effectRef idx="0">
+              <a:schemeClr val="accent1"/>
+            </a:effectRef>
+            <a:fontRef idx="minor">
+              <a:schemeClr val="lt1"/>
+            </a:fontRef>
+          </p:style>
+          <p:txBody>
+            <a:bodyPr rtlCol="0" anchor="ctr"/>
+            <a:lstStyle/>
+            <a:p>
+              <a:pPr algn="ctr"/>
+              <a:endParaRPr lang="ko-KR" altLang="en-US"/>
+            </a:p>
+          </p:txBody>
+        </p:sp>
+        <p:sp>
+          <p:nvSpPr>
+            <p:cNvPr id="112" name="팔각형 111">
+              <a:extLst>
+                <a:ext uri="{FF2B5EF4-FFF2-40B4-BE49-F238E27FC236}">
+                  <a16:creationId xmlns:a16="http://schemas.microsoft.com/office/drawing/2014/main" id="{9C51F3AA-1EFC-4F9E-484D-CDB77C89F814}"/>
+                </a:ext>
+              </a:extLst>
+            </p:cNvPr>
+            <p:cNvSpPr/>
+            <p:nvPr/>
+          </p:nvSpPr>
+          <p:spPr>
+            <a:xfrm rot="10800000">
+              <a:off x="7281207" y="1916046"/>
+              <a:ext cx="223636" cy="223636"/>
+            </a:xfrm>
+            <a:prstGeom prst="octagon">
+              <a:avLst/>
+            </a:prstGeom>
+            <a:solidFill>
+              <a:srgbClr val="6FAFFF"/>
+            </a:solidFill>
+            <a:ln>
+              <a:noFill/>
+            </a:ln>
+          </p:spPr>
+          <p:style>
+            <a:lnRef idx="2">
+              <a:schemeClr val="accent1">
+                <a:shade val="15000"/>
+              </a:schemeClr>
+            </a:lnRef>
+            <a:fillRef idx="1">
+              <a:schemeClr val="accent1"/>
+            </a:fillRef>
+            <a:effectRef idx="0">
+              <a:schemeClr val="accent1"/>
+            </a:effectRef>
+            <a:fontRef idx="minor">
+              <a:schemeClr val="lt1"/>
+            </a:fontRef>
+          </p:style>
+          <p:txBody>
+            <a:bodyPr rtlCol="0" anchor="ctr"/>
+            <a:lstStyle/>
+            <a:p>
+              <a:pPr algn="ctr"/>
+              <a:endParaRPr lang="ko-KR" altLang="en-US"/>
+            </a:p>
+          </p:txBody>
+        </p:sp>
+        <p:sp>
+          <p:nvSpPr>
+            <p:cNvPr id="113" name="팔각형 112">
+              <a:extLst>
+                <a:ext uri="{FF2B5EF4-FFF2-40B4-BE49-F238E27FC236}">
+                  <a16:creationId xmlns:a16="http://schemas.microsoft.com/office/drawing/2014/main" id="{3964140F-FCC3-A19A-CE60-0E80D27047C0}"/>
+                </a:ext>
+              </a:extLst>
+            </p:cNvPr>
+            <p:cNvSpPr/>
+            <p:nvPr/>
+          </p:nvSpPr>
+          <p:spPr>
+            <a:xfrm rot="10800000">
+              <a:off x="7139841" y="2163737"/>
+              <a:ext cx="186510" cy="186510"/>
+            </a:xfrm>
+            <a:prstGeom prst="octagon">
+              <a:avLst/>
+            </a:prstGeom>
+            <a:solidFill>
+              <a:srgbClr val="3F6FFD"/>
+            </a:solidFill>
+            <a:ln>
+              <a:noFill/>
+            </a:ln>
+          </p:spPr>
+          <p:style>
+            <a:lnRef idx="2">
+              <a:schemeClr val="accent1">
+                <a:shade val="15000"/>
+              </a:schemeClr>
+            </a:lnRef>
+            <a:fillRef idx="1">
+              <a:schemeClr val="accent1"/>
+            </a:fillRef>
+            <a:effectRef idx="0">
+              <a:schemeClr val="accent1"/>
+            </a:effectRef>
+            <a:fontRef idx="minor">
+              <a:schemeClr val="lt1"/>
+            </a:fontRef>
+          </p:style>
+          <p:txBody>
+            <a:bodyPr rtlCol="0" anchor="ctr"/>
+            <a:lstStyle/>
+            <a:p>
+              <a:pPr algn="ctr"/>
+              <a:endParaRPr lang="ko-KR" altLang="en-US"/>
+            </a:p>
+          </p:txBody>
+        </p:sp>
+        <p:sp>
+          <p:nvSpPr>
+            <p:cNvPr id="114" name="팔각형 113">
+              <a:extLst>
+                <a:ext uri="{FF2B5EF4-FFF2-40B4-BE49-F238E27FC236}">
+                  <a16:creationId xmlns:a16="http://schemas.microsoft.com/office/drawing/2014/main" id="{6E66F806-8E6E-E1F1-7D8F-8F9C09FD7134}"/>
+                </a:ext>
+              </a:extLst>
+            </p:cNvPr>
+            <p:cNvSpPr/>
+            <p:nvPr/>
+          </p:nvSpPr>
+          <p:spPr>
+            <a:xfrm rot="10800000">
+              <a:off x="6992976" y="2202852"/>
+              <a:ext cx="118290" cy="118290"/>
+            </a:xfrm>
+            <a:prstGeom prst="octagon">
+              <a:avLst/>
+            </a:prstGeom>
+            <a:solidFill>
+              <a:srgbClr val="3F6FFD"/>
+            </a:solidFill>
+            <a:ln>
+              <a:noFill/>
+            </a:ln>
+          </p:spPr>
+          <p:style>
+            <a:lnRef idx="2">
+              <a:schemeClr val="accent1">
+                <a:shade val="15000"/>
+              </a:schemeClr>
+            </a:lnRef>
+            <a:fillRef idx="1">
+              <a:schemeClr val="accent1"/>
+            </a:fillRef>
+            <a:effectRef idx="0">
+              <a:schemeClr val="accent1"/>
+            </a:effectRef>
+            <a:fontRef idx="minor">
+              <a:schemeClr val="lt1"/>
+            </a:fontRef>
+          </p:style>
+          <p:txBody>
+            <a:bodyPr rtlCol="0" anchor="ctr"/>
+            <a:lstStyle/>
+            <a:p>
+              <a:pPr algn="ctr"/>
+              <a:endParaRPr lang="ko-KR" altLang="en-US"/>
+            </a:p>
+          </p:txBody>
+        </p:sp>
+        <p:sp>
+          <p:nvSpPr>
+            <p:cNvPr id="115" name="팔각형 114">
+              <a:extLst>
+                <a:ext uri="{FF2B5EF4-FFF2-40B4-BE49-F238E27FC236}">
+                  <a16:creationId xmlns:a16="http://schemas.microsoft.com/office/drawing/2014/main" id="{BC9DB987-69A6-92FE-2534-9F46726881D2}"/>
+                </a:ext>
+              </a:extLst>
+            </p:cNvPr>
+            <p:cNvSpPr/>
+            <p:nvPr/>
+          </p:nvSpPr>
+          <p:spPr>
+            <a:xfrm rot="10800000">
+              <a:off x="6861875" y="2163737"/>
+              <a:ext cx="102526" cy="102526"/>
+            </a:xfrm>
+            <a:prstGeom prst="octagon">
+              <a:avLst/>
+            </a:prstGeom>
+            <a:solidFill>
+              <a:srgbClr val="3F6FFD"/>
+            </a:solidFill>
+            <a:ln>
+              <a:noFill/>
+            </a:ln>
+          </p:spPr>
+          <p:style>
+            <a:lnRef idx="2">
+              <a:schemeClr val="accent1">
+                <a:shade val="15000"/>
+              </a:schemeClr>
+            </a:lnRef>
+            <a:fillRef idx="1">
+              <a:schemeClr val="accent1"/>
+            </a:fillRef>
+            <a:effectRef idx="0">
+              <a:schemeClr val="accent1"/>
+            </a:effectRef>
+            <a:fontRef idx="minor">
+              <a:schemeClr val="lt1"/>
+            </a:fontRef>
+          </p:style>
+          <p:txBody>
+            <a:bodyPr rtlCol="0" anchor="ctr"/>
+            <a:lstStyle/>
+            <a:p>
+              <a:pPr algn="ctr"/>
+              <a:endParaRPr lang="ko-KR" altLang="en-US"/>
+            </a:p>
+          </p:txBody>
+        </p:sp>
+        <p:sp>
+          <p:nvSpPr>
+            <p:cNvPr id="116" name="팔각형 115">
+              <a:extLst>
+                <a:ext uri="{FF2B5EF4-FFF2-40B4-BE49-F238E27FC236}">
+                  <a16:creationId xmlns:a16="http://schemas.microsoft.com/office/drawing/2014/main" id="{3A538B20-6D2F-B587-DA51-65AAE54D394F}"/>
+                </a:ext>
+              </a:extLst>
+            </p:cNvPr>
+            <p:cNvSpPr/>
+            <p:nvPr/>
+          </p:nvSpPr>
+          <p:spPr>
+            <a:xfrm rot="10648658" flipH="1" flipV="1">
+              <a:off x="7114058" y="1862872"/>
+              <a:ext cx="18000" cy="18000"/>
+            </a:xfrm>
+            <a:prstGeom prst="octagon">
+              <a:avLst/>
+            </a:prstGeom>
+            <a:gradFill>
+              <a:gsLst>
+                <a:gs pos="0">
+                  <a:schemeClr val="bg1"/>
+                </a:gs>
+                <a:gs pos="52000">
+                  <a:srgbClr val="152145"/>
+                </a:gs>
+              </a:gsLst>
+              <a:path path="circle">
+                <a:fillToRect l="50000" t="50000" r="50000" b="50000"/>
+              </a:path>
+            </a:gradFill>
+            <a:ln>
+              <a:noFill/>
+            </a:ln>
+          </p:spPr>
+          <p:style>
+            <a:lnRef idx="2">
+              <a:schemeClr val="accent1">
+                <a:shade val="15000"/>
+              </a:schemeClr>
+            </a:lnRef>
+            <a:fillRef idx="1">
+              <a:schemeClr val="accent1"/>
+            </a:fillRef>
+            <a:effectRef idx="0">
+              <a:schemeClr val="accent1"/>
+            </a:effectRef>
+            <a:fontRef idx="minor">
+              <a:schemeClr val="lt1"/>
+            </a:fontRef>
+          </p:style>
+          <p:txBody>
+            <a:bodyPr rtlCol="0" anchor="ctr"/>
+            <a:lstStyle/>
+            <a:p>
+              <a:pPr algn="ctr"/>
+              <a:endParaRPr lang="ko-KR" altLang="en-US"/>
+            </a:p>
+          </p:txBody>
+        </p:sp>
+        <p:sp>
+          <p:nvSpPr>
+            <p:cNvPr id="117" name="팔각형 116">
+              <a:extLst>
+                <a:ext uri="{FF2B5EF4-FFF2-40B4-BE49-F238E27FC236}">
+                  <a16:creationId xmlns:a16="http://schemas.microsoft.com/office/drawing/2014/main" id="{76FB8E26-A505-CC49-55C7-41605B36A67C}"/>
+                </a:ext>
+              </a:extLst>
+            </p:cNvPr>
+            <p:cNvSpPr/>
+            <p:nvPr/>
+          </p:nvSpPr>
+          <p:spPr>
+            <a:xfrm rot="10648658" flipH="1" flipV="1">
+              <a:off x="7044246" y="2032302"/>
+              <a:ext cx="18000" cy="18000"/>
+            </a:xfrm>
+            <a:prstGeom prst="octagon">
+              <a:avLst/>
+            </a:prstGeom>
+            <a:gradFill>
+              <a:gsLst>
+                <a:gs pos="0">
+                  <a:schemeClr val="bg1"/>
+                </a:gs>
+                <a:gs pos="52000">
+                  <a:srgbClr val="152145"/>
+                </a:gs>
+              </a:gsLst>
+              <a:path path="circle">
+                <a:fillToRect l="50000" t="50000" r="50000" b="50000"/>
+              </a:path>
+            </a:gradFill>
+            <a:ln>
+              <a:noFill/>
+            </a:ln>
+          </p:spPr>
+          <p:style>
+            <a:lnRef idx="2">
+              <a:schemeClr val="accent1">
+                <a:shade val="15000"/>
+              </a:schemeClr>
+            </a:lnRef>
+            <a:fillRef idx="1">
+              <a:schemeClr val="accent1"/>
+            </a:fillRef>
+            <a:effectRef idx="0">
+              <a:schemeClr val="accent1"/>
+            </a:effectRef>
+            <a:fontRef idx="minor">
+              <a:schemeClr val="lt1"/>
+            </a:fontRef>
+          </p:style>
+          <p:txBody>
+            <a:bodyPr rtlCol="0" anchor="ctr"/>
+            <a:lstStyle/>
+            <a:p>
+              <a:pPr algn="ctr"/>
+              <a:endParaRPr lang="ko-KR" altLang="en-US"/>
+            </a:p>
+          </p:txBody>
+        </p:sp>
+        <p:sp>
+          <p:nvSpPr>
+            <p:cNvPr id="118" name="팔각형 117">
+              <a:extLst>
+                <a:ext uri="{FF2B5EF4-FFF2-40B4-BE49-F238E27FC236}">
+                  <a16:creationId xmlns:a16="http://schemas.microsoft.com/office/drawing/2014/main" id="{46D2AC09-C637-362F-F8AF-B96E6D95D59A}"/>
+                </a:ext>
+              </a:extLst>
+            </p:cNvPr>
+            <p:cNvSpPr/>
+            <p:nvPr/>
+          </p:nvSpPr>
+          <p:spPr>
+            <a:xfrm rot="10648658" flipH="1" flipV="1">
+              <a:off x="6794730" y="1954388"/>
+              <a:ext cx="18000" cy="18000"/>
+            </a:xfrm>
+            <a:prstGeom prst="octagon">
+              <a:avLst/>
+            </a:prstGeom>
+            <a:gradFill>
+              <a:gsLst>
+                <a:gs pos="0">
+                  <a:schemeClr val="bg1"/>
+                </a:gs>
+                <a:gs pos="52000">
+                  <a:srgbClr val="152145"/>
+                </a:gs>
+              </a:gsLst>
+              <a:path path="circle">
+                <a:fillToRect l="50000" t="50000" r="50000" b="50000"/>
+              </a:path>
+            </a:gradFill>
+            <a:ln>
+              <a:noFill/>
+            </a:ln>
+          </p:spPr>
+          <p:style>
+            <a:lnRef idx="2">
+              <a:schemeClr val="accent1">
+                <a:shade val="15000"/>
+              </a:schemeClr>
+            </a:lnRef>
+            <a:fillRef idx="1">
+              <a:schemeClr val="accent1"/>
+            </a:fillRef>
+            <a:effectRef idx="0">
+              <a:schemeClr val="accent1"/>
+            </a:effectRef>
+            <a:fontRef idx="minor">
+              <a:schemeClr val="lt1"/>
+            </a:fontRef>
+          </p:style>
+          <p:txBody>
+            <a:bodyPr rtlCol="0" anchor="ctr"/>
+            <a:lstStyle/>
+            <a:p>
+              <a:pPr algn="ctr"/>
+              <a:endParaRPr lang="ko-KR" altLang="en-US"/>
+            </a:p>
+          </p:txBody>
+        </p:sp>
+        <p:sp>
+          <p:nvSpPr>
+            <p:cNvPr id="119" name="팔각형 118">
+              <a:extLst>
+                <a:ext uri="{FF2B5EF4-FFF2-40B4-BE49-F238E27FC236}">
+                  <a16:creationId xmlns:a16="http://schemas.microsoft.com/office/drawing/2014/main" id="{C94314BF-2253-6664-3885-9AAD1568ADB5}"/>
+                </a:ext>
+              </a:extLst>
+            </p:cNvPr>
+            <p:cNvSpPr/>
+            <p:nvPr/>
+          </p:nvSpPr>
+          <p:spPr>
+            <a:xfrm rot="10648658" flipH="1" flipV="1">
+              <a:off x="7103172" y="1653014"/>
+              <a:ext cx="18000" cy="18000"/>
+            </a:xfrm>
+            <a:prstGeom prst="octagon">
+              <a:avLst/>
+            </a:prstGeom>
+            <a:gradFill>
+              <a:gsLst>
+                <a:gs pos="0">
+                  <a:schemeClr val="bg1"/>
+                </a:gs>
+                <a:gs pos="52000">
+                  <a:srgbClr val="152145"/>
+                </a:gs>
+              </a:gsLst>
+              <a:path path="circle">
+                <a:fillToRect l="50000" t="50000" r="50000" b="50000"/>
+              </a:path>
+            </a:gradFill>
+            <a:ln>
+              <a:noFill/>
+            </a:ln>
+          </p:spPr>
+          <p:style>
+            <a:lnRef idx="2">
+              <a:schemeClr val="accent1">
+                <a:shade val="15000"/>
+              </a:schemeClr>
+            </a:lnRef>
+            <a:fillRef idx="1">
+              <a:schemeClr val="accent1"/>
+            </a:fillRef>
+            <a:effectRef idx="0">
+              <a:schemeClr val="accent1"/>
+            </a:effectRef>
+            <a:fontRef idx="minor">
+              <a:schemeClr val="lt1"/>
+            </a:fontRef>
+          </p:style>
+          <p:txBody>
+            <a:bodyPr rtlCol="0" anchor="ctr"/>
+            <a:lstStyle/>
+            <a:p>
+              <a:pPr algn="ctr"/>
+              <a:endParaRPr lang="ko-KR" altLang="en-US"/>
+            </a:p>
+          </p:txBody>
+        </p:sp>
+        <p:sp>
+          <p:nvSpPr>
+            <p:cNvPr id="120" name="팔각형 119">
+              <a:extLst>
+                <a:ext uri="{FF2B5EF4-FFF2-40B4-BE49-F238E27FC236}">
+                  <a16:creationId xmlns:a16="http://schemas.microsoft.com/office/drawing/2014/main" id="{AA3C735C-2276-B9E2-ABC0-5D082AFC1DAF}"/>
+                </a:ext>
+              </a:extLst>
+            </p:cNvPr>
+            <p:cNvSpPr/>
+            <p:nvPr/>
+          </p:nvSpPr>
+          <p:spPr>
+            <a:xfrm rot="10648658" flipH="1" flipV="1">
+              <a:off x="7479277" y="2258617"/>
+              <a:ext cx="18000" cy="18000"/>
+            </a:xfrm>
+            <a:prstGeom prst="octagon">
+              <a:avLst/>
+            </a:prstGeom>
+            <a:gradFill>
+              <a:gsLst>
+                <a:gs pos="0">
+                  <a:schemeClr val="bg1"/>
+                </a:gs>
+                <a:gs pos="52000">
+                  <a:srgbClr val="152145"/>
+                </a:gs>
+              </a:gsLst>
+              <a:path path="circle">
+                <a:fillToRect l="50000" t="50000" r="50000" b="50000"/>
+              </a:path>
+            </a:gradFill>
+            <a:ln>
+              <a:noFill/>
+            </a:ln>
+          </p:spPr>
+          <p:style>
+            <a:lnRef idx="2">
+              <a:schemeClr val="accent1">
+                <a:shade val="15000"/>
+              </a:schemeClr>
+            </a:lnRef>
+            <a:fillRef idx="1">
+              <a:schemeClr val="accent1"/>
+            </a:fillRef>
+            <a:effectRef idx="0">
+              <a:schemeClr val="accent1"/>
+            </a:effectRef>
+            <a:fontRef idx="minor">
+              <a:schemeClr val="lt1"/>
+            </a:fontRef>
+          </p:style>
+          <p:txBody>
+            <a:bodyPr rtlCol="0" anchor="ctr"/>
+            <a:lstStyle/>
+            <a:p>
+              <a:pPr algn="ctr"/>
+              <a:endParaRPr lang="ko-KR" altLang="en-US"/>
+            </a:p>
+          </p:txBody>
+        </p:sp>
+        <p:sp>
+          <p:nvSpPr>
+            <p:cNvPr id="121" name="팔각형 120">
+              <a:extLst>
+                <a:ext uri="{FF2B5EF4-FFF2-40B4-BE49-F238E27FC236}">
+                  <a16:creationId xmlns:a16="http://schemas.microsoft.com/office/drawing/2014/main" id="{13816B20-7498-05B2-135C-BFB2E4C7460F}"/>
+                </a:ext>
+              </a:extLst>
+            </p:cNvPr>
+            <p:cNvSpPr/>
+            <p:nvPr/>
+          </p:nvSpPr>
+          <p:spPr>
+            <a:xfrm rot="10648658" flipH="1" flipV="1">
+              <a:off x="6684272" y="2370534"/>
+              <a:ext cx="18000" cy="18000"/>
+            </a:xfrm>
+            <a:prstGeom prst="octagon">
+              <a:avLst/>
+            </a:prstGeom>
+            <a:gradFill>
+              <a:gsLst>
+                <a:gs pos="0">
+                  <a:schemeClr val="bg1"/>
+                </a:gs>
+                <a:gs pos="52000">
+                  <a:srgbClr val="152145"/>
+                </a:gs>
+              </a:gsLst>
+              <a:path path="circle">
+                <a:fillToRect l="50000" t="50000" r="50000" b="50000"/>
+              </a:path>
+            </a:gradFill>
+            <a:ln>
+              <a:noFill/>
+            </a:ln>
+          </p:spPr>
+          <p:style>
+            <a:lnRef idx="2">
+              <a:schemeClr val="accent1">
+                <a:shade val="15000"/>
+              </a:schemeClr>
+            </a:lnRef>
+            <a:fillRef idx="1">
+              <a:schemeClr val="accent1"/>
+            </a:fillRef>
+            <a:effectRef idx="0">
+              <a:schemeClr val="accent1"/>
+            </a:effectRef>
+            <a:fontRef idx="minor">
+              <a:schemeClr val="lt1"/>
+            </a:fontRef>
+          </p:style>
+          <p:txBody>
+            <a:bodyPr rtlCol="0" anchor="ctr"/>
+            <a:lstStyle/>
+            <a:p>
+              <a:pPr algn="ctr"/>
+              <a:endParaRPr lang="ko-KR" altLang="en-US"/>
+            </a:p>
+          </p:txBody>
+        </p:sp>
+        <p:sp>
+          <p:nvSpPr>
+            <p:cNvPr id="123" name="팔각형 122">
+              <a:extLst>
+                <a:ext uri="{FF2B5EF4-FFF2-40B4-BE49-F238E27FC236}">
+                  <a16:creationId xmlns:a16="http://schemas.microsoft.com/office/drawing/2014/main" id="{55207DD4-1437-C4BC-37C6-807BC08FB186}"/>
+                </a:ext>
+              </a:extLst>
+            </p:cNvPr>
+            <p:cNvSpPr/>
+            <p:nvPr/>
+          </p:nvSpPr>
+          <p:spPr>
+            <a:xfrm rot="10648658" flipH="1" flipV="1">
+              <a:off x="6606092" y="1882312"/>
+              <a:ext cx="18000" cy="18000"/>
+            </a:xfrm>
+            <a:prstGeom prst="octagon">
+              <a:avLst/>
+            </a:prstGeom>
+            <a:gradFill>
+              <a:gsLst>
+                <a:gs pos="0">
+                  <a:schemeClr val="bg1"/>
+                </a:gs>
+                <a:gs pos="52000">
+                  <a:srgbClr val="152145"/>
+                </a:gs>
+              </a:gsLst>
+              <a:path path="circle">
+                <a:fillToRect l="50000" t="50000" r="50000" b="50000"/>
+              </a:path>
+            </a:gradFill>
+            <a:ln>
+              <a:noFill/>
+            </a:ln>
+          </p:spPr>
+          <p:style>
+            <a:lnRef idx="2">
+              <a:schemeClr val="accent1">
+                <a:shade val="15000"/>
+              </a:schemeClr>
+            </a:lnRef>
+            <a:fillRef idx="1">
+              <a:schemeClr val="accent1"/>
+            </a:fillRef>
+            <a:effectRef idx="0">
+              <a:schemeClr val="accent1"/>
+            </a:effectRef>
+            <a:fontRef idx="minor">
+              <a:schemeClr val="lt1"/>
+            </a:fontRef>
+          </p:style>
+          <p:txBody>
+            <a:bodyPr rtlCol="0" anchor="ctr"/>
+            <a:lstStyle/>
+            <a:p>
+              <a:pPr algn="ctr"/>
+              <a:endParaRPr lang="ko-KR" altLang="en-US"/>
+            </a:p>
+          </p:txBody>
+        </p:sp>
+        <p:sp>
+          <p:nvSpPr>
+            <p:cNvPr id="125" name="팔각형 124">
+              <a:extLst>
+                <a:ext uri="{FF2B5EF4-FFF2-40B4-BE49-F238E27FC236}">
+                  <a16:creationId xmlns:a16="http://schemas.microsoft.com/office/drawing/2014/main" id="{94EF55AE-B5A6-4266-6211-6AC57C4D8BDC}"/>
+                </a:ext>
+              </a:extLst>
+            </p:cNvPr>
+            <p:cNvSpPr/>
+            <p:nvPr/>
+          </p:nvSpPr>
+          <p:spPr>
+            <a:xfrm rot="10648658" flipH="1" flipV="1">
+              <a:off x="7440187" y="1572750"/>
+              <a:ext cx="18000" cy="18000"/>
+            </a:xfrm>
+            <a:prstGeom prst="octagon">
+              <a:avLst/>
+            </a:prstGeom>
+            <a:gradFill>
+              <a:gsLst>
+                <a:gs pos="0">
+                  <a:schemeClr val="bg1"/>
+                </a:gs>
+                <a:gs pos="52000">
+                  <a:srgbClr val="152145"/>
+                </a:gs>
+              </a:gsLst>
+              <a:path path="circle">
+                <a:fillToRect l="50000" t="50000" r="50000" b="50000"/>
+              </a:path>
+            </a:gradFill>
+            <a:ln>
+              <a:noFill/>
+            </a:ln>
+          </p:spPr>
+          <p:style>
+            <a:lnRef idx="2">
+              <a:schemeClr val="accent1">
+                <a:shade val="15000"/>
+              </a:schemeClr>
+            </a:lnRef>
+            <a:fillRef idx="1">
+              <a:schemeClr val="accent1"/>
+            </a:fillRef>
+            <a:effectRef idx="0">
+              <a:schemeClr val="accent1"/>
+            </a:effectRef>
+            <a:fontRef idx="minor">
+              <a:schemeClr val="lt1"/>
+            </a:fontRef>
+          </p:style>
+          <p:txBody>
+            <a:bodyPr rtlCol="0" anchor="ctr"/>
+            <a:lstStyle/>
+            <a:p>
+              <a:pPr algn="ctr"/>
+              <a:endParaRPr lang="ko-KR" altLang="en-US"/>
+            </a:p>
+          </p:txBody>
+        </p:sp>
+        <p:sp>
+          <p:nvSpPr>
+            <p:cNvPr id="126" name="팔각형 125">
+              <a:extLst>
+                <a:ext uri="{FF2B5EF4-FFF2-40B4-BE49-F238E27FC236}">
+                  <a16:creationId xmlns:a16="http://schemas.microsoft.com/office/drawing/2014/main" id="{46BAE5CB-0DF5-76D4-6E18-37880EC23EC3}"/>
+                </a:ext>
+              </a:extLst>
+            </p:cNvPr>
+            <p:cNvSpPr/>
+            <p:nvPr/>
+          </p:nvSpPr>
+          <p:spPr>
+            <a:xfrm rot="10648658" flipH="1" flipV="1">
+              <a:off x="7592587" y="1725150"/>
+              <a:ext cx="18000" cy="18000"/>
+            </a:xfrm>
+            <a:prstGeom prst="octagon">
+              <a:avLst/>
+            </a:prstGeom>
+            <a:gradFill>
+              <a:gsLst>
+                <a:gs pos="0">
+                  <a:schemeClr val="bg1"/>
+                </a:gs>
+                <a:gs pos="52000">
+                  <a:srgbClr val="152145"/>
+                </a:gs>
+              </a:gsLst>
+              <a:path path="circle">
+                <a:fillToRect l="50000" t="50000" r="50000" b="50000"/>
+              </a:path>
+            </a:gradFill>
+            <a:ln>
+              <a:noFill/>
+            </a:ln>
+          </p:spPr>
+          <p:style>
+            <a:lnRef idx="2">
+              <a:schemeClr val="accent1">
+                <a:shade val="15000"/>
+              </a:schemeClr>
+            </a:lnRef>
+            <a:fillRef idx="1">
+              <a:schemeClr val="accent1"/>
+            </a:fillRef>
+            <a:effectRef idx="0">
+              <a:schemeClr val="accent1"/>
+            </a:effectRef>
+            <a:fontRef idx="minor">
+              <a:schemeClr val="lt1"/>
+            </a:fontRef>
+          </p:style>
+          <p:txBody>
+            <a:bodyPr rtlCol="0" anchor="ctr"/>
+            <a:lstStyle/>
+            <a:p>
+              <a:pPr algn="ctr"/>
+              <a:endParaRPr lang="ko-KR" altLang="en-US"/>
+            </a:p>
+          </p:txBody>
+        </p:sp>
+        <p:sp>
+          <p:nvSpPr>
+            <p:cNvPr id="128" name="팔각형 127">
+              <a:extLst>
+                <a:ext uri="{FF2B5EF4-FFF2-40B4-BE49-F238E27FC236}">
+                  <a16:creationId xmlns:a16="http://schemas.microsoft.com/office/drawing/2014/main" id="{A8BCF081-90BB-8677-E7AB-EC305562478F}"/>
+                </a:ext>
+              </a:extLst>
+            </p:cNvPr>
+            <p:cNvSpPr/>
+            <p:nvPr/>
+          </p:nvSpPr>
+          <p:spPr>
+            <a:xfrm rot="10648658" flipH="1" flipV="1">
+              <a:off x="6612154" y="2195141"/>
+              <a:ext cx="18000" cy="18000"/>
+            </a:xfrm>
+            <a:prstGeom prst="octagon">
+              <a:avLst/>
+            </a:prstGeom>
+            <a:gradFill>
+              <a:gsLst>
+                <a:gs pos="0">
+                  <a:schemeClr val="bg1"/>
+                </a:gs>
+                <a:gs pos="52000">
+                  <a:srgbClr val="152145"/>
+                </a:gs>
+              </a:gsLst>
+              <a:path path="circle">
+                <a:fillToRect l="50000" t="50000" r="50000" b="50000"/>
+              </a:path>
+            </a:gradFill>
+            <a:ln>
+              <a:noFill/>
+            </a:ln>
+          </p:spPr>
+          <p:style>
+            <a:lnRef idx="2">
+              <a:schemeClr val="accent1">
+                <a:shade val="15000"/>
+              </a:schemeClr>
+            </a:lnRef>
+            <a:fillRef idx="1">
+              <a:schemeClr val="accent1"/>
+            </a:fillRef>
+            <a:effectRef idx="0">
+              <a:schemeClr val="accent1"/>
+            </a:effectRef>
+            <a:fontRef idx="minor">
+              <a:schemeClr val="lt1"/>
+            </a:fontRef>
+          </p:style>
+          <p:txBody>
+            <a:bodyPr rtlCol="0" anchor="ctr"/>
+            <a:lstStyle/>
+            <a:p>
+              <a:pPr algn="ctr"/>
+              <a:endParaRPr lang="ko-KR" altLang="en-US"/>
+            </a:p>
+          </p:txBody>
+        </p:sp>
+        <p:sp>
+          <p:nvSpPr>
+            <p:cNvPr id="129" name="팔각형 128">
+              <a:extLst>
+                <a:ext uri="{FF2B5EF4-FFF2-40B4-BE49-F238E27FC236}">
+                  <a16:creationId xmlns:a16="http://schemas.microsoft.com/office/drawing/2014/main" id="{B0FF225A-915B-32FF-D215-7D51A9397862}"/>
+                </a:ext>
+              </a:extLst>
+            </p:cNvPr>
+            <p:cNvSpPr/>
+            <p:nvPr/>
+          </p:nvSpPr>
+          <p:spPr>
+            <a:xfrm rot="10648658" flipH="1" flipV="1">
+              <a:off x="7220451" y="1308565"/>
+              <a:ext cx="18000" cy="18000"/>
+            </a:xfrm>
+            <a:prstGeom prst="octagon">
+              <a:avLst/>
+            </a:prstGeom>
+            <a:gradFill>
+              <a:gsLst>
+                <a:gs pos="0">
+                  <a:schemeClr val="bg1"/>
+                </a:gs>
+                <a:gs pos="52000">
+                  <a:srgbClr val="152145"/>
+                </a:gs>
+              </a:gsLst>
+              <a:path path="circle">
+                <a:fillToRect l="50000" t="50000" r="50000" b="50000"/>
+              </a:path>
+            </a:gradFill>
+            <a:ln>
+              <a:noFill/>
+            </a:ln>
+          </p:spPr>
+          <p:style>
+            <a:lnRef idx="2">
+              <a:schemeClr val="accent1">
+                <a:shade val="15000"/>
+              </a:schemeClr>
+            </a:lnRef>
+            <a:fillRef idx="1">
+              <a:schemeClr val="accent1"/>
+            </a:fillRef>
+            <a:effectRef idx="0">
+              <a:schemeClr val="accent1"/>
+            </a:effectRef>
+            <a:fontRef idx="minor">
+              <a:schemeClr val="lt1"/>
+            </a:fontRef>
+          </p:style>
+          <p:txBody>
+            <a:bodyPr rtlCol="0" anchor="ctr"/>
+            <a:lstStyle/>
+            <a:p>
+              <a:pPr algn="ctr"/>
+              <a:endParaRPr lang="ko-KR" altLang="en-US"/>
+            </a:p>
+          </p:txBody>
+        </p:sp>
+        <p:sp>
+          <p:nvSpPr>
+            <p:cNvPr id="131" name="팔각형 130">
+              <a:extLst>
+                <a:ext uri="{FF2B5EF4-FFF2-40B4-BE49-F238E27FC236}">
+                  <a16:creationId xmlns:a16="http://schemas.microsoft.com/office/drawing/2014/main" id="{DADD608A-5541-07B3-1F38-DC947BD1FF48}"/>
+                </a:ext>
+              </a:extLst>
+            </p:cNvPr>
+            <p:cNvSpPr/>
+            <p:nvPr/>
+          </p:nvSpPr>
+          <p:spPr>
+            <a:xfrm rot="10648658" flipH="1" flipV="1">
+              <a:off x="6729328" y="2145349"/>
+              <a:ext cx="18000" cy="18000"/>
+            </a:xfrm>
+            <a:prstGeom prst="octagon">
+              <a:avLst/>
+            </a:prstGeom>
+            <a:gradFill>
+              <a:gsLst>
+                <a:gs pos="0">
+                  <a:schemeClr val="bg1"/>
+                </a:gs>
+                <a:gs pos="52000">
+                  <a:srgbClr val="152145"/>
+                </a:gs>
+              </a:gsLst>
+              <a:path path="circle">
+                <a:fillToRect l="50000" t="50000" r="50000" b="50000"/>
+              </a:path>
+            </a:gradFill>
+            <a:ln>
+              <a:noFill/>
+            </a:ln>
+          </p:spPr>
+          <p:style>
+            <a:lnRef idx="2">
+              <a:schemeClr val="accent1">
+                <a:shade val="15000"/>
+              </a:schemeClr>
+            </a:lnRef>
+            <a:fillRef idx="1">
+              <a:schemeClr val="accent1"/>
+            </a:fillRef>
+            <a:effectRef idx="0">
+              <a:schemeClr val="accent1"/>
+            </a:effectRef>
+            <a:fontRef idx="minor">
+              <a:schemeClr val="lt1"/>
+            </a:fontRef>
+          </p:style>
+          <p:txBody>
+            <a:bodyPr rtlCol="0" anchor="ctr"/>
+            <a:lstStyle/>
+            <a:p>
+              <a:pPr algn="ctr"/>
+              <a:endParaRPr lang="ko-KR" altLang="en-US"/>
+            </a:p>
+          </p:txBody>
+        </p:sp>
+        <p:sp>
+          <p:nvSpPr>
+            <p:cNvPr id="132" name="팔각형 131">
+              <a:extLst>
+                <a:ext uri="{FF2B5EF4-FFF2-40B4-BE49-F238E27FC236}">
+                  <a16:creationId xmlns:a16="http://schemas.microsoft.com/office/drawing/2014/main" id="{D00718D4-DB24-AABC-B398-71694E4E02EC}"/>
+                </a:ext>
+              </a:extLst>
+            </p:cNvPr>
+            <p:cNvSpPr/>
+            <p:nvPr/>
+          </p:nvSpPr>
+          <p:spPr>
+            <a:xfrm rot="10648658" flipH="1" flipV="1">
+              <a:off x="7266458" y="2389131"/>
+              <a:ext cx="18000" cy="18000"/>
+            </a:xfrm>
+            <a:prstGeom prst="octagon">
+              <a:avLst/>
+            </a:prstGeom>
+            <a:gradFill>
+              <a:gsLst>
+                <a:gs pos="0">
+                  <a:schemeClr val="bg1"/>
+                </a:gs>
+                <a:gs pos="52000">
+                  <a:srgbClr val="152145"/>
+                </a:gs>
+              </a:gsLst>
+              <a:path path="circle">
+                <a:fillToRect l="50000" t="50000" r="50000" b="50000"/>
+              </a:path>
+            </a:gradFill>
+            <a:ln>
+              <a:noFill/>
+            </a:ln>
+          </p:spPr>
+          <p:style>
+            <a:lnRef idx="2">
+              <a:schemeClr val="accent1">
+                <a:shade val="15000"/>
+              </a:schemeClr>
+            </a:lnRef>
+            <a:fillRef idx="1">
+              <a:schemeClr val="accent1"/>
+            </a:fillRef>
+            <a:effectRef idx="0">
+              <a:schemeClr val="accent1"/>
+            </a:effectRef>
+            <a:fontRef idx="minor">
+              <a:schemeClr val="lt1"/>
+            </a:fontRef>
+          </p:style>
+          <p:txBody>
+            <a:bodyPr rtlCol="0" anchor="ctr"/>
+            <a:lstStyle/>
+            <a:p>
+              <a:pPr algn="ctr"/>
+              <a:endParaRPr lang="ko-KR" altLang="en-US"/>
+            </a:p>
+          </p:txBody>
+        </p:sp>
+        <p:sp>
+          <p:nvSpPr>
+            <p:cNvPr id="133" name="팔각형 132">
+              <a:extLst>
+                <a:ext uri="{FF2B5EF4-FFF2-40B4-BE49-F238E27FC236}">
+                  <a16:creationId xmlns:a16="http://schemas.microsoft.com/office/drawing/2014/main" id="{1B3E7ED1-193A-8903-3820-2C89C1BCE074}"/>
+                </a:ext>
+              </a:extLst>
+            </p:cNvPr>
+            <p:cNvSpPr/>
+            <p:nvPr/>
+          </p:nvSpPr>
+          <p:spPr>
+            <a:xfrm rot="16048658" flipH="1" flipV="1">
+              <a:off x="7106520" y="1781547"/>
+              <a:ext cx="12272" cy="12272"/>
+            </a:xfrm>
+            <a:prstGeom prst="octagon">
+              <a:avLst/>
+            </a:prstGeom>
+            <a:gradFill>
+              <a:gsLst>
+                <a:gs pos="0">
+                  <a:schemeClr val="bg1"/>
+                </a:gs>
+                <a:gs pos="52000">
+                  <a:srgbClr val="152145"/>
+                </a:gs>
+              </a:gsLst>
+              <a:path path="circle">
+                <a:fillToRect l="50000" t="50000" r="50000" b="50000"/>
+              </a:path>
+            </a:gradFill>
+            <a:ln>
+              <a:noFill/>
+            </a:ln>
+          </p:spPr>
+          <p:style>
+            <a:lnRef idx="2">
+              <a:schemeClr val="accent1">
+                <a:shade val="15000"/>
+              </a:schemeClr>
+            </a:lnRef>
+            <a:fillRef idx="1">
+              <a:schemeClr val="accent1"/>
+            </a:fillRef>
+            <a:effectRef idx="0">
+              <a:schemeClr val="accent1"/>
+            </a:effectRef>
+            <a:fontRef idx="minor">
+              <a:schemeClr val="lt1"/>
+            </a:fontRef>
+          </p:style>
+          <p:txBody>
+            <a:bodyPr rtlCol="0" anchor="ctr"/>
+            <a:lstStyle/>
+            <a:p>
+              <a:pPr algn="ctr"/>
+              <a:endParaRPr lang="ko-KR" altLang="en-US"/>
+            </a:p>
+          </p:txBody>
+        </p:sp>
+        <p:sp>
+          <p:nvSpPr>
+            <p:cNvPr id="134" name="팔각형 133">
+              <a:extLst>
+                <a:ext uri="{FF2B5EF4-FFF2-40B4-BE49-F238E27FC236}">
+                  <a16:creationId xmlns:a16="http://schemas.microsoft.com/office/drawing/2014/main" id="{374E00C6-E75E-68FD-F495-05DE387F6959}"/>
+                </a:ext>
+              </a:extLst>
+            </p:cNvPr>
+            <p:cNvSpPr/>
+            <p:nvPr/>
+          </p:nvSpPr>
+          <p:spPr>
+            <a:xfrm rot="16048658" flipH="1" flipV="1">
+              <a:off x="7000165" y="1678341"/>
+              <a:ext cx="12272" cy="12272"/>
+            </a:xfrm>
+            <a:prstGeom prst="octagon">
+              <a:avLst/>
+            </a:prstGeom>
+            <a:gradFill>
+              <a:gsLst>
+                <a:gs pos="0">
+                  <a:schemeClr val="bg1"/>
+                </a:gs>
+                <a:gs pos="52000">
+                  <a:srgbClr val="152145"/>
+                </a:gs>
+              </a:gsLst>
+              <a:path path="circle">
+                <a:fillToRect l="50000" t="50000" r="50000" b="50000"/>
+              </a:path>
+            </a:gradFill>
+            <a:ln>
+              <a:noFill/>
+            </a:ln>
+          </p:spPr>
+          <p:style>
+            <a:lnRef idx="2">
+              <a:schemeClr val="accent1">
+                <a:shade val="15000"/>
+              </a:schemeClr>
+            </a:lnRef>
+            <a:fillRef idx="1">
+              <a:schemeClr val="accent1"/>
+            </a:fillRef>
+            <a:effectRef idx="0">
+              <a:schemeClr val="accent1"/>
+            </a:effectRef>
+            <a:fontRef idx="minor">
+              <a:schemeClr val="lt1"/>
+            </a:fontRef>
+          </p:style>
+          <p:txBody>
+            <a:bodyPr rtlCol="0" anchor="ctr"/>
+            <a:lstStyle/>
+            <a:p>
+              <a:pPr algn="ctr"/>
+              <a:endParaRPr lang="ko-KR" altLang="en-US"/>
+            </a:p>
+          </p:txBody>
+        </p:sp>
+        <p:sp>
+          <p:nvSpPr>
+            <p:cNvPr id="135" name="팔각형 134">
+              <a:extLst>
+                <a:ext uri="{FF2B5EF4-FFF2-40B4-BE49-F238E27FC236}">
+                  <a16:creationId xmlns:a16="http://schemas.microsoft.com/office/drawing/2014/main" id="{63B6B375-667B-E2B6-849E-245F2AAC8E3A}"/>
+                </a:ext>
+              </a:extLst>
+            </p:cNvPr>
+            <p:cNvSpPr/>
+            <p:nvPr/>
+          </p:nvSpPr>
+          <p:spPr>
+            <a:xfrm rot="16048658" flipH="1" flipV="1">
+              <a:off x="7044124" y="1563829"/>
+              <a:ext cx="12272" cy="12272"/>
+            </a:xfrm>
+            <a:prstGeom prst="octagon">
+              <a:avLst/>
+            </a:prstGeom>
+            <a:gradFill>
+              <a:gsLst>
+                <a:gs pos="0">
+                  <a:schemeClr val="bg1"/>
+                </a:gs>
+                <a:gs pos="52000">
+                  <a:srgbClr val="152145"/>
+                </a:gs>
+              </a:gsLst>
+              <a:path path="circle">
+                <a:fillToRect l="50000" t="50000" r="50000" b="50000"/>
+              </a:path>
+            </a:gradFill>
+            <a:ln>
+              <a:noFill/>
+            </a:ln>
+          </p:spPr>
+          <p:style>
+            <a:lnRef idx="2">
+              <a:schemeClr val="accent1">
+                <a:shade val="15000"/>
+              </a:schemeClr>
+            </a:lnRef>
+            <a:fillRef idx="1">
+              <a:schemeClr val="accent1"/>
+            </a:fillRef>
+            <a:effectRef idx="0">
+              <a:schemeClr val="accent1"/>
+            </a:effectRef>
+            <a:fontRef idx="minor">
+              <a:schemeClr val="lt1"/>
+            </a:fontRef>
+          </p:style>
+          <p:txBody>
+            <a:bodyPr rtlCol="0" anchor="ctr"/>
+            <a:lstStyle/>
+            <a:p>
+              <a:pPr algn="ctr"/>
+              <a:endParaRPr lang="ko-KR" altLang="en-US"/>
+            </a:p>
+          </p:txBody>
+        </p:sp>
+        <p:sp>
+          <p:nvSpPr>
+            <p:cNvPr id="136" name="팔각형 135">
+              <a:extLst>
+                <a:ext uri="{FF2B5EF4-FFF2-40B4-BE49-F238E27FC236}">
+                  <a16:creationId xmlns:a16="http://schemas.microsoft.com/office/drawing/2014/main" id="{7D643345-967D-DA0C-021F-543ED703F049}"/>
+                </a:ext>
+              </a:extLst>
+            </p:cNvPr>
+            <p:cNvSpPr/>
+            <p:nvPr/>
+          </p:nvSpPr>
+          <p:spPr>
+            <a:xfrm rot="16048658" flipH="1" flipV="1">
+              <a:off x="7249602" y="1774125"/>
+              <a:ext cx="12272" cy="12272"/>
+            </a:xfrm>
+            <a:prstGeom prst="octagon">
+              <a:avLst/>
+            </a:prstGeom>
+            <a:gradFill>
+              <a:gsLst>
+                <a:gs pos="0">
+                  <a:schemeClr val="bg1"/>
+                </a:gs>
+                <a:gs pos="52000">
+                  <a:srgbClr val="152145"/>
+                </a:gs>
+              </a:gsLst>
+              <a:path path="circle">
+                <a:fillToRect l="50000" t="50000" r="50000" b="50000"/>
+              </a:path>
+            </a:gradFill>
+            <a:ln>
+              <a:noFill/>
+            </a:ln>
+          </p:spPr>
+          <p:style>
+            <a:lnRef idx="2">
+              <a:schemeClr val="accent1">
+                <a:shade val="15000"/>
+              </a:schemeClr>
+            </a:lnRef>
+            <a:fillRef idx="1">
+              <a:schemeClr val="accent1"/>
+            </a:fillRef>
+            <a:effectRef idx="0">
+              <a:schemeClr val="accent1"/>
+            </a:effectRef>
+            <a:fontRef idx="minor">
+              <a:schemeClr val="lt1"/>
+            </a:fontRef>
+          </p:style>
+          <p:txBody>
+            <a:bodyPr rtlCol="0" anchor="ctr"/>
+            <a:lstStyle/>
+            <a:p>
+              <a:pPr algn="ctr"/>
+              <a:endParaRPr lang="ko-KR" altLang="en-US"/>
+            </a:p>
+          </p:txBody>
+        </p:sp>
+        <p:sp>
+          <p:nvSpPr>
+            <p:cNvPr id="139" name="팔각형 138">
+              <a:extLst>
+                <a:ext uri="{FF2B5EF4-FFF2-40B4-BE49-F238E27FC236}">
+                  <a16:creationId xmlns:a16="http://schemas.microsoft.com/office/drawing/2014/main" id="{3D0737F2-688E-9245-B718-73724853A379}"/>
+                </a:ext>
+              </a:extLst>
+            </p:cNvPr>
+            <p:cNvSpPr/>
+            <p:nvPr/>
+          </p:nvSpPr>
+          <p:spPr>
+            <a:xfrm rot="16048658" flipH="1" flipV="1">
+              <a:off x="6836701" y="2030554"/>
+              <a:ext cx="12272" cy="12272"/>
+            </a:xfrm>
+            <a:prstGeom prst="octagon">
+              <a:avLst/>
+            </a:prstGeom>
+            <a:gradFill>
+              <a:gsLst>
+                <a:gs pos="0">
+                  <a:schemeClr val="bg1"/>
+                </a:gs>
+                <a:gs pos="52000">
+                  <a:srgbClr val="152145"/>
+                </a:gs>
+              </a:gsLst>
+              <a:path path="circle">
+                <a:fillToRect l="50000" t="50000" r="50000" b="50000"/>
+              </a:path>
+            </a:gradFill>
+            <a:ln>
+              <a:noFill/>
+            </a:ln>
+          </p:spPr>
+          <p:style>
+            <a:lnRef idx="2">
+              <a:schemeClr val="accent1">
+                <a:shade val="15000"/>
+              </a:schemeClr>
+            </a:lnRef>
+            <a:fillRef idx="1">
+              <a:schemeClr val="accent1"/>
+            </a:fillRef>
+            <a:effectRef idx="0">
+              <a:schemeClr val="accent1"/>
+            </a:effectRef>
+            <a:fontRef idx="minor">
+              <a:schemeClr val="lt1"/>
+            </a:fontRef>
+          </p:style>
+          <p:txBody>
+            <a:bodyPr rtlCol="0" anchor="ctr"/>
+            <a:lstStyle/>
+            <a:p>
+              <a:pPr algn="ctr"/>
+              <a:endParaRPr lang="ko-KR" altLang="en-US"/>
+            </a:p>
+          </p:txBody>
+        </p:sp>
+        <p:sp>
+          <p:nvSpPr>
+            <p:cNvPr id="140" name="팔각형 139">
+              <a:extLst>
+                <a:ext uri="{FF2B5EF4-FFF2-40B4-BE49-F238E27FC236}">
+                  <a16:creationId xmlns:a16="http://schemas.microsoft.com/office/drawing/2014/main" id="{8EA82E1F-F2CD-8292-AD69-42C068B5164B}"/>
+                </a:ext>
+              </a:extLst>
+            </p:cNvPr>
+            <p:cNvSpPr/>
+            <p:nvPr/>
+          </p:nvSpPr>
+          <p:spPr>
+            <a:xfrm rot="16048658" flipH="1" flipV="1">
+              <a:off x="6892488" y="1262818"/>
+              <a:ext cx="12272" cy="12272"/>
+            </a:xfrm>
+            <a:prstGeom prst="octagon">
+              <a:avLst/>
+            </a:prstGeom>
+            <a:gradFill>
+              <a:gsLst>
+                <a:gs pos="0">
+                  <a:schemeClr val="bg1"/>
+                </a:gs>
+                <a:gs pos="52000">
+                  <a:srgbClr val="152145"/>
+                </a:gs>
+              </a:gsLst>
+              <a:path path="circle">
+                <a:fillToRect l="50000" t="50000" r="50000" b="50000"/>
+              </a:path>
+            </a:gradFill>
+            <a:ln>
+              <a:noFill/>
+            </a:ln>
+          </p:spPr>
+          <p:style>
+            <a:lnRef idx="2">
+              <a:schemeClr val="accent1">
+                <a:shade val="15000"/>
+              </a:schemeClr>
+            </a:lnRef>
+            <a:fillRef idx="1">
+              <a:schemeClr val="accent1"/>
+            </a:fillRef>
+            <a:effectRef idx="0">
+              <a:schemeClr val="accent1"/>
+            </a:effectRef>
+            <a:fontRef idx="minor">
+              <a:schemeClr val="lt1"/>
+            </a:fontRef>
+          </p:style>
+          <p:txBody>
+            <a:bodyPr rtlCol="0" anchor="ctr"/>
+            <a:lstStyle/>
+            <a:p>
+              <a:pPr algn="ctr"/>
+              <a:endParaRPr lang="ko-KR" altLang="en-US"/>
+            </a:p>
+          </p:txBody>
+        </p:sp>
+        <p:sp>
+          <p:nvSpPr>
+            <p:cNvPr id="141" name="팔각형 140">
+              <a:extLst>
+                <a:ext uri="{FF2B5EF4-FFF2-40B4-BE49-F238E27FC236}">
+                  <a16:creationId xmlns:a16="http://schemas.microsoft.com/office/drawing/2014/main" id="{1FD5DE96-958D-D095-B683-0DC0E6FC1F0F}"/>
+                </a:ext>
+              </a:extLst>
+            </p:cNvPr>
+            <p:cNvSpPr/>
+            <p:nvPr/>
+          </p:nvSpPr>
+          <p:spPr>
+            <a:xfrm rot="16048658" flipH="1" flipV="1">
+              <a:off x="6535518" y="1512836"/>
+              <a:ext cx="12272" cy="12272"/>
+            </a:xfrm>
+            <a:prstGeom prst="octagon">
+              <a:avLst/>
+            </a:prstGeom>
+            <a:gradFill>
+              <a:gsLst>
+                <a:gs pos="0">
+                  <a:schemeClr val="bg1"/>
+                </a:gs>
+                <a:gs pos="52000">
+                  <a:srgbClr val="152145"/>
+                </a:gs>
+              </a:gsLst>
+              <a:path path="circle">
+                <a:fillToRect l="50000" t="50000" r="50000" b="50000"/>
+              </a:path>
+            </a:gradFill>
+            <a:ln>
+              <a:noFill/>
+            </a:ln>
+          </p:spPr>
+          <p:style>
+            <a:lnRef idx="2">
+              <a:schemeClr val="accent1">
+                <a:shade val="15000"/>
+              </a:schemeClr>
+            </a:lnRef>
+            <a:fillRef idx="1">
+              <a:schemeClr val="accent1"/>
+            </a:fillRef>
+            <a:effectRef idx="0">
+              <a:schemeClr val="accent1"/>
+            </a:effectRef>
+            <a:fontRef idx="minor">
+              <a:schemeClr val="lt1"/>
+            </a:fontRef>
+          </p:style>
+          <p:txBody>
+            <a:bodyPr rtlCol="0" anchor="ctr"/>
+            <a:lstStyle/>
+            <a:p>
+              <a:pPr algn="ctr"/>
+              <a:endParaRPr lang="ko-KR" altLang="en-US"/>
+            </a:p>
+          </p:txBody>
+        </p:sp>
+        <p:sp>
+          <p:nvSpPr>
+            <p:cNvPr id="142" name="팔각형 141">
+              <a:extLst>
+                <a:ext uri="{FF2B5EF4-FFF2-40B4-BE49-F238E27FC236}">
+                  <a16:creationId xmlns:a16="http://schemas.microsoft.com/office/drawing/2014/main" id="{23560214-B4ED-0910-C476-6F718538CED7}"/>
+                </a:ext>
+              </a:extLst>
+            </p:cNvPr>
+            <p:cNvSpPr/>
+            <p:nvPr/>
+          </p:nvSpPr>
+          <p:spPr>
+            <a:xfrm rot="16048658" flipH="1" flipV="1">
+              <a:off x="7647468" y="2133546"/>
+              <a:ext cx="12272" cy="12272"/>
+            </a:xfrm>
+            <a:prstGeom prst="octagon">
+              <a:avLst/>
+            </a:prstGeom>
+            <a:gradFill>
+              <a:gsLst>
+                <a:gs pos="0">
+                  <a:schemeClr val="bg1"/>
+                </a:gs>
+                <a:gs pos="52000">
+                  <a:srgbClr val="152145"/>
+                </a:gs>
+              </a:gsLst>
+              <a:path path="circle">
+                <a:fillToRect l="50000" t="50000" r="50000" b="50000"/>
+              </a:path>
+            </a:gradFill>
+            <a:ln>
+              <a:noFill/>
+            </a:ln>
+          </p:spPr>
+          <p:style>
+            <a:lnRef idx="2">
+              <a:schemeClr val="accent1">
+                <a:shade val="15000"/>
+              </a:schemeClr>
+            </a:lnRef>
+            <a:fillRef idx="1">
+              <a:schemeClr val="accent1"/>
+            </a:fillRef>
+            <a:effectRef idx="0">
+              <a:schemeClr val="accent1"/>
+            </a:effectRef>
+            <a:fontRef idx="minor">
+              <a:schemeClr val="lt1"/>
+            </a:fontRef>
+          </p:style>
+          <p:txBody>
+            <a:bodyPr rtlCol="0" anchor="ctr"/>
+            <a:lstStyle/>
+            <a:p>
+              <a:pPr algn="ctr"/>
+              <a:endParaRPr lang="ko-KR" altLang="en-US"/>
+            </a:p>
+          </p:txBody>
+        </p:sp>
+        <p:sp>
+          <p:nvSpPr>
+            <p:cNvPr id="146" name="팔각형 145">
+              <a:extLst>
+                <a:ext uri="{FF2B5EF4-FFF2-40B4-BE49-F238E27FC236}">
+                  <a16:creationId xmlns:a16="http://schemas.microsoft.com/office/drawing/2014/main" id="{FAF11A5B-CE70-A16D-863C-7A5B644055CB}"/>
+                </a:ext>
+              </a:extLst>
+            </p:cNvPr>
+            <p:cNvSpPr/>
+            <p:nvPr/>
+          </p:nvSpPr>
+          <p:spPr>
+            <a:xfrm rot="16048658" flipH="1" flipV="1">
+              <a:off x="7200419" y="2107809"/>
+              <a:ext cx="12272" cy="12272"/>
+            </a:xfrm>
+            <a:prstGeom prst="octagon">
+              <a:avLst/>
+            </a:prstGeom>
+            <a:gradFill>
+              <a:gsLst>
+                <a:gs pos="0">
+                  <a:schemeClr val="bg1"/>
+                </a:gs>
+                <a:gs pos="52000">
+                  <a:srgbClr val="152145"/>
+                </a:gs>
+              </a:gsLst>
+              <a:path path="circle">
+                <a:fillToRect l="50000" t="50000" r="50000" b="50000"/>
+              </a:path>
+            </a:gradFill>
+            <a:ln>
+              <a:noFill/>
+            </a:ln>
+          </p:spPr>
+          <p:style>
+            <a:lnRef idx="2">
+              <a:schemeClr val="accent1">
+                <a:shade val="15000"/>
+              </a:schemeClr>
+            </a:lnRef>
+            <a:fillRef idx="1">
+              <a:schemeClr val="accent1"/>
+            </a:fillRef>
+            <a:effectRef idx="0">
+              <a:schemeClr val="accent1"/>
+            </a:effectRef>
+            <a:fontRef idx="minor">
+              <a:schemeClr val="lt1"/>
+            </a:fontRef>
+          </p:style>
+          <p:txBody>
+            <a:bodyPr rtlCol="0" anchor="ctr"/>
+            <a:lstStyle/>
+            <a:p>
+              <a:pPr algn="ctr"/>
+              <a:endParaRPr lang="ko-KR" altLang="en-US"/>
+            </a:p>
+          </p:txBody>
+        </p:sp>
+        <p:sp>
+          <p:nvSpPr>
+            <p:cNvPr id="148" name="팔각형 147">
+              <a:extLst>
+                <a:ext uri="{FF2B5EF4-FFF2-40B4-BE49-F238E27FC236}">
+                  <a16:creationId xmlns:a16="http://schemas.microsoft.com/office/drawing/2014/main" id="{2C3801EF-574B-0C87-2FAF-CFB4510F264D}"/>
+                </a:ext>
+              </a:extLst>
+            </p:cNvPr>
+            <p:cNvSpPr/>
+            <p:nvPr/>
+          </p:nvSpPr>
+          <p:spPr>
+            <a:xfrm rot="16048658" flipH="1" flipV="1">
+              <a:off x="7467709" y="1463701"/>
+              <a:ext cx="12272" cy="12272"/>
+            </a:xfrm>
+            <a:prstGeom prst="octagon">
+              <a:avLst/>
+            </a:prstGeom>
+            <a:gradFill>
+              <a:gsLst>
+                <a:gs pos="0">
+                  <a:schemeClr val="bg1"/>
+                </a:gs>
+                <a:gs pos="52000">
+                  <a:srgbClr val="152145"/>
+                </a:gs>
+              </a:gsLst>
+              <a:path path="circle">
+                <a:fillToRect l="50000" t="50000" r="50000" b="50000"/>
+              </a:path>
+            </a:gradFill>
+            <a:ln>
+              <a:noFill/>
+            </a:ln>
+          </p:spPr>
+          <p:style>
+            <a:lnRef idx="2">
+              <a:schemeClr val="accent1">
+                <a:shade val="15000"/>
+              </a:schemeClr>
+            </a:lnRef>
+            <a:fillRef idx="1">
+              <a:schemeClr val="accent1"/>
+            </a:fillRef>
+            <a:effectRef idx="0">
+              <a:schemeClr val="accent1"/>
+            </a:effectRef>
+            <a:fontRef idx="minor">
+              <a:schemeClr val="lt1"/>
+            </a:fontRef>
+          </p:style>
+          <p:txBody>
+            <a:bodyPr rtlCol="0" anchor="ctr"/>
+            <a:lstStyle/>
+            <a:p>
+              <a:pPr algn="ctr"/>
+              <a:endParaRPr lang="ko-KR" altLang="en-US"/>
+            </a:p>
+          </p:txBody>
+        </p:sp>
+        <p:sp>
+          <p:nvSpPr>
+            <p:cNvPr id="149" name="팔각형 148">
+              <a:extLst>
+                <a:ext uri="{FF2B5EF4-FFF2-40B4-BE49-F238E27FC236}">
+                  <a16:creationId xmlns:a16="http://schemas.microsoft.com/office/drawing/2014/main" id="{83537C7C-8EA3-90F8-B789-93A3F74E37F5}"/>
+                </a:ext>
+              </a:extLst>
+            </p:cNvPr>
+            <p:cNvSpPr/>
+            <p:nvPr/>
+          </p:nvSpPr>
+          <p:spPr>
+            <a:xfrm rot="16048658" flipH="1" flipV="1">
+              <a:off x="7537283" y="1828951"/>
+              <a:ext cx="12272" cy="12272"/>
+            </a:xfrm>
+            <a:prstGeom prst="octagon">
+              <a:avLst/>
+            </a:prstGeom>
+            <a:gradFill>
+              <a:gsLst>
+                <a:gs pos="0">
+                  <a:schemeClr val="bg1"/>
+                </a:gs>
+                <a:gs pos="52000">
+                  <a:srgbClr val="152145"/>
+                </a:gs>
+              </a:gsLst>
+              <a:path path="circle">
+                <a:fillToRect l="50000" t="50000" r="50000" b="50000"/>
+              </a:path>
+            </a:gradFill>
+            <a:ln>
+              <a:noFill/>
+            </a:ln>
+          </p:spPr>
+          <p:style>
+            <a:lnRef idx="2">
+              <a:schemeClr val="accent1">
+                <a:shade val="15000"/>
+              </a:schemeClr>
+            </a:lnRef>
+            <a:fillRef idx="1">
+              <a:schemeClr val="accent1"/>
+            </a:fillRef>
+            <a:effectRef idx="0">
+              <a:schemeClr val="accent1"/>
+            </a:effectRef>
+            <a:fontRef idx="minor">
+              <a:schemeClr val="lt1"/>
+            </a:fontRef>
+          </p:style>
+          <p:txBody>
+            <a:bodyPr rtlCol="0" anchor="ctr"/>
+            <a:lstStyle/>
+            <a:p>
+              <a:pPr algn="ctr"/>
+              <a:endParaRPr lang="ko-KR" altLang="en-US"/>
+            </a:p>
+          </p:txBody>
+        </p:sp>
+        <p:sp>
+          <p:nvSpPr>
+            <p:cNvPr id="150" name="팔각형 149">
+              <a:extLst>
+                <a:ext uri="{FF2B5EF4-FFF2-40B4-BE49-F238E27FC236}">
+                  <a16:creationId xmlns:a16="http://schemas.microsoft.com/office/drawing/2014/main" id="{0ABE3FF3-200D-FB4D-F406-59A29A2F1D7C}"/>
+                </a:ext>
+              </a:extLst>
+            </p:cNvPr>
+            <p:cNvSpPr/>
+            <p:nvPr/>
+          </p:nvSpPr>
+          <p:spPr>
+            <a:xfrm rot="16048658" flipH="1" flipV="1">
+              <a:off x="6971949" y="1888930"/>
+              <a:ext cx="12272" cy="12272"/>
+            </a:xfrm>
+            <a:prstGeom prst="octagon">
+              <a:avLst/>
+            </a:prstGeom>
+            <a:gradFill>
+              <a:gsLst>
+                <a:gs pos="0">
+                  <a:schemeClr val="bg1"/>
+                </a:gs>
+                <a:gs pos="52000">
+                  <a:srgbClr val="152145"/>
+                </a:gs>
+              </a:gsLst>
+              <a:path path="circle">
+                <a:fillToRect l="50000" t="50000" r="50000" b="50000"/>
+              </a:path>
+            </a:gradFill>
+            <a:ln>
+              <a:noFill/>
+            </a:ln>
+          </p:spPr>
+          <p:style>
+            <a:lnRef idx="2">
+              <a:schemeClr val="accent1">
+                <a:shade val="15000"/>
+              </a:schemeClr>
+            </a:lnRef>
+            <a:fillRef idx="1">
+              <a:schemeClr val="accent1"/>
+            </a:fillRef>
+            <a:effectRef idx="0">
+              <a:schemeClr val="accent1"/>
+            </a:effectRef>
+            <a:fontRef idx="minor">
+              <a:schemeClr val="lt1"/>
+            </a:fontRef>
+          </p:style>
+          <p:txBody>
+            <a:bodyPr rtlCol="0" anchor="ctr"/>
+            <a:lstStyle/>
+            <a:p>
+              <a:pPr algn="ctr"/>
+              <a:endParaRPr lang="ko-KR" altLang="en-US"/>
+            </a:p>
+          </p:txBody>
+        </p:sp>
+        <p:sp>
+          <p:nvSpPr>
+            <p:cNvPr id="151" name="팔각형 150">
+              <a:extLst>
+                <a:ext uri="{FF2B5EF4-FFF2-40B4-BE49-F238E27FC236}">
+                  <a16:creationId xmlns:a16="http://schemas.microsoft.com/office/drawing/2014/main" id="{3912859F-5311-C07B-80F0-DCA43029B108}"/>
+                </a:ext>
+              </a:extLst>
+            </p:cNvPr>
+            <p:cNvSpPr/>
+            <p:nvPr/>
+          </p:nvSpPr>
+          <p:spPr>
+            <a:xfrm rot="16048658" flipH="1" flipV="1">
+              <a:off x="6747716" y="1885453"/>
+              <a:ext cx="12272" cy="12272"/>
+            </a:xfrm>
+            <a:prstGeom prst="octagon">
+              <a:avLst/>
+            </a:prstGeom>
+            <a:gradFill>
+              <a:gsLst>
+                <a:gs pos="0">
+                  <a:schemeClr val="bg1"/>
+                </a:gs>
+                <a:gs pos="52000">
+                  <a:srgbClr val="152145"/>
+                </a:gs>
+              </a:gsLst>
+              <a:path path="circle">
+                <a:fillToRect l="50000" t="50000" r="50000" b="50000"/>
+              </a:path>
+            </a:gradFill>
+            <a:ln>
+              <a:noFill/>
+            </a:ln>
+          </p:spPr>
+          <p:style>
+            <a:lnRef idx="2">
+              <a:schemeClr val="accent1">
+                <a:shade val="15000"/>
+              </a:schemeClr>
+            </a:lnRef>
+            <a:fillRef idx="1">
+              <a:schemeClr val="accent1"/>
+            </a:fillRef>
+            <a:effectRef idx="0">
+              <a:schemeClr val="accent1"/>
+            </a:effectRef>
+            <a:fontRef idx="minor">
+              <a:schemeClr val="lt1"/>
+            </a:fontRef>
+          </p:style>
+          <p:txBody>
+            <a:bodyPr rtlCol="0" anchor="ctr"/>
+            <a:lstStyle/>
+            <a:p>
+              <a:pPr algn="ctr"/>
+              <a:endParaRPr lang="ko-KR" altLang="en-US"/>
+            </a:p>
+          </p:txBody>
+        </p:sp>
+        <p:sp>
+          <p:nvSpPr>
+            <p:cNvPr id="155" name="팔각형 154">
+              <a:extLst>
+                <a:ext uri="{FF2B5EF4-FFF2-40B4-BE49-F238E27FC236}">
+                  <a16:creationId xmlns:a16="http://schemas.microsoft.com/office/drawing/2014/main" id="{3C5AA1FC-E8A6-8E58-BCAA-98B5B1A2677D}"/>
+                </a:ext>
+              </a:extLst>
+            </p:cNvPr>
+            <p:cNvSpPr/>
+            <p:nvPr/>
+          </p:nvSpPr>
+          <p:spPr>
+            <a:xfrm rot="5248658" flipH="1" flipV="1">
+              <a:off x="7659978" y="1673959"/>
+              <a:ext cx="18000" cy="18000"/>
+            </a:xfrm>
+            <a:prstGeom prst="octagon">
+              <a:avLst/>
+            </a:prstGeom>
+            <a:gradFill>
+              <a:gsLst>
+                <a:gs pos="0">
+                  <a:schemeClr val="bg1"/>
+                </a:gs>
+                <a:gs pos="52000">
+                  <a:srgbClr val="152145"/>
+                </a:gs>
+              </a:gsLst>
+              <a:path path="circle">
+                <a:fillToRect l="50000" t="50000" r="50000" b="50000"/>
+              </a:path>
+            </a:gradFill>
+            <a:ln>
+              <a:noFill/>
+            </a:ln>
+          </p:spPr>
+          <p:style>
+            <a:lnRef idx="2">
+              <a:schemeClr val="accent1">
+                <a:shade val="15000"/>
+              </a:schemeClr>
+            </a:lnRef>
+            <a:fillRef idx="1">
+              <a:schemeClr val="accent1"/>
+            </a:fillRef>
+            <a:effectRef idx="0">
+              <a:schemeClr val="accent1"/>
+            </a:effectRef>
+            <a:fontRef idx="minor">
+              <a:schemeClr val="lt1"/>
+            </a:fontRef>
+          </p:style>
+          <p:txBody>
+            <a:bodyPr rtlCol="0" anchor="ctr"/>
+            <a:lstStyle/>
+            <a:p>
+              <a:pPr algn="ctr"/>
+              <a:endParaRPr lang="ko-KR" altLang="en-US"/>
+            </a:p>
+          </p:txBody>
+        </p:sp>
+        <p:sp>
+          <p:nvSpPr>
+            <p:cNvPr id="157" name="팔각형 156">
+              <a:extLst>
+                <a:ext uri="{FF2B5EF4-FFF2-40B4-BE49-F238E27FC236}">
+                  <a16:creationId xmlns:a16="http://schemas.microsoft.com/office/drawing/2014/main" id="{B07A0709-2D55-1747-0F3B-B7B210668EFE}"/>
+                </a:ext>
+              </a:extLst>
+            </p:cNvPr>
+            <p:cNvSpPr/>
+            <p:nvPr/>
+          </p:nvSpPr>
+          <p:spPr>
+            <a:xfrm rot="5248658" flipH="1" flipV="1">
+              <a:off x="7450120" y="1684845"/>
+              <a:ext cx="18000" cy="18000"/>
+            </a:xfrm>
+            <a:prstGeom prst="octagon">
+              <a:avLst/>
+            </a:prstGeom>
+            <a:gradFill>
+              <a:gsLst>
+                <a:gs pos="0">
+                  <a:schemeClr val="bg1"/>
+                </a:gs>
+                <a:gs pos="52000">
+                  <a:srgbClr val="152145"/>
+                </a:gs>
+              </a:gsLst>
+              <a:path path="circle">
+                <a:fillToRect l="50000" t="50000" r="50000" b="50000"/>
+              </a:path>
+            </a:gradFill>
+            <a:ln>
+              <a:noFill/>
+            </a:ln>
+          </p:spPr>
+          <p:style>
+            <a:lnRef idx="2">
+              <a:schemeClr val="accent1">
+                <a:shade val="15000"/>
+              </a:schemeClr>
+            </a:lnRef>
+            <a:fillRef idx="1">
+              <a:schemeClr val="accent1"/>
+            </a:fillRef>
+            <a:effectRef idx="0">
+              <a:schemeClr val="accent1"/>
+            </a:effectRef>
+            <a:fontRef idx="minor">
+              <a:schemeClr val="lt1"/>
+            </a:fontRef>
+          </p:style>
+          <p:txBody>
+            <a:bodyPr rtlCol="0" anchor="ctr"/>
+            <a:lstStyle/>
+            <a:p>
+              <a:pPr algn="ctr"/>
+              <a:endParaRPr lang="ko-KR" altLang="en-US"/>
+            </a:p>
+          </p:txBody>
+        </p:sp>
+        <p:sp>
+          <p:nvSpPr>
+            <p:cNvPr id="158" name="팔각형 157">
+              <a:extLst>
+                <a:ext uri="{FF2B5EF4-FFF2-40B4-BE49-F238E27FC236}">
+                  <a16:creationId xmlns:a16="http://schemas.microsoft.com/office/drawing/2014/main" id="{350E856D-8A18-6499-CE08-94C260B2E0C5}"/>
+                </a:ext>
+              </a:extLst>
+            </p:cNvPr>
+            <p:cNvSpPr/>
+            <p:nvPr/>
+          </p:nvSpPr>
+          <p:spPr>
+            <a:xfrm rot="5248658" flipH="1" flipV="1">
+              <a:off x="7369856" y="1347830"/>
+              <a:ext cx="18000" cy="18000"/>
+            </a:xfrm>
+            <a:prstGeom prst="octagon">
+              <a:avLst/>
+            </a:prstGeom>
+            <a:gradFill>
+              <a:gsLst>
+                <a:gs pos="0">
+                  <a:schemeClr val="bg1"/>
+                </a:gs>
+                <a:gs pos="52000">
+                  <a:srgbClr val="152145"/>
+                </a:gs>
+              </a:gsLst>
+              <a:path path="circle">
+                <a:fillToRect l="50000" t="50000" r="50000" b="50000"/>
+              </a:path>
+            </a:gradFill>
+            <a:ln>
+              <a:noFill/>
+            </a:ln>
+          </p:spPr>
+          <p:style>
+            <a:lnRef idx="2">
+              <a:schemeClr val="accent1">
+                <a:shade val="15000"/>
+              </a:schemeClr>
+            </a:lnRef>
+            <a:fillRef idx="1">
+              <a:schemeClr val="accent1"/>
+            </a:fillRef>
+            <a:effectRef idx="0">
+              <a:schemeClr val="accent1"/>
+            </a:effectRef>
+            <a:fontRef idx="minor">
+              <a:schemeClr val="lt1"/>
+            </a:fontRef>
+          </p:style>
+          <p:txBody>
+            <a:bodyPr rtlCol="0" anchor="ctr"/>
+            <a:lstStyle/>
+            <a:p>
+              <a:pPr algn="ctr"/>
+              <a:endParaRPr lang="ko-KR" altLang="en-US"/>
+            </a:p>
+          </p:txBody>
+        </p:sp>
+        <p:sp>
+          <p:nvSpPr>
+            <p:cNvPr id="159" name="팔각형 158">
+              <a:extLst>
+                <a:ext uri="{FF2B5EF4-FFF2-40B4-BE49-F238E27FC236}">
+                  <a16:creationId xmlns:a16="http://schemas.microsoft.com/office/drawing/2014/main" id="{C2D65F87-5232-15FA-F76E-B2443E49AAE6}"/>
+                </a:ext>
+              </a:extLst>
+            </p:cNvPr>
+            <p:cNvSpPr/>
+            <p:nvPr/>
+          </p:nvSpPr>
+          <p:spPr>
+            <a:xfrm rot="5248658" flipH="1" flipV="1">
+              <a:off x="7522256" y="1195430"/>
+              <a:ext cx="18000" cy="18000"/>
+            </a:xfrm>
+            <a:prstGeom prst="octagon">
+              <a:avLst/>
+            </a:prstGeom>
+            <a:gradFill>
+              <a:gsLst>
+                <a:gs pos="0">
+                  <a:schemeClr val="bg1"/>
+                </a:gs>
+                <a:gs pos="52000">
+                  <a:srgbClr val="152145"/>
+                </a:gs>
+              </a:gsLst>
+              <a:path path="circle">
+                <a:fillToRect l="50000" t="50000" r="50000" b="50000"/>
+              </a:path>
+            </a:gradFill>
+            <a:ln>
+              <a:noFill/>
+            </a:ln>
+          </p:spPr>
+          <p:style>
+            <a:lnRef idx="2">
+              <a:schemeClr val="accent1">
+                <a:shade val="15000"/>
+              </a:schemeClr>
+            </a:lnRef>
+            <a:fillRef idx="1">
+              <a:schemeClr val="accent1"/>
+            </a:fillRef>
+            <a:effectRef idx="0">
+              <a:schemeClr val="accent1"/>
+            </a:effectRef>
+            <a:fontRef idx="minor">
+              <a:schemeClr val="lt1"/>
+            </a:fontRef>
+          </p:style>
+          <p:txBody>
+            <a:bodyPr rtlCol="0" anchor="ctr"/>
+            <a:lstStyle/>
+            <a:p>
+              <a:pPr algn="ctr"/>
+              <a:endParaRPr lang="ko-KR" altLang="en-US"/>
+            </a:p>
+          </p:txBody>
+        </p:sp>
+        <p:sp>
+          <p:nvSpPr>
+            <p:cNvPr id="160" name="팔각형 159">
+              <a:extLst>
+                <a:ext uri="{FF2B5EF4-FFF2-40B4-BE49-F238E27FC236}">
+                  <a16:creationId xmlns:a16="http://schemas.microsoft.com/office/drawing/2014/main" id="{48EA0671-51B4-7042-6E95-FD5AEA2FD6FA}"/>
+                </a:ext>
+              </a:extLst>
+            </p:cNvPr>
+            <p:cNvSpPr/>
+            <p:nvPr/>
+          </p:nvSpPr>
+          <p:spPr>
+            <a:xfrm rot="10648658" flipH="1" flipV="1">
+              <a:off x="7578653" y="1687225"/>
+              <a:ext cx="12272" cy="12272"/>
+            </a:xfrm>
+            <a:prstGeom prst="octagon">
+              <a:avLst/>
+            </a:prstGeom>
+            <a:gradFill>
+              <a:gsLst>
+                <a:gs pos="0">
+                  <a:schemeClr val="bg1"/>
+                </a:gs>
+                <a:gs pos="52000">
+                  <a:srgbClr val="152145"/>
+                </a:gs>
+              </a:gsLst>
+              <a:path path="circle">
+                <a:fillToRect l="50000" t="50000" r="50000" b="50000"/>
+              </a:path>
+            </a:gradFill>
+            <a:ln>
+              <a:noFill/>
+            </a:ln>
+          </p:spPr>
+          <p:style>
+            <a:lnRef idx="2">
+              <a:schemeClr val="accent1">
+                <a:shade val="15000"/>
+              </a:schemeClr>
+            </a:lnRef>
+            <a:fillRef idx="1">
+              <a:schemeClr val="accent1"/>
+            </a:fillRef>
+            <a:effectRef idx="0">
+              <a:schemeClr val="accent1"/>
+            </a:effectRef>
+            <a:fontRef idx="minor">
+              <a:schemeClr val="lt1"/>
+            </a:fontRef>
+          </p:style>
+          <p:txBody>
+            <a:bodyPr rtlCol="0" anchor="ctr"/>
+            <a:lstStyle/>
+            <a:p>
+              <a:pPr algn="ctr"/>
+              <a:endParaRPr lang="ko-KR" altLang="en-US"/>
+            </a:p>
+          </p:txBody>
+        </p:sp>
+        <p:sp>
+          <p:nvSpPr>
+            <p:cNvPr id="161" name="팔각형 160">
+              <a:extLst>
+                <a:ext uri="{FF2B5EF4-FFF2-40B4-BE49-F238E27FC236}">
+                  <a16:creationId xmlns:a16="http://schemas.microsoft.com/office/drawing/2014/main" id="{FA293AEB-B3A0-6982-97DB-86342893777A}"/>
+                </a:ext>
+              </a:extLst>
+            </p:cNvPr>
+            <p:cNvSpPr/>
+            <p:nvPr/>
+          </p:nvSpPr>
+          <p:spPr>
+            <a:xfrm rot="10648658" flipH="1" flipV="1">
+              <a:off x="7475447" y="1793580"/>
+              <a:ext cx="12272" cy="12272"/>
+            </a:xfrm>
+            <a:prstGeom prst="octagon">
+              <a:avLst/>
+            </a:prstGeom>
+            <a:gradFill>
+              <a:gsLst>
+                <a:gs pos="0">
+                  <a:schemeClr val="bg1"/>
+                </a:gs>
+                <a:gs pos="52000">
+                  <a:srgbClr val="152145"/>
+                </a:gs>
+              </a:gsLst>
+              <a:path path="circle">
+                <a:fillToRect l="50000" t="50000" r="50000" b="50000"/>
+              </a:path>
+            </a:gradFill>
+            <a:ln>
+              <a:noFill/>
+            </a:ln>
+          </p:spPr>
+          <p:style>
+            <a:lnRef idx="2">
+              <a:schemeClr val="accent1">
+                <a:shade val="15000"/>
+              </a:schemeClr>
+            </a:lnRef>
+            <a:fillRef idx="1">
+              <a:schemeClr val="accent1"/>
+            </a:fillRef>
+            <a:effectRef idx="0">
+              <a:schemeClr val="accent1"/>
+            </a:effectRef>
+            <a:fontRef idx="minor">
+              <a:schemeClr val="lt1"/>
+            </a:fontRef>
+          </p:style>
+          <p:txBody>
+            <a:bodyPr rtlCol="0" anchor="ctr"/>
+            <a:lstStyle/>
+            <a:p>
+              <a:pPr algn="ctr"/>
+              <a:endParaRPr lang="ko-KR" altLang="en-US"/>
+            </a:p>
+          </p:txBody>
+        </p:sp>
+        <p:sp>
+          <p:nvSpPr>
+            <p:cNvPr id="162" name="팔각형 161">
+              <a:extLst>
+                <a:ext uri="{FF2B5EF4-FFF2-40B4-BE49-F238E27FC236}">
+                  <a16:creationId xmlns:a16="http://schemas.microsoft.com/office/drawing/2014/main" id="{8D42E948-92E3-2068-192D-64AC24E4090C}"/>
+                </a:ext>
+              </a:extLst>
+            </p:cNvPr>
+            <p:cNvSpPr/>
+            <p:nvPr/>
+          </p:nvSpPr>
+          <p:spPr>
+            <a:xfrm rot="10648658" flipH="1" flipV="1">
+              <a:off x="7360935" y="1749621"/>
+              <a:ext cx="12272" cy="12272"/>
+            </a:xfrm>
+            <a:prstGeom prst="octagon">
+              <a:avLst/>
+            </a:prstGeom>
+            <a:gradFill>
+              <a:gsLst>
+                <a:gs pos="0">
+                  <a:schemeClr val="bg1"/>
+                </a:gs>
+                <a:gs pos="52000">
+                  <a:srgbClr val="152145"/>
+                </a:gs>
+              </a:gsLst>
+              <a:path path="circle">
+                <a:fillToRect l="50000" t="50000" r="50000" b="50000"/>
+              </a:path>
+            </a:gradFill>
+            <a:ln>
+              <a:noFill/>
+            </a:ln>
+          </p:spPr>
+          <p:style>
+            <a:lnRef idx="2">
+              <a:schemeClr val="accent1">
+                <a:shade val="15000"/>
+              </a:schemeClr>
+            </a:lnRef>
+            <a:fillRef idx="1">
+              <a:schemeClr val="accent1"/>
+            </a:fillRef>
+            <a:effectRef idx="0">
+              <a:schemeClr val="accent1"/>
+            </a:effectRef>
+            <a:fontRef idx="minor">
+              <a:schemeClr val="lt1"/>
+            </a:fontRef>
+          </p:style>
+          <p:txBody>
+            <a:bodyPr rtlCol="0" anchor="ctr"/>
+            <a:lstStyle/>
+            <a:p>
+              <a:pPr algn="ctr"/>
+              <a:endParaRPr lang="ko-KR" altLang="en-US"/>
+            </a:p>
+          </p:txBody>
+        </p:sp>
+        <p:sp>
+          <p:nvSpPr>
+            <p:cNvPr id="163" name="팔각형 162">
+              <a:extLst>
+                <a:ext uri="{FF2B5EF4-FFF2-40B4-BE49-F238E27FC236}">
+                  <a16:creationId xmlns:a16="http://schemas.microsoft.com/office/drawing/2014/main" id="{76C552AC-1A23-5F5C-8ACF-8B5F6823E16B}"/>
+                </a:ext>
+              </a:extLst>
+            </p:cNvPr>
+            <p:cNvSpPr/>
+            <p:nvPr/>
+          </p:nvSpPr>
+          <p:spPr>
+            <a:xfrm rot="10648658" flipH="1" flipV="1">
+              <a:off x="7571231" y="1544143"/>
+              <a:ext cx="12272" cy="12272"/>
+            </a:xfrm>
+            <a:prstGeom prst="octagon">
+              <a:avLst/>
+            </a:prstGeom>
+            <a:gradFill>
+              <a:gsLst>
+                <a:gs pos="0">
+                  <a:schemeClr val="bg1"/>
+                </a:gs>
+                <a:gs pos="52000">
+                  <a:srgbClr val="152145"/>
+                </a:gs>
+              </a:gsLst>
+              <a:path path="circle">
+                <a:fillToRect l="50000" t="50000" r="50000" b="50000"/>
+              </a:path>
+            </a:gradFill>
+            <a:ln>
+              <a:noFill/>
+            </a:ln>
+          </p:spPr>
+          <p:style>
+            <a:lnRef idx="2">
+              <a:schemeClr val="accent1">
+                <a:shade val="15000"/>
+              </a:schemeClr>
+            </a:lnRef>
+            <a:fillRef idx="1">
+              <a:schemeClr val="accent1"/>
+            </a:fillRef>
+            <a:effectRef idx="0">
+              <a:schemeClr val="accent1"/>
+            </a:effectRef>
+            <a:fontRef idx="minor">
+              <a:schemeClr val="lt1"/>
+            </a:fontRef>
+          </p:style>
+          <p:txBody>
+            <a:bodyPr rtlCol="0" anchor="ctr"/>
+            <a:lstStyle/>
+            <a:p>
+              <a:pPr algn="ctr"/>
+              <a:endParaRPr lang="ko-KR" altLang="en-US"/>
+            </a:p>
+          </p:txBody>
+        </p:sp>
+        <p:sp>
+          <p:nvSpPr>
+            <p:cNvPr id="164" name="팔각형 163">
+              <a:extLst>
+                <a:ext uri="{FF2B5EF4-FFF2-40B4-BE49-F238E27FC236}">
+                  <a16:creationId xmlns:a16="http://schemas.microsoft.com/office/drawing/2014/main" id="{FB5A8772-93C0-6757-D2F2-DE1E8ADC5309}"/>
+                </a:ext>
+              </a:extLst>
+            </p:cNvPr>
+            <p:cNvSpPr/>
+            <p:nvPr/>
+          </p:nvSpPr>
+          <p:spPr>
+            <a:xfrm rot="10648658" flipH="1" flipV="1">
+              <a:off x="7626057" y="1256462"/>
+              <a:ext cx="12272" cy="12272"/>
+            </a:xfrm>
+            <a:prstGeom prst="octagon">
+              <a:avLst/>
+            </a:prstGeom>
+            <a:gradFill>
+              <a:gsLst>
+                <a:gs pos="0">
+                  <a:schemeClr val="bg1"/>
+                </a:gs>
+                <a:gs pos="52000">
+                  <a:srgbClr val="152145"/>
+                </a:gs>
+              </a:gsLst>
+              <a:path path="circle">
+                <a:fillToRect l="50000" t="50000" r="50000" b="50000"/>
+              </a:path>
+            </a:gradFill>
+            <a:ln>
+              <a:noFill/>
+            </a:ln>
+          </p:spPr>
+          <p:style>
+            <a:lnRef idx="2">
+              <a:schemeClr val="accent1">
+                <a:shade val="15000"/>
+              </a:schemeClr>
+            </a:lnRef>
+            <a:fillRef idx="1">
+              <a:schemeClr val="accent1"/>
+            </a:fillRef>
+            <a:effectRef idx="0">
+              <a:schemeClr val="accent1"/>
+            </a:effectRef>
+            <a:fontRef idx="minor">
+              <a:schemeClr val="lt1"/>
+            </a:fontRef>
+          </p:style>
+          <p:txBody>
+            <a:bodyPr rtlCol="0" anchor="ctr"/>
+            <a:lstStyle/>
+            <a:p>
+              <a:pPr algn="ctr"/>
+              <a:endParaRPr lang="ko-KR" altLang="en-US"/>
+            </a:p>
+          </p:txBody>
+        </p:sp>
+        <p:sp>
+          <p:nvSpPr>
+            <p:cNvPr id="166" name="팔각형 165">
+              <a:extLst>
+                <a:ext uri="{FF2B5EF4-FFF2-40B4-BE49-F238E27FC236}">
+                  <a16:creationId xmlns:a16="http://schemas.microsoft.com/office/drawing/2014/main" id="{5821BFF4-9A68-224C-2A09-A0D6998F5953}"/>
+                </a:ext>
+              </a:extLst>
+            </p:cNvPr>
+            <p:cNvSpPr/>
+            <p:nvPr/>
+          </p:nvSpPr>
+          <p:spPr>
+            <a:xfrm rot="10648658" flipH="1" flipV="1">
+              <a:off x="6595362" y="2056668"/>
+              <a:ext cx="18000" cy="18000"/>
+            </a:xfrm>
+            <a:prstGeom prst="octagon">
+              <a:avLst/>
+            </a:prstGeom>
+            <a:gradFill>
+              <a:gsLst>
+                <a:gs pos="0">
+                  <a:schemeClr val="bg1"/>
+                </a:gs>
+                <a:gs pos="52000">
+                  <a:srgbClr val="152145"/>
+                </a:gs>
+              </a:gsLst>
+              <a:path path="circle">
+                <a:fillToRect l="50000" t="50000" r="50000" b="50000"/>
+              </a:path>
+            </a:gradFill>
+            <a:ln>
+              <a:noFill/>
+            </a:ln>
+          </p:spPr>
+          <p:style>
+            <a:lnRef idx="2">
+              <a:schemeClr val="accent1">
+                <a:shade val="15000"/>
+              </a:schemeClr>
+            </a:lnRef>
+            <a:fillRef idx="1">
+              <a:schemeClr val="accent1"/>
+            </a:fillRef>
+            <a:effectRef idx="0">
+              <a:schemeClr val="accent1"/>
+            </a:effectRef>
+            <a:fontRef idx="minor">
+              <a:schemeClr val="lt1"/>
+            </a:fontRef>
+          </p:style>
+          <p:txBody>
+            <a:bodyPr rtlCol="0" anchor="ctr"/>
+            <a:lstStyle/>
+            <a:p>
+              <a:pPr algn="ctr"/>
+              <a:endParaRPr lang="ko-KR" altLang="en-US"/>
+            </a:p>
+          </p:txBody>
+        </p:sp>
+        <p:sp>
+          <p:nvSpPr>
+            <p:cNvPr id="167" name="팔각형 166">
+              <a:extLst>
+                <a:ext uri="{FF2B5EF4-FFF2-40B4-BE49-F238E27FC236}">
+                  <a16:creationId xmlns:a16="http://schemas.microsoft.com/office/drawing/2014/main" id="{57E54324-4D7D-637D-33A6-7B018BE07AB0}"/>
+                </a:ext>
+              </a:extLst>
+            </p:cNvPr>
+            <p:cNvSpPr/>
+            <p:nvPr/>
+          </p:nvSpPr>
+          <p:spPr>
+            <a:xfrm rot="10648658" flipH="1" flipV="1">
+              <a:off x="6783480" y="1347043"/>
+              <a:ext cx="18000" cy="18000"/>
+            </a:xfrm>
+            <a:prstGeom prst="octagon">
+              <a:avLst/>
+            </a:prstGeom>
+            <a:gradFill>
+              <a:gsLst>
+                <a:gs pos="0">
+                  <a:schemeClr val="bg1"/>
+                </a:gs>
+                <a:gs pos="52000">
+                  <a:srgbClr val="152145"/>
+                </a:gs>
+              </a:gsLst>
+              <a:path path="circle">
+                <a:fillToRect l="50000" t="50000" r="50000" b="50000"/>
+              </a:path>
+            </a:gradFill>
+            <a:ln>
+              <a:noFill/>
+            </a:ln>
+          </p:spPr>
+          <p:style>
+            <a:lnRef idx="2">
+              <a:schemeClr val="accent1">
+                <a:shade val="15000"/>
+              </a:schemeClr>
+            </a:lnRef>
+            <a:fillRef idx="1">
+              <a:schemeClr val="accent1"/>
+            </a:fillRef>
+            <a:effectRef idx="0">
+              <a:schemeClr val="accent1"/>
+            </a:effectRef>
+            <a:fontRef idx="minor">
+              <a:schemeClr val="lt1"/>
+            </a:fontRef>
+          </p:style>
+          <p:txBody>
+            <a:bodyPr rtlCol="0" anchor="ctr"/>
+            <a:lstStyle/>
+            <a:p>
+              <a:pPr algn="ctr"/>
+              <a:endParaRPr lang="ko-KR" altLang="en-US"/>
+            </a:p>
+          </p:txBody>
+        </p:sp>
+        <p:sp>
+          <p:nvSpPr>
+            <p:cNvPr id="168" name="팔각형 167">
+              <a:extLst>
+                <a:ext uri="{FF2B5EF4-FFF2-40B4-BE49-F238E27FC236}">
+                  <a16:creationId xmlns:a16="http://schemas.microsoft.com/office/drawing/2014/main" id="{EBC20EB1-94D2-A462-9D6D-5653322C2EDC}"/>
+                </a:ext>
+              </a:extLst>
+            </p:cNvPr>
+            <p:cNvSpPr/>
+            <p:nvPr/>
+          </p:nvSpPr>
+          <p:spPr>
+            <a:xfrm rot="16048658" flipH="1" flipV="1">
+              <a:off x="6440495" y="1396018"/>
+              <a:ext cx="12272" cy="12272"/>
+            </a:xfrm>
+            <a:prstGeom prst="octagon">
+              <a:avLst/>
+            </a:prstGeom>
+            <a:gradFill>
+              <a:gsLst>
+                <a:gs pos="0">
+                  <a:schemeClr val="bg1"/>
+                </a:gs>
+                <a:gs pos="52000">
+                  <a:srgbClr val="152145"/>
+                </a:gs>
+              </a:gsLst>
+              <a:path path="circle">
+                <a:fillToRect l="50000" t="50000" r="50000" b="50000"/>
+              </a:path>
+            </a:gradFill>
+            <a:ln>
+              <a:noFill/>
+            </a:ln>
+          </p:spPr>
+          <p:style>
+            <a:lnRef idx="2">
+              <a:schemeClr val="accent1">
+                <a:shade val="15000"/>
+              </a:schemeClr>
+            </a:lnRef>
+            <a:fillRef idx="1">
+              <a:schemeClr val="accent1"/>
+            </a:fillRef>
+            <a:effectRef idx="0">
+              <a:schemeClr val="accent1"/>
+            </a:effectRef>
+            <a:fontRef idx="minor">
+              <a:schemeClr val="lt1"/>
+            </a:fontRef>
+          </p:style>
+          <p:txBody>
+            <a:bodyPr rtlCol="0" anchor="ctr"/>
+            <a:lstStyle/>
+            <a:p>
+              <a:pPr algn="ctr"/>
+              <a:endParaRPr lang="ko-KR" altLang="en-US"/>
+            </a:p>
+          </p:txBody>
+        </p:sp>
+        <p:sp>
+          <p:nvSpPr>
+            <p:cNvPr id="169" name="팔각형 168">
+              <a:extLst>
+                <a:ext uri="{FF2B5EF4-FFF2-40B4-BE49-F238E27FC236}">
+                  <a16:creationId xmlns:a16="http://schemas.microsoft.com/office/drawing/2014/main" id="{B25C8294-F386-80C6-15DB-DF791748C7A1}"/>
+                </a:ext>
+              </a:extLst>
+            </p:cNvPr>
+            <p:cNvSpPr/>
+            <p:nvPr/>
+          </p:nvSpPr>
+          <p:spPr>
+            <a:xfrm rot="16048658" flipH="1" flipV="1">
+              <a:off x="6728176" y="1450844"/>
+              <a:ext cx="12272" cy="12272"/>
+            </a:xfrm>
+            <a:prstGeom prst="octagon">
+              <a:avLst/>
+            </a:prstGeom>
+            <a:gradFill>
+              <a:gsLst>
+                <a:gs pos="0">
+                  <a:schemeClr val="bg1"/>
+                </a:gs>
+                <a:gs pos="52000">
+                  <a:srgbClr val="152145"/>
+                </a:gs>
+              </a:gsLst>
+              <a:path path="circle">
+                <a:fillToRect l="50000" t="50000" r="50000" b="50000"/>
+              </a:path>
+            </a:gradFill>
+            <a:ln>
+              <a:noFill/>
+            </a:ln>
+          </p:spPr>
+          <p:style>
+            <a:lnRef idx="2">
+              <a:schemeClr val="accent1">
+                <a:shade val="15000"/>
+              </a:schemeClr>
+            </a:lnRef>
+            <a:fillRef idx="1">
+              <a:schemeClr val="accent1"/>
+            </a:fillRef>
+            <a:effectRef idx="0">
+              <a:schemeClr val="accent1"/>
+            </a:effectRef>
+            <a:fontRef idx="minor">
+              <a:schemeClr val="lt1"/>
+            </a:fontRef>
+          </p:style>
+          <p:txBody>
+            <a:bodyPr rtlCol="0" anchor="ctr"/>
+            <a:lstStyle/>
+            <a:p>
+              <a:pPr algn="ctr"/>
+              <a:endParaRPr lang="ko-KR" altLang="en-US"/>
+            </a:p>
+          </p:txBody>
+        </p:sp>
+        <p:sp>
+          <p:nvSpPr>
+            <p:cNvPr id="170" name="팔각형 169">
+              <a:extLst>
+                <a:ext uri="{FF2B5EF4-FFF2-40B4-BE49-F238E27FC236}">
+                  <a16:creationId xmlns:a16="http://schemas.microsoft.com/office/drawing/2014/main" id="{9E1761D4-F440-D3D7-6197-972F95511001}"/>
+                </a:ext>
+              </a:extLst>
+            </p:cNvPr>
+            <p:cNvSpPr/>
+            <p:nvPr/>
+          </p:nvSpPr>
+          <p:spPr>
+            <a:xfrm rot="5248658" flipH="1" flipV="1">
+              <a:off x="6850871" y="1295852"/>
+              <a:ext cx="18000" cy="18000"/>
+            </a:xfrm>
+            <a:prstGeom prst="octagon">
+              <a:avLst/>
+            </a:prstGeom>
+            <a:gradFill>
+              <a:gsLst>
+                <a:gs pos="0">
+                  <a:schemeClr val="bg1"/>
+                </a:gs>
+                <a:gs pos="52000">
+                  <a:srgbClr val="152145"/>
+                </a:gs>
+              </a:gsLst>
+              <a:path path="circle">
+                <a:fillToRect l="50000" t="50000" r="50000" b="50000"/>
+              </a:path>
+            </a:gradFill>
+            <a:ln>
+              <a:noFill/>
+            </a:ln>
+          </p:spPr>
+          <p:style>
+            <a:lnRef idx="2">
+              <a:schemeClr val="accent1">
+                <a:shade val="15000"/>
+              </a:schemeClr>
+            </a:lnRef>
+            <a:fillRef idx="1">
+              <a:schemeClr val="accent1"/>
+            </a:fillRef>
+            <a:effectRef idx="0">
+              <a:schemeClr val="accent1"/>
+            </a:effectRef>
+            <a:fontRef idx="minor">
+              <a:schemeClr val="lt1"/>
+            </a:fontRef>
+          </p:style>
+          <p:txBody>
+            <a:bodyPr rtlCol="0" anchor="ctr"/>
+            <a:lstStyle/>
+            <a:p>
+              <a:pPr algn="ctr"/>
+              <a:endParaRPr lang="ko-KR" altLang="en-US"/>
+            </a:p>
+          </p:txBody>
+        </p:sp>
+        <p:sp>
+          <p:nvSpPr>
+            <p:cNvPr id="171" name="팔각형 170">
+              <a:extLst>
+                <a:ext uri="{FF2B5EF4-FFF2-40B4-BE49-F238E27FC236}">
+                  <a16:creationId xmlns:a16="http://schemas.microsoft.com/office/drawing/2014/main" id="{BA12D6BA-60C8-BF30-3B42-F7290DF41048}"/>
+                </a:ext>
+              </a:extLst>
+            </p:cNvPr>
+            <p:cNvSpPr/>
+            <p:nvPr/>
+          </p:nvSpPr>
+          <p:spPr>
+            <a:xfrm rot="5248658" flipH="1" flipV="1">
+              <a:off x="6605295" y="2168763"/>
+              <a:ext cx="18000" cy="18000"/>
+            </a:xfrm>
+            <a:prstGeom prst="octagon">
+              <a:avLst/>
+            </a:prstGeom>
+            <a:gradFill>
+              <a:gsLst>
+                <a:gs pos="0">
+                  <a:schemeClr val="bg1"/>
+                </a:gs>
+                <a:gs pos="52000">
+                  <a:srgbClr val="152145"/>
+                </a:gs>
+              </a:gsLst>
+              <a:path path="circle">
+                <a:fillToRect l="50000" t="50000" r="50000" b="50000"/>
+              </a:path>
+            </a:gradFill>
+            <a:ln>
+              <a:noFill/>
+            </a:ln>
+          </p:spPr>
+          <p:style>
+            <a:lnRef idx="2">
+              <a:schemeClr val="accent1">
+                <a:shade val="15000"/>
+              </a:schemeClr>
+            </a:lnRef>
+            <a:fillRef idx="1">
+              <a:schemeClr val="accent1"/>
+            </a:fillRef>
+            <a:effectRef idx="0">
+              <a:schemeClr val="accent1"/>
+            </a:effectRef>
+            <a:fontRef idx="minor">
+              <a:schemeClr val="lt1"/>
+            </a:fontRef>
+          </p:style>
+          <p:txBody>
+            <a:bodyPr rtlCol="0" anchor="ctr"/>
+            <a:lstStyle/>
+            <a:p>
+              <a:pPr algn="ctr"/>
+              <a:endParaRPr lang="ko-KR" altLang="en-US"/>
+            </a:p>
+          </p:txBody>
+        </p:sp>
+        <p:sp>
+          <p:nvSpPr>
+            <p:cNvPr id="172" name="팔각형 171">
+              <a:extLst>
+                <a:ext uri="{FF2B5EF4-FFF2-40B4-BE49-F238E27FC236}">
+                  <a16:creationId xmlns:a16="http://schemas.microsoft.com/office/drawing/2014/main" id="{C514DFBF-38E6-BC5C-FF03-52D57EF88DA1}"/>
+                </a:ext>
+              </a:extLst>
+            </p:cNvPr>
+            <p:cNvSpPr/>
+            <p:nvPr/>
+          </p:nvSpPr>
+          <p:spPr>
+            <a:xfrm rot="10648658" flipH="1" flipV="1">
+              <a:off x="6769546" y="1309118"/>
+              <a:ext cx="12272" cy="12272"/>
+            </a:xfrm>
+            <a:prstGeom prst="octagon">
+              <a:avLst/>
+            </a:prstGeom>
+            <a:gradFill>
+              <a:gsLst>
+                <a:gs pos="0">
+                  <a:schemeClr val="bg1"/>
+                </a:gs>
+                <a:gs pos="52000">
+                  <a:srgbClr val="152145"/>
+                </a:gs>
+              </a:gsLst>
+              <a:path path="circle">
+                <a:fillToRect l="50000" t="50000" r="50000" b="50000"/>
+              </a:path>
+            </a:gradFill>
+            <a:ln>
+              <a:noFill/>
+            </a:ln>
+          </p:spPr>
+          <p:style>
+            <a:lnRef idx="2">
+              <a:schemeClr val="accent1">
+                <a:shade val="15000"/>
+              </a:schemeClr>
+            </a:lnRef>
+            <a:fillRef idx="1">
+              <a:schemeClr val="accent1"/>
+            </a:fillRef>
+            <a:effectRef idx="0">
+              <a:schemeClr val="accent1"/>
+            </a:effectRef>
+            <a:fontRef idx="minor">
+              <a:schemeClr val="lt1"/>
+            </a:fontRef>
+          </p:style>
+          <p:txBody>
+            <a:bodyPr rtlCol="0" anchor="ctr"/>
+            <a:lstStyle/>
+            <a:p>
+              <a:pPr algn="ctr"/>
+              <a:endParaRPr lang="ko-KR" altLang="en-US"/>
+            </a:p>
+          </p:txBody>
+        </p:sp>
+        <p:sp>
+          <p:nvSpPr>
+            <p:cNvPr id="173" name="팔각형 172">
+              <a:extLst>
+                <a:ext uri="{FF2B5EF4-FFF2-40B4-BE49-F238E27FC236}">
+                  <a16:creationId xmlns:a16="http://schemas.microsoft.com/office/drawing/2014/main" id="{B3CA607C-541F-AB5A-52EF-1DFB8FAC99E5}"/>
+                </a:ext>
+              </a:extLst>
+            </p:cNvPr>
+            <p:cNvSpPr/>
+            <p:nvPr/>
+          </p:nvSpPr>
+          <p:spPr>
+            <a:xfrm rot="10648658" flipH="1" flipV="1">
+              <a:off x="6666340" y="1415473"/>
+              <a:ext cx="12272" cy="12272"/>
+            </a:xfrm>
+            <a:prstGeom prst="octagon">
+              <a:avLst/>
+            </a:prstGeom>
+            <a:gradFill>
+              <a:gsLst>
+                <a:gs pos="0">
+                  <a:schemeClr val="bg1"/>
+                </a:gs>
+                <a:gs pos="52000">
+                  <a:srgbClr val="152145"/>
+                </a:gs>
+              </a:gsLst>
+              <a:path path="circle">
+                <a:fillToRect l="50000" t="50000" r="50000" b="50000"/>
+              </a:path>
+            </a:gradFill>
+            <a:ln>
+              <a:noFill/>
+            </a:ln>
+          </p:spPr>
+          <p:style>
+            <a:lnRef idx="2">
+              <a:schemeClr val="accent1">
+                <a:shade val="15000"/>
+              </a:schemeClr>
+            </a:lnRef>
+            <a:fillRef idx="1">
+              <a:schemeClr val="accent1"/>
+            </a:fillRef>
+            <a:effectRef idx="0">
+              <a:schemeClr val="accent1"/>
+            </a:effectRef>
+            <a:fontRef idx="minor">
+              <a:schemeClr val="lt1"/>
+            </a:fontRef>
+          </p:style>
+          <p:txBody>
+            <a:bodyPr rtlCol="0" anchor="ctr"/>
+            <a:lstStyle/>
+            <a:p>
+              <a:pPr algn="ctr"/>
+              <a:endParaRPr lang="ko-KR" altLang="en-US"/>
+            </a:p>
+          </p:txBody>
+        </p:sp>
+        <p:sp>
+          <p:nvSpPr>
+            <p:cNvPr id="174" name="팔각형 173">
+              <a:extLst>
+                <a:ext uri="{FF2B5EF4-FFF2-40B4-BE49-F238E27FC236}">
+                  <a16:creationId xmlns:a16="http://schemas.microsoft.com/office/drawing/2014/main" id="{528042C1-60E3-3DB9-1D69-019901CFAB31}"/>
+                </a:ext>
+              </a:extLst>
+            </p:cNvPr>
+            <p:cNvSpPr/>
+            <p:nvPr/>
+          </p:nvSpPr>
+          <p:spPr>
+            <a:xfrm rot="10648658" flipH="1" flipV="1">
+              <a:off x="6551828" y="1371514"/>
+              <a:ext cx="12272" cy="12272"/>
+            </a:xfrm>
+            <a:prstGeom prst="octagon">
+              <a:avLst/>
+            </a:prstGeom>
+            <a:gradFill>
+              <a:gsLst>
+                <a:gs pos="0">
+                  <a:schemeClr val="bg1"/>
+                </a:gs>
+                <a:gs pos="52000">
+                  <a:srgbClr val="152145"/>
+                </a:gs>
+              </a:gsLst>
+              <a:path path="circle">
+                <a:fillToRect l="50000" t="50000" r="50000" b="50000"/>
+              </a:path>
+            </a:gradFill>
+            <a:ln>
+              <a:noFill/>
+            </a:ln>
+          </p:spPr>
+          <p:style>
+            <a:lnRef idx="2">
+              <a:schemeClr val="accent1">
+                <a:shade val="15000"/>
+              </a:schemeClr>
+            </a:lnRef>
+            <a:fillRef idx="1">
+              <a:schemeClr val="accent1"/>
+            </a:fillRef>
+            <a:effectRef idx="0">
+              <a:schemeClr val="accent1"/>
+            </a:effectRef>
+            <a:fontRef idx="minor">
+              <a:schemeClr val="lt1"/>
+            </a:fontRef>
+          </p:style>
+          <p:txBody>
+            <a:bodyPr rtlCol="0" anchor="ctr"/>
+            <a:lstStyle/>
+            <a:p>
+              <a:pPr algn="ctr"/>
+              <a:endParaRPr lang="ko-KR" altLang="en-US"/>
+            </a:p>
+          </p:txBody>
+        </p:sp>
+        <p:sp>
+          <p:nvSpPr>
+            <p:cNvPr id="175" name="팔각형 174">
+              <a:extLst>
+                <a:ext uri="{FF2B5EF4-FFF2-40B4-BE49-F238E27FC236}">
+                  <a16:creationId xmlns:a16="http://schemas.microsoft.com/office/drawing/2014/main" id="{78A4A835-EF62-A51B-5A07-8B8D21DA9B1E}"/>
+                </a:ext>
+              </a:extLst>
+            </p:cNvPr>
+            <p:cNvSpPr/>
+            <p:nvPr/>
+          </p:nvSpPr>
+          <p:spPr>
+            <a:xfrm rot="10648658" flipH="1" flipV="1">
+              <a:off x="6762124" y="1166036"/>
+              <a:ext cx="12272" cy="12272"/>
+            </a:xfrm>
+            <a:prstGeom prst="octagon">
+              <a:avLst/>
+            </a:prstGeom>
+            <a:gradFill>
+              <a:gsLst>
+                <a:gs pos="0">
+                  <a:schemeClr val="bg1"/>
+                </a:gs>
+                <a:gs pos="52000">
+                  <a:srgbClr val="152145"/>
+                </a:gs>
+              </a:gsLst>
+              <a:path path="circle">
+                <a:fillToRect l="50000" t="50000" r="50000" b="50000"/>
+              </a:path>
+            </a:gradFill>
+            <a:ln>
+              <a:noFill/>
+            </a:ln>
+          </p:spPr>
+          <p:style>
+            <a:lnRef idx="2">
+              <a:schemeClr val="accent1">
+                <a:shade val="15000"/>
+              </a:schemeClr>
+            </a:lnRef>
+            <a:fillRef idx="1">
+              <a:schemeClr val="accent1"/>
+            </a:fillRef>
+            <a:effectRef idx="0">
+              <a:schemeClr val="accent1"/>
+            </a:effectRef>
+            <a:fontRef idx="minor">
+              <a:schemeClr val="lt1"/>
+            </a:fontRef>
+          </p:style>
+          <p:txBody>
+            <a:bodyPr rtlCol="0" anchor="ctr"/>
+            <a:lstStyle/>
+            <a:p>
+              <a:pPr algn="ctr"/>
+              <a:endParaRPr lang="ko-KR" altLang="en-US"/>
+            </a:p>
+          </p:txBody>
+        </p:sp>
+      </p:grpSp>
     </p:spTree>
     <p:extLst>
       <p:ext uri="{BB962C8B-B14F-4D97-AF65-F5344CB8AC3E}">

</xml_diff>

<commit_message>
Added icons for Palworld and Enter the Gungeon
</commit_message>
<xml_diff>
--- a/tepk2924_Custon_Icon.pptx
+++ b/tepk2924_Custon_Icon.pptx
@@ -8,6 +8,7 @@
     <p:sldId id="256" r:id="rId2"/>
     <p:sldId id="258" r:id="rId3"/>
     <p:sldId id="257" r:id="rId4"/>
+    <p:sldId id="259" r:id="rId5"/>
   </p:sldIdLst>
   <p:sldSz cx="12192000" cy="6858000"/>
   <p:notesSz cx="6858000" cy="9144000"/>
@@ -3342,7 +3343,59 @@
       </p:grpSpPr>
       <p:sp>
         <p:nvSpPr>
-          <p:cNvPr id="7" name="직사각형 6">
+          <p:cNvPr id="3" name="팔각형 2">
+            <a:extLst>
+              <a:ext uri="{FF2B5EF4-FFF2-40B4-BE49-F238E27FC236}">
+                <a16:creationId xmlns:a16="http://schemas.microsoft.com/office/drawing/2014/main" id="{FE15EBFD-72B6-CA37-48F3-5EA228E3A587}"/>
+              </a:ext>
+            </a:extLst>
+          </p:cNvPr>
+          <p:cNvSpPr/>
+          <p:nvPr/>
+        </p:nvSpPr>
+        <p:spPr>
+          <a:xfrm>
+            <a:off x="3084818" y="839462"/>
+            <a:ext cx="1440000" cy="1440000"/>
+          </a:xfrm>
+          <a:prstGeom prst="octagon">
+            <a:avLst/>
+          </a:prstGeom>
+          <a:solidFill>
+            <a:schemeClr val="tx1"/>
+          </a:solidFill>
+          <a:ln>
+            <a:noFill/>
+          </a:ln>
+        </p:spPr>
+        <p:style>
+          <a:lnRef idx="2">
+            <a:schemeClr val="accent1">
+              <a:shade val="15000"/>
+            </a:schemeClr>
+          </a:lnRef>
+          <a:fillRef idx="1">
+            <a:schemeClr val="accent1"/>
+          </a:fillRef>
+          <a:effectRef idx="0">
+            <a:schemeClr val="accent1"/>
+          </a:effectRef>
+          <a:fontRef idx="minor">
+            <a:schemeClr val="lt1"/>
+          </a:fontRef>
+        </p:style>
+        <p:txBody>
+          <a:bodyPr rtlCol="0" anchor="ctr"/>
+          <a:lstStyle/>
+          <a:p>
+            <a:pPr algn="ctr"/>
+            <a:endParaRPr lang="ko-KR" altLang="en-US"/>
+          </a:p>
+        </p:txBody>
+      </p:sp>
+      <p:sp>
+        <p:nvSpPr>
+          <p:cNvPr id="5" name="직사각형 4">
             <a:extLst>
               <a:ext uri="{FF2B5EF4-FFF2-40B4-BE49-F238E27FC236}">
                 <a16:creationId xmlns:a16="http://schemas.microsoft.com/office/drawing/2014/main" id="{06B4E298-DAFB-4FBD-2AC4-D44E05385CFD}"/>
@@ -3387,58 +3440,6 @@
           <a:bodyPr wrap="square" rtlCol="0" anchor="ctr">
             <a:noAutofit/>
           </a:bodyPr>
-          <a:lstStyle/>
-          <a:p>
-            <a:pPr algn="ctr"/>
-            <a:endParaRPr lang="ko-KR" altLang="en-US"/>
-          </a:p>
-        </p:txBody>
-      </p:sp>
-      <p:sp>
-        <p:nvSpPr>
-          <p:cNvPr id="3" name="팔각형 2">
-            <a:extLst>
-              <a:ext uri="{FF2B5EF4-FFF2-40B4-BE49-F238E27FC236}">
-                <a16:creationId xmlns:a16="http://schemas.microsoft.com/office/drawing/2014/main" id="{FE15EBFD-72B6-CA37-48F3-5EA228E3A587}"/>
-              </a:ext>
-            </a:extLst>
-          </p:cNvPr>
-          <p:cNvSpPr/>
-          <p:nvPr/>
-        </p:nvSpPr>
-        <p:spPr>
-          <a:xfrm>
-            <a:off x="3084818" y="839462"/>
-            <a:ext cx="1440000" cy="1440000"/>
-          </a:xfrm>
-          <a:prstGeom prst="octagon">
-            <a:avLst/>
-          </a:prstGeom>
-          <a:solidFill>
-            <a:schemeClr val="tx1"/>
-          </a:solidFill>
-          <a:ln>
-            <a:noFill/>
-          </a:ln>
-        </p:spPr>
-        <p:style>
-          <a:lnRef idx="2">
-            <a:schemeClr val="accent1">
-              <a:shade val="15000"/>
-            </a:schemeClr>
-          </a:lnRef>
-          <a:fillRef idx="1">
-            <a:schemeClr val="accent1"/>
-          </a:fillRef>
-          <a:effectRef idx="0">
-            <a:schemeClr val="accent1"/>
-          </a:effectRef>
-          <a:fontRef idx="minor">
-            <a:schemeClr val="lt1"/>
-          </a:fontRef>
-        </p:style>
-        <p:txBody>
-          <a:bodyPr rtlCol="0" anchor="ctr"/>
           <a:lstStyle/>
           <a:p>
             <a:pPr algn="ctr"/>
@@ -17863,10 +17864,2827 @@
           </p:txBody>
         </p:sp>
       </p:grpSp>
+      <p:grpSp>
+        <p:nvGrpSpPr>
+          <p:cNvPr id="181" name="그룹 180">
+            <a:extLst>
+              <a:ext uri="{FF2B5EF4-FFF2-40B4-BE49-F238E27FC236}">
+                <a16:creationId xmlns:a16="http://schemas.microsoft.com/office/drawing/2014/main" id="{53C28D9B-3F26-158F-6B51-7DCC54EB8567}"/>
+              </a:ext>
+            </a:extLst>
+          </p:cNvPr>
+          <p:cNvGrpSpPr/>
+          <p:nvPr/>
+        </p:nvGrpSpPr>
+        <p:grpSpPr>
+          <a:xfrm>
+            <a:off x="7958698" y="4430746"/>
+            <a:ext cx="1440001" cy="1440000"/>
+            <a:chOff x="4038778" y="3010082"/>
+            <a:chExt cx="1440001" cy="1440000"/>
+          </a:xfrm>
+        </p:grpSpPr>
+        <p:sp>
+          <p:nvSpPr>
+            <p:cNvPr id="176" name="자유형: 도형 175">
+              <a:extLst>
+                <a:ext uri="{FF2B5EF4-FFF2-40B4-BE49-F238E27FC236}">
+                  <a16:creationId xmlns:a16="http://schemas.microsoft.com/office/drawing/2014/main" id="{B10FFB3E-4051-8CEA-48CB-817A4B7894B8}"/>
+                </a:ext>
+              </a:extLst>
+            </p:cNvPr>
+            <p:cNvSpPr/>
+            <p:nvPr/>
+          </p:nvSpPr>
+          <p:spPr>
+            <a:xfrm>
+              <a:off x="4038780" y="3204720"/>
+              <a:ext cx="1190055" cy="1245362"/>
+            </a:xfrm>
+            <a:custGeom>
+              <a:avLst/>
+              <a:gdLst>
+                <a:gd name="connsiteX0" fmla="*/ 548748 w 1190055"/>
+                <a:gd name="connsiteY0" fmla="*/ 904550 h 1245362"/>
+                <a:gd name="connsiteX1" fmla="*/ 648933 w 1190055"/>
+                <a:gd name="connsiteY1" fmla="*/ 904550 h 1245362"/>
+                <a:gd name="connsiteX2" fmla="*/ 684662 w 1190055"/>
+                <a:gd name="connsiteY2" fmla="*/ 940280 h 1245362"/>
+                <a:gd name="connsiteX3" fmla="*/ 684662 w 1190055"/>
+                <a:gd name="connsiteY3" fmla="*/ 955873 h 1245362"/>
+                <a:gd name="connsiteX4" fmla="*/ 564341 w 1190055"/>
+                <a:gd name="connsiteY4" fmla="*/ 1076194 h 1245362"/>
+                <a:gd name="connsiteX5" fmla="*/ 548748 w 1190055"/>
+                <a:gd name="connsiteY5" fmla="*/ 1076194 h 1245362"/>
+                <a:gd name="connsiteX6" fmla="*/ 513018 w 1190055"/>
+                <a:gd name="connsiteY6" fmla="*/ 1040465 h 1245362"/>
+                <a:gd name="connsiteX7" fmla="*/ 513018 w 1190055"/>
+                <a:gd name="connsiteY7" fmla="*/ 940280 h 1245362"/>
+                <a:gd name="connsiteX8" fmla="*/ 535450 w 1190055"/>
+                <a:gd name="connsiteY8" fmla="*/ 881768 h 1245362"/>
+                <a:gd name="connsiteX9" fmla="*/ 490236 w 1190055"/>
+                <a:gd name="connsiteY9" fmla="*/ 926982 h 1245362"/>
+                <a:gd name="connsiteX10" fmla="*/ 490236 w 1190055"/>
+                <a:gd name="connsiteY10" fmla="*/ 1053762 h 1245362"/>
+                <a:gd name="connsiteX11" fmla="*/ 535450 w 1190055"/>
+                <a:gd name="connsiteY11" fmla="*/ 1098976 h 1245362"/>
+                <a:gd name="connsiteX12" fmla="*/ 567494 w 1190055"/>
+                <a:gd name="connsiteY12" fmla="*/ 1098976 h 1245362"/>
+                <a:gd name="connsiteX13" fmla="*/ 707444 w 1190055"/>
+                <a:gd name="connsiteY13" fmla="*/ 959025 h 1245362"/>
+                <a:gd name="connsiteX14" fmla="*/ 707444 w 1190055"/>
+                <a:gd name="connsiteY14" fmla="*/ 926982 h 1245362"/>
+                <a:gd name="connsiteX15" fmla="*/ 662230 w 1190055"/>
+                <a:gd name="connsiteY15" fmla="*/ 881768 h 1245362"/>
+                <a:gd name="connsiteX16" fmla="*/ 627496 w 1190055"/>
+                <a:gd name="connsiteY16" fmla="*/ 149269 h 1245362"/>
+                <a:gd name="connsiteX17" fmla="*/ 599830 w 1190055"/>
+                <a:gd name="connsiteY17" fmla="*/ 176935 h 1245362"/>
+                <a:gd name="connsiteX18" fmla="*/ 599830 w 1190055"/>
+                <a:gd name="connsiteY18" fmla="*/ 216061 h 1245362"/>
+                <a:gd name="connsiteX19" fmla="*/ 627496 w 1190055"/>
+                <a:gd name="connsiteY19" fmla="*/ 243727 h 1245362"/>
+                <a:gd name="connsiteX20" fmla="*/ 666622 w 1190055"/>
+                <a:gd name="connsiteY20" fmla="*/ 243727 h 1245362"/>
+                <a:gd name="connsiteX21" fmla="*/ 694288 w 1190055"/>
+                <a:gd name="connsiteY21" fmla="*/ 216061 h 1245362"/>
+                <a:gd name="connsiteX22" fmla="*/ 694288 w 1190055"/>
+                <a:gd name="connsiteY22" fmla="*/ 176935 h 1245362"/>
+                <a:gd name="connsiteX23" fmla="*/ 666622 w 1190055"/>
+                <a:gd name="connsiteY23" fmla="*/ 149269 h 1245362"/>
+                <a:gd name="connsiteX24" fmla="*/ 589307 w 1190055"/>
+                <a:gd name="connsiteY24" fmla="*/ 0 h 1245362"/>
+                <a:gd name="connsiteX25" fmla="*/ 1024063 w 1190055"/>
+                <a:gd name="connsiteY25" fmla="*/ 0 h 1245362"/>
+                <a:gd name="connsiteX26" fmla="*/ 1190055 w 1190055"/>
+                <a:gd name="connsiteY26" fmla="*/ 165992 h 1245362"/>
+                <a:gd name="connsiteX27" fmla="*/ 1190055 w 1190055"/>
+                <a:gd name="connsiteY27" fmla="*/ 348731 h 1245362"/>
+                <a:gd name="connsiteX28" fmla="*/ 799378 w 1190055"/>
+                <a:gd name="connsiteY28" fmla="*/ 348731 h 1245362"/>
+                <a:gd name="connsiteX29" fmla="*/ 768586 w 1190055"/>
+                <a:gd name="connsiteY29" fmla="*/ 379523 h 1245362"/>
+                <a:gd name="connsiteX30" fmla="*/ 768586 w 1190055"/>
+                <a:gd name="connsiteY30" fmla="*/ 704387 h 1245362"/>
+                <a:gd name="connsiteX31" fmla="*/ 768586 w 1190055"/>
+                <a:gd name="connsiteY31" fmla="*/ 729106 h 1245362"/>
+                <a:gd name="connsiteX32" fmla="*/ 768586 w 1190055"/>
+                <a:gd name="connsiteY32" fmla="*/ 1093758 h 1245362"/>
+                <a:gd name="connsiteX33" fmla="*/ 616982 w 1190055"/>
+                <a:gd name="connsiteY33" fmla="*/ 1245362 h 1245362"/>
+                <a:gd name="connsiteX34" fmla="*/ 156456 w 1190055"/>
+                <a:gd name="connsiteY34" fmla="*/ 1245362 h 1245362"/>
+                <a:gd name="connsiteX35" fmla="*/ 0 w 1190055"/>
+                <a:gd name="connsiteY35" fmla="*/ 1088906 h 1245362"/>
+                <a:gd name="connsiteX36" fmla="*/ 0 w 1190055"/>
+                <a:gd name="connsiteY36" fmla="*/ 1064420 h 1245362"/>
+                <a:gd name="connsiteX37" fmla="*/ 79847 w 1190055"/>
+                <a:gd name="connsiteY37" fmla="*/ 1064420 h 1245362"/>
+                <a:gd name="connsiteX38" fmla="*/ 125056 w 1190055"/>
+                <a:gd name="connsiteY38" fmla="*/ 1019211 h 1245362"/>
+                <a:gd name="connsiteX39" fmla="*/ 125056 w 1190055"/>
+                <a:gd name="connsiteY39" fmla="*/ 1078348 h 1245362"/>
+                <a:gd name="connsiteX40" fmla="*/ 160848 w 1190055"/>
+                <a:gd name="connsiteY40" fmla="*/ 1114140 h 1245362"/>
+                <a:gd name="connsiteX41" fmla="*/ 304014 w 1190055"/>
+                <a:gd name="connsiteY41" fmla="*/ 1114140 h 1245362"/>
+                <a:gd name="connsiteX42" fmla="*/ 339806 w 1190055"/>
+                <a:gd name="connsiteY42" fmla="*/ 1078348 h 1245362"/>
+                <a:gd name="connsiteX43" fmla="*/ 339806 w 1190055"/>
+                <a:gd name="connsiteY43" fmla="*/ 968797 h 1245362"/>
+                <a:gd name="connsiteX44" fmla="*/ 360149 w 1190055"/>
+                <a:gd name="connsiteY44" fmla="*/ 948454 h 1245362"/>
+                <a:gd name="connsiteX45" fmla="*/ 425098 w 1190055"/>
+                <a:gd name="connsiteY45" fmla="*/ 948454 h 1245362"/>
+                <a:gd name="connsiteX46" fmla="*/ 628922 w 1190055"/>
+                <a:gd name="connsiteY46" fmla="*/ 744630 h 1245362"/>
+                <a:gd name="connsiteX47" fmla="*/ 628922 w 1190055"/>
+                <a:gd name="connsiteY47" fmla="*/ 666280 h 1245362"/>
+                <a:gd name="connsiteX48" fmla="*/ 556885 w 1190055"/>
+                <a:gd name="connsiteY48" fmla="*/ 594243 h 1245362"/>
+                <a:gd name="connsiteX49" fmla="*/ 556885 w 1190055"/>
+                <a:gd name="connsiteY49" fmla="*/ 544379 h 1245362"/>
+                <a:gd name="connsiteX50" fmla="*/ 599894 w 1190055"/>
+                <a:gd name="connsiteY50" fmla="*/ 501370 h 1245362"/>
+                <a:gd name="connsiteX51" fmla="*/ 599894 w 1190055"/>
+                <a:gd name="connsiteY51" fmla="*/ 369466 h 1245362"/>
+                <a:gd name="connsiteX52" fmla="*/ 503055 w 1190055"/>
+                <a:gd name="connsiteY52" fmla="*/ 272627 h 1245362"/>
+                <a:gd name="connsiteX53" fmla="*/ 423315 w 1190055"/>
+                <a:gd name="connsiteY53" fmla="*/ 272627 h 1245362"/>
+                <a:gd name="connsiteX54" fmla="*/ 423315 w 1190055"/>
+                <a:gd name="connsiteY54" fmla="*/ 262930 h 1245362"/>
+                <a:gd name="connsiteX55" fmla="*/ 423315 w 1190055"/>
+                <a:gd name="connsiteY55" fmla="*/ 165992 h 1245362"/>
+              </a:gdLst>
+              <a:ahLst/>
+              <a:cxnLst>
+                <a:cxn ang="0">
+                  <a:pos x="connsiteX0" y="connsiteY0"/>
+                </a:cxn>
+                <a:cxn ang="0">
+                  <a:pos x="connsiteX1" y="connsiteY1"/>
+                </a:cxn>
+                <a:cxn ang="0">
+                  <a:pos x="connsiteX2" y="connsiteY2"/>
+                </a:cxn>
+                <a:cxn ang="0">
+                  <a:pos x="connsiteX3" y="connsiteY3"/>
+                </a:cxn>
+                <a:cxn ang="0">
+                  <a:pos x="connsiteX4" y="connsiteY4"/>
+                </a:cxn>
+                <a:cxn ang="0">
+                  <a:pos x="connsiteX5" y="connsiteY5"/>
+                </a:cxn>
+                <a:cxn ang="0">
+                  <a:pos x="connsiteX6" y="connsiteY6"/>
+                </a:cxn>
+                <a:cxn ang="0">
+                  <a:pos x="connsiteX7" y="connsiteY7"/>
+                </a:cxn>
+                <a:cxn ang="0">
+                  <a:pos x="connsiteX8" y="connsiteY8"/>
+                </a:cxn>
+                <a:cxn ang="0">
+                  <a:pos x="connsiteX9" y="connsiteY9"/>
+                </a:cxn>
+                <a:cxn ang="0">
+                  <a:pos x="connsiteX10" y="connsiteY10"/>
+                </a:cxn>
+                <a:cxn ang="0">
+                  <a:pos x="connsiteX11" y="connsiteY11"/>
+                </a:cxn>
+                <a:cxn ang="0">
+                  <a:pos x="connsiteX12" y="connsiteY12"/>
+                </a:cxn>
+                <a:cxn ang="0">
+                  <a:pos x="connsiteX13" y="connsiteY13"/>
+                </a:cxn>
+                <a:cxn ang="0">
+                  <a:pos x="connsiteX14" y="connsiteY14"/>
+                </a:cxn>
+                <a:cxn ang="0">
+                  <a:pos x="connsiteX15" y="connsiteY15"/>
+                </a:cxn>
+                <a:cxn ang="0">
+                  <a:pos x="connsiteX16" y="connsiteY16"/>
+                </a:cxn>
+                <a:cxn ang="0">
+                  <a:pos x="connsiteX17" y="connsiteY17"/>
+                </a:cxn>
+                <a:cxn ang="0">
+                  <a:pos x="connsiteX18" y="connsiteY18"/>
+                </a:cxn>
+                <a:cxn ang="0">
+                  <a:pos x="connsiteX19" y="connsiteY19"/>
+                </a:cxn>
+                <a:cxn ang="0">
+                  <a:pos x="connsiteX20" y="connsiteY20"/>
+                </a:cxn>
+                <a:cxn ang="0">
+                  <a:pos x="connsiteX21" y="connsiteY21"/>
+                </a:cxn>
+                <a:cxn ang="0">
+                  <a:pos x="connsiteX22" y="connsiteY22"/>
+                </a:cxn>
+                <a:cxn ang="0">
+                  <a:pos x="connsiteX23" y="connsiteY23"/>
+                </a:cxn>
+                <a:cxn ang="0">
+                  <a:pos x="connsiteX24" y="connsiteY24"/>
+                </a:cxn>
+                <a:cxn ang="0">
+                  <a:pos x="connsiteX25" y="connsiteY25"/>
+                </a:cxn>
+                <a:cxn ang="0">
+                  <a:pos x="connsiteX26" y="connsiteY26"/>
+                </a:cxn>
+                <a:cxn ang="0">
+                  <a:pos x="connsiteX27" y="connsiteY27"/>
+                </a:cxn>
+                <a:cxn ang="0">
+                  <a:pos x="connsiteX28" y="connsiteY28"/>
+                </a:cxn>
+                <a:cxn ang="0">
+                  <a:pos x="connsiteX29" y="connsiteY29"/>
+                </a:cxn>
+                <a:cxn ang="0">
+                  <a:pos x="connsiteX30" y="connsiteY30"/>
+                </a:cxn>
+                <a:cxn ang="0">
+                  <a:pos x="connsiteX31" y="connsiteY31"/>
+                </a:cxn>
+                <a:cxn ang="0">
+                  <a:pos x="connsiteX32" y="connsiteY32"/>
+                </a:cxn>
+                <a:cxn ang="0">
+                  <a:pos x="connsiteX33" y="connsiteY33"/>
+                </a:cxn>
+                <a:cxn ang="0">
+                  <a:pos x="connsiteX34" y="connsiteY34"/>
+                </a:cxn>
+                <a:cxn ang="0">
+                  <a:pos x="connsiteX35" y="connsiteY35"/>
+                </a:cxn>
+                <a:cxn ang="0">
+                  <a:pos x="connsiteX36" y="connsiteY36"/>
+                </a:cxn>
+                <a:cxn ang="0">
+                  <a:pos x="connsiteX37" y="connsiteY37"/>
+                </a:cxn>
+                <a:cxn ang="0">
+                  <a:pos x="connsiteX38" y="connsiteY38"/>
+                </a:cxn>
+                <a:cxn ang="0">
+                  <a:pos x="connsiteX39" y="connsiteY39"/>
+                </a:cxn>
+                <a:cxn ang="0">
+                  <a:pos x="connsiteX40" y="connsiteY40"/>
+                </a:cxn>
+                <a:cxn ang="0">
+                  <a:pos x="connsiteX41" y="connsiteY41"/>
+                </a:cxn>
+                <a:cxn ang="0">
+                  <a:pos x="connsiteX42" y="connsiteY42"/>
+                </a:cxn>
+                <a:cxn ang="0">
+                  <a:pos x="connsiteX43" y="connsiteY43"/>
+                </a:cxn>
+                <a:cxn ang="0">
+                  <a:pos x="connsiteX44" y="connsiteY44"/>
+                </a:cxn>
+                <a:cxn ang="0">
+                  <a:pos x="connsiteX45" y="connsiteY45"/>
+                </a:cxn>
+                <a:cxn ang="0">
+                  <a:pos x="connsiteX46" y="connsiteY46"/>
+                </a:cxn>
+                <a:cxn ang="0">
+                  <a:pos x="connsiteX47" y="connsiteY47"/>
+                </a:cxn>
+                <a:cxn ang="0">
+                  <a:pos x="connsiteX48" y="connsiteY48"/>
+                </a:cxn>
+                <a:cxn ang="0">
+                  <a:pos x="connsiteX49" y="connsiteY49"/>
+                </a:cxn>
+                <a:cxn ang="0">
+                  <a:pos x="connsiteX50" y="connsiteY50"/>
+                </a:cxn>
+                <a:cxn ang="0">
+                  <a:pos x="connsiteX51" y="connsiteY51"/>
+                </a:cxn>
+                <a:cxn ang="0">
+                  <a:pos x="connsiteX52" y="connsiteY52"/>
+                </a:cxn>
+                <a:cxn ang="0">
+                  <a:pos x="connsiteX53" y="connsiteY53"/>
+                </a:cxn>
+                <a:cxn ang="0">
+                  <a:pos x="connsiteX54" y="connsiteY54"/>
+                </a:cxn>
+                <a:cxn ang="0">
+                  <a:pos x="connsiteX55" y="connsiteY55"/>
+                </a:cxn>
+              </a:cxnLst>
+              <a:rect l="l" t="t" r="r" b="b"/>
+              <a:pathLst>
+                <a:path w="1190055" h="1245362">
+                  <a:moveTo>
+                    <a:pt x="548748" y="904550"/>
+                  </a:moveTo>
+                  <a:lnTo>
+                    <a:pt x="648933" y="904550"/>
+                  </a:lnTo>
+                  <a:lnTo>
+                    <a:pt x="684662" y="940280"/>
+                  </a:lnTo>
+                  <a:lnTo>
+                    <a:pt x="684662" y="955873"/>
+                  </a:lnTo>
+                  <a:lnTo>
+                    <a:pt x="564341" y="1076194"/>
+                  </a:lnTo>
+                  <a:lnTo>
+                    <a:pt x="548748" y="1076194"/>
+                  </a:lnTo>
+                  <a:lnTo>
+                    <a:pt x="513018" y="1040465"/>
+                  </a:lnTo>
+                  <a:lnTo>
+                    <a:pt x="513018" y="940280"/>
+                  </a:lnTo>
+                  <a:close/>
+                  <a:moveTo>
+                    <a:pt x="535450" y="881768"/>
+                  </a:moveTo>
+                  <a:lnTo>
+                    <a:pt x="490236" y="926982"/>
+                  </a:lnTo>
+                  <a:lnTo>
+                    <a:pt x="490236" y="1053762"/>
+                  </a:lnTo>
+                  <a:lnTo>
+                    <a:pt x="535450" y="1098976"/>
+                  </a:lnTo>
+                  <a:lnTo>
+                    <a:pt x="567494" y="1098976"/>
+                  </a:lnTo>
+                  <a:lnTo>
+                    <a:pt x="707444" y="959025"/>
+                  </a:lnTo>
+                  <a:lnTo>
+                    <a:pt x="707444" y="926982"/>
+                  </a:lnTo>
+                  <a:lnTo>
+                    <a:pt x="662230" y="881768"/>
+                  </a:lnTo>
+                  <a:close/>
+                  <a:moveTo>
+                    <a:pt x="627496" y="149269"/>
+                  </a:moveTo>
+                  <a:lnTo>
+                    <a:pt x="599830" y="176935"/>
+                  </a:lnTo>
+                  <a:lnTo>
+                    <a:pt x="599830" y="216061"/>
+                  </a:lnTo>
+                  <a:lnTo>
+                    <a:pt x="627496" y="243727"/>
+                  </a:lnTo>
+                  <a:lnTo>
+                    <a:pt x="666622" y="243727"/>
+                  </a:lnTo>
+                  <a:lnTo>
+                    <a:pt x="694288" y="216061"/>
+                  </a:lnTo>
+                  <a:lnTo>
+                    <a:pt x="694288" y="176935"/>
+                  </a:lnTo>
+                  <a:lnTo>
+                    <a:pt x="666622" y="149269"/>
+                  </a:lnTo>
+                  <a:close/>
+                  <a:moveTo>
+                    <a:pt x="589307" y="0"/>
+                  </a:moveTo>
+                  <a:lnTo>
+                    <a:pt x="1024063" y="0"/>
+                  </a:lnTo>
+                  <a:lnTo>
+                    <a:pt x="1190055" y="165992"/>
+                  </a:lnTo>
+                  <a:lnTo>
+                    <a:pt x="1190055" y="348731"/>
+                  </a:lnTo>
+                  <a:lnTo>
+                    <a:pt x="799378" y="348731"/>
+                  </a:lnTo>
+                  <a:lnTo>
+                    <a:pt x="768586" y="379523"/>
+                  </a:lnTo>
+                  <a:lnTo>
+                    <a:pt x="768586" y="704387"/>
+                  </a:lnTo>
+                  <a:lnTo>
+                    <a:pt x="768586" y="729106"/>
+                  </a:lnTo>
+                  <a:lnTo>
+                    <a:pt x="768586" y="1093758"/>
+                  </a:lnTo>
+                  <a:lnTo>
+                    <a:pt x="616982" y="1245362"/>
+                  </a:lnTo>
+                  <a:lnTo>
+                    <a:pt x="156456" y="1245362"/>
+                  </a:lnTo>
+                  <a:lnTo>
+                    <a:pt x="0" y="1088906"/>
+                  </a:lnTo>
+                  <a:lnTo>
+                    <a:pt x="0" y="1064420"/>
+                  </a:lnTo>
+                  <a:lnTo>
+                    <a:pt x="79847" y="1064420"/>
+                  </a:lnTo>
+                  <a:lnTo>
+                    <a:pt x="125056" y="1019211"/>
+                  </a:lnTo>
+                  <a:lnTo>
+                    <a:pt x="125056" y="1078348"/>
+                  </a:lnTo>
+                  <a:lnTo>
+                    <a:pt x="160848" y="1114140"/>
+                  </a:lnTo>
+                  <a:lnTo>
+                    <a:pt x="304014" y="1114140"/>
+                  </a:lnTo>
+                  <a:lnTo>
+                    <a:pt x="339806" y="1078348"/>
+                  </a:lnTo>
+                  <a:lnTo>
+                    <a:pt x="339806" y="968797"/>
+                  </a:lnTo>
+                  <a:lnTo>
+                    <a:pt x="360149" y="948454"/>
+                  </a:lnTo>
+                  <a:lnTo>
+                    <a:pt x="425098" y="948454"/>
+                  </a:lnTo>
+                  <a:lnTo>
+                    <a:pt x="628922" y="744630"/>
+                  </a:lnTo>
+                  <a:lnTo>
+                    <a:pt x="628922" y="666280"/>
+                  </a:lnTo>
+                  <a:lnTo>
+                    <a:pt x="556885" y="594243"/>
+                  </a:lnTo>
+                  <a:lnTo>
+                    <a:pt x="556885" y="544379"/>
+                  </a:lnTo>
+                  <a:lnTo>
+                    <a:pt x="599894" y="501370"/>
+                  </a:lnTo>
+                  <a:lnTo>
+                    <a:pt x="599894" y="369466"/>
+                  </a:lnTo>
+                  <a:lnTo>
+                    <a:pt x="503055" y="272627"/>
+                  </a:lnTo>
+                  <a:lnTo>
+                    <a:pt x="423315" y="272627"/>
+                  </a:lnTo>
+                  <a:lnTo>
+                    <a:pt x="423315" y="262930"/>
+                  </a:lnTo>
+                  <a:lnTo>
+                    <a:pt x="423315" y="165992"/>
+                  </a:lnTo>
+                  <a:close/>
+                </a:path>
+              </a:pathLst>
+            </a:custGeom>
+            <a:solidFill>
+              <a:srgbClr val="7AD8EE"/>
+            </a:solidFill>
+            <a:ln>
+              <a:noFill/>
+            </a:ln>
+          </p:spPr>
+          <p:style>
+            <a:lnRef idx="2">
+              <a:schemeClr val="accent1">
+                <a:shade val="15000"/>
+              </a:schemeClr>
+            </a:lnRef>
+            <a:fillRef idx="1">
+              <a:schemeClr val="accent1"/>
+            </a:fillRef>
+            <a:effectRef idx="0">
+              <a:schemeClr val="accent1"/>
+            </a:effectRef>
+            <a:fontRef idx="minor">
+              <a:schemeClr val="lt1"/>
+            </a:fontRef>
+          </p:style>
+          <p:txBody>
+            <a:bodyPr wrap="square" rtlCol="0" anchor="ctr">
+              <a:noAutofit/>
+            </a:bodyPr>
+            <a:lstStyle/>
+            <a:p>
+              <a:pPr algn="ctr"/>
+              <a:endParaRPr lang="ko-KR" altLang="en-US"/>
+            </a:p>
+          </p:txBody>
+        </p:sp>
+        <p:sp>
+          <p:nvSpPr>
+            <p:cNvPr id="177" name="자유형: 도형 176">
+              <a:extLst>
+                <a:ext uri="{FF2B5EF4-FFF2-40B4-BE49-F238E27FC236}">
+                  <a16:creationId xmlns:a16="http://schemas.microsoft.com/office/drawing/2014/main" id="{A27355DC-B694-7C27-DB95-3BDC2461C336}"/>
+                </a:ext>
+              </a:extLst>
+            </p:cNvPr>
+            <p:cNvSpPr/>
+            <p:nvPr/>
+          </p:nvSpPr>
+          <p:spPr>
+            <a:xfrm>
+              <a:off x="4708153" y="3581399"/>
+              <a:ext cx="414000" cy="868683"/>
+            </a:xfrm>
+            <a:custGeom>
+              <a:avLst/>
+              <a:gdLst>
+                <a:gd name="connsiteX0" fmla="*/ 202408 w 414000"/>
+                <a:gd name="connsiteY0" fmla="*/ 217542 h 868683"/>
+                <a:gd name="connsiteX1" fmla="*/ 202408 w 414000"/>
+                <a:gd name="connsiteY1" fmla="*/ 320563 h 868683"/>
+                <a:gd name="connsiteX2" fmla="*/ 202409 w 414000"/>
+                <a:gd name="connsiteY2" fmla="*/ 320563 h 868683"/>
+                <a:gd name="connsiteX3" fmla="*/ 202409 w 414000"/>
+                <a:gd name="connsiteY3" fmla="*/ 217542 h 868683"/>
+                <a:gd name="connsiteX4" fmla="*/ 152114 w 414000"/>
+                <a:gd name="connsiteY4" fmla="*/ 0 h 868683"/>
+                <a:gd name="connsiteX5" fmla="*/ 183643 w 414000"/>
+                <a:gd name="connsiteY5" fmla="*/ 0 h 868683"/>
+                <a:gd name="connsiteX6" fmla="*/ 200803 w 414000"/>
+                <a:gd name="connsiteY6" fmla="*/ 17160 h 868683"/>
+                <a:gd name="connsiteX7" fmla="*/ 200803 w 414000"/>
+                <a:gd name="connsiteY7" fmla="*/ 16670 h 868683"/>
+                <a:gd name="connsiteX8" fmla="*/ 410157 w 414000"/>
+                <a:gd name="connsiteY8" fmla="*/ 217542 h 868683"/>
+                <a:gd name="connsiteX9" fmla="*/ 411763 w 414000"/>
+                <a:gd name="connsiteY9" fmla="*/ 217542 h 868683"/>
+                <a:gd name="connsiteX10" fmla="*/ 411763 w 414000"/>
+                <a:gd name="connsiteY10" fmla="*/ 581026 h 868683"/>
+                <a:gd name="connsiteX11" fmla="*/ 414000 w 414000"/>
+                <a:gd name="connsiteY11" fmla="*/ 581026 h 868683"/>
+                <a:gd name="connsiteX12" fmla="*/ 411763 w 414000"/>
+                <a:gd name="connsiteY12" fmla="*/ 583327 h 868683"/>
+                <a:gd name="connsiteX13" fmla="*/ 411763 w 414000"/>
+                <a:gd name="connsiteY13" fmla="*/ 585787 h 868683"/>
+                <a:gd name="connsiteX14" fmla="*/ 409371 w 414000"/>
+                <a:gd name="connsiteY14" fmla="*/ 585787 h 868683"/>
+                <a:gd name="connsiteX15" fmla="*/ 134323 w 414000"/>
+                <a:gd name="connsiteY15" fmla="*/ 868683 h 868683"/>
+                <a:gd name="connsiteX16" fmla="*/ 0 w 414000"/>
+                <a:gd name="connsiteY16" fmla="*/ 868683 h 868683"/>
+                <a:gd name="connsiteX17" fmla="*/ 133349 w 414000"/>
+                <a:gd name="connsiteY17" fmla="*/ 731529 h 868683"/>
+                <a:gd name="connsiteX18" fmla="*/ 133349 w 414000"/>
+                <a:gd name="connsiteY18" fmla="*/ 18765 h 868683"/>
+              </a:gdLst>
+              <a:ahLst/>
+              <a:cxnLst>
+                <a:cxn ang="0">
+                  <a:pos x="connsiteX0" y="connsiteY0"/>
+                </a:cxn>
+                <a:cxn ang="0">
+                  <a:pos x="connsiteX1" y="connsiteY1"/>
+                </a:cxn>
+                <a:cxn ang="0">
+                  <a:pos x="connsiteX2" y="connsiteY2"/>
+                </a:cxn>
+                <a:cxn ang="0">
+                  <a:pos x="connsiteX3" y="connsiteY3"/>
+                </a:cxn>
+                <a:cxn ang="0">
+                  <a:pos x="connsiteX4" y="connsiteY4"/>
+                </a:cxn>
+                <a:cxn ang="0">
+                  <a:pos x="connsiteX5" y="connsiteY5"/>
+                </a:cxn>
+                <a:cxn ang="0">
+                  <a:pos x="connsiteX6" y="connsiteY6"/>
+                </a:cxn>
+                <a:cxn ang="0">
+                  <a:pos x="connsiteX7" y="connsiteY7"/>
+                </a:cxn>
+                <a:cxn ang="0">
+                  <a:pos x="connsiteX8" y="connsiteY8"/>
+                </a:cxn>
+                <a:cxn ang="0">
+                  <a:pos x="connsiteX9" y="connsiteY9"/>
+                </a:cxn>
+                <a:cxn ang="0">
+                  <a:pos x="connsiteX10" y="connsiteY10"/>
+                </a:cxn>
+                <a:cxn ang="0">
+                  <a:pos x="connsiteX11" y="connsiteY11"/>
+                </a:cxn>
+                <a:cxn ang="0">
+                  <a:pos x="connsiteX12" y="connsiteY12"/>
+                </a:cxn>
+                <a:cxn ang="0">
+                  <a:pos x="connsiteX13" y="connsiteY13"/>
+                </a:cxn>
+                <a:cxn ang="0">
+                  <a:pos x="connsiteX14" y="connsiteY14"/>
+                </a:cxn>
+                <a:cxn ang="0">
+                  <a:pos x="connsiteX15" y="connsiteY15"/>
+                </a:cxn>
+                <a:cxn ang="0">
+                  <a:pos x="connsiteX16" y="connsiteY16"/>
+                </a:cxn>
+                <a:cxn ang="0">
+                  <a:pos x="connsiteX17" y="connsiteY17"/>
+                </a:cxn>
+                <a:cxn ang="0">
+                  <a:pos x="connsiteX18" y="connsiteY18"/>
+                </a:cxn>
+              </a:cxnLst>
+              <a:rect l="l" t="t" r="r" b="b"/>
+              <a:pathLst>
+                <a:path w="414000" h="868683">
+                  <a:moveTo>
+                    <a:pt x="202408" y="217542"/>
+                  </a:moveTo>
+                  <a:lnTo>
+                    <a:pt x="202408" y="320563"/>
+                  </a:lnTo>
+                  <a:lnTo>
+                    <a:pt x="202409" y="320563"/>
+                  </a:lnTo>
+                  <a:lnTo>
+                    <a:pt x="202409" y="217542"/>
+                  </a:lnTo>
+                  <a:close/>
+                  <a:moveTo>
+                    <a:pt x="152114" y="0"/>
+                  </a:moveTo>
+                  <a:lnTo>
+                    <a:pt x="183643" y="0"/>
+                  </a:lnTo>
+                  <a:lnTo>
+                    <a:pt x="200803" y="17160"/>
+                  </a:lnTo>
+                  <a:lnTo>
+                    <a:pt x="200803" y="16670"/>
+                  </a:lnTo>
+                  <a:lnTo>
+                    <a:pt x="410157" y="217542"/>
+                  </a:lnTo>
+                  <a:lnTo>
+                    <a:pt x="411763" y="217542"/>
+                  </a:lnTo>
+                  <a:lnTo>
+                    <a:pt x="411763" y="581026"/>
+                  </a:lnTo>
+                  <a:lnTo>
+                    <a:pt x="414000" y="581026"/>
+                  </a:lnTo>
+                  <a:lnTo>
+                    <a:pt x="411763" y="583327"/>
+                  </a:lnTo>
+                  <a:lnTo>
+                    <a:pt x="411763" y="585787"/>
+                  </a:lnTo>
+                  <a:lnTo>
+                    <a:pt x="409371" y="585787"/>
+                  </a:lnTo>
+                  <a:lnTo>
+                    <a:pt x="134323" y="868683"/>
+                  </a:lnTo>
+                  <a:lnTo>
+                    <a:pt x="0" y="868683"/>
+                  </a:lnTo>
+                  <a:lnTo>
+                    <a:pt x="133349" y="731529"/>
+                  </a:lnTo>
+                  <a:lnTo>
+                    <a:pt x="133349" y="18765"/>
+                  </a:lnTo>
+                  <a:close/>
+                </a:path>
+              </a:pathLst>
+            </a:custGeom>
+            <a:solidFill>
+              <a:srgbClr val="FFF6CE"/>
+            </a:solidFill>
+            <a:ln>
+              <a:noFill/>
+            </a:ln>
+          </p:spPr>
+          <p:style>
+            <a:lnRef idx="2">
+              <a:schemeClr val="accent1">
+                <a:shade val="15000"/>
+              </a:schemeClr>
+            </a:lnRef>
+            <a:fillRef idx="1">
+              <a:schemeClr val="accent1"/>
+            </a:fillRef>
+            <a:effectRef idx="0">
+              <a:schemeClr val="accent1"/>
+            </a:effectRef>
+            <a:fontRef idx="minor">
+              <a:schemeClr val="lt1"/>
+            </a:fontRef>
+          </p:style>
+          <p:txBody>
+            <a:bodyPr wrap="square" rtlCol="0" anchor="ctr">
+              <a:noAutofit/>
+            </a:bodyPr>
+            <a:lstStyle/>
+            <a:p>
+              <a:pPr algn="ctr"/>
+              <a:endParaRPr lang="ko-KR" altLang="en-US"/>
+            </a:p>
+          </p:txBody>
+        </p:sp>
+        <p:sp>
+          <p:nvSpPr>
+            <p:cNvPr id="178" name="자유형: 도형 177">
+              <a:extLst>
+                <a:ext uri="{FF2B5EF4-FFF2-40B4-BE49-F238E27FC236}">
+                  <a16:creationId xmlns:a16="http://schemas.microsoft.com/office/drawing/2014/main" id="{AA74DC4B-8B75-524A-33EB-E0764BE1F562}"/>
+                </a:ext>
+              </a:extLst>
+            </p:cNvPr>
+            <p:cNvSpPr/>
+            <p:nvPr/>
+          </p:nvSpPr>
+          <p:spPr>
+            <a:xfrm>
+              <a:off x="4038779" y="3010082"/>
+              <a:ext cx="1440000" cy="1440000"/>
+            </a:xfrm>
+            <a:custGeom>
+              <a:avLst/>
+              <a:gdLst>
+                <a:gd name="connsiteX0" fmla="*/ 156456 w 1440000"/>
+                <a:gd name="connsiteY0" fmla="*/ 0 h 1440000"/>
+                <a:gd name="connsiteX1" fmla="*/ 1283544 w 1440000"/>
+                <a:gd name="connsiteY1" fmla="*/ 0 h 1440000"/>
+                <a:gd name="connsiteX2" fmla="*/ 1440000 w 1440000"/>
+                <a:gd name="connsiteY2" fmla="*/ 156456 h 1440000"/>
+                <a:gd name="connsiteX3" fmla="*/ 1440000 w 1440000"/>
+                <a:gd name="connsiteY3" fmla="*/ 1283544 h 1440000"/>
+                <a:gd name="connsiteX4" fmla="*/ 1283544 w 1440000"/>
+                <a:gd name="connsiteY4" fmla="*/ 1440000 h 1440000"/>
+                <a:gd name="connsiteX5" fmla="*/ 850894 w 1440000"/>
+                <a:gd name="connsiteY5" fmla="*/ 1440000 h 1440000"/>
+                <a:gd name="connsiteX6" fmla="*/ 1113287 w 1440000"/>
+                <a:gd name="connsiteY6" fmla="*/ 1177607 h 1440000"/>
+                <a:gd name="connsiteX7" fmla="*/ 1146969 w 1440000"/>
+                <a:gd name="connsiteY7" fmla="*/ 1177607 h 1440000"/>
+                <a:gd name="connsiteX8" fmla="*/ 1209494 w 1440000"/>
+                <a:gd name="connsiteY8" fmla="*/ 1115083 h 1440000"/>
+                <a:gd name="connsiteX9" fmla="*/ 1209494 w 1440000"/>
+                <a:gd name="connsiteY9" fmla="*/ 1003107 h 1440000"/>
+                <a:gd name="connsiteX10" fmla="*/ 1146969 w 1440000"/>
+                <a:gd name="connsiteY10" fmla="*/ 940582 h 1440000"/>
+                <a:gd name="connsiteX11" fmla="*/ 1128338 w 1440000"/>
+                <a:gd name="connsiteY11" fmla="*/ 940582 h 1440000"/>
+                <a:gd name="connsiteX12" fmla="*/ 1128338 w 1440000"/>
+                <a:gd name="connsiteY12" fmla="*/ 771261 h 1440000"/>
+                <a:gd name="connsiteX13" fmla="*/ 1127426 w 1440000"/>
+                <a:gd name="connsiteY13" fmla="*/ 770349 h 1440000"/>
+                <a:gd name="connsiteX14" fmla="*/ 1127426 w 1440000"/>
+                <a:gd name="connsiteY14" fmla="*/ 769269 h 1440000"/>
+                <a:gd name="connsiteX15" fmla="*/ 1127425 w 1440000"/>
+                <a:gd name="connsiteY15" fmla="*/ 769268 h 1440000"/>
+                <a:gd name="connsiteX16" fmla="*/ 1127425 w 1440000"/>
+                <a:gd name="connsiteY16" fmla="*/ 741102 h 1440000"/>
+                <a:gd name="connsiteX17" fmla="*/ 1127425 w 1440000"/>
+                <a:gd name="connsiteY17" fmla="*/ 740020 h 1440000"/>
+                <a:gd name="connsiteX18" fmla="*/ 1127425 w 1440000"/>
+                <a:gd name="connsiteY18" fmla="*/ 718149 h 1440000"/>
+                <a:gd name="connsiteX19" fmla="*/ 1231193 w 1440000"/>
+                <a:gd name="connsiteY19" fmla="*/ 614381 h 1440000"/>
+                <a:gd name="connsiteX20" fmla="*/ 1231193 w 1440000"/>
+                <a:gd name="connsiteY20" fmla="*/ 357451 h 1440000"/>
+                <a:gd name="connsiteX21" fmla="*/ 1231194 w 1440000"/>
+                <a:gd name="connsiteY21" fmla="*/ 357452 h 1440000"/>
+                <a:gd name="connsiteX22" fmla="*/ 1231194 w 1440000"/>
+                <a:gd name="connsiteY22" fmla="*/ 334499 h 1440000"/>
+                <a:gd name="connsiteX23" fmla="*/ 1122296 w 1440000"/>
+                <a:gd name="connsiteY23" fmla="*/ 225601 h 1440000"/>
+                <a:gd name="connsiteX24" fmla="*/ 1122091 w 1440000"/>
+                <a:gd name="connsiteY24" fmla="*/ 225601 h 1440000"/>
+                <a:gd name="connsiteX25" fmla="*/ 1046499 w 1440000"/>
+                <a:gd name="connsiteY25" fmla="*/ 150009 h 1440000"/>
+                <a:gd name="connsiteX26" fmla="*/ 566874 w 1440000"/>
+                <a:gd name="connsiteY26" fmla="*/ 150009 h 1440000"/>
+                <a:gd name="connsiteX27" fmla="*/ 385059 w 1440000"/>
+                <a:gd name="connsiteY27" fmla="*/ 331823 h 1440000"/>
+                <a:gd name="connsiteX28" fmla="*/ 385059 w 1440000"/>
+                <a:gd name="connsiteY28" fmla="*/ 353693 h 1440000"/>
+                <a:gd name="connsiteX29" fmla="*/ 385058 w 1440000"/>
+                <a:gd name="connsiteY29" fmla="*/ 353694 h 1440000"/>
+                <a:gd name="connsiteX30" fmla="*/ 385058 w 1440000"/>
+                <a:gd name="connsiteY30" fmla="*/ 556602 h 1440000"/>
+                <a:gd name="connsiteX31" fmla="*/ 386032 w 1440000"/>
+                <a:gd name="connsiteY31" fmla="*/ 556602 h 1440000"/>
+                <a:gd name="connsiteX32" fmla="*/ 386032 w 1440000"/>
+                <a:gd name="connsiteY32" fmla="*/ 852894 h 1440000"/>
+                <a:gd name="connsiteX33" fmla="*/ 385058 w 1440000"/>
+                <a:gd name="connsiteY33" fmla="*/ 853868 h 1440000"/>
+                <a:gd name="connsiteX34" fmla="*/ 385058 w 1440000"/>
+                <a:gd name="connsiteY34" fmla="*/ 906885 h 1440000"/>
+                <a:gd name="connsiteX35" fmla="*/ 363437 w 1440000"/>
+                <a:gd name="connsiteY35" fmla="*/ 928506 h 1440000"/>
+                <a:gd name="connsiteX36" fmla="*/ 359699 w 1440000"/>
+                <a:gd name="connsiteY36" fmla="*/ 928506 h 1440000"/>
+                <a:gd name="connsiteX37" fmla="*/ 259685 w 1440000"/>
+                <a:gd name="connsiteY37" fmla="*/ 1028520 h 1440000"/>
+                <a:gd name="connsiteX38" fmla="*/ 210406 w 1440000"/>
+                <a:gd name="connsiteY38" fmla="*/ 1028520 h 1440000"/>
+                <a:gd name="connsiteX39" fmla="*/ 96298 w 1440000"/>
+                <a:gd name="connsiteY39" fmla="*/ 1028520 h 1440000"/>
+                <a:gd name="connsiteX40" fmla="*/ 0 w 1440000"/>
+                <a:gd name="connsiteY40" fmla="*/ 932222 h 1440000"/>
+                <a:gd name="connsiteX41" fmla="*/ 0 w 1440000"/>
+                <a:gd name="connsiteY41" fmla="*/ 577130 h 1440000"/>
+                <a:gd name="connsiteX42" fmla="*/ 0 w 1440000"/>
+                <a:gd name="connsiteY42" fmla="*/ 156456 h 1440000"/>
+              </a:gdLst>
+              <a:ahLst/>
+              <a:cxnLst>
+                <a:cxn ang="0">
+                  <a:pos x="connsiteX0" y="connsiteY0"/>
+                </a:cxn>
+                <a:cxn ang="0">
+                  <a:pos x="connsiteX1" y="connsiteY1"/>
+                </a:cxn>
+                <a:cxn ang="0">
+                  <a:pos x="connsiteX2" y="connsiteY2"/>
+                </a:cxn>
+                <a:cxn ang="0">
+                  <a:pos x="connsiteX3" y="connsiteY3"/>
+                </a:cxn>
+                <a:cxn ang="0">
+                  <a:pos x="connsiteX4" y="connsiteY4"/>
+                </a:cxn>
+                <a:cxn ang="0">
+                  <a:pos x="connsiteX5" y="connsiteY5"/>
+                </a:cxn>
+                <a:cxn ang="0">
+                  <a:pos x="connsiteX6" y="connsiteY6"/>
+                </a:cxn>
+                <a:cxn ang="0">
+                  <a:pos x="connsiteX7" y="connsiteY7"/>
+                </a:cxn>
+                <a:cxn ang="0">
+                  <a:pos x="connsiteX8" y="connsiteY8"/>
+                </a:cxn>
+                <a:cxn ang="0">
+                  <a:pos x="connsiteX9" y="connsiteY9"/>
+                </a:cxn>
+                <a:cxn ang="0">
+                  <a:pos x="connsiteX10" y="connsiteY10"/>
+                </a:cxn>
+                <a:cxn ang="0">
+                  <a:pos x="connsiteX11" y="connsiteY11"/>
+                </a:cxn>
+                <a:cxn ang="0">
+                  <a:pos x="connsiteX12" y="connsiteY12"/>
+                </a:cxn>
+                <a:cxn ang="0">
+                  <a:pos x="connsiteX13" y="connsiteY13"/>
+                </a:cxn>
+                <a:cxn ang="0">
+                  <a:pos x="connsiteX14" y="connsiteY14"/>
+                </a:cxn>
+                <a:cxn ang="0">
+                  <a:pos x="connsiteX15" y="connsiteY15"/>
+                </a:cxn>
+                <a:cxn ang="0">
+                  <a:pos x="connsiteX16" y="connsiteY16"/>
+                </a:cxn>
+                <a:cxn ang="0">
+                  <a:pos x="connsiteX17" y="connsiteY17"/>
+                </a:cxn>
+                <a:cxn ang="0">
+                  <a:pos x="connsiteX18" y="connsiteY18"/>
+                </a:cxn>
+                <a:cxn ang="0">
+                  <a:pos x="connsiteX19" y="connsiteY19"/>
+                </a:cxn>
+                <a:cxn ang="0">
+                  <a:pos x="connsiteX20" y="connsiteY20"/>
+                </a:cxn>
+                <a:cxn ang="0">
+                  <a:pos x="connsiteX21" y="connsiteY21"/>
+                </a:cxn>
+                <a:cxn ang="0">
+                  <a:pos x="connsiteX22" y="connsiteY22"/>
+                </a:cxn>
+                <a:cxn ang="0">
+                  <a:pos x="connsiteX23" y="connsiteY23"/>
+                </a:cxn>
+                <a:cxn ang="0">
+                  <a:pos x="connsiteX24" y="connsiteY24"/>
+                </a:cxn>
+                <a:cxn ang="0">
+                  <a:pos x="connsiteX25" y="connsiteY25"/>
+                </a:cxn>
+                <a:cxn ang="0">
+                  <a:pos x="connsiteX26" y="connsiteY26"/>
+                </a:cxn>
+                <a:cxn ang="0">
+                  <a:pos x="connsiteX27" y="connsiteY27"/>
+                </a:cxn>
+                <a:cxn ang="0">
+                  <a:pos x="connsiteX28" y="connsiteY28"/>
+                </a:cxn>
+                <a:cxn ang="0">
+                  <a:pos x="connsiteX29" y="connsiteY29"/>
+                </a:cxn>
+                <a:cxn ang="0">
+                  <a:pos x="connsiteX30" y="connsiteY30"/>
+                </a:cxn>
+                <a:cxn ang="0">
+                  <a:pos x="connsiteX31" y="connsiteY31"/>
+                </a:cxn>
+                <a:cxn ang="0">
+                  <a:pos x="connsiteX32" y="connsiteY32"/>
+                </a:cxn>
+                <a:cxn ang="0">
+                  <a:pos x="connsiteX33" y="connsiteY33"/>
+                </a:cxn>
+                <a:cxn ang="0">
+                  <a:pos x="connsiteX34" y="connsiteY34"/>
+                </a:cxn>
+                <a:cxn ang="0">
+                  <a:pos x="connsiteX35" y="connsiteY35"/>
+                </a:cxn>
+                <a:cxn ang="0">
+                  <a:pos x="connsiteX36" y="connsiteY36"/>
+                </a:cxn>
+                <a:cxn ang="0">
+                  <a:pos x="connsiteX37" y="connsiteY37"/>
+                </a:cxn>
+                <a:cxn ang="0">
+                  <a:pos x="connsiteX38" y="connsiteY38"/>
+                </a:cxn>
+                <a:cxn ang="0">
+                  <a:pos x="connsiteX39" y="connsiteY39"/>
+                </a:cxn>
+                <a:cxn ang="0">
+                  <a:pos x="connsiteX40" y="connsiteY40"/>
+                </a:cxn>
+                <a:cxn ang="0">
+                  <a:pos x="connsiteX41" y="connsiteY41"/>
+                </a:cxn>
+                <a:cxn ang="0">
+                  <a:pos x="connsiteX42" y="connsiteY42"/>
+                </a:cxn>
+              </a:cxnLst>
+              <a:rect l="l" t="t" r="r" b="b"/>
+              <a:pathLst>
+                <a:path w="1440000" h="1440000">
+                  <a:moveTo>
+                    <a:pt x="156456" y="0"/>
+                  </a:moveTo>
+                  <a:lnTo>
+                    <a:pt x="1283544" y="0"/>
+                  </a:lnTo>
+                  <a:lnTo>
+                    <a:pt x="1440000" y="156456"/>
+                  </a:lnTo>
+                  <a:lnTo>
+                    <a:pt x="1440000" y="1283544"/>
+                  </a:lnTo>
+                  <a:lnTo>
+                    <a:pt x="1283544" y="1440000"/>
+                  </a:lnTo>
+                  <a:lnTo>
+                    <a:pt x="850894" y="1440000"/>
+                  </a:lnTo>
+                  <a:lnTo>
+                    <a:pt x="1113287" y="1177607"/>
+                  </a:lnTo>
+                  <a:lnTo>
+                    <a:pt x="1146969" y="1177607"/>
+                  </a:lnTo>
+                  <a:lnTo>
+                    <a:pt x="1209494" y="1115083"/>
+                  </a:lnTo>
+                  <a:lnTo>
+                    <a:pt x="1209494" y="1003107"/>
+                  </a:lnTo>
+                  <a:lnTo>
+                    <a:pt x="1146969" y="940582"/>
+                  </a:lnTo>
+                  <a:lnTo>
+                    <a:pt x="1128338" y="940582"/>
+                  </a:lnTo>
+                  <a:lnTo>
+                    <a:pt x="1128338" y="771261"/>
+                  </a:lnTo>
+                  <a:lnTo>
+                    <a:pt x="1127426" y="770349"/>
+                  </a:lnTo>
+                  <a:lnTo>
+                    <a:pt x="1127426" y="769269"/>
+                  </a:lnTo>
+                  <a:lnTo>
+                    <a:pt x="1127425" y="769268"/>
+                  </a:lnTo>
+                  <a:lnTo>
+                    <a:pt x="1127425" y="741102"/>
+                  </a:lnTo>
+                  <a:lnTo>
+                    <a:pt x="1127425" y="740020"/>
+                  </a:lnTo>
+                  <a:lnTo>
+                    <a:pt x="1127425" y="718149"/>
+                  </a:lnTo>
+                  <a:lnTo>
+                    <a:pt x="1231193" y="614381"/>
+                  </a:lnTo>
+                  <a:lnTo>
+                    <a:pt x="1231193" y="357451"/>
+                  </a:lnTo>
+                  <a:lnTo>
+                    <a:pt x="1231194" y="357452"/>
+                  </a:lnTo>
+                  <a:lnTo>
+                    <a:pt x="1231194" y="334499"/>
+                  </a:lnTo>
+                  <a:lnTo>
+                    <a:pt x="1122296" y="225601"/>
+                  </a:lnTo>
+                  <a:lnTo>
+                    <a:pt x="1122091" y="225601"/>
+                  </a:lnTo>
+                  <a:lnTo>
+                    <a:pt x="1046499" y="150009"/>
+                  </a:lnTo>
+                  <a:lnTo>
+                    <a:pt x="566874" y="150009"/>
+                  </a:lnTo>
+                  <a:lnTo>
+                    <a:pt x="385059" y="331823"/>
+                  </a:lnTo>
+                  <a:lnTo>
+                    <a:pt x="385059" y="353693"/>
+                  </a:lnTo>
+                  <a:lnTo>
+                    <a:pt x="385058" y="353694"/>
+                  </a:lnTo>
+                  <a:lnTo>
+                    <a:pt x="385058" y="556602"/>
+                  </a:lnTo>
+                  <a:lnTo>
+                    <a:pt x="386032" y="556602"/>
+                  </a:lnTo>
+                  <a:lnTo>
+                    <a:pt x="386032" y="852894"/>
+                  </a:lnTo>
+                  <a:lnTo>
+                    <a:pt x="385058" y="853868"/>
+                  </a:lnTo>
+                  <a:lnTo>
+                    <a:pt x="385058" y="906885"/>
+                  </a:lnTo>
+                  <a:lnTo>
+                    <a:pt x="363437" y="928506"/>
+                  </a:lnTo>
+                  <a:lnTo>
+                    <a:pt x="359699" y="928506"/>
+                  </a:lnTo>
+                  <a:lnTo>
+                    <a:pt x="259685" y="1028520"/>
+                  </a:lnTo>
+                  <a:lnTo>
+                    <a:pt x="210406" y="1028520"/>
+                  </a:lnTo>
+                  <a:lnTo>
+                    <a:pt x="96298" y="1028520"/>
+                  </a:lnTo>
+                  <a:lnTo>
+                    <a:pt x="0" y="932222"/>
+                  </a:lnTo>
+                  <a:lnTo>
+                    <a:pt x="0" y="577130"/>
+                  </a:lnTo>
+                  <a:lnTo>
+                    <a:pt x="0" y="156456"/>
+                  </a:lnTo>
+                  <a:close/>
+                </a:path>
+              </a:pathLst>
+            </a:custGeom>
+            <a:solidFill>
+              <a:srgbClr val="F1D640"/>
+            </a:solidFill>
+            <a:ln>
+              <a:noFill/>
+            </a:ln>
+          </p:spPr>
+          <p:style>
+            <a:lnRef idx="2">
+              <a:schemeClr val="accent1">
+                <a:shade val="15000"/>
+              </a:schemeClr>
+            </a:lnRef>
+            <a:fillRef idx="1">
+              <a:schemeClr val="accent1"/>
+            </a:fillRef>
+            <a:effectRef idx="0">
+              <a:schemeClr val="accent1"/>
+            </a:effectRef>
+            <a:fontRef idx="minor">
+              <a:schemeClr val="lt1"/>
+            </a:fontRef>
+          </p:style>
+          <p:txBody>
+            <a:bodyPr wrap="square" rtlCol="0" anchor="ctr">
+              <a:noAutofit/>
+            </a:bodyPr>
+            <a:lstStyle/>
+            <a:p>
+              <a:pPr algn="ctr"/>
+              <a:endParaRPr lang="ko-KR" altLang="en-US" dirty="0"/>
+            </a:p>
+          </p:txBody>
+        </p:sp>
+        <p:sp>
+          <p:nvSpPr>
+            <p:cNvPr id="179" name="사각형: 잘린 위쪽 모서리 178">
+              <a:extLst>
+                <a:ext uri="{FF2B5EF4-FFF2-40B4-BE49-F238E27FC236}">
+                  <a16:creationId xmlns:a16="http://schemas.microsoft.com/office/drawing/2014/main" id="{15D04993-0981-469D-94D7-F791EFEA41E5}"/>
+                </a:ext>
+              </a:extLst>
+            </p:cNvPr>
+            <p:cNvSpPr/>
+            <p:nvPr/>
+          </p:nvSpPr>
+          <p:spPr>
+            <a:xfrm rot="5400000">
+              <a:off x="4419852" y="3566861"/>
+              <a:ext cx="231775" cy="146555"/>
+            </a:xfrm>
+            <a:prstGeom prst="snip2SameRect">
+              <a:avLst>
+                <a:gd name="adj1" fmla="val 47039"/>
+                <a:gd name="adj2" fmla="val 0"/>
+              </a:avLst>
+            </a:prstGeom>
+            <a:solidFill>
+              <a:srgbClr val="36447A"/>
+            </a:solidFill>
+            <a:ln>
+              <a:noFill/>
+            </a:ln>
+          </p:spPr>
+          <p:style>
+            <a:lnRef idx="2">
+              <a:schemeClr val="accent1">
+                <a:shade val="15000"/>
+              </a:schemeClr>
+            </a:lnRef>
+            <a:fillRef idx="1">
+              <a:schemeClr val="accent1"/>
+            </a:fillRef>
+            <a:effectRef idx="0">
+              <a:schemeClr val="accent1"/>
+            </a:effectRef>
+            <a:fontRef idx="minor">
+              <a:schemeClr val="lt1"/>
+            </a:fontRef>
+          </p:style>
+          <p:txBody>
+            <a:bodyPr wrap="square" rtlCol="0" anchor="ctr">
+              <a:noAutofit/>
+            </a:bodyPr>
+            <a:lstStyle/>
+            <a:p>
+              <a:pPr algn="ctr"/>
+              <a:endParaRPr lang="ko-KR" altLang="en-US"/>
+            </a:p>
+          </p:txBody>
+        </p:sp>
+        <p:sp>
+          <p:nvSpPr>
+            <p:cNvPr id="182" name="사각형: 잘린 위쪽 모서리 181">
+              <a:extLst>
+                <a:ext uri="{FF2B5EF4-FFF2-40B4-BE49-F238E27FC236}">
+                  <a16:creationId xmlns:a16="http://schemas.microsoft.com/office/drawing/2014/main" id="{A4B3F9DF-2437-9EBE-8403-4021B9833ED9}"/>
+                </a:ext>
+              </a:extLst>
+            </p:cNvPr>
+            <p:cNvSpPr/>
+            <p:nvPr/>
+          </p:nvSpPr>
+          <p:spPr>
+            <a:xfrm rot="10800000">
+              <a:off x="4198987" y="4086488"/>
+              <a:ext cx="149557" cy="197326"/>
+            </a:xfrm>
+            <a:prstGeom prst="snip2SameRect">
+              <a:avLst/>
+            </a:prstGeom>
+            <a:solidFill>
+              <a:srgbClr val="36447A"/>
+            </a:solidFill>
+            <a:ln>
+              <a:noFill/>
+            </a:ln>
+          </p:spPr>
+          <p:style>
+            <a:lnRef idx="2">
+              <a:schemeClr val="accent1">
+                <a:shade val="15000"/>
+              </a:schemeClr>
+            </a:lnRef>
+            <a:fillRef idx="1">
+              <a:schemeClr val="accent1"/>
+            </a:fillRef>
+            <a:effectRef idx="0">
+              <a:schemeClr val="accent1"/>
+            </a:effectRef>
+            <a:fontRef idx="minor">
+              <a:schemeClr val="lt1"/>
+            </a:fontRef>
+          </p:style>
+          <p:txBody>
+            <a:bodyPr wrap="square" rtlCol="0" anchor="ctr">
+              <a:noAutofit/>
+            </a:bodyPr>
+            <a:lstStyle/>
+            <a:p>
+              <a:pPr algn="ctr"/>
+              <a:endParaRPr lang="ko-KR" altLang="en-US"/>
+            </a:p>
+          </p:txBody>
+        </p:sp>
+        <p:sp>
+          <p:nvSpPr>
+            <p:cNvPr id="183" name="사각형: 잘린 위쪽 모서리 182">
+              <a:extLst>
+                <a:ext uri="{FF2B5EF4-FFF2-40B4-BE49-F238E27FC236}">
+                  <a16:creationId xmlns:a16="http://schemas.microsoft.com/office/drawing/2014/main" id="{2AD9CA8B-03C2-C0B1-50D2-0456F46D051A}"/>
+                </a:ext>
+              </a:extLst>
+            </p:cNvPr>
+            <p:cNvSpPr/>
+            <p:nvPr/>
+          </p:nvSpPr>
+          <p:spPr>
+            <a:xfrm rot="8100000">
+              <a:off x="4336293" y="3919939"/>
+              <a:ext cx="327025" cy="123948"/>
+            </a:xfrm>
+            <a:prstGeom prst="snip2SameRect">
+              <a:avLst>
+                <a:gd name="adj1" fmla="val 32457"/>
+                <a:gd name="adj2" fmla="val 0"/>
+              </a:avLst>
+            </a:prstGeom>
+            <a:solidFill>
+              <a:srgbClr val="36447A"/>
+            </a:solidFill>
+            <a:ln>
+              <a:noFill/>
+            </a:ln>
+          </p:spPr>
+          <p:style>
+            <a:lnRef idx="2">
+              <a:schemeClr val="accent1">
+                <a:shade val="15000"/>
+              </a:schemeClr>
+            </a:lnRef>
+            <a:fillRef idx="1">
+              <a:schemeClr val="accent1"/>
+            </a:fillRef>
+            <a:effectRef idx="0">
+              <a:schemeClr val="accent1"/>
+            </a:effectRef>
+            <a:fontRef idx="minor">
+              <a:schemeClr val="lt1"/>
+            </a:fontRef>
+          </p:style>
+          <p:txBody>
+            <a:bodyPr wrap="square" rtlCol="0" anchor="ctr">
+              <a:noAutofit/>
+            </a:bodyPr>
+            <a:lstStyle/>
+            <a:p>
+              <a:pPr algn="ctr"/>
+              <a:endParaRPr lang="ko-KR" altLang="en-US"/>
+            </a:p>
+          </p:txBody>
+        </p:sp>
+        <p:sp>
+          <p:nvSpPr>
+            <p:cNvPr id="184" name="직사각형 183">
+              <a:extLst>
+                <a:ext uri="{FF2B5EF4-FFF2-40B4-BE49-F238E27FC236}">
+                  <a16:creationId xmlns:a16="http://schemas.microsoft.com/office/drawing/2014/main" id="{D2A03B9C-4DC4-8567-BA75-F84AC94C05E6}"/>
+                </a:ext>
+              </a:extLst>
+            </p:cNvPr>
+            <p:cNvSpPr/>
+            <p:nvPr/>
+          </p:nvSpPr>
+          <p:spPr>
+            <a:xfrm>
+              <a:off x="4461535" y="3612785"/>
+              <a:ext cx="112846" cy="337879"/>
+            </a:xfrm>
+            <a:prstGeom prst="rect">
+              <a:avLst/>
+            </a:prstGeom>
+            <a:solidFill>
+              <a:srgbClr val="36447A"/>
+            </a:solidFill>
+            <a:ln>
+              <a:noFill/>
+            </a:ln>
+          </p:spPr>
+          <p:style>
+            <a:lnRef idx="2">
+              <a:schemeClr val="accent1">
+                <a:shade val="15000"/>
+              </a:schemeClr>
+            </a:lnRef>
+            <a:fillRef idx="1">
+              <a:schemeClr val="accent1"/>
+            </a:fillRef>
+            <a:effectRef idx="0">
+              <a:schemeClr val="accent1"/>
+            </a:effectRef>
+            <a:fontRef idx="minor">
+              <a:schemeClr val="lt1"/>
+            </a:fontRef>
+          </p:style>
+          <p:txBody>
+            <a:bodyPr wrap="square" rtlCol="0" anchor="ctr">
+              <a:noAutofit/>
+            </a:bodyPr>
+            <a:lstStyle/>
+            <a:p>
+              <a:pPr algn="ctr"/>
+              <a:endParaRPr lang="ko-KR" altLang="en-US"/>
+            </a:p>
+          </p:txBody>
+        </p:sp>
+        <p:sp>
+          <p:nvSpPr>
+            <p:cNvPr id="185" name="자유형: 도형 184">
+              <a:extLst>
+                <a:ext uri="{FF2B5EF4-FFF2-40B4-BE49-F238E27FC236}">
+                  <a16:creationId xmlns:a16="http://schemas.microsoft.com/office/drawing/2014/main" id="{DBB405F8-0131-82BC-E1EC-F016AA0F771B}"/>
+                </a:ext>
+              </a:extLst>
+            </p:cNvPr>
+            <p:cNvSpPr/>
+            <p:nvPr/>
+          </p:nvSpPr>
+          <p:spPr>
+            <a:xfrm rot="10800000">
+              <a:off x="4038778" y="4033297"/>
+              <a:ext cx="125058" cy="197328"/>
+            </a:xfrm>
+            <a:custGeom>
+              <a:avLst/>
+              <a:gdLst>
+                <a:gd name="connsiteX0" fmla="*/ 125058 w 125058"/>
+                <a:gd name="connsiteY0" fmla="*/ 197328 h 197328"/>
+                <a:gd name="connsiteX1" fmla="*/ 72300 w 125058"/>
+                <a:gd name="connsiteY1" fmla="*/ 144570 h 197328"/>
+                <a:gd name="connsiteX2" fmla="*/ 0 w 125058"/>
+                <a:gd name="connsiteY2" fmla="*/ 144570 h 197328"/>
+                <a:gd name="connsiteX3" fmla="*/ 0 w 125058"/>
+                <a:gd name="connsiteY3" fmla="*/ 50272 h 197328"/>
+                <a:gd name="connsiteX4" fmla="*/ 50272 w 125058"/>
+                <a:gd name="connsiteY4" fmla="*/ 0 h 197328"/>
+                <a:gd name="connsiteX5" fmla="*/ 125058 w 125058"/>
+                <a:gd name="connsiteY5" fmla="*/ 0 h 197328"/>
+              </a:gdLst>
+              <a:ahLst/>
+              <a:cxnLst>
+                <a:cxn ang="0">
+                  <a:pos x="connsiteX0" y="connsiteY0"/>
+                </a:cxn>
+                <a:cxn ang="0">
+                  <a:pos x="connsiteX1" y="connsiteY1"/>
+                </a:cxn>
+                <a:cxn ang="0">
+                  <a:pos x="connsiteX2" y="connsiteY2"/>
+                </a:cxn>
+                <a:cxn ang="0">
+                  <a:pos x="connsiteX3" y="connsiteY3"/>
+                </a:cxn>
+                <a:cxn ang="0">
+                  <a:pos x="connsiteX4" y="connsiteY4"/>
+                </a:cxn>
+                <a:cxn ang="0">
+                  <a:pos x="connsiteX5" y="connsiteY5"/>
+                </a:cxn>
+              </a:cxnLst>
+              <a:rect l="l" t="t" r="r" b="b"/>
+              <a:pathLst>
+                <a:path w="125058" h="197328">
+                  <a:moveTo>
+                    <a:pt x="125058" y="197328"/>
+                  </a:moveTo>
+                  <a:lnTo>
+                    <a:pt x="72300" y="144570"/>
+                  </a:lnTo>
+                  <a:lnTo>
+                    <a:pt x="0" y="144570"/>
+                  </a:lnTo>
+                  <a:lnTo>
+                    <a:pt x="0" y="50272"/>
+                  </a:lnTo>
+                  <a:lnTo>
+                    <a:pt x="50272" y="0"/>
+                  </a:lnTo>
+                  <a:lnTo>
+                    <a:pt x="125058" y="0"/>
+                  </a:lnTo>
+                  <a:close/>
+                </a:path>
+              </a:pathLst>
+            </a:custGeom>
+            <a:solidFill>
+              <a:srgbClr val="36447A"/>
+            </a:solidFill>
+            <a:ln>
+              <a:noFill/>
+            </a:ln>
+          </p:spPr>
+          <p:style>
+            <a:lnRef idx="2">
+              <a:schemeClr val="accent1">
+                <a:shade val="15000"/>
+              </a:schemeClr>
+            </a:lnRef>
+            <a:fillRef idx="1">
+              <a:schemeClr val="accent1"/>
+            </a:fillRef>
+            <a:effectRef idx="0">
+              <a:schemeClr val="accent1"/>
+            </a:effectRef>
+            <a:fontRef idx="minor">
+              <a:schemeClr val="lt1"/>
+            </a:fontRef>
+          </p:style>
+          <p:txBody>
+            <a:bodyPr wrap="square" rtlCol="0" anchor="ctr">
+              <a:noAutofit/>
+            </a:bodyPr>
+            <a:lstStyle/>
+            <a:p>
+              <a:pPr algn="ctr"/>
+              <a:endParaRPr lang="ko-KR" altLang="en-US"/>
+            </a:p>
+          </p:txBody>
+        </p:sp>
+        <p:sp>
+          <p:nvSpPr>
+            <p:cNvPr id="186" name="직사각형 185">
+              <a:extLst>
+                <a:ext uri="{FF2B5EF4-FFF2-40B4-BE49-F238E27FC236}">
+                  <a16:creationId xmlns:a16="http://schemas.microsoft.com/office/drawing/2014/main" id="{D64E9A2B-D667-54C5-7C09-AE503D34E9C9}"/>
+                </a:ext>
+              </a:extLst>
+            </p:cNvPr>
+            <p:cNvSpPr/>
+            <p:nvPr/>
+          </p:nvSpPr>
+          <p:spPr>
+            <a:xfrm rot="2700000" flipH="1" flipV="1">
+              <a:off x="4304241" y="4032805"/>
+              <a:ext cx="82707" cy="148174"/>
+            </a:xfrm>
+            <a:prstGeom prst="rect">
+              <a:avLst/>
+            </a:prstGeom>
+            <a:solidFill>
+              <a:srgbClr val="36447A"/>
+            </a:solidFill>
+            <a:ln>
+              <a:noFill/>
+            </a:ln>
+          </p:spPr>
+          <p:style>
+            <a:lnRef idx="2">
+              <a:schemeClr val="accent1">
+                <a:shade val="15000"/>
+              </a:schemeClr>
+            </a:lnRef>
+            <a:fillRef idx="1">
+              <a:schemeClr val="accent1"/>
+            </a:fillRef>
+            <a:effectRef idx="0">
+              <a:schemeClr val="accent1"/>
+            </a:effectRef>
+            <a:fontRef idx="minor">
+              <a:schemeClr val="lt1"/>
+            </a:fontRef>
+          </p:style>
+          <p:txBody>
+            <a:bodyPr wrap="square" rtlCol="0" anchor="ctr">
+              <a:noAutofit/>
+            </a:bodyPr>
+            <a:lstStyle/>
+            <a:p>
+              <a:pPr algn="ctr"/>
+              <a:endParaRPr lang="ko-KR" altLang="en-US"/>
+            </a:p>
+          </p:txBody>
+        </p:sp>
+        <p:sp>
+          <p:nvSpPr>
+            <p:cNvPr id="187" name="사각형: 잘린 위쪽 모서리 186">
+              <a:extLst>
+                <a:ext uri="{FF2B5EF4-FFF2-40B4-BE49-F238E27FC236}">
+                  <a16:creationId xmlns:a16="http://schemas.microsoft.com/office/drawing/2014/main" id="{9EFF325B-B21D-1BBC-1C55-3BC7F60A43BF}"/>
+                </a:ext>
+              </a:extLst>
+            </p:cNvPr>
+            <p:cNvSpPr/>
+            <p:nvPr/>
+          </p:nvSpPr>
+          <p:spPr>
+            <a:xfrm rot="5400000">
+              <a:off x="5115394" y="4043722"/>
+              <a:ext cx="149557" cy="45719"/>
+            </a:xfrm>
+            <a:prstGeom prst="snip2SameRect">
+              <a:avLst>
+                <a:gd name="adj1" fmla="val 50000"/>
+                <a:gd name="adj2" fmla="val 0"/>
+              </a:avLst>
+            </a:prstGeom>
+            <a:solidFill>
+              <a:srgbClr val="5E9FB3"/>
+            </a:solidFill>
+            <a:ln>
+              <a:noFill/>
+            </a:ln>
+          </p:spPr>
+          <p:style>
+            <a:lnRef idx="2">
+              <a:schemeClr val="accent1">
+                <a:shade val="15000"/>
+              </a:schemeClr>
+            </a:lnRef>
+            <a:fillRef idx="1">
+              <a:schemeClr val="accent1"/>
+            </a:fillRef>
+            <a:effectRef idx="0">
+              <a:schemeClr val="accent1"/>
+            </a:effectRef>
+            <a:fontRef idx="minor">
+              <a:schemeClr val="lt1"/>
+            </a:fontRef>
+          </p:style>
+          <p:txBody>
+            <a:bodyPr wrap="square" rtlCol="0" anchor="ctr">
+              <a:noAutofit/>
+            </a:bodyPr>
+            <a:lstStyle/>
+            <a:p>
+              <a:pPr algn="ctr"/>
+              <a:endParaRPr lang="ko-KR" altLang="en-US"/>
+            </a:p>
+          </p:txBody>
+        </p:sp>
+        <p:sp>
+          <p:nvSpPr>
+            <p:cNvPr id="188" name="팔각형 187">
+              <a:extLst>
+                <a:ext uri="{FF2B5EF4-FFF2-40B4-BE49-F238E27FC236}">
+                  <a16:creationId xmlns:a16="http://schemas.microsoft.com/office/drawing/2014/main" id="{4B169C28-AC11-7D62-9D00-37CF77A72BCA}"/>
+                </a:ext>
+              </a:extLst>
+            </p:cNvPr>
+            <p:cNvSpPr/>
+            <p:nvPr/>
+          </p:nvSpPr>
+          <p:spPr>
+            <a:xfrm rot="10800000" flipH="1" flipV="1">
+              <a:off x="4659249" y="3375820"/>
+              <a:ext cx="53180" cy="53180"/>
+            </a:xfrm>
+            <a:prstGeom prst="octagon">
+              <a:avLst/>
+            </a:prstGeom>
+            <a:solidFill>
+              <a:schemeClr val="tx1"/>
+            </a:solidFill>
+            <a:ln>
+              <a:noFill/>
+            </a:ln>
+          </p:spPr>
+          <p:style>
+            <a:lnRef idx="2">
+              <a:schemeClr val="accent1">
+                <a:shade val="15000"/>
+              </a:schemeClr>
+            </a:lnRef>
+            <a:fillRef idx="1">
+              <a:schemeClr val="accent1"/>
+            </a:fillRef>
+            <a:effectRef idx="0">
+              <a:schemeClr val="accent1"/>
+            </a:effectRef>
+            <a:fontRef idx="minor">
+              <a:schemeClr val="lt1"/>
+            </a:fontRef>
+          </p:style>
+          <p:txBody>
+            <a:bodyPr rtlCol="0" anchor="ctr"/>
+            <a:lstStyle/>
+            <a:p>
+              <a:pPr algn="ctr"/>
+              <a:endParaRPr lang="ko-KR" altLang="en-US"/>
+            </a:p>
+          </p:txBody>
+        </p:sp>
+        <p:sp>
+          <p:nvSpPr>
+            <p:cNvPr id="189" name="자유형: 도형 188">
+              <a:extLst>
+                <a:ext uri="{FF2B5EF4-FFF2-40B4-BE49-F238E27FC236}">
+                  <a16:creationId xmlns:a16="http://schemas.microsoft.com/office/drawing/2014/main" id="{4681A4B8-3DBC-C1E2-994F-3ECF4B016F99}"/>
+                </a:ext>
+              </a:extLst>
+            </p:cNvPr>
+            <p:cNvSpPr/>
+            <p:nvPr/>
+          </p:nvSpPr>
+          <p:spPr>
+            <a:xfrm>
+              <a:off x="4970073" y="3586907"/>
+              <a:ext cx="258763" cy="158005"/>
+            </a:xfrm>
+            <a:custGeom>
+              <a:avLst/>
+              <a:gdLst>
+                <a:gd name="connsiteX0" fmla="*/ 20225 w 258763"/>
+                <a:gd name="connsiteY0" fmla="*/ 0 h 158005"/>
+                <a:gd name="connsiteX1" fmla="*/ 233436 w 258763"/>
+                <a:gd name="connsiteY1" fmla="*/ 0 h 158005"/>
+                <a:gd name="connsiteX2" fmla="*/ 245259 w 258763"/>
+                <a:gd name="connsiteY2" fmla="*/ 0 h 158005"/>
+                <a:gd name="connsiteX3" fmla="*/ 258763 w 258763"/>
+                <a:gd name="connsiteY3" fmla="*/ 13503 h 158005"/>
+                <a:gd name="connsiteX4" fmla="*/ 258763 w 258763"/>
+                <a:gd name="connsiteY4" fmla="*/ 39131 h 158005"/>
+                <a:gd name="connsiteX5" fmla="*/ 151498 w 258763"/>
+                <a:gd name="connsiteY5" fmla="*/ 146396 h 158005"/>
+                <a:gd name="connsiteX6" fmla="*/ 150549 w 258763"/>
+                <a:gd name="connsiteY6" fmla="*/ 145447 h 158005"/>
+                <a:gd name="connsiteX7" fmla="*/ 137991 w 258763"/>
+                <a:gd name="connsiteY7" fmla="*/ 158005 h 158005"/>
+                <a:gd name="connsiteX8" fmla="*/ 126277 w 258763"/>
+                <a:gd name="connsiteY8" fmla="*/ 146291 h 158005"/>
+                <a:gd name="connsiteX9" fmla="*/ 126171 w 258763"/>
+                <a:gd name="connsiteY9" fmla="*/ 146396 h 158005"/>
+                <a:gd name="connsiteX10" fmla="*/ 0 w 258763"/>
+                <a:gd name="connsiteY10" fmla="*/ 20225 h 158005"/>
+              </a:gdLst>
+              <a:ahLst/>
+              <a:cxnLst>
+                <a:cxn ang="0">
+                  <a:pos x="connsiteX0" y="connsiteY0"/>
+                </a:cxn>
+                <a:cxn ang="0">
+                  <a:pos x="connsiteX1" y="connsiteY1"/>
+                </a:cxn>
+                <a:cxn ang="0">
+                  <a:pos x="connsiteX2" y="connsiteY2"/>
+                </a:cxn>
+                <a:cxn ang="0">
+                  <a:pos x="connsiteX3" y="connsiteY3"/>
+                </a:cxn>
+                <a:cxn ang="0">
+                  <a:pos x="connsiteX4" y="connsiteY4"/>
+                </a:cxn>
+                <a:cxn ang="0">
+                  <a:pos x="connsiteX5" y="connsiteY5"/>
+                </a:cxn>
+                <a:cxn ang="0">
+                  <a:pos x="connsiteX6" y="connsiteY6"/>
+                </a:cxn>
+                <a:cxn ang="0">
+                  <a:pos x="connsiteX7" y="connsiteY7"/>
+                </a:cxn>
+                <a:cxn ang="0">
+                  <a:pos x="connsiteX8" y="connsiteY8"/>
+                </a:cxn>
+                <a:cxn ang="0">
+                  <a:pos x="connsiteX9" y="connsiteY9"/>
+                </a:cxn>
+                <a:cxn ang="0">
+                  <a:pos x="connsiteX10" y="connsiteY10"/>
+                </a:cxn>
+              </a:cxnLst>
+              <a:rect l="l" t="t" r="r" b="b"/>
+              <a:pathLst>
+                <a:path w="258763" h="158005">
+                  <a:moveTo>
+                    <a:pt x="20225" y="0"/>
+                  </a:moveTo>
+                  <a:lnTo>
+                    <a:pt x="233436" y="0"/>
+                  </a:lnTo>
+                  <a:lnTo>
+                    <a:pt x="245259" y="0"/>
+                  </a:lnTo>
+                  <a:lnTo>
+                    <a:pt x="258763" y="13503"/>
+                  </a:lnTo>
+                  <a:lnTo>
+                    <a:pt x="258763" y="39131"/>
+                  </a:lnTo>
+                  <a:lnTo>
+                    <a:pt x="151498" y="146396"/>
+                  </a:lnTo>
+                  <a:lnTo>
+                    <a:pt x="150549" y="145447"/>
+                  </a:lnTo>
+                  <a:lnTo>
+                    <a:pt x="137991" y="158005"/>
+                  </a:lnTo>
+                  <a:lnTo>
+                    <a:pt x="126277" y="146291"/>
+                  </a:lnTo>
+                  <a:lnTo>
+                    <a:pt x="126171" y="146396"/>
+                  </a:lnTo>
+                  <a:lnTo>
+                    <a:pt x="0" y="20225"/>
+                  </a:lnTo>
+                  <a:close/>
+                </a:path>
+              </a:pathLst>
+            </a:custGeom>
+            <a:solidFill>
+              <a:srgbClr val="F29B87"/>
+            </a:solidFill>
+            <a:ln>
+              <a:noFill/>
+            </a:ln>
+          </p:spPr>
+          <p:style>
+            <a:lnRef idx="2">
+              <a:schemeClr val="accent1">
+                <a:shade val="15000"/>
+              </a:schemeClr>
+            </a:lnRef>
+            <a:fillRef idx="1">
+              <a:schemeClr val="accent1"/>
+            </a:fillRef>
+            <a:effectRef idx="0">
+              <a:schemeClr val="accent1"/>
+            </a:effectRef>
+            <a:fontRef idx="minor">
+              <a:schemeClr val="lt1"/>
+            </a:fontRef>
+          </p:style>
+          <p:txBody>
+            <a:bodyPr wrap="square" rtlCol="0" anchor="ctr">
+              <a:noAutofit/>
+            </a:bodyPr>
+            <a:lstStyle/>
+            <a:p>
+              <a:pPr algn="ctr"/>
+              <a:endParaRPr lang="ko-KR" altLang="en-US"/>
+            </a:p>
+          </p:txBody>
+        </p:sp>
+      </p:grpSp>
+      <p:grpSp>
+        <p:nvGrpSpPr>
+          <p:cNvPr id="190" name="그룹 189">
+            <a:extLst>
+              <a:ext uri="{FF2B5EF4-FFF2-40B4-BE49-F238E27FC236}">
+                <a16:creationId xmlns:a16="http://schemas.microsoft.com/office/drawing/2014/main" id="{17D9346F-0EFE-A0F1-F30F-D0EC1A50CE24}"/>
+              </a:ext>
+            </a:extLst>
+          </p:cNvPr>
+          <p:cNvGrpSpPr/>
+          <p:nvPr/>
+        </p:nvGrpSpPr>
+        <p:grpSpPr>
+          <a:xfrm>
+            <a:off x="9741984" y="4456690"/>
+            <a:ext cx="1440000" cy="1440000"/>
+            <a:chOff x="4565667" y="2555158"/>
+            <a:chExt cx="1440000" cy="1440000"/>
+          </a:xfrm>
+        </p:grpSpPr>
+        <p:sp>
+          <p:nvSpPr>
+            <p:cNvPr id="191" name="자유형: 도형 190">
+              <a:extLst>
+                <a:ext uri="{FF2B5EF4-FFF2-40B4-BE49-F238E27FC236}">
+                  <a16:creationId xmlns:a16="http://schemas.microsoft.com/office/drawing/2014/main" id="{3431386A-7563-AC98-2F5E-D9809065E7D4}"/>
+                </a:ext>
+              </a:extLst>
+            </p:cNvPr>
+            <p:cNvSpPr/>
+            <p:nvPr/>
+          </p:nvSpPr>
+          <p:spPr>
+            <a:xfrm>
+              <a:off x="4565667" y="2555158"/>
+              <a:ext cx="1440000" cy="1440000"/>
+            </a:xfrm>
+            <a:custGeom>
+              <a:avLst/>
+              <a:gdLst>
+                <a:gd name="connsiteX0" fmla="*/ 677846 w 1440000"/>
+                <a:gd name="connsiteY0" fmla="*/ 235666 h 1440000"/>
+                <a:gd name="connsiteX1" fmla="*/ 443759 w 1440000"/>
+                <a:gd name="connsiteY1" fmla="*/ 469752 h 1440000"/>
+                <a:gd name="connsiteX2" fmla="*/ 443759 w 1440000"/>
+                <a:gd name="connsiteY2" fmla="*/ 472709 h 1440000"/>
+                <a:gd name="connsiteX3" fmla="*/ 434410 w 1440000"/>
+                <a:gd name="connsiteY3" fmla="*/ 482058 h 1440000"/>
+                <a:gd name="connsiteX4" fmla="*/ 434410 w 1440000"/>
+                <a:gd name="connsiteY4" fmla="*/ 580244 h 1440000"/>
+                <a:gd name="connsiteX5" fmla="*/ 504544 w 1440000"/>
+                <a:gd name="connsiteY5" fmla="*/ 650378 h 1440000"/>
+                <a:gd name="connsiteX6" fmla="*/ 545714 w 1440000"/>
+                <a:gd name="connsiteY6" fmla="*/ 650378 h 1440000"/>
+                <a:gd name="connsiteX7" fmla="*/ 569803 w 1440000"/>
+                <a:gd name="connsiteY7" fmla="*/ 674467 h 1440000"/>
+                <a:gd name="connsiteX8" fmla="*/ 309038 w 1440000"/>
+                <a:gd name="connsiteY8" fmla="*/ 935232 h 1440000"/>
+                <a:gd name="connsiteX9" fmla="*/ 309038 w 1440000"/>
+                <a:gd name="connsiteY9" fmla="*/ 1042107 h 1440000"/>
+                <a:gd name="connsiteX10" fmla="*/ 377881 w 1440000"/>
+                <a:gd name="connsiteY10" fmla="*/ 1110950 h 1440000"/>
+                <a:gd name="connsiteX11" fmla="*/ 484756 w 1440000"/>
+                <a:gd name="connsiteY11" fmla="*/ 1110950 h 1440000"/>
+                <a:gd name="connsiteX12" fmla="*/ 486494 w 1440000"/>
+                <a:gd name="connsiteY12" fmla="*/ 1109212 h 1440000"/>
+                <a:gd name="connsiteX13" fmla="*/ 974775 w 1440000"/>
+                <a:gd name="connsiteY13" fmla="*/ 1109212 h 1440000"/>
+                <a:gd name="connsiteX14" fmla="*/ 1049320 w 1440000"/>
+                <a:gd name="connsiteY14" fmla="*/ 1034667 h 1440000"/>
+                <a:gd name="connsiteX15" fmla="*/ 1049320 w 1440000"/>
+                <a:gd name="connsiteY15" fmla="*/ 934099 h 1440000"/>
+                <a:gd name="connsiteX16" fmla="*/ 974775 w 1440000"/>
+                <a:gd name="connsiteY16" fmla="*/ 859554 h 1440000"/>
+                <a:gd name="connsiteX17" fmla="*/ 792474 w 1440000"/>
+                <a:gd name="connsiteY17" fmla="*/ 859554 h 1440000"/>
+                <a:gd name="connsiteX18" fmla="*/ 764313 w 1440000"/>
+                <a:gd name="connsiteY18" fmla="*/ 831393 h 1440000"/>
+                <a:gd name="connsiteX19" fmla="*/ 1006175 w 1440000"/>
+                <a:gd name="connsiteY19" fmla="*/ 589531 h 1440000"/>
+                <a:gd name="connsiteX20" fmla="*/ 1006175 w 1440000"/>
+                <a:gd name="connsiteY20" fmla="*/ 482656 h 1440000"/>
+                <a:gd name="connsiteX21" fmla="*/ 938295 w 1440000"/>
+                <a:gd name="connsiteY21" fmla="*/ 414776 h 1440000"/>
+                <a:gd name="connsiteX22" fmla="*/ 883538 w 1440000"/>
+                <a:gd name="connsiteY22" fmla="*/ 414776 h 1440000"/>
+                <a:gd name="connsiteX23" fmla="*/ 857576 w 1440000"/>
+                <a:gd name="connsiteY23" fmla="*/ 388814 h 1440000"/>
+                <a:gd name="connsiteX24" fmla="*/ 857576 w 1440000"/>
+                <a:gd name="connsiteY24" fmla="*/ 369057 h 1440000"/>
+                <a:gd name="connsiteX25" fmla="*/ 857939 w 1440000"/>
+                <a:gd name="connsiteY25" fmla="*/ 369057 h 1440000"/>
+                <a:gd name="connsiteX26" fmla="*/ 857939 w 1440000"/>
+                <a:gd name="connsiteY26" fmla="*/ 306223 h 1440000"/>
+                <a:gd name="connsiteX27" fmla="*/ 787382 w 1440000"/>
+                <a:gd name="connsiteY27" fmla="*/ 235666 h 1440000"/>
+                <a:gd name="connsiteX28" fmla="*/ 274118 w 1440000"/>
+                <a:gd name="connsiteY28" fmla="*/ 0 h 1440000"/>
+                <a:gd name="connsiteX29" fmla="*/ 1165882 w 1440000"/>
+                <a:gd name="connsiteY29" fmla="*/ 0 h 1440000"/>
+                <a:gd name="connsiteX30" fmla="*/ 1440000 w 1440000"/>
+                <a:gd name="connsiteY30" fmla="*/ 274118 h 1440000"/>
+                <a:gd name="connsiteX31" fmla="*/ 1440000 w 1440000"/>
+                <a:gd name="connsiteY31" fmla="*/ 1165882 h 1440000"/>
+                <a:gd name="connsiteX32" fmla="*/ 1165882 w 1440000"/>
+                <a:gd name="connsiteY32" fmla="*/ 1440000 h 1440000"/>
+                <a:gd name="connsiteX33" fmla="*/ 274118 w 1440000"/>
+                <a:gd name="connsiteY33" fmla="*/ 1440000 h 1440000"/>
+                <a:gd name="connsiteX34" fmla="*/ 0 w 1440000"/>
+                <a:gd name="connsiteY34" fmla="*/ 1165882 h 1440000"/>
+                <a:gd name="connsiteX35" fmla="*/ 0 w 1440000"/>
+                <a:gd name="connsiteY35" fmla="*/ 274118 h 1440000"/>
+              </a:gdLst>
+              <a:ahLst/>
+              <a:cxnLst>
+                <a:cxn ang="0">
+                  <a:pos x="connsiteX0" y="connsiteY0"/>
+                </a:cxn>
+                <a:cxn ang="0">
+                  <a:pos x="connsiteX1" y="connsiteY1"/>
+                </a:cxn>
+                <a:cxn ang="0">
+                  <a:pos x="connsiteX2" y="connsiteY2"/>
+                </a:cxn>
+                <a:cxn ang="0">
+                  <a:pos x="connsiteX3" y="connsiteY3"/>
+                </a:cxn>
+                <a:cxn ang="0">
+                  <a:pos x="connsiteX4" y="connsiteY4"/>
+                </a:cxn>
+                <a:cxn ang="0">
+                  <a:pos x="connsiteX5" y="connsiteY5"/>
+                </a:cxn>
+                <a:cxn ang="0">
+                  <a:pos x="connsiteX6" y="connsiteY6"/>
+                </a:cxn>
+                <a:cxn ang="0">
+                  <a:pos x="connsiteX7" y="connsiteY7"/>
+                </a:cxn>
+                <a:cxn ang="0">
+                  <a:pos x="connsiteX8" y="connsiteY8"/>
+                </a:cxn>
+                <a:cxn ang="0">
+                  <a:pos x="connsiteX9" y="connsiteY9"/>
+                </a:cxn>
+                <a:cxn ang="0">
+                  <a:pos x="connsiteX10" y="connsiteY10"/>
+                </a:cxn>
+                <a:cxn ang="0">
+                  <a:pos x="connsiteX11" y="connsiteY11"/>
+                </a:cxn>
+                <a:cxn ang="0">
+                  <a:pos x="connsiteX12" y="connsiteY12"/>
+                </a:cxn>
+                <a:cxn ang="0">
+                  <a:pos x="connsiteX13" y="connsiteY13"/>
+                </a:cxn>
+                <a:cxn ang="0">
+                  <a:pos x="connsiteX14" y="connsiteY14"/>
+                </a:cxn>
+                <a:cxn ang="0">
+                  <a:pos x="connsiteX15" y="connsiteY15"/>
+                </a:cxn>
+                <a:cxn ang="0">
+                  <a:pos x="connsiteX16" y="connsiteY16"/>
+                </a:cxn>
+                <a:cxn ang="0">
+                  <a:pos x="connsiteX17" y="connsiteY17"/>
+                </a:cxn>
+                <a:cxn ang="0">
+                  <a:pos x="connsiteX18" y="connsiteY18"/>
+                </a:cxn>
+                <a:cxn ang="0">
+                  <a:pos x="connsiteX19" y="connsiteY19"/>
+                </a:cxn>
+                <a:cxn ang="0">
+                  <a:pos x="connsiteX20" y="connsiteY20"/>
+                </a:cxn>
+                <a:cxn ang="0">
+                  <a:pos x="connsiteX21" y="connsiteY21"/>
+                </a:cxn>
+                <a:cxn ang="0">
+                  <a:pos x="connsiteX22" y="connsiteY22"/>
+                </a:cxn>
+                <a:cxn ang="0">
+                  <a:pos x="connsiteX23" y="connsiteY23"/>
+                </a:cxn>
+                <a:cxn ang="0">
+                  <a:pos x="connsiteX24" y="connsiteY24"/>
+                </a:cxn>
+                <a:cxn ang="0">
+                  <a:pos x="connsiteX25" y="connsiteY25"/>
+                </a:cxn>
+                <a:cxn ang="0">
+                  <a:pos x="connsiteX26" y="connsiteY26"/>
+                </a:cxn>
+                <a:cxn ang="0">
+                  <a:pos x="connsiteX27" y="connsiteY27"/>
+                </a:cxn>
+                <a:cxn ang="0">
+                  <a:pos x="connsiteX28" y="connsiteY28"/>
+                </a:cxn>
+                <a:cxn ang="0">
+                  <a:pos x="connsiteX29" y="connsiteY29"/>
+                </a:cxn>
+                <a:cxn ang="0">
+                  <a:pos x="connsiteX30" y="connsiteY30"/>
+                </a:cxn>
+                <a:cxn ang="0">
+                  <a:pos x="connsiteX31" y="connsiteY31"/>
+                </a:cxn>
+                <a:cxn ang="0">
+                  <a:pos x="connsiteX32" y="connsiteY32"/>
+                </a:cxn>
+                <a:cxn ang="0">
+                  <a:pos x="connsiteX33" y="connsiteY33"/>
+                </a:cxn>
+                <a:cxn ang="0">
+                  <a:pos x="connsiteX34" y="connsiteY34"/>
+                </a:cxn>
+                <a:cxn ang="0">
+                  <a:pos x="connsiteX35" y="connsiteY35"/>
+                </a:cxn>
+              </a:cxnLst>
+              <a:rect l="l" t="t" r="r" b="b"/>
+              <a:pathLst>
+                <a:path w="1440000" h="1440000">
+                  <a:moveTo>
+                    <a:pt x="677846" y="235666"/>
+                  </a:moveTo>
+                  <a:lnTo>
+                    <a:pt x="443759" y="469752"/>
+                  </a:lnTo>
+                  <a:lnTo>
+                    <a:pt x="443759" y="472709"/>
+                  </a:lnTo>
+                  <a:lnTo>
+                    <a:pt x="434410" y="482058"/>
+                  </a:lnTo>
+                  <a:lnTo>
+                    <a:pt x="434410" y="580244"/>
+                  </a:lnTo>
+                  <a:lnTo>
+                    <a:pt x="504544" y="650378"/>
+                  </a:lnTo>
+                  <a:lnTo>
+                    <a:pt x="545714" y="650378"/>
+                  </a:lnTo>
+                  <a:lnTo>
+                    <a:pt x="569803" y="674467"/>
+                  </a:lnTo>
+                  <a:lnTo>
+                    <a:pt x="309038" y="935232"/>
+                  </a:lnTo>
+                  <a:lnTo>
+                    <a:pt x="309038" y="1042107"/>
+                  </a:lnTo>
+                  <a:lnTo>
+                    <a:pt x="377881" y="1110950"/>
+                  </a:lnTo>
+                  <a:lnTo>
+                    <a:pt x="484756" y="1110950"/>
+                  </a:lnTo>
+                  <a:lnTo>
+                    <a:pt x="486494" y="1109212"/>
+                  </a:lnTo>
+                  <a:lnTo>
+                    <a:pt x="974775" y="1109212"/>
+                  </a:lnTo>
+                  <a:lnTo>
+                    <a:pt x="1049320" y="1034667"/>
+                  </a:lnTo>
+                  <a:lnTo>
+                    <a:pt x="1049320" y="934099"/>
+                  </a:lnTo>
+                  <a:lnTo>
+                    <a:pt x="974775" y="859554"/>
+                  </a:lnTo>
+                  <a:lnTo>
+                    <a:pt x="792474" y="859554"/>
+                  </a:lnTo>
+                  <a:lnTo>
+                    <a:pt x="764313" y="831393"/>
+                  </a:lnTo>
+                  <a:lnTo>
+                    <a:pt x="1006175" y="589531"/>
+                  </a:lnTo>
+                  <a:lnTo>
+                    <a:pt x="1006175" y="482656"/>
+                  </a:lnTo>
+                  <a:lnTo>
+                    <a:pt x="938295" y="414776"/>
+                  </a:lnTo>
+                  <a:lnTo>
+                    <a:pt x="883538" y="414776"/>
+                  </a:lnTo>
+                  <a:lnTo>
+                    <a:pt x="857576" y="388814"/>
+                  </a:lnTo>
+                  <a:lnTo>
+                    <a:pt x="857576" y="369057"/>
+                  </a:lnTo>
+                  <a:lnTo>
+                    <a:pt x="857939" y="369057"/>
+                  </a:lnTo>
+                  <a:lnTo>
+                    <a:pt x="857939" y="306223"/>
+                  </a:lnTo>
+                  <a:lnTo>
+                    <a:pt x="787382" y="235666"/>
+                  </a:lnTo>
+                  <a:close/>
+                  <a:moveTo>
+                    <a:pt x="274118" y="0"/>
+                  </a:moveTo>
+                  <a:lnTo>
+                    <a:pt x="1165882" y="0"/>
+                  </a:lnTo>
+                  <a:lnTo>
+                    <a:pt x="1440000" y="274118"/>
+                  </a:lnTo>
+                  <a:lnTo>
+                    <a:pt x="1440000" y="1165882"/>
+                  </a:lnTo>
+                  <a:lnTo>
+                    <a:pt x="1165882" y="1440000"/>
+                  </a:lnTo>
+                  <a:lnTo>
+                    <a:pt x="274118" y="1440000"/>
+                  </a:lnTo>
+                  <a:lnTo>
+                    <a:pt x="0" y="1165882"/>
+                  </a:lnTo>
+                  <a:lnTo>
+                    <a:pt x="0" y="274118"/>
+                  </a:lnTo>
+                  <a:close/>
+                </a:path>
+              </a:pathLst>
+            </a:custGeom>
+            <a:solidFill>
+              <a:schemeClr val="tx1"/>
+            </a:solidFill>
+            <a:ln>
+              <a:noFill/>
+            </a:ln>
+          </p:spPr>
+          <p:style>
+            <a:lnRef idx="2">
+              <a:schemeClr val="accent1">
+                <a:shade val="15000"/>
+              </a:schemeClr>
+            </a:lnRef>
+            <a:fillRef idx="1">
+              <a:schemeClr val="accent1"/>
+            </a:fillRef>
+            <a:effectRef idx="0">
+              <a:schemeClr val="accent1"/>
+            </a:effectRef>
+            <a:fontRef idx="minor">
+              <a:schemeClr val="lt1"/>
+            </a:fontRef>
+          </p:style>
+          <p:txBody>
+            <a:bodyPr wrap="square" rtlCol="0" anchor="ctr">
+              <a:noAutofit/>
+            </a:bodyPr>
+            <a:lstStyle/>
+            <a:p>
+              <a:pPr algn="ctr"/>
+              <a:endParaRPr lang="ko-KR" altLang="en-US"/>
+            </a:p>
+          </p:txBody>
+        </p:sp>
+        <p:sp>
+          <p:nvSpPr>
+            <p:cNvPr id="192" name="자유형: 도형 191">
+              <a:extLst>
+                <a:ext uri="{FF2B5EF4-FFF2-40B4-BE49-F238E27FC236}">
+                  <a16:creationId xmlns:a16="http://schemas.microsoft.com/office/drawing/2014/main" id="{57DA856D-F2E9-9F29-C9C9-4D7C1F7F3871}"/>
+                </a:ext>
+              </a:extLst>
+            </p:cNvPr>
+            <p:cNvSpPr/>
+            <p:nvPr/>
+          </p:nvSpPr>
+          <p:spPr>
+            <a:xfrm rot="-2700000">
+              <a:off x="4858266" y="2976183"/>
+              <a:ext cx="828164" cy="744606"/>
+            </a:xfrm>
+            <a:custGeom>
+              <a:avLst/>
+              <a:gdLst>
+                <a:gd name="connsiteX0" fmla="*/ 775974 w 828164"/>
+                <a:gd name="connsiteY0" fmla="*/ 0 h 744606"/>
+                <a:gd name="connsiteX1" fmla="*/ 828164 w 828164"/>
+                <a:gd name="connsiteY1" fmla="*/ 52190 h 744606"/>
+                <a:gd name="connsiteX2" fmla="*/ 828164 w 828164"/>
+                <a:gd name="connsiteY2" fmla="*/ 119426 h 744606"/>
+                <a:gd name="connsiteX3" fmla="*/ 775974 w 828164"/>
+                <a:gd name="connsiteY3" fmla="*/ 171616 h 744606"/>
+                <a:gd name="connsiteX4" fmla="*/ 703629 w 828164"/>
+                <a:gd name="connsiteY4" fmla="*/ 171616 h 744606"/>
+                <a:gd name="connsiteX5" fmla="*/ 760420 w 828164"/>
+                <a:gd name="connsiteY5" fmla="*/ 228407 h 744606"/>
+                <a:gd name="connsiteX6" fmla="*/ 760420 w 828164"/>
+                <a:gd name="connsiteY6" fmla="*/ 228407 h 744606"/>
+                <a:gd name="connsiteX7" fmla="*/ 812938 w 828164"/>
+                <a:gd name="connsiteY7" fmla="*/ 280925 h 744606"/>
+                <a:gd name="connsiteX8" fmla="*/ 812938 w 828164"/>
+                <a:gd name="connsiteY8" fmla="*/ 347833 h 744606"/>
+                <a:gd name="connsiteX9" fmla="*/ 760749 w 828164"/>
+                <a:gd name="connsiteY9" fmla="*/ 400023 h 744606"/>
+                <a:gd name="connsiteX10" fmla="*/ 292668 w 828164"/>
+                <a:gd name="connsiteY10" fmla="*/ 400023 h 744606"/>
+                <a:gd name="connsiteX11" fmla="*/ 515900 w 828164"/>
+                <a:gd name="connsiteY11" fmla="*/ 623255 h 744606"/>
+                <a:gd name="connsiteX12" fmla="*/ 515900 w 828164"/>
+                <a:gd name="connsiteY12" fmla="*/ 697063 h 744606"/>
+                <a:gd name="connsiteX13" fmla="*/ 468357 w 828164"/>
+                <a:gd name="connsiteY13" fmla="*/ 744606 h 744606"/>
+                <a:gd name="connsiteX14" fmla="*/ 394549 w 828164"/>
+                <a:gd name="connsiteY14" fmla="*/ 744606 h 744606"/>
+                <a:gd name="connsiteX15" fmla="*/ 7920 w 828164"/>
+                <a:gd name="connsiteY15" fmla="*/ 357977 h 744606"/>
+                <a:gd name="connsiteX16" fmla="*/ 7920 w 828164"/>
+                <a:gd name="connsiteY16" fmla="*/ 355753 h 744606"/>
+                <a:gd name="connsiteX17" fmla="*/ 0 w 828164"/>
+                <a:gd name="connsiteY17" fmla="*/ 347833 h 744606"/>
+                <a:gd name="connsiteX18" fmla="*/ 0 w 828164"/>
+                <a:gd name="connsiteY18" fmla="*/ 280597 h 744606"/>
+                <a:gd name="connsiteX19" fmla="*/ 52190 w 828164"/>
+                <a:gd name="connsiteY19" fmla="*/ 228407 h 744606"/>
+                <a:gd name="connsiteX20" fmla="*/ 517718 w 828164"/>
+                <a:gd name="connsiteY20" fmla="*/ 228407 h 744606"/>
+                <a:gd name="connsiteX21" fmla="*/ 460927 w 828164"/>
+                <a:gd name="connsiteY21" fmla="*/ 171616 h 744606"/>
+                <a:gd name="connsiteX22" fmla="*/ 459667 w 828164"/>
+                <a:gd name="connsiteY22" fmla="*/ 171616 h 744606"/>
+                <a:gd name="connsiteX23" fmla="*/ 407477 w 828164"/>
+                <a:gd name="connsiteY23" fmla="*/ 119426 h 744606"/>
+                <a:gd name="connsiteX24" fmla="*/ 407477 w 828164"/>
+                <a:gd name="connsiteY24" fmla="*/ 52190 h 744606"/>
+                <a:gd name="connsiteX25" fmla="*/ 459667 w 828164"/>
+                <a:gd name="connsiteY25" fmla="*/ 0 h 744606"/>
+              </a:gdLst>
+              <a:ahLst/>
+              <a:cxnLst>
+                <a:cxn ang="0">
+                  <a:pos x="connsiteX0" y="connsiteY0"/>
+                </a:cxn>
+                <a:cxn ang="0">
+                  <a:pos x="connsiteX1" y="connsiteY1"/>
+                </a:cxn>
+                <a:cxn ang="0">
+                  <a:pos x="connsiteX2" y="connsiteY2"/>
+                </a:cxn>
+                <a:cxn ang="0">
+                  <a:pos x="connsiteX3" y="connsiteY3"/>
+                </a:cxn>
+                <a:cxn ang="0">
+                  <a:pos x="connsiteX4" y="connsiteY4"/>
+                </a:cxn>
+                <a:cxn ang="0">
+                  <a:pos x="connsiteX5" y="connsiteY5"/>
+                </a:cxn>
+                <a:cxn ang="0">
+                  <a:pos x="connsiteX6" y="connsiteY6"/>
+                </a:cxn>
+                <a:cxn ang="0">
+                  <a:pos x="connsiteX7" y="connsiteY7"/>
+                </a:cxn>
+                <a:cxn ang="0">
+                  <a:pos x="connsiteX8" y="connsiteY8"/>
+                </a:cxn>
+                <a:cxn ang="0">
+                  <a:pos x="connsiteX9" y="connsiteY9"/>
+                </a:cxn>
+                <a:cxn ang="0">
+                  <a:pos x="connsiteX10" y="connsiteY10"/>
+                </a:cxn>
+                <a:cxn ang="0">
+                  <a:pos x="connsiteX11" y="connsiteY11"/>
+                </a:cxn>
+                <a:cxn ang="0">
+                  <a:pos x="connsiteX12" y="connsiteY12"/>
+                </a:cxn>
+                <a:cxn ang="0">
+                  <a:pos x="connsiteX13" y="connsiteY13"/>
+                </a:cxn>
+                <a:cxn ang="0">
+                  <a:pos x="connsiteX14" y="connsiteY14"/>
+                </a:cxn>
+                <a:cxn ang="0">
+                  <a:pos x="connsiteX15" y="connsiteY15"/>
+                </a:cxn>
+                <a:cxn ang="0">
+                  <a:pos x="connsiteX16" y="connsiteY16"/>
+                </a:cxn>
+                <a:cxn ang="0">
+                  <a:pos x="connsiteX17" y="connsiteY17"/>
+                </a:cxn>
+                <a:cxn ang="0">
+                  <a:pos x="connsiteX18" y="connsiteY18"/>
+                </a:cxn>
+                <a:cxn ang="0">
+                  <a:pos x="connsiteX19" y="connsiteY19"/>
+                </a:cxn>
+                <a:cxn ang="0">
+                  <a:pos x="connsiteX20" y="connsiteY20"/>
+                </a:cxn>
+                <a:cxn ang="0">
+                  <a:pos x="connsiteX21" y="connsiteY21"/>
+                </a:cxn>
+                <a:cxn ang="0">
+                  <a:pos x="connsiteX22" y="connsiteY22"/>
+                </a:cxn>
+                <a:cxn ang="0">
+                  <a:pos x="connsiteX23" y="connsiteY23"/>
+                </a:cxn>
+                <a:cxn ang="0">
+                  <a:pos x="connsiteX24" y="connsiteY24"/>
+                </a:cxn>
+                <a:cxn ang="0">
+                  <a:pos x="connsiteX25" y="connsiteY25"/>
+                </a:cxn>
+              </a:cxnLst>
+              <a:rect l="l" t="t" r="r" b="b"/>
+              <a:pathLst>
+                <a:path w="828164" h="744606">
+                  <a:moveTo>
+                    <a:pt x="775974" y="0"/>
+                  </a:moveTo>
+                  <a:lnTo>
+                    <a:pt x="828164" y="52190"/>
+                  </a:lnTo>
+                  <a:lnTo>
+                    <a:pt x="828164" y="119426"/>
+                  </a:lnTo>
+                  <a:lnTo>
+                    <a:pt x="775974" y="171616"/>
+                  </a:lnTo>
+                  <a:lnTo>
+                    <a:pt x="703629" y="171616"/>
+                  </a:lnTo>
+                  <a:lnTo>
+                    <a:pt x="760420" y="228407"/>
+                  </a:lnTo>
+                  <a:lnTo>
+                    <a:pt x="760420" y="228407"/>
+                  </a:lnTo>
+                  <a:lnTo>
+                    <a:pt x="812938" y="280925"/>
+                  </a:lnTo>
+                  <a:lnTo>
+                    <a:pt x="812938" y="347833"/>
+                  </a:lnTo>
+                  <a:lnTo>
+                    <a:pt x="760749" y="400023"/>
+                  </a:lnTo>
+                  <a:lnTo>
+                    <a:pt x="292668" y="400023"/>
+                  </a:lnTo>
+                  <a:lnTo>
+                    <a:pt x="515900" y="623255"/>
+                  </a:lnTo>
+                  <a:lnTo>
+                    <a:pt x="515900" y="697063"/>
+                  </a:lnTo>
+                  <a:lnTo>
+                    <a:pt x="468357" y="744606"/>
+                  </a:lnTo>
+                  <a:lnTo>
+                    <a:pt x="394549" y="744606"/>
+                  </a:lnTo>
+                  <a:lnTo>
+                    <a:pt x="7920" y="357977"/>
+                  </a:lnTo>
+                  <a:lnTo>
+                    <a:pt x="7920" y="355753"/>
+                  </a:lnTo>
+                  <a:lnTo>
+                    <a:pt x="0" y="347833"/>
+                  </a:lnTo>
+                  <a:lnTo>
+                    <a:pt x="0" y="280597"/>
+                  </a:lnTo>
+                  <a:lnTo>
+                    <a:pt x="52190" y="228407"/>
+                  </a:lnTo>
+                  <a:lnTo>
+                    <a:pt x="517718" y="228407"/>
+                  </a:lnTo>
+                  <a:lnTo>
+                    <a:pt x="460927" y="171616"/>
+                  </a:lnTo>
+                  <a:lnTo>
+                    <a:pt x="459667" y="171616"/>
+                  </a:lnTo>
+                  <a:lnTo>
+                    <a:pt x="407477" y="119426"/>
+                  </a:lnTo>
+                  <a:lnTo>
+                    <a:pt x="407477" y="52190"/>
+                  </a:lnTo>
+                  <a:lnTo>
+                    <a:pt x="459667" y="0"/>
+                  </a:lnTo>
+                  <a:close/>
+                </a:path>
+              </a:pathLst>
+            </a:custGeom>
+            <a:solidFill>
+              <a:srgbClr val="00FFAE"/>
+            </a:solidFill>
+            <a:ln>
+              <a:noFill/>
+            </a:ln>
+          </p:spPr>
+          <p:style>
+            <a:lnRef idx="2">
+              <a:schemeClr val="accent1">
+                <a:shade val="15000"/>
+              </a:schemeClr>
+            </a:lnRef>
+            <a:fillRef idx="1">
+              <a:schemeClr val="accent1"/>
+            </a:fillRef>
+            <a:effectRef idx="0">
+              <a:schemeClr val="accent1"/>
+            </a:effectRef>
+            <a:fontRef idx="minor">
+              <a:schemeClr val="lt1"/>
+            </a:fontRef>
+          </p:style>
+          <p:txBody>
+            <a:bodyPr wrap="square" rtlCol="0" anchor="ctr">
+              <a:noAutofit/>
+            </a:bodyPr>
+            <a:lstStyle/>
+            <a:p>
+              <a:pPr algn="ctr"/>
+              <a:endParaRPr lang="ko-KR" altLang="en-US"/>
+            </a:p>
+          </p:txBody>
+        </p:sp>
+      </p:grpSp>
     </p:spTree>
     <p:extLst>
       <p:ext uri="{BB962C8B-B14F-4D97-AF65-F5344CB8AC3E}">
         <p14:creationId xmlns:p14="http://schemas.microsoft.com/office/powerpoint/2010/main" val="3602296085"/>
+      </p:ext>
+    </p:extLst>
+  </p:cSld>
+  <p:clrMapOvr>
+    <a:masterClrMapping/>
+  </p:clrMapOvr>
+</p:sld>
+</file>
+
+<file path=ppt/slides/slide4.xml><?xml version="1.0" encoding="utf-8"?>
+<p:sld xmlns:a="http://schemas.openxmlformats.org/drawingml/2006/main" xmlns:r="http://schemas.openxmlformats.org/officeDocument/2006/relationships" xmlns:p="http://schemas.openxmlformats.org/presentationml/2006/main">
+  <p:cSld>
+    <p:spTree>
+      <p:nvGrpSpPr>
+        <p:cNvPr id="1" name=""/>
+        <p:cNvGrpSpPr/>
+        <p:nvPr/>
+      </p:nvGrpSpPr>
+      <p:grpSpPr>
+        <a:xfrm>
+          <a:off x="0" y="0"/>
+          <a:ext cx="0" cy="0"/>
+          <a:chOff x="0" y="0"/>
+          <a:chExt cx="0" cy="0"/>
+        </a:xfrm>
+      </p:grpSpPr>
+      <p:grpSp>
+        <p:nvGrpSpPr>
+          <p:cNvPr id="15" name="그룹 14">
+            <a:extLst>
+              <a:ext uri="{FF2B5EF4-FFF2-40B4-BE49-F238E27FC236}">
+                <a16:creationId xmlns:a16="http://schemas.microsoft.com/office/drawing/2014/main" id="{A96B8B65-E649-0A89-9D77-7CC6738A5430}"/>
+              </a:ext>
+            </a:extLst>
+          </p:cNvPr>
+          <p:cNvGrpSpPr/>
+          <p:nvPr/>
+        </p:nvGrpSpPr>
+        <p:grpSpPr>
+          <a:xfrm>
+            <a:off x="225539" y="222475"/>
+            <a:ext cx="1440000" cy="1440000"/>
+            <a:chOff x="2959214" y="2276700"/>
+            <a:chExt cx="1440000" cy="1440000"/>
+          </a:xfrm>
+        </p:grpSpPr>
+        <p:sp>
+          <p:nvSpPr>
+            <p:cNvPr id="4" name="팔각형 3">
+              <a:extLst>
+                <a:ext uri="{FF2B5EF4-FFF2-40B4-BE49-F238E27FC236}">
+                  <a16:creationId xmlns:a16="http://schemas.microsoft.com/office/drawing/2014/main" id="{8F561B3B-18B6-B648-72F8-037FFB1A4FB8}"/>
+                </a:ext>
+              </a:extLst>
+            </p:cNvPr>
+            <p:cNvSpPr/>
+            <p:nvPr/>
+          </p:nvSpPr>
+          <p:spPr>
+            <a:xfrm>
+              <a:off x="2959214" y="2276700"/>
+              <a:ext cx="1440000" cy="1440000"/>
+            </a:xfrm>
+            <a:prstGeom prst="octagon">
+              <a:avLst>
+                <a:gd name="adj" fmla="val 10282"/>
+              </a:avLst>
+            </a:prstGeom>
+            <a:solidFill>
+              <a:srgbClr val="FAA41A"/>
+            </a:solidFill>
+            <a:ln>
+              <a:noFill/>
+            </a:ln>
+          </p:spPr>
+          <p:style>
+            <a:lnRef idx="2">
+              <a:schemeClr val="accent1">
+                <a:shade val="15000"/>
+              </a:schemeClr>
+            </a:lnRef>
+            <a:fillRef idx="1">
+              <a:schemeClr val="accent1"/>
+            </a:fillRef>
+            <a:effectRef idx="0">
+              <a:schemeClr val="accent1"/>
+            </a:effectRef>
+            <a:fontRef idx="minor">
+              <a:schemeClr val="lt1"/>
+            </a:fontRef>
+          </p:style>
+          <p:txBody>
+            <a:bodyPr rtlCol="0" anchor="ctr"/>
+            <a:lstStyle/>
+            <a:p>
+              <a:pPr algn="ctr"/>
+              <a:endParaRPr lang="ko-KR" altLang="en-US"/>
+            </a:p>
+          </p:txBody>
+        </p:sp>
+        <p:sp>
+          <p:nvSpPr>
+            <p:cNvPr id="5" name="팔각형 4">
+              <a:extLst>
+                <a:ext uri="{FF2B5EF4-FFF2-40B4-BE49-F238E27FC236}">
+                  <a16:creationId xmlns:a16="http://schemas.microsoft.com/office/drawing/2014/main" id="{2B675F35-7C3E-C28F-EFC8-5ADD42F6DEF3}"/>
+                </a:ext>
+              </a:extLst>
+            </p:cNvPr>
+            <p:cNvSpPr/>
+            <p:nvPr/>
+          </p:nvSpPr>
+          <p:spPr>
+            <a:xfrm>
+              <a:off x="3120244" y="3234031"/>
+              <a:ext cx="266788" cy="266788"/>
+            </a:xfrm>
+            <a:prstGeom prst="octagon">
+              <a:avLst/>
+            </a:prstGeom>
+            <a:solidFill>
+              <a:srgbClr val="000205"/>
+            </a:solidFill>
+            <a:ln>
+              <a:noFill/>
+            </a:ln>
+          </p:spPr>
+          <p:style>
+            <a:lnRef idx="2">
+              <a:schemeClr val="accent1">
+                <a:shade val="15000"/>
+              </a:schemeClr>
+            </a:lnRef>
+            <a:fillRef idx="1">
+              <a:schemeClr val="accent1"/>
+            </a:fillRef>
+            <a:effectRef idx="0">
+              <a:schemeClr val="accent1"/>
+            </a:effectRef>
+            <a:fontRef idx="minor">
+              <a:schemeClr val="lt1"/>
+            </a:fontRef>
+          </p:style>
+          <p:txBody>
+            <a:bodyPr rtlCol="0" anchor="ctr"/>
+            <a:lstStyle/>
+            <a:p>
+              <a:pPr algn="ctr"/>
+              <a:endParaRPr lang="ko-KR" altLang="en-US"/>
+            </a:p>
+          </p:txBody>
+        </p:sp>
+        <p:sp>
+          <p:nvSpPr>
+            <p:cNvPr id="12" name="팔각형 11">
+              <a:extLst>
+                <a:ext uri="{FF2B5EF4-FFF2-40B4-BE49-F238E27FC236}">
+                  <a16:creationId xmlns:a16="http://schemas.microsoft.com/office/drawing/2014/main" id="{6A448DAD-4D41-C73C-9EF6-09430DA599FE}"/>
+                </a:ext>
+              </a:extLst>
+            </p:cNvPr>
+            <p:cNvSpPr/>
+            <p:nvPr/>
+          </p:nvSpPr>
+          <p:spPr>
+            <a:xfrm flipH="1">
+              <a:off x="3971396" y="3234031"/>
+              <a:ext cx="266788" cy="266788"/>
+            </a:xfrm>
+            <a:prstGeom prst="octagon">
+              <a:avLst/>
+            </a:prstGeom>
+            <a:solidFill>
+              <a:srgbClr val="000205"/>
+            </a:solidFill>
+            <a:ln>
+              <a:noFill/>
+            </a:ln>
+          </p:spPr>
+          <p:style>
+            <a:lnRef idx="2">
+              <a:schemeClr val="accent1">
+                <a:shade val="15000"/>
+              </a:schemeClr>
+            </a:lnRef>
+            <a:fillRef idx="1">
+              <a:schemeClr val="accent1"/>
+            </a:fillRef>
+            <a:effectRef idx="0">
+              <a:schemeClr val="accent1"/>
+            </a:effectRef>
+            <a:fontRef idx="minor">
+              <a:schemeClr val="lt1"/>
+            </a:fontRef>
+          </p:style>
+          <p:txBody>
+            <a:bodyPr rtlCol="0" anchor="ctr"/>
+            <a:lstStyle/>
+            <a:p>
+              <a:pPr algn="ctr"/>
+              <a:endParaRPr lang="ko-KR" altLang="en-US"/>
+            </a:p>
+          </p:txBody>
+        </p:sp>
+        <p:sp>
+          <p:nvSpPr>
+            <p:cNvPr id="14" name="자유형: 도형 13">
+              <a:extLst>
+                <a:ext uri="{FF2B5EF4-FFF2-40B4-BE49-F238E27FC236}">
+                  <a16:creationId xmlns:a16="http://schemas.microsoft.com/office/drawing/2014/main" id="{16EA1834-BB12-800A-212D-10BC3A31A6DD}"/>
+                </a:ext>
+              </a:extLst>
+            </p:cNvPr>
+            <p:cNvSpPr/>
+            <p:nvPr/>
+          </p:nvSpPr>
+          <p:spPr>
+            <a:xfrm flipH="1">
+              <a:off x="3513944" y="3406457"/>
+              <a:ext cx="330540" cy="113413"/>
+            </a:xfrm>
+            <a:custGeom>
+              <a:avLst/>
+              <a:gdLst>
+                <a:gd name="connsiteX0" fmla="*/ 330540 w 330540"/>
+                <a:gd name="connsiteY0" fmla="*/ 0 h 113413"/>
+                <a:gd name="connsiteX1" fmla="*/ 315106 w 330540"/>
+                <a:gd name="connsiteY1" fmla="*/ 0 h 113413"/>
+                <a:gd name="connsiteX2" fmla="*/ 15434 w 330540"/>
+                <a:gd name="connsiteY2" fmla="*/ 0 h 113413"/>
+                <a:gd name="connsiteX3" fmla="*/ 0 w 330540"/>
+                <a:gd name="connsiteY3" fmla="*/ 0 h 113413"/>
+                <a:gd name="connsiteX4" fmla="*/ 0 w 330540"/>
+                <a:gd name="connsiteY4" fmla="*/ 35273 h 113413"/>
+                <a:gd name="connsiteX5" fmla="*/ 78140 w 330540"/>
+                <a:gd name="connsiteY5" fmla="*/ 113413 h 113413"/>
+                <a:gd name="connsiteX6" fmla="*/ 93574 w 330540"/>
+                <a:gd name="connsiteY6" fmla="*/ 113413 h 113413"/>
+                <a:gd name="connsiteX7" fmla="*/ 236966 w 330540"/>
+                <a:gd name="connsiteY7" fmla="*/ 113413 h 113413"/>
+                <a:gd name="connsiteX8" fmla="*/ 252400 w 330540"/>
+                <a:gd name="connsiteY8" fmla="*/ 113413 h 113413"/>
+                <a:gd name="connsiteX9" fmla="*/ 330540 w 330540"/>
+                <a:gd name="connsiteY9" fmla="*/ 35273 h 113413"/>
+              </a:gdLst>
+              <a:ahLst/>
+              <a:cxnLst>
+                <a:cxn ang="0">
+                  <a:pos x="connsiteX0" y="connsiteY0"/>
+                </a:cxn>
+                <a:cxn ang="0">
+                  <a:pos x="connsiteX1" y="connsiteY1"/>
+                </a:cxn>
+                <a:cxn ang="0">
+                  <a:pos x="connsiteX2" y="connsiteY2"/>
+                </a:cxn>
+                <a:cxn ang="0">
+                  <a:pos x="connsiteX3" y="connsiteY3"/>
+                </a:cxn>
+                <a:cxn ang="0">
+                  <a:pos x="connsiteX4" y="connsiteY4"/>
+                </a:cxn>
+                <a:cxn ang="0">
+                  <a:pos x="connsiteX5" y="connsiteY5"/>
+                </a:cxn>
+                <a:cxn ang="0">
+                  <a:pos x="connsiteX6" y="connsiteY6"/>
+                </a:cxn>
+                <a:cxn ang="0">
+                  <a:pos x="connsiteX7" y="connsiteY7"/>
+                </a:cxn>
+                <a:cxn ang="0">
+                  <a:pos x="connsiteX8" y="connsiteY8"/>
+                </a:cxn>
+                <a:cxn ang="0">
+                  <a:pos x="connsiteX9" y="connsiteY9"/>
+                </a:cxn>
+              </a:cxnLst>
+              <a:rect l="l" t="t" r="r" b="b"/>
+              <a:pathLst>
+                <a:path w="330540" h="113413">
+                  <a:moveTo>
+                    <a:pt x="330540" y="0"/>
+                  </a:moveTo>
+                  <a:lnTo>
+                    <a:pt x="315106" y="0"/>
+                  </a:lnTo>
+                  <a:lnTo>
+                    <a:pt x="15434" y="0"/>
+                  </a:lnTo>
+                  <a:lnTo>
+                    <a:pt x="0" y="0"/>
+                  </a:lnTo>
+                  <a:lnTo>
+                    <a:pt x="0" y="35273"/>
+                  </a:lnTo>
+                  <a:lnTo>
+                    <a:pt x="78140" y="113413"/>
+                  </a:lnTo>
+                  <a:lnTo>
+                    <a:pt x="93574" y="113413"/>
+                  </a:lnTo>
+                  <a:lnTo>
+                    <a:pt x="236966" y="113413"/>
+                  </a:lnTo>
+                  <a:lnTo>
+                    <a:pt x="252400" y="113413"/>
+                  </a:lnTo>
+                  <a:lnTo>
+                    <a:pt x="330540" y="35273"/>
+                  </a:lnTo>
+                  <a:close/>
+                </a:path>
+              </a:pathLst>
+            </a:custGeom>
+            <a:solidFill>
+              <a:srgbClr val="000205"/>
+            </a:solidFill>
+            <a:ln>
+              <a:noFill/>
+            </a:ln>
+          </p:spPr>
+          <p:style>
+            <a:lnRef idx="2">
+              <a:schemeClr val="accent1">
+                <a:shade val="15000"/>
+              </a:schemeClr>
+            </a:lnRef>
+            <a:fillRef idx="1">
+              <a:schemeClr val="accent1"/>
+            </a:fillRef>
+            <a:effectRef idx="0">
+              <a:schemeClr val="accent1"/>
+            </a:effectRef>
+            <a:fontRef idx="minor">
+              <a:schemeClr val="lt1"/>
+            </a:fontRef>
+          </p:style>
+          <p:txBody>
+            <a:bodyPr wrap="square" rtlCol="0" anchor="ctr">
+              <a:noAutofit/>
+            </a:bodyPr>
+            <a:lstStyle/>
+            <a:p>
+              <a:pPr algn="ctr"/>
+              <a:endParaRPr lang="ko-KR" altLang="en-US"/>
+            </a:p>
+          </p:txBody>
+        </p:sp>
+      </p:grpSp>
+    </p:spTree>
+    <p:extLst>
+      <p:ext uri="{BB962C8B-B14F-4D97-AF65-F5344CB8AC3E}">
+        <p14:creationId xmlns:p14="http://schemas.microsoft.com/office/powerpoint/2010/main" val="2674189831"/>
       </p:ext>
     </p:extLst>
   </p:cSld>

</xml_diff>

<commit_message>
Added icon for Rhythm Doctor
</commit_message>
<xml_diff>
--- a/tepk2924_Custon_Icon.pptx
+++ b/tepk2924_Custon_Icon.pptx
@@ -4,6 +4,9 @@
   <p:sldMasterIdLst>
     <p:sldMasterId id="2147483648" r:id="rId1"/>
   </p:sldMasterIdLst>
+  <p:notesMasterIdLst>
+    <p:notesMasterId r:id="rId6"/>
+  </p:notesMasterIdLst>
   <p:sldIdLst>
     <p:sldId id="256" r:id="rId2"/>
     <p:sldId id="258" r:id="rId3"/>
@@ -125,6 +128,439 @@
     </p:extLst>
   </p:cmAuthor>
 </p:cmAuthorLst>
+</file>
+
+<file path=ppt/notesMasters/notesMaster1.xml><?xml version="1.0" encoding="utf-8"?>
+<p:notesMaster xmlns:a="http://schemas.openxmlformats.org/drawingml/2006/main" xmlns:r="http://schemas.openxmlformats.org/officeDocument/2006/relationships" xmlns:p="http://schemas.openxmlformats.org/presentationml/2006/main">
+  <p:cSld>
+    <p:bg>
+      <p:bgRef idx="1001">
+        <a:schemeClr val="bg1"/>
+      </p:bgRef>
+    </p:bg>
+    <p:spTree>
+      <p:nvGrpSpPr>
+        <p:cNvPr id="1" name=""/>
+        <p:cNvGrpSpPr/>
+        <p:nvPr/>
+      </p:nvGrpSpPr>
+      <p:grpSpPr>
+        <a:xfrm>
+          <a:off x="0" y="0"/>
+          <a:ext cx="0" cy="0"/>
+          <a:chOff x="0" y="0"/>
+          <a:chExt cx="0" cy="0"/>
+        </a:xfrm>
+      </p:grpSpPr>
+      <p:sp>
+        <p:nvSpPr>
+          <p:cNvPr id="2" name="머리글 개체 틀 1"/>
+          <p:cNvSpPr>
+            <a:spLocks noGrp="1"/>
+          </p:cNvSpPr>
+          <p:nvPr>
+            <p:ph type="hdr" sz="quarter"/>
+          </p:nvPr>
+        </p:nvSpPr>
+        <p:spPr>
+          <a:xfrm>
+            <a:off x="0" y="0"/>
+            <a:ext cx="2971800" cy="458788"/>
+          </a:xfrm>
+          <a:prstGeom prst="rect">
+            <a:avLst/>
+          </a:prstGeom>
+        </p:spPr>
+        <p:txBody>
+          <a:bodyPr vert="horz" lIns="91440" tIns="45720" rIns="91440" bIns="45720" rtlCol="0"/>
+          <a:lstStyle>
+            <a:lvl1pPr algn="l">
+              <a:defRPr sz="1200"/>
+            </a:lvl1pPr>
+          </a:lstStyle>
+          <a:p>
+            <a:endParaRPr lang="ko-KR" altLang="en-US"/>
+          </a:p>
+        </p:txBody>
+      </p:sp>
+      <p:sp>
+        <p:nvSpPr>
+          <p:cNvPr id="3" name="날짜 개체 틀 2"/>
+          <p:cNvSpPr>
+            <a:spLocks noGrp="1"/>
+          </p:cNvSpPr>
+          <p:nvPr>
+            <p:ph type="dt" idx="1"/>
+          </p:nvPr>
+        </p:nvSpPr>
+        <p:spPr>
+          <a:xfrm>
+            <a:off x="3884613" y="0"/>
+            <a:ext cx="2971800" cy="458788"/>
+          </a:xfrm>
+          <a:prstGeom prst="rect">
+            <a:avLst/>
+          </a:prstGeom>
+        </p:spPr>
+        <p:txBody>
+          <a:bodyPr vert="horz" lIns="91440" tIns="45720" rIns="91440" bIns="45720" rtlCol="0"/>
+          <a:lstStyle>
+            <a:lvl1pPr algn="r">
+              <a:defRPr sz="1200"/>
+            </a:lvl1pPr>
+          </a:lstStyle>
+          <a:p>
+            <a:fld id="{10460FAE-A4BB-46CF-AB3F-8A65ECE16F8C}" type="datetimeFigureOut">
+              <a:rPr lang="ko-KR" altLang="en-US" smtClean="0"/>
+              <a:t>2024-08-05</a:t>
+            </a:fld>
+            <a:endParaRPr lang="ko-KR" altLang="en-US"/>
+          </a:p>
+        </p:txBody>
+      </p:sp>
+      <p:sp>
+        <p:nvSpPr>
+          <p:cNvPr id="4" name="슬라이드 이미지 개체 틀 3"/>
+          <p:cNvSpPr>
+            <a:spLocks noGrp="1" noRot="1" noChangeAspect="1"/>
+          </p:cNvSpPr>
+          <p:nvPr>
+            <p:ph type="sldImg" idx="2"/>
+          </p:nvPr>
+        </p:nvSpPr>
+        <p:spPr>
+          <a:xfrm>
+            <a:off x="685800" y="1143000"/>
+            <a:ext cx="5486400" cy="3086100"/>
+          </a:xfrm>
+          <a:prstGeom prst="rect">
+            <a:avLst/>
+          </a:prstGeom>
+          <a:noFill/>
+          <a:ln w="12700">
+            <a:solidFill>
+              <a:prstClr val="black"/>
+            </a:solidFill>
+          </a:ln>
+        </p:spPr>
+        <p:txBody>
+          <a:bodyPr vert="horz" lIns="91440" tIns="45720" rIns="91440" bIns="45720" rtlCol="0" anchor="ctr"/>
+          <a:lstStyle/>
+          <a:p>
+            <a:endParaRPr lang="ko-KR" altLang="en-US"/>
+          </a:p>
+        </p:txBody>
+      </p:sp>
+      <p:sp>
+        <p:nvSpPr>
+          <p:cNvPr id="5" name="슬라이드 노트 개체 틀 4"/>
+          <p:cNvSpPr>
+            <a:spLocks noGrp="1"/>
+          </p:cNvSpPr>
+          <p:nvPr>
+            <p:ph type="body" sz="quarter" idx="3"/>
+          </p:nvPr>
+        </p:nvSpPr>
+        <p:spPr>
+          <a:xfrm>
+            <a:off x="685800" y="4400550"/>
+            <a:ext cx="5486400" cy="3600450"/>
+          </a:xfrm>
+          <a:prstGeom prst="rect">
+            <a:avLst/>
+          </a:prstGeom>
+        </p:spPr>
+        <p:txBody>
+          <a:bodyPr vert="horz" lIns="91440" tIns="45720" rIns="91440" bIns="45720" rtlCol="0"/>
+          <a:lstStyle/>
+          <a:p>
+            <a:pPr lvl="0"/>
+            <a:r>
+              <a:rPr lang="ko-KR" altLang="en-US"/>
+              <a:t>마스터 텍스트 스타일을 편집하려면 클릭</a:t>
+            </a:r>
+          </a:p>
+          <a:p>
+            <a:pPr lvl="1"/>
+            <a:r>
+              <a:rPr lang="ko-KR" altLang="en-US"/>
+              <a:t>두 번째 수준</a:t>
+            </a:r>
+          </a:p>
+          <a:p>
+            <a:pPr lvl="2"/>
+            <a:r>
+              <a:rPr lang="ko-KR" altLang="en-US"/>
+              <a:t>세 번째 수준</a:t>
+            </a:r>
+          </a:p>
+          <a:p>
+            <a:pPr lvl="3"/>
+            <a:r>
+              <a:rPr lang="ko-KR" altLang="en-US"/>
+              <a:t>네 번째 수준</a:t>
+            </a:r>
+          </a:p>
+          <a:p>
+            <a:pPr lvl="4"/>
+            <a:r>
+              <a:rPr lang="ko-KR" altLang="en-US"/>
+              <a:t>다섯 번째 수준</a:t>
+            </a:r>
+          </a:p>
+        </p:txBody>
+      </p:sp>
+      <p:sp>
+        <p:nvSpPr>
+          <p:cNvPr id="6" name="바닥글 개체 틀 5"/>
+          <p:cNvSpPr>
+            <a:spLocks noGrp="1"/>
+          </p:cNvSpPr>
+          <p:nvPr>
+            <p:ph type="ftr" sz="quarter" idx="4"/>
+          </p:nvPr>
+        </p:nvSpPr>
+        <p:spPr>
+          <a:xfrm>
+            <a:off x="0" y="8685213"/>
+            <a:ext cx="2971800" cy="458787"/>
+          </a:xfrm>
+          <a:prstGeom prst="rect">
+            <a:avLst/>
+          </a:prstGeom>
+        </p:spPr>
+        <p:txBody>
+          <a:bodyPr vert="horz" lIns="91440" tIns="45720" rIns="91440" bIns="45720" rtlCol="0" anchor="b"/>
+          <a:lstStyle>
+            <a:lvl1pPr algn="l">
+              <a:defRPr sz="1200"/>
+            </a:lvl1pPr>
+          </a:lstStyle>
+          <a:p>
+            <a:endParaRPr lang="ko-KR" altLang="en-US"/>
+          </a:p>
+        </p:txBody>
+      </p:sp>
+      <p:sp>
+        <p:nvSpPr>
+          <p:cNvPr id="7" name="슬라이드 번호 개체 틀 6"/>
+          <p:cNvSpPr>
+            <a:spLocks noGrp="1"/>
+          </p:cNvSpPr>
+          <p:nvPr>
+            <p:ph type="sldNum" sz="quarter" idx="5"/>
+          </p:nvPr>
+        </p:nvSpPr>
+        <p:spPr>
+          <a:xfrm>
+            <a:off x="3884613" y="8685213"/>
+            <a:ext cx="2971800" cy="458787"/>
+          </a:xfrm>
+          <a:prstGeom prst="rect">
+            <a:avLst/>
+          </a:prstGeom>
+        </p:spPr>
+        <p:txBody>
+          <a:bodyPr vert="horz" lIns="91440" tIns="45720" rIns="91440" bIns="45720" rtlCol="0" anchor="b"/>
+          <a:lstStyle>
+            <a:lvl1pPr algn="r">
+              <a:defRPr sz="1200"/>
+            </a:lvl1pPr>
+          </a:lstStyle>
+          <a:p>
+            <a:fld id="{B282231C-E566-484F-9BE2-AB6DE9DFE434}" type="slidenum">
+              <a:rPr lang="ko-KR" altLang="en-US" smtClean="0"/>
+              <a:t>‹#›</a:t>
+            </a:fld>
+            <a:endParaRPr lang="ko-KR" altLang="en-US"/>
+          </a:p>
+        </p:txBody>
+      </p:sp>
+    </p:spTree>
+    <p:extLst>
+      <p:ext uri="{BB962C8B-B14F-4D97-AF65-F5344CB8AC3E}">
+        <p14:creationId xmlns:p14="http://schemas.microsoft.com/office/powerpoint/2010/main" val="2031469743"/>
+      </p:ext>
+    </p:extLst>
+  </p:cSld>
+  <p:clrMap bg1="lt1" tx1="dk1" bg2="lt2" tx2="dk2" accent1="accent1" accent2="accent2" accent3="accent3" accent4="accent4" accent5="accent5" accent6="accent6" hlink="hlink" folHlink="folHlink"/>
+  <p:notesStyle>
+    <a:lvl1pPr marL="0" algn="l" defTabSz="914400" rtl="0" eaLnBrk="1" latinLnBrk="1" hangingPunct="1">
+      <a:defRPr sz="1200" kern="1200">
+        <a:solidFill>
+          <a:schemeClr val="tx1"/>
+        </a:solidFill>
+        <a:latin typeface="+mn-lt"/>
+        <a:ea typeface="+mn-ea"/>
+        <a:cs typeface="+mn-cs"/>
+      </a:defRPr>
+    </a:lvl1pPr>
+    <a:lvl2pPr marL="457200" algn="l" defTabSz="914400" rtl="0" eaLnBrk="1" latinLnBrk="1" hangingPunct="1">
+      <a:defRPr sz="1200" kern="1200">
+        <a:solidFill>
+          <a:schemeClr val="tx1"/>
+        </a:solidFill>
+        <a:latin typeface="+mn-lt"/>
+        <a:ea typeface="+mn-ea"/>
+        <a:cs typeface="+mn-cs"/>
+      </a:defRPr>
+    </a:lvl2pPr>
+    <a:lvl3pPr marL="914400" algn="l" defTabSz="914400" rtl="0" eaLnBrk="1" latinLnBrk="1" hangingPunct="1">
+      <a:defRPr sz="1200" kern="1200">
+        <a:solidFill>
+          <a:schemeClr val="tx1"/>
+        </a:solidFill>
+        <a:latin typeface="+mn-lt"/>
+        <a:ea typeface="+mn-ea"/>
+        <a:cs typeface="+mn-cs"/>
+      </a:defRPr>
+    </a:lvl3pPr>
+    <a:lvl4pPr marL="1371600" algn="l" defTabSz="914400" rtl="0" eaLnBrk="1" latinLnBrk="1" hangingPunct="1">
+      <a:defRPr sz="1200" kern="1200">
+        <a:solidFill>
+          <a:schemeClr val="tx1"/>
+        </a:solidFill>
+        <a:latin typeface="+mn-lt"/>
+        <a:ea typeface="+mn-ea"/>
+        <a:cs typeface="+mn-cs"/>
+      </a:defRPr>
+    </a:lvl4pPr>
+    <a:lvl5pPr marL="1828800" algn="l" defTabSz="914400" rtl="0" eaLnBrk="1" latinLnBrk="1" hangingPunct="1">
+      <a:defRPr sz="1200" kern="1200">
+        <a:solidFill>
+          <a:schemeClr val="tx1"/>
+        </a:solidFill>
+        <a:latin typeface="+mn-lt"/>
+        <a:ea typeface="+mn-ea"/>
+        <a:cs typeface="+mn-cs"/>
+      </a:defRPr>
+    </a:lvl5pPr>
+    <a:lvl6pPr marL="2286000" algn="l" defTabSz="914400" rtl="0" eaLnBrk="1" latinLnBrk="1" hangingPunct="1">
+      <a:defRPr sz="1200" kern="1200">
+        <a:solidFill>
+          <a:schemeClr val="tx1"/>
+        </a:solidFill>
+        <a:latin typeface="+mn-lt"/>
+        <a:ea typeface="+mn-ea"/>
+        <a:cs typeface="+mn-cs"/>
+      </a:defRPr>
+    </a:lvl6pPr>
+    <a:lvl7pPr marL="2743200" algn="l" defTabSz="914400" rtl="0" eaLnBrk="1" latinLnBrk="1" hangingPunct="1">
+      <a:defRPr sz="1200" kern="1200">
+        <a:solidFill>
+          <a:schemeClr val="tx1"/>
+        </a:solidFill>
+        <a:latin typeface="+mn-lt"/>
+        <a:ea typeface="+mn-ea"/>
+        <a:cs typeface="+mn-cs"/>
+      </a:defRPr>
+    </a:lvl7pPr>
+    <a:lvl8pPr marL="3200400" algn="l" defTabSz="914400" rtl="0" eaLnBrk="1" latinLnBrk="1" hangingPunct="1">
+      <a:defRPr sz="1200" kern="1200">
+        <a:solidFill>
+          <a:schemeClr val="tx1"/>
+        </a:solidFill>
+        <a:latin typeface="+mn-lt"/>
+        <a:ea typeface="+mn-ea"/>
+        <a:cs typeface="+mn-cs"/>
+      </a:defRPr>
+    </a:lvl8pPr>
+    <a:lvl9pPr marL="3657600" algn="l" defTabSz="914400" rtl="0" eaLnBrk="1" latinLnBrk="1" hangingPunct="1">
+      <a:defRPr sz="1200" kern="1200">
+        <a:solidFill>
+          <a:schemeClr val="tx1"/>
+        </a:solidFill>
+        <a:latin typeface="+mn-lt"/>
+        <a:ea typeface="+mn-ea"/>
+        <a:cs typeface="+mn-cs"/>
+      </a:defRPr>
+    </a:lvl9pPr>
+  </p:notesStyle>
+</p:notesMaster>
+</file>
+
+<file path=ppt/notesSlides/notesSlide1.xml><?xml version="1.0" encoding="utf-8"?>
+<p:notes xmlns:a="http://schemas.openxmlformats.org/drawingml/2006/main" xmlns:r="http://schemas.openxmlformats.org/officeDocument/2006/relationships" xmlns:p="http://schemas.openxmlformats.org/presentationml/2006/main">
+  <p:cSld>
+    <p:spTree>
+      <p:nvGrpSpPr>
+        <p:cNvPr id="1" name=""/>
+        <p:cNvGrpSpPr/>
+        <p:nvPr/>
+      </p:nvGrpSpPr>
+      <p:grpSpPr>
+        <a:xfrm>
+          <a:off x="0" y="0"/>
+          <a:ext cx="0" cy="0"/>
+          <a:chOff x="0" y="0"/>
+          <a:chExt cx="0" cy="0"/>
+        </a:xfrm>
+      </p:grpSpPr>
+      <p:sp>
+        <p:nvSpPr>
+          <p:cNvPr id="2" name="슬라이드 이미지 개체 틀 1"/>
+          <p:cNvSpPr>
+            <a:spLocks noGrp="1" noRot="1" noChangeAspect="1"/>
+          </p:cNvSpPr>
+          <p:nvPr>
+            <p:ph type="sldImg"/>
+          </p:nvPr>
+        </p:nvSpPr>
+        <p:spPr/>
+      </p:sp>
+      <p:sp>
+        <p:nvSpPr>
+          <p:cNvPr id="3" name="슬라이드 노트 개체 틀 2"/>
+          <p:cNvSpPr>
+            <a:spLocks noGrp="1"/>
+          </p:cNvSpPr>
+          <p:nvPr>
+            <p:ph type="body" idx="1"/>
+          </p:nvPr>
+        </p:nvSpPr>
+        <p:spPr/>
+        <p:txBody>
+          <a:bodyPr/>
+          <a:lstStyle/>
+          <a:p>
+            <a:endParaRPr lang="ko-KR" altLang="en-US" dirty="0"/>
+          </a:p>
+        </p:txBody>
+      </p:sp>
+      <p:sp>
+        <p:nvSpPr>
+          <p:cNvPr id="4" name="슬라이드 번호 개체 틀 3"/>
+          <p:cNvSpPr>
+            <a:spLocks noGrp="1"/>
+          </p:cNvSpPr>
+          <p:nvPr>
+            <p:ph type="sldNum" sz="quarter" idx="5"/>
+          </p:nvPr>
+        </p:nvSpPr>
+        <p:spPr/>
+        <p:txBody>
+          <a:bodyPr/>
+          <a:lstStyle/>
+          <a:p>
+            <a:fld id="{B282231C-E566-484F-9BE2-AB6DE9DFE434}" type="slidenum">
+              <a:rPr lang="ko-KR" altLang="en-US" smtClean="0"/>
+              <a:t>2</a:t>
+            </a:fld>
+            <a:endParaRPr lang="ko-KR" altLang="en-US"/>
+          </a:p>
+        </p:txBody>
+      </p:sp>
+    </p:spTree>
+    <p:extLst>
+      <p:ext uri="{BB962C8B-B14F-4D97-AF65-F5344CB8AC3E}">
+        <p14:creationId xmlns:p14="http://schemas.microsoft.com/office/powerpoint/2010/main" val="1090409588"/>
+      </p:ext>
+    </p:extLst>
+  </p:cSld>
+  <p:clrMapOvr>
+    <a:masterClrMapping/>
+  </p:clrMapOvr>
+</p:notes>
 </file>
 
 <file path=ppt/slideLayouts/slideLayout1.xml><?xml version="1.0" encoding="utf-8"?>
@@ -20681,6 +21117,2645 @@
           </p:txBody>
         </p:sp>
       </p:grpSp>
+      <p:grpSp>
+        <p:nvGrpSpPr>
+          <p:cNvPr id="82" name="그룹 81">
+            <a:extLst>
+              <a:ext uri="{FF2B5EF4-FFF2-40B4-BE49-F238E27FC236}">
+                <a16:creationId xmlns:a16="http://schemas.microsoft.com/office/drawing/2014/main" id="{39509EDE-7BC2-2DAC-59DF-EC5BA8B36478}"/>
+              </a:ext>
+            </a:extLst>
+          </p:cNvPr>
+          <p:cNvGrpSpPr/>
+          <p:nvPr/>
+        </p:nvGrpSpPr>
+        <p:grpSpPr>
+          <a:xfrm>
+            <a:off x="2220269" y="222475"/>
+            <a:ext cx="1439400" cy="1440621"/>
+            <a:chOff x="2496616" y="2515055"/>
+            <a:chExt cx="1439400" cy="1440621"/>
+          </a:xfrm>
+        </p:grpSpPr>
+        <p:sp>
+          <p:nvSpPr>
+            <p:cNvPr id="3" name="자유형: 도형 2">
+              <a:extLst>
+                <a:ext uri="{FF2B5EF4-FFF2-40B4-BE49-F238E27FC236}">
+                  <a16:creationId xmlns:a16="http://schemas.microsoft.com/office/drawing/2014/main" id="{266BA83A-9AD4-A739-AA29-FFD9EAC9E8F4}"/>
+                </a:ext>
+              </a:extLst>
+            </p:cNvPr>
+            <p:cNvSpPr/>
+            <p:nvPr/>
+          </p:nvSpPr>
+          <p:spPr>
+            <a:xfrm>
+              <a:off x="2496616" y="2515055"/>
+              <a:ext cx="1439400" cy="1440000"/>
+            </a:xfrm>
+            <a:custGeom>
+              <a:avLst/>
+              <a:gdLst>
+                <a:gd name="connsiteX0" fmla="*/ 110736 w 1439400"/>
+                <a:gd name="connsiteY0" fmla="*/ 0 h 1440000"/>
+                <a:gd name="connsiteX1" fmla="*/ 1329264 w 1439400"/>
+                <a:gd name="connsiteY1" fmla="*/ 0 h 1440000"/>
+                <a:gd name="connsiteX2" fmla="*/ 1439400 w 1439400"/>
+                <a:gd name="connsiteY2" fmla="*/ 110136 h 1440000"/>
+                <a:gd name="connsiteX3" fmla="*/ 1439400 w 1439400"/>
+                <a:gd name="connsiteY3" fmla="*/ 817802 h 1440000"/>
+                <a:gd name="connsiteX4" fmla="*/ 1438778 w 1439400"/>
+                <a:gd name="connsiteY4" fmla="*/ 817218 h 1440000"/>
+                <a:gd name="connsiteX5" fmla="*/ 1438778 w 1439400"/>
+                <a:gd name="connsiteY5" fmla="*/ 854713 h 1440000"/>
+                <a:gd name="connsiteX6" fmla="*/ 1331858 w 1439400"/>
+                <a:gd name="connsiteY6" fmla="*/ 746749 h 1440000"/>
+                <a:gd name="connsiteX7" fmla="*/ 1331200 w 1439400"/>
+                <a:gd name="connsiteY7" fmla="*/ 746749 h 1440000"/>
+                <a:gd name="connsiteX8" fmla="*/ 1331200 w 1439400"/>
+                <a:gd name="connsiteY8" fmla="*/ 594903 h 1440000"/>
+                <a:gd name="connsiteX9" fmla="*/ 1206295 w 1439400"/>
+                <a:gd name="connsiteY9" fmla="*/ 469998 h 1440000"/>
+                <a:gd name="connsiteX10" fmla="*/ 1207008 w 1439400"/>
+                <a:gd name="connsiteY10" fmla="*/ 469284 h 1440000"/>
+                <a:gd name="connsiteX11" fmla="*/ 1205854 w 1439400"/>
+                <a:gd name="connsiteY11" fmla="*/ 468130 h 1440000"/>
+                <a:gd name="connsiteX12" fmla="*/ 1394840 w 1439400"/>
+                <a:gd name="connsiteY12" fmla="*/ 279144 h 1440000"/>
+                <a:gd name="connsiteX13" fmla="*/ 1394840 w 1439400"/>
+                <a:gd name="connsiteY13" fmla="*/ 232100 h 1440000"/>
+                <a:gd name="connsiteX14" fmla="*/ 1364622 w 1439400"/>
+                <a:gd name="connsiteY14" fmla="*/ 201882 h 1440000"/>
+                <a:gd name="connsiteX15" fmla="*/ 1318590 w 1439400"/>
+                <a:gd name="connsiteY15" fmla="*/ 201882 h 1440000"/>
+                <a:gd name="connsiteX16" fmla="*/ 1130756 w 1439400"/>
+                <a:gd name="connsiteY16" fmla="*/ 389716 h 1440000"/>
+                <a:gd name="connsiteX17" fmla="*/ 1031395 w 1439400"/>
+                <a:gd name="connsiteY17" fmla="*/ 290355 h 1440000"/>
+                <a:gd name="connsiteX18" fmla="*/ 824132 w 1439400"/>
+                <a:gd name="connsiteY18" fmla="*/ 290355 h 1440000"/>
+                <a:gd name="connsiteX19" fmla="*/ 821547 w 1439400"/>
+                <a:gd name="connsiteY19" fmla="*/ 292940 h 1440000"/>
+                <a:gd name="connsiteX20" fmla="*/ 712620 w 1439400"/>
+                <a:gd name="connsiteY20" fmla="*/ 184012 h 1440000"/>
+                <a:gd name="connsiteX21" fmla="*/ 640733 w 1439400"/>
+                <a:gd name="connsiteY21" fmla="*/ 184012 h 1440000"/>
+                <a:gd name="connsiteX22" fmla="*/ 606160 w 1439400"/>
+                <a:gd name="connsiteY22" fmla="*/ 218585 h 1440000"/>
+                <a:gd name="connsiteX23" fmla="*/ 606160 w 1439400"/>
+                <a:gd name="connsiteY23" fmla="*/ 265682 h 1440000"/>
+                <a:gd name="connsiteX24" fmla="*/ 627157 w 1439400"/>
+                <a:gd name="connsiteY24" fmla="*/ 286679 h 1440000"/>
+                <a:gd name="connsiteX25" fmla="*/ 356931 w 1439400"/>
+                <a:gd name="connsiteY25" fmla="*/ 556905 h 1440000"/>
+                <a:gd name="connsiteX26" fmla="*/ 356931 w 1439400"/>
+                <a:gd name="connsiteY26" fmla="*/ 695050 h 1440000"/>
+                <a:gd name="connsiteX27" fmla="*/ 403558 w 1439400"/>
+                <a:gd name="connsiteY27" fmla="*/ 741677 h 1440000"/>
+                <a:gd name="connsiteX28" fmla="*/ 272609 w 1439400"/>
+                <a:gd name="connsiteY28" fmla="*/ 872626 h 1440000"/>
+                <a:gd name="connsiteX29" fmla="*/ 272609 w 1439400"/>
+                <a:gd name="connsiteY29" fmla="*/ 1440000 h 1440000"/>
+                <a:gd name="connsiteX30" fmla="*/ 110736 w 1439400"/>
+                <a:gd name="connsiteY30" fmla="*/ 1440000 h 1440000"/>
+                <a:gd name="connsiteX31" fmla="*/ 0 w 1439400"/>
+                <a:gd name="connsiteY31" fmla="*/ 1329264 h 1440000"/>
+                <a:gd name="connsiteX32" fmla="*/ 0 w 1439400"/>
+                <a:gd name="connsiteY32" fmla="*/ 110736 h 1440000"/>
+              </a:gdLst>
+              <a:ahLst/>
+              <a:cxnLst>
+                <a:cxn ang="0">
+                  <a:pos x="connsiteX0" y="connsiteY0"/>
+                </a:cxn>
+                <a:cxn ang="0">
+                  <a:pos x="connsiteX1" y="connsiteY1"/>
+                </a:cxn>
+                <a:cxn ang="0">
+                  <a:pos x="connsiteX2" y="connsiteY2"/>
+                </a:cxn>
+                <a:cxn ang="0">
+                  <a:pos x="connsiteX3" y="connsiteY3"/>
+                </a:cxn>
+                <a:cxn ang="0">
+                  <a:pos x="connsiteX4" y="connsiteY4"/>
+                </a:cxn>
+                <a:cxn ang="0">
+                  <a:pos x="connsiteX5" y="connsiteY5"/>
+                </a:cxn>
+                <a:cxn ang="0">
+                  <a:pos x="connsiteX6" y="connsiteY6"/>
+                </a:cxn>
+                <a:cxn ang="0">
+                  <a:pos x="connsiteX7" y="connsiteY7"/>
+                </a:cxn>
+                <a:cxn ang="0">
+                  <a:pos x="connsiteX8" y="connsiteY8"/>
+                </a:cxn>
+                <a:cxn ang="0">
+                  <a:pos x="connsiteX9" y="connsiteY9"/>
+                </a:cxn>
+                <a:cxn ang="0">
+                  <a:pos x="connsiteX10" y="connsiteY10"/>
+                </a:cxn>
+                <a:cxn ang="0">
+                  <a:pos x="connsiteX11" y="connsiteY11"/>
+                </a:cxn>
+                <a:cxn ang="0">
+                  <a:pos x="connsiteX12" y="connsiteY12"/>
+                </a:cxn>
+                <a:cxn ang="0">
+                  <a:pos x="connsiteX13" y="connsiteY13"/>
+                </a:cxn>
+                <a:cxn ang="0">
+                  <a:pos x="connsiteX14" y="connsiteY14"/>
+                </a:cxn>
+                <a:cxn ang="0">
+                  <a:pos x="connsiteX15" y="connsiteY15"/>
+                </a:cxn>
+                <a:cxn ang="0">
+                  <a:pos x="connsiteX16" y="connsiteY16"/>
+                </a:cxn>
+                <a:cxn ang="0">
+                  <a:pos x="connsiteX17" y="connsiteY17"/>
+                </a:cxn>
+                <a:cxn ang="0">
+                  <a:pos x="connsiteX18" y="connsiteY18"/>
+                </a:cxn>
+                <a:cxn ang="0">
+                  <a:pos x="connsiteX19" y="connsiteY19"/>
+                </a:cxn>
+                <a:cxn ang="0">
+                  <a:pos x="connsiteX20" y="connsiteY20"/>
+                </a:cxn>
+                <a:cxn ang="0">
+                  <a:pos x="connsiteX21" y="connsiteY21"/>
+                </a:cxn>
+                <a:cxn ang="0">
+                  <a:pos x="connsiteX22" y="connsiteY22"/>
+                </a:cxn>
+                <a:cxn ang="0">
+                  <a:pos x="connsiteX23" y="connsiteY23"/>
+                </a:cxn>
+                <a:cxn ang="0">
+                  <a:pos x="connsiteX24" y="connsiteY24"/>
+                </a:cxn>
+                <a:cxn ang="0">
+                  <a:pos x="connsiteX25" y="connsiteY25"/>
+                </a:cxn>
+                <a:cxn ang="0">
+                  <a:pos x="connsiteX26" y="connsiteY26"/>
+                </a:cxn>
+                <a:cxn ang="0">
+                  <a:pos x="connsiteX27" y="connsiteY27"/>
+                </a:cxn>
+                <a:cxn ang="0">
+                  <a:pos x="connsiteX28" y="connsiteY28"/>
+                </a:cxn>
+                <a:cxn ang="0">
+                  <a:pos x="connsiteX29" y="connsiteY29"/>
+                </a:cxn>
+                <a:cxn ang="0">
+                  <a:pos x="connsiteX30" y="connsiteY30"/>
+                </a:cxn>
+                <a:cxn ang="0">
+                  <a:pos x="connsiteX31" y="connsiteY31"/>
+                </a:cxn>
+                <a:cxn ang="0">
+                  <a:pos x="connsiteX32" y="connsiteY32"/>
+                </a:cxn>
+              </a:cxnLst>
+              <a:rect l="l" t="t" r="r" b="b"/>
+              <a:pathLst>
+                <a:path w="1439400" h="1440000">
+                  <a:moveTo>
+                    <a:pt x="110736" y="0"/>
+                  </a:moveTo>
+                  <a:lnTo>
+                    <a:pt x="1329264" y="0"/>
+                  </a:lnTo>
+                  <a:lnTo>
+                    <a:pt x="1439400" y="110136"/>
+                  </a:lnTo>
+                  <a:lnTo>
+                    <a:pt x="1439400" y="817802"/>
+                  </a:lnTo>
+                  <a:lnTo>
+                    <a:pt x="1438778" y="817218"/>
+                  </a:lnTo>
+                  <a:lnTo>
+                    <a:pt x="1438778" y="854713"/>
+                  </a:lnTo>
+                  <a:lnTo>
+                    <a:pt x="1331858" y="746749"/>
+                  </a:lnTo>
+                  <a:lnTo>
+                    <a:pt x="1331200" y="746749"/>
+                  </a:lnTo>
+                  <a:lnTo>
+                    <a:pt x="1331200" y="594903"/>
+                  </a:lnTo>
+                  <a:lnTo>
+                    <a:pt x="1206295" y="469998"/>
+                  </a:lnTo>
+                  <a:lnTo>
+                    <a:pt x="1207008" y="469284"/>
+                  </a:lnTo>
+                  <a:lnTo>
+                    <a:pt x="1205854" y="468130"/>
+                  </a:lnTo>
+                  <a:lnTo>
+                    <a:pt x="1394840" y="279144"/>
+                  </a:lnTo>
+                  <a:lnTo>
+                    <a:pt x="1394840" y="232100"/>
+                  </a:lnTo>
+                  <a:lnTo>
+                    <a:pt x="1364622" y="201882"/>
+                  </a:lnTo>
+                  <a:lnTo>
+                    <a:pt x="1318590" y="201882"/>
+                  </a:lnTo>
+                  <a:lnTo>
+                    <a:pt x="1130756" y="389716"/>
+                  </a:lnTo>
+                  <a:lnTo>
+                    <a:pt x="1031395" y="290355"/>
+                  </a:lnTo>
+                  <a:lnTo>
+                    <a:pt x="824132" y="290355"/>
+                  </a:lnTo>
+                  <a:lnTo>
+                    <a:pt x="821547" y="292940"/>
+                  </a:lnTo>
+                  <a:lnTo>
+                    <a:pt x="712620" y="184012"/>
+                  </a:lnTo>
+                  <a:lnTo>
+                    <a:pt x="640733" y="184012"/>
+                  </a:lnTo>
+                  <a:lnTo>
+                    <a:pt x="606160" y="218585"/>
+                  </a:lnTo>
+                  <a:lnTo>
+                    <a:pt x="606160" y="265682"/>
+                  </a:lnTo>
+                  <a:lnTo>
+                    <a:pt x="627157" y="286679"/>
+                  </a:lnTo>
+                  <a:lnTo>
+                    <a:pt x="356931" y="556905"/>
+                  </a:lnTo>
+                  <a:lnTo>
+                    <a:pt x="356931" y="695050"/>
+                  </a:lnTo>
+                  <a:lnTo>
+                    <a:pt x="403558" y="741677"/>
+                  </a:lnTo>
+                  <a:lnTo>
+                    <a:pt x="272609" y="872626"/>
+                  </a:lnTo>
+                  <a:lnTo>
+                    <a:pt x="272609" y="1440000"/>
+                  </a:lnTo>
+                  <a:lnTo>
+                    <a:pt x="110736" y="1440000"/>
+                  </a:lnTo>
+                  <a:lnTo>
+                    <a:pt x="0" y="1329264"/>
+                  </a:lnTo>
+                  <a:lnTo>
+                    <a:pt x="0" y="110736"/>
+                  </a:lnTo>
+                  <a:close/>
+                </a:path>
+              </a:pathLst>
+            </a:custGeom>
+            <a:solidFill>
+              <a:srgbClr val="24A8E6"/>
+            </a:solidFill>
+            <a:ln>
+              <a:noFill/>
+            </a:ln>
+          </p:spPr>
+          <p:style>
+            <a:lnRef idx="2">
+              <a:schemeClr val="accent1">
+                <a:shade val="15000"/>
+              </a:schemeClr>
+            </a:lnRef>
+            <a:fillRef idx="1">
+              <a:schemeClr val="accent1"/>
+            </a:fillRef>
+            <a:effectRef idx="0">
+              <a:schemeClr val="accent1"/>
+            </a:effectRef>
+            <a:fontRef idx="minor">
+              <a:schemeClr val="lt1"/>
+            </a:fontRef>
+          </p:style>
+          <p:txBody>
+            <a:bodyPr wrap="square" rtlCol="0" anchor="ctr">
+              <a:noAutofit/>
+            </a:bodyPr>
+            <a:lstStyle/>
+            <a:p>
+              <a:pPr algn="ctr"/>
+              <a:endParaRPr lang="ko-KR" altLang="en-US"/>
+            </a:p>
+          </p:txBody>
+        </p:sp>
+        <p:sp>
+          <p:nvSpPr>
+            <p:cNvPr id="61" name="자유형: 도형 60">
+              <a:extLst>
+                <a:ext uri="{FF2B5EF4-FFF2-40B4-BE49-F238E27FC236}">
+                  <a16:creationId xmlns:a16="http://schemas.microsoft.com/office/drawing/2014/main" id="{5A4CF22B-3A64-0E30-2179-A612770577C9}"/>
+                </a:ext>
+              </a:extLst>
+            </p:cNvPr>
+            <p:cNvSpPr/>
+            <p:nvPr/>
+          </p:nvSpPr>
+          <p:spPr>
+            <a:xfrm rot="2700000">
+              <a:off x="3309977" y="3054304"/>
+              <a:ext cx="337300" cy="405475"/>
+            </a:xfrm>
+            <a:custGeom>
+              <a:avLst/>
+              <a:gdLst>
+                <a:gd name="connsiteX0" fmla="*/ 0 w 337300"/>
+                <a:gd name="connsiteY0" fmla="*/ 150775 h 405475"/>
+                <a:gd name="connsiteX1" fmla="*/ 150775 w 337300"/>
+                <a:gd name="connsiteY1" fmla="*/ 0 h 405475"/>
+                <a:gd name="connsiteX2" fmla="*/ 260396 w 337300"/>
+                <a:gd name="connsiteY2" fmla="*/ 0 h 405475"/>
+                <a:gd name="connsiteX3" fmla="*/ 337300 w 337300"/>
+                <a:gd name="connsiteY3" fmla="*/ 76904 h 405475"/>
+                <a:gd name="connsiteX4" fmla="*/ 337300 w 337300"/>
+                <a:gd name="connsiteY4" fmla="*/ 256237 h 405475"/>
+                <a:gd name="connsiteX5" fmla="*/ 188062 w 337300"/>
+                <a:gd name="connsiteY5" fmla="*/ 405475 h 405475"/>
+                <a:gd name="connsiteX6" fmla="*/ 76904 w 337300"/>
+                <a:gd name="connsiteY6" fmla="*/ 405475 h 405475"/>
+                <a:gd name="connsiteX7" fmla="*/ 0 w 337300"/>
+                <a:gd name="connsiteY7" fmla="*/ 328571 h 405475"/>
+              </a:gdLst>
+              <a:ahLst/>
+              <a:cxnLst>
+                <a:cxn ang="0">
+                  <a:pos x="connsiteX0" y="connsiteY0"/>
+                </a:cxn>
+                <a:cxn ang="0">
+                  <a:pos x="connsiteX1" y="connsiteY1"/>
+                </a:cxn>
+                <a:cxn ang="0">
+                  <a:pos x="connsiteX2" y="connsiteY2"/>
+                </a:cxn>
+                <a:cxn ang="0">
+                  <a:pos x="connsiteX3" y="connsiteY3"/>
+                </a:cxn>
+                <a:cxn ang="0">
+                  <a:pos x="connsiteX4" y="connsiteY4"/>
+                </a:cxn>
+                <a:cxn ang="0">
+                  <a:pos x="connsiteX5" y="connsiteY5"/>
+                </a:cxn>
+                <a:cxn ang="0">
+                  <a:pos x="connsiteX6" y="connsiteY6"/>
+                </a:cxn>
+                <a:cxn ang="0">
+                  <a:pos x="connsiteX7" y="connsiteY7"/>
+                </a:cxn>
+              </a:cxnLst>
+              <a:rect l="l" t="t" r="r" b="b"/>
+              <a:pathLst>
+                <a:path w="337300" h="405475">
+                  <a:moveTo>
+                    <a:pt x="0" y="150775"/>
+                  </a:moveTo>
+                  <a:lnTo>
+                    <a:pt x="150775" y="0"/>
+                  </a:lnTo>
+                  <a:lnTo>
+                    <a:pt x="260396" y="0"/>
+                  </a:lnTo>
+                  <a:lnTo>
+                    <a:pt x="337300" y="76904"/>
+                  </a:lnTo>
+                  <a:lnTo>
+                    <a:pt x="337300" y="256237"/>
+                  </a:lnTo>
+                  <a:lnTo>
+                    <a:pt x="188062" y="405475"/>
+                  </a:lnTo>
+                  <a:lnTo>
+                    <a:pt x="76904" y="405475"/>
+                  </a:lnTo>
+                  <a:lnTo>
+                    <a:pt x="0" y="328571"/>
+                  </a:lnTo>
+                  <a:close/>
+                </a:path>
+              </a:pathLst>
+            </a:custGeom>
+            <a:solidFill>
+              <a:srgbClr val="EB935E"/>
+            </a:solidFill>
+            <a:ln>
+              <a:noFill/>
+            </a:ln>
+          </p:spPr>
+          <p:style>
+            <a:lnRef idx="2">
+              <a:schemeClr val="accent1">
+                <a:shade val="15000"/>
+              </a:schemeClr>
+            </a:lnRef>
+            <a:fillRef idx="1">
+              <a:schemeClr val="accent1"/>
+            </a:fillRef>
+            <a:effectRef idx="0">
+              <a:schemeClr val="accent1"/>
+            </a:effectRef>
+            <a:fontRef idx="minor">
+              <a:schemeClr val="lt1"/>
+            </a:fontRef>
+          </p:style>
+          <p:txBody>
+            <a:bodyPr wrap="square" rtlCol="0" anchor="ctr">
+              <a:noAutofit/>
+            </a:bodyPr>
+            <a:lstStyle/>
+            <a:p>
+              <a:pPr algn="ctr"/>
+              <a:endParaRPr lang="ko-KR" altLang="en-US"/>
+            </a:p>
+          </p:txBody>
+        </p:sp>
+        <p:sp>
+          <p:nvSpPr>
+            <p:cNvPr id="62" name="자유형: 도형 61">
+              <a:extLst>
+                <a:ext uri="{FF2B5EF4-FFF2-40B4-BE49-F238E27FC236}">
+                  <a16:creationId xmlns:a16="http://schemas.microsoft.com/office/drawing/2014/main" id="{9B45C6DC-1AC7-37F6-58F5-2CA8C2D3B249}"/>
+                </a:ext>
+              </a:extLst>
+            </p:cNvPr>
+            <p:cNvSpPr/>
+            <p:nvPr/>
+          </p:nvSpPr>
+          <p:spPr>
+            <a:xfrm>
+              <a:off x="3185347" y="3344181"/>
+              <a:ext cx="586559" cy="313167"/>
+            </a:xfrm>
+            <a:custGeom>
+              <a:avLst/>
+              <a:gdLst>
+                <a:gd name="connsiteX0" fmla="*/ 483329 w 586559"/>
+                <a:gd name="connsiteY0" fmla="*/ 0 h 313167"/>
+                <a:gd name="connsiteX1" fmla="*/ 586559 w 586559"/>
+                <a:gd name="connsiteY1" fmla="*/ 103231 h 313167"/>
+                <a:gd name="connsiteX2" fmla="*/ 586559 w 586559"/>
+                <a:gd name="connsiteY2" fmla="*/ 185803 h 313167"/>
+                <a:gd name="connsiteX3" fmla="*/ 459195 w 586559"/>
+                <a:gd name="connsiteY3" fmla="*/ 313167 h 313167"/>
+                <a:gd name="connsiteX4" fmla="*/ 127364 w 586559"/>
+                <a:gd name="connsiteY4" fmla="*/ 313167 h 313167"/>
+                <a:gd name="connsiteX5" fmla="*/ 0 w 586559"/>
+                <a:gd name="connsiteY5" fmla="*/ 185803 h 313167"/>
+                <a:gd name="connsiteX6" fmla="*/ 0 w 586559"/>
+                <a:gd name="connsiteY6" fmla="*/ 103231 h 313167"/>
+                <a:gd name="connsiteX7" fmla="*/ 53225 w 586559"/>
+                <a:gd name="connsiteY7" fmla="*/ 50006 h 313167"/>
+                <a:gd name="connsiteX8" fmla="*/ 105031 w 586559"/>
+                <a:gd name="connsiteY8" fmla="*/ 50006 h 313167"/>
+                <a:gd name="connsiteX9" fmla="*/ 163649 w 586559"/>
+                <a:gd name="connsiteY9" fmla="*/ 108625 h 313167"/>
+                <a:gd name="connsiteX10" fmla="*/ 374704 w 586559"/>
+                <a:gd name="connsiteY10" fmla="*/ 108625 h 313167"/>
+              </a:gdLst>
+              <a:ahLst/>
+              <a:cxnLst>
+                <a:cxn ang="0">
+                  <a:pos x="connsiteX0" y="connsiteY0"/>
+                </a:cxn>
+                <a:cxn ang="0">
+                  <a:pos x="connsiteX1" y="connsiteY1"/>
+                </a:cxn>
+                <a:cxn ang="0">
+                  <a:pos x="connsiteX2" y="connsiteY2"/>
+                </a:cxn>
+                <a:cxn ang="0">
+                  <a:pos x="connsiteX3" y="connsiteY3"/>
+                </a:cxn>
+                <a:cxn ang="0">
+                  <a:pos x="connsiteX4" y="connsiteY4"/>
+                </a:cxn>
+                <a:cxn ang="0">
+                  <a:pos x="connsiteX5" y="connsiteY5"/>
+                </a:cxn>
+                <a:cxn ang="0">
+                  <a:pos x="connsiteX6" y="connsiteY6"/>
+                </a:cxn>
+                <a:cxn ang="0">
+                  <a:pos x="connsiteX7" y="connsiteY7"/>
+                </a:cxn>
+                <a:cxn ang="0">
+                  <a:pos x="connsiteX8" y="connsiteY8"/>
+                </a:cxn>
+                <a:cxn ang="0">
+                  <a:pos x="connsiteX9" y="connsiteY9"/>
+                </a:cxn>
+                <a:cxn ang="0">
+                  <a:pos x="connsiteX10" y="connsiteY10"/>
+                </a:cxn>
+              </a:cxnLst>
+              <a:rect l="l" t="t" r="r" b="b"/>
+              <a:pathLst>
+                <a:path w="586559" h="313167">
+                  <a:moveTo>
+                    <a:pt x="483329" y="0"/>
+                  </a:moveTo>
+                  <a:lnTo>
+                    <a:pt x="586559" y="103231"/>
+                  </a:lnTo>
+                  <a:lnTo>
+                    <a:pt x="586559" y="185803"/>
+                  </a:lnTo>
+                  <a:lnTo>
+                    <a:pt x="459195" y="313167"/>
+                  </a:lnTo>
+                  <a:lnTo>
+                    <a:pt x="127364" y="313167"/>
+                  </a:lnTo>
+                  <a:lnTo>
+                    <a:pt x="0" y="185803"/>
+                  </a:lnTo>
+                  <a:lnTo>
+                    <a:pt x="0" y="103231"/>
+                  </a:lnTo>
+                  <a:lnTo>
+                    <a:pt x="53225" y="50006"/>
+                  </a:lnTo>
+                  <a:lnTo>
+                    <a:pt x="105031" y="50006"/>
+                  </a:lnTo>
+                  <a:lnTo>
+                    <a:pt x="163649" y="108625"/>
+                  </a:lnTo>
+                  <a:lnTo>
+                    <a:pt x="374704" y="108625"/>
+                  </a:lnTo>
+                  <a:close/>
+                </a:path>
+              </a:pathLst>
+            </a:custGeom>
+            <a:solidFill>
+              <a:srgbClr val="C5181A"/>
+            </a:solidFill>
+            <a:ln>
+              <a:noFill/>
+            </a:ln>
+          </p:spPr>
+          <p:style>
+            <a:lnRef idx="2">
+              <a:schemeClr val="accent1">
+                <a:shade val="15000"/>
+              </a:schemeClr>
+            </a:lnRef>
+            <a:fillRef idx="1">
+              <a:schemeClr val="accent1"/>
+            </a:fillRef>
+            <a:effectRef idx="0">
+              <a:schemeClr val="accent1"/>
+            </a:effectRef>
+            <a:fontRef idx="minor">
+              <a:schemeClr val="lt1"/>
+            </a:fontRef>
+          </p:style>
+          <p:txBody>
+            <a:bodyPr wrap="square" rtlCol="0" anchor="ctr">
+              <a:noAutofit/>
+            </a:bodyPr>
+            <a:lstStyle/>
+            <a:p>
+              <a:pPr algn="ctr"/>
+              <a:endParaRPr lang="ko-KR" altLang="en-US"/>
+            </a:p>
+          </p:txBody>
+        </p:sp>
+        <p:sp>
+          <p:nvSpPr>
+            <p:cNvPr id="63" name="자유형: 도형 62">
+              <a:extLst>
+                <a:ext uri="{FF2B5EF4-FFF2-40B4-BE49-F238E27FC236}">
+                  <a16:creationId xmlns:a16="http://schemas.microsoft.com/office/drawing/2014/main" id="{491A57DD-B64A-43F1-534E-2ACF323FA1BE}"/>
+                </a:ext>
+              </a:extLst>
+            </p:cNvPr>
+            <p:cNvSpPr/>
+            <p:nvPr/>
+          </p:nvSpPr>
+          <p:spPr>
+            <a:xfrm>
+              <a:off x="3105319" y="3599055"/>
+              <a:ext cx="666587" cy="282729"/>
+            </a:xfrm>
+            <a:custGeom>
+              <a:avLst/>
+              <a:gdLst>
+                <a:gd name="connsiteX0" fmla="*/ 36261 w 666587"/>
+                <a:gd name="connsiteY0" fmla="*/ 0 h 282729"/>
+                <a:gd name="connsiteX1" fmla="*/ 99383 w 666587"/>
+                <a:gd name="connsiteY1" fmla="*/ 0 h 282729"/>
+                <a:gd name="connsiteX2" fmla="*/ 207392 w 666587"/>
+                <a:gd name="connsiteY2" fmla="*/ 108009 h 282729"/>
+                <a:gd name="connsiteX3" fmla="*/ 539223 w 666587"/>
+                <a:gd name="connsiteY3" fmla="*/ 108009 h 282729"/>
+                <a:gd name="connsiteX4" fmla="*/ 638779 w 666587"/>
+                <a:gd name="connsiteY4" fmla="*/ 8453 h 282729"/>
+                <a:gd name="connsiteX5" fmla="*/ 666587 w 666587"/>
+                <a:gd name="connsiteY5" fmla="*/ 36261 h 282729"/>
+                <a:gd name="connsiteX6" fmla="*/ 666587 w 666587"/>
+                <a:gd name="connsiteY6" fmla="*/ 180640 h 282729"/>
+                <a:gd name="connsiteX7" fmla="*/ 564498 w 666587"/>
+                <a:gd name="connsiteY7" fmla="*/ 282729 h 282729"/>
+                <a:gd name="connsiteX8" fmla="*/ 102089 w 666587"/>
+                <a:gd name="connsiteY8" fmla="*/ 282729 h 282729"/>
+                <a:gd name="connsiteX9" fmla="*/ 0 w 666587"/>
+                <a:gd name="connsiteY9" fmla="*/ 180640 h 282729"/>
+                <a:gd name="connsiteX10" fmla="*/ 0 w 666587"/>
+                <a:gd name="connsiteY10" fmla="*/ 36261 h 282729"/>
+              </a:gdLst>
+              <a:ahLst/>
+              <a:cxnLst>
+                <a:cxn ang="0">
+                  <a:pos x="connsiteX0" y="connsiteY0"/>
+                </a:cxn>
+                <a:cxn ang="0">
+                  <a:pos x="connsiteX1" y="connsiteY1"/>
+                </a:cxn>
+                <a:cxn ang="0">
+                  <a:pos x="connsiteX2" y="connsiteY2"/>
+                </a:cxn>
+                <a:cxn ang="0">
+                  <a:pos x="connsiteX3" y="connsiteY3"/>
+                </a:cxn>
+                <a:cxn ang="0">
+                  <a:pos x="connsiteX4" y="connsiteY4"/>
+                </a:cxn>
+                <a:cxn ang="0">
+                  <a:pos x="connsiteX5" y="connsiteY5"/>
+                </a:cxn>
+                <a:cxn ang="0">
+                  <a:pos x="connsiteX6" y="connsiteY6"/>
+                </a:cxn>
+                <a:cxn ang="0">
+                  <a:pos x="connsiteX7" y="connsiteY7"/>
+                </a:cxn>
+                <a:cxn ang="0">
+                  <a:pos x="connsiteX8" y="connsiteY8"/>
+                </a:cxn>
+                <a:cxn ang="0">
+                  <a:pos x="connsiteX9" y="connsiteY9"/>
+                </a:cxn>
+                <a:cxn ang="0">
+                  <a:pos x="connsiteX10" y="connsiteY10"/>
+                </a:cxn>
+              </a:cxnLst>
+              <a:rect l="l" t="t" r="r" b="b"/>
+              <a:pathLst>
+                <a:path w="666587" h="282729">
+                  <a:moveTo>
+                    <a:pt x="36261" y="0"/>
+                  </a:moveTo>
+                  <a:lnTo>
+                    <a:pt x="99383" y="0"/>
+                  </a:lnTo>
+                  <a:lnTo>
+                    <a:pt x="207392" y="108009"/>
+                  </a:lnTo>
+                  <a:lnTo>
+                    <a:pt x="539223" y="108009"/>
+                  </a:lnTo>
+                  <a:lnTo>
+                    <a:pt x="638779" y="8453"/>
+                  </a:lnTo>
+                  <a:lnTo>
+                    <a:pt x="666587" y="36261"/>
+                  </a:lnTo>
+                  <a:lnTo>
+                    <a:pt x="666587" y="180640"/>
+                  </a:lnTo>
+                  <a:lnTo>
+                    <a:pt x="564498" y="282729"/>
+                  </a:lnTo>
+                  <a:lnTo>
+                    <a:pt x="102089" y="282729"/>
+                  </a:lnTo>
+                  <a:lnTo>
+                    <a:pt x="0" y="180640"/>
+                  </a:lnTo>
+                  <a:lnTo>
+                    <a:pt x="0" y="36261"/>
+                  </a:lnTo>
+                  <a:close/>
+                </a:path>
+              </a:pathLst>
+            </a:custGeom>
+            <a:solidFill>
+              <a:srgbClr val="C5181A"/>
+            </a:solidFill>
+            <a:ln>
+              <a:noFill/>
+            </a:ln>
+          </p:spPr>
+          <p:style>
+            <a:lnRef idx="2">
+              <a:schemeClr val="accent1">
+                <a:shade val="15000"/>
+              </a:schemeClr>
+            </a:lnRef>
+            <a:fillRef idx="1">
+              <a:schemeClr val="accent1"/>
+            </a:fillRef>
+            <a:effectRef idx="0">
+              <a:schemeClr val="accent1"/>
+            </a:effectRef>
+            <a:fontRef idx="minor">
+              <a:schemeClr val="lt1"/>
+            </a:fontRef>
+          </p:style>
+          <p:txBody>
+            <a:bodyPr wrap="square" rtlCol="0" anchor="ctr">
+              <a:noAutofit/>
+            </a:bodyPr>
+            <a:lstStyle/>
+            <a:p>
+              <a:pPr algn="ctr"/>
+              <a:endParaRPr lang="ko-KR" altLang="en-US"/>
+            </a:p>
+          </p:txBody>
+        </p:sp>
+        <p:sp>
+          <p:nvSpPr>
+            <p:cNvPr id="64" name="자유형: 도형 63">
+              <a:extLst>
+                <a:ext uri="{FF2B5EF4-FFF2-40B4-BE49-F238E27FC236}">
+                  <a16:creationId xmlns:a16="http://schemas.microsoft.com/office/drawing/2014/main" id="{B0101FEC-D1C1-13A8-3F31-815872EFADCB}"/>
+                </a:ext>
+              </a:extLst>
+            </p:cNvPr>
+            <p:cNvSpPr/>
+            <p:nvPr/>
+          </p:nvSpPr>
+          <p:spPr>
+            <a:xfrm>
+              <a:off x="3025459" y="3779134"/>
+              <a:ext cx="184619" cy="175921"/>
+            </a:xfrm>
+            <a:custGeom>
+              <a:avLst/>
+              <a:gdLst>
+                <a:gd name="connsiteX0" fmla="*/ 38585 w 184619"/>
+                <a:gd name="connsiteY0" fmla="*/ 0 h 175921"/>
+                <a:gd name="connsiteX1" fmla="*/ 184619 w 184619"/>
+                <a:gd name="connsiteY1" fmla="*/ 146034 h 175921"/>
+                <a:gd name="connsiteX2" fmla="*/ 184619 w 184619"/>
+                <a:gd name="connsiteY2" fmla="*/ 175921 h 175921"/>
+                <a:gd name="connsiteX3" fmla="*/ 0 w 184619"/>
+                <a:gd name="connsiteY3" fmla="*/ 175921 h 175921"/>
+                <a:gd name="connsiteX4" fmla="*/ 0 w 184619"/>
+                <a:gd name="connsiteY4" fmla="*/ 38585 h 175921"/>
+              </a:gdLst>
+              <a:ahLst/>
+              <a:cxnLst>
+                <a:cxn ang="0">
+                  <a:pos x="connsiteX0" y="connsiteY0"/>
+                </a:cxn>
+                <a:cxn ang="0">
+                  <a:pos x="connsiteX1" y="connsiteY1"/>
+                </a:cxn>
+                <a:cxn ang="0">
+                  <a:pos x="connsiteX2" y="connsiteY2"/>
+                </a:cxn>
+                <a:cxn ang="0">
+                  <a:pos x="connsiteX3" y="connsiteY3"/>
+                </a:cxn>
+                <a:cxn ang="0">
+                  <a:pos x="connsiteX4" y="connsiteY4"/>
+                </a:cxn>
+              </a:cxnLst>
+              <a:rect l="l" t="t" r="r" b="b"/>
+              <a:pathLst>
+                <a:path w="184619" h="175921">
+                  <a:moveTo>
+                    <a:pt x="38585" y="0"/>
+                  </a:moveTo>
+                  <a:lnTo>
+                    <a:pt x="184619" y="146034"/>
+                  </a:lnTo>
+                  <a:lnTo>
+                    <a:pt x="184619" y="175921"/>
+                  </a:lnTo>
+                  <a:lnTo>
+                    <a:pt x="0" y="175921"/>
+                  </a:lnTo>
+                  <a:lnTo>
+                    <a:pt x="0" y="38585"/>
+                  </a:lnTo>
+                  <a:close/>
+                </a:path>
+              </a:pathLst>
+            </a:custGeom>
+            <a:solidFill>
+              <a:srgbClr val="C5181A"/>
+            </a:solidFill>
+            <a:ln>
+              <a:noFill/>
+            </a:ln>
+          </p:spPr>
+          <p:style>
+            <a:lnRef idx="2">
+              <a:schemeClr val="accent1">
+                <a:shade val="15000"/>
+              </a:schemeClr>
+            </a:lnRef>
+            <a:fillRef idx="1">
+              <a:schemeClr val="accent1"/>
+            </a:fillRef>
+            <a:effectRef idx="0">
+              <a:schemeClr val="accent1"/>
+            </a:effectRef>
+            <a:fontRef idx="minor">
+              <a:schemeClr val="lt1"/>
+            </a:fontRef>
+          </p:style>
+          <p:txBody>
+            <a:bodyPr wrap="square" rtlCol="0" anchor="ctr">
+              <a:noAutofit/>
+            </a:bodyPr>
+            <a:lstStyle/>
+            <a:p>
+              <a:pPr algn="ctr"/>
+              <a:endParaRPr lang="ko-KR" altLang="en-US"/>
+            </a:p>
+          </p:txBody>
+        </p:sp>
+        <p:sp>
+          <p:nvSpPr>
+            <p:cNvPr id="65" name="자유형: 도형 64">
+              <a:extLst>
+                <a:ext uri="{FF2B5EF4-FFF2-40B4-BE49-F238E27FC236}">
+                  <a16:creationId xmlns:a16="http://schemas.microsoft.com/office/drawing/2014/main" id="{E9E20362-5BD0-4902-B292-A9EF97811EAB}"/>
+                </a:ext>
+              </a:extLst>
+            </p:cNvPr>
+            <p:cNvSpPr/>
+            <p:nvPr/>
+          </p:nvSpPr>
+          <p:spPr>
+            <a:xfrm>
+              <a:off x="3254325" y="3823785"/>
+              <a:ext cx="558967" cy="130324"/>
+            </a:xfrm>
+            <a:custGeom>
+              <a:avLst/>
+              <a:gdLst>
+                <a:gd name="connsiteX0" fmla="*/ 520382 w 558967"/>
+                <a:gd name="connsiteY0" fmla="*/ 0 h 130324"/>
+                <a:gd name="connsiteX1" fmla="*/ 558967 w 558967"/>
+                <a:gd name="connsiteY1" fmla="*/ 38585 h 130324"/>
+                <a:gd name="connsiteX2" fmla="*/ 558967 w 558967"/>
+                <a:gd name="connsiteY2" fmla="*/ 130324 h 130324"/>
+                <a:gd name="connsiteX3" fmla="*/ 0 w 558967"/>
+                <a:gd name="connsiteY3" fmla="*/ 130324 h 130324"/>
+                <a:gd name="connsiteX4" fmla="*/ 0 w 558967"/>
+                <a:gd name="connsiteY4" fmla="*/ 87961 h 130324"/>
+                <a:gd name="connsiteX5" fmla="*/ 432421 w 558967"/>
+                <a:gd name="connsiteY5" fmla="*/ 87961 h 130324"/>
+              </a:gdLst>
+              <a:ahLst/>
+              <a:cxnLst>
+                <a:cxn ang="0">
+                  <a:pos x="connsiteX0" y="connsiteY0"/>
+                </a:cxn>
+                <a:cxn ang="0">
+                  <a:pos x="connsiteX1" y="connsiteY1"/>
+                </a:cxn>
+                <a:cxn ang="0">
+                  <a:pos x="connsiteX2" y="connsiteY2"/>
+                </a:cxn>
+                <a:cxn ang="0">
+                  <a:pos x="connsiteX3" y="connsiteY3"/>
+                </a:cxn>
+                <a:cxn ang="0">
+                  <a:pos x="connsiteX4" y="connsiteY4"/>
+                </a:cxn>
+                <a:cxn ang="0">
+                  <a:pos x="connsiteX5" y="connsiteY5"/>
+                </a:cxn>
+              </a:cxnLst>
+              <a:rect l="l" t="t" r="r" b="b"/>
+              <a:pathLst>
+                <a:path w="558967" h="130324">
+                  <a:moveTo>
+                    <a:pt x="520382" y="0"/>
+                  </a:moveTo>
+                  <a:lnTo>
+                    <a:pt x="558967" y="38585"/>
+                  </a:lnTo>
+                  <a:lnTo>
+                    <a:pt x="558967" y="130324"/>
+                  </a:lnTo>
+                  <a:lnTo>
+                    <a:pt x="0" y="130324"/>
+                  </a:lnTo>
+                  <a:lnTo>
+                    <a:pt x="0" y="87961"/>
+                  </a:lnTo>
+                  <a:lnTo>
+                    <a:pt x="432421" y="87961"/>
+                  </a:lnTo>
+                  <a:close/>
+                </a:path>
+              </a:pathLst>
+            </a:custGeom>
+            <a:solidFill>
+              <a:srgbClr val="C5181A"/>
+            </a:solidFill>
+            <a:ln>
+              <a:noFill/>
+            </a:ln>
+          </p:spPr>
+          <p:style>
+            <a:lnRef idx="2">
+              <a:schemeClr val="accent1">
+                <a:shade val="15000"/>
+              </a:schemeClr>
+            </a:lnRef>
+            <a:fillRef idx="1">
+              <a:schemeClr val="accent1"/>
+            </a:fillRef>
+            <a:effectRef idx="0">
+              <a:schemeClr val="accent1"/>
+            </a:effectRef>
+            <a:fontRef idx="minor">
+              <a:schemeClr val="lt1"/>
+            </a:fontRef>
+          </p:style>
+          <p:txBody>
+            <a:bodyPr wrap="square" rtlCol="0" anchor="ctr">
+              <a:noAutofit/>
+            </a:bodyPr>
+            <a:lstStyle/>
+            <a:p>
+              <a:pPr algn="ctr"/>
+              <a:endParaRPr lang="ko-KR" altLang="en-US"/>
+            </a:p>
+          </p:txBody>
+        </p:sp>
+        <p:sp>
+          <p:nvSpPr>
+            <p:cNvPr id="66" name="팔각형 65">
+              <a:extLst>
+                <a:ext uri="{FF2B5EF4-FFF2-40B4-BE49-F238E27FC236}">
+                  <a16:creationId xmlns:a16="http://schemas.microsoft.com/office/drawing/2014/main" id="{5CDAA93D-10C2-20F8-F28E-F0AF6D3735CD}"/>
+                </a:ext>
+              </a:extLst>
+            </p:cNvPr>
+            <p:cNvSpPr/>
+            <p:nvPr/>
+          </p:nvSpPr>
+          <p:spPr>
+            <a:xfrm>
+              <a:off x="3383651" y="3146795"/>
+              <a:ext cx="264318" cy="61200"/>
+            </a:xfrm>
+            <a:prstGeom prst="octagon">
+              <a:avLst/>
+            </a:prstGeom>
+            <a:solidFill>
+              <a:schemeClr val="tx1"/>
+            </a:solidFill>
+            <a:ln>
+              <a:noFill/>
+            </a:ln>
+          </p:spPr>
+          <p:style>
+            <a:lnRef idx="2">
+              <a:schemeClr val="accent1">
+                <a:shade val="15000"/>
+              </a:schemeClr>
+            </a:lnRef>
+            <a:fillRef idx="1">
+              <a:schemeClr val="accent1"/>
+            </a:fillRef>
+            <a:effectRef idx="0">
+              <a:schemeClr val="accent1"/>
+            </a:effectRef>
+            <a:fontRef idx="minor">
+              <a:schemeClr val="lt1"/>
+            </a:fontRef>
+          </p:style>
+          <p:txBody>
+            <a:bodyPr rtlCol="0" anchor="ctr"/>
+            <a:lstStyle/>
+            <a:p>
+              <a:pPr algn="ctr"/>
+              <a:endParaRPr lang="ko-KR" altLang="en-US"/>
+            </a:p>
+          </p:txBody>
+        </p:sp>
+        <p:sp>
+          <p:nvSpPr>
+            <p:cNvPr id="67" name="팔각형 66">
+              <a:extLst>
+                <a:ext uri="{FF2B5EF4-FFF2-40B4-BE49-F238E27FC236}">
+                  <a16:creationId xmlns:a16="http://schemas.microsoft.com/office/drawing/2014/main" id="{62E7129B-1B68-DA73-DA0A-71A415F1E56D}"/>
+                </a:ext>
+              </a:extLst>
+            </p:cNvPr>
+            <p:cNvSpPr/>
+            <p:nvPr/>
+          </p:nvSpPr>
+          <p:spPr>
+            <a:xfrm>
+              <a:off x="3427040" y="3193461"/>
+              <a:ext cx="61200" cy="61200"/>
+            </a:xfrm>
+            <a:prstGeom prst="octagon">
+              <a:avLst/>
+            </a:prstGeom>
+            <a:solidFill>
+              <a:schemeClr val="tx1"/>
+            </a:solidFill>
+            <a:ln>
+              <a:noFill/>
+            </a:ln>
+          </p:spPr>
+          <p:style>
+            <a:lnRef idx="2">
+              <a:schemeClr val="accent1">
+                <a:shade val="15000"/>
+              </a:schemeClr>
+            </a:lnRef>
+            <a:fillRef idx="1">
+              <a:schemeClr val="accent1"/>
+            </a:fillRef>
+            <a:effectRef idx="0">
+              <a:schemeClr val="accent1"/>
+            </a:effectRef>
+            <a:fontRef idx="minor">
+              <a:schemeClr val="lt1"/>
+            </a:fontRef>
+          </p:style>
+          <p:txBody>
+            <a:bodyPr rtlCol="0" anchor="ctr"/>
+            <a:lstStyle/>
+            <a:p>
+              <a:pPr algn="ctr"/>
+              <a:endParaRPr lang="ko-KR" altLang="en-US"/>
+            </a:p>
+          </p:txBody>
+        </p:sp>
+        <p:sp>
+          <p:nvSpPr>
+            <p:cNvPr id="68" name="팔각형 67">
+              <a:extLst>
+                <a:ext uri="{FF2B5EF4-FFF2-40B4-BE49-F238E27FC236}">
+                  <a16:creationId xmlns:a16="http://schemas.microsoft.com/office/drawing/2014/main" id="{46F844E2-BF6C-40C3-70AE-A3C58838CF5C}"/>
+                </a:ext>
+              </a:extLst>
+            </p:cNvPr>
+            <p:cNvSpPr/>
+            <p:nvPr/>
+          </p:nvSpPr>
+          <p:spPr>
+            <a:xfrm>
+              <a:off x="3545642" y="3193461"/>
+              <a:ext cx="61200" cy="61200"/>
+            </a:xfrm>
+            <a:prstGeom prst="octagon">
+              <a:avLst/>
+            </a:prstGeom>
+            <a:solidFill>
+              <a:schemeClr val="tx1"/>
+            </a:solidFill>
+            <a:ln>
+              <a:noFill/>
+            </a:ln>
+          </p:spPr>
+          <p:style>
+            <a:lnRef idx="2">
+              <a:schemeClr val="accent1">
+                <a:shade val="15000"/>
+              </a:schemeClr>
+            </a:lnRef>
+            <a:fillRef idx="1">
+              <a:schemeClr val="accent1"/>
+            </a:fillRef>
+            <a:effectRef idx="0">
+              <a:schemeClr val="accent1"/>
+            </a:effectRef>
+            <a:fontRef idx="minor">
+              <a:schemeClr val="lt1"/>
+            </a:fontRef>
+          </p:style>
+          <p:txBody>
+            <a:bodyPr rtlCol="0" anchor="ctr"/>
+            <a:lstStyle/>
+            <a:p>
+              <a:pPr algn="ctr"/>
+              <a:endParaRPr lang="ko-KR" altLang="en-US"/>
+            </a:p>
+          </p:txBody>
+        </p:sp>
+        <p:sp>
+          <p:nvSpPr>
+            <p:cNvPr id="69" name="팔각형 68">
+              <a:extLst>
+                <a:ext uri="{FF2B5EF4-FFF2-40B4-BE49-F238E27FC236}">
+                  <a16:creationId xmlns:a16="http://schemas.microsoft.com/office/drawing/2014/main" id="{6C8430F7-F237-468A-2B59-FCA678DE7B35}"/>
+                </a:ext>
+              </a:extLst>
+            </p:cNvPr>
+            <p:cNvSpPr/>
+            <p:nvPr/>
+          </p:nvSpPr>
+          <p:spPr>
+            <a:xfrm>
+              <a:off x="3475244" y="3319589"/>
+              <a:ext cx="90487" cy="45719"/>
+            </a:xfrm>
+            <a:prstGeom prst="octagon">
+              <a:avLst>
+                <a:gd name="adj" fmla="val 13725"/>
+              </a:avLst>
+            </a:prstGeom>
+            <a:solidFill>
+              <a:schemeClr val="tx1"/>
+            </a:solidFill>
+            <a:ln>
+              <a:noFill/>
+            </a:ln>
+          </p:spPr>
+          <p:style>
+            <a:lnRef idx="2">
+              <a:schemeClr val="accent1">
+                <a:shade val="15000"/>
+              </a:schemeClr>
+            </a:lnRef>
+            <a:fillRef idx="1">
+              <a:schemeClr val="accent1"/>
+            </a:fillRef>
+            <a:effectRef idx="0">
+              <a:schemeClr val="accent1"/>
+            </a:effectRef>
+            <a:fontRef idx="minor">
+              <a:schemeClr val="lt1"/>
+            </a:fontRef>
+          </p:style>
+          <p:txBody>
+            <a:bodyPr rtlCol="0" anchor="ctr"/>
+            <a:lstStyle/>
+            <a:p>
+              <a:pPr algn="ctr"/>
+              <a:endParaRPr lang="ko-KR" altLang="en-US"/>
+            </a:p>
+          </p:txBody>
+        </p:sp>
+        <p:sp>
+          <p:nvSpPr>
+            <p:cNvPr id="70" name="자유형: 도형 69">
+              <a:extLst>
+                <a:ext uri="{FF2B5EF4-FFF2-40B4-BE49-F238E27FC236}">
+                  <a16:creationId xmlns:a16="http://schemas.microsoft.com/office/drawing/2014/main" id="{0CFC97F7-EB9F-9A9E-AE40-22A17252DD17}"/>
+                </a:ext>
+              </a:extLst>
+            </p:cNvPr>
+            <p:cNvSpPr/>
+            <p:nvPr/>
+          </p:nvSpPr>
+          <p:spPr>
+            <a:xfrm rot="18900000">
+              <a:off x="3398371" y="3468643"/>
+              <a:ext cx="206774" cy="206775"/>
+            </a:xfrm>
+            <a:custGeom>
+              <a:avLst/>
+              <a:gdLst>
+                <a:gd name="connsiteX0" fmla="*/ 188511 w 206774"/>
+                <a:gd name="connsiteY0" fmla="*/ 72211 h 206775"/>
+                <a:gd name="connsiteX1" fmla="*/ 206774 w 206774"/>
+                <a:gd name="connsiteY1" fmla="*/ 90474 h 206775"/>
+                <a:gd name="connsiteX2" fmla="*/ 206774 w 206774"/>
+                <a:gd name="connsiteY2" fmla="*/ 116301 h 206775"/>
+                <a:gd name="connsiteX3" fmla="*/ 188511 w 206774"/>
+                <a:gd name="connsiteY3" fmla="*/ 134564 h 206775"/>
+                <a:gd name="connsiteX4" fmla="*/ 134562 w 206774"/>
+                <a:gd name="connsiteY4" fmla="*/ 134564 h 206775"/>
+                <a:gd name="connsiteX5" fmla="*/ 134562 w 206774"/>
+                <a:gd name="connsiteY5" fmla="*/ 188512 h 206775"/>
+                <a:gd name="connsiteX6" fmla="*/ 116299 w 206774"/>
+                <a:gd name="connsiteY6" fmla="*/ 206775 h 206775"/>
+                <a:gd name="connsiteX7" fmla="*/ 90472 w 206774"/>
+                <a:gd name="connsiteY7" fmla="*/ 206774 h 206775"/>
+                <a:gd name="connsiteX8" fmla="*/ 72209 w 206774"/>
+                <a:gd name="connsiteY8" fmla="*/ 188511 h 206775"/>
+                <a:gd name="connsiteX9" fmla="*/ 72209 w 206774"/>
+                <a:gd name="connsiteY9" fmla="*/ 134564 h 206775"/>
+                <a:gd name="connsiteX10" fmla="*/ 18263 w 206774"/>
+                <a:gd name="connsiteY10" fmla="*/ 134564 h 206775"/>
+                <a:gd name="connsiteX11" fmla="*/ 0 w 206774"/>
+                <a:gd name="connsiteY11" fmla="*/ 116301 h 206775"/>
+                <a:gd name="connsiteX12" fmla="*/ 0 w 206774"/>
+                <a:gd name="connsiteY12" fmla="*/ 90474 h 206775"/>
+                <a:gd name="connsiteX13" fmla="*/ 18263 w 206774"/>
+                <a:gd name="connsiteY13" fmla="*/ 72211 h 206775"/>
+                <a:gd name="connsiteX14" fmla="*/ 72209 w 206774"/>
+                <a:gd name="connsiteY14" fmla="*/ 72211 h 206775"/>
+                <a:gd name="connsiteX15" fmla="*/ 72209 w 206774"/>
+                <a:gd name="connsiteY15" fmla="*/ 18264 h 206775"/>
+                <a:gd name="connsiteX16" fmla="*/ 90472 w 206774"/>
+                <a:gd name="connsiteY16" fmla="*/ 1 h 206775"/>
+                <a:gd name="connsiteX17" fmla="*/ 116299 w 206774"/>
+                <a:gd name="connsiteY17" fmla="*/ 0 h 206775"/>
+                <a:gd name="connsiteX18" fmla="*/ 134562 w 206774"/>
+                <a:gd name="connsiteY18" fmla="*/ 18264 h 206775"/>
+                <a:gd name="connsiteX19" fmla="*/ 134562 w 206774"/>
+                <a:gd name="connsiteY19" fmla="*/ 72211 h 206775"/>
+              </a:gdLst>
+              <a:ahLst/>
+              <a:cxnLst>
+                <a:cxn ang="0">
+                  <a:pos x="connsiteX0" y="connsiteY0"/>
+                </a:cxn>
+                <a:cxn ang="0">
+                  <a:pos x="connsiteX1" y="connsiteY1"/>
+                </a:cxn>
+                <a:cxn ang="0">
+                  <a:pos x="connsiteX2" y="connsiteY2"/>
+                </a:cxn>
+                <a:cxn ang="0">
+                  <a:pos x="connsiteX3" y="connsiteY3"/>
+                </a:cxn>
+                <a:cxn ang="0">
+                  <a:pos x="connsiteX4" y="connsiteY4"/>
+                </a:cxn>
+                <a:cxn ang="0">
+                  <a:pos x="connsiteX5" y="connsiteY5"/>
+                </a:cxn>
+                <a:cxn ang="0">
+                  <a:pos x="connsiteX6" y="connsiteY6"/>
+                </a:cxn>
+                <a:cxn ang="0">
+                  <a:pos x="connsiteX7" y="connsiteY7"/>
+                </a:cxn>
+                <a:cxn ang="0">
+                  <a:pos x="connsiteX8" y="connsiteY8"/>
+                </a:cxn>
+                <a:cxn ang="0">
+                  <a:pos x="connsiteX9" y="connsiteY9"/>
+                </a:cxn>
+                <a:cxn ang="0">
+                  <a:pos x="connsiteX10" y="connsiteY10"/>
+                </a:cxn>
+                <a:cxn ang="0">
+                  <a:pos x="connsiteX11" y="connsiteY11"/>
+                </a:cxn>
+                <a:cxn ang="0">
+                  <a:pos x="connsiteX12" y="connsiteY12"/>
+                </a:cxn>
+                <a:cxn ang="0">
+                  <a:pos x="connsiteX13" y="connsiteY13"/>
+                </a:cxn>
+                <a:cxn ang="0">
+                  <a:pos x="connsiteX14" y="connsiteY14"/>
+                </a:cxn>
+                <a:cxn ang="0">
+                  <a:pos x="connsiteX15" y="connsiteY15"/>
+                </a:cxn>
+                <a:cxn ang="0">
+                  <a:pos x="connsiteX16" y="connsiteY16"/>
+                </a:cxn>
+                <a:cxn ang="0">
+                  <a:pos x="connsiteX17" y="connsiteY17"/>
+                </a:cxn>
+                <a:cxn ang="0">
+                  <a:pos x="connsiteX18" y="connsiteY18"/>
+                </a:cxn>
+                <a:cxn ang="0">
+                  <a:pos x="connsiteX19" y="connsiteY19"/>
+                </a:cxn>
+              </a:cxnLst>
+              <a:rect l="l" t="t" r="r" b="b"/>
+              <a:pathLst>
+                <a:path w="206774" h="206775">
+                  <a:moveTo>
+                    <a:pt x="188511" y="72211"/>
+                  </a:moveTo>
+                  <a:lnTo>
+                    <a:pt x="206774" y="90474"/>
+                  </a:lnTo>
+                  <a:lnTo>
+                    <a:pt x="206774" y="116301"/>
+                  </a:lnTo>
+                  <a:lnTo>
+                    <a:pt x="188511" y="134564"/>
+                  </a:lnTo>
+                  <a:lnTo>
+                    <a:pt x="134562" y="134564"/>
+                  </a:lnTo>
+                  <a:lnTo>
+                    <a:pt x="134562" y="188512"/>
+                  </a:lnTo>
+                  <a:lnTo>
+                    <a:pt x="116299" y="206775"/>
+                  </a:lnTo>
+                  <a:lnTo>
+                    <a:pt x="90472" y="206774"/>
+                  </a:lnTo>
+                  <a:lnTo>
+                    <a:pt x="72209" y="188511"/>
+                  </a:lnTo>
+                  <a:lnTo>
+                    <a:pt x="72209" y="134564"/>
+                  </a:lnTo>
+                  <a:lnTo>
+                    <a:pt x="18263" y="134564"/>
+                  </a:lnTo>
+                  <a:lnTo>
+                    <a:pt x="0" y="116301"/>
+                  </a:lnTo>
+                  <a:lnTo>
+                    <a:pt x="0" y="90474"/>
+                  </a:lnTo>
+                  <a:lnTo>
+                    <a:pt x="18263" y="72211"/>
+                  </a:lnTo>
+                  <a:lnTo>
+                    <a:pt x="72209" y="72211"/>
+                  </a:lnTo>
+                  <a:lnTo>
+                    <a:pt x="72209" y="18264"/>
+                  </a:lnTo>
+                  <a:lnTo>
+                    <a:pt x="90472" y="1"/>
+                  </a:lnTo>
+                  <a:lnTo>
+                    <a:pt x="116299" y="0"/>
+                  </a:lnTo>
+                  <a:lnTo>
+                    <a:pt x="134562" y="18264"/>
+                  </a:lnTo>
+                  <a:lnTo>
+                    <a:pt x="134562" y="72211"/>
+                  </a:lnTo>
+                  <a:close/>
+                </a:path>
+              </a:pathLst>
+            </a:custGeom>
+            <a:solidFill>
+              <a:srgbClr val="FFFF01"/>
+            </a:solidFill>
+            <a:ln>
+              <a:noFill/>
+            </a:ln>
+          </p:spPr>
+          <p:style>
+            <a:lnRef idx="2">
+              <a:schemeClr val="accent1">
+                <a:shade val="15000"/>
+              </a:schemeClr>
+            </a:lnRef>
+            <a:fillRef idx="1">
+              <a:schemeClr val="accent1"/>
+            </a:fillRef>
+            <a:effectRef idx="0">
+              <a:schemeClr val="accent1"/>
+            </a:effectRef>
+            <a:fontRef idx="minor">
+              <a:schemeClr val="lt1"/>
+            </a:fontRef>
+          </p:style>
+          <p:txBody>
+            <a:bodyPr wrap="square" rtlCol="0" anchor="ctr">
+              <a:noAutofit/>
+            </a:bodyPr>
+            <a:lstStyle/>
+            <a:p>
+              <a:pPr algn="ctr"/>
+              <a:endParaRPr lang="ko-KR" altLang="en-US"/>
+            </a:p>
+          </p:txBody>
+        </p:sp>
+        <p:sp>
+          <p:nvSpPr>
+            <p:cNvPr id="71" name="직각 삼각형 70">
+              <a:extLst>
+                <a:ext uri="{FF2B5EF4-FFF2-40B4-BE49-F238E27FC236}">
+                  <a16:creationId xmlns:a16="http://schemas.microsoft.com/office/drawing/2014/main" id="{B2739292-02D7-D9A9-6F8A-249725B582EA}"/>
+                </a:ext>
+              </a:extLst>
+            </p:cNvPr>
+            <p:cNvSpPr/>
+            <p:nvPr/>
+          </p:nvSpPr>
+          <p:spPr>
+            <a:xfrm rot="8100000">
+              <a:off x="3426368" y="3793376"/>
+              <a:ext cx="150780" cy="150780"/>
+            </a:xfrm>
+            <a:prstGeom prst="rtTriangle">
+              <a:avLst/>
+            </a:prstGeom>
+            <a:solidFill>
+              <a:srgbClr val="FFFF01"/>
+            </a:solidFill>
+            <a:ln>
+              <a:noFill/>
+            </a:ln>
+          </p:spPr>
+          <p:style>
+            <a:lnRef idx="2">
+              <a:schemeClr val="accent1">
+                <a:shade val="15000"/>
+              </a:schemeClr>
+            </a:lnRef>
+            <a:fillRef idx="1">
+              <a:schemeClr val="accent1"/>
+            </a:fillRef>
+            <a:effectRef idx="0">
+              <a:schemeClr val="accent1"/>
+            </a:effectRef>
+            <a:fontRef idx="minor">
+              <a:schemeClr val="lt1"/>
+            </a:fontRef>
+          </p:style>
+          <p:txBody>
+            <a:bodyPr wrap="square" rtlCol="0" anchor="ctr">
+              <a:noAutofit/>
+            </a:bodyPr>
+            <a:lstStyle/>
+            <a:p>
+              <a:pPr algn="ctr"/>
+              <a:endParaRPr lang="ko-KR" altLang="en-US"/>
+            </a:p>
+          </p:txBody>
+        </p:sp>
+        <p:sp>
+          <p:nvSpPr>
+            <p:cNvPr id="6" name="평행 사변형 5">
+              <a:extLst>
+                <a:ext uri="{FF2B5EF4-FFF2-40B4-BE49-F238E27FC236}">
+                  <a16:creationId xmlns:a16="http://schemas.microsoft.com/office/drawing/2014/main" id="{A794982A-34E0-233D-4BDC-FDB05436F5F4}"/>
+                </a:ext>
+              </a:extLst>
+            </p:cNvPr>
+            <p:cNvSpPr/>
+            <p:nvPr/>
+          </p:nvSpPr>
+          <p:spPr>
+            <a:xfrm rot="5400000" flipV="1">
+              <a:off x="3779005" y="3786578"/>
+              <a:ext cx="198838" cy="85236"/>
+            </a:xfrm>
+            <a:prstGeom prst="parallelogram">
+              <a:avLst>
+                <a:gd name="adj" fmla="val 96915"/>
+              </a:avLst>
+            </a:prstGeom>
+            <a:solidFill>
+              <a:srgbClr val="EB935E"/>
+            </a:solidFill>
+            <a:ln>
+              <a:noFill/>
+            </a:ln>
+          </p:spPr>
+          <p:style>
+            <a:lnRef idx="2">
+              <a:schemeClr val="accent1">
+                <a:shade val="15000"/>
+              </a:schemeClr>
+            </a:lnRef>
+            <a:fillRef idx="1">
+              <a:schemeClr val="accent1"/>
+            </a:fillRef>
+            <a:effectRef idx="0">
+              <a:schemeClr val="accent1"/>
+            </a:effectRef>
+            <a:fontRef idx="minor">
+              <a:schemeClr val="lt1"/>
+            </a:fontRef>
+          </p:style>
+          <p:txBody>
+            <a:bodyPr wrap="square" rtlCol="0" anchor="ctr">
+              <a:noAutofit/>
+            </a:bodyPr>
+            <a:lstStyle/>
+            <a:p>
+              <a:pPr algn="ctr"/>
+              <a:endParaRPr lang="ko-KR" altLang="en-US"/>
+            </a:p>
+          </p:txBody>
+        </p:sp>
+        <p:sp>
+          <p:nvSpPr>
+            <p:cNvPr id="73" name="자유형: 도형 72">
+              <a:extLst>
+                <a:ext uri="{FF2B5EF4-FFF2-40B4-BE49-F238E27FC236}">
+                  <a16:creationId xmlns:a16="http://schemas.microsoft.com/office/drawing/2014/main" id="{158803C5-70B9-7B03-ADDB-EE9829119E05}"/>
+                </a:ext>
+              </a:extLst>
+            </p:cNvPr>
+            <p:cNvSpPr/>
+            <p:nvPr/>
+          </p:nvSpPr>
+          <p:spPr>
+            <a:xfrm flipV="1">
+              <a:off x="3163208" y="2836433"/>
+              <a:ext cx="772807" cy="969050"/>
+            </a:xfrm>
+            <a:custGeom>
+              <a:avLst/>
+              <a:gdLst>
+                <a:gd name="connsiteX0" fmla="*/ 546349 w 772807"/>
+                <a:gd name="connsiteY0" fmla="*/ 735954 h 969050"/>
+                <a:gd name="connsiteX1" fmla="*/ 546349 w 772807"/>
+                <a:gd name="connsiteY1" fmla="*/ 731156 h 969050"/>
+                <a:gd name="connsiteX2" fmla="*/ 547202 w 772807"/>
+                <a:gd name="connsiteY2" fmla="*/ 731156 h 969050"/>
+                <a:gd name="connsiteX3" fmla="*/ 547202 w 772807"/>
+                <a:gd name="connsiteY3" fmla="*/ 735954 h 969050"/>
+                <a:gd name="connsiteX4" fmla="*/ 0 w 772807"/>
+                <a:gd name="connsiteY4" fmla="*/ 969050 h 969050"/>
+                <a:gd name="connsiteX5" fmla="*/ 352125 w 772807"/>
+                <a:gd name="connsiteY5" fmla="*/ 969050 h 969050"/>
+                <a:gd name="connsiteX6" fmla="*/ 578030 w 772807"/>
+                <a:gd name="connsiteY6" fmla="*/ 735954 h 969050"/>
+                <a:gd name="connsiteX7" fmla="*/ 576555 w 772807"/>
+                <a:gd name="connsiteY7" fmla="*/ 735954 h 969050"/>
+                <a:gd name="connsiteX8" fmla="*/ 638100 w 772807"/>
+                <a:gd name="connsiteY8" fmla="*/ 676307 h 969050"/>
+                <a:gd name="connsiteX9" fmla="*/ 638100 w 772807"/>
+                <a:gd name="connsiteY9" fmla="*/ 522275 h 969050"/>
+                <a:gd name="connsiteX10" fmla="*/ 772807 w 772807"/>
+                <a:gd name="connsiteY10" fmla="*/ 391724 h 969050"/>
+                <a:gd name="connsiteX11" fmla="*/ 772807 w 772807"/>
+                <a:gd name="connsiteY11" fmla="*/ 312194 h 969050"/>
+                <a:gd name="connsiteX12" fmla="*/ 772807 w 772807"/>
+                <a:gd name="connsiteY12" fmla="*/ 239135 h 969050"/>
+                <a:gd name="connsiteX13" fmla="*/ 772807 w 772807"/>
+                <a:gd name="connsiteY13" fmla="*/ 138363 h 969050"/>
+                <a:gd name="connsiteX14" fmla="*/ 772147 w 772807"/>
+                <a:gd name="connsiteY14" fmla="*/ 138363 h 969050"/>
+                <a:gd name="connsiteX15" fmla="*/ 772147 w 772807"/>
+                <a:gd name="connsiteY15" fmla="*/ 130681 h 969050"/>
+                <a:gd name="connsiteX16" fmla="*/ 760156 w 772807"/>
+                <a:gd name="connsiteY16" fmla="*/ 119060 h 969050"/>
+                <a:gd name="connsiteX17" fmla="*/ 760156 w 772807"/>
+                <a:gd name="connsiteY17" fmla="*/ 117649 h 969050"/>
+                <a:gd name="connsiteX18" fmla="*/ 638762 w 772807"/>
+                <a:gd name="connsiteY18" fmla="*/ 0 h 969050"/>
+                <a:gd name="connsiteX19" fmla="*/ 638762 w 772807"/>
+                <a:gd name="connsiteY19" fmla="*/ 337786 h 969050"/>
+                <a:gd name="connsiteX20" fmla="*/ 638762 w 772807"/>
+                <a:gd name="connsiteY20" fmla="*/ 337787 h 969050"/>
+                <a:gd name="connsiteX21" fmla="*/ 638762 w 772807"/>
+                <a:gd name="connsiteY21" fmla="*/ 369045 h 969050"/>
+                <a:gd name="connsiteX22" fmla="*/ 545495 w 772807"/>
+                <a:gd name="connsiteY22" fmla="*/ 459434 h 969050"/>
+                <a:gd name="connsiteX23" fmla="*/ 545495 w 772807"/>
+                <a:gd name="connsiteY23" fmla="*/ 565826 h 969050"/>
+                <a:gd name="connsiteX24" fmla="*/ 545185 w 772807"/>
+                <a:gd name="connsiteY24" fmla="*/ 565826 h 969050"/>
+                <a:gd name="connsiteX25" fmla="*/ 545185 w 772807"/>
+                <a:gd name="connsiteY25" fmla="*/ 642015 h 969050"/>
+                <a:gd name="connsiteX26" fmla="*/ 451246 w 772807"/>
+                <a:gd name="connsiteY26" fmla="*/ 735954 h 969050"/>
+                <a:gd name="connsiteX27" fmla="*/ 225905 w 772807"/>
+                <a:gd name="connsiteY27" fmla="*/ 735954 h 969050"/>
+              </a:gdLst>
+              <a:ahLst/>
+              <a:cxnLst>
+                <a:cxn ang="0">
+                  <a:pos x="connsiteX0" y="connsiteY0"/>
+                </a:cxn>
+                <a:cxn ang="0">
+                  <a:pos x="connsiteX1" y="connsiteY1"/>
+                </a:cxn>
+                <a:cxn ang="0">
+                  <a:pos x="connsiteX2" y="connsiteY2"/>
+                </a:cxn>
+                <a:cxn ang="0">
+                  <a:pos x="connsiteX3" y="connsiteY3"/>
+                </a:cxn>
+                <a:cxn ang="0">
+                  <a:pos x="connsiteX4" y="connsiteY4"/>
+                </a:cxn>
+                <a:cxn ang="0">
+                  <a:pos x="connsiteX5" y="connsiteY5"/>
+                </a:cxn>
+                <a:cxn ang="0">
+                  <a:pos x="connsiteX6" y="connsiteY6"/>
+                </a:cxn>
+                <a:cxn ang="0">
+                  <a:pos x="connsiteX7" y="connsiteY7"/>
+                </a:cxn>
+                <a:cxn ang="0">
+                  <a:pos x="connsiteX8" y="connsiteY8"/>
+                </a:cxn>
+                <a:cxn ang="0">
+                  <a:pos x="connsiteX9" y="connsiteY9"/>
+                </a:cxn>
+                <a:cxn ang="0">
+                  <a:pos x="connsiteX10" y="connsiteY10"/>
+                </a:cxn>
+                <a:cxn ang="0">
+                  <a:pos x="connsiteX11" y="connsiteY11"/>
+                </a:cxn>
+                <a:cxn ang="0">
+                  <a:pos x="connsiteX12" y="connsiteY12"/>
+                </a:cxn>
+                <a:cxn ang="0">
+                  <a:pos x="connsiteX13" y="connsiteY13"/>
+                </a:cxn>
+                <a:cxn ang="0">
+                  <a:pos x="connsiteX14" y="connsiteY14"/>
+                </a:cxn>
+                <a:cxn ang="0">
+                  <a:pos x="connsiteX15" y="connsiteY15"/>
+                </a:cxn>
+                <a:cxn ang="0">
+                  <a:pos x="connsiteX16" y="connsiteY16"/>
+                </a:cxn>
+                <a:cxn ang="0">
+                  <a:pos x="connsiteX17" y="connsiteY17"/>
+                </a:cxn>
+                <a:cxn ang="0">
+                  <a:pos x="connsiteX18" y="connsiteY18"/>
+                </a:cxn>
+                <a:cxn ang="0">
+                  <a:pos x="connsiteX19" y="connsiteY19"/>
+                </a:cxn>
+                <a:cxn ang="0">
+                  <a:pos x="connsiteX20" y="connsiteY20"/>
+                </a:cxn>
+                <a:cxn ang="0">
+                  <a:pos x="connsiteX21" y="connsiteY21"/>
+                </a:cxn>
+                <a:cxn ang="0">
+                  <a:pos x="connsiteX22" y="connsiteY22"/>
+                </a:cxn>
+                <a:cxn ang="0">
+                  <a:pos x="connsiteX23" y="connsiteY23"/>
+                </a:cxn>
+                <a:cxn ang="0">
+                  <a:pos x="connsiteX24" y="connsiteY24"/>
+                </a:cxn>
+                <a:cxn ang="0">
+                  <a:pos x="connsiteX25" y="connsiteY25"/>
+                </a:cxn>
+                <a:cxn ang="0">
+                  <a:pos x="connsiteX26" y="connsiteY26"/>
+                </a:cxn>
+                <a:cxn ang="0">
+                  <a:pos x="connsiteX27" y="connsiteY27"/>
+                </a:cxn>
+              </a:cxnLst>
+              <a:rect l="l" t="t" r="r" b="b"/>
+              <a:pathLst>
+                <a:path w="772807" h="969050">
+                  <a:moveTo>
+                    <a:pt x="546349" y="735954"/>
+                  </a:moveTo>
+                  <a:lnTo>
+                    <a:pt x="546349" y="731156"/>
+                  </a:lnTo>
+                  <a:lnTo>
+                    <a:pt x="547202" y="731156"/>
+                  </a:lnTo>
+                  <a:lnTo>
+                    <a:pt x="547202" y="735954"/>
+                  </a:lnTo>
+                  <a:close/>
+                  <a:moveTo>
+                    <a:pt x="0" y="969050"/>
+                  </a:moveTo>
+                  <a:lnTo>
+                    <a:pt x="352125" y="969050"/>
+                  </a:lnTo>
+                  <a:lnTo>
+                    <a:pt x="578030" y="735954"/>
+                  </a:lnTo>
+                  <a:lnTo>
+                    <a:pt x="576555" y="735954"/>
+                  </a:lnTo>
+                  <a:lnTo>
+                    <a:pt x="638100" y="676307"/>
+                  </a:lnTo>
+                  <a:lnTo>
+                    <a:pt x="638100" y="522275"/>
+                  </a:lnTo>
+                  <a:lnTo>
+                    <a:pt x="772807" y="391724"/>
+                  </a:lnTo>
+                  <a:lnTo>
+                    <a:pt x="772807" y="312194"/>
+                  </a:lnTo>
+                  <a:lnTo>
+                    <a:pt x="772807" y="239135"/>
+                  </a:lnTo>
+                  <a:lnTo>
+                    <a:pt x="772807" y="138363"/>
+                  </a:lnTo>
+                  <a:lnTo>
+                    <a:pt x="772147" y="138363"/>
+                  </a:lnTo>
+                  <a:lnTo>
+                    <a:pt x="772147" y="130681"/>
+                  </a:lnTo>
+                  <a:lnTo>
+                    <a:pt x="760156" y="119060"/>
+                  </a:lnTo>
+                  <a:lnTo>
+                    <a:pt x="760156" y="117649"/>
+                  </a:lnTo>
+                  <a:lnTo>
+                    <a:pt x="638762" y="0"/>
+                  </a:lnTo>
+                  <a:lnTo>
+                    <a:pt x="638762" y="337786"/>
+                  </a:lnTo>
+                  <a:lnTo>
+                    <a:pt x="638762" y="337787"/>
+                  </a:lnTo>
+                  <a:lnTo>
+                    <a:pt x="638762" y="369045"/>
+                  </a:lnTo>
+                  <a:lnTo>
+                    <a:pt x="545495" y="459434"/>
+                  </a:lnTo>
+                  <a:lnTo>
+                    <a:pt x="545495" y="565826"/>
+                  </a:lnTo>
+                  <a:lnTo>
+                    <a:pt x="545185" y="565826"/>
+                  </a:lnTo>
+                  <a:lnTo>
+                    <a:pt x="545185" y="642015"/>
+                  </a:lnTo>
+                  <a:lnTo>
+                    <a:pt x="451246" y="735954"/>
+                  </a:lnTo>
+                  <a:lnTo>
+                    <a:pt x="225905" y="735954"/>
+                  </a:lnTo>
+                  <a:close/>
+                </a:path>
+              </a:pathLst>
+            </a:custGeom>
+            <a:solidFill>
+              <a:srgbClr val="C5181A"/>
+            </a:solidFill>
+            <a:ln>
+              <a:noFill/>
+            </a:ln>
+          </p:spPr>
+          <p:style>
+            <a:lnRef idx="2">
+              <a:schemeClr val="accent1">
+                <a:shade val="15000"/>
+              </a:schemeClr>
+            </a:lnRef>
+            <a:fillRef idx="1">
+              <a:schemeClr val="accent1"/>
+            </a:fillRef>
+            <a:effectRef idx="0">
+              <a:schemeClr val="accent1"/>
+            </a:effectRef>
+            <a:fontRef idx="minor">
+              <a:schemeClr val="lt1"/>
+            </a:fontRef>
+          </p:style>
+          <p:txBody>
+            <a:bodyPr wrap="square" rtlCol="0" anchor="ctr">
+              <a:noAutofit/>
+            </a:bodyPr>
+            <a:lstStyle/>
+            <a:p>
+              <a:pPr algn="ctr"/>
+              <a:endParaRPr lang="ko-KR" altLang="en-US"/>
+            </a:p>
+          </p:txBody>
+        </p:sp>
+        <p:sp>
+          <p:nvSpPr>
+            <p:cNvPr id="74" name="자유형: 도형 73">
+              <a:extLst>
+                <a:ext uri="{FF2B5EF4-FFF2-40B4-BE49-F238E27FC236}">
+                  <a16:creationId xmlns:a16="http://schemas.microsoft.com/office/drawing/2014/main" id="{29DA04D2-864E-742B-0D3E-47BFD781F588}"/>
+                </a:ext>
+              </a:extLst>
+            </p:cNvPr>
+            <p:cNvSpPr/>
+            <p:nvPr/>
+          </p:nvSpPr>
+          <p:spPr>
+            <a:xfrm rot="2700000">
+              <a:off x="3016708" y="2945754"/>
+              <a:ext cx="338702" cy="165255"/>
+            </a:xfrm>
+            <a:custGeom>
+              <a:avLst/>
+              <a:gdLst>
+                <a:gd name="connsiteX0" fmla="*/ 0 w 338702"/>
+                <a:gd name="connsiteY0" fmla="*/ 0 h 165255"/>
+                <a:gd name="connsiteX1" fmla="*/ 338702 w 338702"/>
+                <a:gd name="connsiteY1" fmla="*/ 0 h 165255"/>
+                <a:gd name="connsiteX2" fmla="*/ 338702 w 338702"/>
+                <a:gd name="connsiteY2" fmla="*/ 165255 h 165255"/>
+                <a:gd name="connsiteX3" fmla="*/ 34737 w 338702"/>
+                <a:gd name="connsiteY3" fmla="*/ 165255 h 165255"/>
+                <a:gd name="connsiteX4" fmla="*/ 0 w 338702"/>
+                <a:gd name="connsiteY4" fmla="*/ 130518 h 165255"/>
+              </a:gdLst>
+              <a:ahLst/>
+              <a:cxnLst>
+                <a:cxn ang="0">
+                  <a:pos x="connsiteX0" y="connsiteY0"/>
+                </a:cxn>
+                <a:cxn ang="0">
+                  <a:pos x="connsiteX1" y="connsiteY1"/>
+                </a:cxn>
+                <a:cxn ang="0">
+                  <a:pos x="connsiteX2" y="connsiteY2"/>
+                </a:cxn>
+                <a:cxn ang="0">
+                  <a:pos x="connsiteX3" y="connsiteY3"/>
+                </a:cxn>
+                <a:cxn ang="0">
+                  <a:pos x="connsiteX4" y="connsiteY4"/>
+                </a:cxn>
+              </a:cxnLst>
+              <a:rect l="l" t="t" r="r" b="b"/>
+              <a:pathLst>
+                <a:path w="338702" h="165255">
+                  <a:moveTo>
+                    <a:pt x="0" y="0"/>
+                  </a:moveTo>
+                  <a:lnTo>
+                    <a:pt x="338702" y="0"/>
+                  </a:lnTo>
+                  <a:lnTo>
+                    <a:pt x="338702" y="165255"/>
+                  </a:lnTo>
+                  <a:lnTo>
+                    <a:pt x="34737" y="165255"/>
+                  </a:lnTo>
+                  <a:lnTo>
+                    <a:pt x="0" y="130518"/>
+                  </a:lnTo>
+                  <a:close/>
+                </a:path>
+              </a:pathLst>
+            </a:custGeom>
+            <a:solidFill>
+              <a:srgbClr val="C5181A"/>
+            </a:solidFill>
+            <a:ln>
+              <a:noFill/>
+            </a:ln>
+          </p:spPr>
+          <p:style>
+            <a:lnRef idx="2">
+              <a:schemeClr val="accent1">
+                <a:shade val="15000"/>
+              </a:schemeClr>
+            </a:lnRef>
+            <a:fillRef idx="1">
+              <a:schemeClr val="accent1"/>
+            </a:fillRef>
+            <a:effectRef idx="0">
+              <a:schemeClr val="accent1"/>
+            </a:effectRef>
+            <a:fontRef idx="minor">
+              <a:schemeClr val="lt1"/>
+            </a:fontRef>
+          </p:style>
+          <p:txBody>
+            <a:bodyPr wrap="square" rtlCol="0" anchor="ctr">
+              <a:noAutofit/>
+            </a:bodyPr>
+            <a:lstStyle/>
+            <a:p>
+              <a:pPr algn="ctr"/>
+              <a:endParaRPr lang="ko-KR" altLang="en-US"/>
+            </a:p>
+          </p:txBody>
+        </p:sp>
+        <p:sp>
+          <p:nvSpPr>
+            <p:cNvPr id="75" name="자유형: 도형 74">
+              <a:extLst>
+                <a:ext uri="{FF2B5EF4-FFF2-40B4-BE49-F238E27FC236}">
+                  <a16:creationId xmlns:a16="http://schemas.microsoft.com/office/drawing/2014/main" id="{5E6649D4-CE6C-D2B1-AE66-184509847B54}"/>
+                </a:ext>
+              </a:extLst>
+            </p:cNvPr>
+            <p:cNvSpPr/>
+            <p:nvPr/>
+          </p:nvSpPr>
+          <p:spPr>
+            <a:xfrm rot="2700000">
+              <a:off x="2853419" y="3123508"/>
+              <a:ext cx="418981" cy="200830"/>
+            </a:xfrm>
+            <a:custGeom>
+              <a:avLst/>
+              <a:gdLst>
+                <a:gd name="connsiteX0" fmla="*/ 0 w 418981"/>
+                <a:gd name="connsiteY0" fmla="*/ 28665 h 200830"/>
+                <a:gd name="connsiteX1" fmla="*/ 28665 w 418981"/>
+                <a:gd name="connsiteY1" fmla="*/ 0 h 200830"/>
+                <a:gd name="connsiteX2" fmla="*/ 355199 w 418981"/>
+                <a:gd name="connsiteY2" fmla="*/ 0 h 200830"/>
+                <a:gd name="connsiteX3" fmla="*/ 418981 w 418981"/>
+                <a:gd name="connsiteY3" fmla="*/ 63782 h 200830"/>
+                <a:gd name="connsiteX4" fmla="*/ 418981 w 418981"/>
+                <a:gd name="connsiteY4" fmla="*/ 200830 h 200830"/>
+                <a:gd name="connsiteX5" fmla="*/ 52024 w 418981"/>
+                <a:gd name="connsiteY5" fmla="*/ 200830 h 200830"/>
+                <a:gd name="connsiteX6" fmla="*/ 0 w 418981"/>
+                <a:gd name="connsiteY6" fmla="*/ 148806 h 200830"/>
+              </a:gdLst>
+              <a:ahLst/>
+              <a:cxnLst>
+                <a:cxn ang="0">
+                  <a:pos x="connsiteX0" y="connsiteY0"/>
+                </a:cxn>
+                <a:cxn ang="0">
+                  <a:pos x="connsiteX1" y="connsiteY1"/>
+                </a:cxn>
+                <a:cxn ang="0">
+                  <a:pos x="connsiteX2" y="connsiteY2"/>
+                </a:cxn>
+                <a:cxn ang="0">
+                  <a:pos x="connsiteX3" y="connsiteY3"/>
+                </a:cxn>
+                <a:cxn ang="0">
+                  <a:pos x="connsiteX4" y="connsiteY4"/>
+                </a:cxn>
+                <a:cxn ang="0">
+                  <a:pos x="connsiteX5" y="connsiteY5"/>
+                </a:cxn>
+                <a:cxn ang="0">
+                  <a:pos x="connsiteX6" y="connsiteY6"/>
+                </a:cxn>
+              </a:cxnLst>
+              <a:rect l="l" t="t" r="r" b="b"/>
+              <a:pathLst>
+                <a:path w="418981" h="200830">
+                  <a:moveTo>
+                    <a:pt x="0" y="28665"/>
+                  </a:moveTo>
+                  <a:lnTo>
+                    <a:pt x="28665" y="0"/>
+                  </a:lnTo>
+                  <a:lnTo>
+                    <a:pt x="355199" y="0"/>
+                  </a:lnTo>
+                  <a:lnTo>
+                    <a:pt x="418981" y="63782"/>
+                  </a:lnTo>
+                  <a:lnTo>
+                    <a:pt x="418981" y="200830"/>
+                  </a:lnTo>
+                  <a:lnTo>
+                    <a:pt x="52024" y="200830"/>
+                  </a:lnTo>
+                  <a:lnTo>
+                    <a:pt x="0" y="148806"/>
+                  </a:lnTo>
+                  <a:close/>
+                </a:path>
+              </a:pathLst>
+            </a:custGeom>
+            <a:solidFill>
+              <a:srgbClr val="C5181A"/>
+            </a:solidFill>
+            <a:ln>
+              <a:noFill/>
+            </a:ln>
+          </p:spPr>
+          <p:style>
+            <a:lnRef idx="2">
+              <a:schemeClr val="accent1">
+                <a:shade val="15000"/>
+              </a:schemeClr>
+            </a:lnRef>
+            <a:fillRef idx="1">
+              <a:schemeClr val="accent1"/>
+            </a:fillRef>
+            <a:effectRef idx="0">
+              <a:schemeClr val="accent1"/>
+            </a:effectRef>
+            <a:fontRef idx="minor">
+              <a:schemeClr val="lt1"/>
+            </a:fontRef>
+          </p:style>
+          <p:txBody>
+            <a:bodyPr wrap="square" rtlCol="0" anchor="ctr">
+              <a:noAutofit/>
+            </a:bodyPr>
+            <a:lstStyle/>
+            <a:p>
+              <a:pPr algn="ctr"/>
+              <a:endParaRPr lang="ko-KR" altLang="en-US"/>
+            </a:p>
+          </p:txBody>
+        </p:sp>
+        <p:sp>
+          <p:nvSpPr>
+            <p:cNvPr id="76" name="자유형: 도형 75">
+              <a:extLst>
+                <a:ext uri="{FF2B5EF4-FFF2-40B4-BE49-F238E27FC236}">
+                  <a16:creationId xmlns:a16="http://schemas.microsoft.com/office/drawing/2014/main" id="{579CEF04-7789-2F2B-039D-31DA09DF8BAB}"/>
+                </a:ext>
+              </a:extLst>
+            </p:cNvPr>
+            <p:cNvSpPr/>
+            <p:nvPr/>
+          </p:nvSpPr>
+          <p:spPr>
+            <a:xfrm rot="2700000">
+              <a:off x="2780087" y="3369888"/>
+              <a:ext cx="349992" cy="252221"/>
+            </a:xfrm>
+            <a:custGeom>
+              <a:avLst/>
+              <a:gdLst>
+                <a:gd name="connsiteX0" fmla="*/ 0 w 349992"/>
+                <a:gd name="connsiteY0" fmla="*/ 0 h 252221"/>
+                <a:gd name="connsiteX1" fmla="*/ 269889 w 349992"/>
+                <a:gd name="connsiteY1" fmla="*/ 0 h 252221"/>
+                <a:gd name="connsiteX2" fmla="*/ 349992 w 349992"/>
+                <a:gd name="connsiteY2" fmla="*/ 80103 h 252221"/>
+                <a:gd name="connsiteX3" fmla="*/ 349992 w 349992"/>
+                <a:gd name="connsiteY3" fmla="*/ 130918 h 252221"/>
+                <a:gd name="connsiteX4" fmla="*/ 228689 w 349992"/>
+                <a:gd name="connsiteY4" fmla="*/ 252221 h 252221"/>
+                <a:gd name="connsiteX5" fmla="*/ 75783 w 349992"/>
+                <a:gd name="connsiteY5" fmla="*/ 252221 h 252221"/>
+                <a:gd name="connsiteX6" fmla="*/ 0 w 349992"/>
+                <a:gd name="connsiteY6" fmla="*/ 176438 h 252221"/>
+              </a:gdLst>
+              <a:ahLst/>
+              <a:cxnLst>
+                <a:cxn ang="0">
+                  <a:pos x="connsiteX0" y="connsiteY0"/>
+                </a:cxn>
+                <a:cxn ang="0">
+                  <a:pos x="connsiteX1" y="connsiteY1"/>
+                </a:cxn>
+                <a:cxn ang="0">
+                  <a:pos x="connsiteX2" y="connsiteY2"/>
+                </a:cxn>
+                <a:cxn ang="0">
+                  <a:pos x="connsiteX3" y="connsiteY3"/>
+                </a:cxn>
+                <a:cxn ang="0">
+                  <a:pos x="connsiteX4" y="connsiteY4"/>
+                </a:cxn>
+                <a:cxn ang="0">
+                  <a:pos x="connsiteX5" y="connsiteY5"/>
+                </a:cxn>
+                <a:cxn ang="0">
+                  <a:pos x="connsiteX6" y="connsiteY6"/>
+                </a:cxn>
+              </a:cxnLst>
+              <a:rect l="l" t="t" r="r" b="b"/>
+              <a:pathLst>
+                <a:path w="349992" h="252221">
+                  <a:moveTo>
+                    <a:pt x="0" y="0"/>
+                  </a:moveTo>
+                  <a:lnTo>
+                    <a:pt x="269889" y="0"/>
+                  </a:lnTo>
+                  <a:lnTo>
+                    <a:pt x="349992" y="80103"/>
+                  </a:lnTo>
+                  <a:lnTo>
+                    <a:pt x="349992" y="130918"/>
+                  </a:lnTo>
+                  <a:lnTo>
+                    <a:pt x="228689" y="252221"/>
+                  </a:lnTo>
+                  <a:lnTo>
+                    <a:pt x="75783" y="252221"/>
+                  </a:lnTo>
+                  <a:lnTo>
+                    <a:pt x="0" y="176438"/>
+                  </a:lnTo>
+                  <a:close/>
+                </a:path>
+              </a:pathLst>
+            </a:custGeom>
+            <a:solidFill>
+              <a:srgbClr val="C5181A"/>
+            </a:solidFill>
+            <a:ln>
+              <a:noFill/>
+            </a:ln>
+          </p:spPr>
+          <p:style>
+            <a:lnRef idx="2">
+              <a:schemeClr val="accent1">
+                <a:shade val="15000"/>
+              </a:schemeClr>
+            </a:lnRef>
+            <a:fillRef idx="1">
+              <a:schemeClr val="accent1"/>
+            </a:fillRef>
+            <a:effectRef idx="0">
+              <a:schemeClr val="accent1"/>
+            </a:effectRef>
+            <a:fontRef idx="minor">
+              <a:schemeClr val="lt1"/>
+            </a:fontRef>
+          </p:style>
+          <p:txBody>
+            <a:bodyPr wrap="square" rtlCol="0" anchor="ctr">
+              <a:noAutofit/>
+            </a:bodyPr>
+            <a:lstStyle/>
+            <a:p>
+              <a:pPr algn="ctr"/>
+              <a:endParaRPr lang="ko-KR" altLang="en-US"/>
+            </a:p>
+          </p:txBody>
+        </p:sp>
+        <p:sp>
+          <p:nvSpPr>
+            <p:cNvPr id="77" name="자유형: 도형 76">
+              <a:extLst>
+                <a:ext uri="{FF2B5EF4-FFF2-40B4-BE49-F238E27FC236}">
+                  <a16:creationId xmlns:a16="http://schemas.microsoft.com/office/drawing/2014/main" id="{95BA6F7F-E43A-FCFC-138B-03A1BC0E7098}"/>
+                </a:ext>
+              </a:extLst>
+            </p:cNvPr>
+            <p:cNvSpPr/>
+            <p:nvPr/>
+          </p:nvSpPr>
+          <p:spPr>
+            <a:xfrm rot="18900000">
+              <a:off x="2772392" y="3582970"/>
+              <a:ext cx="288602" cy="248749"/>
+            </a:xfrm>
+            <a:custGeom>
+              <a:avLst/>
+              <a:gdLst>
+                <a:gd name="connsiteX0" fmla="*/ 164812 w 288602"/>
+                <a:gd name="connsiteY0" fmla="*/ 15580 h 248749"/>
+                <a:gd name="connsiteX1" fmla="*/ 164812 w 288602"/>
+                <a:gd name="connsiteY1" fmla="*/ 43576 h 248749"/>
+                <a:gd name="connsiteX2" fmla="*/ 164302 w 288602"/>
+                <a:gd name="connsiteY2" fmla="*/ 44086 h 248749"/>
+                <a:gd name="connsiteX3" fmla="*/ 164302 w 288602"/>
+                <a:gd name="connsiteY3" fmla="*/ 71737 h 248749"/>
+                <a:gd name="connsiteX4" fmla="*/ 288602 w 288602"/>
+                <a:gd name="connsiteY4" fmla="*/ 196037 h 248749"/>
+                <a:gd name="connsiteX5" fmla="*/ 235889 w 288602"/>
+                <a:gd name="connsiteY5" fmla="*/ 248749 h 248749"/>
+                <a:gd name="connsiteX6" fmla="*/ 137804 w 288602"/>
+                <a:gd name="connsiteY6" fmla="*/ 248749 h 248749"/>
+                <a:gd name="connsiteX7" fmla="*/ 139840 w 288602"/>
+                <a:gd name="connsiteY7" fmla="*/ 246713 h 248749"/>
+                <a:gd name="connsiteX8" fmla="*/ 139840 w 288602"/>
+                <a:gd name="connsiteY8" fmla="*/ 184296 h 248749"/>
+                <a:gd name="connsiteX9" fmla="*/ 70312 w 288602"/>
+                <a:gd name="connsiteY9" fmla="*/ 114767 h 248749"/>
+                <a:gd name="connsiteX10" fmla="*/ 68395 w 288602"/>
+                <a:gd name="connsiteY10" fmla="*/ 116684 h 248749"/>
+                <a:gd name="connsiteX11" fmla="*/ 22798 w 288602"/>
+                <a:gd name="connsiteY11" fmla="*/ 116684 h 248749"/>
+                <a:gd name="connsiteX12" fmla="*/ 0 w 288602"/>
+                <a:gd name="connsiteY12" fmla="*/ 93886 h 248749"/>
+                <a:gd name="connsiteX13" fmla="*/ 71249 w 288602"/>
+                <a:gd name="connsiteY13" fmla="*/ 22637 h 248749"/>
+                <a:gd name="connsiteX14" fmla="*/ 98599 w 288602"/>
+                <a:gd name="connsiteY14" fmla="*/ 22636 h 248749"/>
+                <a:gd name="connsiteX15" fmla="*/ 121236 w 288602"/>
+                <a:gd name="connsiteY15" fmla="*/ 0 h 248749"/>
+                <a:gd name="connsiteX16" fmla="*/ 149231 w 288602"/>
+                <a:gd name="connsiteY16" fmla="*/ 0 h 248749"/>
+              </a:gdLst>
+              <a:ahLst/>
+              <a:cxnLst>
+                <a:cxn ang="0">
+                  <a:pos x="connsiteX0" y="connsiteY0"/>
+                </a:cxn>
+                <a:cxn ang="0">
+                  <a:pos x="connsiteX1" y="connsiteY1"/>
+                </a:cxn>
+                <a:cxn ang="0">
+                  <a:pos x="connsiteX2" y="connsiteY2"/>
+                </a:cxn>
+                <a:cxn ang="0">
+                  <a:pos x="connsiteX3" y="connsiteY3"/>
+                </a:cxn>
+                <a:cxn ang="0">
+                  <a:pos x="connsiteX4" y="connsiteY4"/>
+                </a:cxn>
+                <a:cxn ang="0">
+                  <a:pos x="connsiteX5" y="connsiteY5"/>
+                </a:cxn>
+                <a:cxn ang="0">
+                  <a:pos x="connsiteX6" y="connsiteY6"/>
+                </a:cxn>
+                <a:cxn ang="0">
+                  <a:pos x="connsiteX7" y="connsiteY7"/>
+                </a:cxn>
+                <a:cxn ang="0">
+                  <a:pos x="connsiteX8" y="connsiteY8"/>
+                </a:cxn>
+                <a:cxn ang="0">
+                  <a:pos x="connsiteX9" y="connsiteY9"/>
+                </a:cxn>
+                <a:cxn ang="0">
+                  <a:pos x="connsiteX10" y="connsiteY10"/>
+                </a:cxn>
+                <a:cxn ang="0">
+                  <a:pos x="connsiteX11" y="connsiteY11"/>
+                </a:cxn>
+                <a:cxn ang="0">
+                  <a:pos x="connsiteX12" y="connsiteY12"/>
+                </a:cxn>
+                <a:cxn ang="0">
+                  <a:pos x="connsiteX13" y="connsiteY13"/>
+                </a:cxn>
+                <a:cxn ang="0">
+                  <a:pos x="connsiteX14" y="connsiteY14"/>
+                </a:cxn>
+                <a:cxn ang="0">
+                  <a:pos x="connsiteX15" y="connsiteY15"/>
+                </a:cxn>
+                <a:cxn ang="0">
+                  <a:pos x="connsiteX16" y="connsiteY16"/>
+                </a:cxn>
+              </a:cxnLst>
+              <a:rect l="l" t="t" r="r" b="b"/>
+              <a:pathLst>
+                <a:path w="288602" h="248749">
+                  <a:moveTo>
+                    <a:pt x="164812" y="15580"/>
+                  </a:moveTo>
+                  <a:lnTo>
+                    <a:pt x="164812" y="43576"/>
+                  </a:lnTo>
+                  <a:lnTo>
+                    <a:pt x="164302" y="44086"/>
+                  </a:lnTo>
+                  <a:lnTo>
+                    <a:pt x="164302" y="71737"/>
+                  </a:lnTo>
+                  <a:lnTo>
+                    <a:pt x="288602" y="196037"/>
+                  </a:lnTo>
+                  <a:lnTo>
+                    <a:pt x="235889" y="248749"/>
+                  </a:lnTo>
+                  <a:lnTo>
+                    <a:pt x="137804" y="248749"/>
+                  </a:lnTo>
+                  <a:lnTo>
+                    <a:pt x="139840" y="246713"/>
+                  </a:lnTo>
+                  <a:lnTo>
+                    <a:pt x="139840" y="184296"/>
+                  </a:lnTo>
+                  <a:lnTo>
+                    <a:pt x="70312" y="114767"/>
+                  </a:lnTo>
+                  <a:lnTo>
+                    <a:pt x="68395" y="116684"/>
+                  </a:lnTo>
+                  <a:lnTo>
+                    <a:pt x="22798" y="116684"/>
+                  </a:lnTo>
+                  <a:lnTo>
+                    <a:pt x="0" y="93886"/>
+                  </a:lnTo>
+                  <a:lnTo>
+                    <a:pt x="71249" y="22637"/>
+                  </a:lnTo>
+                  <a:lnTo>
+                    <a:pt x="98599" y="22636"/>
+                  </a:lnTo>
+                  <a:lnTo>
+                    <a:pt x="121236" y="0"/>
+                  </a:lnTo>
+                  <a:lnTo>
+                    <a:pt x="149231" y="0"/>
+                  </a:lnTo>
+                  <a:close/>
+                </a:path>
+              </a:pathLst>
+            </a:custGeom>
+            <a:solidFill>
+              <a:srgbClr val="C5181A"/>
+            </a:solidFill>
+            <a:ln>
+              <a:noFill/>
+            </a:ln>
+          </p:spPr>
+          <p:style>
+            <a:lnRef idx="2">
+              <a:schemeClr val="accent1">
+                <a:shade val="15000"/>
+              </a:schemeClr>
+            </a:lnRef>
+            <a:fillRef idx="1">
+              <a:schemeClr val="accent1"/>
+            </a:fillRef>
+            <a:effectRef idx="0">
+              <a:schemeClr val="accent1"/>
+            </a:effectRef>
+            <a:fontRef idx="minor">
+              <a:schemeClr val="lt1"/>
+            </a:fontRef>
+          </p:style>
+          <p:txBody>
+            <a:bodyPr wrap="square" rtlCol="0" anchor="ctr">
+              <a:noAutofit/>
+            </a:bodyPr>
+            <a:lstStyle/>
+            <a:p>
+              <a:pPr algn="ctr"/>
+              <a:endParaRPr lang="ko-KR" altLang="en-US"/>
+            </a:p>
+          </p:txBody>
+        </p:sp>
+        <p:sp>
+          <p:nvSpPr>
+            <p:cNvPr id="78" name="팔각형 77">
+              <a:extLst>
+                <a:ext uri="{FF2B5EF4-FFF2-40B4-BE49-F238E27FC236}">
+                  <a16:creationId xmlns:a16="http://schemas.microsoft.com/office/drawing/2014/main" id="{6C42D346-3264-BE8C-10FF-51D162BAB2BE}"/>
+                </a:ext>
+              </a:extLst>
+            </p:cNvPr>
+            <p:cNvSpPr/>
+            <p:nvPr/>
+          </p:nvSpPr>
+          <p:spPr>
+            <a:xfrm rot="10800000" flipH="1" flipV="1">
+              <a:off x="2812438" y="3773198"/>
+              <a:ext cx="182478" cy="182478"/>
+            </a:xfrm>
+            <a:prstGeom prst="octagon">
+              <a:avLst/>
+            </a:prstGeom>
+            <a:solidFill>
+              <a:srgbClr val="EB935E"/>
+            </a:solidFill>
+            <a:ln>
+              <a:noFill/>
+            </a:ln>
+          </p:spPr>
+          <p:style>
+            <a:lnRef idx="2">
+              <a:schemeClr val="accent1">
+                <a:shade val="15000"/>
+              </a:schemeClr>
+            </a:lnRef>
+            <a:fillRef idx="1">
+              <a:schemeClr val="accent1"/>
+            </a:fillRef>
+            <a:effectRef idx="0">
+              <a:schemeClr val="accent1"/>
+            </a:effectRef>
+            <a:fontRef idx="minor">
+              <a:schemeClr val="lt1"/>
+            </a:fontRef>
+          </p:style>
+          <p:txBody>
+            <a:bodyPr rtlCol="0" anchor="ctr"/>
+            <a:lstStyle/>
+            <a:p>
+              <a:pPr algn="ctr"/>
+              <a:endParaRPr lang="ko-KR" altLang="en-US"/>
+            </a:p>
+          </p:txBody>
+        </p:sp>
+        <p:sp>
+          <p:nvSpPr>
+            <p:cNvPr id="79" name="자유형: 도형 78">
+              <a:extLst>
+                <a:ext uri="{FF2B5EF4-FFF2-40B4-BE49-F238E27FC236}">
+                  <a16:creationId xmlns:a16="http://schemas.microsoft.com/office/drawing/2014/main" id="{EAE7D869-A0EA-0E8D-63D4-B2592429E0F4}"/>
+                </a:ext>
+              </a:extLst>
+            </p:cNvPr>
+            <p:cNvSpPr/>
+            <p:nvPr/>
+          </p:nvSpPr>
+          <p:spPr>
+            <a:xfrm>
+              <a:off x="3131563" y="2726088"/>
+              <a:ext cx="734378" cy="343194"/>
+            </a:xfrm>
+            <a:custGeom>
+              <a:avLst/>
+              <a:gdLst>
+                <a:gd name="connsiteX0" fmla="*/ 22201 w 734378"/>
+                <a:gd name="connsiteY0" fmla="*/ 0 h 343194"/>
+                <a:gd name="connsiteX1" fmla="*/ 53598 w 734378"/>
+                <a:gd name="connsiteY1" fmla="*/ 0 h 343194"/>
+                <a:gd name="connsiteX2" fmla="*/ 320994 w 734378"/>
+                <a:gd name="connsiteY2" fmla="*/ 267395 h 343194"/>
+                <a:gd name="connsiteX3" fmla="*/ 444328 w 734378"/>
+                <a:gd name="connsiteY3" fmla="*/ 267395 h 343194"/>
+                <a:gd name="connsiteX4" fmla="*/ 444328 w 734378"/>
+                <a:gd name="connsiteY4" fmla="*/ 266866 h 343194"/>
+                <a:gd name="connsiteX5" fmla="*/ 699690 w 734378"/>
+                <a:gd name="connsiteY5" fmla="*/ 11504 h 343194"/>
+                <a:gd name="connsiteX6" fmla="*/ 720009 w 734378"/>
+                <a:gd name="connsiteY6" fmla="*/ 11504 h 343194"/>
+                <a:gd name="connsiteX7" fmla="*/ 734378 w 734378"/>
+                <a:gd name="connsiteY7" fmla="*/ 25873 h 343194"/>
+                <a:gd name="connsiteX8" fmla="*/ 734378 w 734378"/>
+                <a:gd name="connsiteY8" fmla="*/ 46193 h 343194"/>
+                <a:gd name="connsiteX9" fmla="*/ 485109 w 734378"/>
+                <a:gd name="connsiteY9" fmla="*/ 295462 h 343194"/>
+                <a:gd name="connsiteX10" fmla="*/ 485109 w 734378"/>
+                <a:gd name="connsiteY10" fmla="*/ 320993 h 343194"/>
+                <a:gd name="connsiteX11" fmla="*/ 462908 w 734378"/>
+                <a:gd name="connsiteY11" fmla="*/ 343194 h 343194"/>
+                <a:gd name="connsiteX12" fmla="*/ 288418 w 734378"/>
+                <a:gd name="connsiteY12" fmla="*/ 343194 h 343194"/>
+                <a:gd name="connsiteX13" fmla="*/ 266217 w 734378"/>
+                <a:gd name="connsiteY13" fmla="*/ 320993 h 343194"/>
+                <a:gd name="connsiteX14" fmla="*/ 266217 w 734378"/>
+                <a:gd name="connsiteY14" fmla="*/ 319815 h 343194"/>
+                <a:gd name="connsiteX15" fmla="*/ 0 w 734378"/>
+                <a:gd name="connsiteY15" fmla="*/ 53598 h 343194"/>
+                <a:gd name="connsiteX16" fmla="*/ 0 w 734378"/>
+                <a:gd name="connsiteY16" fmla="*/ 22201 h 343194"/>
+              </a:gdLst>
+              <a:ahLst/>
+              <a:cxnLst>
+                <a:cxn ang="0">
+                  <a:pos x="connsiteX0" y="connsiteY0"/>
+                </a:cxn>
+                <a:cxn ang="0">
+                  <a:pos x="connsiteX1" y="connsiteY1"/>
+                </a:cxn>
+                <a:cxn ang="0">
+                  <a:pos x="connsiteX2" y="connsiteY2"/>
+                </a:cxn>
+                <a:cxn ang="0">
+                  <a:pos x="connsiteX3" y="connsiteY3"/>
+                </a:cxn>
+                <a:cxn ang="0">
+                  <a:pos x="connsiteX4" y="connsiteY4"/>
+                </a:cxn>
+                <a:cxn ang="0">
+                  <a:pos x="connsiteX5" y="connsiteY5"/>
+                </a:cxn>
+                <a:cxn ang="0">
+                  <a:pos x="connsiteX6" y="connsiteY6"/>
+                </a:cxn>
+                <a:cxn ang="0">
+                  <a:pos x="connsiteX7" y="connsiteY7"/>
+                </a:cxn>
+                <a:cxn ang="0">
+                  <a:pos x="connsiteX8" y="connsiteY8"/>
+                </a:cxn>
+                <a:cxn ang="0">
+                  <a:pos x="connsiteX9" y="connsiteY9"/>
+                </a:cxn>
+                <a:cxn ang="0">
+                  <a:pos x="connsiteX10" y="connsiteY10"/>
+                </a:cxn>
+                <a:cxn ang="0">
+                  <a:pos x="connsiteX11" y="connsiteY11"/>
+                </a:cxn>
+                <a:cxn ang="0">
+                  <a:pos x="connsiteX12" y="connsiteY12"/>
+                </a:cxn>
+                <a:cxn ang="0">
+                  <a:pos x="connsiteX13" y="connsiteY13"/>
+                </a:cxn>
+                <a:cxn ang="0">
+                  <a:pos x="connsiteX14" y="connsiteY14"/>
+                </a:cxn>
+                <a:cxn ang="0">
+                  <a:pos x="connsiteX15" y="connsiteY15"/>
+                </a:cxn>
+                <a:cxn ang="0">
+                  <a:pos x="connsiteX16" y="connsiteY16"/>
+                </a:cxn>
+              </a:cxnLst>
+              <a:rect l="l" t="t" r="r" b="b"/>
+              <a:pathLst>
+                <a:path w="734378" h="343194">
+                  <a:moveTo>
+                    <a:pt x="22201" y="0"/>
+                  </a:moveTo>
+                  <a:lnTo>
+                    <a:pt x="53598" y="0"/>
+                  </a:lnTo>
+                  <a:lnTo>
+                    <a:pt x="320994" y="267395"/>
+                  </a:lnTo>
+                  <a:lnTo>
+                    <a:pt x="444328" y="267395"/>
+                  </a:lnTo>
+                  <a:lnTo>
+                    <a:pt x="444328" y="266866"/>
+                  </a:lnTo>
+                  <a:lnTo>
+                    <a:pt x="699690" y="11504"/>
+                  </a:lnTo>
+                  <a:lnTo>
+                    <a:pt x="720009" y="11504"/>
+                  </a:lnTo>
+                  <a:lnTo>
+                    <a:pt x="734378" y="25873"/>
+                  </a:lnTo>
+                  <a:lnTo>
+                    <a:pt x="734378" y="46193"/>
+                  </a:lnTo>
+                  <a:lnTo>
+                    <a:pt x="485109" y="295462"/>
+                  </a:lnTo>
+                  <a:lnTo>
+                    <a:pt x="485109" y="320993"/>
+                  </a:lnTo>
+                  <a:lnTo>
+                    <a:pt x="462908" y="343194"/>
+                  </a:lnTo>
+                  <a:lnTo>
+                    <a:pt x="288418" y="343194"/>
+                  </a:lnTo>
+                  <a:lnTo>
+                    <a:pt x="266217" y="320993"/>
+                  </a:lnTo>
+                  <a:lnTo>
+                    <a:pt x="266217" y="319815"/>
+                  </a:lnTo>
+                  <a:lnTo>
+                    <a:pt x="0" y="53598"/>
+                  </a:lnTo>
+                  <a:lnTo>
+                    <a:pt x="0" y="22201"/>
+                  </a:lnTo>
+                  <a:close/>
+                </a:path>
+              </a:pathLst>
+            </a:custGeom>
+            <a:solidFill>
+              <a:srgbClr val="FFFF01"/>
+            </a:solidFill>
+            <a:ln>
+              <a:noFill/>
+            </a:ln>
+          </p:spPr>
+          <p:style>
+            <a:lnRef idx="2">
+              <a:schemeClr val="accent1">
+                <a:shade val="15000"/>
+              </a:schemeClr>
+            </a:lnRef>
+            <a:fillRef idx="1">
+              <a:schemeClr val="accent1"/>
+            </a:fillRef>
+            <a:effectRef idx="0">
+              <a:schemeClr val="accent1"/>
+            </a:effectRef>
+            <a:fontRef idx="minor">
+              <a:schemeClr val="lt1"/>
+            </a:fontRef>
+          </p:style>
+          <p:txBody>
+            <a:bodyPr wrap="square" rtlCol="0" anchor="ctr">
+              <a:noAutofit/>
+            </a:bodyPr>
+            <a:lstStyle/>
+            <a:p>
+              <a:pPr algn="ctr"/>
+              <a:endParaRPr lang="ko-KR" altLang="en-US"/>
+            </a:p>
+          </p:txBody>
+        </p:sp>
+      </p:grpSp>
     </p:spTree>
     <p:extLst>
       <p:ext uri="{BB962C8B-B14F-4D97-AF65-F5344CB8AC3E}">
@@ -21022,4 +24097,299 @@
     </a:ext>
   </a:extLst>
 </a:theme>
+</file>
+
+<file path=ppt/theme/theme2.xml><?xml version="1.0" encoding="utf-8"?>
+<a:theme xmlns:a="http://schemas.openxmlformats.org/drawingml/2006/main" name="Office 테마">
+  <a:themeElements>
+    <a:clrScheme name="Office">
+      <a:dk1>
+        <a:sysClr val="windowText" lastClr="000000"/>
+      </a:dk1>
+      <a:lt1>
+        <a:sysClr val="window" lastClr="FFFFFF"/>
+      </a:lt1>
+      <a:dk2>
+        <a:srgbClr val="44546A"/>
+      </a:dk2>
+      <a:lt2>
+        <a:srgbClr val="E7E6E6"/>
+      </a:lt2>
+      <a:accent1>
+        <a:srgbClr val="4472C4"/>
+      </a:accent1>
+      <a:accent2>
+        <a:srgbClr val="ED7D31"/>
+      </a:accent2>
+      <a:accent3>
+        <a:srgbClr val="A5A5A5"/>
+      </a:accent3>
+      <a:accent4>
+        <a:srgbClr val="FFC000"/>
+      </a:accent4>
+      <a:accent5>
+        <a:srgbClr val="5B9BD5"/>
+      </a:accent5>
+      <a:accent6>
+        <a:srgbClr val="70AD47"/>
+      </a:accent6>
+      <a:hlink>
+        <a:srgbClr val="0563C1"/>
+      </a:hlink>
+      <a:folHlink>
+        <a:srgbClr val="954F72"/>
+      </a:folHlink>
+    </a:clrScheme>
+    <a:fontScheme name="Office">
+      <a:majorFont>
+        <a:latin typeface="맑은 고딕" panose="020F0302020204030204"/>
+        <a:ea typeface=""/>
+        <a:cs typeface=""/>
+        <a:font script="Jpan" typeface="游ゴシック Light"/>
+        <a:font script="Hang" typeface="맑은 고딕"/>
+        <a:font script="Hans" typeface="等线 Light"/>
+        <a:font script="Hant" typeface="新細明體"/>
+        <a:font script="Arab" typeface="Times New Roman"/>
+        <a:font script="Hebr" typeface="Times New Roman"/>
+        <a:font script="Thai" typeface="Angsana New"/>
+        <a:font script="Ethi" typeface="Nyala"/>
+        <a:font script="Beng" typeface="Vrinda"/>
+        <a:font script="Gujr" typeface="Shruti"/>
+        <a:font script="Khmr" typeface="MoolBoran"/>
+        <a:font script="Knda" typeface="Tunga"/>
+        <a:font script="Guru" typeface="Raavi"/>
+        <a:font script="Cans" typeface="Euphemia"/>
+        <a:font script="Cher" typeface="Plantagenet Cherokee"/>
+        <a:font script="Yiii" typeface="Microsoft Yi Baiti"/>
+        <a:font script="Tibt" typeface="Microsoft Himalaya"/>
+        <a:font script="Thaa" typeface="MV Boli"/>
+        <a:font script="Deva" typeface="Mangal"/>
+        <a:font script="Telu" typeface="Gautami"/>
+        <a:font script="Taml" typeface="Latha"/>
+        <a:font script="Syrc" typeface="Estrangelo Edessa"/>
+        <a:font script="Orya" typeface="Kalinga"/>
+        <a:font script="Mlym" typeface="Kartika"/>
+        <a:font script="Laoo" typeface="DokChampa"/>
+        <a:font script="Sinh" typeface="Iskoola Pota"/>
+        <a:font script="Mong" typeface="Mongolian Baiti"/>
+        <a:font script="Viet" typeface="Times New Roman"/>
+        <a:font script="Uigh" typeface="Microsoft Uighur"/>
+        <a:font script="Geor" typeface="Sylfaen"/>
+        <a:font script="Armn" typeface="Arial"/>
+        <a:font script="Bugi" typeface="Leelawadee UI"/>
+        <a:font script="Bopo" typeface="Microsoft JhengHei"/>
+        <a:font script="Java" typeface="Javanese Text"/>
+        <a:font script="Lisu" typeface="Segoe UI"/>
+        <a:font script="Mymr" typeface="Myanmar Text"/>
+        <a:font script="Nkoo" typeface="Ebrima"/>
+        <a:font script="Olck" typeface="Nirmala UI"/>
+        <a:font script="Osma" typeface="Ebrima"/>
+        <a:font script="Phag" typeface="Phagspa"/>
+        <a:font script="Syrn" typeface="Estrangelo Edessa"/>
+        <a:font script="Syrj" typeface="Estrangelo Edessa"/>
+        <a:font script="Syre" typeface="Estrangelo Edessa"/>
+        <a:font script="Sora" typeface="Nirmala UI"/>
+        <a:font script="Tale" typeface="Microsoft Tai Le"/>
+        <a:font script="Talu" typeface="Microsoft New Tai Lue"/>
+        <a:font script="Tfng" typeface="Ebrima"/>
+      </a:majorFont>
+      <a:minorFont>
+        <a:latin typeface="맑은 고딕" panose="020F0502020204030204"/>
+        <a:ea typeface=""/>
+        <a:cs typeface=""/>
+        <a:font script="Jpan" typeface="游ゴシック"/>
+        <a:font script="Hang" typeface="맑은 고딕"/>
+        <a:font script="Hans" typeface="等线"/>
+        <a:font script="Hant" typeface="新細明體"/>
+        <a:font script="Arab" typeface="Arial"/>
+        <a:font script="Hebr" typeface="Arial"/>
+        <a:font script="Thai" typeface="Cordia New"/>
+        <a:font script="Ethi" typeface="Nyala"/>
+        <a:font script="Beng" typeface="Vrinda"/>
+        <a:font script="Gujr" typeface="Shruti"/>
+        <a:font script="Khmr" typeface="DaunPenh"/>
+        <a:font script="Knda" typeface="Tunga"/>
+        <a:font script="Guru" typeface="Raavi"/>
+        <a:font script="Cans" typeface="Euphemia"/>
+        <a:font script="Cher" typeface="Plantagenet Cherokee"/>
+        <a:font script="Yiii" typeface="Microsoft Yi Baiti"/>
+        <a:font script="Tibt" typeface="Microsoft Himalaya"/>
+        <a:font script="Thaa" typeface="MV Boli"/>
+        <a:font script="Deva" typeface="Mangal"/>
+        <a:font script="Telu" typeface="Gautami"/>
+        <a:font script="Taml" typeface="Latha"/>
+        <a:font script="Syrc" typeface="Estrangelo Edessa"/>
+        <a:font script="Orya" typeface="Kalinga"/>
+        <a:font script="Mlym" typeface="Kartika"/>
+        <a:font script="Laoo" typeface="DokChampa"/>
+        <a:font script="Sinh" typeface="Iskoola Pota"/>
+        <a:font script="Mong" typeface="Mongolian Baiti"/>
+        <a:font script="Viet" typeface="Arial"/>
+        <a:font script="Uigh" typeface="Microsoft Uighur"/>
+        <a:font script="Geor" typeface="Sylfaen"/>
+        <a:font script="Armn" typeface="Arial"/>
+        <a:font script="Bugi" typeface="Leelawadee UI"/>
+        <a:font script="Bopo" typeface="Microsoft JhengHei"/>
+        <a:font script="Java" typeface="Javanese Text"/>
+        <a:font script="Lisu" typeface="Segoe UI"/>
+        <a:font script="Mymr" typeface="Myanmar Text"/>
+        <a:font script="Nkoo" typeface="Ebrima"/>
+        <a:font script="Olck" typeface="Nirmala UI"/>
+        <a:font script="Osma" typeface="Ebrima"/>
+        <a:font script="Phag" typeface="Phagspa"/>
+        <a:font script="Syrn" typeface="Estrangelo Edessa"/>
+        <a:font script="Syrj" typeface="Estrangelo Edessa"/>
+        <a:font script="Syre" typeface="Estrangelo Edessa"/>
+        <a:font script="Sora" typeface="Nirmala UI"/>
+        <a:font script="Tale" typeface="Microsoft Tai Le"/>
+        <a:font script="Talu" typeface="Microsoft New Tai Lue"/>
+        <a:font script="Tfng" typeface="Ebrima"/>
+      </a:minorFont>
+    </a:fontScheme>
+    <a:fmtScheme name="Office">
+      <a:fillStyleLst>
+        <a:solidFill>
+          <a:schemeClr val="phClr"/>
+        </a:solidFill>
+        <a:gradFill rotWithShape="1">
+          <a:gsLst>
+            <a:gs pos="0">
+              <a:schemeClr val="phClr">
+                <a:lumMod val="110000"/>
+                <a:satMod val="105000"/>
+                <a:tint val="67000"/>
+              </a:schemeClr>
+            </a:gs>
+            <a:gs pos="50000">
+              <a:schemeClr val="phClr">
+                <a:lumMod val="105000"/>
+                <a:satMod val="103000"/>
+                <a:tint val="73000"/>
+              </a:schemeClr>
+            </a:gs>
+            <a:gs pos="100000">
+              <a:schemeClr val="phClr">
+                <a:lumMod val="105000"/>
+                <a:satMod val="109000"/>
+                <a:tint val="81000"/>
+              </a:schemeClr>
+            </a:gs>
+          </a:gsLst>
+          <a:lin ang="5400000" scaled="0"/>
+        </a:gradFill>
+        <a:gradFill rotWithShape="1">
+          <a:gsLst>
+            <a:gs pos="0">
+              <a:schemeClr val="phClr">
+                <a:satMod val="103000"/>
+                <a:lumMod val="102000"/>
+                <a:tint val="94000"/>
+              </a:schemeClr>
+            </a:gs>
+            <a:gs pos="50000">
+              <a:schemeClr val="phClr">
+                <a:satMod val="110000"/>
+                <a:lumMod val="100000"/>
+                <a:shade val="100000"/>
+              </a:schemeClr>
+            </a:gs>
+            <a:gs pos="100000">
+              <a:schemeClr val="phClr">
+                <a:lumMod val="99000"/>
+                <a:satMod val="120000"/>
+                <a:shade val="78000"/>
+              </a:schemeClr>
+            </a:gs>
+          </a:gsLst>
+          <a:lin ang="5400000" scaled="0"/>
+        </a:gradFill>
+      </a:fillStyleLst>
+      <a:lnStyleLst>
+        <a:ln w="6350" cap="flat" cmpd="sng" algn="ctr">
+          <a:solidFill>
+            <a:schemeClr val="phClr"/>
+          </a:solidFill>
+          <a:prstDash val="solid"/>
+          <a:miter lim="800000"/>
+        </a:ln>
+        <a:ln w="12700" cap="flat" cmpd="sng" algn="ctr">
+          <a:solidFill>
+            <a:schemeClr val="phClr"/>
+          </a:solidFill>
+          <a:prstDash val="solid"/>
+          <a:miter lim="800000"/>
+        </a:ln>
+        <a:ln w="19050" cap="flat" cmpd="sng" algn="ctr">
+          <a:solidFill>
+            <a:schemeClr val="phClr"/>
+          </a:solidFill>
+          <a:prstDash val="solid"/>
+          <a:miter lim="800000"/>
+        </a:ln>
+      </a:lnStyleLst>
+      <a:effectStyleLst>
+        <a:effectStyle>
+          <a:effectLst/>
+        </a:effectStyle>
+        <a:effectStyle>
+          <a:effectLst/>
+        </a:effectStyle>
+        <a:effectStyle>
+          <a:effectLst>
+            <a:outerShdw blurRad="57150" dist="19050" dir="5400000" algn="ctr" rotWithShape="0">
+              <a:srgbClr val="000000">
+                <a:alpha val="63000"/>
+              </a:srgbClr>
+            </a:outerShdw>
+          </a:effectLst>
+        </a:effectStyle>
+      </a:effectStyleLst>
+      <a:bgFillStyleLst>
+        <a:solidFill>
+          <a:schemeClr val="phClr"/>
+        </a:solidFill>
+        <a:solidFill>
+          <a:schemeClr val="phClr">
+            <a:tint val="95000"/>
+            <a:satMod val="170000"/>
+          </a:schemeClr>
+        </a:solidFill>
+        <a:gradFill rotWithShape="1">
+          <a:gsLst>
+            <a:gs pos="0">
+              <a:schemeClr val="phClr">
+                <a:tint val="93000"/>
+                <a:satMod val="150000"/>
+                <a:shade val="98000"/>
+                <a:lumMod val="102000"/>
+              </a:schemeClr>
+            </a:gs>
+            <a:gs pos="50000">
+              <a:schemeClr val="phClr">
+                <a:tint val="98000"/>
+                <a:satMod val="130000"/>
+                <a:shade val="90000"/>
+                <a:lumMod val="103000"/>
+              </a:schemeClr>
+            </a:gs>
+            <a:gs pos="100000">
+              <a:schemeClr val="phClr">
+                <a:shade val="63000"/>
+                <a:satMod val="120000"/>
+              </a:schemeClr>
+            </a:gs>
+          </a:gsLst>
+          <a:lin ang="5400000" scaled="0"/>
+        </a:gradFill>
+      </a:bgFillStyleLst>
+    </a:fmtScheme>
+  </a:themeElements>
+  <a:objectDefaults/>
+  <a:extraClrSchemeLst/>
+  <a:extLst>
+    <a:ext uri="{05A4C25C-085E-4340-85A3-A5531E510DB2}">
+      <thm15:themeFamily xmlns:thm15="http://schemas.microsoft.com/office/thememl/2012/main" name="Office Theme" id="{62F939B6-93AF-4DB8-9C6B-D6C7DFDC589F}" vid="{4A3C46E8-61CC-4603-A589-7422A47A8E4A}"/>
+    </a:ext>
+  </a:extLst>
+</a:theme>
 </file>
</xml_diff>

<commit_message>
Afreeca TV Icon Added
</commit_message>
<xml_diff>
--- a/tepk2924_Custon_Icon.pptx
+++ b/tepk2924_Custon_Icon.pptx
@@ -212,7 +212,7 @@
           <a:p>
             <a:fld id="{10460FAE-A4BB-46CF-AB3F-8A65ECE16F8C}" type="datetimeFigureOut">
               <a:rPr lang="ko-KR" altLang="en-US" smtClean="0"/>
-              <a:t>2024-08-05</a:t>
+              <a:t>2024-08-07</a:t>
             </a:fld>
             <a:endParaRPr lang="ko-KR" altLang="en-US"/>
           </a:p>
@@ -710,7 +710,7 @@
           <a:p>
             <a:fld id="{5514A77A-5394-47DD-9A3D-6F42195EF4ED}" type="datetimeFigureOut">
               <a:rPr lang="ko-KR" altLang="en-US" smtClean="0"/>
-              <a:t>2024-08-05</a:t>
+              <a:t>2024-08-07</a:t>
             </a:fld>
             <a:endParaRPr lang="ko-KR" altLang="en-US"/>
           </a:p>
@@ -908,7 +908,7 @@
           <a:p>
             <a:fld id="{5514A77A-5394-47DD-9A3D-6F42195EF4ED}" type="datetimeFigureOut">
               <a:rPr lang="ko-KR" altLang="en-US" smtClean="0"/>
-              <a:t>2024-08-05</a:t>
+              <a:t>2024-08-07</a:t>
             </a:fld>
             <a:endParaRPr lang="ko-KR" altLang="en-US"/>
           </a:p>
@@ -1116,7 +1116,7 @@
           <a:p>
             <a:fld id="{5514A77A-5394-47DD-9A3D-6F42195EF4ED}" type="datetimeFigureOut">
               <a:rPr lang="ko-KR" altLang="en-US" smtClean="0"/>
-              <a:t>2024-08-05</a:t>
+              <a:t>2024-08-07</a:t>
             </a:fld>
             <a:endParaRPr lang="ko-KR" altLang="en-US"/>
           </a:p>
@@ -1314,7 +1314,7 @@
           <a:p>
             <a:fld id="{5514A77A-5394-47DD-9A3D-6F42195EF4ED}" type="datetimeFigureOut">
               <a:rPr lang="ko-KR" altLang="en-US" smtClean="0"/>
-              <a:t>2024-08-05</a:t>
+              <a:t>2024-08-07</a:t>
             </a:fld>
             <a:endParaRPr lang="ko-KR" altLang="en-US"/>
           </a:p>
@@ -1589,7 +1589,7 @@
           <a:p>
             <a:fld id="{5514A77A-5394-47DD-9A3D-6F42195EF4ED}" type="datetimeFigureOut">
               <a:rPr lang="ko-KR" altLang="en-US" smtClean="0"/>
-              <a:t>2024-08-05</a:t>
+              <a:t>2024-08-07</a:t>
             </a:fld>
             <a:endParaRPr lang="ko-KR" altLang="en-US"/>
           </a:p>
@@ -1854,7 +1854,7 @@
           <a:p>
             <a:fld id="{5514A77A-5394-47DD-9A3D-6F42195EF4ED}" type="datetimeFigureOut">
               <a:rPr lang="ko-KR" altLang="en-US" smtClean="0"/>
-              <a:t>2024-08-05</a:t>
+              <a:t>2024-08-07</a:t>
             </a:fld>
             <a:endParaRPr lang="ko-KR" altLang="en-US"/>
           </a:p>
@@ -2266,7 +2266,7 @@
           <a:p>
             <a:fld id="{5514A77A-5394-47DD-9A3D-6F42195EF4ED}" type="datetimeFigureOut">
               <a:rPr lang="ko-KR" altLang="en-US" smtClean="0"/>
-              <a:t>2024-08-05</a:t>
+              <a:t>2024-08-07</a:t>
             </a:fld>
             <a:endParaRPr lang="ko-KR" altLang="en-US"/>
           </a:p>
@@ -2407,7 +2407,7 @@
           <a:p>
             <a:fld id="{5514A77A-5394-47DD-9A3D-6F42195EF4ED}" type="datetimeFigureOut">
               <a:rPr lang="ko-KR" altLang="en-US" smtClean="0"/>
-              <a:t>2024-08-05</a:t>
+              <a:t>2024-08-07</a:t>
             </a:fld>
             <a:endParaRPr lang="ko-KR" altLang="en-US"/>
           </a:p>
@@ -2520,7 +2520,7 @@
           <a:p>
             <a:fld id="{5514A77A-5394-47DD-9A3D-6F42195EF4ED}" type="datetimeFigureOut">
               <a:rPr lang="ko-KR" altLang="en-US" smtClean="0"/>
-              <a:t>2024-08-05</a:t>
+              <a:t>2024-08-07</a:t>
             </a:fld>
             <a:endParaRPr lang="ko-KR" altLang="en-US"/>
           </a:p>
@@ -2831,7 +2831,7 @@
           <a:p>
             <a:fld id="{5514A77A-5394-47DD-9A3D-6F42195EF4ED}" type="datetimeFigureOut">
               <a:rPr lang="ko-KR" altLang="en-US" smtClean="0"/>
-              <a:t>2024-08-05</a:t>
+              <a:t>2024-08-07</a:t>
             </a:fld>
             <a:endParaRPr lang="ko-KR" altLang="en-US"/>
           </a:p>
@@ -3119,7 +3119,7 @@
           <a:p>
             <a:fld id="{5514A77A-5394-47DD-9A3D-6F42195EF4ED}" type="datetimeFigureOut">
               <a:rPr lang="ko-KR" altLang="en-US" smtClean="0"/>
-              <a:t>2024-08-05</a:t>
+              <a:t>2024-08-07</a:t>
             </a:fld>
             <a:endParaRPr lang="ko-KR" altLang="en-US"/>
           </a:p>
@@ -3360,7 +3360,7 @@
           <a:p>
             <a:fld id="{5514A77A-5394-47DD-9A3D-6F42195EF4ED}" type="datetimeFigureOut">
               <a:rPr lang="ko-KR" altLang="en-US" smtClean="0"/>
-              <a:t>2024-08-05</a:t>
+              <a:t>2024-08-07</a:t>
             </a:fld>
             <a:endParaRPr lang="ko-KR" altLang="en-US"/>
           </a:p>
@@ -3831,7 +3831,7 @@
       </p:sp>
       <p:sp>
         <p:nvSpPr>
-          <p:cNvPr id="5" name="직사각형 4">
+          <p:cNvPr id="6" name="직사각형 5">
             <a:extLst>
               <a:ext uri="{FF2B5EF4-FFF2-40B4-BE49-F238E27FC236}">
                 <a16:creationId xmlns:a16="http://schemas.microsoft.com/office/drawing/2014/main" id="{06B4E298-DAFB-4FBD-2AC4-D44E05385CFD}"/>
@@ -23756,6 +23756,931 @@
           </p:txBody>
         </p:sp>
       </p:grpSp>
+      <p:grpSp>
+        <p:nvGrpSpPr>
+          <p:cNvPr id="36" name="그룹 35">
+            <a:extLst>
+              <a:ext uri="{FF2B5EF4-FFF2-40B4-BE49-F238E27FC236}">
+                <a16:creationId xmlns:a16="http://schemas.microsoft.com/office/drawing/2014/main" id="{038828CB-8558-D20F-D118-7895B2BA5123}"/>
+              </a:ext>
+            </a:extLst>
+          </p:cNvPr>
+          <p:cNvGrpSpPr/>
+          <p:nvPr/>
+        </p:nvGrpSpPr>
+        <p:grpSpPr>
+          <a:xfrm>
+            <a:off x="4080708" y="219047"/>
+            <a:ext cx="1440000" cy="1440000"/>
+            <a:chOff x="3208473" y="2709000"/>
+            <a:chExt cx="1440000" cy="1440000"/>
+          </a:xfrm>
+        </p:grpSpPr>
+        <p:sp>
+          <p:nvSpPr>
+            <p:cNvPr id="2" name="직사각형 1">
+              <a:extLst>
+                <a:ext uri="{FF2B5EF4-FFF2-40B4-BE49-F238E27FC236}">
+                  <a16:creationId xmlns:a16="http://schemas.microsoft.com/office/drawing/2014/main" id="{983B2C81-892F-6F7B-2E7E-76E1F0B3F3ED}"/>
+                </a:ext>
+              </a:extLst>
+            </p:cNvPr>
+            <p:cNvSpPr/>
+            <p:nvPr/>
+          </p:nvSpPr>
+          <p:spPr>
+            <a:xfrm>
+              <a:off x="3208473" y="2709000"/>
+              <a:ext cx="1440000" cy="1440000"/>
+            </a:xfrm>
+            <a:prstGeom prst="rect">
+              <a:avLst/>
+            </a:prstGeom>
+            <a:noFill/>
+            <a:ln>
+              <a:noFill/>
+            </a:ln>
+          </p:spPr>
+          <p:style>
+            <a:lnRef idx="2">
+              <a:schemeClr val="accent1">
+                <a:shade val="15000"/>
+              </a:schemeClr>
+            </a:lnRef>
+            <a:fillRef idx="1">
+              <a:schemeClr val="accent1"/>
+            </a:fillRef>
+            <a:effectRef idx="0">
+              <a:schemeClr val="accent1"/>
+            </a:effectRef>
+            <a:fontRef idx="minor">
+              <a:schemeClr val="lt1"/>
+            </a:fontRef>
+          </p:style>
+          <p:txBody>
+            <a:bodyPr wrap="square" rtlCol="0" anchor="ctr">
+              <a:noAutofit/>
+            </a:bodyPr>
+            <a:lstStyle/>
+            <a:p>
+              <a:pPr algn="ctr"/>
+              <a:endParaRPr lang="ko-KR" altLang="en-US"/>
+            </a:p>
+          </p:txBody>
+        </p:sp>
+        <p:sp>
+          <p:nvSpPr>
+            <p:cNvPr id="34" name="자유형: 도형 33">
+              <a:extLst>
+                <a:ext uri="{FF2B5EF4-FFF2-40B4-BE49-F238E27FC236}">
+                  <a16:creationId xmlns:a16="http://schemas.microsoft.com/office/drawing/2014/main" id="{CF75581E-6A02-D957-4C19-BCCC4A578559}"/>
+                </a:ext>
+              </a:extLst>
+            </p:cNvPr>
+            <p:cNvSpPr/>
+            <p:nvPr/>
+          </p:nvSpPr>
+          <p:spPr>
+            <a:xfrm>
+              <a:off x="3357041" y="2964415"/>
+              <a:ext cx="1100206" cy="1100206"/>
+            </a:xfrm>
+            <a:custGeom>
+              <a:avLst/>
+              <a:gdLst>
+                <a:gd name="connsiteX0" fmla="*/ 249883 w 1100206"/>
+                <a:gd name="connsiteY0" fmla="*/ 739339 h 1100206"/>
+                <a:gd name="connsiteX1" fmla="*/ 365072 w 1100206"/>
+                <a:gd name="connsiteY1" fmla="*/ 850821 h 1100206"/>
+                <a:gd name="connsiteX2" fmla="*/ 365072 w 1100206"/>
+                <a:gd name="connsiteY2" fmla="*/ 852705 h 1100206"/>
+                <a:gd name="connsiteX3" fmla="*/ 754099 w 1100206"/>
+                <a:gd name="connsiteY3" fmla="*/ 852705 h 1100206"/>
+                <a:gd name="connsiteX4" fmla="*/ 754099 w 1100206"/>
+                <a:gd name="connsiteY4" fmla="*/ 852828 h 1100206"/>
+                <a:gd name="connsiteX5" fmla="*/ 865581 w 1100206"/>
+                <a:gd name="connsiteY5" fmla="*/ 741346 h 1100206"/>
+                <a:gd name="connsiteX6" fmla="*/ 816456 w 1100206"/>
+                <a:gd name="connsiteY6" fmla="*/ 741346 h 1100206"/>
+                <a:gd name="connsiteX7" fmla="*/ 754099 w 1100206"/>
+                <a:gd name="connsiteY7" fmla="*/ 803703 h 1100206"/>
+                <a:gd name="connsiteX8" fmla="*/ 754099 w 1100206"/>
+                <a:gd name="connsiteY8" fmla="*/ 801850 h 1100206"/>
+                <a:gd name="connsiteX9" fmla="*/ 365072 w 1100206"/>
+                <a:gd name="connsiteY9" fmla="*/ 801850 h 1100206"/>
+                <a:gd name="connsiteX10" fmla="*/ 365072 w 1100206"/>
+                <a:gd name="connsiteY10" fmla="*/ 801695 h 1100206"/>
+                <a:gd name="connsiteX11" fmla="*/ 300642 w 1100206"/>
+                <a:gd name="connsiteY11" fmla="*/ 739339 h 1100206"/>
+                <a:gd name="connsiteX12" fmla="*/ 435324 w 1100206"/>
+                <a:gd name="connsiteY12" fmla="*/ 269323 h 1100206"/>
+                <a:gd name="connsiteX13" fmla="*/ 383906 w 1100206"/>
+                <a:gd name="connsiteY13" fmla="*/ 320741 h 1100206"/>
+                <a:gd name="connsiteX14" fmla="*/ 383906 w 1100206"/>
+                <a:gd name="connsiteY14" fmla="*/ 608427 h 1100206"/>
+                <a:gd name="connsiteX15" fmla="*/ 435324 w 1100206"/>
+                <a:gd name="connsiteY15" fmla="*/ 659845 h 1100206"/>
+                <a:gd name="connsiteX16" fmla="*/ 664880 w 1100206"/>
+                <a:gd name="connsiteY16" fmla="*/ 659845 h 1100206"/>
+                <a:gd name="connsiteX17" fmla="*/ 716298 w 1100206"/>
+                <a:gd name="connsiteY17" fmla="*/ 608427 h 1100206"/>
+                <a:gd name="connsiteX18" fmla="*/ 716298 w 1100206"/>
+                <a:gd name="connsiteY18" fmla="*/ 320741 h 1100206"/>
+                <a:gd name="connsiteX19" fmla="*/ 664880 w 1100206"/>
+                <a:gd name="connsiteY19" fmla="*/ 269323 h 1100206"/>
+                <a:gd name="connsiteX20" fmla="*/ 170191 w 1100206"/>
+                <a:gd name="connsiteY20" fmla="*/ 0 h 1100206"/>
+                <a:gd name="connsiteX21" fmla="*/ 930015 w 1100206"/>
+                <a:gd name="connsiteY21" fmla="*/ 0 h 1100206"/>
+                <a:gd name="connsiteX22" fmla="*/ 1100206 w 1100206"/>
+                <a:gd name="connsiteY22" fmla="*/ 170191 h 1100206"/>
+                <a:gd name="connsiteX23" fmla="*/ 1100206 w 1100206"/>
+                <a:gd name="connsiteY23" fmla="*/ 250140 h 1100206"/>
+                <a:gd name="connsiteX24" fmla="*/ 930078 w 1100206"/>
+                <a:gd name="connsiteY24" fmla="*/ 80012 h 1100206"/>
+                <a:gd name="connsiteX25" fmla="*/ 800875 w 1100206"/>
+                <a:gd name="connsiteY25" fmla="*/ 80012 h 1100206"/>
+                <a:gd name="connsiteX26" fmla="*/ 747612 w 1100206"/>
+                <a:gd name="connsiteY26" fmla="*/ 133275 h 1100206"/>
+                <a:gd name="connsiteX27" fmla="*/ 747612 w 1100206"/>
+                <a:gd name="connsiteY27" fmla="*/ 491093 h 1100206"/>
+                <a:gd name="connsiteX28" fmla="*/ 800875 w 1100206"/>
+                <a:gd name="connsiteY28" fmla="*/ 544356 h 1100206"/>
+                <a:gd name="connsiteX29" fmla="*/ 935180 w 1100206"/>
+                <a:gd name="connsiteY29" fmla="*/ 544356 h 1100206"/>
+                <a:gd name="connsiteX30" fmla="*/ 1100206 w 1100206"/>
+                <a:gd name="connsiteY30" fmla="*/ 379330 h 1100206"/>
+                <a:gd name="connsiteX31" fmla="*/ 1100206 w 1100206"/>
+                <a:gd name="connsiteY31" fmla="*/ 930015 h 1100206"/>
+                <a:gd name="connsiteX32" fmla="*/ 930015 w 1100206"/>
+                <a:gd name="connsiteY32" fmla="*/ 1100206 h 1100206"/>
+                <a:gd name="connsiteX33" fmla="*/ 170191 w 1100206"/>
+                <a:gd name="connsiteY33" fmla="*/ 1100206 h 1100206"/>
+                <a:gd name="connsiteX34" fmla="*/ 0 w 1100206"/>
+                <a:gd name="connsiteY34" fmla="*/ 930015 h 1100206"/>
+                <a:gd name="connsiteX35" fmla="*/ 0 w 1100206"/>
+                <a:gd name="connsiteY35" fmla="*/ 468610 h 1100206"/>
+                <a:gd name="connsiteX36" fmla="*/ 53124 w 1100206"/>
+                <a:gd name="connsiteY36" fmla="*/ 521734 h 1100206"/>
+                <a:gd name="connsiteX37" fmla="*/ 290298 w 1100206"/>
+                <a:gd name="connsiteY37" fmla="*/ 521734 h 1100206"/>
+                <a:gd name="connsiteX38" fmla="*/ 343422 w 1100206"/>
+                <a:gd name="connsiteY38" fmla="*/ 468610 h 1100206"/>
+                <a:gd name="connsiteX39" fmla="*/ 343422 w 1100206"/>
+                <a:gd name="connsiteY39" fmla="*/ 155760 h 1100206"/>
+                <a:gd name="connsiteX40" fmla="*/ 290298 w 1100206"/>
+                <a:gd name="connsiteY40" fmla="*/ 102636 h 1100206"/>
+                <a:gd name="connsiteX41" fmla="*/ 67555 w 1100206"/>
+                <a:gd name="connsiteY41" fmla="*/ 102636 h 1100206"/>
+              </a:gdLst>
+              <a:ahLst/>
+              <a:cxnLst>
+                <a:cxn ang="0">
+                  <a:pos x="connsiteX0" y="connsiteY0"/>
+                </a:cxn>
+                <a:cxn ang="0">
+                  <a:pos x="connsiteX1" y="connsiteY1"/>
+                </a:cxn>
+                <a:cxn ang="0">
+                  <a:pos x="connsiteX2" y="connsiteY2"/>
+                </a:cxn>
+                <a:cxn ang="0">
+                  <a:pos x="connsiteX3" y="connsiteY3"/>
+                </a:cxn>
+                <a:cxn ang="0">
+                  <a:pos x="connsiteX4" y="connsiteY4"/>
+                </a:cxn>
+                <a:cxn ang="0">
+                  <a:pos x="connsiteX5" y="connsiteY5"/>
+                </a:cxn>
+                <a:cxn ang="0">
+                  <a:pos x="connsiteX6" y="connsiteY6"/>
+                </a:cxn>
+                <a:cxn ang="0">
+                  <a:pos x="connsiteX7" y="connsiteY7"/>
+                </a:cxn>
+                <a:cxn ang="0">
+                  <a:pos x="connsiteX8" y="connsiteY8"/>
+                </a:cxn>
+                <a:cxn ang="0">
+                  <a:pos x="connsiteX9" y="connsiteY9"/>
+                </a:cxn>
+                <a:cxn ang="0">
+                  <a:pos x="connsiteX10" y="connsiteY10"/>
+                </a:cxn>
+                <a:cxn ang="0">
+                  <a:pos x="connsiteX11" y="connsiteY11"/>
+                </a:cxn>
+                <a:cxn ang="0">
+                  <a:pos x="connsiteX12" y="connsiteY12"/>
+                </a:cxn>
+                <a:cxn ang="0">
+                  <a:pos x="connsiteX13" y="connsiteY13"/>
+                </a:cxn>
+                <a:cxn ang="0">
+                  <a:pos x="connsiteX14" y="connsiteY14"/>
+                </a:cxn>
+                <a:cxn ang="0">
+                  <a:pos x="connsiteX15" y="connsiteY15"/>
+                </a:cxn>
+                <a:cxn ang="0">
+                  <a:pos x="connsiteX16" y="connsiteY16"/>
+                </a:cxn>
+                <a:cxn ang="0">
+                  <a:pos x="connsiteX17" y="connsiteY17"/>
+                </a:cxn>
+                <a:cxn ang="0">
+                  <a:pos x="connsiteX18" y="connsiteY18"/>
+                </a:cxn>
+                <a:cxn ang="0">
+                  <a:pos x="connsiteX19" y="connsiteY19"/>
+                </a:cxn>
+                <a:cxn ang="0">
+                  <a:pos x="connsiteX20" y="connsiteY20"/>
+                </a:cxn>
+                <a:cxn ang="0">
+                  <a:pos x="connsiteX21" y="connsiteY21"/>
+                </a:cxn>
+                <a:cxn ang="0">
+                  <a:pos x="connsiteX22" y="connsiteY22"/>
+                </a:cxn>
+                <a:cxn ang="0">
+                  <a:pos x="connsiteX23" y="connsiteY23"/>
+                </a:cxn>
+                <a:cxn ang="0">
+                  <a:pos x="connsiteX24" y="connsiteY24"/>
+                </a:cxn>
+                <a:cxn ang="0">
+                  <a:pos x="connsiteX25" y="connsiteY25"/>
+                </a:cxn>
+                <a:cxn ang="0">
+                  <a:pos x="connsiteX26" y="connsiteY26"/>
+                </a:cxn>
+                <a:cxn ang="0">
+                  <a:pos x="connsiteX27" y="connsiteY27"/>
+                </a:cxn>
+                <a:cxn ang="0">
+                  <a:pos x="connsiteX28" y="connsiteY28"/>
+                </a:cxn>
+                <a:cxn ang="0">
+                  <a:pos x="connsiteX29" y="connsiteY29"/>
+                </a:cxn>
+                <a:cxn ang="0">
+                  <a:pos x="connsiteX30" y="connsiteY30"/>
+                </a:cxn>
+                <a:cxn ang="0">
+                  <a:pos x="connsiteX31" y="connsiteY31"/>
+                </a:cxn>
+                <a:cxn ang="0">
+                  <a:pos x="connsiteX32" y="connsiteY32"/>
+                </a:cxn>
+                <a:cxn ang="0">
+                  <a:pos x="connsiteX33" y="connsiteY33"/>
+                </a:cxn>
+                <a:cxn ang="0">
+                  <a:pos x="connsiteX34" y="connsiteY34"/>
+                </a:cxn>
+                <a:cxn ang="0">
+                  <a:pos x="connsiteX35" y="connsiteY35"/>
+                </a:cxn>
+                <a:cxn ang="0">
+                  <a:pos x="connsiteX36" y="connsiteY36"/>
+                </a:cxn>
+                <a:cxn ang="0">
+                  <a:pos x="connsiteX37" y="connsiteY37"/>
+                </a:cxn>
+                <a:cxn ang="0">
+                  <a:pos x="connsiteX38" y="connsiteY38"/>
+                </a:cxn>
+                <a:cxn ang="0">
+                  <a:pos x="connsiteX39" y="connsiteY39"/>
+                </a:cxn>
+                <a:cxn ang="0">
+                  <a:pos x="connsiteX40" y="connsiteY40"/>
+                </a:cxn>
+                <a:cxn ang="0">
+                  <a:pos x="connsiteX41" y="connsiteY41"/>
+                </a:cxn>
+              </a:cxnLst>
+              <a:rect l="l" t="t" r="r" b="b"/>
+              <a:pathLst>
+                <a:path w="1100206" h="1100206">
+                  <a:moveTo>
+                    <a:pt x="249883" y="739339"/>
+                  </a:moveTo>
+                  <a:lnTo>
+                    <a:pt x="365072" y="850821"/>
+                  </a:lnTo>
+                  <a:lnTo>
+                    <a:pt x="365072" y="852705"/>
+                  </a:lnTo>
+                  <a:lnTo>
+                    <a:pt x="754099" y="852705"/>
+                  </a:lnTo>
+                  <a:lnTo>
+                    <a:pt x="754099" y="852828"/>
+                  </a:lnTo>
+                  <a:lnTo>
+                    <a:pt x="865581" y="741346"/>
+                  </a:lnTo>
+                  <a:lnTo>
+                    <a:pt x="816456" y="741346"/>
+                  </a:lnTo>
+                  <a:lnTo>
+                    <a:pt x="754099" y="803703"/>
+                  </a:lnTo>
+                  <a:lnTo>
+                    <a:pt x="754099" y="801850"/>
+                  </a:lnTo>
+                  <a:lnTo>
+                    <a:pt x="365072" y="801850"/>
+                  </a:lnTo>
+                  <a:lnTo>
+                    <a:pt x="365072" y="801695"/>
+                  </a:lnTo>
+                  <a:lnTo>
+                    <a:pt x="300642" y="739339"/>
+                  </a:lnTo>
+                  <a:close/>
+                  <a:moveTo>
+                    <a:pt x="435324" y="269323"/>
+                  </a:moveTo>
+                  <a:lnTo>
+                    <a:pt x="383906" y="320741"/>
+                  </a:lnTo>
+                  <a:lnTo>
+                    <a:pt x="383906" y="608427"/>
+                  </a:lnTo>
+                  <a:lnTo>
+                    <a:pt x="435324" y="659845"/>
+                  </a:lnTo>
+                  <a:lnTo>
+                    <a:pt x="664880" y="659845"/>
+                  </a:lnTo>
+                  <a:lnTo>
+                    <a:pt x="716298" y="608427"/>
+                  </a:lnTo>
+                  <a:lnTo>
+                    <a:pt x="716298" y="320741"/>
+                  </a:lnTo>
+                  <a:lnTo>
+                    <a:pt x="664880" y="269323"/>
+                  </a:lnTo>
+                  <a:close/>
+                  <a:moveTo>
+                    <a:pt x="170191" y="0"/>
+                  </a:moveTo>
+                  <a:lnTo>
+                    <a:pt x="930015" y="0"/>
+                  </a:lnTo>
+                  <a:lnTo>
+                    <a:pt x="1100206" y="170191"/>
+                  </a:lnTo>
+                  <a:lnTo>
+                    <a:pt x="1100206" y="250140"/>
+                  </a:lnTo>
+                  <a:lnTo>
+                    <a:pt x="930078" y="80012"/>
+                  </a:lnTo>
+                  <a:lnTo>
+                    <a:pt x="800875" y="80012"/>
+                  </a:lnTo>
+                  <a:lnTo>
+                    <a:pt x="747612" y="133275"/>
+                  </a:lnTo>
+                  <a:lnTo>
+                    <a:pt x="747612" y="491093"/>
+                  </a:lnTo>
+                  <a:lnTo>
+                    <a:pt x="800875" y="544356"/>
+                  </a:lnTo>
+                  <a:lnTo>
+                    <a:pt x="935180" y="544356"/>
+                  </a:lnTo>
+                  <a:lnTo>
+                    <a:pt x="1100206" y="379330"/>
+                  </a:lnTo>
+                  <a:lnTo>
+                    <a:pt x="1100206" y="930015"/>
+                  </a:lnTo>
+                  <a:lnTo>
+                    <a:pt x="930015" y="1100206"/>
+                  </a:lnTo>
+                  <a:lnTo>
+                    <a:pt x="170191" y="1100206"/>
+                  </a:lnTo>
+                  <a:lnTo>
+                    <a:pt x="0" y="930015"/>
+                  </a:lnTo>
+                  <a:lnTo>
+                    <a:pt x="0" y="468610"/>
+                  </a:lnTo>
+                  <a:lnTo>
+                    <a:pt x="53124" y="521734"/>
+                  </a:lnTo>
+                  <a:lnTo>
+                    <a:pt x="290298" y="521734"/>
+                  </a:lnTo>
+                  <a:lnTo>
+                    <a:pt x="343422" y="468610"/>
+                  </a:lnTo>
+                  <a:lnTo>
+                    <a:pt x="343422" y="155760"/>
+                  </a:lnTo>
+                  <a:lnTo>
+                    <a:pt x="290298" y="102636"/>
+                  </a:lnTo>
+                  <a:lnTo>
+                    <a:pt x="67555" y="102636"/>
+                  </a:lnTo>
+                  <a:close/>
+                </a:path>
+              </a:pathLst>
+            </a:custGeom>
+            <a:solidFill>
+              <a:srgbClr val="0543AB"/>
+            </a:solidFill>
+            <a:ln>
+              <a:noFill/>
+            </a:ln>
+          </p:spPr>
+          <p:style>
+            <a:lnRef idx="2">
+              <a:schemeClr val="accent1">
+                <a:shade val="15000"/>
+              </a:schemeClr>
+            </a:lnRef>
+            <a:fillRef idx="1">
+              <a:schemeClr val="accent1"/>
+            </a:fillRef>
+            <a:effectRef idx="0">
+              <a:schemeClr val="accent1"/>
+            </a:effectRef>
+            <a:fontRef idx="minor">
+              <a:schemeClr val="lt1"/>
+            </a:fontRef>
+          </p:style>
+          <p:txBody>
+            <a:bodyPr wrap="square" rtlCol="0" anchor="ctr">
+              <a:noAutofit/>
+            </a:bodyPr>
+            <a:lstStyle/>
+            <a:p>
+              <a:pPr algn="ctr"/>
+              <a:endParaRPr lang="ko-KR" altLang="en-US"/>
+            </a:p>
+          </p:txBody>
+        </p:sp>
+        <p:sp>
+          <p:nvSpPr>
+            <p:cNvPr id="7" name="팔각형 6">
+              <a:extLst>
+                <a:ext uri="{FF2B5EF4-FFF2-40B4-BE49-F238E27FC236}">
+                  <a16:creationId xmlns:a16="http://schemas.microsoft.com/office/drawing/2014/main" id="{CFEDCB05-DE59-111C-2379-F8DBE195B2CD}"/>
+                </a:ext>
+              </a:extLst>
+            </p:cNvPr>
+            <p:cNvSpPr/>
+            <p:nvPr/>
+          </p:nvSpPr>
+          <p:spPr>
+            <a:xfrm>
+              <a:off x="3568646" y="2824541"/>
+              <a:ext cx="279727" cy="110992"/>
+            </a:xfrm>
+            <a:prstGeom prst="octagon">
+              <a:avLst>
+                <a:gd name="adj" fmla="val 15469"/>
+              </a:avLst>
+            </a:prstGeom>
+            <a:solidFill>
+              <a:srgbClr val="0543AB"/>
+            </a:solidFill>
+            <a:ln>
+              <a:noFill/>
+            </a:ln>
+          </p:spPr>
+          <p:style>
+            <a:lnRef idx="2">
+              <a:schemeClr val="accent1">
+                <a:shade val="15000"/>
+              </a:schemeClr>
+            </a:lnRef>
+            <a:fillRef idx="1">
+              <a:schemeClr val="accent1"/>
+            </a:fillRef>
+            <a:effectRef idx="0">
+              <a:schemeClr val="accent1"/>
+            </a:effectRef>
+            <a:fontRef idx="minor">
+              <a:schemeClr val="lt1"/>
+            </a:fontRef>
+          </p:style>
+          <p:txBody>
+            <a:bodyPr rtlCol="0" anchor="ctr"/>
+            <a:lstStyle/>
+            <a:p>
+              <a:pPr algn="ctr"/>
+              <a:endParaRPr lang="ko-KR" altLang="en-US"/>
+            </a:p>
+          </p:txBody>
+        </p:sp>
+        <p:sp>
+          <p:nvSpPr>
+            <p:cNvPr id="8" name="팔각형 7">
+              <a:extLst>
+                <a:ext uri="{FF2B5EF4-FFF2-40B4-BE49-F238E27FC236}">
+                  <a16:creationId xmlns:a16="http://schemas.microsoft.com/office/drawing/2014/main" id="{EE0E0E2B-E339-5E20-02DC-8A85F339CC0A}"/>
+                </a:ext>
+              </a:extLst>
+            </p:cNvPr>
+            <p:cNvSpPr/>
+            <p:nvPr/>
+          </p:nvSpPr>
+          <p:spPr>
+            <a:xfrm>
+              <a:off x="3934554" y="2824541"/>
+              <a:ext cx="357571" cy="110992"/>
+            </a:xfrm>
+            <a:prstGeom prst="octagon">
+              <a:avLst>
+                <a:gd name="adj" fmla="val 15469"/>
+              </a:avLst>
+            </a:prstGeom>
+            <a:solidFill>
+              <a:srgbClr val="0543AB"/>
+            </a:solidFill>
+            <a:ln>
+              <a:noFill/>
+            </a:ln>
+          </p:spPr>
+          <p:style>
+            <a:lnRef idx="2">
+              <a:schemeClr val="accent1">
+                <a:shade val="15000"/>
+              </a:schemeClr>
+            </a:lnRef>
+            <a:fillRef idx="1">
+              <a:schemeClr val="accent1"/>
+            </a:fillRef>
+            <a:effectRef idx="0">
+              <a:schemeClr val="accent1"/>
+            </a:effectRef>
+            <a:fontRef idx="minor">
+              <a:schemeClr val="lt1"/>
+            </a:fontRef>
+          </p:style>
+          <p:txBody>
+            <a:bodyPr rtlCol="0" anchor="ctr"/>
+            <a:lstStyle/>
+            <a:p>
+              <a:pPr algn="ctr"/>
+              <a:endParaRPr lang="ko-KR" altLang="en-US"/>
+            </a:p>
+          </p:txBody>
+        </p:sp>
+        <p:sp>
+          <p:nvSpPr>
+            <p:cNvPr id="9" name="팔각형 8">
+              <a:extLst>
+                <a:ext uri="{FF2B5EF4-FFF2-40B4-BE49-F238E27FC236}">
+                  <a16:creationId xmlns:a16="http://schemas.microsoft.com/office/drawing/2014/main" id="{21B0F40C-ACDA-3CC5-3557-4211FDD7E4CD}"/>
+                </a:ext>
+              </a:extLst>
+            </p:cNvPr>
+            <p:cNvSpPr/>
+            <p:nvPr/>
+          </p:nvSpPr>
+          <p:spPr>
+            <a:xfrm>
+              <a:off x="3791719" y="3276600"/>
+              <a:ext cx="230850" cy="304798"/>
+            </a:xfrm>
+            <a:prstGeom prst="octagon">
+              <a:avLst>
+                <a:gd name="adj" fmla="val 15469"/>
+              </a:avLst>
+            </a:prstGeom>
+            <a:solidFill>
+              <a:srgbClr val="19C02E"/>
+            </a:solidFill>
+            <a:ln>
+              <a:noFill/>
+            </a:ln>
+          </p:spPr>
+          <p:style>
+            <a:lnRef idx="2">
+              <a:schemeClr val="accent1">
+                <a:shade val="15000"/>
+              </a:schemeClr>
+            </a:lnRef>
+            <a:fillRef idx="1">
+              <a:schemeClr val="accent1"/>
+            </a:fillRef>
+            <a:effectRef idx="0">
+              <a:schemeClr val="accent1"/>
+            </a:effectRef>
+            <a:fontRef idx="minor">
+              <a:schemeClr val="lt1"/>
+            </a:fontRef>
+          </p:style>
+          <p:txBody>
+            <a:bodyPr rtlCol="0" anchor="ctr"/>
+            <a:lstStyle/>
+            <a:p>
+              <a:pPr algn="ctr"/>
+              <a:endParaRPr lang="ko-KR" altLang="en-US"/>
+            </a:p>
+          </p:txBody>
+        </p:sp>
+        <p:sp>
+          <p:nvSpPr>
+            <p:cNvPr id="11" name="팔각형 10">
+              <a:extLst>
+                <a:ext uri="{FF2B5EF4-FFF2-40B4-BE49-F238E27FC236}">
+                  <a16:creationId xmlns:a16="http://schemas.microsoft.com/office/drawing/2014/main" id="{625B78ED-28C3-E539-F623-8B1DE2832C69}"/>
+                </a:ext>
+              </a:extLst>
+            </p:cNvPr>
+            <p:cNvSpPr/>
+            <p:nvPr/>
+          </p:nvSpPr>
+          <p:spPr>
+            <a:xfrm>
+              <a:off x="3403871" y="3124199"/>
+              <a:ext cx="249762" cy="304800"/>
+            </a:xfrm>
+            <a:prstGeom prst="octagon">
+              <a:avLst>
+                <a:gd name="adj" fmla="val 15469"/>
+              </a:avLst>
+            </a:prstGeom>
+            <a:solidFill>
+              <a:srgbClr val="EA3186"/>
+            </a:solidFill>
+            <a:ln>
+              <a:noFill/>
+            </a:ln>
+          </p:spPr>
+          <p:style>
+            <a:lnRef idx="2">
+              <a:schemeClr val="accent1">
+                <a:shade val="15000"/>
+              </a:schemeClr>
+            </a:lnRef>
+            <a:fillRef idx="1">
+              <a:schemeClr val="accent1"/>
+            </a:fillRef>
+            <a:effectRef idx="0">
+              <a:schemeClr val="accent1"/>
+            </a:effectRef>
+            <a:fontRef idx="minor">
+              <a:schemeClr val="lt1"/>
+            </a:fontRef>
+          </p:style>
+          <p:txBody>
+            <a:bodyPr rtlCol="0" anchor="ctr"/>
+            <a:lstStyle/>
+            <a:p>
+              <a:pPr algn="ctr"/>
+              <a:endParaRPr lang="ko-KR" altLang="en-US"/>
+            </a:p>
+          </p:txBody>
+        </p:sp>
+        <p:sp>
+          <p:nvSpPr>
+            <p:cNvPr id="13" name="팔각형 12">
+              <a:extLst>
+                <a:ext uri="{FF2B5EF4-FFF2-40B4-BE49-F238E27FC236}">
+                  <a16:creationId xmlns:a16="http://schemas.microsoft.com/office/drawing/2014/main" id="{8BC849E5-C53B-857B-8005-F583D1F82465}"/>
+                </a:ext>
+              </a:extLst>
+            </p:cNvPr>
+            <p:cNvSpPr/>
+            <p:nvPr/>
+          </p:nvSpPr>
+          <p:spPr>
+            <a:xfrm flipH="1">
+              <a:off x="3462226" y="3210073"/>
+              <a:ext cx="133052" cy="133052"/>
+            </a:xfrm>
+            <a:prstGeom prst="octagon">
+              <a:avLst/>
+            </a:prstGeom>
+            <a:solidFill>
+              <a:schemeClr val="tx1"/>
+            </a:solidFill>
+            <a:ln>
+              <a:noFill/>
+            </a:ln>
+          </p:spPr>
+          <p:style>
+            <a:lnRef idx="2">
+              <a:schemeClr val="accent1">
+                <a:shade val="15000"/>
+              </a:schemeClr>
+            </a:lnRef>
+            <a:fillRef idx="1">
+              <a:schemeClr val="accent1"/>
+            </a:fillRef>
+            <a:effectRef idx="0">
+              <a:schemeClr val="accent1"/>
+            </a:effectRef>
+            <a:fontRef idx="minor">
+              <a:schemeClr val="lt1"/>
+            </a:fontRef>
+          </p:style>
+          <p:txBody>
+            <a:bodyPr rtlCol="0" anchor="ctr"/>
+            <a:lstStyle/>
+            <a:p>
+              <a:pPr algn="ctr"/>
+              <a:endParaRPr lang="ko-KR" altLang="en-US"/>
+            </a:p>
+          </p:txBody>
+        </p:sp>
+        <p:sp>
+          <p:nvSpPr>
+            <p:cNvPr id="25" name="자유형: 도형 24">
+              <a:extLst>
+                <a:ext uri="{FF2B5EF4-FFF2-40B4-BE49-F238E27FC236}">
+                  <a16:creationId xmlns:a16="http://schemas.microsoft.com/office/drawing/2014/main" id="{E971A90C-AAF4-1AE3-40BE-F827FCD2612B}"/>
+                </a:ext>
+              </a:extLst>
+            </p:cNvPr>
+            <p:cNvSpPr/>
+            <p:nvPr/>
+          </p:nvSpPr>
+          <p:spPr>
+            <a:xfrm>
+              <a:off x="4161654" y="3119493"/>
+              <a:ext cx="238592" cy="314212"/>
+            </a:xfrm>
+            <a:custGeom>
+              <a:avLst/>
+              <a:gdLst>
+                <a:gd name="connsiteX0" fmla="*/ 53263 w 352594"/>
+                <a:gd name="connsiteY0" fmla="*/ 0 h 464344"/>
+                <a:gd name="connsiteX1" fmla="*/ 182466 w 352594"/>
+                <a:gd name="connsiteY1" fmla="*/ 0 h 464344"/>
+                <a:gd name="connsiteX2" fmla="*/ 352594 w 352594"/>
+                <a:gd name="connsiteY2" fmla="*/ 170128 h 464344"/>
+                <a:gd name="connsiteX3" fmla="*/ 352594 w 352594"/>
+                <a:gd name="connsiteY3" fmla="*/ 299318 h 464344"/>
+                <a:gd name="connsiteX4" fmla="*/ 187568 w 352594"/>
+                <a:gd name="connsiteY4" fmla="*/ 464344 h 464344"/>
+                <a:gd name="connsiteX5" fmla="*/ 53263 w 352594"/>
+                <a:gd name="connsiteY5" fmla="*/ 464344 h 464344"/>
+                <a:gd name="connsiteX6" fmla="*/ 0 w 352594"/>
+                <a:gd name="connsiteY6" fmla="*/ 411081 h 464344"/>
+                <a:gd name="connsiteX7" fmla="*/ 0 w 352594"/>
+                <a:gd name="connsiteY7" fmla="*/ 53263 h 464344"/>
+              </a:gdLst>
+              <a:ahLst/>
+              <a:cxnLst>
+                <a:cxn ang="0">
+                  <a:pos x="connsiteX0" y="connsiteY0"/>
+                </a:cxn>
+                <a:cxn ang="0">
+                  <a:pos x="connsiteX1" y="connsiteY1"/>
+                </a:cxn>
+                <a:cxn ang="0">
+                  <a:pos x="connsiteX2" y="connsiteY2"/>
+                </a:cxn>
+                <a:cxn ang="0">
+                  <a:pos x="connsiteX3" y="connsiteY3"/>
+                </a:cxn>
+                <a:cxn ang="0">
+                  <a:pos x="connsiteX4" y="connsiteY4"/>
+                </a:cxn>
+                <a:cxn ang="0">
+                  <a:pos x="connsiteX5" y="connsiteY5"/>
+                </a:cxn>
+                <a:cxn ang="0">
+                  <a:pos x="connsiteX6" y="connsiteY6"/>
+                </a:cxn>
+                <a:cxn ang="0">
+                  <a:pos x="connsiteX7" y="connsiteY7"/>
+                </a:cxn>
+              </a:cxnLst>
+              <a:rect l="l" t="t" r="r" b="b"/>
+              <a:pathLst>
+                <a:path w="352594" h="464344">
+                  <a:moveTo>
+                    <a:pt x="53263" y="0"/>
+                  </a:moveTo>
+                  <a:lnTo>
+                    <a:pt x="182466" y="0"/>
+                  </a:lnTo>
+                  <a:lnTo>
+                    <a:pt x="352594" y="170128"/>
+                  </a:lnTo>
+                  <a:lnTo>
+                    <a:pt x="352594" y="299318"/>
+                  </a:lnTo>
+                  <a:lnTo>
+                    <a:pt x="187568" y="464344"/>
+                  </a:lnTo>
+                  <a:lnTo>
+                    <a:pt x="53263" y="464344"/>
+                  </a:lnTo>
+                  <a:lnTo>
+                    <a:pt x="0" y="411081"/>
+                  </a:lnTo>
+                  <a:lnTo>
+                    <a:pt x="0" y="53263"/>
+                  </a:lnTo>
+                  <a:close/>
+                </a:path>
+              </a:pathLst>
+            </a:custGeom>
+            <a:solidFill>
+              <a:srgbClr val="00B5E6"/>
+            </a:solidFill>
+            <a:ln>
+              <a:noFill/>
+            </a:ln>
+          </p:spPr>
+          <p:style>
+            <a:lnRef idx="2">
+              <a:schemeClr val="accent1">
+                <a:shade val="15000"/>
+              </a:schemeClr>
+            </a:lnRef>
+            <a:fillRef idx="1">
+              <a:schemeClr val="accent1"/>
+            </a:fillRef>
+            <a:effectRef idx="0">
+              <a:schemeClr val="accent1"/>
+            </a:effectRef>
+            <a:fontRef idx="minor">
+              <a:schemeClr val="lt1"/>
+            </a:fontRef>
+          </p:style>
+          <p:txBody>
+            <a:bodyPr wrap="square" rtlCol="0" anchor="ctr">
+              <a:noAutofit/>
+            </a:bodyPr>
+            <a:lstStyle/>
+            <a:p>
+              <a:pPr algn="ctr"/>
+              <a:endParaRPr lang="ko-KR" altLang="en-US"/>
+            </a:p>
+          </p:txBody>
+        </p:sp>
+        <p:sp>
+          <p:nvSpPr>
+            <p:cNvPr id="27" name="팔각형 26">
+              <a:extLst>
+                <a:ext uri="{FF2B5EF4-FFF2-40B4-BE49-F238E27FC236}">
+                  <a16:creationId xmlns:a16="http://schemas.microsoft.com/office/drawing/2014/main" id="{081D526E-FEAB-93FB-5A69-D44BE782372C}"/>
+                </a:ext>
+              </a:extLst>
+            </p:cNvPr>
+            <p:cNvSpPr/>
+            <p:nvPr/>
+          </p:nvSpPr>
+          <p:spPr>
+            <a:xfrm flipH="1">
+              <a:off x="4214424" y="3210073"/>
+              <a:ext cx="133052" cy="133052"/>
+            </a:xfrm>
+            <a:prstGeom prst="octagon">
+              <a:avLst/>
+            </a:prstGeom>
+            <a:solidFill>
+              <a:schemeClr val="tx1"/>
+            </a:solidFill>
+            <a:ln>
+              <a:noFill/>
+            </a:ln>
+          </p:spPr>
+          <p:style>
+            <a:lnRef idx="2">
+              <a:schemeClr val="accent1">
+                <a:shade val="15000"/>
+              </a:schemeClr>
+            </a:lnRef>
+            <a:fillRef idx="1">
+              <a:schemeClr val="accent1"/>
+            </a:fillRef>
+            <a:effectRef idx="0">
+              <a:schemeClr val="accent1"/>
+            </a:effectRef>
+            <a:fontRef idx="minor">
+              <a:schemeClr val="lt1"/>
+            </a:fontRef>
+          </p:style>
+          <p:txBody>
+            <a:bodyPr rtlCol="0" anchor="ctr"/>
+            <a:lstStyle/>
+            <a:p>
+              <a:pPr algn="ctr"/>
+              <a:endParaRPr lang="ko-KR" altLang="en-US"/>
+            </a:p>
+          </p:txBody>
+        </p:sp>
+      </p:grpSp>
     </p:spTree>
     <p:extLst>
       <p:ext uri="{BB962C8B-B14F-4D97-AF65-F5344CB8AC3E}">

</xml_diff>

<commit_message>
Half Life 2 Logo Added
</commit_message>
<xml_diff>
--- a/tepk2924_Custon_Icon.pptx
+++ b/tepk2924_Custon_Icon.pptx
@@ -212,7 +212,7 @@
           <a:p>
             <a:fld id="{10460FAE-A4BB-46CF-AB3F-8A65ECE16F8C}" type="datetimeFigureOut">
               <a:rPr lang="ko-KR" altLang="en-US" smtClean="0"/>
-              <a:t>2024-08-07</a:t>
+              <a:t>2024-12-24</a:t>
             </a:fld>
             <a:endParaRPr lang="ko-KR" altLang="en-US"/>
           </a:p>
@@ -710,7 +710,7 @@
           <a:p>
             <a:fld id="{5514A77A-5394-47DD-9A3D-6F42195EF4ED}" type="datetimeFigureOut">
               <a:rPr lang="ko-KR" altLang="en-US" smtClean="0"/>
-              <a:t>2024-08-07</a:t>
+              <a:t>2024-12-24</a:t>
             </a:fld>
             <a:endParaRPr lang="ko-KR" altLang="en-US"/>
           </a:p>
@@ -908,7 +908,7 @@
           <a:p>
             <a:fld id="{5514A77A-5394-47DD-9A3D-6F42195EF4ED}" type="datetimeFigureOut">
               <a:rPr lang="ko-KR" altLang="en-US" smtClean="0"/>
-              <a:t>2024-08-07</a:t>
+              <a:t>2024-12-24</a:t>
             </a:fld>
             <a:endParaRPr lang="ko-KR" altLang="en-US"/>
           </a:p>
@@ -1116,7 +1116,7 @@
           <a:p>
             <a:fld id="{5514A77A-5394-47DD-9A3D-6F42195EF4ED}" type="datetimeFigureOut">
               <a:rPr lang="ko-KR" altLang="en-US" smtClean="0"/>
-              <a:t>2024-08-07</a:t>
+              <a:t>2024-12-24</a:t>
             </a:fld>
             <a:endParaRPr lang="ko-KR" altLang="en-US"/>
           </a:p>
@@ -1314,7 +1314,7 @@
           <a:p>
             <a:fld id="{5514A77A-5394-47DD-9A3D-6F42195EF4ED}" type="datetimeFigureOut">
               <a:rPr lang="ko-KR" altLang="en-US" smtClean="0"/>
-              <a:t>2024-08-07</a:t>
+              <a:t>2024-12-24</a:t>
             </a:fld>
             <a:endParaRPr lang="ko-KR" altLang="en-US"/>
           </a:p>
@@ -1589,7 +1589,7 @@
           <a:p>
             <a:fld id="{5514A77A-5394-47DD-9A3D-6F42195EF4ED}" type="datetimeFigureOut">
               <a:rPr lang="ko-KR" altLang="en-US" smtClean="0"/>
-              <a:t>2024-08-07</a:t>
+              <a:t>2024-12-24</a:t>
             </a:fld>
             <a:endParaRPr lang="ko-KR" altLang="en-US"/>
           </a:p>
@@ -1854,7 +1854,7 @@
           <a:p>
             <a:fld id="{5514A77A-5394-47DD-9A3D-6F42195EF4ED}" type="datetimeFigureOut">
               <a:rPr lang="ko-KR" altLang="en-US" smtClean="0"/>
-              <a:t>2024-08-07</a:t>
+              <a:t>2024-12-24</a:t>
             </a:fld>
             <a:endParaRPr lang="ko-KR" altLang="en-US"/>
           </a:p>
@@ -2266,7 +2266,7 @@
           <a:p>
             <a:fld id="{5514A77A-5394-47DD-9A3D-6F42195EF4ED}" type="datetimeFigureOut">
               <a:rPr lang="ko-KR" altLang="en-US" smtClean="0"/>
-              <a:t>2024-08-07</a:t>
+              <a:t>2024-12-24</a:t>
             </a:fld>
             <a:endParaRPr lang="ko-KR" altLang="en-US"/>
           </a:p>
@@ -2407,7 +2407,7 @@
           <a:p>
             <a:fld id="{5514A77A-5394-47DD-9A3D-6F42195EF4ED}" type="datetimeFigureOut">
               <a:rPr lang="ko-KR" altLang="en-US" smtClean="0"/>
-              <a:t>2024-08-07</a:t>
+              <a:t>2024-12-24</a:t>
             </a:fld>
             <a:endParaRPr lang="ko-KR" altLang="en-US"/>
           </a:p>
@@ -2520,7 +2520,7 @@
           <a:p>
             <a:fld id="{5514A77A-5394-47DD-9A3D-6F42195EF4ED}" type="datetimeFigureOut">
               <a:rPr lang="ko-KR" altLang="en-US" smtClean="0"/>
-              <a:t>2024-08-07</a:t>
+              <a:t>2024-12-24</a:t>
             </a:fld>
             <a:endParaRPr lang="ko-KR" altLang="en-US"/>
           </a:p>
@@ -2831,7 +2831,7 @@
           <a:p>
             <a:fld id="{5514A77A-5394-47DD-9A3D-6F42195EF4ED}" type="datetimeFigureOut">
               <a:rPr lang="ko-KR" altLang="en-US" smtClean="0"/>
-              <a:t>2024-08-07</a:t>
+              <a:t>2024-12-24</a:t>
             </a:fld>
             <a:endParaRPr lang="ko-KR" altLang="en-US"/>
           </a:p>
@@ -3119,7 +3119,7 @@
           <a:p>
             <a:fld id="{5514A77A-5394-47DD-9A3D-6F42195EF4ED}" type="datetimeFigureOut">
               <a:rPr lang="ko-KR" altLang="en-US" smtClean="0"/>
-              <a:t>2024-08-07</a:t>
+              <a:t>2024-12-24</a:t>
             </a:fld>
             <a:endParaRPr lang="ko-KR" altLang="en-US"/>
           </a:p>
@@ -3360,7 +3360,7 @@
           <a:p>
             <a:fld id="{5514A77A-5394-47DD-9A3D-6F42195EF4ED}" type="datetimeFigureOut">
               <a:rPr lang="ko-KR" altLang="en-US" smtClean="0"/>
-              <a:t>2024-08-07</a:t>
+              <a:t>2024-12-24</a:t>
             </a:fld>
             <a:endParaRPr lang="ko-KR" altLang="en-US"/>
           </a:p>
@@ -4520,7 +4520,7 @@
             <a:lstStyle/>
             <a:p>
               <a:pPr algn="ctr"/>
-              <a:endParaRPr lang="ko-KR" altLang="en-US"/>
+              <a:endParaRPr lang="ko-KR" altLang="en-US" dirty="0"/>
             </a:p>
           </p:txBody>
         </p:sp>
@@ -24681,6 +24681,824 @@
           </p:txBody>
         </p:sp>
       </p:grpSp>
+      <p:grpSp>
+        <p:nvGrpSpPr>
+          <p:cNvPr id="46" name="그룹 45">
+            <a:extLst>
+              <a:ext uri="{FF2B5EF4-FFF2-40B4-BE49-F238E27FC236}">
+                <a16:creationId xmlns:a16="http://schemas.microsoft.com/office/drawing/2014/main" id="{06D90CF0-5A49-F3BC-1828-6452C97DBB28}"/>
+              </a:ext>
+            </a:extLst>
+          </p:cNvPr>
+          <p:cNvGrpSpPr/>
+          <p:nvPr/>
+        </p:nvGrpSpPr>
+        <p:grpSpPr>
+          <a:xfrm>
+            <a:off x="5915396" y="304565"/>
+            <a:ext cx="1440000" cy="1440000"/>
+            <a:chOff x="3107304" y="3429000"/>
+            <a:chExt cx="1440000" cy="1440000"/>
+          </a:xfrm>
+        </p:grpSpPr>
+        <p:sp>
+          <p:nvSpPr>
+            <p:cNvPr id="17" name="직사각형 16">
+              <a:extLst>
+                <a:ext uri="{FF2B5EF4-FFF2-40B4-BE49-F238E27FC236}">
+                  <a16:creationId xmlns:a16="http://schemas.microsoft.com/office/drawing/2014/main" id="{93FCF9C4-AEF6-4110-3A93-5E88FF26E8AA}"/>
+                </a:ext>
+              </a:extLst>
+            </p:cNvPr>
+            <p:cNvSpPr/>
+            <p:nvPr/>
+          </p:nvSpPr>
+          <p:spPr>
+            <a:xfrm>
+              <a:off x="3107304" y="3429000"/>
+              <a:ext cx="1440000" cy="1440000"/>
+            </a:xfrm>
+            <a:prstGeom prst="rect">
+              <a:avLst/>
+            </a:prstGeom>
+            <a:noFill/>
+            <a:ln>
+              <a:noFill/>
+            </a:ln>
+          </p:spPr>
+          <p:style>
+            <a:lnRef idx="2">
+              <a:schemeClr val="accent1">
+                <a:shade val="15000"/>
+              </a:schemeClr>
+            </a:lnRef>
+            <a:fillRef idx="1">
+              <a:schemeClr val="accent1"/>
+            </a:fillRef>
+            <a:effectRef idx="0">
+              <a:schemeClr val="accent1"/>
+            </a:effectRef>
+            <a:fontRef idx="minor">
+              <a:schemeClr val="lt1"/>
+            </a:fontRef>
+          </p:style>
+          <p:txBody>
+            <a:bodyPr wrap="square" rtlCol="0" anchor="ctr">
+              <a:noAutofit/>
+            </a:bodyPr>
+            <a:lstStyle/>
+            <a:p>
+              <a:pPr algn="ctr"/>
+              <a:endParaRPr lang="ko-KR" altLang="en-US"/>
+            </a:p>
+          </p:txBody>
+        </p:sp>
+        <p:sp>
+          <p:nvSpPr>
+            <p:cNvPr id="23" name="자유형: 도형 22">
+              <a:extLst>
+                <a:ext uri="{FF2B5EF4-FFF2-40B4-BE49-F238E27FC236}">
+                  <a16:creationId xmlns:a16="http://schemas.microsoft.com/office/drawing/2014/main" id="{B6AB9F31-9A1C-2163-178E-260CCE2D80A7}"/>
+                </a:ext>
+              </a:extLst>
+            </p:cNvPr>
+            <p:cNvSpPr/>
+            <p:nvPr/>
+          </p:nvSpPr>
+          <p:spPr>
+            <a:xfrm>
+              <a:off x="3111660" y="3671272"/>
+              <a:ext cx="1335571" cy="1083428"/>
+            </a:xfrm>
+            <a:custGeom>
+              <a:avLst/>
+              <a:gdLst>
+                <a:gd name="connsiteX0" fmla="*/ 346599 w 1335571"/>
+                <a:gd name="connsiteY0" fmla="*/ 0 h 1083428"/>
+                <a:gd name="connsiteX1" fmla="*/ 1244543 w 1335571"/>
+                <a:gd name="connsiteY1" fmla="*/ 0 h 1083428"/>
+                <a:gd name="connsiteX2" fmla="*/ 1335571 w 1335571"/>
+                <a:gd name="connsiteY2" fmla="*/ 91028 h 1083428"/>
+                <a:gd name="connsiteX3" fmla="*/ 1335571 w 1335571"/>
+                <a:gd name="connsiteY3" fmla="*/ 322020 h 1083428"/>
+                <a:gd name="connsiteX4" fmla="*/ 1282742 w 1335571"/>
+                <a:gd name="connsiteY4" fmla="*/ 374850 h 1083428"/>
+                <a:gd name="connsiteX5" fmla="*/ 1283260 w 1335571"/>
+                <a:gd name="connsiteY5" fmla="*/ 375368 h 1083428"/>
+                <a:gd name="connsiteX6" fmla="*/ 1080000 w 1335571"/>
+                <a:gd name="connsiteY6" fmla="*/ 578628 h 1083428"/>
+                <a:gd name="connsiteX7" fmla="*/ 1080000 w 1335571"/>
+                <a:gd name="connsiteY7" fmla="*/ 767107 h 1083428"/>
+                <a:gd name="connsiteX8" fmla="*/ 763679 w 1335571"/>
+                <a:gd name="connsiteY8" fmla="*/ 1083428 h 1083428"/>
+                <a:gd name="connsiteX9" fmla="*/ 316321 w 1335571"/>
+                <a:gd name="connsiteY9" fmla="*/ 1083428 h 1083428"/>
+                <a:gd name="connsiteX10" fmla="*/ 0 w 1335571"/>
+                <a:gd name="connsiteY10" fmla="*/ 767107 h 1083428"/>
+                <a:gd name="connsiteX11" fmla="*/ 0 w 1335571"/>
+                <a:gd name="connsiteY11" fmla="*/ 319749 h 1083428"/>
+                <a:gd name="connsiteX12" fmla="*/ 316321 w 1335571"/>
+                <a:gd name="connsiteY12" fmla="*/ 3428 h 1083428"/>
+                <a:gd name="connsiteX13" fmla="*/ 343171 w 1335571"/>
+                <a:gd name="connsiteY13" fmla="*/ 3428 h 1083428"/>
+              </a:gdLst>
+              <a:ahLst/>
+              <a:cxnLst>
+                <a:cxn ang="0">
+                  <a:pos x="connsiteX0" y="connsiteY0"/>
+                </a:cxn>
+                <a:cxn ang="0">
+                  <a:pos x="connsiteX1" y="connsiteY1"/>
+                </a:cxn>
+                <a:cxn ang="0">
+                  <a:pos x="connsiteX2" y="connsiteY2"/>
+                </a:cxn>
+                <a:cxn ang="0">
+                  <a:pos x="connsiteX3" y="connsiteY3"/>
+                </a:cxn>
+                <a:cxn ang="0">
+                  <a:pos x="connsiteX4" y="connsiteY4"/>
+                </a:cxn>
+                <a:cxn ang="0">
+                  <a:pos x="connsiteX5" y="connsiteY5"/>
+                </a:cxn>
+                <a:cxn ang="0">
+                  <a:pos x="connsiteX6" y="connsiteY6"/>
+                </a:cxn>
+                <a:cxn ang="0">
+                  <a:pos x="connsiteX7" y="connsiteY7"/>
+                </a:cxn>
+                <a:cxn ang="0">
+                  <a:pos x="connsiteX8" y="connsiteY8"/>
+                </a:cxn>
+                <a:cxn ang="0">
+                  <a:pos x="connsiteX9" y="connsiteY9"/>
+                </a:cxn>
+                <a:cxn ang="0">
+                  <a:pos x="connsiteX10" y="connsiteY10"/>
+                </a:cxn>
+                <a:cxn ang="0">
+                  <a:pos x="connsiteX11" y="connsiteY11"/>
+                </a:cxn>
+                <a:cxn ang="0">
+                  <a:pos x="connsiteX12" y="connsiteY12"/>
+                </a:cxn>
+                <a:cxn ang="0">
+                  <a:pos x="connsiteX13" y="connsiteY13"/>
+                </a:cxn>
+              </a:cxnLst>
+              <a:rect l="l" t="t" r="r" b="b"/>
+              <a:pathLst>
+                <a:path w="1335571" h="1083428">
+                  <a:moveTo>
+                    <a:pt x="346599" y="0"/>
+                  </a:moveTo>
+                  <a:lnTo>
+                    <a:pt x="1244543" y="0"/>
+                  </a:lnTo>
+                  <a:lnTo>
+                    <a:pt x="1335571" y="91028"/>
+                  </a:lnTo>
+                  <a:lnTo>
+                    <a:pt x="1335571" y="322020"/>
+                  </a:lnTo>
+                  <a:lnTo>
+                    <a:pt x="1282742" y="374850"/>
+                  </a:lnTo>
+                  <a:lnTo>
+                    <a:pt x="1283260" y="375368"/>
+                  </a:lnTo>
+                  <a:lnTo>
+                    <a:pt x="1080000" y="578628"/>
+                  </a:lnTo>
+                  <a:lnTo>
+                    <a:pt x="1080000" y="767107"/>
+                  </a:lnTo>
+                  <a:lnTo>
+                    <a:pt x="763679" y="1083428"/>
+                  </a:lnTo>
+                  <a:lnTo>
+                    <a:pt x="316321" y="1083428"/>
+                  </a:lnTo>
+                  <a:lnTo>
+                    <a:pt x="0" y="767107"/>
+                  </a:lnTo>
+                  <a:lnTo>
+                    <a:pt x="0" y="319749"/>
+                  </a:lnTo>
+                  <a:lnTo>
+                    <a:pt x="316321" y="3428"/>
+                  </a:lnTo>
+                  <a:lnTo>
+                    <a:pt x="343171" y="3428"/>
+                  </a:lnTo>
+                  <a:close/>
+                </a:path>
+              </a:pathLst>
+            </a:custGeom>
+            <a:gradFill>
+              <a:gsLst>
+                <a:gs pos="0">
+                  <a:srgbClr val="858384"/>
+                </a:gs>
+                <a:gs pos="40000">
+                  <a:srgbClr val="868486"/>
+                </a:gs>
+                <a:gs pos="61000">
+                  <a:srgbClr val="353535"/>
+                </a:gs>
+                <a:gs pos="100000">
+                  <a:srgbClr val="272828"/>
+                </a:gs>
+              </a:gsLst>
+              <a:lin ang="5400000" scaled="1"/>
+            </a:gradFill>
+            <a:ln>
+              <a:noFill/>
+            </a:ln>
+          </p:spPr>
+          <p:style>
+            <a:lnRef idx="2">
+              <a:schemeClr val="accent1">
+                <a:shade val="15000"/>
+              </a:schemeClr>
+            </a:lnRef>
+            <a:fillRef idx="1">
+              <a:schemeClr val="accent1"/>
+            </a:fillRef>
+            <a:effectRef idx="0">
+              <a:schemeClr val="accent1"/>
+            </a:effectRef>
+            <a:fontRef idx="minor">
+              <a:schemeClr val="lt1"/>
+            </a:fontRef>
+          </p:style>
+          <p:txBody>
+            <a:bodyPr wrap="square" rtlCol="0" anchor="ctr">
+              <a:noAutofit/>
+            </a:bodyPr>
+            <a:lstStyle/>
+            <a:p>
+              <a:pPr algn="ctr"/>
+              <a:endParaRPr lang="ko-KR" altLang="en-US"/>
+            </a:p>
+          </p:txBody>
+        </p:sp>
+        <p:sp>
+          <p:nvSpPr>
+            <p:cNvPr id="20" name="팔각형 19">
+              <a:extLst>
+                <a:ext uri="{FF2B5EF4-FFF2-40B4-BE49-F238E27FC236}">
+                  <a16:creationId xmlns:a16="http://schemas.microsoft.com/office/drawing/2014/main" id="{A9D6D39A-5F73-E449-F225-BE9A3B76D93D}"/>
+                </a:ext>
+              </a:extLst>
+            </p:cNvPr>
+            <p:cNvSpPr/>
+            <p:nvPr/>
+          </p:nvSpPr>
+          <p:spPr>
+            <a:xfrm>
+              <a:off x="3201660" y="3764700"/>
+              <a:ext cx="900000" cy="900000"/>
+            </a:xfrm>
+            <a:prstGeom prst="octagon">
+              <a:avLst/>
+            </a:prstGeom>
+            <a:gradFill>
+              <a:gsLst>
+                <a:gs pos="0">
+                  <a:srgbClr val="EABC43"/>
+                </a:gs>
+                <a:gs pos="40000">
+                  <a:srgbClr val="DFAF37"/>
+                </a:gs>
+                <a:gs pos="61000">
+                  <a:srgbClr val="C89000"/>
+                </a:gs>
+                <a:gs pos="100000">
+                  <a:srgbClr val="C48C00"/>
+                </a:gs>
+              </a:gsLst>
+              <a:lin ang="5400000" scaled="1"/>
+            </a:gradFill>
+            <a:ln>
+              <a:noFill/>
+            </a:ln>
+          </p:spPr>
+          <p:style>
+            <a:lnRef idx="2">
+              <a:schemeClr val="accent1">
+                <a:shade val="15000"/>
+              </a:schemeClr>
+            </a:lnRef>
+            <a:fillRef idx="1">
+              <a:schemeClr val="accent1"/>
+            </a:fillRef>
+            <a:effectRef idx="0">
+              <a:schemeClr val="accent1"/>
+            </a:effectRef>
+            <a:fontRef idx="minor">
+              <a:schemeClr val="lt1"/>
+            </a:fontRef>
+          </p:style>
+          <p:txBody>
+            <a:bodyPr rtlCol="0" anchor="ctr"/>
+            <a:lstStyle/>
+            <a:p>
+              <a:pPr algn="ctr"/>
+              <a:endParaRPr lang="ko-KR" altLang="en-US"/>
+            </a:p>
+          </p:txBody>
+        </p:sp>
+        <p:sp>
+          <p:nvSpPr>
+            <p:cNvPr id="38" name="자유형: 도형 37">
+              <a:extLst>
+                <a:ext uri="{FF2B5EF4-FFF2-40B4-BE49-F238E27FC236}">
+                  <a16:creationId xmlns:a16="http://schemas.microsoft.com/office/drawing/2014/main" id="{4F23AE1D-A7DF-D4BE-19BB-78EF7005693C}"/>
+                </a:ext>
+              </a:extLst>
+            </p:cNvPr>
+            <p:cNvSpPr/>
+            <p:nvPr/>
+          </p:nvSpPr>
+          <p:spPr>
+            <a:xfrm>
+              <a:off x="4145011" y="3720763"/>
+              <a:ext cx="211553" cy="319858"/>
+            </a:xfrm>
+            <a:custGeom>
+              <a:avLst/>
+              <a:gdLst>
+                <a:gd name="connsiteX0" fmla="*/ 137544 w 211553"/>
+                <a:gd name="connsiteY0" fmla="*/ 0 h 319858"/>
+                <a:gd name="connsiteX1" fmla="*/ 165276 w 211553"/>
+                <a:gd name="connsiteY1" fmla="*/ 0 h 319858"/>
+                <a:gd name="connsiteX2" fmla="*/ 208447 w 211553"/>
+                <a:gd name="connsiteY2" fmla="*/ 43171 h 319858"/>
+                <a:gd name="connsiteX3" fmla="*/ 209550 w 211553"/>
+                <a:gd name="connsiteY3" fmla="*/ 42068 h 319858"/>
+                <a:gd name="connsiteX4" fmla="*/ 209550 w 211553"/>
+                <a:gd name="connsiteY4" fmla="*/ 72001 h 319858"/>
+                <a:gd name="connsiteX5" fmla="*/ 209544 w 211553"/>
+                <a:gd name="connsiteY5" fmla="*/ 72001 h 319858"/>
+                <a:gd name="connsiteX6" fmla="*/ 209544 w 211553"/>
+                <a:gd name="connsiteY6" fmla="*/ 144954 h 319858"/>
+                <a:gd name="connsiteX7" fmla="*/ 211553 w 211553"/>
+                <a:gd name="connsiteY7" fmla="*/ 146963 h 319858"/>
+                <a:gd name="connsiteX8" fmla="*/ 110657 w 211553"/>
+                <a:gd name="connsiteY8" fmla="*/ 247858 h 319858"/>
+                <a:gd name="connsiteX9" fmla="*/ 209550 w 211553"/>
+                <a:gd name="connsiteY9" fmla="*/ 247858 h 319858"/>
+                <a:gd name="connsiteX10" fmla="*/ 209550 w 211553"/>
+                <a:gd name="connsiteY10" fmla="*/ 319858 h 319858"/>
+                <a:gd name="connsiteX11" fmla="*/ 22960 w 211553"/>
+                <a:gd name="connsiteY11" fmla="*/ 319858 h 319858"/>
+                <a:gd name="connsiteX12" fmla="*/ 0 w 211553"/>
+                <a:gd name="connsiteY12" fmla="*/ 296898 h 319858"/>
+                <a:gd name="connsiteX13" fmla="*/ 0 w 211553"/>
+                <a:gd name="connsiteY13" fmla="*/ 259542 h 319858"/>
+                <a:gd name="connsiteX14" fmla="*/ 25489 w 211553"/>
+                <a:gd name="connsiteY14" fmla="*/ 234053 h 319858"/>
+                <a:gd name="connsiteX15" fmla="*/ 24064 w 211553"/>
+                <a:gd name="connsiteY15" fmla="*/ 232628 h 319858"/>
+                <a:gd name="connsiteX16" fmla="*/ 137544 w 211553"/>
+                <a:gd name="connsiteY16" fmla="*/ 119148 h 319858"/>
+                <a:gd name="connsiteX17" fmla="*/ 137544 w 211553"/>
+                <a:gd name="connsiteY17" fmla="*/ 72001 h 319858"/>
+                <a:gd name="connsiteX18" fmla="*/ 0 w 211553"/>
+                <a:gd name="connsiteY18" fmla="*/ 72001 h 319858"/>
+                <a:gd name="connsiteX19" fmla="*/ 0 w 211553"/>
+                <a:gd name="connsiteY19" fmla="*/ 40066 h 319858"/>
+                <a:gd name="connsiteX20" fmla="*/ 3105 w 211553"/>
+                <a:gd name="connsiteY20" fmla="*/ 43171 h 319858"/>
+                <a:gd name="connsiteX21" fmla="*/ 46275 w 211553"/>
+                <a:gd name="connsiteY21" fmla="*/ 1 h 319858"/>
+                <a:gd name="connsiteX22" fmla="*/ 137544 w 211553"/>
+                <a:gd name="connsiteY22" fmla="*/ 1 h 319858"/>
+              </a:gdLst>
+              <a:ahLst/>
+              <a:cxnLst>
+                <a:cxn ang="0">
+                  <a:pos x="connsiteX0" y="connsiteY0"/>
+                </a:cxn>
+                <a:cxn ang="0">
+                  <a:pos x="connsiteX1" y="connsiteY1"/>
+                </a:cxn>
+                <a:cxn ang="0">
+                  <a:pos x="connsiteX2" y="connsiteY2"/>
+                </a:cxn>
+                <a:cxn ang="0">
+                  <a:pos x="connsiteX3" y="connsiteY3"/>
+                </a:cxn>
+                <a:cxn ang="0">
+                  <a:pos x="connsiteX4" y="connsiteY4"/>
+                </a:cxn>
+                <a:cxn ang="0">
+                  <a:pos x="connsiteX5" y="connsiteY5"/>
+                </a:cxn>
+                <a:cxn ang="0">
+                  <a:pos x="connsiteX6" y="connsiteY6"/>
+                </a:cxn>
+                <a:cxn ang="0">
+                  <a:pos x="connsiteX7" y="connsiteY7"/>
+                </a:cxn>
+                <a:cxn ang="0">
+                  <a:pos x="connsiteX8" y="connsiteY8"/>
+                </a:cxn>
+                <a:cxn ang="0">
+                  <a:pos x="connsiteX9" y="connsiteY9"/>
+                </a:cxn>
+                <a:cxn ang="0">
+                  <a:pos x="connsiteX10" y="connsiteY10"/>
+                </a:cxn>
+                <a:cxn ang="0">
+                  <a:pos x="connsiteX11" y="connsiteY11"/>
+                </a:cxn>
+                <a:cxn ang="0">
+                  <a:pos x="connsiteX12" y="connsiteY12"/>
+                </a:cxn>
+                <a:cxn ang="0">
+                  <a:pos x="connsiteX13" y="connsiteY13"/>
+                </a:cxn>
+                <a:cxn ang="0">
+                  <a:pos x="connsiteX14" y="connsiteY14"/>
+                </a:cxn>
+                <a:cxn ang="0">
+                  <a:pos x="connsiteX15" y="connsiteY15"/>
+                </a:cxn>
+                <a:cxn ang="0">
+                  <a:pos x="connsiteX16" y="connsiteY16"/>
+                </a:cxn>
+                <a:cxn ang="0">
+                  <a:pos x="connsiteX17" y="connsiteY17"/>
+                </a:cxn>
+                <a:cxn ang="0">
+                  <a:pos x="connsiteX18" y="connsiteY18"/>
+                </a:cxn>
+                <a:cxn ang="0">
+                  <a:pos x="connsiteX19" y="connsiteY19"/>
+                </a:cxn>
+                <a:cxn ang="0">
+                  <a:pos x="connsiteX20" y="connsiteY20"/>
+                </a:cxn>
+                <a:cxn ang="0">
+                  <a:pos x="connsiteX21" y="connsiteY21"/>
+                </a:cxn>
+                <a:cxn ang="0">
+                  <a:pos x="connsiteX22" y="connsiteY22"/>
+                </a:cxn>
+              </a:cxnLst>
+              <a:rect l="l" t="t" r="r" b="b"/>
+              <a:pathLst>
+                <a:path w="211553" h="319858">
+                  <a:moveTo>
+                    <a:pt x="137544" y="0"/>
+                  </a:moveTo>
+                  <a:lnTo>
+                    <a:pt x="165276" y="0"/>
+                  </a:lnTo>
+                  <a:lnTo>
+                    <a:pt x="208447" y="43171"/>
+                  </a:lnTo>
+                  <a:lnTo>
+                    <a:pt x="209550" y="42068"/>
+                  </a:lnTo>
+                  <a:lnTo>
+                    <a:pt x="209550" y="72001"/>
+                  </a:lnTo>
+                  <a:lnTo>
+                    <a:pt x="209544" y="72001"/>
+                  </a:lnTo>
+                  <a:lnTo>
+                    <a:pt x="209544" y="144954"/>
+                  </a:lnTo>
+                  <a:lnTo>
+                    <a:pt x="211553" y="146963"/>
+                  </a:lnTo>
+                  <a:lnTo>
+                    <a:pt x="110657" y="247858"/>
+                  </a:lnTo>
+                  <a:lnTo>
+                    <a:pt x="209550" y="247858"/>
+                  </a:lnTo>
+                  <a:lnTo>
+                    <a:pt x="209550" y="319858"/>
+                  </a:lnTo>
+                  <a:lnTo>
+                    <a:pt x="22960" y="319858"/>
+                  </a:lnTo>
+                  <a:lnTo>
+                    <a:pt x="0" y="296898"/>
+                  </a:lnTo>
+                  <a:lnTo>
+                    <a:pt x="0" y="259542"/>
+                  </a:lnTo>
+                  <a:lnTo>
+                    <a:pt x="25489" y="234053"/>
+                  </a:lnTo>
+                  <a:lnTo>
+                    <a:pt x="24064" y="232628"/>
+                  </a:lnTo>
+                  <a:lnTo>
+                    <a:pt x="137544" y="119148"/>
+                  </a:lnTo>
+                  <a:lnTo>
+                    <a:pt x="137544" y="72001"/>
+                  </a:lnTo>
+                  <a:lnTo>
+                    <a:pt x="0" y="72001"/>
+                  </a:lnTo>
+                  <a:lnTo>
+                    <a:pt x="0" y="40066"/>
+                  </a:lnTo>
+                  <a:lnTo>
+                    <a:pt x="3105" y="43171"/>
+                  </a:lnTo>
+                  <a:lnTo>
+                    <a:pt x="46275" y="1"/>
+                  </a:lnTo>
+                  <a:lnTo>
+                    <a:pt x="137544" y="1"/>
+                  </a:lnTo>
+                  <a:close/>
+                </a:path>
+              </a:pathLst>
+            </a:custGeom>
+            <a:solidFill>
+              <a:srgbClr val="E0B038"/>
+            </a:solidFill>
+            <a:ln>
+              <a:noFill/>
+            </a:ln>
+          </p:spPr>
+          <p:style>
+            <a:lnRef idx="2">
+              <a:schemeClr val="accent1">
+                <a:shade val="15000"/>
+              </a:schemeClr>
+            </a:lnRef>
+            <a:fillRef idx="1">
+              <a:schemeClr val="accent1"/>
+            </a:fillRef>
+            <a:effectRef idx="0">
+              <a:schemeClr val="accent1"/>
+            </a:effectRef>
+            <a:fontRef idx="minor">
+              <a:schemeClr val="lt1"/>
+            </a:fontRef>
+          </p:style>
+          <p:txBody>
+            <a:bodyPr wrap="square" rtlCol="0" anchor="ctr">
+              <a:noAutofit/>
+            </a:bodyPr>
+            <a:lstStyle/>
+            <a:p>
+              <a:pPr algn="ctr"/>
+              <a:endParaRPr lang="ko-KR" altLang="en-US"/>
+            </a:p>
+          </p:txBody>
+        </p:sp>
+        <p:sp>
+          <p:nvSpPr>
+            <p:cNvPr id="44" name="자유형: 도형 43">
+              <a:extLst>
+                <a:ext uri="{FF2B5EF4-FFF2-40B4-BE49-F238E27FC236}">
+                  <a16:creationId xmlns:a16="http://schemas.microsoft.com/office/drawing/2014/main" id="{FEA97B23-7285-067A-2255-957F8C05F7E8}"/>
+                </a:ext>
+              </a:extLst>
+            </p:cNvPr>
+            <p:cNvSpPr/>
+            <p:nvPr/>
+          </p:nvSpPr>
+          <p:spPr>
+            <a:xfrm>
+              <a:off x="3412163" y="3819656"/>
+              <a:ext cx="457401" cy="729563"/>
+            </a:xfrm>
+            <a:custGeom>
+              <a:avLst/>
+              <a:gdLst>
+                <a:gd name="connsiteX0" fmla="*/ 83168 w 457401"/>
+                <a:gd name="connsiteY0" fmla="*/ 0 h 729563"/>
+                <a:gd name="connsiteX1" fmla="*/ 191168 w 457401"/>
+                <a:gd name="connsiteY1" fmla="*/ 0 h 729563"/>
+                <a:gd name="connsiteX2" fmla="*/ 191168 w 457401"/>
+                <a:gd name="connsiteY2" fmla="*/ 117801 h 729563"/>
+                <a:gd name="connsiteX3" fmla="*/ 453680 w 457401"/>
+                <a:gd name="connsiteY3" fmla="*/ 380313 h 729563"/>
+                <a:gd name="connsiteX4" fmla="*/ 456805 w 457401"/>
+                <a:gd name="connsiteY4" fmla="*/ 380313 h 729563"/>
+                <a:gd name="connsiteX5" fmla="*/ 456805 w 457401"/>
+                <a:gd name="connsiteY5" fmla="*/ 383438 h 729563"/>
+                <a:gd name="connsiteX6" fmla="*/ 457401 w 457401"/>
+                <a:gd name="connsiteY6" fmla="*/ 384034 h 729563"/>
+                <a:gd name="connsiteX7" fmla="*/ 456805 w 457401"/>
+                <a:gd name="connsiteY7" fmla="*/ 384629 h 729563"/>
+                <a:gd name="connsiteX8" fmla="*/ 456805 w 457401"/>
+                <a:gd name="connsiteY8" fmla="*/ 729563 h 729563"/>
+                <a:gd name="connsiteX9" fmla="*/ 348805 w 457401"/>
+                <a:gd name="connsiteY9" fmla="*/ 729563 h 729563"/>
+                <a:gd name="connsiteX10" fmla="*/ 348805 w 457401"/>
+                <a:gd name="connsiteY10" fmla="*/ 428173 h 729563"/>
+                <a:gd name="connsiteX11" fmla="*/ 230760 w 457401"/>
+                <a:gd name="connsiteY11" fmla="*/ 310128 h 729563"/>
+                <a:gd name="connsiteX12" fmla="*/ 108000 w 457401"/>
+                <a:gd name="connsiteY12" fmla="*/ 432887 h 729563"/>
+                <a:gd name="connsiteX13" fmla="*/ 108000 w 457401"/>
+                <a:gd name="connsiteY13" fmla="*/ 729563 h 729563"/>
+                <a:gd name="connsiteX14" fmla="*/ 0 w 457401"/>
+                <a:gd name="connsiteY14" fmla="*/ 729563 h 729563"/>
+                <a:gd name="connsiteX15" fmla="*/ 0 w 457401"/>
+                <a:gd name="connsiteY15" fmla="*/ 380313 h 729563"/>
+                <a:gd name="connsiteX16" fmla="*/ 7839 w 457401"/>
+                <a:gd name="connsiteY16" fmla="*/ 380313 h 729563"/>
+                <a:gd name="connsiteX17" fmla="*/ 154392 w 457401"/>
+                <a:gd name="connsiteY17" fmla="*/ 233760 h 729563"/>
+                <a:gd name="connsiteX18" fmla="*/ 88908 w 457401"/>
+                <a:gd name="connsiteY18" fmla="*/ 168275 h 729563"/>
+                <a:gd name="connsiteX19" fmla="*/ 83168 w 457401"/>
+                <a:gd name="connsiteY19" fmla="*/ 168275 h 729563"/>
+              </a:gdLst>
+              <a:ahLst/>
+              <a:cxnLst>
+                <a:cxn ang="0">
+                  <a:pos x="connsiteX0" y="connsiteY0"/>
+                </a:cxn>
+                <a:cxn ang="0">
+                  <a:pos x="connsiteX1" y="connsiteY1"/>
+                </a:cxn>
+                <a:cxn ang="0">
+                  <a:pos x="connsiteX2" y="connsiteY2"/>
+                </a:cxn>
+                <a:cxn ang="0">
+                  <a:pos x="connsiteX3" y="connsiteY3"/>
+                </a:cxn>
+                <a:cxn ang="0">
+                  <a:pos x="connsiteX4" y="connsiteY4"/>
+                </a:cxn>
+                <a:cxn ang="0">
+                  <a:pos x="connsiteX5" y="connsiteY5"/>
+                </a:cxn>
+                <a:cxn ang="0">
+                  <a:pos x="connsiteX6" y="connsiteY6"/>
+                </a:cxn>
+                <a:cxn ang="0">
+                  <a:pos x="connsiteX7" y="connsiteY7"/>
+                </a:cxn>
+                <a:cxn ang="0">
+                  <a:pos x="connsiteX8" y="connsiteY8"/>
+                </a:cxn>
+                <a:cxn ang="0">
+                  <a:pos x="connsiteX9" y="connsiteY9"/>
+                </a:cxn>
+                <a:cxn ang="0">
+                  <a:pos x="connsiteX10" y="connsiteY10"/>
+                </a:cxn>
+                <a:cxn ang="0">
+                  <a:pos x="connsiteX11" y="connsiteY11"/>
+                </a:cxn>
+                <a:cxn ang="0">
+                  <a:pos x="connsiteX12" y="connsiteY12"/>
+                </a:cxn>
+                <a:cxn ang="0">
+                  <a:pos x="connsiteX13" y="connsiteY13"/>
+                </a:cxn>
+                <a:cxn ang="0">
+                  <a:pos x="connsiteX14" y="connsiteY14"/>
+                </a:cxn>
+                <a:cxn ang="0">
+                  <a:pos x="connsiteX15" y="connsiteY15"/>
+                </a:cxn>
+                <a:cxn ang="0">
+                  <a:pos x="connsiteX16" y="connsiteY16"/>
+                </a:cxn>
+                <a:cxn ang="0">
+                  <a:pos x="connsiteX17" y="connsiteY17"/>
+                </a:cxn>
+                <a:cxn ang="0">
+                  <a:pos x="connsiteX18" y="connsiteY18"/>
+                </a:cxn>
+                <a:cxn ang="0">
+                  <a:pos x="connsiteX19" y="connsiteY19"/>
+                </a:cxn>
+              </a:cxnLst>
+              <a:rect l="l" t="t" r="r" b="b"/>
+              <a:pathLst>
+                <a:path w="457401" h="729563">
+                  <a:moveTo>
+                    <a:pt x="83168" y="0"/>
+                  </a:moveTo>
+                  <a:lnTo>
+                    <a:pt x="191168" y="0"/>
+                  </a:lnTo>
+                  <a:lnTo>
+                    <a:pt x="191168" y="117801"/>
+                  </a:lnTo>
+                  <a:lnTo>
+                    <a:pt x="453680" y="380313"/>
+                  </a:lnTo>
+                  <a:lnTo>
+                    <a:pt x="456805" y="380313"/>
+                  </a:lnTo>
+                  <a:lnTo>
+                    <a:pt x="456805" y="383438"/>
+                  </a:lnTo>
+                  <a:lnTo>
+                    <a:pt x="457401" y="384034"/>
+                  </a:lnTo>
+                  <a:lnTo>
+                    <a:pt x="456805" y="384629"/>
+                  </a:lnTo>
+                  <a:lnTo>
+                    <a:pt x="456805" y="729563"/>
+                  </a:lnTo>
+                  <a:lnTo>
+                    <a:pt x="348805" y="729563"/>
+                  </a:lnTo>
+                  <a:lnTo>
+                    <a:pt x="348805" y="428173"/>
+                  </a:lnTo>
+                  <a:lnTo>
+                    <a:pt x="230760" y="310128"/>
+                  </a:lnTo>
+                  <a:lnTo>
+                    <a:pt x="108000" y="432887"/>
+                  </a:lnTo>
+                  <a:lnTo>
+                    <a:pt x="108000" y="729563"/>
+                  </a:lnTo>
+                  <a:lnTo>
+                    <a:pt x="0" y="729563"/>
+                  </a:lnTo>
+                  <a:lnTo>
+                    <a:pt x="0" y="380313"/>
+                  </a:lnTo>
+                  <a:lnTo>
+                    <a:pt x="7839" y="380313"/>
+                  </a:lnTo>
+                  <a:lnTo>
+                    <a:pt x="154392" y="233760"/>
+                  </a:lnTo>
+                  <a:lnTo>
+                    <a:pt x="88908" y="168275"/>
+                  </a:lnTo>
+                  <a:lnTo>
+                    <a:pt x="83168" y="168275"/>
+                  </a:lnTo>
+                  <a:close/>
+                </a:path>
+              </a:pathLst>
+            </a:custGeom>
+            <a:gradFill>
+              <a:gsLst>
+                <a:gs pos="0">
+                  <a:srgbClr val="858384"/>
+                </a:gs>
+                <a:gs pos="40000">
+                  <a:srgbClr val="868486"/>
+                </a:gs>
+                <a:gs pos="61000">
+                  <a:srgbClr val="353535"/>
+                </a:gs>
+                <a:gs pos="100000">
+                  <a:srgbClr val="272828"/>
+                </a:gs>
+              </a:gsLst>
+              <a:lin ang="5400000" scaled="1"/>
+            </a:gradFill>
+            <a:ln>
+              <a:noFill/>
+            </a:ln>
+          </p:spPr>
+          <p:style>
+            <a:lnRef idx="2">
+              <a:schemeClr val="accent1">
+                <a:shade val="15000"/>
+              </a:schemeClr>
+            </a:lnRef>
+            <a:fillRef idx="1">
+              <a:schemeClr val="accent1"/>
+            </a:fillRef>
+            <a:effectRef idx="0">
+              <a:schemeClr val="accent1"/>
+            </a:effectRef>
+            <a:fontRef idx="minor">
+              <a:schemeClr val="lt1"/>
+            </a:fontRef>
+          </p:style>
+          <p:txBody>
+            <a:bodyPr wrap="square" rtlCol="0" anchor="ctr">
+              <a:noAutofit/>
+            </a:bodyPr>
+            <a:lstStyle/>
+            <a:p>
+              <a:pPr algn="ctr"/>
+              <a:endParaRPr lang="ko-KR" altLang="en-US" b="1" dirty="0"/>
+            </a:p>
+          </p:txBody>
+        </p:sp>
+      </p:grpSp>
     </p:spTree>
     <p:extLst>
       <p:ext uri="{BB962C8B-B14F-4D97-AF65-F5344CB8AC3E}">

</xml_diff>

<commit_message>
Added Core Keeper Icon
</commit_message>
<xml_diff>
--- a/tepk2924_Custon_Icon.pptx
+++ b/tepk2924_Custon_Icon.pptx
@@ -212,7 +212,7 @@
           <a:p>
             <a:fld id="{10460FAE-A4BB-46CF-AB3F-8A65ECE16F8C}" type="datetimeFigureOut">
               <a:rPr lang="ko-KR" altLang="en-US" smtClean="0"/>
-              <a:t>2024-12-24</a:t>
+              <a:t>2025-01-04</a:t>
             </a:fld>
             <a:endParaRPr lang="ko-KR" altLang="en-US"/>
           </a:p>
@@ -710,7 +710,7 @@
           <a:p>
             <a:fld id="{5514A77A-5394-47DD-9A3D-6F42195EF4ED}" type="datetimeFigureOut">
               <a:rPr lang="ko-KR" altLang="en-US" smtClean="0"/>
-              <a:t>2024-12-24</a:t>
+              <a:t>2025-01-04</a:t>
             </a:fld>
             <a:endParaRPr lang="ko-KR" altLang="en-US"/>
           </a:p>
@@ -908,7 +908,7 @@
           <a:p>
             <a:fld id="{5514A77A-5394-47DD-9A3D-6F42195EF4ED}" type="datetimeFigureOut">
               <a:rPr lang="ko-KR" altLang="en-US" smtClean="0"/>
-              <a:t>2024-12-24</a:t>
+              <a:t>2025-01-04</a:t>
             </a:fld>
             <a:endParaRPr lang="ko-KR" altLang="en-US"/>
           </a:p>
@@ -1116,7 +1116,7 @@
           <a:p>
             <a:fld id="{5514A77A-5394-47DD-9A3D-6F42195EF4ED}" type="datetimeFigureOut">
               <a:rPr lang="ko-KR" altLang="en-US" smtClean="0"/>
-              <a:t>2024-12-24</a:t>
+              <a:t>2025-01-04</a:t>
             </a:fld>
             <a:endParaRPr lang="ko-KR" altLang="en-US"/>
           </a:p>
@@ -1314,7 +1314,7 @@
           <a:p>
             <a:fld id="{5514A77A-5394-47DD-9A3D-6F42195EF4ED}" type="datetimeFigureOut">
               <a:rPr lang="ko-KR" altLang="en-US" smtClean="0"/>
-              <a:t>2024-12-24</a:t>
+              <a:t>2025-01-04</a:t>
             </a:fld>
             <a:endParaRPr lang="ko-KR" altLang="en-US"/>
           </a:p>
@@ -1589,7 +1589,7 @@
           <a:p>
             <a:fld id="{5514A77A-5394-47DD-9A3D-6F42195EF4ED}" type="datetimeFigureOut">
               <a:rPr lang="ko-KR" altLang="en-US" smtClean="0"/>
-              <a:t>2024-12-24</a:t>
+              <a:t>2025-01-04</a:t>
             </a:fld>
             <a:endParaRPr lang="ko-KR" altLang="en-US"/>
           </a:p>
@@ -1854,7 +1854,7 @@
           <a:p>
             <a:fld id="{5514A77A-5394-47DD-9A3D-6F42195EF4ED}" type="datetimeFigureOut">
               <a:rPr lang="ko-KR" altLang="en-US" smtClean="0"/>
-              <a:t>2024-12-24</a:t>
+              <a:t>2025-01-04</a:t>
             </a:fld>
             <a:endParaRPr lang="ko-KR" altLang="en-US"/>
           </a:p>
@@ -2266,7 +2266,7 @@
           <a:p>
             <a:fld id="{5514A77A-5394-47DD-9A3D-6F42195EF4ED}" type="datetimeFigureOut">
               <a:rPr lang="ko-KR" altLang="en-US" smtClean="0"/>
-              <a:t>2024-12-24</a:t>
+              <a:t>2025-01-04</a:t>
             </a:fld>
             <a:endParaRPr lang="ko-KR" altLang="en-US"/>
           </a:p>
@@ -2407,7 +2407,7 @@
           <a:p>
             <a:fld id="{5514A77A-5394-47DD-9A3D-6F42195EF4ED}" type="datetimeFigureOut">
               <a:rPr lang="ko-KR" altLang="en-US" smtClean="0"/>
-              <a:t>2024-12-24</a:t>
+              <a:t>2025-01-04</a:t>
             </a:fld>
             <a:endParaRPr lang="ko-KR" altLang="en-US"/>
           </a:p>
@@ -2520,7 +2520,7 @@
           <a:p>
             <a:fld id="{5514A77A-5394-47DD-9A3D-6F42195EF4ED}" type="datetimeFigureOut">
               <a:rPr lang="ko-KR" altLang="en-US" smtClean="0"/>
-              <a:t>2024-12-24</a:t>
+              <a:t>2025-01-04</a:t>
             </a:fld>
             <a:endParaRPr lang="ko-KR" altLang="en-US"/>
           </a:p>
@@ -2831,7 +2831,7 @@
           <a:p>
             <a:fld id="{5514A77A-5394-47DD-9A3D-6F42195EF4ED}" type="datetimeFigureOut">
               <a:rPr lang="ko-KR" altLang="en-US" smtClean="0"/>
-              <a:t>2024-12-24</a:t>
+              <a:t>2025-01-04</a:t>
             </a:fld>
             <a:endParaRPr lang="ko-KR" altLang="en-US"/>
           </a:p>
@@ -3119,7 +3119,7 @@
           <a:p>
             <a:fld id="{5514A77A-5394-47DD-9A3D-6F42195EF4ED}" type="datetimeFigureOut">
               <a:rPr lang="ko-KR" altLang="en-US" smtClean="0"/>
-              <a:t>2024-12-24</a:t>
+              <a:t>2025-01-04</a:t>
             </a:fld>
             <a:endParaRPr lang="ko-KR" altLang="en-US"/>
           </a:p>
@@ -3360,7 +3360,7 @@
           <a:p>
             <a:fld id="{5514A77A-5394-47DD-9A3D-6F42195EF4ED}" type="datetimeFigureOut">
               <a:rPr lang="ko-KR" altLang="en-US" smtClean="0"/>
-              <a:t>2024-12-24</a:t>
+              <a:t>2025-01-04</a:t>
             </a:fld>
             <a:endParaRPr lang="ko-KR" altLang="en-US"/>
           </a:p>
@@ -3913,6 +3913,110 @@
           <a:chExt cx="0" cy="0"/>
         </a:xfrm>
       </p:grpSpPr>
+      <p:sp>
+        <p:nvSpPr>
+          <p:cNvPr id="5" name="팔각형 4">
+            <a:extLst>
+              <a:ext uri="{FF2B5EF4-FFF2-40B4-BE49-F238E27FC236}">
+                <a16:creationId xmlns:a16="http://schemas.microsoft.com/office/drawing/2014/main" id="{FFF26AD7-C5DA-675E-8C86-B04C65AC9048}"/>
+              </a:ext>
+            </a:extLst>
+          </p:cNvPr>
+          <p:cNvSpPr/>
+          <p:nvPr/>
+        </p:nvSpPr>
+        <p:spPr>
+          <a:xfrm>
+            <a:off x="1725136" y="3967674"/>
+            <a:ext cx="1440000" cy="1440000"/>
+          </a:xfrm>
+          <a:prstGeom prst="octagon">
+            <a:avLst/>
+          </a:prstGeom>
+          <a:solidFill>
+            <a:schemeClr val="tx1"/>
+          </a:solidFill>
+          <a:ln>
+            <a:noFill/>
+          </a:ln>
+        </p:spPr>
+        <p:style>
+          <a:lnRef idx="2">
+            <a:schemeClr val="accent1">
+              <a:shade val="15000"/>
+            </a:schemeClr>
+          </a:lnRef>
+          <a:fillRef idx="1">
+            <a:schemeClr val="accent1"/>
+          </a:fillRef>
+          <a:effectRef idx="0">
+            <a:schemeClr val="accent1"/>
+          </a:effectRef>
+          <a:fontRef idx="minor">
+            <a:schemeClr val="lt1"/>
+          </a:fontRef>
+        </p:style>
+        <p:txBody>
+          <a:bodyPr rtlCol="0" anchor="ctr"/>
+          <a:lstStyle/>
+          <a:p>
+            <a:pPr algn="ctr"/>
+            <a:endParaRPr lang="ko-KR" altLang="en-US"/>
+          </a:p>
+        </p:txBody>
+      </p:sp>
+      <p:sp>
+        <p:nvSpPr>
+          <p:cNvPr id="32" name="팔각형 31">
+            <a:extLst>
+              <a:ext uri="{FF2B5EF4-FFF2-40B4-BE49-F238E27FC236}">
+                <a16:creationId xmlns:a16="http://schemas.microsoft.com/office/drawing/2014/main" id="{AB25C666-7978-C138-8710-C9631D68249F}"/>
+              </a:ext>
+            </a:extLst>
+          </p:cNvPr>
+          <p:cNvSpPr/>
+          <p:nvPr/>
+        </p:nvSpPr>
+        <p:spPr>
+          <a:xfrm>
+            <a:off x="8205251" y="4013016"/>
+            <a:ext cx="1044000" cy="1044000"/>
+          </a:xfrm>
+          <a:prstGeom prst="octagon">
+            <a:avLst/>
+          </a:prstGeom>
+          <a:solidFill>
+            <a:srgbClr val="0D39AD"/>
+          </a:solidFill>
+          <a:ln>
+            <a:noFill/>
+          </a:ln>
+        </p:spPr>
+        <p:style>
+          <a:lnRef idx="2">
+            <a:schemeClr val="accent1">
+              <a:shade val="15000"/>
+            </a:schemeClr>
+          </a:lnRef>
+          <a:fillRef idx="1">
+            <a:schemeClr val="accent1"/>
+          </a:fillRef>
+          <a:effectRef idx="0">
+            <a:schemeClr val="accent1"/>
+          </a:effectRef>
+          <a:fontRef idx="minor">
+            <a:schemeClr val="lt1"/>
+          </a:fontRef>
+        </p:style>
+        <p:txBody>
+          <a:bodyPr rtlCol="0" anchor="ctr"/>
+          <a:lstStyle/>
+          <a:p>
+            <a:pPr algn="ctr"/>
+            <a:endParaRPr lang="ko-KR" altLang="en-US"/>
+          </a:p>
+        </p:txBody>
+      </p:sp>
     </p:spTree>
     <p:extLst>
       <p:ext uri="{BB962C8B-B14F-4D97-AF65-F5344CB8AC3E}">
@@ -25499,6 +25603,785 @@
           </p:txBody>
         </p:sp>
       </p:grpSp>
+      <p:grpSp>
+        <p:nvGrpSpPr>
+          <p:cNvPr id="52" name="그룹 51">
+            <a:extLst>
+              <a:ext uri="{FF2B5EF4-FFF2-40B4-BE49-F238E27FC236}">
+                <a16:creationId xmlns:a16="http://schemas.microsoft.com/office/drawing/2014/main" id="{B5F1356D-5619-F21A-9A71-F721E9E5299B}"/>
+              </a:ext>
+            </a:extLst>
+          </p:cNvPr>
+          <p:cNvGrpSpPr/>
+          <p:nvPr/>
+        </p:nvGrpSpPr>
+        <p:grpSpPr>
+          <a:xfrm>
+            <a:off x="7668747" y="242804"/>
+            <a:ext cx="1440000" cy="1440000"/>
+            <a:chOff x="5916951" y="969193"/>
+            <a:chExt cx="1440000" cy="1440000"/>
+          </a:xfrm>
+        </p:grpSpPr>
+        <p:sp>
+          <p:nvSpPr>
+            <p:cNvPr id="10" name="팔각형 9">
+              <a:extLst>
+                <a:ext uri="{FF2B5EF4-FFF2-40B4-BE49-F238E27FC236}">
+                  <a16:creationId xmlns:a16="http://schemas.microsoft.com/office/drawing/2014/main" id="{CC005E17-0443-AAD5-5B59-F67B1AC2C59D}"/>
+                </a:ext>
+              </a:extLst>
+            </p:cNvPr>
+            <p:cNvSpPr/>
+            <p:nvPr/>
+          </p:nvSpPr>
+          <p:spPr>
+            <a:xfrm>
+              <a:off x="5916951" y="969193"/>
+              <a:ext cx="1440000" cy="1440000"/>
+            </a:xfrm>
+            <a:prstGeom prst="octagon">
+              <a:avLst/>
+            </a:prstGeom>
+            <a:solidFill>
+              <a:srgbClr val="67B2B5"/>
+            </a:solidFill>
+            <a:ln>
+              <a:noFill/>
+            </a:ln>
+          </p:spPr>
+          <p:style>
+            <a:lnRef idx="2">
+              <a:schemeClr val="accent1">
+                <a:shade val="15000"/>
+              </a:schemeClr>
+            </a:lnRef>
+            <a:fillRef idx="1">
+              <a:schemeClr val="accent1"/>
+            </a:fillRef>
+            <a:effectRef idx="0">
+              <a:schemeClr val="accent1"/>
+            </a:effectRef>
+            <a:fontRef idx="minor">
+              <a:schemeClr val="lt1"/>
+            </a:fontRef>
+          </p:style>
+          <p:txBody>
+            <a:bodyPr rtlCol="0" anchor="ctr"/>
+            <a:lstStyle/>
+            <a:p>
+              <a:pPr algn="ctr"/>
+              <a:endParaRPr lang="ko-KR" altLang="en-US"/>
+            </a:p>
+          </p:txBody>
+        </p:sp>
+        <p:sp>
+          <p:nvSpPr>
+            <p:cNvPr id="16" name="팔각형 15">
+              <a:extLst>
+                <a:ext uri="{FF2B5EF4-FFF2-40B4-BE49-F238E27FC236}">
+                  <a16:creationId xmlns:a16="http://schemas.microsoft.com/office/drawing/2014/main" id="{381041C6-4558-94EE-0089-40B29B944C05}"/>
+                </a:ext>
+              </a:extLst>
+            </p:cNvPr>
+            <p:cNvSpPr/>
+            <p:nvPr/>
+          </p:nvSpPr>
+          <p:spPr>
+            <a:xfrm>
+              <a:off x="5970951" y="1023193"/>
+              <a:ext cx="1332000" cy="1332000"/>
+            </a:xfrm>
+            <a:prstGeom prst="octagon">
+              <a:avLst/>
+            </a:prstGeom>
+            <a:solidFill>
+              <a:srgbClr val="0D39AD"/>
+            </a:solidFill>
+            <a:ln>
+              <a:noFill/>
+            </a:ln>
+          </p:spPr>
+          <p:style>
+            <a:lnRef idx="2">
+              <a:schemeClr val="accent1">
+                <a:shade val="15000"/>
+              </a:schemeClr>
+            </a:lnRef>
+            <a:fillRef idx="1">
+              <a:schemeClr val="accent1"/>
+            </a:fillRef>
+            <a:effectRef idx="0">
+              <a:schemeClr val="accent1"/>
+            </a:effectRef>
+            <a:fontRef idx="minor">
+              <a:schemeClr val="lt1"/>
+            </a:fontRef>
+          </p:style>
+          <p:txBody>
+            <a:bodyPr rtlCol="0" anchor="ctr"/>
+            <a:lstStyle/>
+            <a:p>
+              <a:pPr algn="ctr"/>
+              <a:endParaRPr lang="ko-KR" altLang="en-US"/>
+            </a:p>
+          </p:txBody>
+        </p:sp>
+        <p:sp>
+          <p:nvSpPr>
+            <p:cNvPr id="18" name="팔각형 17">
+              <a:extLst>
+                <a:ext uri="{FF2B5EF4-FFF2-40B4-BE49-F238E27FC236}">
+                  <a16:creationId xmlns:a16="http://schemas.microsoft.com/office/drawing/2014/main" id="{4DB32A88-2A8A-D28E-C21B-7C8EE5F7B5B2}"/>
+                </a:ext>
+              </a:extLst>
+            </p:cNvPr>
+            <p:cNvSpPr/>
+            <p:nvPr/>
+          </p:nvSpPr>
+          <p:spPr>
+            <a:xfrm rot="2700000">
+              <a:off x="6021941" y="1080436"/>
+              <a:ext cx="1224000" cy="1224000"/>
+            </a:xfrm>
+            <a:prstGeom prst="octagon">
+              <a:avLst/>
+            </a:prstGeom>
+            <a:gradFill flip="none" rotWithShape="1">
+              <a:gsLst>
+                <a:gs pos="18000">
+                  <a:srgbClr val="B6FFEA"/>
+                </a:gs>
+                <a:gs pos="0">
+                  <a:srgbClr val="9DFFE2"/>
+                </a:gs>
+                <a:gs pos="30000">
+                  <a:srgbClr val="189ECA"/>
+                </a:gs>
+                <a:gs pos="56000">
+                  <a:srgbClr val="189ECA"/>
+                </a:gs>
+                <a:gs pos="100000">
+                  <a:srgbClr val="0D39AD"/>
+                </a:gs>
+              </a:gsLst>
+              <a:path path="rect">
+                <a:fillToRect l="100000" t="100000"/>
+              </a:path>
+              <a:tileRect r="-100000" b="-100000"/>
+            </a:gradFill>
+            <a:ln>
+              <a:noFill/>
+            </a:ln>
+          </p:spPr>
+          <p:style>
+            <a:lnRef idx="2">
+              <a:schemeClr val="accent1">
+                <a:shade val="15000"/>
+              </a:schemeClr>
+            </a:lnRef>
+            <a:fillRef idx="1">
+              <a:schemeClr val="accent1"/>
+            </a:fillRef>
+            <a:effectRef idx="0">
+              <a:schemeClr val="accent1"/>
+            </a:effectRef>
+            <a:fontRef idx="minor">
+              <a:schemeClr val="lt1"/>
+            </a:fontRef>
+          </p:style>
+          <p:txBody>
+            <a:bodyPr rtlCol="0" anchor="ctr"/>
+            <a:lstStyle/>
+            <a:p>
+              <a:pPr algn="ctr"/>
+              <a:endParaRPr lang="ko-KR" altLang="en-US"/>
+            </a:p>
+          </p:txBody>
+        </p:sp>
+        <p:sp>
+          <p:nvSpPr>
+            <p:cNvPr id="19" name="팔각형 18">
+              <a:extLst>
+                <a:ext uri="{FF2B5EF4-FFF2-40B4-BE49-F238E27FC236}">
+                  <a16:creationId xmlns:a16="http://schemas.microsoft.com/office/drawing/2014/main" id="{A678B77C-8FC7-EC86-5B09-54658B19FE67}"/>
+                </a:ext>
+              </a:extLst>
+            </p:cNvPr>
+            <p:cNvSpPr/>
+            <p:nvPr/>
+          </p:nvSpPr>
+          <p:spPr>
+            <a:xfrm>
+              <a:off x="6111941" y="1042243"/>
+              <a:ext cx="1044000" cy="1044000"/>
+            </a:xfrm>
+            <a:prstGeom prst="octagon">
+              <a:avLst/>
+            </a:prstGeom>
+            <a:solidFill>
+              <a:srgbClr val="143EAB"/>
+            </a:solidFill>
+            <a:ln>
+              <a:noFill/>
+            </a:ln>
+          </p:spPr>
+          <p:style>
+            <a:lnRef idx="2">
+              <a:schemeClr val="accent1">
+                <a:shade val="15000"/>
+              </a:schemeClr>
+            </a:lnRef>
+            <a:fillRef idx="1">
+              <a:schemeClr val="accent1"/>
+            </a:fillRef>
+            <a:effectRef idx="0">
+              <a:schemeClr val="accent1"/>
+            </a:effectRef>
+            <a:fontRef idx="minor">
+              <a:schemeClr val="lt1"/>
+            </a:fontRef>
+          </p:style>
+          <p:txBody>
+            <a:bodyPr rtlCol="0" anchor="ctr"/>
+            <a:lstStyle/>
+            <a:p>
+              <a:pPr algn="ctr"/>
+              <a:endParaRPr lang="ko-KR" altLang="en-US"/>
+            </a:p>
+          </p:txBody>
+        </p:sp>
+        <p:sp>
+          <p:nvSpPr>
+            <p:cNvPr id="51" name="자유형: 도형 50">
+              <a:extLst>
+                <a:ext uri="{FF2B5EF4-FFF2-40B4-BE49-F238E27FC236}">
+                  <a16:creationId xmlns:a16="http://schemas.microsoft.com/office/drawing/2014/main" id="{F8AD674E-696E-5493-6F8A-0B4412FB199E}"/>
+                </a:ext>
+              </a:extLst>
+            </p:cNvPr>
+            <p:cNvSpPr/>
+            <p:nvPr/>
+          </p:nvSpPr>
+          <p:spPr>
+            <a:xfrm rot="16200000" flipH="1">
+              <a:off x="6260939" y="934336"/>
+              <a:ext cx="740118" cy="1046932"/>
+            </a:xfrm>
+            <a:custGeom>
+              <a:avLst/>
+              <a:gdLst>
+                <a:gd name="connsiteX0" fmla="*/ 0 w 740118"/>
+                <a:gd name="connsiteY0" fmla="*/ 340359 h 1046932"/>
+                <a:gd name="connsiteX1" fmla="*/ 0 w 740118"/>
+                <a:gd name="connsiteY1" fmla="*/ 704695 h 1046932"/>
+                <a:gd name="connsiteX2" fmla="*/ 89143 w 740118"/>
+                <a:gd name="connsiteY2" fmla="*/ 793838 h 1046932"/>
+                <a:gd name="connsiteX3" fmla="*/ 89143 w 740118"/>
+                <a:gd name="connsiteY3" fmla="*/ 795484 h 1046932"/>
+                <a:gd name="connsiteX4" fmla="*/ 124074 w 740118"/>
+                <a:gd name="connsiteY4" fmla="*/ 830415 h 1046932"/>
+                <a:gd name="connsiteX5" fmla="*/ 124074 w 740118"/>
+                <a:gd name="connsiteY5" fmla="*/ 830789 h 1046932"/>
+                <a:gd name="connsiteX6" fmla="*/ 331898 w 740118"/>
+                <a:gd name="connsiteY6" fmla="*/ 1038614 h 1046932"/>
+                <a:gd name="connsiteX7" fmla="*/ 332154 w 740118"/>
+                <a:gd name="connsiteY7" fmla="*/ 1038614 h 1046932"/>
+                <a:gd name="connsiteX8" fmla="*/ 340471 w 740118"/>
+                <a:gd name="connsiteY8" fmla="*/ 1046931 h 1046932"/>
+                <a:gd name="connsiteX9" fmla="*/ 452460 w 740118"/>
+                <a:gd name="connsiteY9" fmla="*/ 1046931 h 1046932"/>
+                <a:gd name="connsiteX10" fmla="*/ 452461 w 740118"/>
+                <a:gd name="connsiteY10" fmla="*/ 1046932 h 1046932"/>
+                <a:gd name="connsiteX11" fmla="*/ 687533 w 740118"/>
+                <a:gd name="connsiteY11" fmla="*/ 1046932 h 1046932"/>
+                <a:gd name="connsiteX12" fmla="*/ 740118 w 740118"/>
+                <a:gd name="connsiteY12" fmla="*/ 994347 h 1046932"/>
+                <a:gd name="connsiteX13" fmla="*/ 740118 w 740118"/>
+                <a:gd name="connsiteY13" fmla="*/ 937254 h 1046932"/>
+                <a:gd name="connsiteX14" fmla="*/ 740117 w 740118"/>
+                <a:gd name="connsiteY14" fmla="*/ 937253 h 1046932"/>
+                <a:gd name="connsiteX15" fmla="*/ 740117 w 740118"/>
+                <a:gd name="connsiteY15" fmla="*/ 904479 h 1046932"/>
+                <a:gd name="connsiteX16" fmla="*/ 684558 w 740118"/>
+                <a:gd name="connsiteY16" fmla="*/ 848920 h 1046932"/>
+                <a:gd name="connsiteX17" fmla="*/ 593635 w 740118"/>
+                <a:gd name="connsiteY17" fmla="*/ 848920 h 1046932"/>
+                <a:gd name="connsiteX18" fmla="*/ 592741 w 740118"/>
+                <a:gd name="connsiteY18" fmla="*/ 849813 h 1046932"/>
+                <a:gd name="connsiteX19" fmla="*/ 505777 w 740118"/>
+                <a:gd name="connsiteY19" fmla="*/ 849813 h 1046932"/>
+                <a:gd name="connsiteX20" fmla="*/ 357997 w 740118"/>
+                <a:gd name="connsiteY20" fmla="*/ 702033 h 1046932"/>
+                <a:gd name="connsiteX21" fmla="*/ 357997 w 740118"/>
+                <a:gd name="connsiteY21" fmla="*/ 344898 h 1046932"/>
+                <a:gd name="connsiteX22" fmla="*/ 505777 w 740118"/>
+                <a:gd name="connsiteY22" fmla="*/ 197118 h 1046932"/>
+                <a:gd name="connsiteX23" fmla="*/ 567550 w 740118"/>
+                <a:gd name="connsiteY23" fmla="*/ 197118 h 1046932"/>
+                <a:gd name="connsiteX24" fmla="*/ 567550 w 740118"/>
+                <a:gd name="connsiteY24" fmla="*/ 196458 h 1046932"/>
+                <a:gd name="connsiteX25" fmla="*/ 683757 w 740118"/>
+                <a:gd name="connsiteY25" fmla="*/ 196458 h 1046932"/>
+                <a:gd name="connsiteX26" fmla="*/ 740117 w 740118"/>
+                <a:gd name="connsiteY26" fmla="*/ 140098 h 1046932"/>
+                <a:gd name="connsiteX27" fmla="*/ 740117 w 740118"/>
+                <a:gd name="connsiteY27" fmla="*/ 109679 h 1046932"/>
+                <a:gd name="connsiteX28" fmla="*/ 740118 w 740118"/>
+                <a:gd name="connsiteY28" fmla="*/ 109679 h 1046932"/>
+                <a:gd name="connsiteX29" fmla="*/ 740118 w 740118"/>
+                <a:gd name="connsiteY29" fmla="*/ 52586 h 1046932"/>
+                <a:gd name="connsiteX30" fmla="*/ 687533 w 740118"/>
+                <a:gd name="connsiteY30" fmla="*/ 0 h 1046932"/>
+                <a:gd name="connsiteX31" fmla="*/ 452461 w 740118"/>
+                <a:gd name="connsiteY31" fmla="*/ 0 h 1046932"/>
+                <a:gd name="connsiteX32" fmla="*/ 452460 w 740118"/>
+                <a:gd name="connsiteY32" fmla="*/ 1 h 1046932"/>
+                <a:gd name="connsiteX33" fmla="*/ 340471 w 740118"/>
+                <a:gd name="connsiteY33" fmla="*/ 1 h 1046932"/>
+                <a:gd name="connsiteX34" fmla="*/ 338927 w 740118"/>
+                <a:gd name="connsiteY34" fmla="*/ 1 h 1046932"/>
+                <a:gd name="connsiteX35" fmla="*/ 244088 w 740118"/>
+                <a:gd name="connsiteY35" fmla="*/ 94840 h 1046932"/>
+                <a:gd name="connsiteX36" fmla="*/ 244088 w 740118"/>
+                <a:gd name="connsiteY36" fmla="*/ 97118 h 1046932"/>
+                <a:gd name="connsiteX37" fmla="*/ 125458 w 740118"/>
+                <a:gd name="connsiteY37" fmla="*/ 215748 h 1046932"/>
+                <a:gd name="connsiteX38" fmla="*/ 125458 w 740118"/>
+                <a:gd name="connsiteY38" fmla="*/ 218061 h 1046932"/>
+                <a:gd name="connsiteX39" fmla="*/ 98056 w 740118"/>
+                <a:gd name="connsiteY39" fmla="*/ 245463 h 1046932"/>
+                <a:gd name="connsiteX40" fmla="*/ 94896 w 740118"/>
+                <a:gd name="connsiteY40" fmla="*/ 245463 h 1046932"/>
+              </a:gdLst>
+              <a:ahLst/>
+              <a:cxnLst>
+                <a:cxn ang="0">
+                  <a:pos x="connsiteX0" y="connsiteY0"/>
+                </a:cxn>
+                <a:cxn ang="0">
+                  <a:pos x="connsiteX1" y="connsiteY1"/>
+                </a:cxn>
+                <a:cxn ang="0">
+                  <a:pos x="connsiteX2" y="connsiteY2"/>
+                </a:cxn>
+                <a:cxn ang="0">
+                  <a:pos x="connsiteX3" y="connsiteY3"/>
+                </a:cxn>
+                <a:cxn ang="0">
+                  <a:pos x="connsiteX4" y="connsiteY4"/>
+                </a:cxn>
+                <a:cxn ang="0">
+                  <a:pos x="connsiteX5" y="connsiteY5"/>
+                </a:cxn>
+                <a:cxn ang="0">
+                  <a:pos x="connsiteX6" y="connsiteY6"/>
+                </a:cxn>
+                <a:cxn ang="0">
+                  <a:pos x="connsiteX7" y="connsiteY7"/>
+                </a:cxn>
+                <a:cxn ang="0">
+                  <a:pos x="connsiteX8" y="connsiteY8"/>
+                </a:cxn>
+                <a:cxn ang="0">
+                  <a:pos x="connsiteX9" y="connsiteY9"/>
+                </a:cxn>
+                <a:cxn ang="0">
+                  <a:pos x="connsiteX10" y="connsiteY10"/>
+                </a:cxn>
+                <a:cxn ang="0">
+                  <a:pos x="connsiteX11" y="connsiteY11"/>
+                </a:cxn>
+                <a:cxn ang="0">
+                  <a:pos x="connsiteX12" y="connsiteY12"/>
+                </a:cxn>
+                <a:cxn ang="0">
+                  <a:pos x="connsiteX13" y="connsiteY13"/>
+                </a:cxn>
+                <a:cxn ang="0">
+                  <a:pos x="connsiteX14" y="connsiteY14"/>
+                </a:cxn>
+                <a:cxn ang="0">
+                  <a:pos x="connsiteX15" y="connsiteY15"/>
+                </a:cxn>
+                <a:cxn ang="0">
+                  <a:pos x="connsiteX16" y="connsiteY16"/>
+                </a:cxn>
+                <a:cxn ang="0">
+                  <a:pos x="connsiteX17" y="connsiteY17"/>
+                </a:cxn>
+                <a:cxn ang="0">
+                  <a:pos x="connsiteX18" y="connsiteY18"/>
+                </a:cxn>
+                <a:cxn ang="0">
+                  <a:pos x="connsiteX19" y="connsiteY19"/>
+                </a:cxn>
+                <a:cxn ang="0">
+                  <a:pos x="connsiteX20" y="connsiteY20"/>
+                </a:cxn>
+                <a:cxn ang="0">
+                  <a:pos x="connsiteX21" y="connsiteY21"/>
+                </a:cxn>
+                <a:cxn ang="0">
+                  <a:pos x="connsiteX22" y="connsiteY22"/>
+                </a:cxn>
+                <a:cxn ang="0">
+                  <a:pos x="connsiteX23" y="connsiteY23"/>
+                </a:cxn>
+                <a:cxn ang="0">
+                  <a:pos x="connsiteX24" y="connsiteY24"/>
+                </a:cxn>
+                <a:cxn ang="0">
+                  <a:pos x="connsiteX25" y="connsiteY25"/>
+                </a:cxn>
+                <a:cxn ang="0">
+                  <a:pos x="connsiteX26" y="connsiteY26"/>
+                </a:cxn>
+                <a:cxn ang="0">
+                  <a:pos x="connsiteX27" y="connsiteY27"/>
+                </a:cxn>
+                <a:cxn ang="0">
+                  <a:pos x="connsiteX28" y="connsiteY28"/>
+                </a:cxn>
+                <a:cxn ang="0">
+                  <a:pos x="connsiteX29" y="connsiteY29"/>
+                </a:cxn>
+                <a:cxn ang="0">
+                  <a:pos x="connsiteX30" y="connsiteY30"/>
+                </a:cxn>
+                <a:cxn ang="0">
+                  <a:pos x="connsiteX31" y="connsiteY31"/>
+                </a:cxn>
+                <a:cxn ang="0">
+                  <a:pos x="connsiteX32" y="connsiteY32"/>
+                </a:cxn>
+                <a:cxn ang="0">
+                  <a:pos x="connsiteX33" y="connsiteY33"/>
+                </a:cxn>
+                <a:cxn ang="0">
+                  <a:pos x="connsiteX34" y="connsiteY34"/>
+                </a:cxn>
+                <a:cxn ang="0">
+                  <a:pos x="connsiteX35" y="connsiteY35"/>
+                </a:cxn>
+                <a:cxn ang="0">
+                  <a:pos x="connsiteX36" y="connsiteY36"/>
+                </a:cxn>
+                <a:cxn ang="0">
+                  <a:pos x="connsiteX37" y="connsiteY37"/>
+                </a:cxn>
+                <a:cxn ang="0">
+                  <a:pos x="connsiteX38" y="connsiteY38"/>
+                </a:cxn>
+                <a:cxn ang="0">
+                  <a:pos x="connsiteX39" y="connsiteY39"/>
+                </a:cxn>
+                <a:cxn ang="0">
+                  <a:pos x="connsiteX40" y="connsiteY40"/>
+                </a:cxn>
+              </a:cxnLst>
+              <a:rect l="l" t="t" r="r" b="b"/>
+              <a:pathLst>
+                <a:path w="740118" h="1046932">
+                  <a:moveTo>
+                    <a:pt x="0" y="340359"/>
+                  </a:moveTo>
+                  <a:lnTo>
+                    <a:pt x="0" y="704695"/>
+                  </a:lnTo>
+                  <a:lnTo>
+                    <a:pt x="89143" y="793838"/>
+                  </a:lnTo>
+                  <a:lnTo>
+                    <a:pt x="89143" y="795484"/>
+                  </a:lnTo>
+                  <a:lnTo>
+                    <a:pt x="124074" y="830415"/>
+                  </a:lnTo>
+                  <a:lnTo>
+                    <a:pt x="124074" y="830789"/>
+                  </a:lnTo>
+                  <a:lnTo>
+                    <a:pt x="331898" y="1038614"/>
+                  </a:lnTo>
+                  <a:lnTo>
+                    <a:pt x="332154" y="1038614"/>
+                  </a:lnTo>
+                  <a:lnTo>
+                    <a:pt x="340471" y="1046931"/>
+                  </a:lnTo>
+                  <a:lnTo>
+                    <a:pt x="452460" y="1046931"/>
+                  </a:lnTo>
+                  <a:lnTo>
+                    <a:pt x="452461" y="1046932"/>
+                  </a:lnTo>
+                  <a:lnTo>
+                    <a:pt x="687533" y="1046932"/>
+                  </a:lnTo>
+                  <a:lnTo>
+                    <a:pt x="740118" y="994347"/>
+                  </a:lnTo>
+                  <a:lnTo>
+                    <a:pt x="740118" y="937254"/>
+                  </a:lnTo>
+                  <a:lnTo>
+                    <a:pt x="740117" y="937253"/>
+                  </a:lnTo>
+                  <a:lnTo>
+                    <a:pt x="740117" y="904479"/>
+                  </a:lnTo>
+                  <a:lnTo>
+                    <a:pt x="684558" y="848920"/>
+                  </a:lnTo>
+                  <a:lnTo>
+                    <a:pt x="593635" y="848920"/>
+                  </a:lnTo>
+                  <a:lnTo>
+                    <a:pt x="592741" y="849813"/>
+                  </a:lnTo>
+                  <a:lnTo>
+                    <a:pt x="505777" y="849813"/>
+                  </a:lnTo>
+                  <a:lnTo>
+                    <a:pt x="357997" y="702033"/>
+                  </a:lnTo>
+                  <a:lnTo>
+                    <a:pt x="357997" y="344898"/>
+                  </a:lnTo>
+                  <a:lnTo>
+                    <a:pt x="505777" y="197118"/>
+                  </a:lnTo>
+                  <a:lnTo>
+                    <a:pt x="567550" y="197118"/>
+                  </a:lnTo>
+                  <a:lnTo>
+                    <a:pt x="567550" y="196458"/>
+                  </a:lnTo>
+                  <a:lnTo>
+                    <a:pt x="683757" y="196458"/>
+                  </a:lnTo>
+                  <a:lnTo>
+                    <a:pt x="740117" y="140098"/>
+                  </a:lnTo>
+                  <a:lnTo>
+                    <a:pt x="740117" y="109679"/>
+                  </a:lnTo>
+                  <a:lnTo>
+                    <a:pt x="740118" y="109679"/>
+                  </a:lnTo>
+                  <a:lnTo>
+                    <a:pt x="740118" y="52586"/>
+                  </a:lnTo>
+                  <a:lnTo>
+                    <a:pt x="687533" y="0"/>
+                  </a:lnTo>
+                  <a:lnTo>
+                    <a:pt x="452461" y="0"/>
+                  </a:lnTo>
+                  <a:lnTo>
+                    <a:pt x="452460" y="1"/>
+                  </a:lnTo>
+                  <a:lnTo>
+                    <a:pt x="340471" y="1"/>
+                  </a:lnTo>
+                  <a:lnTo>
+                    <a:pt x="338927" y="1"/>
+                  </a:lnTo>
+                  <a:lnTo>
+                    <a:pt x="244088" y="94840"/>
+                  </a:lnTo>
+                  <a:lnTo>
+                    <a:pt x="244088" y="97118"/>
+                  </a:lnTo>
+                  <a:lnTo>
+                    <a:pt x="125458" y="215748"/>
+                  </a:lnTo>
+                  <a:lnTo>
+                    <a:pt x="125458" y="218061"/>
+                  </a:lnTo>
+                  <a:lnTo>
+                    <a:pt x="98056" y="245463"/>
+                  </a:lnTo>
+                  <a:lnTo>
+                    <a:pt x="94896" y="245463"/>
+                  </a:lnTo>
+                  <a:close/>
+                </a:path>
+              </a:pathLst>
+            </a:custGeom>
+            <a:solidFill>
+              <a:srgbClr val="142B5C"/>
+            </a:solidFill>
+            <a:ln>
+              <a:noFill/>
+            </a:ln>
+          </p:spPr>
+          <p:style>
+            <a:lnRef idx="2">
+              <a:schemeClr val="accent1">
+                <a:shade val="15000"/>
+              </a:schemeClr>
+            </a:lnRef>
+            <a:fillRef idx="1">
+              <a:schemeClr val="accent1"/>
+            </a:fillRef>
+            <a:effectRef idx="0">
+              <a:schemeClr val="accent1"/>
+            </a:effectRef>
+            <a:fontRef idx="minor">
+              <a:schemeClr val="lt1"/>
+            </a:fontRef>
+          </p:style>
+          <p:txBody>
+            <a:bodyPr wrap="square" rtlCol="0" anchor="ctr">
+              <a:noAutofit/>
+            </a:bodyPr>
+            <a:lstStyle/>
+            <a:p>
+              <a:pPr algn="ctr"/>
+              <a:endParaRPr lang="ko-KR" altLang="en-US"/>
+            </a:p>
+          </p:txBody>
+        </p:sp>
+        <p:sp>
+          <p:nvSpPr>
+            <p:cNvPr id="31" name="팔각형 30">
+              <a:extLst>
+                <a:ext uri="{FF2B5EF4-FFF2-40B4-BE49-F238E27FC236}">
+                  <a16:creationId xmlns:a16="http://schemas.microsoft.com/office/drawing/2014/main" id="{05229276-74BF-745A-6ACF-2044128A3C0F}"/>
+                </a:ext>
+              </a:extLst>
+            </p:cNvPr>
+            <p:cNvSpPr/>
+            <p:nvPr/>
+          </p:nvSpPr>
+          <p:spPr>
+            <a:xfrm>
+              <a:off x="6486533" y="1127292"/>
+              <a:ext cx="288930" cy="288930"/>
+            </a:xfrm>
+            <a:prstGeom prst="octagon">
+              <a:avLst/>
+            </a:prstGeom>
+            <a:gradFill flip="none" rotWithShape="1">
+              <a:gsLst>
+                <a:gs pos="0">
+                  <a:srgbClr val="1885D8"/>
+                </a:gs>
+                <a:gs pos="46000">
+                  <a:srgbClr val="1885D8"/>
+                </a:gs>
+                <a:gs pos="68000">
+                  <a:srgbClr val="142B5C"/>
+                </a:gs>
+                <a:gs pos="100000">
+                  <a:srgbClr val="142B5C"/>
+                </a:gs>
+              </a:gsLst>
+              <a:path path="circle">
+                <a:fillToRect l="50000" t="50000" r="50000" b="50000"/>
+              </a:path>
+              <a:tileRect/>
+            </a:gradFill>
+            <a:ln>
+              <a:noFill/>
+            </a:ln>
+          </p:spPr>
+          <p:style>
+            <a:lnRef idx="2">
+              <a:schemeClr val="accent1">
+                <a:shade val="15000"/>
+              </a:schemeClr>
+            </a:lnRef>
+            <a:fillRef idx="1">
+              <a:schemeClr val="accent1"/>
+            </a:fillRef>
+            <a:effectRef idx="0">
+              <a:schemeClr val="accent1"/>
+            </a:effectRef>
+            <a:fontRef idx="minor">
+              <a:schemeClr val="lt1"/>
+            </a:fontRef>
+          </p:style>
+          <p:txBody>
+            <a:bodyPr rtlCol="0" anchor="ctr"/>
+            <a:lstStyle/>
+            <a:p>
+              <a:pPr algn="ctr"/>
+              <a:endParaRPr lang="ko-KR" altLang="en-US" dirty="0"/>
+            </a:p>
+          </p:txBody>
+        </p:sp>
+        <p:sp>
+          <p:nvSpPr>
+            <p:cNvPr id="21" name="팔각형 20">
+              <a:extLst>
+                <a:ext uri="{FF2B5EF4-FFF2-40B4-BE49-F238E27FC236}">
+                  <a16:creationId xmlns:a16="http://schemas.microsoft.com/office/drawing/2014/main" id="{BB6E6984-C904-BCC3-6BDB-B431F73A8DCE}"/>
+                </a:ext>
+              </a:extLst>
+            </p:cNvPr>
+            <p:cNvSpPr/>
+            <p:nvPr/>
+          </p:nvSpPr>
+          <p:spPr>
+            <a:xfrm>
+              <a:off x="6365200" y="1501459"/>
+              <a:ext cx="537250" cy="537250"/>
+            </a:xfrm>
+            <a:prstGeom prst="octagon">
+              <a:avLst/>
+            </a:prstGeom>
+            <a:gradFill>
+              <a:gsLst>
+                <a:gs pos="0">
+                  <a:srgbClr val="FFFFFF"/>
+                </a:gs>
+                <a:gs pos="44000">
+                  <a:srgbClr val="B6FFEA"/>
+                </a:gs>
+                <a:gs pos="72000">
+                  <a:srgbClr val="011EA2"/>
+                </a:gs>
+                <a:gs pos="100000">
+                  <a:srgbClr val="0324A6"/>
+                </a:gs>
+              </a:gsLst>
+              <a:path path="circle">
+                <a:fillToRect l="50000" t="50000" r="50000" b="50000"/>
+              </a:path>
+            </a:gradFill>
+            <a:ln>
+              <a:noFill/>
+            </a:ln>
+          </p:spPr>
+          <p:style>
+            <a:lnRef idx="2">
+              <a:schemeClr val="accent1">
+                <a:shade val="15000"/>
+              </a:schemeClr>
+            </a:lnRef>
+            <a:fillRef idx="1">
+              <a:schemeClr val="accent1"/>
+            </a:fillRef>
+            <a:effectRef idx="0">
+              <a:schemeClr val="accent1"/>
+            </a:effectRef>
+            <a:fontRef idx="minor">
+              <a:schemeClr val="lt1"/>
+            </a:fontRef>
+          </p:style>
+          <p:txBody>
+            <a:bodyPr rtlCol="0" anchor="ctr"/>
+            <a:lstStyle/>
+            <a:p>
+              <a:pPr algn="ctr"/>
+              <a:endParaRPr lang="ko-KR" altLang="en-US"/>
+            </a:p>
+          </p:txBody>
+        </p:sp>
+      </p:grpSp>
     </p:spTree>
     <p:extLst>
       <p:ext uri="{BB962C8B-B14F-4D97-AF65-F5344CB8AC3E}">

</xml_diff>